<commit_message>
- Aporte de secciones en la presentación final.
- Carga de videos.
</commit_message>
<xml_diff>
--- a/Presentaciones/Presentación VASPA - Diciembre 2020 - Examen Final/Presentación VASPA - Diciembre 2020 - Examen Final.pptx
+++ b/Presentaciones/Presentación VASPA - Diciembre 2020 - Examen Final/Presentación VASPA - Diciembre 2020 - Examen Final.pptx
@@ -5,7 +5,7 @@
     <p:sldMasterId id="2147483933" r:id="rId1"/>
   </p:sldMasterIdLst>
   <p:notesMasterIdLst>
-    <p:notesMasterId r:id="rId27"/>
+    <p:notesMasterId r:id="rId29"/>
   </p:notesMasterIdLst>
   <p:sldIdLst>
     <p:sldId id="267" r:id="rId2"/>
@@ -30,9 +30,11 @@
     <p:sldId id="381" r:id="rId21"/>
     <p:sldId id="387" r:id="rId22"/>
     <p:sldId id="388" r:id="rId23"/>
-    <p:sldId id="389" r:id="rId24"/>
-    <p:sldId id="390" r:id="rId25"/>
-    <p:sldId id="275" r:id="rId26"/>
+    <p:sldId id="391" r:id="rId24"/>
+    <p:sldId id="392" r:id="rId25"/>
+    <p:sldId id="389" r:id="rId26"/>
+    <p:sldId id="390" r:id="rId27"/>
+    <p:sldId id="275" r:id="rId28"/>
   </p:sldIdLst>
   <p:sldSz cx="12192000" cy="6858000"/>
   <p:notesSz cx="6858000" cy="9144000"/>
@@ -133,7 +135,7 @@
   </p:defaultTextStyle>
   <p:extLst>
     <p:ext uri="{EFAFB233-063F-42B5-8137-9DF3F51BA10A}">
-      <p15:sldGuideLst xmlns:p15="http://schemas.microsoft.com/office/powerpoint/2012/main">
+      <p15:sldGuideLst xmlns:p15="http://schemas.microsoft.com/office/powerpoint/2012/main" xmlns="">
         <p15:guide id="1" orient="horz" pos="2160">
           <p15:clr>
             <a:srgbClr val="A4A3A4"/>
@@ -151,18 +153,8 @@
 </file>
 
 <file path=ppt/charts/chart1.xml><?xml version="1.0" encoding="utf-8"?>
-<c:chartSpace xmlns:c="http://schemas.openxmlformats.org/drawingml/2006/chart" xmlns:a="http://schemas.openxmlformats.org/drawingml/2006/main" xmlns:r="http://schemas.openxmlformats.org/officeDocument/2006/relationships" xmlns:c16r2="http://schemas.microsoft.com/office/drawing/2015/06/chart">
-  <c:date1904 val="0"/>
-  <c:lang val="es-ES"/>
-  <c:roundedCorners val="0"/>
-  <mc:AlternateContent xmlns:mc="http://schemas.openxmlformats.org/markup-compatibility/2006">
-    <mc:Choice xmlns:c14="http://schemas.microsoft.com/office/drawing/2007/8/2/chart" Requires="c14">
-      <c14:style val="102"/>
-    </mc:Choice>
-    <mc:Fallback>
-      <c:style val="2"/>
-    </mc:Fallback>
-  </mc:AlternateContent>
+<c:chartSpace xmlns:c="http://schemas.openxmlformats.org/drawingml/2006/chart" xmlns:a="http://schemas.openxmlformats.org/drawingml/2006/main" xmlns:r="http://schemas.openxmlformats.org/officeDocument/2006/relationships">
+  <c:lang val="es-AR"/>
   <c:chart>
     <c:title>
       <c:tx>
@@ -195,7 +187,7 @@
           </a:p>
         </c:rich>
       </c:tx>
-      <c:overlay val="0"/>
+      <c:layout/>
       <c:spPr>
         <a:noFill/>
         <a:ln>
@@ -204,12 +196,10 @@
         <a:effectLst/>
       </c:spPr>
     </c:title>
-    <c:autoTitleDeleted val="0"/>
     <c:plotArea>
       <c:layout/>
       <c:lineChart>
         <c:grouping val="standard"/>
-        <c:varyColors val="0"/>
         <c:ser>
           <c:idx val="0"/>
           <c:order val="0"/>
@@ -335,8 +325,7 @@
               </c:numCache>
             </c:numRef>
           </c:val>
-          <c:smooth val="0"/>
-          <c:extLst>
+          <c:extLst xmlns:c16r2="http://schemas.microsoft.com/office/drawing/2015/06/chart">
             <c:ext xmlns:c16="http://schemas.microsoft.com/office/drawing/2014/chart" uri="{C3380CC4-5D6E-409C-BE32-E72D297353CC}">
               <c16:uniqueId val="{00000000-38D4-4551-A2C0-6F470BC3E09B}"/>
             </c:ext>
@@ -446,16 +435,16 @@
                   <c:v>65.569999999999993</c:v>
                 </c:pt>
                 <c:pt idx="5">
-                  <c:v>50.85</c:v>
+                  <c:v>50.849999999999994</c:v>
                 </c:pt>
                 <c:pt idx="6">
                   <c:v>46.42</c:v>
                 </c:pt>
                 <c:pt idx="7">
-                  <c:v>24.419999999999995</c:v>
+                  <c:v>24.419999999999991</c:v>
                 </c:pt>
                 <c:pt idx="8">
-                  <c:v>10.850000000000003</c:v>
+                  <c:v>10.850000000000005</c:v>
                 </c:pt>
                 <c:pt idx="9">
                   <c:v>6.42</c:v>
@@ -466,36 +455,25 @@
               </c:numCache>
             </c:numRef>
           </c:val>
-          <c:smooth val="0"/>
-          <c:extLst>
+          <c:extLst xmlns:c16r2="http://schemas.microsoft.com/office/drawing/2015/06/chart">
             <c:ext xmlns:c16="http://schemas.microsoft.com/office/drawing/2014/chart" uri="{C3380CC4-5D6E-409C-BE32-E72D297353CC}">
               <c16:uniqueId val="{00000001-38D4-4551-A2C0-6F470BC3E09B}"/>
             </c:ext>
           </c:extLst>
         </c:ser>
-        <c:dLbls>
-          <c:showLegendKey val="0"/>
-          <c:showVal val="0"/>
-          <c:showCatName val="0"/>
-          <c:showSerName val="0"/>
-          <c:showPercent val="0"/>
-          <c:showBubbleSize val="0"/>
-        </c:dLbls>
+        <c:dLbls/>
         <c:marker val="1"/>
-        <c:smooth val="0"/>
-        <c:axId val="72085888"/>
-        <c:axId val="72087424"/>
+        <c:axId val="74605696"/>
+        <c:axId val="74607232"/>
       </c:lineChart>
       <c:dateAx>
-        <c:axId val="72085888"/>
+        <c:axId val="74605696"/>
         <c:scaling>
           <c:orientation val="minMax"/>
         </c:scaling>
-        <c:delete val="0"/>
         <c:axPos val="b"/>
         <c:numFmt formatCode="m/d/yyyy" sourceLinked="1"/>
         <c:majorTickMark val="none"/>
-        <c:minorTickMark val="none"/>
         <c:tickLblPos val="nextTo"/>
         <c:spPr>
           <a:noFill/>
@@ -530,18 +508,17 @@
             <a:endParaRPr lang="es-AR"/>
           </a:p>
         </c:txPr>
-        <c:crossAx val="72087424"/>
+        <c:crossAx val="74607232"/>
         <c:crosses val="autoZero"/>
         <c:auto val="1"/>
         <c:lblOffset val="100"/>
         <c:baseTimeUnit val="days"/>
       </c:dateAx>
       <c:valAx>
-        <c:axId val="72087424"/>
+        <c:axId val="74607232"/>
         <c:scaling>
           <c:orientation val="minMax"/>
         </c:scaling>
-        <c:delete val="0"/>
         <c:axPos val="l"/>
         <c:majorGridlines>
           <c:spPr>
@@ -559,7 +536,6 @@
         </c:majorGridlines>
         <c:numFmt formatCode="General" sourceLinked="1"/>
         <c:majorTickMark val="none"/>
-        <c:minorTickMark val="none"/>
         <c:tickLblPos val="nextTo"/>
         <c:spPr>
           <a:noFill/>
@@ -588,7 +564,7 @@
             <a:endParaRPr lang="es-AR"/>
           </a:p>
         </c:txPr>
-        <c:crossAx val="72085888"/>
+        <c:crossAx val="74605696"/>
         <c:crosses val="autoZero"/>
         <c:crossBetween val="between"/>
       </c:valAx>
@@ -602,7 +578,7 @@
     </c:plotArea>
     <c:legend>
       <c:legendPos val="b"/>
-      <c:overlay val="0"/>
+      <c:layout/>
       <c:spPr>
         <a:noFill/>
         <a:ln>
@@ -633,14 +609,13 @@
     </c:legend>
     <c:plotVisOnly val="1"/>
     <c:dispBlanksAs val="gap"/>
-    <c:extLst>
+    <c:extLst xmlns:c16r2="http://schemas.microsoft.com/office/drawing/2015/06/chart">
       <c:ext xmlns:c16r3="http://schemas.microsoft.com/office/drawing/2017/03/chart" uri="{56B9EC1D-385E-4148-901F-78D8002777C0}">
         <c16r3:dataDisplayOptions16>
           <c16r3:dispNaAsBlank val="1"/>
         </c16r3:dataDisplayOptions16>
       </c:ext>
     </c:extLst>
-    <c:showDLblsOverMax val="0"/>
   </c:chart>
   <c:spPr>
     <a:solidFill>
@@ -667,9 +642,7 @@
       <a:endParaRPr lang="es-AR"/>
     </a:p>
   </c:txPr>
-  <c:externalData r:id="rId1">
-    <c:autoUpdate val="0"/>
-  </c:externalData>
+  <c:externalData r:id="rId1"/>
   <c:userShapes r:id="rId2"/>
 </c:chartSpace>
 </file>
@@ -1592,6 +1565,13 @@
         </dgm:presLayoutVars>
       </dgm:prSet>
       <dgm:spPr/>
+      <dgm:t>
+        <a:bodyPr/>
+        <a:lstStyle/>
+        <a:p>
+          <a:endParaRPr lang="es-AR"/>
+        </a:p>
+      </dgm:t>
     </dgm:pt>
     <dgm:pt modelId="{3D5C674D-195F-4346-A602-68D809648B83}" type="pres">
       <dgm:prSet presAssocID="{853FF75D-08FD-4C0B-97FF-B95C5121D1D7}" presName="parTxOnly" presStyleLbl="node1" presStyleIdx="0" presStyleCnt="4">
@@ -1602,6 +1582,13 @@
         </dgm:presLayoutVars>
       </dgm:prSet>
       <dgm:spPr/>
+      <dgm:t>
+        <a:bodyPr/>
+        <a:lstStyle/>
+        <a:p>
+          <a:endParaRPr lang="es-AR"/>
+        </a:p>
+      </dgm:t>
     </dgm:pt>
     <dgm:pt modelId="{4DCC4052-4221-44D0-84E2-29AAAD96FCB3}" type="pres">
       <dgm:prSet presAssocID="{888E8F23-D971-4F49-AF2A-2D3F7847711C}" presName="parTxOnlySpace" presStyleCnt="0"/>
@@ -1616,6 +1603,13 @@
         </dgm:presLayoutVars>
       </dgm:prSet>
       <dgm:spPr/>
+      <dgm:t>
+        <a:bodyPr/>
+        <a:lstStyle/>
+        <a:p>
+          <a:endParaRPr lang="es-AR"/>
+        </a:p>
+      </dgm:t>
     </dgm:pt>
     <dgm:pt modelId="{A6E2C1E9-D2ED-47B3-A71D-FDA80BA4D0C1}" type="pres">
       <dgm:prSet presAssocID="{431F7064-B371-4D30-9440-9276B420E393}" presName="parTxOnlySpace" presStyleCnt="0"/>
@@ -1630,6 +1624,13 @@
         </dgm:presLayoutVars>
       </dgm:prSet>
       <dgm:spPr/>
+      <dgm:t>
+        <a:bodyPr/>
+        <a:lstStyle/>
+        <a:p>
+          <a:endParaRPr lang="es-AR"/>
+        </a:p>
+      </dgm:t>
     </dgm:pt>
     <dgm:pt modelId="{FA28285D-C85B-47E5-8E04-E3031E7EB070}" type="pres">
       <dgm:prSet presAssocID="{50E5B106-8092-4055-AC3C-E16AB9A8A632}" presName="parTxOnlySpace" presStyleCnt="0"/>
@@ -1644,17 +1645,24 @@
         </dgm:presLayoutVars>
       </dgm:prSet>
       <dgm:spPr/>
+      <dgm:t>
+        <a:bodyPr/>
+        <a:lstStyle/>
+        <a:p>
+          <a:endParaRPr lang="es-AR"/>
+        </a:p>
+      </dgm:t>
     </dgm:pt>
   </dgm:ptLst>
   <dgm:cxnLst>
     <dgm:cxn modelId="{7D2F0A27-3D8B-4128-8CB3-A82F5F34B1DA}" type="presOf" srcId="{3B4EE390-B919-49DE-81BE-0780A08DDBFA}" destId="{AEA2C0A0-0FCA-4EB1-AA5B-89E50BC14E35}" srcOrd="0" destOrd="0" presId="urn:microsoft.com/office/officeart/2005/8/layout/chevron1"/>
+    <dgm:cxn modelId="{5E7AA7A8-CA8D-46F6-8417-A9E8900910E7}" type="presOf" srcId="{07D852F8-DC80-412E-99FF-CBC8CF6E9E53}" destId="{BB3205ED-EB8F-4AA2-A69D-916A25FD317F}" srcOrd="0" destOrd="0" presId="urn:microsoft.com/office/officeart/2005/8/layout/chevron1"/>
+    <dgm:cxn modelId="{24BDC4C3-8E68-4ABC-A0DA-A0FE0C4BE3D4}" srcId="{07D852F8-DC80-412E-99FF-CBC8CF6E9E53}" destId="{3E85E467-C11E-426F-9200-FC251BE43DEA}" srcOrd="1" destOrd="0" parTransId="{83EB3A9D-25F1-42C7-AA54-1B46554184BF}" sibTransId="{431F7064-B371-4D30-9440-9276B420E393}"/>
     <dgm:cxn modelId="{C846122C-05FD-4C41-8444-CC3A300BDFFE}" srcId="{07D852F8-DC80-412E-99FF-CBC8CF6E9E53}" destId="{853FF75D-08FD-4C0B-97FF-B95C5121D1D7}" srcOrd="0" destOrd="0" parTransId="{BD4839AE-4C9F-4F18-92E9-4B1323829560}" sibTransId="{888E8F23-D971-4F49-AF2A-2D3F7847711C}"/>
+    <dgm:cxn modelId="{403E4FC9-6B5A-4E42-8B00-B4A63F0B56C0}" type="presOf" srcId="{3E85E467-C11E-426F-9200-FC251BE43DEA}" destId="{6886AB32-2506-433F-9563-157CC1EA1348}" srcOrd="0" destOrd="0" presId="urn:microsoft.com/office/officeart/2005/8/layout/chevron1"/>
     <dgm:cxn modelId="{49728C46-9AF0-4404-B77C-0BF8753B1BE2}" srcId="{07D852F8-DC80-412E-99FF-CBC8CF6E9E53}" destId="{3B4EE390-B919-49DE-81BE-0780A08DDBFA}" srcOrd="2" destOrd="0" parTransId="{3B1FF57E-AA55-4079-B104-9BCA769CA707}" sibTransId="{50E5B106-8092-4055-AC3C-E16AB9A8A632}"/>
     <dgm:cxn modelId="{D7B69E66-919E-4FAC-945E-964D8A3AC565}" type="presOf" srcId="{FE8D9DF2-8BC9-4E07-8005-D845C397B55E}" destId="{09B459DE-37E0-4270-82CB-D68CAF9A376E}" srcOrd="0" destOrd="0" presId="urn:microsoft.com/office/officeart/2005/8/layout/chevron1"/>
     <dgm:cxn modelId="{D76B3C6A-BC4F-4872-BB7B-7982459BAA86}" type="presOf" srcId="{853FF75D-08FD-4C0B-97FF-B95C5121D1D7}" destId="{3D5C674D-195F-4346-A602-68D809648B83}" srcOrd="0" destOrd="0" presId="urn:microsoft.com/office/officeart/2005/8/layout/chevron1"/>
-    <dgm:cxn modelId="{5E7AA7A8-CA8D-46F6-8417-A9E8900910E7}" type="presOf" srcId="{07D852F8-DC80-412E-99FF-CBC8CF6E9E53}" destId="{BB3205ED-EB8F-4AA2-A69D-916A25FD317F}" srcOrd="0" destOrd="0" presId="urn:microsoft.com/office/officeart/2005/8/layout/chevron1"/>
-    <dgm:cxn modelId="{24BDC4C3-8E68-4ABC-A0DA-A0FE0C4BE3D4}" srcId="{07D852F8-DC80-412E-99FF-CBC8CF6E9E53}" destId="{3E85E467-C11E-426F-9200-FC251BE43DEA}" srcOrd="1" destOrd="0" parTransId="{83EB3A9D-25F1-42C7-AA54-1B46554184BF}" sibTransId="{431F7064-B371-4D30-9440-9276B420E393}"/>
-    <dgm:cxn modelId="{403E4FC9-6B5A-4E42-8B00-B4A63F0B56C0}" type="presOf" srcId="{3E85E467-C11E-426F-9200-FC251BE43DEA}" destId="{6886AB32-2506-433F-9563-157CC1EA1348}" srcOrd="0" destOrd="0" presId="urn:microsoft.com/office/officeart/2005/8/layout/chevron1"/>
     <dgm:cxn modelId="{61C2D7D0-DEE2-4010-B64E-4D1FEDBA0702}" srcId="{07D852F8-DC80-412E-99FF-CBC8CF6E9E53}" destId="{FE8D9DF2-8BC9-4E07-8005-D845C397B55E}" srcOrd="3" destOrd="0" parTransId="{5B8A1B7E-67AD-4057-819C-2245EC4F7AC4}" sibTransId="{5B54ED7F-A264-47E6-96E6-7D075AA7F363}"/>
     <dgm:cxn modelId="{2F515B5D-54B1-4237-891D-39EC55794076}" type="presParOf" srcId="{BB3205ED-EB8F-4AA2-A69D-916A25FD317F}" destId="{3D5C674D-195F-4346-A602-68D809648B83}" srcOrd="0" destOrd="0" presId="urn:microsoft.com/office/officeart/2005/8/layout/chevron1"/>
     <dgm:cxn modelId="{624BFC5C-F915-4A8E-B04A-57BF8C238C73}" type="presParOf" srcId="{BB3205ED-EB8F-4AA2-A69D-916A25FD317F}" destId="{4DCC4052-4221-44D0-84E2-29AAAD96FCB3}" srcOrd="1" destOrd="0" presId="urn:microsoft.com/office/officeart/2005/8/layout/chevron1"/>
@@ -1668,14 +1676,14 @@
   <dgm:whole/>
   <dgm:extLst>
     <a:ext uri="http://schemas.microsoft.com/office/drawing/2008/diagram">
-      <dsp:dataModelExt xmlns:dsp="http://schemas.microsoft.com/office/drawing/2008/diagram" relId="rId6" minVer="http://schemas.openxmlformats.org/drawingml/2006/diagram"/>
+      <dsp:dataModelExt xmlns:dsp="http://schemas.microsoft.com/office/drawing/2008/diagram" xmlns="" relId="rId6" minVer="http://schemas.openxmlformats.org/drawingml/2006/diagram"/>
     </a:ext>
   </dgm:extLst>
 </dgm:dataModel>
 </file>
 
 <file path=ppt/diagrams/drawing1.xml><?xml version="1.0" encoding="utf-8"?>
-<dsp:drawing xmlns:dgm="http://schemas.openxmlformats.org/drawingml/2006/diagram" xmlns:dsp="http://schemas.microsoft.com/office/drawing/2008/diagram" xmlns:a="http://schemas.openxmlformats.org/drawingml/2006/main">
+<dsp:drawing xmlns:dgm="http://schemas.openxmlformats.org/drawingml/2006/diagram" xmlns:a="http://schemas.openxmlformats.org/drawingml/2006/main" xmlns:dsp="http://schemas.microsoft.com/office/drawing/2008/diagram">
   <dsp:spTree>
     <dsp:nvGrpSpPr>
       <dsp:cNvPr id="0" name=""/>
@@ -1736,7 +1744,7 @@
         </a:bodyPr>
         <a:lstStyle/>
         <a:p>
-          <a:pPr marL="0" lvl="0" indent="0" algn="ctr" defTabSz="755650">
+          <a:pPr lvl="0" algn="ctr" defTabSz="755650">
             <a:lnSpc>
               <a:spcPct val="90000"/>
             </a:lnSpc>
@@ -1746,7 +1754,6 @@
             <a:spcAft>
               <a:spcPct val="35000"/>
             </a:spcAft>
-            <a:buNone/>
           </a:pPr>
           <a:r>
             <a:rPr lang="es-ES" sz="1700" kern="1200" dirty="0"/>
@@ -1756,8 +1763,8 @@
         </a:p>
       </dsp:txBody>
       <dsp:txXfrm>
-        <a:off x="442714" y="2190952"/>
-        <a:ext cx="1316831" cy="877887"/>
+        <a:off x="3770" y="2190952"/>
+        <a:ext cx="2194718" cy="877887"/>
       </dsp:txXfrm>
     </dsp:sp>
     <dsp:sp modelId="{6886AB32-2506-433F-9563-157CC1EA1348}">
@@ -1814,7 +1821,7 @@
         </a:bodyPr>
         <a:lstStyle/>
         <a:p>
-          <a:pPr marL="0" lvl="0" indent="0" algn="ctr" defTabSz="755650">
+          <a:pPr lvl="0" algn="ctr" defTabSz="755650">
             <a:lnSpc>
               <a:spcPct val="90000"/>
             </a:lnSpc>
@@ -1824,7 +1831,6 @@
             <a:spcAft>
               <a:spcPct val="35000"/>
             </a:spcAft>
-            <a:buNone/>
           </a:pPr>
           <a:r>
             <a:rPr lang="es-ES" sz="1700" kern="1200" dirty="0"/>
@@ -1834,8 +1840,8 @@
         </a:p>
       </dsp:txBody>
       <dsp:txXfrm>
-        <a:off x="2417961" y="2190952"/>
-        <a:ext cx="1316831" cy="877887"/>
+        <a:off x="1979017" y="2190952"/>
+        <a:ext cx="2194718" cy="877887"/>
       </dsp:txXfrm>
     </dsp:sp>
     <dsp:sp modelId="{AEA2C0A0-0FCA-4EB1-AA5B-89E50BC14E35}">
@@ -1892,7 +1898,7 @@
         </a:bodyPr>
         <a:lstStyle/>
         <a:p>
-          <a:pPr marL="0" lvl="0" indent="0" algn="ctr" defTabSz="755650">
+          <a:pPr lvl="0" algn="ctr" defTabSz="755650">
             <a:lnSpc>
               <a:spcPct val="90000"/>
             </a:lnSpc>
@@ -1902,7 +1908,6 @@
             <a:spcAft>
               <a:spcPct val="35000"/>
             </a:spcAft>
-            <a:buNone/>
           </a:pPr>
           <a:r>
             <a:rPr lang="es-ES" sz="1700" kern="1200" dirty="0"/>
@@ -1912,8 +1917,8 @@
         </a:p>
       </dsp:txBody>
       <dsp:txXfrm>
-        <a:off x="4393208" y="2190952"/>
-        <a:ext cx="1316831" cy="877887"/>
+        <a:off x="3954264" y="2190952"/>
+        <a:ext cx="2194718" cy="877887"/>
       </dsp:txXfrm>
     </dsp:sp>
     <dsp:sp modelId="{09B459DE-37E0-4270-82CB-D68CAF9A376E}">
@@ -1970,7 +1975,7 @@
         </a:bodyPr>
         <a:lstStyle/>
         <a:p>
-          <a:pPr marL="0" lvl="0" indent="0" algn="ctr" defTabSz="755650">
+          <a:pPr lvl="0" algn="ctr" defTabSz="755650">
             <a:lnSpc>
               <a:spcPct val="90000"/>
             </a:lnSpc>
@@ -1980,7 +1985,6 @@
             <a:spcAft>
               <a:spcPct val="35000"/>
             </a:spcAft>
-            <a:buNone/>
           </a:pPr>
           <a:r>
             <a:rPr lang="es-ES" sz="1700" kern="1200" dirty="0"/>
@@ -1990,8 +1994,8 @@
         </a:p>
       </dsp:txBody>
       <dsp:txXfrm>
-        <a:off x="6368454" y="2190952"/>
-        <a:ext cx="1316831" cy="877887"/>
+        <a:off x="5929510" y="2190952"/>
+        <a:ext cx="2194718" cy="877887"/>
       </dsp:txXfrm>
     </dsp:sp>
   </dsp:spTree>
@@ -3331,7 +3335,7 @@
         <cdr:cNvPr id="2" name="CuadroTexto 2">
           <a:extLst xmlns:a="http://schemas.openxmlformats.org/drawingml/2006/main">
             <a:ext uri="{FF2B5EF4-FFF2-40B4-BE49-F238E27FC236}">
-              <a16:creationId xmlns:a16="http://schemas.microsoft.com/office/drawing/2014/main" id="{29B4C296-372F-455A-BE5A-B512322B8EDE}"/>
+              <a16:creationId xmlns:a16="http://schemas.microsoft.com/office/drawing/2014/main" xmlns="" id="{29B4C296-372F-455A-BE5A-B512322B8EDE}"/>
             </a:ext>
           </a:extLst>
         </cdr:cNvPr>
@@ -3542,7 +3546,7 @@
             <a:fld id="{F55F861E-3C59-4235-9924-AE3FDF166F3F}" type="datetimeFigureOut">
               <a:rPr lang="es-AR" smtClean="0"/>
               <a:pPr/>
-              <a:t>20/11/2020</a:t>
+              <a:t>21/11/2020</a:t>
             </a:fld>
             <a:endParaRPr lang="es-AR"/>
           </a:p>
@@ -3711,7 +3715,7 @@
     </p:spTree>
     <p:extLst>
       <p:ext uri="{BB962C8B-B14F-4D97-AF65-F5344CB8AC3E}">
-        <p14:creationId xmlns:p14="http://schemas.microsoft.com/office/powerpoint/2010/main" val="1580866007"/>
+        <p14:creationId xmlns:p14="http://schemas.microsoft.com/office/powerpoint/2010/main" xmlns="" val="1580866007"/>
       </p:ext>
     </p:extLst>
   </p:cSld>
@@ -4314,7 +4318,7 @@
             <a:fld id="{59D4168E-E6F0-4E6D-9E98-0FBF44047F1D}" type="datetimeFigureOut">
               <a:rPr lang="es-AR" smtClean="0"/>
               <a:pPr/>
-              <a:t>20/11/2020</a:t>
+              <a:t>21/11/2020</a:t>
             </a:fld>
             <a:endParaRPr lang="es-AR"/>
           </a:p>
@@ -4373,7 +4377,7 @@
           <p:cNvPr id="8" name="Imagen 7">
             <a:extLst>
               <a:ext uri="{FF2B5EF4-FFF2-40B4-BE49-F238E27FC236}">
-                <a16:creationId xmlns:a16="http://schemas.microsoft.com/office/drawing/2014/main" id="{153E41C7-C0FB-4283-8821-79FB890C108B}"/>
+                <a16:creationId xmlns:a16="http://schemas.microsoft.com/office/drawing/2014/main" xmlns="" id="{153E41C7-C0FB-4283-8821-79FB890C108B}"/>
               </a:ext>
             </a:extLst>
           </p:cNvPr>
@@ -4386,7 +4390,7 @@
           <a:blip r:embed="rId2" cstate="print">
             <a:extLst>
               <a:ext uri="{28A0092B-C50C-407E-A947-70E740481C1C}">
-                <a14:useLocalDpi xmlns:a14="http://schemas.microsoft.com/office/drawing/2010/main" val="0"/>
+                <a14:useLocalDpi xmlns:a14="http://schemas.microsoft.com/office/drawing/2010/main" xmlns="" val="0"/>
               </a:ext>
             </a:extLst>
           </a:blip>
@@ -4407,7 +4411,7 @@
     </p:spTree>
     <p:extLst>
       <p:ext uri="{BB962C8B-B14F-4D97-AF65-F5344CB8AC3E}">
-        <p14:creationId xmlns:p14="http://schemas.microsoft.com/office/powerpoint/2010/main" val="594578851"/>
+        <p14:creationId xmlns:p14="http://schemas.microsoft.com/office/powerpoint/2010/main" xmlns="" val="594578851"/>
       </p:ext>
     </p:extLst>
   </p:cSld>
@@ -4648,7 +4652,7 @@
             <a:fld id="{59D4168E-E6F0-4E6D-9E98-0FBF44047F1D}" type="datetimeFigureOut">
               <a:rPr lang="es-AR" smtClean="0"/>
               <a:pPr/>
-              <a:t>20/11/2020</a:t>
+              <a:t>21/11/2020</a:t>
             </a:fld>
             <a:endParaRPr lang="es-AR"/>
           </a:p>
@@ -4700,7 +4704,7 @@
     </p:spTree>
     <p:extLst>
       <p:ext uri="{BB962C8B-B14F-4D97-AF65-F5344CB8AC3E}">
-        <p14:creationId xmlns:p14="http://schemas.microsoft.com/office/powerpoint/2010/main" val="2858870748"/>
+        <p14:creationId xmlns:p14="http://schemas.microsoft.com/office/powerpoint/2010/main" xmlns="" val="2858870748"/>
       </p:ext>
     </p:extLst>
   </p:cSld>
@@ -4898,7 +4902,7 @@
             <a:fld id="{59D4168E-E6F0-4E6D-9E98-0FBF44047F1D}" type="datetimeFigureOut">
               <a:rPr lang="es-AR" smtClean="0"/>
               <a:pPr/>
-              <a:t>20/11/2020</a:t>
+              <a:t>21/11/2020</a:t>
             </a:fld>
             <a:endParaRPr lang="es-AR"/>
           </a:p>
@@ -4950,7 +4954,7 @@
     </p:spTree>
     <p:extLst>
       <p:ext uri="{BB962C8B-B14F-4D97-AF65-F5344CB8AC3E}">
-        <p14:creationId xmlns:p14="http://schemas.microsoft.com/office/powerpoint/2010/main" val="2887001581"/>
+        <p14:creationId xmlns:p14="http://schemas.microsoft.com/office/powerpoint/2010/main" xmlns="" val="2887001581"/>
       </p:ext>
     </p:extLst>
   </p:cSld>
@@ -5440,7 +5444,7 @@
             <a:fld id="{59D4168E-E6F0-4E6D-9E98-0FBF44047F1D}" type="datetimeFigureOut">
               <a:rPr lang="es-AR" smtClean="0"/>
               <a:pPr/>
-              <a:t>20/11/2020</a:t>
+              <a:t>21/11/2020</a:t>
             </a:fld>
             <a:endParaRPr lang="es-AR"/>
           </a:p>
@@ -5492,7 +5496,7 @@
     </p:spTree>
     <p:extLst>
       <p:ext uri="{BB962C8B-B14F-4D97-AF65-F5344CB8AC3E}">
-        <p14:creationId xmlns:p14="http://schemas.microsoft.com/office/powerpoint/2010/main" val="953477666"/>
+        <p14:creationId xmlns:p14="http://schemas.microsoft.com/office/powerpoint/2010/main" xmlns="" val="953477666"/>
       </p:ext>
     </p:extLst>
   </p:cSld>
@@ -5690,7 +5694,7 @@
             <a:fld id="{59D4168E-E6F0-4E6D-9E98-0FBF44047F1D}" type="datetimeFigureOut">
               <a:rPr lang="es-AR" smtClean="0"/>
               <a:pPr/>
-              <a:t>20/11/2020</a:t>
+              <a:t>21/11/2020</a:t>
             </a:fld>
             <a:endParaRPr lang="es-AR"/>
           </a:p>
@@ -5742,7 +5746,7 @@
     </p:spTree>
     <p:extLst>
       <p:ext uri="{BB962C8B-B14F-4D97-AF65-F5344CB8AC3E}">
-        <p14:creationId xmlns:p14="http://schemas.microsoft.com/office/powerpoint/2010/main" val="2881036134"/>
+        <p14:creationId xmlns:p14="http://schemas.microsoft.com/office/powerpoint/2010/main" xmlns="" val="2881036134"/>
       </p:ext>
     </p:extLst>
   </p:cSld>
@@ -6224,7 +6228,7 @@
             <a:fld id="{59D4168E-E6F0-4E6D-9E98-0FBF44047F1D}" type="datetimeFigureOut">
               <a:rPr lang="es-AR" smtClean="0"/>
               <a:pPr/>
-              <a:t>20/11/2020</a:t>
+              <a:t>21/11/2020</a:t>
             </a:fld>
             <a:endParaRPr lang="es-AR"/>
           </a:p>
@@ -6276,7 +6280,7 @@
     </p:spTree>
     <p:extLst>
       <p:ext uri="{BB962C8B-B14F-4D97-AF65-F5344CB8AC3E}">
-        <p14:creationId xmlns:p14="http://schemas.microsoft.com/office/powerpoint/2010/main" val="3557333580"/>
+        <p14:creationId xmlns:p14="http://schemas.microsoft.com/office/powerpoint/2010/main" xmlns="" val="3557333580"/>
       </p:ext>
     </p:extLst>
   </p:cSld>
@@ -6523,7 +6527,7 @@
             <a:fld id="{59D4168E-E6F0-4E6D-9E98-0FBF44047F1D}" type="datetimeFigureOut">
               <a:rPr lang="es-AR" smtClean="0"/>
               <a:pPr/>
-              <a:t>20/11/2020</a:t>
+              <a:t>21/11/2020</a:t>
             </a:fld>
             <a:endParaRPr lang="es-AR"/>
           </a:p>
@@ -6575,7 +6579,7 @@
     </p:spTree>
     <p:extLst>
       <p:ext uri="{BB962C8B-B14F-4D97-AF65-F5344CB8AC3E}">
-        <p14:creationId xmlns:p14="http://schemas.microsoft.com/office/powerpoint/2010/main" val="2020671905"/>
+        <p14:creationId xmlns:p14="http://schemas.microsoft.com/office/powerpoint/2010/main" xmlns="" val="2020671905"/>
       </p:ext>
     </p:extLst>
   </p:cSld>
@@ -6699,7 +6703,7 @@
             <a:fld id="{59D4168E-E6F0-4E6D-9E98-0FBF44047F1D}" type="datetimeFigureOut">
               <a:rPr lang="es-AR" smtClean="0"/>
               <a:pPr/>
-              <a:t>20/11/2020</a:t>
+              <a:t>21/11/2020</a:t>
             </a:fld>
             <a:endParaRPr lang="es-AR"/>
           </a:p>
@@ -6751,7 +6755,7 @@
     </p:spTree>
     <p:extLst>
       <p:ext uri="{BB962C8B-B14F-4D97-AF65-F5344CB8AC3E}">
-        <p14:creationId xmlns:p14="http://schemas.microsoft.com/office/powerpoint/2010/main" val="3698065381"/>
+        <p14:creationId xmlns:p14="http://schemas.microsoft.com/office/powerpoint/2010/main" xmlns="" val="3698065381"/>
       </p:ext>
     </p:extLst>
   </p:cSld>
@@ -6881,7 +6885,7 @@
             <a:fld id="{59D4168E-E6F0-4E6D-9E98-0FBF44047F1D}" type="datetimeFigureOut">
               <a:rPr lang="es-AR" smtClean="0"/>
               <a:pPr/>
-              <a:t>20/11/2020</a:t>
+              <a:t>21/11/2020</a:t>
             </a:fld>
             <a:endParaRPr lang="es-AR"/>
           </a:p>
@@ -6933,7 +6937,7 @@
     </p:spTree>
     <p:extLst>
       <p:ext uri="{BB962C8B-B14F-4D97-AF65-F5344CB8AC3E}">
-        <p14:creationId xmlns:p14="http://schemas.microsoft.com/office/powerpoint/2010/main" val="2361575083"/>
+        <p14:creationId xmlns:p14="http://schemas.microsoft.com/office/powerpoint/2010/main" xmlns="" val="2361575083"/>
       </p:ext>
     </p:extLst>
   </p:cSld>
@@ -7059,7 +7063,7 @@
             <a:fld id="{59D4168E-E6F0-4E6D-9E98-0FBF44047F1D}" type="datetimeFigureOut">
               <a:rPr lang="es-AR" smtClean="0"/>
               <a:pPr/>
-              <a:t>20/11/2020</a:t>
+              <a:t>21/11/2020</a:t>
             </a:fld>
             <a:endParaRPr lang="es-AR"/>
           </a:p>
@@ -7118,7 +7122,7 @@
           <p:cNvPr id="8" name="Imagen 7">
             <a:extLst>
               <a:ext uri="{FF2B5EF4-FFF2-40B4-BE49-F238E27FC236}">
-                <a16:creationId xmlns:a16="http://schemas.microsoft.com/office/drawing/2014/main" id="{F65BAB47-52C5-4418-98C7-5ABDFBAB2220}"/>
+                <a16:creationId xmlns:a16="http://schemas.microsoft.com/office/drawing/2014/main" xmlns="" id="{F65BAB47-52C5-4418-98C7-5ABDFBAB2220}"/>
               </a:ext>
             </a:extLst>
           </p:cNvPr>
@@ -7131,7 +7135,7 @@
           <a:blip r:embed="rId2" cstate="print">
             <a:extLst>
               <a:ext uri="{28A0092B-C50C-407E-A947-70E740481C1C}">
-                <a14:useLocalDpi xmlns:a14="http://schemas.microsoft.com/office/drawing/2010/main" val="0"/>
+                <a14:useLocalDpi xmlns:a14="http://schemas.microsoft.com/office/drawing/2010/main" xmlns="" val="0"/>
               </a:ext>
             </a:extLst>
           </a:blip>
@@ -7152,7 +7156,7 @@
     </p:spTree>
     <p:extLst>
       <p:ext uri="{BB962C8B-B14F-4D97-AF65-F5344CB8AC3E}">
-        <p14:creationId xmlns:p14="http://schemas.microsoft.com/office/powerpoint/2010/main" val="3522170283"/>
+        <p14:creationId xmlns:p14="http://schemas.microsoft.com/office/powerpoint/2010/main" xmlns="" val="3522170283"/>
       </p:ext>
     </p:extLst>
   </p:cSld>
@@ -7348,7 +7352,7 @@
             <a:fld id="{59D4168E-E6F0-4E6D-9E98-0FBF44047F1D}" type="datetimeFigureOut">
               <a:rPr lang="es-AR" smtClean="0"/>
               <a:pPr/>
-              <a:t>20/11/2020</a:t>
+              <a:t>21/11/2020</a:t>
             </a:fld>
             <a:endParaRPr lang="es-AR"/>
           </a:p>
@@ -7400,7 +7404,7 @@
     </p:spTree>
     <p:extLst>
       <p:ext uri="{BB962C8B-B14F-4D97-AF65-F5344CB8AC3E}">
-        <p14:creationId xmlns:p14="http://schemas.microsoft.com/office/powerpoint/2010/main" val="2921707453"/>
+        <p14:creationId xmlns:p14="http://schemas.microsoft.com/office/powerpoint/2010/main" xmlns="" val="2921707453"/>
       </p:ext>
     </p:extLst>
   </p:cSld>
@@ -7647,7 +7651,7 @@
             <a:fld id="{59D4168E-E6F0-4E6D-9E98-0FBF44047F1D}" type="datetimeFigureOut">
               <a:rPr lang="es-AR" smtClean="0"/>
               <a:pPr/>
-              <a:t>20/11/2020</a:t>
+              <a:t>21/11/2020</a:t>
             </a:fld>
             <a:endParaRPr lang="es-AR"/>
           </a:p>
@@ -7699,7 +7703,7 @@
     </p:spTree>
     <p:extLst>
       <p:ext uri="{BB962C8B-B14F-4D97-AF65-F5344CB8AC3E}">
-        <p14:creationId xmlns:p14="http://schemas.microsoft.com/office/powerpoint/2010/main" val="1855319959"/>
+        <p14:creationId xmlns:p14="http://schemas.microsoft.com/office/powerpoint/2010/main" xmlns="" val="1855319959"/>
       </p:ext>
     </p:extLst>
   </p:cSld>
@@ -8091,7 +8095,7 @@
             <a:fld id="{59D4168E-E6F0-4E6D-9E98-0FBF44047F1D}" type="datetimeFigureOut">
               <a:rPr lang="es-AR" smtClean="0"/>
               <a:pPr/>
-              <a:t>20/11/2020</a:t>
+              <a:t>21/11/2020</a:t>
             </a:fld>
             <a:endParaRPr lang="es-AR"/>
           </a:p>
@@ -8143,7 +8147,7 @@
     </p:spTree>
     <p:extLst>
       <p:ext uri="{BB962C8B-B14F-4D97-AF65-F5344CB8AC3E}">
-        <p14:creationId xmlns:p14="http://schemas.microsoft.com/office/powerpoint/2010/main" val="522982594"/>
+        <p14:creationId xmlns:p14="http://schemas.microsoft.com/office/powerpoint/2010/main" xmlns="" val="522982594"/>
       </p:ext>
     </p:extLst>
   </p:cSld>
@@ -8211,7 +8215,7 @@
             <a:fld id="{59D4168E-E6F0-4E6D-9E98-0FBF44047F1D}" type="datetimeFigureOut">
               <a:rPr lang="es-AR" smtClean="0"/>
               <a:pPr/>
-              <a:t>20/11/2020</a:t>
+              <a:t>21/11/2020</a:t>
             </a:fld>
             <a:endParaRPr lang="es-AR"/>
           </a:p>
@@ -8263,7 +8267,7 @@
     </p:spTree>
     <p:extLst>
       <p:ext uri="{BB962C8B-B14F-4D97-AF65-F5344CB8AC3E}">
-        <p14:creationId xmlns:p14="http://schemas.microsoft.com/office/powerpoint/2010/main" val="3355991177"/>
+        <p14:creationId xmlns:p14="http://schemas.microsoft.com/office/powerpoint/2010/main" xmlns="" val="3355991177"/>
       </p:ext>
     </p:extLst>
   </p:cSld>
@@ -8308,7 +8312,7 @@
             <a:fld id="{59D4168E-E6F0-4E6D-9E98-0FBF44047F1D}" type="datetimeFigureOut">
               <a:rPr lang="es-AR" smtClean="0"/>
               <a:pPr/>
-              <a:t>20/11/2020</a:t>
+              <a:t>21/11/2020</a:t>
             </a:fld>
             <a:endParaRPr lang="es-AR"/>
           </a:p>
@@ -8360,7 +8364,7 @@
     </p:spTree>
     <p:extLst>
       <p:ext uri="{BB962C8B-B14F-4D97-AF65-F5344CB8AC3E}">
-        <p14:creationId xmlns:p14="http://schemas.microsoft.com/office/powerpoint/2010/main" val="2067178301"/>
+        <p14:creationId xmlns:p14="http://schemas.microsoft.com/office/powerpoint/2010/main" xmlns="" val="2067178301"/>
       </p:ext>
     </p:extLst>
   </p:cSld>
@@ -8593,7 +8597,7 @@
             <a:fld id="{59D4168E-E6F0-4E6D-9E98-0FBF44047F1D}" type="datetimeFigureOut">
               <a:rPr lang="es-AR" smtClean="0"/>
               <a:pPr/>
-              <a:t>20/11/2020</a:t>
+              <a:t>21/11/2020</a:t>
             </a:fld>
             <a:endParaRPr lang="es-AR"/>
           </a:p>
@@ -8645,7 +8649,7 @@
     </p:spTree>
     <p:extLst>
       <p:ext uri="{BB962C8B-B14F-4D97-AF65-F5344CB8AC3E}">
-        <p14:creationId xmlns:p14="http://schemas.microsoft.com/office/powerpoint/2010/main" val="1822716033"/>
+        <p14:creationId xmlns:p14="http://schemas.microsoft.com/office/powerpoint/2010/main" xmlns="" val="1822716033"/>
       </p:ext>
     </p:extLst>
   </p:cSld>
@@ -8886,7 +8890,7 @@
             <a:fld id="{59D4168E-E6F0-4E6D-9E98-0FBF44047F1D}" type="datetimeFigureOut">
               <a:rPr lang="es-AR" smtClean="0"/>
               <a:pPr/>
-              <a:t>20/11/2020</a:t>
+              <a:t>21/11/2020</a:t>
             </a:fld>
             <a:endParaRPr lang="es-AR"/>
           </a:p>
@@ -8938,7 +8942,7 @@
     </p:spTree>
     <p:extLst>
       <p:ext uri="{BB962C8B-B14F-4D97-AF65-F5344CB8AC3E}">
-        <p14:creationId xmlns:p14="http://schemas.microsoft.com/office/powerpoint/2010/main" val="2752311715"/>
+        <p14:creationId xmlns:p14="http://schemas.microsoft.com/office/powerpoint/2010/main" xmlns="" val="2752311715"/>
       </p:ext>
     </p:extLst>
   </p:cSld>
@@ -9418,7 +9422,7 @@
             <a:fld id="{59D4168E-E6F0-4E6D-9E98-0FBF44047F1D}" type="datetimeFigureOut">
               <a:rPr lang="es-AR" smtClean="0"/>
               <a:pPr/>
-              <a:t>20/11/2020</a:t>
+              <a:t>21/11/2020</a:t>
             </a:fld>
             <a:endParaRPr lang="es-AR"/>
           </a:p>
@@ -9506,7 +9510,7 @@
     </p:spTree>
     <p:extLst>
       <p:ext uri="{BB962C8B-B14F-4D97-AF65-F5344CB8AC3E}">
-        <p14:creationId xmlns:p14="http://schemas.microsoft.com/office/powerpoint/2010/main" val="761644953"/>
+        <p14:creationId xmlns:p14="http://schemas.microsoft.com/office/powerpoint/2010/main" xmlns="" val="761644953"/>
       </p:ext>
     </p:extLst>
   </p:cSld>
@@ -9955,7 +9959,7 @@
           <p:cNvPr id="2" name="Título 1">
             <a:extLst>
               <a:ext uri="{FF2B5EF4-FFF2-40B4-BE49-F238E27FC236}">
-                <a16:creationId xmlns:a16="http://schemas.microsoft.com/office/drawing/2014/main" id="{8CE1749D-25BE-4B8A-9C39-0568C1DB7176}"/>
+                <a16:creationId xmlns:a16="http://schemas.microsoft.com/office/drawing/2014/main" xmlns="" id="{8CE1749D-25BE-4B8A-9C39-0568C1DB7176}"/>
               </a:ext>
             </a:extLst>
           </p:cNvPr>
@@ -9990,7 +9994,7 @@
           <p:cNvPr id="5" name="Subtítulo 2">
             <a:extLst>
               <a:ext uri="{FF2B5EF4-FFF2-40B4-BE49-F238E27FC236}">
-                <a16:creationId xmlns:a16="http://schemas.microsoft.com/office/drawing/2014/main" id="{77C0998F-42B9-4F94-A4C5-FB800997D545}"/>
+                <a16:creationId xmlns:a16="http://schemas.microsoft.com/office/drawing/2014/main" xmlns="" id="{77C0998F-42B9-4F94-A4C5-FB800997D545}"/>
               </a:ext>
             </a:extLst>
           </p:cNvPr>
@@ -10027,7 +10031,7 @@
           <p:cNvPr id="3" name="CuadroTexto 2">
             <a:extLst>
               <a:ext uri="{FF2B5EF4-FFF2-40B4-BE49-F238E27FC236}">
-                <a16:creationId xmlns:a16="http://schemas.microsoft.com/office/drawing/2014/main" id="{EC53297C-9824-45B9-8927-A6834EB1DBD1}"/>
+                <a16:creationId xmlns:a16="http://schemas.microsoft.com/office/drawing/2014/main" xmlns="" id="{EC53297C-9824-45B9-8927-A6834EB1DBD1}"/>
               </a:ext>
             </a:extLst>
           </p:cNvPr>
@@ -10100,7 +10104,7 @@
           <p:cNvPr id="6" name="Imagen 5">
             <a:extLst>
               <a:ext uri="{FF2B5EF4-FFF2-40B4-BE49-F238E27FC236}">
-                <a16:creationId xmlns:a16="http://schemas.microsoft.com/office/drawing/2014/main" id="{765DC11C-9D6D-4F31-9AC7-1EFE6E6D455C}"/>
+                <a16:creationId xmlns:a16="http://schemas.microsoft.com/office/drawing/2014/main" xmlns="" id="{765DC11C-9D6D-4F31-9AC7-1EFE6E6D455C}"/>
               </a:ext>
             </a:extLst>
           </p:cNvPr>
@@ -10113,7 +10117,7 @@
           <a:blip r:embed="rId2" cstate="print">
             <a:extLst>
               <a:ext uri="{28A0092B-C50C-407E-A947-70E740481C1C}">
-                <a14:useLocalDpi xmlns:a14="http://schemas.microsoft.com/office/drawing/2010/main" val="0"/>
+                <a14:useLocalDpi xmlns:a14="http://schemas.microsoft.com/office/drawing/2010/main" xmlns="" val="0"/>
               </a:ext>
             </a:extLst>
           </a:blip>
@@ -10134,7 +10138,7 @@
     </p:spTree>
     <p:extLst>
       <p:ext uri="{BB962C8B-B14F-4D97-AF65-F5344CB8AC3E}">
-        <p14:creationId xmlns:p14="http://schemas.microsoft.com/office/powerpoint/2010/main" val="2967959437"/>
+        <p14:creationId xmlns:p14="http://schemas.microsoft.com/office/powerpoint/2010/main" xmlns="" val="2967959437"/>
       </p:ext>
     </p:extLst>
   </p:cSld>
@@ -10166,7 +10170,7 @@
           <p:cNvPr id="2" name="Título 1">
             <a:extLst>
               <a:ext uri="{FF2B5EF4-FFF2-40B4-BE49-F238E27FC236}">
-                <a16:creationId xmlns:a16="http://schemas.microsoft.com/office/drawing/2014/main" id="{0ED6D180-92C1-4333-BA91-2BBA4DD94A3B}"/>
+                <a16:creationId xmlns:a16="http://schemas.microsoft.com/office/drawing/2014/main" xmlns="" id="{0ED6D180-92C1-4333-BA91-2BBA4DD94A3B}"/>
               </a:ext>
             </a:extLst>
           </p:cNvPr>
@@ -10203,7 +10207,7 @@
           <p:cNvPr id="13" name="Imagen 12">
             <a:extLst>
               <a:ext uri="{FF2B5EF4-FFF2-40B4-BE49-F238E27FC236}">
-                <a16:creationId xmlns:a16="http://schemas.microsoft.com/office/drawing/2014/main" id="{FCC26050-5F59-41A3-BF4B-7F8AD9F429BD}"/>
+                <a16:creationId xmlns:a16="http://schemas.microsoft.com/office/drawing/2014/main" xmlns="" id="{FCC26050-5F59-41A3-BF4B-7F8AD9F429BD}"/>
               </a:ext>
             </a:extLst>
           </p:cNvPr>
@@ -10213,10 +10217,10 @@
           <p:nvPr/>
         </p:nvPicPr>
         <p:blipFill>
-          <a:blip r:embed="rId2">
+          <a:blip r:embed="rId2" cstate="print">
             <a:extLst>
               <a:ext uri="{28A0092B-C50C-407E-A947-70E740481C1C}">
-                <a14:useLocalDpi xmlns:a14="http://schemas.microsoft.com/office/drawing/2010/main" val="0"/>
+                <a14:useLocalDpi xmlns:a14="http://schemas.microsoft.com/office/drawing/2010/main" xmlns="" val="0"/>
               </a:ext>
             </a:extLst>
           </a:blip>
@@ -10236,7 +10240,7 @@
     </p:spTree>
     <p:extLst>
       <p:ext uri="{BB962C8B-B14F-4D97-AF65-F5344CB8AC3E}">
-        <p14:creationId xmlns:p14="http://schemas.microsoft.com/office/powerpoint/2010/main" val="78293021"/>
+        <p14:creationId xmlns:p14="http://schemas.microsoft.com/office/powerpoint/2010/main" xmlns="" val="78293021"/>
       </p:ext>
     </p:extLst>
   </p:cSld>
@@ -10268,7 +10272,7 @@
           <p:cNvPr id="4" name="Rectángulo 3">
             <a:extLst>
               <a:ext uri="{FF2B5EF4-FFF2-40B4-BE49-F238E27FC236}">
-                <a16:creationId xmlns:a16="http://schemas.microsoft.com/office/drawing/2014/main" id="{B0F1B4F4-0C7A-4C0E-8584-95718BC545EC}"/>
+                <a16:creationId xmlns:a16="http://schemas.microsoft.com/office/drawing/2014/main" xmlns="" id="{B0F1B4F4-0C7A-4C0E-8584-95718BC545EC}"/>
               </a:ext>
             </a:extLst>
           </p:cNvPr>
@@ -10327,7 +10331,7 @@
     </p:spTree>
     <p:extLst>
       <p:ext uri="{BB962C8B-B14F-4D97-AF65-F5344CB8AC3E}">
-        <p14:creationId xmlns:p14="http://schemas.microsoft.com/office/powerpoint/2010/main" val="1715947005"/>
+        <p14:creationId xmlns:p14="http://schemas.microsoft.com/office/powerpoint/2010/main" xmlns="" val="1715947005"/>
       </p:ext>
     </p:extLst>
   </p:cSld>
@@ -10359,7 +10363,7 @@
           <p:cNvPr id="2" name="Título 1">
             <a:extLst>
               <a:ext uri="{FF2B5EF4-FFF2-40B4-BE49-F238E27FC236}">
-                <a16:creationId xmlns:a16="http://schemas.microsoft.com/office/drawing/2014/main" id="{0ED6D180-92C1-4333-BA91-2BBA4DD94A3B}"/>
+                <a16:creationId xmlns:a16="http://schemas.microsoft.com/office/drawing/2014/main" xmlns="" id="{0ED6D180-92C1-4333-BA91-2BBA4DD94A3B}"/>
               </a:ext>
             </a:extLst>
           </p:cNvPr>
@@ -10396,7 +10400,7 @@
           <p:cNvPr id="5" name="Diagrama 4">
             <a:extLst>
               <a:ext uri="{FF2B5EF4-FFF2-40B4-BE49-F238E27FC236}">
-                <a16:creationId xmlns:a16="http://schemas.microsoft.com/office/drawing/2014/main" id="{D29B3E67-509D-445E-9F92-4DFCE92BD789}"/>
+                <a16:creationId xmlns:a16="http://schemas.microsoft.com/office/drawing/2014/main" xmlns="" id="{D29B3E67-509D-445E-9F92-4DFCE92BD789}"/>
               </a:ext>
             </a:extLst>
           </p:cNvPr>
@@ -10404,7 +10408,7 @@
           <p:nvPr>
             <p:extLst>
               <p:ext uri="{D42A27DB-BD31-4B8C-83A1-F6EECF244321}">
-                <p14:modId xmlns:p14="http://schemas.microsoft.com/office/powerpoint/2010/main" val="573577508"/>
+                <p14:modId xmlns:p14="http://schemas.microsoft.com/office/powerpoint/2010/main" xmlns="" val="573577508"/>
               </p:ext>
             </p:extLst>
           </p:nvPr>
@@ -10424,7 +10428,7 @@
           <p:cNvPr id="7" name="CuadroTexto 6">
             <a:extLst>
               <a:ext uri="{FF2B5EF4-FFF2-40B4-BE49-F238E27FC236}">
-                <a16:creationId xmlns:a16="http://schemas.microsoft.com/office/drawing/2014/main" id="{EFF07B65-0D67-434E-9DAD-C6F8000B23BA}"/>
+                <a16:creationId xmlns:a16="http://schemas.microsoft.com/office/drawing/2014/main" xmlns="" id="{EFF07B65-0D67-434E-9DAD-C6F8000B23BA}"/>
               </a:ext>
             </a:extLst>
           </p:cNvPr>
@@ -10516,7 +10520,7 @@
           <p:cNvPr id="9" name="CuadroTexto 8">
             <a:extLst>
               <a:ext uri="{FF2B5EF4-FFF2-40B4-BE49-F238E27FC236}">
-                <a16:creationId xmlns:a16="http://schemas.microsoft.com/office/drawing/2014/main" id="{97CF3F33-5EF6-48E7-9958-F9C2744489F1}"/>
+                <a16:creationId xmlns:a16="http://schemas.microsoft.com/office/drawing/2014/main" xmlns="" id="{97CF3F33-5EF6-48E7-9958-F9C2744489F1}"/>
               </a:ext>
             </a:extLst>
           </p:cNvPr>
@@ -10559,7 +10563,7 @@
           <p:cNvPr id="11" name="CuadroTexto 10">
             <a:extLst>
               <a:ext uri="{FF2B5EF4-FFF2-40B4-BE49-F238E27FC236}">
-                <a16:creationId xmlns:a16="http://schemas.microsoft.com/office/drawing/2014/main" id="{CFB755FD-7818-4BD2-8DEB-A53F85894D7B}"/>
+                <a16:creationId xmlns:a16="http://schemas.microsoft.com/office/drawing/2014/main" xmlns="" id="{CFB755FD-7818-4BD2-8DEB-A53F85894D7B}"/>
               </a:ext>
             </a:extLst>
           </p:cNvPr>
@@ -10611,7 +10615,7 @@
           <p:cNvPr id="13" name="CuadroTexto 12">
             <a:extLst>
               <a:ext uri="{FF2B5EF4-FFF2-40B4-BE49-F238E27FC236}">
-                <a16:creationId xmlns:a16="http://schemas.microsoft.com/office/drawing/2014/main" id="{1DC2E036-AC7A-450A-BDD4-9A2A0F769C65}"/>
+                <a16:creationId xmlns:a16="http://schemas.microsoft.com/office/drawing/2014/main" xmlns="" id="{1DC2E036-AC7A-450A-BDD4-9A2A0F769C65}"/>
               </a:ext>
             </a:extLst>
           </p:cNvPr>
@@ -10654,7 +10658,7 @@
           <p:cNvPr id="15" name="CuadroTexto 14">
             <a:extLst>
               <a:ext uri="{FF2B5EF4-FFF2-40B4-BE49-F238E27FC236}">
-                <a16:creationId xmlns:a16="http://schemas.microsoft.com/office/drawing/2014/main" id="{6ECB2B3E-252C-4E7C-8FB7-1815D6E1E0A0}"/>
+                <a16:creationId xmlns:a16="http://schemas.microsoft.com/office/drawing/2014/main" xmlns="" id="{6ECB2B3E-252C-4E7C-8FB7-1815D6E1E0A0}"/>
               </a:ext>
             </a:extLst>
           </p:cNvPr>
@@ -10695,7 +10699,7 @@
     </p:spTree>
     <p:extLst>
       <p:ext uri="{BB962C8B-B14F-4D97-AF65-F5344CB8AC3E}">
-        <p14:creationId xmlns:p14="http://schemas.microsoft.com/office/powerpoint/2010/main" val="2198404308"/>
+        <p14:creationId xmlns:p14="http://schemas.microsoft.com/office/powerpoint/2010/main" xmlns="" val="2198404308"/>
       </p:ext>
     </p:extLst>
   </p:cSld>
@@ -10727,7 +10731,7 @@
           <p:cNvPr id="2" name="Título 1">
             <a:extLst>
               <a:ext uri="{FF2B5EF4-FFF2-40B4-BE49-F238E27FC236}">
-                <a16:creationId xmlns:a16="http://schemas.microsoft.com/office/drawing/2014/main" id="{0ED6D180-92C1-4333-BA91-2BBA4DD94A3B}"/>
+                <a16:creationId xmlns:a16="http://schemas.microsoft.com/office/drawing/2014/main" xmlns="" id="{0ED6D180-92C1-4333-BA91-2BBA4DD94A3B}"/>
               </a:ext>
             </a:extLst>
           </p:cNvPr>
@@ -10764,7 +10768,7 @@
           <p:cNvPr id="6" name="CuadroTexto 5">
             <a:extLst>
               <a:ext uri="{FF2B5EF4-FFF2-40B4-BE49-F238E27FC236}">
-                <a16:creationId xmlns:a16="http://schemas.microsoft.com/office/drawing/2014/main" id="{BC8D092D-6667-447D-B473-A50467138064}"/>
+                <a16:creationId xmlns:a16="http://schemas.microsoft.com/office/drawing/2014/main" xmlns="" id="{BC8D092D-6667-447D-B473-A50467138064}"/>
               </a:ext>
             </a:extLst>
           </p:cNvPr>
@@ -10809,7 +10813,7 @@
     </p:spTree>
     <p:extLst>
       <p:ext uri="{BB962C8B-B14F-4D97-AF65-F5344CB8AC3E}">
-        <p14:creationId xmlns:p14="http://schemas.microsoft.com/office/powerpoint/2010/main" val="435960141"/>
+        <p14:creationId xmlns:p14="http://schemas.microsoft.com/office/powerpoint/2010/main" xmlns="" val="435960141"/>
       </p:ext>
     </p:extLst>
   </p:cSld>
@@ -10841,7 +10845,7 @@
           <p:cNvPr id="2" name="Título 1">
             <a:extLst>
               <a:ext uri="{FF2B5EF4-FFF2-40B4-BE49-F238E27FC236}">
-                <a16:creationId xmlns:a16="http://schemas.microsoft.com/office/drawing/2014/main" id="{0ED6D180-92C1-4333-BA91-2BBA4DD94A3B}"/>
+                <a16:creationId xmlns:a16="http://schemas.microsoft.com/office/drawing/2014/main" xmlns="" id="{0ED6D180-92C1-4333-BA91-2BBA4DD94A3B}"/>
               </a:ext>
             </a:extLst>
           </p:cNvPr>
@@ -10878,7 +10882,7 @@
           <p:cNvPr id="6" name="CuadroTexto 5">
             <a:extLst>
               <a:ext uri="{FF2B5EF4-FFF2-40B4-BE49-F238E27FC236}">
-                <a16:creationId xmlns:a16="http://schemas.microsoft.com/office/drawing/2014/main" id="{BC8D092D-6667-447D-B473-A50467138064}"/>
+                <a16:creationId xmlns:a16="http://schemas.microsoft.com/office/drawing/2014/main" xmlns="" id="{BC8D092D-6667-447D-B473-A50467138064}"/>
               </a:ext>
             </a:extLst>
           </p:cNvPr>
@@ -10923,7 +10927,7 @@
     </p:spTree>
     <p:extLst>
       <p:ext uri="{BB962C8B-B14F-4D97-AF65-F5344CB8AC3E}">
-        <p14:creationId xmlns:p14="http://schemas.microsoft.com/office/powerpoint/2010/main" val="1725776676"/>
+        <p14:creationId xmlns:p14="http://schemas.microsoft.com/office/powerpoint/2010/main" xmlns="" val="1725776676"/>
       </p:ext>
     </p:extLst>
   </p:cSld>
@@ -10955,7 +10959,7 @@
           <p:cNvPr id="2" name="Título 1">
             <a:extLst>
               <a:ext uri="{FF2B5EF4-FFF2-40B4-BE49-F238E27FC236}">
-                <a16:creationId xmlns:a16="http://schemas.microsoft.com/office/drawing/2014/main" id="{0ED6D180-92C1-4333-BA91-2BBA4DD94A3B}"/>
+                <a16:creationId xmlns:a16="http://schemas.microsoft.com/office/drawing/2014/main" xmlns="" id="{0ED6D180-92C1-4333-BA91-2BBA4DD94A3B}"/>
               </a:ext>
             </a:extLst>
           </p:cNvPr>
@@ -10992,7 +10996,7 @@
           <p:cNvPr id="6" name="CuadroTexto 5">
             <a:extLst>
               <a:ext uri="{FF2B5EF4-FFF2-40B4-BE49-F238E27FC236}">
-                <a16:creationId xmlns:a16="http://schemas.microsoft.com/office/drawing/2014/main" id="{BC8D092D-6667-447D-B473-A50467138064}"/>
+                <a16:creationId xmlns:a16="http://schemas.microsoft.com/office/drawing/2014/main" xmlns="" id="{BC8D092D-6667-447D-B473-A50467138064}"/>
               </a:ext>
             </a:extLst>
           </p:cNvPr>
@@ -11037,7 +11041,7 @@
     </p:spTree>
     <p:extLst>
       <p:ext uri="{BB962C8B-B14F-4D97-AF65-F5344CB8AC3E}">
-        <p14:creationId xmlns:p14="http://schemas.microsoft.com/office/powerpoint/2010/main" val="1240761595"/>
+        <p14:creationId xmlns:p14="http://schemas.microsoft.com/office/powerpoint/2010/main" xmlns="" val="1240761595"/>
       </p:ext>
     </p:extLst>
   </p:cSld>
@@ -11069,7 +11073,7 @@
           <p:cNvPr id="2" name="Título 1">
             <a:extLst>
               <a:ext uri="{FF2B5EF4-FFF2-40B4-BE49-F238E27FC236}">
-                <a16:creationId xmlns:a16="http://schemas.microsoft.com/office/drawing/2014/main" id="{0ED6D180-92C1-4333-BA91-2BBA4DD94A3B}"/>
+                <a16:creationId xmlns:a16="http://schemas.microsoft.com/office/drawing/2014/main" xmlns="" id="{0ED6D180-92C1-4333-BA91-2BBA4DD94A3B}"/>
               </a:ext>
             </a:extLst>
           </p:cNvPr>
@@ -11106,7 +11110,7 @@
           <p:cNvPr id="6" name="CuadroTexto 5">
             <a:extLst>
               <a:ext uri="{FF2B5EF4-FFF2-40B4-BE49-F238E27FC236}">
-                <a16:creationId xmlns:a16="http://schemas.microsoft.com/office/drawing/2014/main" id="{BC8D092D-6667-447D-B473-A50467138064}"/>
+                <a16:creationId xmlns:a16="http://schemas.microsoft.com/office/drawing/2014/main" xmlns="" id="{BC8D092D-6667-447D-B473-A50467138064}"/>
               </a:ext>
             </a:extLst>
           </p:cNvPr>
@@ -11151,7 +11155,7 @@
     </p:spTree>
     <p:extLst>
       <p:ext uri="{BB962C8B-B14F-4D97-AF65-F5344CB8AC3E}">
-        <p14:creationId xmlns:p14="http://schemas.microsoft.com/office/powerpoint/2010/main" val="3434906999"/>
+        <p14:creationId xmlns:p14="http://schemas.microsoft.com/office/powerpoint/2010/main" xmlns="" val="3434906999"/>
       </p:ext>
     </p:extLst>
   </p:cSld>
@@ -11183,7 +11187,7 @@
           <p:cNvPr id="4" name="Rectángulo 3">
             <a:extLst>
               <a:ext uri="{FF2B5EF4-FFF2-40B4-BE49-F238E27FC236}">
-                <a16:creationId xmlns:a16="http://schemas.microsoft.com/office/drawing/2014/main" id="{B0F1B4F4-0C7A-4C0E-8584-95718BC545EC}"/>
+                <a16:creationId xmlns:a16="http://schemas.microsoft.com/office/drawing/2014/main" xmlns="" id="{B0F1B4F4-0C7A-4C0E-8584-95718BC545EC}"/>
               </a:ext>
             </a:extLst>
           </p:cNvPr>
@@ -11242,7 +11246,7 @@
     </p:spTree>
     <p:extLst>
       <p:ext uri="{BB962C8B-B14F-4D97-AF65-F5344CB8AC3E}">
-        <p14:creationId xmlns:p14="http://schemas.microsoft.com/office/powerpoint/2010/main" val="3874587205"/>
+        <p14:creationId xmlns:p14="http://schemas.microsoft.com/office/powerpoint/2010/main" xmlns="" val="3874587205"/>
       </p:ext>
     </p:extLst>
   </p:cSld>
@@ -11274,7 +11278,7 @@
           <p:cNvPr id="2" name="Título 1">
             <a:extLst>
               <a:ext uri="{FF2B5EF4-FFF2-40B4-BE49-F238E27FC236}">
-                <a16:creationId xmlns:a16="http://schemas.microsoft.com/office/drawing/2014/main" id="{0ED6D180-92C1-4333-BA91-2BBA4DD94A3B}"/>
+                <a16:creationId xmlns:a16="http://schemas.microsoft.com/office/drawing/2014/main" xmlns="" id="{0ED6D180-92C1-4333-BA91-2BBA4DD94A3B}"/>
               </a:ext>
             </a:extLst>
           </p:cNvPr>
@@ -11311,7 +11315,7 @@
           <p:cNvPr id="4" name="Gráfico 3">
             <a:extLst>
               <a:ext uri="{FF2B5EF4-FFF2-40B4-BE49-F238E27FC236}">
-                <a16:creationId xmlns:a16="http://schemas.microsoft.com/office/drawing/2014/main" id="{AEDE60AA-37AA-4383-BA26-5EA432BE4F35}"/>
+                <a16:creationId xmlns:a16="http://schemas.microsoft.com/office/drawing/2014/main" xmlns="" id="{AEDE60AA-37AA-4383-BA26-5EA432BE4F35}"/>
               </a:ext>
             </a:extLst>
           </p:cNvPr>
@@ -11319,7 +11323,7 @@
           <p:nvPr>
             <p:extLst>
               <p:ext uri="{D42A27DB-BD31-4B8C-83A1-F6EECF244321}">
-                <p14:modId xmlns:p14="http://schemas.microsoft.com/office/powerpoint/2010/main" val="993474529"/>
+                <p14:modId xmlns:p14="http://schemas.microsoft.com/office/powerpoint/2010/main" xmlns="" val="993474529"/>
               </p:ext>
             </p:extLst>
           </p:nvPr>
@@ -11339,7 +11343,7 @@
           <p:cNvPr id="3" name="CuadroTexto 2">
             <a:extLst>
               <a:ext uri="{FF2B5EF4-FFF2-40B4-BE49-F238E27FC236}">
-                <a16:creationId xmlns:a16="http://schemas.microsoft.com/office/drawing/2014/main" id="{29B4C296-372F-455A-BE5A-B512322B8EDE}"/>
+                <a16:creationId xmlns:a16="http://schemas.microsoft.com/office/drawing/2014/main" xmlns="" id="{29B4C296-372F-455A-BE5A-B512322B8EDE}"/>
               </a:ext>
             </a:extLst>
           </p:cNvPr>
@@ -11373,7 +11377,7 @@
     </p:spTree>
     <p:extLst>
       <p:ext uri="{BB962C8B-B14F-4D97-AF65-F5344CB8AC3E}">
-        <p14:creationId xmlns:p14="http://schemas.microsoft.com/office/powerpoint/2010/main" val="3883774572"/>
+        <p14:creationId xmlns:p14="http://schemas.microsoft.com/office/powerpoint/2010/main" xmlns="" val="3883774572"/>
       </p:ext>
     </p:extLst>
   </p:cSld>
@@ -11405,7 +11409,7 @@
           <p:cNvPr id="2" name="Título 1">
             <a:extLst>
               <a:ext uri="{FF2B5EF4-FFF2-40B4-BE49-F238E27FC236}">
-                <a16:creationId xmlns:a16="http://schemas.microsoft.com/office/drawing/2014/main" id="{0ED6D180-92C1-4333-BA91-2BBA4DD94A3B}"/>
+                <a16:creationId xmlns:a16="http://schemas.microsoft.com/office/drawing/2014/main" xmlns="" id="{0ED6D180-92C1-4333-BA91-2BBA4DD94A3B}"/>
               </a:ext>
             </a:extLst>
           </p:cNvPr>
@@ -11440,7 +11444,7 @@
     </p:spTree>
     <p:extLst>
       <p:ext uri="{BB962C8B-B14F-4D97-AF65-F5344CB8AC3E}">
-        <p14:creationId xmlns:p14="http://schemas.microsoft.com/office/powerpoint/2010/main" val="2470537140"/>
+        <p14:creationId xmlns:p14="http://schemas.microsoft.com/office/powerpoint/2010/main" xmlns="" val="2470537140"/>
       </p:ext>
     </p:extLst>
   </p:cSld>
@@ -11472,7 +11476,7 @@
           <p:cNvPr id="2" name="Título 1">
             <a:extLst>
               <a:ext uri="{FF2B5EF4-FFF2-40B4-BE49-F238E27FC236}">
-                <a16:creationId xmlns:a16="http://schemas.microsoft.com/office/drawing/2014/main" id="{A08BF852-5F19-46F2-83FE-6528AEC95981}"/>
+                <a16:creationId xmlns:a16="http://schemas.microsoft.com/office/drawing/2014/main" xmlns="" id="{A08BF852-5F19-46F2-83FE-6528AEC95981}"/>
               </a:ext>
             </a:extLst>
           </p:cNvPr>
@@ -11508,7 +11512,7 @@
           <p:cNvPr id="3" name="Marcador de contenido 2">
             <a:extLst>
               <a:ext uri="{FF2B5EF4-FFF2-40B4-BE49-F238E27FC236}">
-                <a16:creationId xmlns:a16="http://schemas.microsoft.com/office/drawing/2014/main" id="{4825B7B8-2642-4E50-9E0D-E85148EB6652}"/>
+                <a16:creationId xmlns:a16="http://schemas.microsoft.com/office/drawing/2014/main" xmlns="" id="{4825B7B8-2642-4E50-9E0D-E85148EB6652}"/>
               </a:ext>
             </a:extLst>
           </p:cNvPr>
@@ -11607,7 +11611,7 @@
     </p:spTree>
     <p:extLst>
       <p:ext uri="{BB962C8B-B14F-4D97-AF65-F5344CB8AC3E}">
-        <p14:creationId xmlns:p14="http://schemas.microsoft.com/office/powerpoint/2010/main" val="493199861"/>
+        <p14:creationId xmlns:p14="http://schemas.microsoft.com/office/powerpoint/2010/main" xmlns="" val="493199861"/>
       </p:ext>
     </p:extLst>
   </p:cSld>
@@ -11639,7 +11643,7 @@
           <p:cNvPr id="2" name="Título 1">
             <a:extLst>
               <a:ext uri="{FF2B5EF4-FFF2-40B4-BE49-F238E27FC236}">
-                <a16:creationId xmlns:a16="http://schemas.microsoft.com/office/drawing/2014/main" id="{0ED6D180-92C1-4333-BA91-2BBA4DD94A3B}"/>
+                <a16:creationId xmlns:a16="http://schemas.microsoft.com/office/drawing/2014/main" xmlns="" id="{0ED6D180-92C1-4333-BA91-2BBA4DD94A3B}"/>
               </a:ext>
             </a:extLst>
           </p:cNvPr>
@@ -11652,8 +11656,8 @@
         </p:nvSpPr>
         <p:spPr>
           <a:xfrm>
-            <a:off x="1270000" y="0"/>
-            <a:ext cx="10922000" cy="1752599"/>
+            <a:off x="1270000" y="1"/>
+            <a:ext cx="10922000" cy="998806"/>
           </a:xfrm>
         </p:spPr>
         <p:txBody>
@@ -11671,10 +11675,36 @@
           </a:p>
         </p:txBody>
       </p:sp>
+      <p:pic>
+        <p:nvPicPr>
+          <p:cNvPr id="1026" name="Picture 2" descr="C:\Users\Usuario\Desktop\PRESENTACION FINAL - LDS\Flujo Pruebas.png"/>
+          <p:cNvPicPr>
+            <a:picLocks noChangeAspect="1" noChangeArrowheads="1"/>
+          </p:cNvPicPr>
+          <p:nvPr/>
+        </p:nvPicPr>
+        <p:blipFill>
+          <a:blip r:embed="rId2" cstate="print"/>
+          <a:srcRect/>
+          <a:stretch>
+            <a:fillRect/>
+          </a:stretch>
+        </p:blipFill>
+        <p:spPr bwMode="auto">
+          <a:xfrm>
+            <a:off x="0" y="1012874"/>
+            <a:ext cx="12192000" cy="5845126"/>
+          </a:xfrm>
+          <a:prstGeom prst="rect">
+            <a:avLst/>
+          </a:prstGeom>
+          <a:noFill/>
+        </p:spPr>
+      </p:pic>
     </p:spTree>
     <p:extLst>
       <p:ext uri="{BB962C8B-B14F-4D97-AF65-F5344CB8AC3E}">
-        <p14:creationId xmlns:p14="http://schemas.microsoft.com/office/powerpoint/2010/main" val="2861481179"/>
+        <p14:creationId xmlns:p14="http://schemas.microsoft.com/office/powerpoint/2010/main" xmlns="" val="2861481179"/>
       </p:ext>
     </p:extLst>
   </p:cSld>
@@ -11706,7 +11736,7 @@
           <p:cNvPr id="4" name="Rectángulo 3">
             <a:extLst>
               <a:ext uri="{FF2B5EF4-FFF2-40B4-BE49-F238E27FC236}">
-                <a16:creationId xmlns:a16="http://schemas.microsoft.com/office/drawing/2014/main" id="{B0F1B4F4-0C7A-4C0E-8584-95718BC545EC}"/>
+                <a16:creationId xmlns:a16="http://schemas.microsoft.com/office/drawing/2014/main" xmlns="" id="{B0F1B4F4-0C7A-4C0E-8584-95718BC545EC}"/>
               </a:ext>
             </a:extLst>
           </p:cNvPr>
@@ -11765,7 +11795,7 @@
     </p:spTree>
     <p:extLst>
       <p:ext uri="{BB962C8B-B14F-4D97-AF65-F5344CB8AC3E}">
-        <p14:creationId xmlns:p14="http://schemas.microsoft.com/office/powerpoint/2010/main" val="4125267999"/>
+        <p14:creationId xmlns:p14="http://schemas.microsoft.com/office/powerpoint/2010/main" xmlns="" val="4125267999"/>
       </p:ext>
     </p:extLst>
   </p:cSld>
@@ -11797,7 +11827,7 @@
           <p:cNvPr id="4" name="Rectángulo 3">
             <a:extLst>
               <a:ext uri="{FF2B5EF4-FFF2-40B4-BE49-F238E27FC236}">
-                <a16:creationId xmlns:a16="http://schemas.microsoft.com/office/drawing/2014/main" id="{B0F1B4F4-0C7A-4C0E-8584-95718BC545EC}"/>
+                <a16:creationId xmlns:a16="http://schemas.microsoft.com/office/drawing/2014/main" xmlns="" id="{B0F1B4F4-0C7A-4C0E-8584-95718BC545EC}"/>
               </a:ext>
             </a:extLst>
           </p:cNvPr>
@@ -11856,7 +11886,7 @@
     </p:spTree>
     <p:extLst>
       <p:ext uri="{BB962C8B-B14F-4D97-AF65-F5344CB8AC3E}">
-        <p14:creationId xmlns:p14="http://schemas.microsoft.com/office/powerpoint/2010/main" val="115837642"/>
+        <p14:creationId xmlns:p14="http://schemas.microsoft.com/office/powerpoint/2010/main" xmlns="" val="115837642"/>
       </p:ext>
     </p:extLst>
   </p:cSld>
@@ -11888,7 +11918,7 @@
           <p:cNvPr id="4" name="Rectángulo 3">
             <a:extLst>
               <a:ext uri="{FF2B5EF4-FFF2-40B4-BE49-F238E27FC236}">
-                <a16:creationId xmlns:a16="http://schemas.microsoft.com/office/drawing/2014/main" id="{B0F1B4F4-0C7A-4C0E-8584-95718BC545EC}"/>
+                <a16:creationId xmlns:a16="http://schemas.microsoft.com/office/drawing/2014/main" xmlns="" id="{B0F1B4F4-0C7A-4C0E-8584-95718BC545EC}"/>
               </a:ext>
             </a:extLst>
           </p:cNvPr>
@@ -11913,7 +11943,7 @@
           <a:p>
             <a:pPr algn="ctr"/>
             <a:r>
-              <a:rPr lang="es-ES" sz="7200" b="1" dirty="0">
+              <a:rPr lang="es-ES" sz="7200" b="1" dirty="0" smtClean="0">
                 <a:ln w="0"/>
                 <a:solidFill>
                   <a:schemeClr val="accent1"/>
@@ -11926,7 +11956,7 @@
                   </a:outerShdw>
                 </a:effectLst>
               </a:rPr>
-              <a:t>Conclusiones</a:t>
+              <a:t>Videos</a:t>
             </a:r>
             <a:endParaRPr lang="es-ES" sz="7200" b="1" cap="none" spc="0" dirty="0">
               <a:ln w="0"/>
@@ -11947,7 +11977,7 @@
     </p:spTree>
     <p:extLst>
       <p:ext uri="{BB962C8B-B14F-4D97-AF65-F5344CB8AC3E}">
-        <p14:creationId xmlns:p14="http://schemas.microsoft.com/office/powerpoint/2010/main" val="3888593392"/>
+        <p14:creationId xmlns:p14="http://schemas.microsoft.com/office/powerpoint/2010/main" xmlns="" val="115837642"/>
       </p:ext>
     </p:extLst>
   </p:cSld>
@@ -11976,13 +12006,7 @@
       </p:grpSpPr>
       <p:sp>
         <p:nvSpPr>
-          <p:cNvPr id="2" name="Título 1">
-            <a:extLst>
-              <a:ext uri="{FF2B5EF4-FFF2-40B4-BE49-F238E27FC236}">
-                <a16:creationId xmlns:a16="http://schemas.microsoft.com/office/drawing/2014/main" id="{0ED6D180-92C1-4333-BA91-2BBA4DD94A3B}"/>
-              </a:ext>
-            </a:extLst>
-          </p:cNvPr>
+          <p:cNvPr id="2" name="1 Título"/>
           <p:cNvSpPr>
             <a:spLocks noGrp="1"/>
           </p:cNvSpPr>
@@ -11992,8 +12016,8 @@
         </p:nvSpPr>
         <p:spPr>
           <a:xfrm>
-            <a:off x="1270000" y="0"/>
-            <a:ext cx="10922000" cy="1752599"/>
+            <a:off x="1484311" y="1"/>
+            <a:ext cx="10018713" cy="1280159"/>
           </a:xfrm>
         </p:spPr>
         <p:txBody>
@@ -12003,173 +12027,44 @@
           <a:lstStyle/>
           <a:p>
             <a:r>
-              <a:rPr lang="es-ES" sz="4000" dirty="0">
-                <a:latin typeface="Georgia" panose="02040502050405020303" pitchFamily="18" charset="0"/>
+              <a:rPr lang="es-AR" sz="4000" dirty="0" smtClean="0">
+                <a:latin typeface="Georgia" pitchFamily="18" charset="0"/>
               </a:rPr>
-              <a:t>Conclusiones</a:t>
-            </a:r>
-          </a:p>
-        </p:txBody>
-      </p:sp>
-      <p:sp>
-        <p:nvSpPr>
-          <p:cNvPr id="6" name="CuadroTexto 5">
-            <a:extLst>
-              <a:ext uri="{FF2B5EF4-FFF2-40B4-BE49-F238E27FC236}">
-                <a16:creationId xmlns:a16="http://schemas.microsoft.com/office/drawing/2014/main" id="{BC8D092D-6667-447D-B473-A50467138064}"/>
-              </a:ext>
-            </a:extLst>
-          </p:cNvPr>
-          <p:cNvSpPr txBox="1"/>
+              <a:t>Flujos Principales</a:t>
+            </a:r>
+            <a:endParaRPr lang="es-AR" sz="4000" dirty="0">
+              <a:latin typeface="Georgia" pitchFamily="18" charset="0"/>
+            </a:endParaRPr>
+          </a:p>
+        </p:txBody>
+      </p:sp>
+      <p:pic>
+        <p:nvPicPr>
+          <p:cNvPr id="2050" name="Picture 2" descr="C:\Users\Usuario\Desktop\PRESENTACION FINAL - LDS\Flujo Videos.png"/>
+          <p:cNvPicPr>
+            <a:picLocks noChangeAspect="1" noChangeArrowheads="1"/>
+          </p:cNvPicPr>
           <p:nvPr/>
-        </p:nvSpPr>
-        <p:spPr>
+        </p:nvPicPr>
+        <p:blipFill>
+          <a:blip r:embed="rId2" cstate="print"/>
+          <a:srcRect/>
+          <a:stretch>
+            <a:fillRect/>
+          </a:stretch>
+        </p:blipFill>
+        <p:spPr bwMode="auto">
           <a:xfrm>
-            <a:off x="2469776" y="1950620"/>
-            <a:ext cx="7252447" cy="3785652"/>
+            <a:off x="0" y="1266092"/>
+            <a:ext cx="12192000" cy="5591908"/>
           </a:xfrm>
           <a:prstGeom prst="rect">
             <a:avLst/>
           </a:prstGeom>
           <a:noFill/>
         </p:spPr>
-        <p:txBody>
-          <a:bodyPr wrap="square">
-            <a:spAutoFit/>
-          </a:bodyPr>
-          <a:lstStyle/>
-          <a:p>
-            <a:pPr algn="l"/>
-            <a:endParaRPr lang="es-AR" sz="2000" b="0" i="0" u="none" strike="noStrike" baseline="0" dirty="0">
-              <a:solidFill>
-                <a:srgbClr val="000000"/>
-              </a:solidFill>
-              <a:latin typeface="Calibri" panose="020F0502020204030204" pitchFamily="34" charset="0"/>
-            </a:endParaRPr>
-          </a:p>
-          <a:p>
-            <a:pPr marL="342900" indent="-342900">
-              <a:buFont typeface="Arial" panose="020B0604020202020204" pitchFamily="34" charset="0"/>
-              <a:buChar char="•"/>
-            </a:pPr>
-            <a:r>
-              <a:rPr lang="es-ES" sz="2000" b="0" i="0" u="none" strike="noStrike" baseline="0" dirty="0">
-                <a:latin typeface="Georgia" panose="02040502050405020303" pitchFamily="18" charset="0"/>
-              </a:rPr>
-              <a:t>Elección y funcionamiento del equipo</a:t>
-            </a:r>
-          </a:p>
-          <a:p>
-            <a:endParaRPr lang="es-ES" sz="2000" b="0" i="0" u="none" strike="noStrike" baseline="0" dirty="0">
-              <a:latin typeface="Georgia" panose="02040502050405020303" pitchFamily="18" charset="0"/>
-            </a:endParaRPr>
-          </a:p>
-          <a:p>
-            <a:pPr marL="342900" indent="-342900">
-              <a:buFont typeface="Arial" panose="020B0604020202020204" pitchFamily="34" charset="0"/>
-              <a:buChar char="•"/>
-            </a:pPr>
-            <a:r>
-              <a:rPr lang="es-ES" sz="2000" dirty="0">
-                <a:latin typeface="Georgia" panose="02040502050405020303" pitchFamily="18" charset="0"/>
-              </a:rPr>
-              <a:t>Asignación del sistema a desarrollar</a:t>
-            </a:r>
-            <a:endParaRPr lang="es-ES" sz="2000" b="0" i="0" u="none" strike="noStrike" baseline="0" dirty="0">
-              <a:latin typeface="Georgia" panose="02040502050405020303" pitchFamily="18" charset="0"/>
-            </a:endParaRPr>
-          </a:p>
-          <a:p>
-            <a:endParaRPr lang="es-ES" sz="2000" b="0" i="0" u="none" strike="noStrike" baseline="0" dirty="0">
-              <a:latin typeface="Georgia" panose="02040502050405020303" pitchFamily="18" charset="0"/>
-            </a:endParaRPr>
-          </a:p>
-          <a:p>
-            <a:pPr marL="342900" indent="-342900">
-              <a:buFont typeface="Arial" panose="020B0604020202020204" pitchFamily="34" charset="0"/>
-              <a:buChar char="•"/>
-            </a:pPr>
-            <a:r>
-              <a:rPr lang="es-ES" sz="2000" b="0" i="0" u="none" strike="noStrike" baseline="0" dirty="0">
-                <a:latin typeface="Georgia" panose="02040502050405020303" pitchFamily="18" charset="0"/>
-              </a:rPr>
-              <a:t>Conocimientos obtenidos</a:t>
-            </a:r>
-          </a:p>
-          <a:p>
-            <a:pPr marL="800100" lvl="1" indent="-342900">
-              <a:buFont typeface="Arial" panose="020B0604020202020204" pitchFamily="34" charset="0"/>
-              <a:buChar char="•"/>
-            </a:pPr>
-            <a:r>
-              <a:rPr lang="es-ES" b="0" i="0" u="none" strike="noStrike" baseline="0" dirty="0">
-                <a:latin typeface="Georgia" panose="02040502050405020303" pitchFamily="18" charset="0"/>
-              </a:rPr>
-              <a:t>Relevancia de un buen análisis y diseño</a:t>
-            </a:r>
-          </a:p>
-          <a:p>
-            <a:pPr marL="800100" lvl="1" indent="-342900">
-              <a:buFont typeface="Arial" panose="020B0604020202020204" pitchFamily="34" charset="0"/>
-              <a:buChar char="•"/>
-            </a:pPr>
-            <a:r>
-              <a:rPr lang="es-ES" dirty="0">
-                <a:latin typeface="Georgia" panose="02040502050405020303" pitchFamily="18" charset="0"/>
-              </a:rPr>
-              <a:t>Utilidad de GIT</a:t>
-            </a:r>
-          </a:p>
-          <a:p>
-            <a:pPr marL="800100" lvl="1" indent="-342900">
-              <a:buFont typeface="Arial" panose="020B0604020202020204" pitchFamily="34" charset="0"/>
-              <a:buChar char="•"/>
-            </a:pPr>
-            <a:r>
-              <a:rPr lang="es-ES" b="0" i="0" u="none" strike="noStrike" baseline="0" dirty="0">
-                <a:latin typeface="Georgia" panose="02040502050405020303" pitchFamily="18" charset="0"/>
-              </a:rPr>
-              <a:t>Autoexigencia en la planificación de tareas</a:t>
-            </a:r>
-          </a:p>
-          <a:p>
-            <a:pPr marL="800100" lvl="1" indent="-342900">
-              <a:buFont typeface="Arial" panose="020B0604020202020204" pitchFamily="34" charset="0"/>
-              <a:buChar char="•"/>
-            </a:pPr>
-            <a:endParaRPr lang="es-ES" sz="2000" b="0" i="0" u="none" strike="noStrike" baseline="0" dirty="0">
-              <a:latin typeface="Georgia" panose="02040502050405020303" pitchFamily="18" charset="0"/>
-            </a:endParaRPr>
-          </a:p>
-          <a:p>
-            <a:pPr marL="342900" indent="-342900">
-              <a:buFont typeface="Arial" panose="020B0604020202020204" pitchFamily="34" charset="0"/>
-              <a:buChar char="•"/>
-            </a:pPr>
-            <a:endParaRPr lang="es-ES" sz="2000" b="0" i="0" u="none" strike="noStrike" baseline="0" dirty="0">
-              <a:latin typeface="Georgia" panose="02040502050405020303" pitchFamily="18" charset="0"/>
-            </a:endParaRPr>
-          </a:p>
-          <a:p>
-            <a:pPr marL="342900" indent="-342900">
-              <a:buFont typeface="Arial" panose="020B0604020202020204" pitchFamily="34" charset="0"/>
-              <a:buChar char="•"/>
-            </a:pPr>
-            <a:r>
-              <a:rPr lang="es-ES" sz="2000" b="0" i="0" u="none" strike="noStrike" baseline="0" dirty="0">
-                <a:latin typeface="Georgia" panose="02040502050405020303" pitchFamily="18" charset="0"/>
-              </a:rPr>
-              <a:t>Consideraciones personales</a:t>
-            </a:r>
-          </a:p>
-        </p:txBody>
-      </p:sp>
+      </p:pic>
     </p:spTree>
-    <p:extLst>
-      <p:ext uri="{BB962C8B-B14F-4D97-AF65-F5344CB8AC3E}">
-        <p14:creationId xmlns:p14="http://schemas.microsoft.com/office/powerpoint/2010/main" val="2147726924"/>
-      </p:ext>
-    </p:extLst>
   </p:cSld>
   <p:clrMapOvr>
     <a:masterClrMapping/>
@@ -12199,7 +12094,318 @@
           <p:cNvPr id="4" name="Rectángulo 3">
             <a:extLst>
               <a:ext uri="{FF2B5EF4-FFF2-40B4-BE49-F238E27FC236}">
-                <a16:creationId xmlns:a16="http://schemas.microsoft.com/office/drawing/2014/main" id="{B0F1B4F4-0C7A-4C0E-8584-95718BC545EC}"/>
+                <a16:creationId xmlns:a16="http://schemas.microsoft.com/office/drawing/2014/main" xmlns="" id="{B0F1B4F4-0C7A-4C0E-8584-95718BC545EC}"/>
+              </a:ext>
+            </a:extLst>
+          </p:cNvPr>
+          <p:cNvSpPr/>
+          <p:nvPr/>
+        </p:nvSpPr>
+        <p:spPr>
+          <a:xfrm>
+            <a:off x="2366075" y="1577741"/>
+            <a:ext cx="9825925" cy="1200329"/>
+          </a:xfrm>
+          <a:prstGeom prst="rect">
+            <a:avLst/>
+          </a:prstGeom>
+          <a:noFill/>
+        </p:spPr>
+        <p:txBody>
+          <a:bodyPr wrap="square" lIns="91440" tIns="45720" rIns="91440" bIns="45720">
+            <a:spAutoFit/>
+          </a:bodyPr>
+          <a:lstStyle/>
+          <a:p>
+            <a:pPr algn="ctr"/>
+            <a:r>
+              <a:rPr lang="es-ES" sz="7200" b="1" dirty="0">
+                <a:ln w="0"/>
+                <a:solidFill>
+                  <a:schemeClr val="accent1"/>
+                </a:solidFill>
+                <a:effectLst>
+                  <a:outerShdw blurRad="38100" dist="25400" dir="5400000" algn="ctr" rotWithShape="0">
+                    <a:srgbClr val="6E747A">
+                      <a:alpha val="43000"/>
+                    </a:srgbClr>
+                  </a:outerShdw>
+                </a:effectLst>
+              </a:rPr>
+              <a:t>Conclusiones</a:t>
+            </a:r>
+            <a:endParaRPr lang="es-ES" sz="7200" b="1" cap="none" spc="0" dirty="0">
+              <a:ln w="0"/>
+              <a:solidFill>
+                <a:schemeClr val="accent1"/>
+              </a:solidFill>
+              <a:effectLst>
+                <a:outerShdw blurRad="38100" dist="25400" dir="5400000" algn="ctr" rotWithShape="0">
+                  <a:srgbClr val="6E747A">
+                    <a:alpha val="43000"/>
+                  </a:srgbClr>
+                </a:outerShdw>
+              </a:effectLst>
+            </a:endParaRPr>
+          </a:p>
+        </p:txBody>
+      </p:sp>
+    </p:spTree>
+    <p:extLst>
+      <p:ext uri="{BB962C8B-B14F-4D97-AF65-F5344CB8AC3E}">
+        <p14:creationId xmlns:p14="http://schemas.microsoft.com/office/powerpoint/2010/main" xmlns="" val="3888593392"/>
+      </p:ext>
+    </p:extLst>
+  </p:cSld>
+  <p:clrMapOvr>
+    <a:masterClrMapping/>
+  </p:clrMapOvr>
+</p:sld>
+</file>
+
+<file path=ppt/slides/slide26.xml><?xml version="1.0" encoding="utf-8"?>
+<p:sld xmlns:a="http://schemas.openxmlformats.org/drawingml/2006/main" xmlns:r="http://schemas.openxmlformats.org/officeDocument/2006/relationships" xmlns:p="http://schemas.openxmlformats.org/presentationml/2006/main">
+  <p:cSld>
+    <p:spTree>
+      <p:nvGrpSpPr>
+        <p:cNvPr id="1" name=""/>
+        <p:cNvGrpSpPr/>
+        <p:nvPr/>
+      </p:nvGrpSpPr>
+      <p:grpSpPr>
+        <a:xfrm>
+          <a:off x="0" y="0"/>
+          <a:ext cx="0" cy="0"/>
+          <a:chOff x="0" y="0"/>
+          <a:chExt cx="0" cy="0"/>
+        </a:xfrm>
+      </p:grpSpPr>
+      <p:sp>
+        <p:nvSpPr>
+          <p:cNvPr id="2" name="Título 1">
+            <a:extLst>
+              <a:ext uri="{FF2B5EF4-FFF2-40B4-BE49-F238E27FC236}">
+                <a16:creationId xmlns:a16="http://schemas.microsoft.com/office/drawing/2014/main" xmlns="" id="{0ED6D180-92C1-4333-BA91-2BBA4DD94A3B}"/>
+              </a:ext>
+            </a:extLst>
+          </p:cNvPr>
+          <p:cNvSpPr>
+            <a:spLocks noGrp="1"/>
+          </p:cNvSpPr>
+          <p:nvPr>
+            <p:ph type="title"/>
+          </p:nvPr>
+        </p:nvSpPr>
+        <p:spPr>
+          <a:xfrm>
+            <a:off x="1270000" y="0"/>
+            <a:ext cx="10922000" cy="1752599"/>
+          </a:xfrm>
+        </p:spPr>
+        <p:txBody>
+          <a:bodyPr>
+            <a:normAutofit/>
+          </a:bodyPr>
+          <a:lstStyle/>
+          <a:p>
+            <a:r>
+              <a:rPr lang="es-ES" sz="4000" dirty="0">
+                <a:latin typeface="Georgia" panose="02040502050405020303" pitchFamily="18" charset="0"/>
+              </a:rPr>
+              <a:t>Conclusiones</a:t>
+            </a:r>
+          </a:p>
+        </p:txBody>
+      </p:sp>
+      <p:sp>
+        <p:nvSpPr>
+          <p:cNvPr id="6" name="CuadroTexto 5">
+            <a:extLst>
+              <a:ext uri="{FF2B5EF4-FFF2-40B4-BE49-F238E27FC236}">
+                <a16:creationId xmlns:a16="http://schemas.microsoft.com/office/drawing/2014/main" xmlns="" id="{BC8D092D-6667-447D-B473-A50467138064}"/>
+              </a:ext>
+            </a:extLst>
+          </p:cNvPr>
+          <p:cNvSpPr txBox="1"/>
+          <p:nvPr/>
+        </p:nvSpPr>
+        <p:spPr>
+          <a:xfrm>
+            <a:off x="2469776" y="1950620"/>
+            <a:ext cx="7252447" cy="3785652"/>
+          </a:xfrm>
+          <a:prstGeom prst="rect">
+            <a:avLst/>
+          </a:prstGeom>
+          <a:noFill/>
+        </p:spPr>
+        <p:txBody>
+          <a:bodyPr wrap="square">
+            <a:spAutoFit/>
+          </a:bodyPr>
+          <a:lstStyle/>
+          <a:p>
+            <a:pPr algn="l"/>
+            <a:endParaRPr lang="es-AR" sz="2000" b="0" i="0" u="none" strike="noStrike" baseline="0" dirty="0">
+              <a:solidFill>
+                <a:srgbClr val="000000"/>
+              </a:solidFill>
+              <a:latin typeface="Calibri" panose="020F0502020204030204" pitchFamily="34" charset="0"/>
+            </a:endParaRPr>
+          </a:p>
+          <a:p>
+            <a:pPr marL="342900" indent="-342900">
+              <a:buFont typeface="Arial" panose="020B0604020202020204" pitchFamily="34" charset="0"/>
+              <a:buChar char="•"/>
+            </a:pPr>
+            <a:r>
+              <a:rPr lang="es-ES" sz="2000" b="0" i="0" u="none" strike="noStrike" baseline="0" dirty="0">
+                <a:latin typeface="Georgia" panose="02040502050405020303" pitchFamily="18" charset="0"/>
+              </a:rPr>
+              <a:t>Elección y funcionamiento del equipo</a:t>
+            </a:r>
+          </a:p>
+          <a:p>
+            <a:endParaRPr lang="es-ES" sz="2000" b="0" i="0" u="none" strike="noStrike" baseline="0" dirty="0">
+              <a:latin typeface="Georgia" panose="02040502050405020303" pitchFamily="18" charset="0"/>
+            </a:endParaRPr>
+          </a:p>
+          <a:p>
+            <a:pPr marL="342900" indent="-342900">
+              <a:buFont typeface="Arial" panose="020B0604020202020204" pitchFamily="34" charset="0"/>
+              <a:buChar char="•"/>
+            </a:pPr>
+            <a:r>
+              <a:rPr lang="es-ES" sz="2000" dirty="0">
+                <a:latin typeface="Georgia" panose="02040502050405020303" pitchFamily="18" charset="0"/>
+              </a:rPr>
+              <a:t>Asignación del sistema a desarrollar</a:t>
+            </a:r>
+            <a:endParaRPr lang="es-ES" sz="2000" b="0" i="0" u="none" strike="noStrike" baseline="0" dirty="0">
+              <a:latin typeface="Georgia" panose="02040502050405020303" pitchFamily="18" charset="0"/>
+            </a:endParaRPr>
+          </a:p>
+          <a:p>
+            <a:endParaRPr lang="es-ES" sz="2000" b="0" i="0" u="none" strike="noStrike" baseline="0" dirty="0">
+              <a:latin typeface="Georgia" panose="02040502050405020303" pitchFamily="18" charset="0"/>
+            </a:endParaRPr>
+          </a:p>
+          <a:p>
+            <a:pPr marL="342900" indent="-342900">
+              <a:buFont typeface="Arial" panose="020B0604020202020204" pitchFamily="34" charset="0"/>
+              <a:buChar char="•"/>
+            </a:pPr>
+            <a:r>
+              <a:rPr lang="es-ES" sz="2000" b="0" i="0" u="none" strike="noStrike" baseline="0" dirty="0">
+                <a:latin typeface="Georgia" panose="02040502050405020303" pitchFamily="18" charset="0"/>
+              </a:rPr>
+              <a:t>Conocimientos obtenidos</a:t>
+            </a:r>
+          </a:p>
+          <a:p>
+            <a:pPr marL="800100" lvl="1" indent="-342900">
+              <a:buFont typeface="Arial" panose="020B0604020202020204" pitchFamily="34" charset="0"/>
+              <a:buChar char="•"/>
+            </a:pPr>
+            <a:r>
+              <a:rPr lang="es-ES" b="0" i="0" u="none" strike="noStrike" baseline="0" dirty="0">
+                <a:latin typeface="Georgia" panose="02040502050405020303" pitchFamily="18" charset="0"/>
+              </a:rPr>
+              <a:t>Relevancia de un buen análisis y diseño</a:t>
+            </a:r>
+          </a:p>
+          <a:p>
+            <a:pPr marL="800100" lvl="1" indent="-342900">
+              <a:buFont typeface="Arial" panose="020B0604020202020204" pitchFamily="34" charset="0"/>
+              <a:buChar char="•"/>
+            </a:pPr>
+            <a:r>
+              <a:rPr lang="es-ES" dirty="0">
+                <a:latin typeface="Georgia" panose="02040502050405020303" pitchFamily="18" charset="0"/>
+              </a:rPr>
+              <a:t>Utilidad de GIT</a:t>
+            </a:r>
+          </a:p>
+          <a:p>
+            <a:pPr marL="800100" lvl="1" indent="-342900">
+              <a:buFont typeface="Arial" panose="020B0604020202020204" pitchFamily="34" charset="0"/>
+              <a:buChar char="•"/>
+            </a:pPr>
+            <a:r>
+              <a:rPr lang="es-ES" b="0" i="0" u="none" strike="noStrike" baseline="0" dirty="0">
+                <a:latin typeface="Georgia" panose="02040502050405020303" pitchFamily="18" charset="0"/>
+              </a:rPr>
+              <a:t>Autoexigencia en la planificación de tareas</a:t>
+            </a:r>
+          </a:p>
+          <a:p>
+            <a:pPr marL="800100" lvl="1" indent="-342900">
+              <a:buFont typeface="Arial" panose="020B0604020202020204" pitchFamily="34" charset="0"/>
+              <a:buChar char="•"/>
+            </a:pPr>
+            <a:endParaRPr lang="es-ES" sz="2000" b="0" i="0" u="none" strike="noStrike" baseline="0" dirty="0">
+              <a:latin typeface="Georgia" panose="02040502050405020303" pitchFamily="18" charset="0"/>
+            </a:endParaRPr>
+          </a:p>
+          <a:p>
+            <a:pPr marL="342900" indent="-342900">
+              <a:buFont typeface="Arial" panose="020B0604020202020204" pitchFamily="34" charset="0"/>
+              <a:buChar char="•"/>
+            </a:pPr>
+            <a:endParaRPr lang="es-ES" sz="2000" b="0" i="0" u="none" strike="noStrike" baseline="0" dirty="0">
+              <a:latin typeface="Georgia" panose="02040502050405020303" pitchFamily="18" charset="0"/>
+            </a:endParaRPr>
+          </a:p>
+          <a:p>
+            <a:pPr marL="342900" indent="-342900">
+              <a:buFont typeface="Arial" panose="020B0604020202020204" pitchFamily="34" charset="0"/>
+              <a:buChar char="•"/>
+            </a:pPr>
+            <a:r>
+              <a:rPr lang="es-ES" sz="2000" b="0" i="0" u="none" strike="noStrike" baseline="0" dirty="0">
+                <a:latin typeface="Georgia" panose="02040502050405020303" pitchFamily="18" charset="0"/>
+              </a:rPr>
+              <a:t>Consideraciones personales</a:t>
+            </a:r>
+          </a:p>
+        </p:txBody>
+      </p:sp>
+    </p:spTree>
+    <p:extLst>
+      <p:ext uri="{BB962C8B-B14F-4D97-AF65-F5344CB8AC3E}">
+        <p14:creationId xmlns:p14="http://schemas.microsoft.com/office/powerpoint/2010/main" xmlns="" val="2147726924"/>
+      </p:ext>
+    </p:extLst>
+  </p:cSld>
+  <p:clrMapOvr>
+    <a:masterClrMapping/>
+  </p:clrMapOvr>
+</p:sld>
+</file>
+
+<file path=ppt/slides/slide27.xml><?xml version="1.0" encoding="utf-8"?>
+<p:sld xmlns:a="http://schemas.openxmlformats.org/drawingml/2006/main" xmlns:r="http://schemas.openxmlformats.org/officeDocument/2006/relationships" xmlns:p="http://schemas.openxmlformats.org/presentationml/2006/main">
+  <p:cSld>
+    <p:spTree>
+      <p:nvGrpSpPr>
+        <p:cNvPr id="1" name=""/>
+        <p:cNvGrpSpPr/>
+        <p:nvPr/>
+      </p:nvGrpSpPr>
+      <p:grpSpPr>
+        <a:xfrm>
+          <a:off x="0" y="0"/>
+          <a:ext cx="0" cy="0"/>
+          <a:chOff x="0" y="0"/>
+          <a:chExt cx="0" cy="0"/>
+        </a:xfrm>
+      </p:grpSpPr>
+      <p:sp>
+        <p:nvSpPr>
+          <p:cNvPr id="4" name="Rectángulo 3">
+            <a:extLst>
+              <a:ext uri="{FF2B5EF4-FFF2-40B4-BE49-F238E27FC236}">
+                <a16:creationId xmlns:a16="http://schemas.microsoft.com/office/drawing/2014/main" xmlns="" id="{B0F1B4F4-0C7A-4C0E-8584-95718BC545EC}"/>
               </a:ext>
             </a:extLst>
           </p:cNvPr>
@@ -12263,7 +12469,7 @@
           <p:cNvPr id="2" name="CuadroTexto 1">
             <a:extLst>
               <a:ext uri="{FF2B5EF4-FFF2-40B4-BE49-F238E27FC236}">
-                <a16:creationId xmlns:a16="http://schemas.microsoft.com/office/drawing/2014/main" id="{BBF285E2-50A8-4654-BD24-220C20D7C57B}"/>
+                <a16:creationId xmlns:a16="http://schemas.microsoft.com/office/drawing/2014/main" xmlns="" id="{BBF285E2-50A8-4654-BD24-220C20D7C57B}"/>
               </a:ext>
             </a:extLst>
           </p:cNvPr>
@@ -12296,7 +12502,7 @@
     </p:spTree>
     <p:extLst>
       <p:ext uri="{BB962C8B-B14F-4D97-AF65-F5344CB8AC3E}">
-        <p14:creationId xmlns:p14="http://schemas.microsoft.com/office/powerpoint/2010/main" val="3442063561"/>
+        <p14:creationId xmlns:p14="http://schemas.microsoft.com/office/powerpoint/2010/main" xmlns="" val="3442063561"/>
       </p:ext>
     </p:extLst>
   </p:cSld>
@@ -12328,7 +12534,7 @@
           <p:cNvPr id="4" name="Título 3">
             <a:extLst>
               <a:ext uri="{FF2B5EF4-FFF2-40B4-BE49-F238E27FC236}">
-                <a16:creationId xmlns:a16="http://schemas.microsoft.com/office/drawing/2014/main" id="{FA4EADB5-92CE-4B25-BE21-7FC484AE680E}"/>
+                <a16:creationId xmlns:a16="http://schemas.microsoft.com/office/drawing/2014/main" xmlns="" id="{FA4EADB5-92CE-4B25-BE21-7FC484AE680E}"/>
               </a:ext>
             </a:extLst>
           </p:cNvPr>
@@ -12366,7 +12572,7 @@
           <p:cNvPr id="5" name="Subtítulo 4">
             <a:extLst>
               <a:ext uri="{FF2B5EF4-FFF2-40B4-BE49-F238E27FC236}">
-                <a16:creationId xmlns:a16="http://schemas.microsoft.com/office/drawing/2014/main" id="{7035CB29-6D24-4E02-AC9F-07DC0DE9312C}"/>
+                <a16:creationId xmlns:a16="http://schemas.microsoft.com/office/drawing/2014/main" xmlns="" id="{7035CB29-6D24-4E02-AC9F-07DC0DE9312C}"/>
               </a:ext>
             </a:extLst>
           </p:cNvPr>
@@ -12489,7 +12695,7 @@
     </p:spTree>
     <p:extLst>
       <p:ext uri="{BB962C8B-B14F-4D97-AF65-F5344CB8AC3E}">
-        <p14:creationId xmlns:p14="http://schemas.microsoft.com/office/powerpoint/2010/main" val="503208862"/>
+        <p14:creationId xmlns:p14="http://schemas.microsoft.com/office/powerpoint/2010/main" xmlns="" val="503208862"/>
       </p:ext>
     </p:extLst>
   </p:cSld>
@@ -12521,7 +12727,7 @@
           <p:cNvPr id="4" name="Título 3">
             <a:extLst>
               <a:ext uri="{FF2B5EF4-FFF2-40B4-BE49-F238E27FC236}">
-                <a16:creationId xmlns:a16="http://schemas.microsoft.com/office/drawing/2014/main" id="{FA4EADB5-92CE-4B25-BE21-7FC484AE680E}"/>
+                <a16:creationId xmlns:a16="http://schemas.microsoft.com/office/drawing/2014/main" xmlns="" id="{FA4EADB5-92CE-4B25-BE21-7FC484AE680E}"/>
               </a:ext>
             </a:extLst>
           </p:cNvPr>
@@ -12558,7 +12764,7 @@
           <p:cNvPr id="5" name="Subtítulo 4">
             <a:extLst>
               <a:ext uri="{FF2B5EF4-FFF2-40B4-BE49-F238E27FC236}">
-                <a16:creationId xmlns:a16="http://schemas.microsoft.com/office/drawing/2014/main" id="{7035CB29-6D24-4E02-AC9F-07DC0DE9312C}"/>
+                <a16:creationId xmlns:a16="http://schemas.microsoft.com/office/drawing/2014/main" xmlns="" id="{7035CB29-6D24-4E02-AC9F-07DC0DE9312C}"/>
               </a:ext>
             </a:extLst>
           </p:cNvPr>
@@ -12672,7 +12878,7 @@
           <p:cNvPr id="6" name="Imagen 5">
             <a:extLst>
               <a:ext uri="{FF2B5EF4-FFF2-40B4-BE49-F238E27FC236}">
-                <a16:creationId xmlns:a16="http://schemas.microsoft.com/office/drawing/2014/main" id="{D3E3C482-901A-431D-8EBF-659D1398387A}"/>
+                <a16:creationId xmlns:a16="http://schemas.microsoft.com/office/drawing/2014/main" xmlns="" id="{D3E3C482-901A-431D-8EBF-659D1398387A}"/>
               </a:ext>
             </a:extLst>
           </p:cNvPr>
@@ -12685,7 +12891,7 @@
           <a:blip r:embed="rId2" cstate="print">
             <a:extLst>
               <a:ext uri="{28A0092B-C50C-407E-A947-70E740481C1C}">
-                <a14:useLocalDpi xmlns:a14="http://schemas.microsoft.com/office/drawing/2010/main" val="0"/>
+                <a14:useLocalDpi xmlns:a14="http://schemas.microsoft.com/office/drawing/2010/main" xmlns="" val="0"/>
               </a:ext>
             </a:extLst>
           </a:blip>
@@ -12708,7 +12914,7 @@
           <p:cNvPr id="8" name="Imagen 7">
             <a:extLst>
               <a:ext uri="{FF2B5EF4-FFF2-40B4-BE49-F238E27FC236}">
-                <a16:creationId xmlns:a16="http://schemas.microsoft.com/office/drawing/2014/main" id="{F7FE4061-0AB6-4263-BAF9-1E3F442EB436}"/>
+                <a16:creationId xmlns:a16="http://schemas.microsoft.com/office/drawing/2014/main" xmlns="" id="{F7FE4061-0AB6-4263-BAF9-1E3F442EB436}"/>
               </a:ext>
             </a:extLst>
           </p:cNvPr>
@@ -12718,10 +12924,10 @@
           <p:nvPr/>
         </p:nvPicPr>
         <p:blipFill>
-          <a:blip r:embed="rId3" cstate="hqprint">
+          <a:blip r:embed="rId3" cstate="print">
             <a:extLst>
               <a:ext uri="{28A0092B-C50C-407E-A947-70E740481C1C}">
-                <a14:useLocalDpi xmlns:a14="http://schemas.microsoft.com/office/drawing/2010/main" val="0"/>
+                <a14:useLocalDpi xmlns:a14="http://schemas.microsoft.com/office/drawing/2010/main" xmlns="" val="0"/>
               </a:ext>
             </a:extLst>
           </a:blip>
@@ -12744,7 +12950,7 @@
           <p:cNvPr id="10" name="Imagen 9">
             <a:extLst>
               <a:ext uri="{FF2B5EF4-FFF2-40B4-BE49-F238E27FC236}">
-                <a16:creationId xmlns:a16="http://schemas.microsoft.com/office/drawing/2014/main" id="{9E93C3DC-EA10-4E41-BDEF-6D23E1C605A2}"/>
+                <a16:creationId xmlns:a16="http://schemas.microsoft.com/office/drawing/2014/main" xmlns="" id="{9E93C3DC-EA10-4E41-BDEF-6D23E1C605A2}"/>
               </a:ext>
             </a:extLst>
           </p:cNvPr>
@@ -12757,7 +12963,7 @@
           <a:blip r:embed="rId4" cstate="print">
             <a:extLst>
               <a:ext uri="{28A0092B-C50C-407E-A947-70E740481C1C}">
-                <a14:useLocalDpi xmlns:a14="http://schemas.microsoft.com/office/drawing/2010/main" val="0"/>
+                <a14:useLocalDpi xmlns:a14="http://schemas.microsoft.com/office/drawing/2010/main" xmlns="" val="0"/>
               </a:ext>
             </a:extLst>
           </a:blip>
@@ -12780,7 +12986,7 @@
           <p:cNvPr id="18" name="Imagen 17">
             <a:extLst>
               <a:ext uri="{FF2B5EF4-FFF2-40B4-BE49-F238E27FC236}">
-                <a16:creationId xmlns:a16="http://schemas.microsoft.com/office/drawing/2014/main" id="{8646EEDC-88A1-4D49-A526-A92135A622F0}"/>
+                <a16:creationId xmlns:a16="http://schemas.microsoft.com/office/drawing/2014/main" xmlns="" id="{8646EEDC-88A1-4D49-A526-A92135A622F0}"/>
               </a:ext>
             </a:extLst>
           </p:cNvPr>
@@ -12793,7 +12999,7 @@
           <a:blip r:embed="rId5" cstate="print">
             <a:extLst>
               <a:ext uri="{28A0092B-C50C-407E-A947-70E740481C1C}">
-                <a14:useLocalDpi xmlns:a14="http://schemas.microsoft.com/office/drawing/2010/main" val="0"/>
+                <a14:useLocalDpi xmlns:a14="http://schemas.microsoft.com/office/drawing/2010/main" xmlns="" val="0"/>
               </a:ext>
             </a:extLst>
           </a:blip>
@@ -12816,7 +13022,7 @@
           <p:cNvPr id="20" name="Imagen 19">
             <a:extLst>
               <a:ext uri="{FF2B5EF4-FFF2-40B4-BE49-F238E27FC236}">
-                <a16:creationId xmlns:a16="http://schemas.microsoft.com/office/drawing/2014/main" id="{4A2D40FB-590B-4A55-B259-6C3ECBBC258F}"/>
+                <a16:creationId xmlns:a16="http://schemas.microsoft.com/office/drawing/2014/main" xmlns="" id="{4A2D40FB-590B-4A55-B259-6C3ECBBC258F}"/>
               </a:ext>
             </a:extLst>
           </p:cNvPr>
@@ -12826,10 +13032,10 @@
           <p:nvPr/>
         </p:nvPicPr>
         <p:blipFill>
-          <a:blip r:embed="rId6" cstate="hqprint">
+          <a:blip r:embed="rId6" cstate="print">
             <a:extLst>
               <a:ext uri="{28A0092B-C50C-407E-A947-70E740481C1C}">
-                <a14:useLocalDpi xmlns:a14="http://schemas.microsoft.com/office/drawing/2010/main" val="0"/>
+                <a14:useLocalDpi xmlns:a14="http://schemas.microsoft.com/office/drawing/2010/main" xmlns="" val="0"/>
               </a:ext>
             </a:extLst>
           </a:blip>
@@ -12852,7 +13058,7 @@
           <p:cNvPr id="22" name="Imagen 21">
             <a:extLst>
               <a:ext uri="{FF2B5EF4-FFF2-40B4-BE49-F238E27FC236}">
-                <a16:creationId xmlns:a16="http://schemas.microsoft.com/office/drawing/2014/main" id="{B2430BC3-AAE9-4FD6-9B04-9E1C8B7005EE}"/>
+                <a16:creationId xmlns:a16="http://schemas.microsoft.com/office/drawing/2014/main" xmlns="" id="{B2430BC3-AAE9-4FD6-9B04-9E1C8B7005EE}"/>
               </a:ext>
             </a:extLst>
           </p:cNvPr>
@@ -12862,10 +13068,10 @@
           <p:nvPr/>
         </p:nvPicPr>
         <p:blipFill>
-          <a:blip r:embed="rId7" cstate="hqprint">
+          <a:blip r:embed="rId7" cstate="print">
             <a:extLst>
               <a:ext uri="{28A0092B-C50C-407E-A947-70E740481C1C}">
-                <a14:useLocalDpi xmlns:a14="http://schemas.microsoft.com/office/drawing/2010/main" val="0"/>
+                <a14:useLocalDpi xmlns:a14="http://schemas.microsoft.com/office/drawing/2010/main" xmlns="" val="0"/>
               </a:ext>
             </a:extLst>
           </a:blip>
@@ -12888,7 +13094,7 @@
           <p:cNvPr id="25" name="Grupo 24">
             <a:extLst>
               <a:ext uri="{FF2B5EF4-FFF2-40B4-BE49-F238E27FC236}">
-                <a16:creationId xmlns:a16="http://schemas.microsoft.com/office/drawing/2014/main" id="{6FBCDE22-F651-45B0-99A1-055E6ABDF7ED}"/>
+                <a16:creationId xmlns:a16="http://schemas.microsoft.com/office/drawing/2014/main" xmlns="" id="{6FBCDE22-F651-45B0-99A1-055E6ABDF7ED}"/>
               </a:ext>
             </a:extLst>
           </p:cNvPr>
@@ -12908,7 +13114,7 @@
             <p:cNvPr id="12" name="Imagen 11">
               <a:extLst>
                 <a:ext uri="{FF2B5EF4-FFF2-40B4-BE49-F238E27FC236}">
-                  <a16:creationId xmlns:a16="http://schemas.microsoft.com/office/drawing/2014/main" id="{8EF366B3-0A5E-4158-883D-ADDFEF56C8D1}"/>
+                  <a16:creationId xmlns:a16="http://schemas.microsoft.com/office/drawing/2014/main" xmlns="" id="{8EF366B3-0A5E-4158-883D-ADDFEF56C8D1}"/>
                 </a:ext>
               </a:extLst>
             </p:cNvPr>
@@ -12921,7 +13127,7 @@
             <a:blip r:embed="rId8" cstate="print">
               <a:extLst>
                 <a:ext uri="{28A0092B-C50C-407E-A947-70E740481C1C}">
-                  <a14:useLocalDpi xmlns:a14="http://schemas.microsoft.com/office/drawing/2010/main" val="0"/>
+                  <a14:useLocalDpi xmlns:a14="http://schemas.microsoft.com/office/drawing/2010/main" xmlns="" val="0"/>
                 </a:ext>
               </a:extLst>
             </a:blip>
@@ -12944,7 +13150,7 @@
             <p:cNvPr id="14" name="Imagen 13">
               <a:extLst>
                 <a:ext uri="{FF2B5EF4-FFF2-40B4-BE49-F238E27FC236}">
-                  <a16:creationId xmlns:a16="http://schemas.microsoft.com/office/drawing/2014/main" id="{16FD14F2-15D3-4DD2-9D3C-D16633A69E32}"/>
+                  <a16:creationId xmlns:a16="http://schemas.microsoft.com/office/drawing/2014/main" xmlns="" id="{16FD14F2-15D3-4DD2-9D3C-D16633A69E32}"/>
                 </a:ext>
               </a:extLst>
             </p:cNvPr>
@@ -12957,7 +13163,7 @@
             <a:blip r:embed="rId9" cstate="print">
               <a:extLst>
                 <a:ext uri="{28A0092B-C50C-407E-A947-70E740481C1C}">
-                  <a14:useLocalDpi xmlns:a14="http://schemas.microsoft.com/office/drawing/2010/main" val="0"/>
+                  <a14:useLocalDpi xmlns:a14="http://schemas.microsoft.com/office/drawing/2010/main" xmlns="" val="0"/>
                 </a:ext>
               </a:extLst>
             </a:blip>
@@ -12980,7 +13186,7 @@
             <p:cNvPr id="16" name="Imagen 15">
               <a:extLst>
                 <a:ext uri="{FF2B5EF4-FFF2-40B4-BE49-F238E27FC236}">
-                  <a16:creationId xmlns:a16="http://schemas.microsoft.com/office/drawing/2014/main" id="{F8D896A9-662E-4D9F-A70A-6AAF6F5C524E}"/>
+                  <a16:creationId xmlns:a16="http://schemas.microsoft.com/office/drawing/2014/main" xmlns="" id="{F8D896A9-662E-4D9F-A70A-6AAF6F5C524E}"/>
                 </a:ext>
               </a:extLst>
             </p:cNvPr>
@@ -12993,7 +13199,7 @@
             <a:blip r:embed="rId10" cstate="print">
               <a:extLst>
                 <a:ext uri="{28A0092B-C50C-407E-A947-70E740481C1C}">
-                  <a14:useLocalDpi xmlns:a14="http://schemas.microsoft.com/office/drawing/2010/main" val="0"/>
+                  <a14:useLocalDpi xmlns:a14="http://schemas.microsoft.com/office/drawing/2010/main" xmlns="" val="0"/>
                 </a:ext>
               </a:extLst>
             </a:blip>
@@ -13016,7 +13222,7 @@
             <p:cNvPr id="24" name="Imagen 23">
               <a:extLst>
                 <a:ext uri="{FF2B5EF4-FFF2-40B4-BE49-F238E27FC236}">
-                  <a16:creationId xmlns:a16="http://schemas.microsoft.com/office/drawing/2014/main" id="{34384560-A72D-4409-8A84-1ED46309C9E6}"/>
+                  <a16:creationId xmlns:a16="http://schemas.microsoft.com/office/drawing/2014/main" xmlns="" id="{34384560-A72D-4409-8A84-1ED46309C9E6}"/>
                 </a:ext>
               </a:extLst>
             </p:cNvPr>
@@ -13029,7 +13235,7 @@
             <a:blip r:embed="rId11" cstate="print">
               <a:extLst>
                 <a:ext uri="{28A0092B-C50C-407E-A947-70E740481C1C}">
-                  <a14:useLocalDpi xmlns:a14="http://schemas.microsoft.com/office/drawing/2010/main" val="0"/>
+                  <a14:useLocalDpi xmlns:a14="http://schemas.microsoft.com/office/drawing/2010/main" xmlns="" val="0"/>
                 </a:ext>
               </a:extLst>
             </a:blip>
@@ -13051,7 +13257,7 @@
     </p:spTree>
     <p:extLst>
       <p:ext uri="{BB962C8B-B14F-4D97-AF65-F5344CB8AC3E}">
-        <p14:creationId xmlns:p14="http://schemas.microsoft.com/office/powerpoint/2010/main" val="2893191071"/>
+        <p14:creationId xmlns:p14="http://schemas.microsoft.com/office/powerpoint/2010/main" xmlns="" val="2893191071"/>
       </p:ext>
     </p:extLst>
   </p:cSld>
@@ -13083,7 +13289,7 @@
           <p:cNvPr id="2" name="Título 1">
             <a:extLst>
               <a:ext uri="{FF2B5EF4-FFF2-40B4-BE49-F238E27FC236}">
-                <a16:creationId xmlns:a16="http://schemas.microsoft.com/office/drawing/2014/main" id="{0ED6D180-92C1-4333-BA91-2BBA4DD94A3B}"/>
+                <a16:creationId xmlns:a16="http://schemas.microsoft.com/office/drawing/2014/main" xmlns="" id="{0ED6D180-92C1-4333-BA91-2BBA4DD94A3B}"/>
               </a:ext>
             </a:extLst>
           </p:cNvPr>
@@ -13120,7 +13326,7 @@
           <p:cNvPr id="9" name="Elipse 8">
             <a:extLst>
               <a:ext uri="{FF2B5EF4-FFF2-40B4-BE49-F238E27FC236}">
-                <a16:creationId xmlns:a16="http://schemas.microsoft.com/office/drawing/2014/main" id="{669363E3-65EC-4B6C-B5A2-86799758077C}"/>
+                <a16:creationId xmlns:a16="http://schemas.microsoft.com/office/drawing/2014/main" xmlns="" id="{669363E3-65EC-4B6C-B5A2-86799758077C}"/>
               </a:ext>
             </a:extLst>
           </p:cNvPr>
@@ -13166,7 +13372,7 @@
           <p:cNvPr id="13" name="Elipse 12">
             <a:extLst>
               <a:ext uri="{FF2B5EF4-FFF2-40B4-BE49-F238E27FC236}">
-                <a16:creationId xmlns:a16="http://schemas.microsoft.com/office/drawing/2014/main" id="{8A714D8D-DDD7-450D-B61B-0A361401E840}"/>
+                <a16:creationId xmlns:a16="http://schemas.microsoft.com/office/drawing/2014/main" xmlns="" id="{8A714D8D-DDD7-450D-B61B-0A361401E840}"/>
               </a:ext>
             </a:extLst>
           </p:cNvPr>
@@ -13212,7 +13418,7 @@
           <p:cNvPr id="15" name="CuadroTexto 14">
             <a:extLst>
               <a:ext uri="{FF2B5EF4-FFF2-40B4-BE49-F238E27FC236}">
-                <a16:creationId xmlns:a16="http://schemas.microsoft.com/office/drawing/2014/main" id="{69C0BCF2-7C39-4E40-9C2B-2198580F3E40}"/>
+                <a16:creationId xmlns:a16="http://schemas.microsoft.com/office/drawing/2014/main" xmlns="" id="{69C0BCF2-7C39-4E40-9C2B-2198580F3E40}"/>
               </a:ext>
             </a:extLst>
           </p:cNvPr>
@@ -13259,7 +13465,7 @@
           <p:cNvPr id="17" name="CuadroTexto 16">
             <a:extLst>
               <a:ext uri="{FF2B5EF4-FFF2-40B4-BE49-F238E27FC236}">
-                <a16:creationId xmlns:a16="http://schemas.microsoft.com/office/drawing/2014/main" id="{F0BB235C-3047-4EFA-8B74-0EE023A1B6DF}"/>
+                <a16:creationId xmlns:a16="http://schemas.microsoft.com/office/drawing/2014/main" xmlns="" id="{F0BB235C-3047-4EFA-8B74-0EE023A1B6DF}"/>
               </a:ext>
             </a:extLst>
           </p:cNvPr>
@@ -13304,7 +13510,7 @@
     </p:spTree>
     <p:extLst>
       <p:ext uri="{BB962C8B-B14F-4D97-AF65-F5344CB8AC3E}">
-        <p14:creationId xmlns:p14="http://schemas.microsoft.com/office/powerpoint/2010/main" val="779257163"/>
+        <p14:creationId xmlns:p14="http://schemas.microsoft.com/office/powerpoint/2010/main" xmlns="" val="779257163"/>
       </p:ext>
     </p:extLst>
   </p:cSld>
@@ -13336,7 +13542,7 @@
           <p:cNvPr id="4" name="Rectángulo 3">
             <a:extLst>
               <a:ext uri="{FF2B5EF4-FFF2-40B4-BE49-F238E27FC236}">
-                <a16:creationId xmlns:a16="http://schemas.microsoft.com/office/drawing/2014/main" id="{B0F1B4F4-0C7A-4C0E-8584-95718BC545EC}"/>
+                <a16:creationId xmlns:a16="http://schemas.microsoft.com/office/drawing/2014/main" xmlns="" id="{B0F1B4F4-0C7A-4C0E-8584-95718BC545EC}"/>
               </a:ext>
             </a:extLst>
           </p:cNvPr>
@@ -13395,7 +13601,7 @@
     </p:spTree>
     <p:extLst>
       <p:ext uri="{BB962C8B-B14F-4D97-AF65-F5344CB8AC3E}">
-        <p14:creationId xmlns:p14="http://schemas.microsoft.com/office/powerpoint/2010/main" val="4228125147"/>
+        <p14:creationId xmlns:p14="http://schemas.microsoft.com/office/powerpoint/2010/main" xmlns="" val="4228125147"/>
       </p:ext>
     </p:extLst>
   </p:cSld>
@@ -13427,7 +13633,7 @@
           <p:cNvPr id="2" name="Título 1">
             <a:extLst>
               <a:ext uri="{FF2B5EF4-FFF2-40B4-BE49-F238E27FC236}">
-                <a16:creationId xmlns:a16="http://schemas.microsoft.com/office/drawing/2014/main" id="{0ED6D180-92C1-4333-BA91-2BBA4DD94A3B}"/>
+                <a16:creationId xmlns:a16="http://schemas.microsoft.com/office/drawing/2014/main" xmlns="" id="{0ED6D180-92C1-4333-BA91-2BBA4DD94A3B}"/>
               </a:ext>
             </a:extLst>
           </p:cNvPr>
@@ -13464,7 +13670,7 @@
           <p:cNvPr id="4" name="CuadroTexto 3">
             <a:extLst>
               <a:ext uri="{FF2B5EF4-FFF2-40B4-BE49-F238E27FC236}">
-                <a16:creationId xmlns:a16="http://schemas.microsoft.com/office/drawing/2014/main" id="{077AD978-631F-4986-B928-CABD7DCA36D6}"/>
+                <a16:creationId xmlns:a16="http://schemas.microsoft.com/office/drawing/2014/main" xmlns="" id="{077AD978-631F-4986-B928-CABD7DCA36D6}"/>
               </a:ext>
             </a:extLst>
           </p:cNvPr>
@@ -13612,7 +13818,7 @@
     </p:spTree>
     <p:extLst>
       <p:ext uri="{BB962C8B-B14F-4D97-AF65-F5344CB8AC3E}">
-        <p14:creationId xmlns:p14="http://schemas.microsoft.com/office/powerpoint/2010/main" val="3252879309"/>
+        <p14:creationId xmlns:p14="http://schemas.microsoft.com/office/powerpoint/2010/main" xmlns="" val="3252879309"/>
       </p:ext>
     </p:extLst>
   </p:cSld>
@@ -13644,7 +13850,7 @@
           <p:cNvPr id="2" name="Título 1">
             <a:extLst>
               <a:ext uri="{FF2B5EF4-FFF2-40B4-BE49-F238E27FC236}">
-                <a16:creationId xmlns:a16="http://schemas.microsoft.com/office/drawing/2014/main" id="{0ED6D180-92C1-4333-BA91-2BBA4DD94A3B}"/>
+                <a16:creationId xmlns:a16="http://schemas.microsoft.com/office/drawing/2014/main" xmlns="" id="{0ED6D180-92C1-4333-BA91-2BBA4DD94A3B}"/>
               </a:ext>
             </a:extLst>
           </p:cNvPr>
@@ -13681,7 +13887,7 @@
           <p:cNvPr id="6" name="CuadroTexto 5">
             <a:extLst>
               <a:ext uri="{FF2B5EF4-FFF2-40B4-BE49-F238E27FC236}">
-                <a16:creationId xmlns:a16="http://schemas.microsoft.com/office/drawing/2014/main" id="{BC8D092D-6667-447D-B473-A50467138064}"/>
+                <a16:creationId xmlns:a16="http://schemas.microsoft.com/office/drawing/2014/main" xmlns="" id="{BC8D092D-6667-447D-B473-A50467138064}"/>
               </a:ext>
             </a:extLst>
           </p:cNvPr>
@@ -13787,7 +13993,7 @@
     </p:spTree>
     <p:extLst>
       <p:ext uri="{BB962C8B-B14F-4D97-AF65-F5344CB8AC3E}">
-        <p14:creationId xmlns:p14="http://schemas.microsoft.com/office/powerpoint/2010/main" val="2333497509"/>
+        <p14:creationId xmlns:p14="http://schemas.microsoft.com/office/powerpoint/2010/main" xmlns="" val="2333497509"/>
       </p:ext>
     </p:extLst>
   </p:cSld>
@@ -13819,7 +14025,7 @@
           <p:cNvPr id="2" name="Título 1">
             <a:extLst>
               <a:ext uri="{FF2B5EF4-FFF2-40B4-BE49-F238E27FC236}">
-                <a16:creationId xmlns:a16="http://schemas.microsoft.com/office/drawing/2014/main" id="{0ED6D180-92C1-4333-BA91-2BBA4DD94A3B}"/>
+                <a16:creationId xmlns:a16="http://schemas.microsoft.com/office/drawing/2014/main" xmlns="" id="{0ED6D180-92C1-4333-BA91-2BBA4DD94A3B}"/>
               </a:ext>
             </a:extLst>
           </p:cNvPr>
@@ -13854,7 +14060,7 @@
     </p:spTree>
     <p:extLst>
       <p:ext uri="{BB962C8B-B14F-4D97-AF65-F5344CB8AC3E}">
-        <p14:creationId xmlns:p14="http://schemas.microsoft.com/office/powerpoint/2010/main" val="3543839896"/>
+        <p14:creationId xmlns:p14="http://schemas.microsoft.com/office/powerpoint/2010/main" xmlns="" val="3543839896"/>
       </p:ext>
     </p:extLst>
   </p:cSld>
@@ -14114,7 +14320,7 @@
   <a:extraClrSchemeLst/>
   <a:extLst>
     <a:ext uri="{05A4C25C-085E-4340-85A3-A5531E510DB2}">
-      <thm15:themeFamily xmlns:thm15="http://schemas.microsoft.com/office/thememl/2012/main" name="Parallax" id="{3388167B-A2EB-4685-9635-1831D9AEF8C4}" vid="{4F7A876A-7598-49CA-AFC8-8EDA2551E4A7}"/>
+      <thm15:themeFamily xmlns:thm15="http://schemas.microsoft.com/office/thememl/2012/main" xmlns="" name="Parallax" id="{3388167B-A2EB-4685-9635-1831D9AEF8C4}" vid="{4F7A876A-7598-49CA-AFC8-8EDA2551E4A7}"/>
     </a:ext>
   </a:extLst>
 </a:theme>
@@ -14375,7 +14581,7 @@
   <a:extraClrSchemeLst/>
   <a:extLst>
     <a:ext uri="{05A4C25C-085E-4340-85A3-A5531E510DB2}">
-      <thm15:themeFamily xmlns:thm15="http://schemas.microsoft.com/office/thememl/2012/main" name="Office Theme" id="{62F939B6-93AF-4DB8-9C6B-D6C7DFDC589F}" vid="{4A3C46E8-61CC-4603-A589-7422A47A8E4A}"/>
+      <thm15:themeFamily xmlns:thm15="http://schemas.microsoft.com/office/thememl/2012/main" xmlns="" name="Office Theme" id="{62F939B6-93AF-4DB8-9C6B-D6C7DFDC589F}" vid="{4A3C46E8-61CC-4603-A589-7422A47A8E4A}"/>
     </a:ext>
   </a:extLst>
 </a:theme>

</xml_diff>

<commit_message>
Se agrega Diapositivas relacionadas a los Riesgos y tecnologias utilizadas en el proyecto
</commit_message>
<xml_diff>
--- a/Presentaciones/Presentación VASPA - Diciembre 2020 - Examen Final/Presentación VASPA - Diciembre 2020 - Examen Final.pptx
+++ b/Presentaciones/Presentación VASPA - Diciembre 2020 - Examen Final/Presentación VASPA - Diciembre 2020 - Examen Final.pptx
@@ -5,7 +5,7 @@
     <p:sldMasterId id="2147483933" r:id="rId1"/>
   </p:sldMasterIdLst>
   <p:notesMasterIdLst>
-    <p:notesMasterId r:id="rId29"/>
+    <p:notesMasterId r:id="rId32"/>
   </p:notesMasterIdLst>
   <p:sldIdLst>
     <p:sldId id="267" r:id="rId2"/>
@@ -27,14 +27,17 @@
     <p:sldId id="378" r:id="rId18"/>
     <p:sldId id="379" r:id="rId19"/>
     <p:sldId id="380" r:id="rId20"/>
-    <p:sldId id="381" r:id="rId21"/>
-    <p:sldId id="387" r:id="rId22"/>
-    <p:sldId id="388" r:id="rId23"/>
-    <p:sldId id="391" r:id="rId24"/>
-    <p:sldId id="392" r:id="rId25"/>
-    <p:sldId id="389" r:id="rId26"/>
-    <p:sldId id="390" r:id="rId27"/>
-    <p:sldId id="275" r:id="rId28"/>
+    <p:sldId id="393" r:id="rId21"/>
+    <p:sldId id="394" r:id="rId22"/>
+    <p:sldId id="381" r:id="rId23"/>
+    <p:sldId id="387" r:id="rId24"/>
+    <p:sldId id="395" r:id="rId25"/>
+    <p:sldId id="388" r:id="rId26"/>
+    <p:sldId id="391" r:id="rId27"/>
+    <p:sldId id="392" r:id="rId28"/>
+    <p:sldId id="389" r:id="rId29"/>
+    <p:sldId id="390" r:id="rId30"/>
+    <p:sldId id="275" r:id="rId31"/>
   </p:sldIdLst>
   <p:sldSz cx="12192000" cy="6858000"/>
   <p:notesSz cx="6858000" cy="9144000"/>
@@ -135,7 +138,7 @@
   </p:defaultTextStyle>
   <p:extLst>
     <p:ext uri="{EFAFB233-063F-42B5-8137-9DF3F51BA10A}">
-      <p15:sldGuideLst xmlns:p15="http://schemas.microsoft.com/office/powerpoint/2012/main" xmlns="">
+      <p15:sldGuideLst xmlns:p15="http://schemas.microsoft.com/office/powerpoint/2012/main">
         <p15:guide id="1" orient="horz" pos="2160">
           <p15:clr>
             <a:srgbClr val="A4A3A4"/>
@@ -153,8 +156,18 @@
 </file>
 
 <file path=ppt/charts/chart1.xml><?xml version="1.0" encoding="utf-8"?>
-<c:chartSpace xmlns:c="http://schemas.openxmlformats.org/drawingml/2006/chart" xmlns:a="http://schemas.openxmlformats.org/drawingml/2006/main" xmlns:r="http://schemas.openxmlformats.org/officeDocument/2006/relationships">
-  <c:lang val="es-AR"/>
+<c:chartSpace xmlns:c="http://schemas.openxmlformats.org/drawingml/2006/chart" xmlns:a="http://schemas.openxmlformats.org/drawingml/2006/main" xmlns:r="http://schemas.openxmlformats.org/officeDocument/2006/relationships" xmlns:c16r2="http://schemas.microsoft.com/office/drawing/2015/06/chart">
+  <c:date1904 val="0"/>
+  <c:lang val="es-ES"/>
+  <c:roundedCorners val="0"/>
+  <mc:AlternateContent xmlns:mc="http://schemas.openxmlformats.org/markup-compatibility/2006">
+    <mc:Choice xmlns:c14="http://schemas.microsoft.com/office/drawing/2007/8/2/chart" Requires="c14">
+      <c14:style val="102"/>
+    </mc:Choice>
+    <mc:Fallback>
+      <c:style val="2"/>
+    </mc:Fallback>
+  </mc:AlternateContent>
   <c:chart>
     <c:title>
       <c:tx>
@@ -188,6 +201,7 @@
         </c:rich>
       </c:tx>
       <c:layout/>
+      <c:overlay val="0"/>
       <c:spPr>
         <a:noFill/>
         <a:ln>
@@ -196,10 +210,12 @@
         <a:effectLst/>
       </c:spPr>
     </c:title>
+    <c:autoTitleDeleted val="0"/>
     <c:plotArea>
       <c:layout/>
       <c:lineChart>
         <c:grouping val="standard"/>
+        <c:varyColors val="0"/>
         <c:ser>
           <c:idx val="0"/>
           <c:order val="0"/>
@@ -325,7 +341,8 @@
               </c:numCache>
             </c:numRef>
           </c:val>
-          <c:extLst xmlns:c16r2="http://schemas.microsoft.com/office/drawing/2015/06/chart">
+          <c:smooth val="0"/>
+          <c:extLst>
             <c:ext xmlns:c16="http://schemas.microsoft.com/office/drawing/2014/chart" uri="{C3380CC4-5D6E-409C-BE32-E72D297353CC}">
               <c16:uniqueId val="{00000000-38D4-4551-A2C0-6F470BC3E09B}"/>
             </c:ext>
@@ -455,14 +472,23 @@
               </c:numCache>
             </c:numRef>
           </c:val>
-          <c:extLst xmlns:c16r2="http://schemas.microsoft.com/office/drawing/2015/06/chart">
+          <c:smooth val="0"/>
+          <c:extLst>
             <c:ext xmlns:c16="http://schemas.microsoft.com/office/drawing/2014/chart" uri="{C3380CC4-5D6E-409C-BE32-E72D297353CC}">
               <c16:uniqueId val="{00000001-38D4-4551-A2C0-6F470BC3E09B}"/>
             </c:ext>
           </c:extLst>
         </c:ser>
-        <c:dLbls/>
+        <c:dLbls>
+          <c:showLegendKey val="0"/>
+          <c:showVal val="0"/>
+          <c:showCatName val="0"/>
+          <c:showSerName val="0"/>
+          <c:showPercent val="0"/>
+          <c:showBubbleSize val="0"/>
+        </c:dLbls>
         <c:marker val="1"/>
+        <c:smooth val="0"/>
         <c:axId val="74605696"/>
         <c:axId val="74607232"/>
       </c:lineChart>
@@ -471,9 +497,11 @@
         <c:scaling>
           <c:orientation val="minMax"/>
         </c:scaling>
+        <c:delete val="0"/>
         <c:axPos val="b"/>
         <c:numFmt formatCode="m/d/yyyy" sourceLinked="1"/>
         <c:majorTickMark val="none"/>
+        <c:minorTickMark val="none"/>
         <c:tickLblPos val="nextTo"/>
         <c:spPr>
           <a:noFill/>
@@ -519,6 +547,7 @@
         <c:scaling>
           <c:orientation val="minMax"/>
         </c:scaling>
+        <c:delete val="0"/>
         <c:axPos val="l"/>
         <c:majorGridlines>
           <c:spPr>
@@ -536,6 +565,7 @@
         </c:majorGridlines>
         <c:numFmt formatCode="General" sourceLinked="1"/>
         <c:majorTickMark val="none"/>
+        <c:minorTickMark val="none"/>
         <c:tickLblPos val="nextTo"/>
         <c:spPr>
           <a:noFill/>
@@ -579,6 +609,7 @@
     <c:legend>
       <c:legendPos val="b"/>
       <c:layout/>
+      <c:overlay val="0"/>
       <c:spPr>
         <a:noFill/>
         <a:ln>
@@ -609,7 +640,8 @@
     </c:legend>
     <c:plotVisOnly val="1"/>
     <c:dispBlanksAs val="gap"/>
-    <c:extLst xmlns:c16r2="http://schemas.microsoft.com/office/drawing/2015/06/chart">
+    <c:showDLblsOverMax val="0"/>
+    <c:extLst>
       <c:ext xmlns:c16r3="http://schemas.microsoft.com/office/drawing/2017/03/chart" uri="{56B9EC1D-385E-4148-901F-78D8002777C0}">
         <c16r3:dataDisplayOptions16>
           <c16r3:dispNaAsBlank val="1"/>
@@ -642,7 +674,9 @@
       <a:endParaRPr lang="es-AR"/>
     </a:p>
   </c:txPr>
-  <c:externalData r:id="rId1"/>
+  <c:externalData r:id="rId1">
+    <c:autoUpdate val="0"/>
+  </c:externalData>
   <c:userShapes r:id="rId2"/>
 </c:chartSpace>
 </file>
@@ -1655,15 +1689,15 @@
     </dgm:pt>
   </dgm:ptLst>
   <dgm:cxnLst>
-    <dgm:cxn modelId="{7D2F0A27-3D8B-4128-8CB3-A82F5F34B1DA}" type="presOf" srcId="{3B4EE390-B919-49DE-81BE-0780A08DDBFA}" destId="{AEA2C0A0-0FCA-4EB1-AA5B-89E50BC14E35}" srcOrd="0" destOrd="0" presId="urn:microsoft.com/office/officeart/2005/8/layout/chevron1"/>
     <dgm:cxn modelId="{5E7AA7A8-CA8D-46F6-8417-A9E8900910E7}" type="presOf" srcId="{07D852F8-DC80-412E-99FF-CBC8CF6E9E53}" destId="{BB3205ED-EB8F-4AA2-A69D-916A25FD317F}" srcOrd="0" destOrd="0" presId="urn:microsoft.com/office/officeart/2005/8/layout/chevron1"/>
+    <dgm:cxn modelId="{49728C46-9AF0-4404-B77C-0BF8753B1BE2}" srcId="{07D852F8-DC80-412E-99FF-CBC8CF6E9E53}" destId="{3B4EE390-B919-49DE-81BE-0780A08DDBFA}" srcOrd="2" destOrd="0" parTransId="{3B1FF57E-AA55-4079-B104-9BCA769CA707}" sibTransId="{50E5B106-8092-4055-AC3C-E16AB9A8A632}"/>
     <dgm:cxn modelId="{24BDC4C3-8E68-4ABC-A0DA-A0FE0C4BE3D4}" srcId="{07D852F8-DC80-412E-99FF-CBC8CF6E9E53}" destId="{3E85E467-C11E-426F-9200-FC251BE43DEA}" srcOrd="1" destOrd="0" parTransId="{83EB3A9D-25F1-42C7-AA54-1B46554184BF}" sibTransId="{431F7064-B371-4D30-9440-9276B420E393}"/>
     <dgm:cxn modelId="{C846122C-05FD-4C41-8444-CC3A300BDFFE}" srcId="{07D852F8-DC80-412E-99FF-CBC8CF6E9E53}" destId="{853FF75D-08FD-4C0B-97FF-B95C5121D1D7}" srcOrd="0" destOrd="0" parTransId="{BD4839AE-4C9F-4F18-92E9-4B1323829560}" sibTransId="{888E8F23-D971-4F49-AF2A-2D3F7847711C}"/>
-    <dgm:cxn modelId="{403E4FC9-6B5A-4E42-8B00-B4A63F0B56C0}" type="presOf" srcId="{3E85E467-C11E-426F-9200-FC251BE43DEA}" destId="{6886AB32-2506-433F-9563-157CC1EA1348}" srcOrd="0" destOrd="0" presId="urn:microsoft.com/office/officeart/2005/8/layout/chevron1"/>
-    <dgm:cxn modelId="{49728C46-9AF0-4404-B77C-0BF8753B1BE2}" srcId="{07D852F8-DC80-412E-99FF-CBC8CF6E9E53}" destId="{3B4EE390-B919-49DE-81BE-0780A08DDBFA}" srcOrd="2" destOrd="0" parTransId="{3B1FF57E-AA55-4079-B104-9BCA769CA707}" sibTransId="{50E5B106-8092-4055-AC3C-E16AB9A8A632}"/>
-    <dgm:cxn modelId="{D7B69E66-919E-4FAC-945E-964D8A3AC565}" type="presOf" srcId="{FE8D9DF2-8BC9-4E07-8005-D845C397B55E}" destId="{09B459DE-37E0-4270-82CB-D68CAF9A376E}" srcOrd="0" destOrd="0" presId="urn:microsoft.com/office/officeart/2005/8/layout/chevron1"/>
+    <dgm:cxn modelId="{7D2F0A27-3D8B-4128-8CB3-A82F5F34B1DA}" type="presOf" srcId="{3B4EE390-B919-49DE-81BE-0780A08DDBFA}" destId="{AEA2C0A0-0FCA-4EB1-AA5B-89E50BC14E35}" srcOrd="0" destOrd="0" presId="urn:microsoft.com/office/officeart/2005/8/layout/chevron1"/>
     <dgm:cxn modelId="{D76B3C6A-BC4F-4872-BB7B-7982459BAA86}" type="presOf" srcId="{853FF75D-08FD-4C0B-97FF-B95C5121D1D7}" destId="{3D5C674D-195F-4346-A602-68D809648B83}" srcOrd="0" destOrd="0" presId="urn:microsoft.com/office/officeart/2005/8/layout/chevron1"/>
     <dgm:cxn modelId="{61C2D7D0-DEE2-4010-B64E-4D1FEDBA0702}" srcId="{07D852F8-DC80-412E-99FF-CBC8CF6E9E53}" destId="{FE8D9DF2-8BC9-4E07-8005-D845C397B55E}" srcOrd="3" destOrd="0" parTransId="{5B8A1B7E-67AD-4057-819C-2245EC4F7AC4}" sibTransId="{5B54ED7F-A264-47E6-96E6-7D075AA7F363}"/>
+    <dgm:cxn modelId="{403E4FC9-6B5A-4E42-8B00-B4A63F0B56C0}" type="presOf" srcId="{3E85E467-C11E-426F-9200-FC251BE43DEA}" destId="{6886AB32-2506-433F-9563-157CC1EA1348}" srcOrd="0" destOrd="0" presId="urn:microsoft.com/office/officeart/2005/8/layout/chevron1"/>
+    <dgm:cxn modelId="{D7B69E66-919E-4FAC-945E-964D8A3AC565}" type="presOf" srcId="{FE8D9DF2-8BC9-4E07-8005-D845C397B55E}" destId="{09B459DE-37E0-4270-82CB-D68CAF9A376E}" srcOrd="0" destOrd="0" presId="urn:microsoft.com/office/officeart/2005/8/layout/chevron1"/>
     <dgm:cxn modelId="{2F515B5D-54B1-4237-891D-39EC55794076}" type="presParOf" srcId="{BB3205ED-EB8F-4AA2-A69D-916A25FD317F}" destId="{3D5C674D-195F-4346-A602-68D809648B83}" srcOrd="0" destOrd="0" presId="urn:microsoft.com/office/officeart/2005/8/layout/chevron1"/>
     <dgm:cxn modelId="{624BFC5C-F915-4A8E-B04A-57BF8C238C73}" type="presParOf" srcId="{BB3205ED-EB8F-4AA2-A69D-916A25FD317F}" destId="{4DCC4052-4221-44D0-84E2-29AAAD96FCB3}" srcOrd="1" destOrd="0" presId="urn:microsoft.com/office/officeart/2005/8/layout/chevron1"/>
     <dgm:cxn modelId="{6BB152CA-DFDB-44B7-9F2B-2AD9DCE38131}" type="presParOf" srcId="{BB3205ED-EB8F-4AA2-A69D-916A25FD317F}" destId="{6886AB32-2506-433F-9563-157CC1EA1348}" srcOrd="2" destOrd="0" presId="urn:microsoft.com/office/officeart/2005/8/layout/chevron1"/>
@@ -1676,14 +1710,14 @@
   <dgm:whole/>
   <dgm:extLst>
     <a:ext uri="http://schemas.microsoft.com/office/drawing/2008/diagram">
-      <dsp:dataModelExt xmlns:dsp="http://schemas.microsoft.com/office/drawing/2008/diagram" xmlns="" relId="rId6" minVer="http://schemas.openxmlformats.org/drawingml/2006/diagram"/>
+      <dsp:dataModelExt xmlns:dsp="http://schemas.microsoft.com/office/drawing/2008/diagram" relId="rId6" minVer="http://schemas.openxmlformats.org/drawingml/2006/diagram"/>
     </a:ext>
   </dgm:extLst>
 </dgm:dataModel>
 </file>
 
 <file path=ppt/diagrams/drawing1.xml><?xml version="1.0" encoding="utf-8"?>
-<dsp:drawing xmlns:dgm="http://schemas.openxmlformats.org/drawingml/2006/diagram" xmlns:a="http://schemas.openxmlformats.org/drawingml/2006/main" xmlns:dsp="http://schemas.microsoft.com/office/drawing/2008/diagram">
+<dsp:drawing xmlns:dgm="http://schemas.openxmlformats.org/drawingml/2006/diagram" xmlns:dsp="http://schemas.microsoft.com/office/drawing/2008/diagram" xmlns:a="http://schemas.openxmlformats.org/drawingml/2006/main">
   <dsp:spTree>
     <dsp:nvGrpSpPr>
       <dsp:cNvPr id="0" name=""/>
@@ -3335,7 +3369,7 @@
         <cdr:cNvPr id="2" name="CuadroTexto 2">
           <a:extLst xmlns:a="http://schemas.openxmlformats.org/drawingml/2006/main">
             <a:ext uri="{FF2B5EF4-FFF2-40B4-BE49-F238E27FC236}">
-              <a16:creationId xmlns:a16="http://schemas.microsoft.com/office/drawing/2014/main" xmlns="" id="{29B4C296-372F-455A-BE5A-B512322B8EDE}"/>
+              <a16:creationId xmlns:a16="http://schemas.microsoft.com/office/drawing/2014/main" id="{29B4C296-372F-455A-BE5A-B512322B8EDE}"/>
             </a:ext>
           </a:extLst>
         </cdr:cNvPr>
@@ -3715,7 +3749,7 @@
     </p:spTree>
     <p:extLst>
       <p:ext uri="{BB962C8B-B14F-4D97-AF65-F5344CB8AC3E}">
-        <p14:creationId xmlns:p14="http://schemas.microsoft.com/office/powerpoint/2010/main" xmlns="" val="1580866007"/>
+        <p14:creationId xmlns:p14="http://schemas.microsoft.com/office/powerpoint/2010/main" val="1580866007"/>
       </p:ext>
     </p:extLst>
   </p:cSld>
@@ -4377,7 +4411,7 @@
           <p:cNvPr id="8" name="Imagen 7">
             <a:extLst>
               <a:ext uri="{FF2B5EF4-FFF2-40B4-BE49-F238E27FC236}">
-                <a16:creationId xmlns:a16="http://schemas.microsoft.com/office/drawing/2014/main" xmlns="" id="{153E41C7-C0FB-4283-8821-79FB890C108B}"/>
+                <a16:creationId xmlns:a16="http://schemas.microsoft.com/office/drawing/2014/main" id="{153E41C7-C0FB-4283-8821-79FB890C108B}"/>
               </a:ext>
             </a:extLst>
           </p:cNvPr>
@@ -4390,7 +4424,7 @@
           <a:blip r:embed="rId2" cstate="print">
             <a:extLst>
               <a:ext uri="{28A0092B-C50C-407E-A947-70E740481C1C}">
-                <a14:useLocalDpi xmlns:a14="http://schemas.microsoft.com/office/drawing/2010/main" xmlns="" val="0"/>
+                <a14:useLocalDpi xmlns:a14="http://schemas.microsoft.com/office/drawing/2010/main" val="0"/>
               </a:ext>
             </a:extLst>
           </a:blip>
@@ -4411,7 +4445,7 @@
     </p:spTree>
     <p:extLst>
       <p:ext uri="{BB962C8B-B14F-4D97-AF65-F5344CB8AC3E}">
-        <p14:creationId xmlns:p14="http://schemas.microsoft.com/office/powerpoint/2010/main" xmlns="" val="594578851"/>
+        <p14:creationId xmlns:p14="http://schemas.microsoft.com/office/powerpoint/2010/main" val="594578851"/>
       </p:ext>
     </p:extLst>
   </p:cSld>
@@ -4704,7 +4738,7 @@
     </p:spTree>
     <p:extLst>
       <p:ext uri="{BB962C8B-B14F-4D97-AF65-F5344CB8AC3E}">
-        <p14:creationId xmlns:p14="http://schemas.microsoft.com/office/powerpoint/2010/main" xmlns="" val="2858870748"/>
+        <p14:creationId xmlns:p14="http://schemas.microsoft.com/office/powerpoint/2010/main" val="2858870748"/>
       </p:ext>
     </p:extLst>
   </p:cSld>
@@ -4954,7 +4988,7 @@
     </p:spTree>
     <p:extLst>
       <p:ext uri="{BB962C8B-B14F-4D97-AF65-F5344CB8AC3E}">
-        <p14:creationId xmlns:p14="http://schemas.microsoft.com/office/powerpoint/2010/main" xmlns="" val="2887001581"/>
+        <p14:creationId xmlns:p14="http://schemas.microsoft.com/office/powerpoint/2010/main" val="2887001581"/>
       </p:ext>
     </p:extLst>
   </p:cSld>
@@ -5496,7 +5530,7 @@
     </p:spTree>
     <p:extLst>
       <p:ext uri="{BB962C8B-B14F-4D97-AF65-F5344CB8AC3E}">
-        <p14:creationId xmlns:p14="http://schemas.microsoft.com/office/powerpoint/2010/main" xmlns="" val="953477666"/>
+        <p14:creationId xmlns:p14="http://schemas.microsoft.com/office/powerpoint/2010/main" val="953477666"/>
       </p:ext>
     </p:extLst>
   </p:cSld>
@@ -5746,7 +5780,7 @@
     </p:spTree>
     <p:extLst>
       <p:ext uri="{BB962C8B-B14F-4D97-AF65-F5344CB8AC3E}">
-        <p14:creationId xmlns:p14="http://schemas.microsoft.com/office/powerpoint/2010/main" xmlns="" val="2881036134"/>
+        <p14:creationId xmlns:p14="http://schemas.microsoft.com/office/powerpoint/2010/main" val="2881036134"/>
       </p:ext>
     </p:extLst>
   </p:cSld>
@@ -6280,7 +6314,7 @@
     </p:spTree>
     <p:extLst>
       <p:ext uri="{BB962C8B-B14F-4D97-AF65-F5344CB8AC3E}">
-        <p14:creationId xmlns:p14="http://schemas.microsoft.com/office/powerpoint/2010/main" xmlns="" val="3557333580"/>
+        <p14:creationId xmlns:p14="http://schemas.microsoft.com/office/powerpoint/2010/main" val="3557333580"/>
       </p:ext>
     </p:extLst>
   </p:cSld>
@@ -6579,7 +6613,7 @@
     </p:spTree>
     <p:extLst>
       <p:ext uri="{BB962C8B-B14F-4D97-AF65-F5344CB8AC3E}">
-        <p14:creationId xmlns:p14="http://schemas.microsoft.com/office/powerpoint/2010/main" xmlns="" val="2020671905"/>
+        <p14:creationId xmlns:p14="http://schemas.microsoft.com/office/powerpoint/2010/main" val="2020671905"/>
       </p:ext>
     </p:extLst>
   </p:cSld>
@@ -6755,7 +6789,7 @@
     </p:spTree>
     <p:extLst>
       <p:ext uri="{BB962C8B-B14F-4D97-AF65-F5344CB8AC3E}">
-        <p14:creationId xmlns:p14="http://schemas.microsoft.com/office/powerpoint/2010/main" xmlns="" val="3698065381"/>
+        <p14:creationId xmlns:p14="http://schemas.microsoft.com/office/powerpoint/2010/main" val="3698065381"/>
       </p:ext>
     </p:extLst>
   </p:cSld>
@@ -6937,7 +6971,7 @@
     </p:spTree>
     <p:extLst>
       <p:ext uri="{BB962C8B-B14F-4D97-AF65-F5344CB8AC3E}">
-        <p14:creationId xmlns:p14="http://schemas.microsoft.com/office/powerpoint/2010/main" xmlns="" val="2361575083"/>
+        <p14:creationId xmlns:p14="http://schemas.microsoft.com/office/powerpoint/2010/main" val="2361575083"/>
       </p:ext>
     </p:extLst>
   </p:cSld>
@@ -7122,7 +7156,7 @@
           <p:cNvPr id="8" name="Imagen 7">
             <a:extLst>
               <a:ext uri="{FF2B5EF4-FFF2-40B4-BE49-F238E27FC236}">
-                <a16:creationId xmlns:a16="http://schemas.microsoft.com/office/drawing/2014/main" xmlns="" id="{F65BAB47-52C5-4418-98C7-5ABDFBAB2220}"/>
+                <a16:creationId xmlns:a16="http://schemas.microsoft.com/office/drawing/2014/main" id="{F65BAB47-52C5-4418-98C7-5ABDFBAB2220}"/>
               </a:ext>
             </a:extLst>
           </p:cNvPr>
@@ -7135,7 +7169,7 @@
           <a:blip r:embed="rId2" cstate="print">
             <a:extLst>
               <a:ext uri="{28A0092B-C50C-407E-A947-70E740481C1C}">
-                <a14:useLocalDpi xmlns:a14="http://schemas.microsoft.com/office/drawing/2010/main" xmlns="" val="0"/>
+                <a14:useLocalDpi xmlns:a14="http://schemas.microsoft.com/office/drawing/2010/main" val="0"/>
               </a:ext>
             </a:extLst>
           </a:blip>
@@ -7156,7 +7190,7 @@
     </p:spTree>
     <p:extLst>
       <p:ext uri="{BB962C8B-B14F-4D97-AF65-F5344CB8AC3E}">
-        <p14:creationId xmlns:p14="http://schemas.microsoft.com/office/powerpoint/2010/main" xmlns="" val="3522170283"/>
+        <p14:creationId xmlns:p14="http://schemas.microsoft.com/office/powerpoint/2010/main" val="3522170283"/>
       </p:ext>
     </p:extLst>
   </p:cSld>
@@ -7404,7 +7438,7 @@
     </p:spTree>
     <p:extLst>
       <p:ext uri="{BB962C8B-B14F-4D97-AF65-F5344CB8AC3E}">
-        <p14:creationId xmlns:p14="http://schemas.microsoft.com/office/powerpoint/2010/main" xmlns="" val="2921707453"/>
+        <p14:creationId xmlns:p14="http://schemas.microsoft.com/office/powerpoint/2010/main" val="2921707453"/>
       </p:ext>
     </p:extLst>
   </p:cSld>
@@ -7703,7 +7737,7 @@
     </p:spTree>
     <p:extLst>
       <p:ext uri="{BB962C8B-B14F-4D97-AF65-F5344CB8AC3E}">
-        <p14:creationId xmlns:p14="http://schemas.microsoft.com/office/powerpoint/2010/main" xmlns="" val="1855319959"/>
+        <p14:creationId xmlns:p14="http://schemas.microsoft.com/office/powerpoint/2010/main" val="1855319959"/>
       </p:ext>
     </p:extLst>
   </p:cSld>
@@ -8147,7 +8181,7 @@
     </p:spTree>
     <p:extLst>
       <p:ext uri="{BB962C8B-B14F-4D97-AF65-F5344CB8AC3E}">
-        <p14:creationId xmlns:p14="http://schemas.microsoft.com/office/powerpoint/2010/main" xmlns="" val="522982594"/>
+        <p14:creationId xmlns:p14="http://schemas.microsoft.com/office/powerpoint/2010/main" val="522982594"/>
       </p:ext>
     </p:extLst>
   </p:cSld>
@@ -8267,7 +8301,7 @@
     </p:spTree>
     <p:extLst>
       <p:ext uri="{BB962C8B-B14F-4D97-AF65-F5344CB8AC3E}">
-        <p14:creationId xmlns:p14="http://schemas.microsoft.com/office/powerpoint/2010/main" xmlns="" val="3355991177"/>
+        <p14:creationId xmlns:p14="http://schemas.microsoft.com/office/powerpoint/2010/main" val="3355991177"/>
       </p:ext>
     </p:extLst>
   </p:cSld>
@@ -8364,7 +8398,7 @@
     </p:spTree>
     <p:extLst>
       <p:ext uri="{BB962C8B-B14F-4D97-AF65-F5344CB8AC3E}">
-        <p14:creationId xmlns:p14="http://schemas.microsoft.com/office/powerpoint/2010/main" xmlns="" val="2067178301"/>
+        <p14:creationId xmlns:p14="http://schemas.microsoft.com/office/powerpoint/2010/main" val="2067178301"/>
       </p:ext>
     </p:extLst>
   </p:cSld>
@@ -8649,7 +8683,7 @@
     </p:spTree>
     <p:extLst>
       <p:ext uri="{BB962C8B-B14F-4D97-AF65-F5344CB8AC3E}">
-        <p14:creationId xmlns:p14="http://schemas.microsoft.com/office/powerpoint/2010/main" xmlns="" val="1822716033"/>
+        <p14:creationId xmlns:p14="http://schemas.microsoft.com/office/powerpoint/2010/main" val="1822716033"/>
       </p:ext>
     </p:extLst>
   </p:cSld>
@@ -8942,7 +8976,7 @@
     </p:spTree>
     <p:extLst>
       <p:ext uri="{BB962C8B-B14F-4D97-AF65-F5344CB8AC3E}">
-        <p14:creationId xmlns:p14="http://schemas.microsoft.com/office/powerpoint/2010/main" xmlns="" val="2752311715"/>
+        <p14:creationId xmlns:p14="http://schemas.microsoft.com/office/powerpoint/2010/main" val="2752311715"/>
       </p:ext>
     </p:extLst>
   </p:cSld>
@@ -9510,7 +9544,7 @@
     </p:spTree>
     <p:extLst>
       <p:ext uri="{BB962C8B-B14F-4D97-AF65-F5344CB8AC3E}">
-        <p14:creationId xmlns:p14="http://schemas.microsoft.com/office/powerpoint/2010/main" xmlns="" val="761644953"/>
+        <p14:creationId xmlns:p14="http://schemas.microsoft.com/office/powerpoint/2010/main" val="761644953"/>
       </p:ext>
     </p:extLst>
   </p:cSld>
@@ -9959,7 +9993,7 @@
           <p:cNvPr id="2" name="Título 1">
             <a:extLst>
               <a:ext uri="{FF2B5EF4-FFF2-40B4-BE49-F238E27FC236}">
-                <a16:creationId xmlns:a16="http://schemas.microsoft.com/office/drawing/2014/main" xmlns="" id="{8CE1749D-25BE-4B8A-9C39-0568C1DB7176}"/>
+                <a16:creationId xmlns:a16="http://schemas.microsoft.com/office/drawing/2014/main" id="{8CE1749D-25BE-4B8A-9C39-0568C1DB7176}"/>
               </a:ext>
             </a:extLst>
           </p:cNvPr>
@@ -9994,7 +10028,7 @@
           <p:cNvPr id="5" name="Subtítulo 2">
             <a:extLst>
               <a:ext uri="{FF2B5EF4-FFF2-40B4-BE49-F238E27FC236}">
-                <a16:creationId xmlns:a16="http://schemas.microsoft.com/office/drawing/2014/main" xmlns="" id="{77C0998F-42B9-4F94-A4C5-FB800997D545}"/>
+                <a16:creationId xmlns:a16="http://schemas.microsoft.com/office/drawing/2014/main" id="{77C0998F-42B9-4F94-A4C5-FB800997D545}"/>
               </a:ext>
             </a:extLst>
           </p:cNvPr>
@@ -10031,7 +10065,7 @@
           <p:cNvPr id="3" name="CuadroTexto 2">
             <a:extLst>
               <a:ext uri="{FF2B5EF4-FFF2-40B4-BE49-F238E27FC236}">
-                <a16:creationId xmlns:a16="http://schemas.microsoft.com/office/drawing/2014/main" xmlns="" id="{EC53297C-9824-45B9-8927-A6834EB1DBD1}"/>
+                <a16:creationId xmlns:a16="http://schemas.microsoft.com/office/drawing/2014/main" id="{EC53297C-9824-45B9-8927-A6834EB1DBD1}"/>
               </a:ext>
             </a:extLst>
           </p:cNvPr>
@@ -10104,7 +10138,7 @@
           <p:cNvPr id="6" name="Imagen 5">
             <a:extLst>
               <a:ext uri="{FF2B5EF4-FFF2-40B4-BE49-F238E27FC236}">
-                <a16:creationId xmlns:a16="http://schemas.microsoft.com/office/drawing/2014/main" xmlns="" id="{765DC11C-9D6D-4F31-9AC7-1EFE6E6D455C}"/>
+                <a16:creationId xmlns:a16="http://schemas.microsoft.com/office/drawing/2014/main" id="{765DC11C-9D6D-4F31-9AC7-1EFE6E6D455C}"/>
               </a:ext>
             </a:extLst>
           </p:cNvPr>
@@ -10117,7 +10151,7 @@
           <a:blip r:embed="rId2" cstate="print">
             <a:extLst>
               <a:ext uri="{28A0092B-C50C-407E-A947-70E740481C1C}">
-                <a14:useLocalDpi xmlns:a14="http://schemas.microsoft.com/office/drawing/2010/main" xmlns="" val="0"/>
+                <a14:useLocalDpi xmlns:a14="http://schemas.microsoft.com/office/drawing/2010/main" val="0"/>
               </a:ext>
             </a:extLst>
           </a:blip>
@@ -10138,7 +10172,7 @@
     </p:spTree>
     <p:extLst>
       <p:ext uri="{BB962C8B-B14F-4D97-AF65-F5344CB8AC3E}">
-        <p14:creationId xmlns:p14="http://schemas.microsoft.com/office/powerpoint/2010/main" xmlns="" val="2967959437"/>
+        <p14:creationId xmlns:p14="http://schemas.microsoft.com/office/powerpoint/2010/main" val="2967959437"/>
       </p:ext>
     </p:extLst>
   </p:cSld>
@@ -10170,7 +10204,7 @@
           <p:cNvPr id="2" name="Título 1">
             <a:extLst>
               <a:ext uri="{FF2B5EF4-FFF2-40B4-BE49-F238E27FC236}">
-                <a16:creationId xmlns:a16="http://schemas.microsoft.com/office/drawing/2014/main" xmlns="" id="{0ED6D180-92C1-4333-BA91-2BBA4DD94A3B}"/>
+                <a16:creationId xmlns:a16="http://schemas.microsoft.com/office/drawing/2014/main" id="{0ED6D180-92C1-4333-BA91-2BBA4DD94A3B}"/>
               </a:ext>
             </a:extLst>
           </p:cNvPr>
@@ -10207,7 +10241,7 @@
           <p:cNvPr id="13" name="Imagen 12">
             <a:extLst>
               <a:ext uri="{FF2B5EF4-FFF2-40B4-BE49-F238E27FC236}">
-                <a16:creationId xmlns:a16="http://schemas.microsoft.com/office/drawing/2014/main" xmlns="" id="{FCC26050-5F59-41A3-BF4B-7F8AD9F429BD}"/>
+                <a16:creationId xmlns:a16="http://schemas.microsoft.com/office/drawing/2014/main" id="{FCC26050-5F59-41A3-BF4B-7F8AD9F429BD}"/>
               </a:ext>
             </a:extLst>
           </p:cNvPr>
@@ -10220,7 +10254,7 @@
           <a:blip r:embed="rId2" cstate="print">
             <a:extLst>
               <a:ext uri="{28A0092B-C50C-407E-A947-70E740481C1C}">
-                <a14:useLocalDpi xmlns:a14="http://schemas.microsoft.com/office/drawing/2010/main" xmlns="" val="0"/>
+                <a14:useLocalDpi xmlns:a14="http://schemas.microsoft.com/office/drawing/2010/main" val="0"/>
               </a:ext>
             </a:extLst>
           </a:blip>
@@ -10240,7 +10274,7 @@
     </p:spTree>
     <p:extLst>
       <p:ext uri="{BB962C8B-B14F-4D97-AF65-F5344CB8AC3E}">
-        <p14:creationId xmlns:p14="http://schemas.microsoft.com/office/powerpoint/2010/main" xmlns="" val="78293021"/>
+        <p14:creationId xmlns:p14="http://schemas.microsoft.com/office/powerpoint/2010/main" val="78293021"/>
       </p:ext>
     </p:extLst>
   </p:cSld>
@@ -10272,7 +10306,7 @@
           <p:cNvPr id="4" name="Rectángulo 3">
             <a:extLst>
               <a:ext uri="{FF2B5EF4-FFF2-40B4-BE49-F238E27FC236}">
-                <a16:creationId xmlns:a16="http://schemas.microsoft.com/office/drawing/2014/main" xmlns="" id="{B0F1B4F4-0C7A-4C0E-8584-95718BC545EC}"/>
+                <a16:creationId xmlns:a16="http://schemas.microsoft.com/office/drawing/2014/main" id="{B0F1B4F4-0C7A-4C0E-8584-95718BC545EC}"/>
               </a:ext>
             </a:extLst>
           </p:cNvPr>
@@ -10331,7 +10365,7 @@
     </p:spTree>
     <p:extLst>
       <p:ext uri="{BB962C8B-B14F-4D97-AF65-F5344CB8AC3E}">
-        <p14:creationId xmlns:p14="http://schemas.microsoft.com/office/powerpoint/2010/main" xmlns="" val="1715947005"/>
+        <p14:creationId xmlns:p14="http://schemas.microsoft.com/office/powerpoint/2010/main" val="1715947005"/>
       </p:ext>
     </p:extLst>
   </p:cSld>
@@ -10363,7 +10397,7 @@
           <p:cNvPr id="2" name="Título 1">
             <a:extLst>
               <a:ext uri="{FF2B5EF4-FFF2-40B4-BE49-F238E27FC236}">
-                <a16:creationId xmlns:a16="http://schemas.microsoft.com/office/drawing/2014/main" xmlns="" id="{0ED6D180-92C1-4333-BA91-2BBA4DD94A3B}"/>
+                <a16:creationId xmlns:a16="http://schemas.microsoft.com/office/drawing/2014/main" id="{0ED6D180-92C1-4333-BA91-2BBA4DD94A3B}"/>
               </a:ext>
             </a:extLst>
           </p:cNvPr>
@@ -10400,7 +10434,7 @@
           <p:cNvPr id="5" name="Diagrama 4">
             <a:extLst>
               <a:ext uri="{FF2B5EF4-FFF2-40B4-BE49-F238E27FC236}">
-                <a16:creationId xmlns:a16="http://schemas.microsoft.com/office/drawing/2014/main" xmlns="" id="{D29B3E67-509D-445E-9F92-4DFCE92BD789}"/>
+                <a16:creationId xmlns:a16="http://schemas.microsoft.com/office/drawing/2014/main" id="{D29B3E67-509D-445E-9F92-4DFCE92BD789}"/>
               </a:ext>
             </a:extLst>
           </p:cNvPr>
@@ -10408,7 +10442,7 @@
           <p:nvPr>
             <p:extLst>
               <p:ext uri="{D42A27DB-BD31-4B8C-83A1-F6EECF244321}">
-                <p14:modId xmlns:p14="http://schemas.microsoft.com/office/powerpoint/2010/main" xmlns="" val="573577508"/>
+                <p14:modId xmlns:p14="http://schemas.microsoft.com/office/powerpoint/2010/main" val="573577508"/>
               </p:ext>
             </p:extLst>
           </p:nvPr>
@@ -10428,7 +10462,7 @@
           <p:cNvPr id="7" name="CuadroTexto 6">
             <a:extLst>
               <a:ext uri="{FF2B5EF4-FFF2-40B4-BE49-F238E27FC236}">
-                <a16:creationId xmlns:a16="http://schemas.microsoft.com/office/drawing/2014/main" xmlns="" id="{EFF07B65-0D67-434E-9DAD-C6F8000B23BA}"/>
+                <a16:creationId xmlns:a16="http://schemas.microsoft.com/office/drawing/2014/main" id="{EFF07B65-0D67-434E-9DAD-C6F8000B23BA}"/>
               </a:ext>
             </a:extLst>
           </p:cNvPr>
@@ -10520,7 +10554,7 @@
           <p:cNvPr id="9" name="CuadroTexto 8">
             <a:extLst>
               <a:ext uri="{FF2B5EF4-FFF2-40B4-BE49-F238E27FC236}">
-                <a16:creationId xmlns:a16="http://schemas.microsoft.com/office/drawing/2014/main" xmlns="" id="{97CF3F33-5EF6-48E7-9958-F9C2744489F1}"/>
+                <a16:creationId xmlns:a16="http://schemas.microsoft.com/office/drawing/2014/main" id="{97CF3F33-5EF6-48E7-9958-F9C2744489F1}"/>
               </a:ext>
             </a:extLst>
           </p:cNvPr>
@@ -10563,7 +10597,7 @@
           <p:cNvPr id="11" name="CuadroTexto 10">
             <a:extLst>
               <a:ext uri="{FF2B5EF4-FFF2-40B4-BE49-F238E27FC236}">
-                <a16:creationId xmlns:a16="http://schemas.microsoft.com/office/drawing/2014/main" xmlns="" id="{CFB755FD-7818-4BD2-8DEB-A53F85894D7B}"/>
+                <a16:creationId xmlns:a16="http://schemas.microsoft.com/office/drawing/2014/main" id="{CFB755FD-7818-4BD2-8DEB-A53F85894D7B}"/>
               </a:ext>
             </a:extLst>
           </p:cNvPr>
@@ -10615,7 +10649,7 @@
           <p:cNvPr id="13" name="CuadroTexto 12">
             <a:extLst>
               <a:ext uri="{FF2B5EF4-FFF2-40B4-BE49-F238E27FC236}">
-                <a16:creationId xmlns:a16="http://schemas.microsoft.com/office/drawing/2014/main" xmlns="" id="{1DC2E036-AC7A-450A-BDD4-9A2A0F769C65}"/>
+                <a16:creationId xmlns:a16="http://schemas.microsoft.com/office/drawing/2014/main" id="{1DC2E036-AC7A-450A-BDD4-9A2A0F769C65}"/>
               </a:ext>
             </a:extLst>
           </p:cNvPr>
@@ -10658,7 +10692,7 @@
           <p:cNvPr id="15" name="CuadroTexto 14">
             <a:extLst>
               <a:ext uri="{FF2B5EF4-FFF2-40B4-BE49-F238E27FC236}">
-                <a16:creationId xmlns:a16="http://schemas.microsoft.com/office/drawing/2014/main" xmlns="" id="{6ECB2B3E-252C-4E7C-8FB7-1815D6E1E0A0}"/>
+                <a16:creationId xmlns:a16="http://schemas.microsoft.com/office/drawing/2014/main" id="{6ECB2B3E-252C-4E7C-8FB7-1815D6E1E0A0}"/>
               </a:ext>
             </a:extLst>
           </p:cNvPr>
@@ -10699,7 +10733,7 @@
     </p:spTree>
     <p:extLst>
       <p:ext uri="{BB962C8B-B14F-4D97-AF65-F5344CB8AC3E}">
-        <p14:creationId xmlns:p14="http://schemas.microsoft.com/office/powerpoint/2010/main" xmlns="" val="2198404308"/>
+        <p14:creationId xmlns:p14="http://schemas.microsoft.com/office/powerpoint/2010/main" val="2198404308"/>
       </p:ext>
     </p:extLst>
   </p:cSld>
@@ -10731,7 +10765,7 @@
           <p:cNvPr id="2" name="Título 1">
             <a:extLst>
               <a:ext uri="{FF2B5EF4-FFF2-40B4-BE49-F238E27FC236}">
-                <a16:creationId xmlns:a16="http://schemas.microsoft.com/office/drawing/2014/main" xmlns="" id="{0ED6D180-92C1-4333-BA91-2BBA4DD94A3B}"/>
+                <a16:creationId xmlns:a16="http://schemas.microsoft.com/office/drawing/2014/main" id="{0ED6D180-92C1-4333-BA91-2BBA4DD94A3B}"/>
               </a:ext>
             </a:extLst>
           </p:cNvPr>
@@ -10768,7 +10802,7 @@
           <p:cNvPr id="6" name="CuadroTexto 5">
             <a:extLst>
               <a:ext uri="{FF2B5EF4-FFF2-40B4-BE49-F238E27FC236}">
-                <a16:creationId xmlns:a16="http://schemas.microsoft.com/office/drawing/2014/main" xmlns="" id="{BC8D092D-6667-447D-B473-A50467138064}"/>
+                <a16:creationId xmlns:a16="http://schemas.microsoft.com/office/drawing/2014/main" id="{BC8D092D-6667-447D-B473-A50467138064}"/>
               </a:ext>
             </a:extLst>
           </p:cNvPr>
@@ -10813,7 +10847,7 @@
     </p:spTree>
     <p:extLst>
       <p:ext uri="{BB962C8B-B14F-4D97-AF65-F5344CB8AC3E}">
-        <p14:creationId xmlns:p14="http://schemas.microsoft.com/office/powerpoint/2010/main" xmlns="" val="435960141"/>
+        <p14:creationId xmlns:p14="http://schemas.microsoft.com/office/powerpoint/2010/main" val="435960141"/>
       </p:ext>
     </p:extLst>
   </p:cSld>
@@ -10845,7 +10879,7 @@
           <p:cNvPr id="2" name="Título 1">
             <a:extLst>
               <a:ext uri="{FF2B5EF4-FFF2-40B4-BE49-F238E27FC236}">
-                <a16:creationId xmlns:a16="http://schemas.microsoft.com/office/drawing/2014/main" xmlns="" id="{0ED6D180-92C1-4333-BA91-2BBA4DD94A3B}"/>
+                <a16:creationId xmlns:a16="http://schemas.microsoft.com/office/drawing/2014/main" id="{0ED6D180-92C1-4333-BA91-2BBA4DD94A3B}"/>
               </a:ext>
             </a:extLst>
           </p:cNvPr>
@@ -10882,7 +10916,7 @@
           <p:cNvPr id="6" name="CuadroTexto 5">
             <a:extLst>
               <a:ext uri="{FF2B5EF4-FFF2-40B4-BE49-F238E27FC236}">
-                <a16:creationId xmlns:a16="http://schemas.microsoft.com/office/drawing/2014/main" xmlns="" id="{BC8D092D-6667-447D-B473-A50467138064}"/>
+                <a16:creationId xmlns:a16="http://schemas.microsoft.com/office/drawing/2014/main" id="{BC8D092D-6667-447D-B473-A50467138064}"/>
               </a:ext>
             </a:extLst>
           </p:cNvPr>
@@ -10927,7 +10961,7 @@
     </p:spTree>
     <p:extLst>
       <p:ext uri="{BB962C8B-B14F-4D97-AF65-F5344CB8AC3E}">
-        <p14:creationId xmlns:p14="http://schemas.microsoft.com/office/powerpoint/2010/main" xmlns="" val="1725776676"/>
+        <p14:creationId xmlns:p14="http://schemas.microsoft.com/office/powerpoint/2010/main" val="1725776676"/>
       </p:ext>
     </p:extLst>
   </p:cSld>
@@ -10959,7 +10993,7 @@
           <p:cNvPr id="2" name="Título 1">
             <a:extLst>
               <a:ext uri="{FF2B5EF4-FFF2-40B4-BE49-F238E27FC236}">
-                <a16:creationId xmlns:a16="http://schemas.microsoft.com/office/drawing/2014/main" xmlns="" id="{0ED6D180-92C1-4333-BA91-2BBA4DD94A3B}"/>
+                <a16:creationId xmlns:a16="http://schemas.microsoft.com/office/drawing/2014/main" id="{0ED6D180-92C1-4333-BA91-2BBA4DD94A3B}"/>
               </a:ext>
             </a:extLst>
           </p:cNvPr>
@@ -10996,7 +11030,7 @@
           <p:cNvPr id="6" name="CuadroTexto 5">
             <a:extLst>
               <a:ext uri="{FF2B5EF4-FFF2-40B4-BE49-F238E27FC236}">
-                <a16:creationId xmlns:a16="http://schemas.microsoft.com/office/drawing/2014/main" xmlns="" id="{BC8D092D-6667-447D-B473-A50467138064}"/>
+                <a16:creationId xmlns:a16="http://schemas.microsoft.com/office/drawing/2014/main" id="{BC8D092D-6667-447D-B473-A50467138064}"/>
               </a:ext>
             </a:extLst>
           </p:cNvPr>
@@ -11041,7 +11075,7 @@
     </p:spTree>
     <p:extLst>
       <p:ext uri="{BB962C8B-B14F-4D97-AF65-F5344CB8AC3E}">
-        <p14:creationId xmlns:p14="http://schemas.microsoft.com/office/powerpoint/2010/main" xmlns="" val="1240761595"/>
+        <p14:creationId xmlns:p14="http://schemas.microsoft.com/office/powerpoint/2010/main" val="1240761595"/>
       </p:ext>
     </p:extLst>
   </p:cSld>
@@ -11073,7 +11107,7 @@
           <p:cNvPr id="2" name="Título 1">
             <a:extLst>
               <a:ext uri="{FF2B5EF4-FFF2-40B4-BE49-F238E27FC236}">
-                <a16:creationId xmlns:a16="http://schemas.microsoft.com/office/drawing/2014/main" xmlns="" id="{0ED6D180-92C1-4333-BA91-2BBA4DD94A3B}"/>
+                <a16:creationId xmlns:a16="http://schemas.microsoft.com/office/drawing/2014/main" id="{0ED6D180-92C1-4333-BA91-2BBA4DD94A3B}"/>
               </a:ext>
             </a:extLst>
           </p:cNvPr>
@@ -11110,7 +11144,7 @@
           <p:cNvPr id="6" name="CuadroTexto 5">
             <a:extLst>
               <a:ext uri="{FF2B5EF4-FFF2-40B4-BE49-F238E27FC236}">
-                <a16:creationId xmlns:a16="http://schemas.microsoft.com/office/drawing/2014/main" xmlns="" id="{BC8D092D-6667-447D-B473-A50467138064}"/>
+                <a16:creationId xmlns:a16="http://schemas.microsoft.com/office/drawing/2014/main" id="{BC8D092D-6667-447D-B473-A50467138064}"/>
               </a:ext>
             </a:extLst>
           </p:cNvPr>
@@ -11155,7 +11189,7 @@
     </p:spTree>
     <p:extLst>
       <p:ext uri="{BB962C8B-B14F-4D97-AF65-F5344CB8AC3E}">
-        <p14:creationId xmlns:p14="http://schemas.microsoft.com/office/powerpoint/2010/main" xmlns="" val="3434906999"/>
+        <p14:creationId xmlns:p14="http://schemas.microsoft.com/office/powerpoint/2010/main" val="3434906999"/>
       </p:ext>
     </p:extLst>
   </p:cSld>
@@ -11187,7 +11221,7 @@
           <p:cNvPr id="4" name="Rectángulo 3">
             <a:extLst>
               <a:ext uri="{FF2B5EF4-FFF2-40B4-BE49-F238E27FC236}">
-                <a16:creationId xmlns:a16="http://schemas.microsoft.com/office/drawing/2014/main" xmlns="" id="{B0F1B4F4-0C7A-4C0E-8584-95718BC545EC}"/>
+                <a16:creationId xmlns:a16="http://schemas.microsoft.com/office/drawing/2014/main" id="{B0F1B4F4-0C7A-4C0E-8584-95718BC545EC}"/>
               </a:ext>
             </a:extLst>
           </p:cNvPr>
@@ -11246,7 +11280,7 @@
     </p:spTree>
     <p:extLst>
       <p:ext uri="{BB962C8B-B14F-4D97-AF65-F5344CB8AC3E}">
-        <p14:creationId xmlns:p14="http://schemas.microsoft.com/office/powerpoint/2010/main" xmlns="" val="3874587205"/>
+        <p14:creationId xmlns:p14="http://schemas.microsoft.com/office/powerpoint/2010/main" val="3874587205"/>
       </p:ext>
     </p:extLst>
   </p:cSld>
@@ -11278,7 +11312,7 @@
           <p:cNvPr id="2" name="Título 1">
             <a:extLst>
               <a:ext uri="{FF2B5EF4-FFF2-40B4-BE49-F238E27FC236}">
-                <a16:creationId xmlns:a16="http://schemas.microsoft.com/office/drawing/2014/main" xmlns="" id="{0ED6D180-92C1-4333-BA91-2BBA4DD94A3B}"/>
+                <a16:creationId xmlns:a16="http://schemas.microsoft.com/office/drawing/2014/main" id="{0ED6D180-92C1-4333-BA91-2BBA4DD94A3B}"/>
               </a:ext>
             </a:extLst>
           </p:cNvPr>
@@ -11315,7 +11349,7 @@
           <p:cNvPr id="4" name="Gráfico 3">
             <a:extLst>
               <a:ext uri="{FF2B5EF4-FFF2-40B4-BE49-F238E27FC236}">
-                <a16:creationId xmlns:a16="http://schemas.microsoft.com/office/drawing/2014/main" xmlns="" id="{AEDE60AA-37AA-4383-BA26-5EA432BE4F35}"/>
+                <a16:creationId xmlns:a16="http://schemas.microsoft.com/office/drawing/2014/main" id="{AEDE60AA-37AA-4383-BA26-5EA432BE4F35}"/>
               </a:ext>
             </a:extLst>
           </p:cNvPr>
@@ -11323,7 +11357,7 @@
           <p:nvPr>
             <p:extLst>
               <p:ext uri="{D42A27DB-BD31-4B8C-83A1-F6EECF244321}">
-                <p14:modId xmlns:p14="http://schemas.microsoft.com/office/powerpoint/2010/main" xmlns="" val="993474529"/>
+                <p14:modId xmlns:p14="http://schemas.microsoft.com/office/powerpoint/2010/main" val="993474529"/>
               </p:ext>
             </p:extLst>
           </p:nvPr>
@@ -11343,7 +11377,7 @@
           <p:cNvPr id="3" name="CuadroTexto 2">
             <a:extLst>
               <a:ext uri="{FF2B5EF4-FFF2-40B4-BE49-F238E27FC236}">
-                <a16:creationId xmlns:a16="http://schemas.microsoft.com/office/drawing/2014/main" xmlns="" id="{29B4C296-372F-455A-BE5A-B512322B8EDE}"/>
+                <a16:creationId xmlns:a16="http://schemas.microsoft.com/office/drawing/2014/main" id="{29B4C296-372F-455A-BE5A-B512322B8EDE}"/>
               </a:ext>
             </a:extLst>
           </p:cNvPr>
@@ -11377,13 +11411,20 @@
     </p:spTree>
     <p:extLst>
       <p:ext uri="{BB962C8B-B14F-4D97-AF65-F5344CB8AC3E}">
-        <p14:creationId xmlns:p14="http://schemas.microsoft.com/office/powerpoint/2010/main" xmlns="" val="3883774572"/>
+        <p14:creationId xmlns:p14="http://schemas.microsoft.com/office/powerpoint/2010/main" val="3883774572"/>
       </p:ext>
     </p:extLst>
   </p:cSld>
   <p:clrMapOvr>
     <a:masterClrMapping/>
   </p:clrMapOvr>
+  <p:timing>
+    <p:tnLst>
+      <p:par>
+        <p:cTn id="1" dur="indefinite" restart="never" nodeType="tmRoot"/>
+      </p:par>
+    </p:tnLst>
+  </p:timing>
 </p:sld>
 </file>
 
@@ -11409,7 +11450,7 @@
           <p:cNvPr id="2" name="Título 1">
             <a:extLst>
               <a:ext uri="{FF2B5EF4-FFF2-40B4-BE49-F238E27FC236}">
-                <a16:creationId xmlns:a16="http://schemas.microsoft.com/office/drawing/2014/main" xmlns="" id="{0ED6D180-92C1-4333-BA91-2BBA4DD94A3B}"/>
+                <a16:creationId xmlns:a16="http://schemas.microsoft.com/office/drawing/2014/main" id="{0ED6D180-92C1-4333-BA91-2BBA4DD94A3B}"/>
               </a:ext>
             </a:extLst>
           </p:cNvPr>
@@ -11441,16 +11482,47 @@
           </a:p>
         </p:txBody>
       </p:sp>
+      <p:pic>
+        <p:nvPicPr>
+          <p:cNvPr id="4" name="Imagen 3"/>
+          <p:cNvPicPr>
+            <a:picLocks noChangeAspect="1"/>
+          </p:cNvPicPr>
+          <p:nvPr/>
+        </p:nvPicPr>
+        <p:blipFill>
+          <a:blip r:embed="rId2"/>
+          <a:stretch>
+            <a:fillRect/>
+          </a:stretch>
+        </p:blipFill>
+        <p:spPr>
+          <a:xfrm>
+            <a:off x="1270000" y="503884"/>
+            <a:ext cx="10302864" cy="5841498"/>
+          </a:xfrm>
+          <a:prstGeom prst="rect">
+            <a:avLst/>
+          </a:prstGeom>
+        </p:spPr>
+      </p:pic>
     </p:spTree>
     <p:extLst>
       <p:ext uri="{BB962C8B-B14F-4D97-AF65-F5344CB8AC3E}">
-        <p14:creationId xmlns:p14="http://schemas.microsoft.com/office/powerpoint/2010/main" xmlns="" val="2470537140"/>
+        <p14:creationId xmlns:p14="http://schemas.microsoft.com/office/powerpoint/2010/main" val="2470537140"/>
       </p:ext>
     </p:extLst>
   </p:cSld>
   <p:clrMapOvr>
     <a:masterClrMapping/>
   </p:clrMapOvr>
+  <p:timing>
+    <p:tnLst>
+      <p:par>
+        <p:cTn id="1" dur="indefinite" restart="never" nodeType="tmRoot"/>
+      </p:par>
+    </p:tnLst>
+  </p:timing>
 </p:sld>
 </file>
 
@@ -11476,7 +11548,7 @@
           <p:cNvPr id="2" name="Título 1">
             <a:extLst>
               <a:ext uri="{FF2B5EF4-FFF2-40B4-BE49-F238E27FC236}">
-                <a16:creationId xmlns:a16="http://schemas.microsoft.com/office/drawing/2014/main" xmlns="" id="{A08BF852-5F19-46F2-83FE-6528AEC95981}"/>
+                <a16:creationId xmlns:a16="http://schemas.microsoft.com/office/drawing/2014/main" id="{A08BF852-5F19-46F2-83FE-6528AEC95981}"/>
               </a:ext>
             </a:extLst>
           </p:cNvPr>
@@ -11512,7 +11584,7 @@
           <p:cNvPr id="3" name="Marcador de contenido 2">
             <a:extLst>
               <a:ext uri="{FF2B5EF4-FFF2-40B4-BE49-F238E27FC236}">
-                <a16:creationId xmlns:a16="http://schemas.microsoft.com/office/drawing/2014/main" xmlns="" id="{4825B7B8-2642-4E50-9E0D-E85148EB6652}"/>
+                <a16:creationId xmlns:a16="http://schemas.microsoft.com/office/drawing/2014/main" id="{4825B7B8-2642-4E50-9E0D-E85148EB6652}"/>
               </a:ext>
             </a:extLst>
           </p:cNvPr>
@@ -11611,7 +11683,7 @@
     </p:spTree>
     <p:extLst>
       <p:ext uri="{BB962C8B-B14F-4D97-AF65-F5344CB8AC3E}">
-        <p14:creationId xmlns:p14="http://schemas.microsoft.com/office/powerpoint/2010/main" xmlns="" val="493199861"/>
+        <p14:creationId xmlns:p14="http://schemas.microsoft.com/office/powerpoint/2010/main" val="493199861"/>
       </p:ext>
     </p:extLst>
   </p:cSld>
@@ -11643,7 +11715,203 @@
           <p:cNvPr id="2" name="Título 1">
             <a:extLst>
               <a:ext uri="{FF2B5EF4-FFF2-40B4-BE49-F238E27FC236}">
-                <a16:creationId xmlns:a16="http://schemas.microsoft.com/office/drawing/2014/main" xmlns="" id="{0ED6D180-92C1-4333-BA91-2BBA4DD94A3B}"/>
+                <a16:creationId xmlns:a16="http://schemas.microsoft.com/office/drawing/2014/main" id="{0ED6D180-92C1-4333-BA91-2BBA4DD94A3B}"/>
+              </a:ext>
+            </a:extLst>
+          </p:cNvPr>
+          <p:cNvSpPr>
+            <a:spLocks noGrp="1"/>
+          </p:cNvSpPr>
+          <p:nvPr>
+            <p:ph type="title"/>
+          </p:nvPr>
+        </p:nvSpPr>
+        <p:spPr>
+          <a:xfrm>
+            <a:off x="1270000" y="0"/>
+            <a:ext cx="10922000" cy="1752599"/>
+          </a:xfrm>
+        </p:spPr>
+        <p:txBody>
+          <a:bodyPr>
+            <a:normAutofit/>
+          </a:bodyPr>
+          <a:lstStyle/>
+          <a:p>
+            <a:r>
+              <a:rPr lang="es-ES" sz="4000" dirty="0">
+                <a:latin typeface="Georgia" panose="02040502050405020303" pitchFamily="18" charset="0"/>
+              </a:rPr>
+              <a:t>Gestión de Riesgos</a:t>
+            </a:r>
+          </a:p>
+        </p:txBody>
+      </p:sp>
+      <p:pic>
+        <p:nvPicPr>
+          <p:cNvPr id="3" name="Imagen 2"/>
+          <p:cNvPicPr>
+            <a:picLocks noChangeAspect="1"/>
+          </p:cNvPicPr>
+          <p:nvPr/>
+        </p:nvPicPr>
+        <p:blipFill>
+          <a:blip r:embed="rId2"/>
+          <a:stretch>
+            <a:fillRect/>
+          </a:stretch>
+        </p:blipFill>
+        <p:spPr>
+          <a:xfrm>
+            <a:off x="1270000" y="633559"/>
+            <a:ext cx="10423236" cy="5624919"/>
+          </a:xfrm>
+          <a:prstGeom prst="rect">
+            <a:avLst/>
+          </a:prstGeom>
+        </p:spPr>
+      </p:pic>
+    </p:spTree>
+    <p:extLst>
+      <p:ext uri="{BB962C8B-B14F-4D97-AF65-F5344CB8AC3E}">
+        <p14:creationId xmlns:p14="http://schemas.microsoft.com/office/powerpoint/2010/main" val="3950036555"/>
+      </p:ext>
+    </p:extLst>
+  </p:cSld>
+  <p:clrMapOvr>
+    <a:masterClrMapping/>
+  </p:clrMapOvr>
+  <p:timing>
+    <p:tnLst>
+      <p:par>
+        <p:cTn id="1" dur="indefinite" restart="never" nodeType="tmRoot"/>
+      </p:par>
+    </p:tnLst>
+  </p:timing>
+</p:sld>
+</file>
+
+<file path=ppt/slides/slide21.xml><?xml version="1.0" encoding="utf-8"?>
+<p:sld xmlns:a="http://schemas.openxmlformats.org/drawingml/2006/main" xmlns:r="http://schemas.openxmlformats.org/officeDocument/2006/relationships" xmlns:p="http://schemas.openxmlformats.org/presentationml/2006/main">
+  <p:cSld>
+    <p:spTree>
+      <p:nvGrpSpPr>
+        <p:cNvPr id="1" name=""/>
+        <p:cNvGrpSpPr/>
+        <p:nvPr/>
+      </p:nvGrpSpPr>
+      <p:grpSpPr>
+        <a:xfrm>
+          <a:off x="0" y="0"/>
+          <a:ext cx="0" cy="0"/>
+          <a:chOff x="0" y="0"/>
+          <a:chExt cx="0" cy="0"/>
+        </a:xfrm>
+      </p:grpSpPr>
+      <p:sp>
+        <p:nvSpPr>
+          <p:cNvPr id="2" name="Título 1">
+            <a:extLst>
+              <a:ext uri="{FF2B5EF4-FFF2-40B4-BE49-F238E27FC236}">
+                <a16:creationId xmlns:a16="http://schemas.microsoft.com/office/drawing/2014/main" id="{0ED6D180-92C1-4333-BA91-2BBA4DD94A3B}"/>
+              </a:ext>
+            </a:extLst>
+          </p:cNvPr>
+          <p:cNvSpPr>
+            <a:spLocks noGrp="1"/>
+          </p:cNvSpPr>
+          <p:nvPr>
+            <p:ph type="title"/>
+          </p:nvPr>
+        </p:nvSpPr>
+        <p:spPr>
+          <a:xfrm>
+            <a:off x="1270000" y="0"/>
+            <a:ext cx="10922000" cy="1752599"/>
+          </a:xfrm>
+        </p:spPr>
+        <p:txBody>
+          <a:bodyPr>
+            <a:normAutofit/>
+          </a:bodyPr>
+          <a:lstStyle/>
+          <a:p>
+            <a:r>
+              <a:rPr lang="es-ES" sz="4000" dirty="0">
+                <a:latin typeface="Georgia" panose="02040502050405020303" pitchFamily="18" charset="0"/>
+              </a:rPr>
+              <a:t>Gestión de Riesgos</a:t>
+            </a:r>
+          </a:p>
+        </p:txBody>
+      </p:sp>
+      <p:pic>
+        <p:nvPicPr>
+          <p:cNvPr id="3" name="Imagen 2"/>
+          <p:cNvPicPr>
+            <a:picLocks noChangeAspect="1"/>
+          </p:cNvPicPr>
+          <p:nvPr/>
+        </p:nvPicPr>
+        <p:blipFill>
+          <a:blip r:embed="rId2"/>
+          <a:stretch>
+            <a:fillRect/>
+          </a:stretch>
+        </p:blipFill>
+        <p:spPr>
+          <a:xfrm>
+            <a:off x="1270000" y="459259"/>
+            <a:ext cx="10139659" cy="5899977"/>
+          </a:xfrm>
+          <a:prstGeom prst="rect">
+            <a:avLst/>
+          </a:prstGeom>
+        </p:spPr>
+      </p:pic>
+    </p:spTree>
+    <p:extLst>
+      <p:ext uri="{BB962C8B-B14F-4D97-AF65-F5344CB8AC3E}">
+        <p14:creationId xmlns:p14="http://schemas.microsoft.com/office/powerpoint/2010/main" val="3027958132"/>
+      </p:ext>
+    </p:extLst>
+  </p:cSld>
+  <p:clrMapOvr>
+    <a:masterClrMapping/>
+  </p:clrMapOvr>
+  <p:timing>
+    <p:tnLst>
+      <p:par>
+        <p:cTn id="1" dur="indefinite" restart="never" nodeType="tmRoot"/>
+      </p:par>
+    </p:tnLst>
+  </p:timing>
+</p:sld>
+</file>
+
+<file path=ppt/slides/slide22.xml><?xml version="1.0" encoding="utf-8"?>
+<p:sld xmlns:a="http://schemas.openxmlformats.org/drawingml/2006/main" xmlns:r="http://schemas.openxmlformats.org/officeDocument/2006/relationships" xmlns:p="http://schemas.openxmlformats.org/presentationml/2006/main">
+  <p:cSld>
+    <p:spTree>
+      <p:nvGrpSpPr>
+        <p:cNvPr id="1" name=""/>
+        <p:cNvGrpSpPr/>
+        <p:nvPr/>
+      </p:nvGrpSpPr>
+      <p:grpSpPr>
+        <a:xfrm>
+          <a:off x="0" y="0"/>
+          <a:ext cx="0" cy="0"/>
+          <a:chOff x="0" y="0"/>
+          <a:chExt cx="0" cy="0"/>
+        </a:xfrm>
+      </p:grpSpPr>
+      <p:sp>
+        <p:nvSpPr>
+          <p:cNvPr id="2" name="Título 1">
+            <a:extLst>
+              <a:ext uri="{FF2B5EF4-FFF2-40B4-BE49-F238E27FC236}">
+                <a16:creationId xmlns:a16="http://schemas.microsoft.com/office/drawing/2014/main" id="{0ED6D180-92C1-4333-BA91-2BBA4DD94A3B}"/>
               </a:ext>
             </a:extLst>
           </p:cNvPr>
@@ -11704,195 +11972,20 @@
     </p:spTree>
     <p:extLst>
       <p:ext uri="{BB962C8B-B14F-4D97-AF65-F5344CB8AC3E}">
-        <p14:creationId xmlns:p14="http://schemas.microsoft.com/office/powerpoint/2010/main" xmlns="" val="2861481179"/>
+        <p14:creationId xmlns:p14="http://schemas.microsoft.com/office/powerpoint/2010/main" val="2861481179"/>
       </p:ext>
     </p:extLst>
   </p:cSld>
   <p:clrMapOvr>
     <a:masterClrMapping/>
   </p:clrMapOvr>
-</p:sld>
-</file>
-
-<file path=ppt/slides/slide21.xml><?xml version="1.0" encoding="utf-8"?>
-<p:sld xmlns:a="http://schemas.openxmlformats.org/drawingml/2006/main" xmlns:r="http://schemas.openxmlformats.org/officeDocument/2006/relationships" xmlns:p="http://schemas.openxmlformats.org/presentationml/2006/main">
-  <p:cSld>
-    <p:spTree>
-      <p:nvGrpSpPr>
-        <p:cNvPr id="1" name=""/>
-        <p:cNvGrpSpPr/>
-        <p:nvPr/>
-      </p:nvGrpSpPr>
-      <p:grpSpPr>
-        <a:xfrm>
-          <a:off x="0" y="0"/>
-          <a:ext cx="0" cy="0"/>
-          <a:chOff x="0" y="0"/>
-          <a:chExt cx="0" cy="0"/>
-        </a:xfrm>
-      </p:grpSpPr>
-      <p:sp>
-        <p:nvSpPr>
-          <p:cNvPr id="4" name="Rectángulo 3">
-            <a:extLst>
-              <a:ext uri="{FF2B5EF4-FFF2-40B4-BE49-F238E27FC236}">
-                <a16:creationId xmlns:a16="http://schemas.microsoft.com/office/drawing/2014/main" xmlns="" id="{B0F1B4F4-0C7A-4C0E-8584-95718BC545EC}"/>
-              </a:ext>
-            </a:extLst>
-          </p:cNvPr>
-          <p:cNvSpPr/>
-          <p:nvPr/>
-        </p:nvSpPr>
-        <p:spPr>
-          <a:xfrm>
-            <a:off x="2366075" y="2011694"/>
-            <a:ext cx="9825925" cy="1200329"/>
-          </a:xfrm>
-          <a:prstGeom prst="rect">
-            <a:avLst/>
-          </a:prstGeom>
-          <a:noFill/>
-        </p:spPr>
-        <p:txBody>
-          <a:bodyPr wrap="square" lIns="91440" tIns="45720" rIns="91440" bIns="45720">
-            <a:spAutoFit/>
-          </a:bodyPr>
-          <a:lstStyle/>
-          <a:p>
-            <a:pPr algn="ctr"/>
-            <a:r>
-              <a:rPr lang="es-ES" sz="7200" b="1" dirty="0">
-                <a:ln w="0"/>
-                <a:solidFill>
-                  <a:schemeClr val="accent1"/>
-                </a:solidFill>
-                <a:effectLst>
-                  <a:outerShdw blurRad="38100" dist="25400" dir="5400000" algn="ctr" rotWithShape="0">
-                    <a:srgbClr val="6E747A">
-                      <a:alpha val="43000"/>
-                    </a:srgbClr>
-                  </a:outerShdw>
-                </a:effectLst>
-              </a:rPr>
-              <a:t>Tecnologías utilizadas</a:t>
-            </a:r>
-            <a:endParaRPr lang="es-ES" sz="7200" b="1" cap="none" spc="0" dirty="0">
-              <a:ln w="0"/>
-              <a:solidFill>
-                <a:schemeClr val="accent1"/>
-              </a:solidFill>
-              <a:effectLst>
-                <a:outerShdw blurRad="38100" dist="25400" dir="5400000" algn="ctr" rotWithShape="0">
-                  <a:srgbClr val="6E747A">
-                    <a:alpha val="43000"/>
-                  </a:srgbClr>
-                </a:outerShdw>
-              </a:effectLst>
-            </a:endParaRPr>
-          </a:p>
-        </p:txBody>
-      </p:sp>
-    </p:spTree>
-    <p:extLst>
-      <p:ext uri="{BB962C8B-B14F-4D97-AF65-F5344CB8AC3E}">
-        <p14:creationId xmlns:p14="http://schemas.microsoft.com/office/powerpoint/2010/main" xmlns="" val="4125267999"/>
-      </p:ext>
-    </p:extLst>
-  </p:cSld>
-  <p:clrMapOvr>
-    <a:masterClrMapping/>
-  </p:clrMapOvr>
-</p:sld>
-</file>
-
-<file path=ppt/slides/slide22.xml><?xml version="1.0" encoding="utf-8"?>
-<p:sld xmlns:a="http://schemas.openxmlformats.org/drawingml/2006/main" xmlns:r="http://schemas.openxmlformats.org/officeDocument/2006/relationships" xmlns:p="http://schemas.openxmlformats.org/presentationml/2006/main">
-  <p:cSld>
-    <p:spTree>
-      <p:nvGrpSpPr>
-        <p:cNvPr id="1" name=""/>
-        <p:cNvGrpSpPr/>
-        <p:nvPr/>
-      </p:nvGrpSpPr>
-      <p:grpSpPr>
-        <a:xfrm>
-          <a:off x="0" y="0"/>
-          <a:ext cx="0" cy="0"/>
-          <a:chOff x="0" y="0"/>
-          <a:chExt cx="0" cy="0"/>
-        </a:xfrm>
-      </p:grpSpPr>
-      <p:sp>
-        <p:nvSpPr>
-          <p:cNvPr id="4" name="Rectángulo 3">
-            <a:extLst>
-              <a:ext uri="{FF2B5EF4-FFF2-40B4-BE49-F238E27FC236}">
-                <a16:creationId xmlns:a16="http://schemas.microsoft.com/office/drawing/2014/main" xmlns="" id="{B0F1B4F4-0C7A-4C0E-8584-95718BC545EC}"/>
-              </a:ext>
-            </a:extLst>
-          </p:cNvPr>
-          <p:cNvSpPr/>
-          <p:nvPr/>
-        </p:nvSpPr>
-        <p:spPr>
-          <a:xfrm>
-            <a:off x="2366075" y="1577741"/>
-            <a:ext cx="9825925" cy="3416320"/>
-          </a:xfrm>
-          <a:prstGeom prst="rect">
-            <a:avLst/>
-          </a:prstGeom>
-          <a:noFill/>
-        </p:spPr>
-        <p:txBody>
-          <a:bodyPr wrap="square" lIns="91440" tIns="45720" rIns="91440" bIns="45720">
-            <a:spAutoFit/>
-          </a:bodyPr>
-          <a:lstStyle/>
-          <a:p>
-            <a:pPr algn="ctr"/>
-            <a:r>
-              <a:rPr lang="es-ES" sz="7200" b="1" dirty="0">
-                <a:ln w="0"/>
-                <a:solidFill>
-                  <a:schemeClr val="accent1"/>
-                </a:solidFill>
-                <a:effectLst>
-                  <a:outerShdw blurRad="38100" dist="25400" dir="5400000" algn="ctr" rotWithShape="0">
-                    <a:srgbClr val="6E747A">
-                      <a:alpha val="43000"/>
-                    </a:srgbClr>
-                  </a:outerShdw>
-                </a:effectLst>
-              </a:rPr>
-              <a:t>Características destacadas y mejoras a futuro</a:t>
-            </a:r>
-            <a:endParaRPr lang="es-ES" sz="7200" b="1" cap="none" spc="0" dirty="0">
-              <a:ln w="0"/>
-              <a:solidFill>
-                <a:schemeClr val="accent1"/>
-              </a:solidFill>
-              <a:effectLst>
-                <a:outerShdw blurRad="38100" dist="25400" dir="5400000" algn="ctr" rotWithShape="0">
-                  <a:srgbClr val="6E747A">
-                    <a:alpha val="43000"/>
-                  </a:srgbClr>
-                </a:outerShdw>
-              </a:effectLst>
-            </a:endParaRPr>
-          </a:p>
-        </p:txBody>
-      </p:sp>
-    </p:spTree>
-    <p:extLst>
-      <p:ext uri="{BB962C8B-B14F-4D97-AF65-F5344CB8AC3E}">
-        <p14:creationId xmlns:p14="http://schemas.microsoft.com/office/powerpoint/2010/main" xmlns="" val="115837642"/>
-      </p:ext>
-    </p:extLst>
-  </p:cSld>
-  <p:clrMapOvr>
-    <a:masterClrMapping/>
-  </p:clrMapOvr>
+  <p:timing>
+    <p:tnLst>
+      <p:par>
+        <p:cTn id="1" dur="indefinite" restart="never" nodeType="tmRoot"/>
+      </p:par>
+    </p:tnLst>
+  </p:timing>
 </p:sld>
 </file>
 
@@ -11918,7 +12011,1217 @@
           <p:cNvPr id="4" name="Rectángulo 3">
             <a:extLst>
               <a:ext uri="{FF2B5EF4-FFF2-40B4-BE49-F238E27FC236}">
-                <a16:creationId xmlns:a16="http://schemas.microsoft.com/office/drawing/2014/main" xmlns="" id="{B0F1B4F4-0C7A-4C0E-8584-95718BC545EC}"/>
+                <a16:creationId xmlns:a16="http://schemas.microsoft.com/office/drawing/2014/main" id="{B0F1B4F4-0C7A-4C0E-8584-95718BC545EC}"/>
+              </a:ext>
+            </a:extLst>
+          </p:cNvPr>
+          <p:cNvSpPr/>
+          <p:nvPr/>
+        </p:nvSpPr>
+        <p:spPr>
+          <a:xfrm>
+            <a:off x="2199821" y="1623766"/>
+            <a:ext cx="9825925" cy="3416320"/>
+          </a:xfrm>
+          <a:prstGeom prst="rect">
+            <a:avLst/>
+          </a:prstGeom>
+          <a:noFill/>
+        </p:spPr>
+        <p:txBody>
+          <a:bodyPr wrap="square" lIns="91440" tIns="45720" rIns="91440" bIns="45720">
+            <a:spAutoFit/>
+          </a:bodyPr>
+          <a:lstStyle/>
+          <a:p>
+            <a:pPr algn="ctr"/>
+            <a:r>
+              <a:rPr lang="es-ES" sz="7200" b="1" dirty="0">
+                <a:ln w="0"/>
+                <a:solidFill>
+                  <a:schemeClr val="accent1"/>
+                </a:solidFill>
+                <a:effectLst>
+                  <a:outerShdw blurRad="38100" dist="25400" dir="5400000" algn="ctr" rotWithShape="0">
+                    <a:srgbClr val="6E747A">
+                      <a:alpha val="43000"/>
+                    </a:srgbClr>
+                  </a:outerShdw>
+                </a:effectLst>
+              </a:rPr>
+              <a:t>Tecnologías </a:t>
+            </a:r>
+            <a:r>
+              <a:rPr lang="es-ES" sz="7200" b="1" dirty="0" smtClean="0">
+                <a:ln w="0"/>
+                <a:solidFill>
+                  <a:schemeClr val="accent1"/>
+                </a:solidFill>
+                <a:effectLst>
+                  <a:outerShdw blurRad="38100" dist="25400" dir="5400000" algn="ctr" rotWithShape="0">
+                    <a:srgbClr val="6E747A">
+                      <a:alpha val="43000"/>
+                    </a:srgbClr>
+                  </a:outerShdw>
+                </a:effectLst>
+              </a:rPr>
+              <a:t>y </a:t>
+            </a:r>
+          </a:p>
+          <a:p>
+            <a:pPr algn="ctr"/>
+            <a:r>
+              <a:rPr lang="es-ES" sz="7200" b="1" dirty="0" smtClean="0">
+                <a:ln w="0"/>
+                <a:solidFill>
+                  <a:schemeClr val="accent1"/>
+                </a:solidFill>
+                <a:effectLst>
+                  <a:outerShdw blurRad="38100" dist="25400" dir="5400000" algn="ctr" rotWithShape="0">
+                    <a:srgbClr val="6E747A">
+                      <a:alpha val="43000"/>
+                    </a:srgbClr>
+                  </a:outerShdw>
+                </a:effectLst>
+              </a:rPr>
+              <a:t>Herramientas</a:t>
+            </a:r>
+          </a:p>
+          <a:p>
+            <a:pPr algn="ctr"/>
+            <a:r>
+              <a:rPr lang="es-ES" sz="7200" b="1" dirty="0" smtClean="0">
+                <a:ln w="0"/>
+                <a:solidFill>
+                  <a:schemeClr val="accent1"/>
+                </a:solidFill>
+                <a:effectLst>
+                  <a:outerShdw blurRad="38100" dist="25400" dir="5400000" algn="ctr" rotWithShape="0">
+                    <a:srgbClr val="6E747A">
+                      <a:alpha val="43000"/>
+                    </a:srgbClr>
+                  </a:outerShdw>
+                </a:effectLst>
+              </a:rPr>
+              <a:t>utilizadas</a:t>
+            </a:r>
+            <a:endParaRPr lang="es-ES" sz="7200" b="1" cap="none" spc="0" dirty="0">
+              <a:ln w="0"/>
+              <a:solidFill>
+                <a:schemeClr val="accent1"/>
+              </a:solidFill>
+              <a:effectLst>
+                <a:outerShdw blurRad="38100" dist="25400" dir="5400000" algn="ctr" rotWithShape="0">
+                  <a:srgbClr val="6E747A">
+                    <a:alpha val="43000"/>
+                  </a:srgbClr>
+                </a:outerShdw>
+              </a:effectLst>
+            </a:endParaRPr>
+          </a:p>
+        </p:txBody>
+      </p:sp>
+    </p:spTree>
+    <p:extLst>
+      <p:ext uri="{BB962C8B-B14F-4D97-AF65-F5344CB8AC3E}">
+        <p14:creationId xmlns:p14="http://schemas.microsoft.com/office/powerpoint/2010/main" val="4125267999"/>
+      </p:ext>
+    </p:extLst>
+  </p:cSld>
+  <p:clrMapOvr>
+    <a:masterClrMapping/>
+  </p:clrMapOvr>
+</p:sld>
+</file>
+
+<file path=ppt/slides/slide24.xml><?xml version="1.0" encoding="utf-8"?>
+<p:sld xmlns:a="http://schemas.openxmlformats.org/drawingml/2006/main" xmlns:r="http://schemas.openxmlformats.org/officeDocument/2006/relationships" xmlns:p="http://schemas.openxmlformats.org/presentationml/2006/main">
+  <p:cSld>
+    <p:spTree>
+      <p:nvGrpSpPr>
+        <p:cNvPr id="1" name=""/>
+        <p:cNvGrpSpPr/>
+        <p:nvPr/>
+      </p:nvGrpSpPr>
+      <p:grpSpPr>
+        <a:xfrm>
+          <a:off x="0" y="0"/>
+          <a:ext cx="0" cy="0"/>
+          <a:chOff x="0" y="0"/>
+          <a:chExt cx="0" cy="0"/>
+        </a:xfrm>
+      </p:grpSpPr>
+      <p:pic>
+        <p:nvPicPr>
+          <p:cNvPr id="4" name="Marcador de contenido 3"/>
+          <p:cNvPicPr>
+            <a:picLocks noGrp="1" noChangeAspect="1"/>
+          </p:cNvPicPr>
+          <p:nvPr>
+            <p:ph idx="1"/>
+          </p:nvPr>
+        </p:nvPicPr>
+        <p:blipFill>
+          <a:blip r:embed="rId2">
+            <a:extLst>
+              <a:ext uri="{28A0092B-C50C-407E-A947-70E740481C1C}">
+                <a14:useLocalDpi xmlns:a14="http://schemas.microsoft.com/office/drawing/2010/main" val="0"/>
+              </a:ext>
+            </a:extLst>
+          </a:blip>
+          <a:stretch>
+            <a:fillRect/>
+          </a:stretch>
+        </p:blipFill>
+        <p:spPr>
+          <a:xfrm>
+            <a:off x="5470552" y="1497609"/>
+            <a:ext cx="1769869" cy="1769869"/>
+          </a:xfrm>
+        </p:spPr>
+      </p:pic>
+      <p:pic>
+        <p:nvPicPr>
+          <p:cNvPr id="5" name="Imagen 4"/>
+          <p:cNvPicPr>
+            <a:picLocks noChangeAspect="1"/>
+          </p:cNvPicPr>
+          <p:nvPr/>
+        </p:nvPicPr>
+        <p:blipFill>
+          <a:blip r:embed="rId3" cstate="hqprint">
+            <a:extLst>
+              <a:ext uri="{28A0092B-C50C-407E-A947-70E740481C1C}">
+                <a14:useLocalDpi xmlns:a14="http://schemas.microsoft.com/office/drawing/2010/main" val="0"/>
+              </a:ext>
+            </a:extLst>
+          </a:blip>
+          <a:stretch>
+            <a:fillRect/>
+          </a:stretch>
+        </p:blipFill>
+        <p:spPr>
+          <a:xfrm>
+            <a:off x="8673228" y="2053967"/>
+            <a:ext cx="1048546" cy="566303"/>
+          </a:xfrm>
+          <a:prstGeom prst="rect">
+            <a:avLst/>
+          </a:prstGeom>
+        </p:spPr>
+      </p:pic>
+      <p:sp>
+        <p:nvSpPr>
+          <p:cNvPr id="6" name="CuadroTexto 5"/>
+          <p:cNvSpPr txBox="1"/>
+          <p:nvPr/>
+        </p:nvSpPr>
+        <p:spPr>
+          <a:xfrm>
+            <a:off x="7647077" y="1145665"/>
+            <a:ext cx="2358338" cy="461665"/>
+          </a:xfrm>
+          <a:prstGeom prst="rect">
+            <a:avLst/>
+          </a:prstGeom>
+          <a:noFill/>
+        </p:spPr>
+        <p:txBody>
+          <a:bodyPr wrap="none" rtlCol="0">
+            <a:spAutoFit/>
+          </a:bodyPr>
+          <a:lstStyle/>
+          <a:p>
+            <a:r>
+              <a:rPr lang="es-AR" sz="2400" b="1" dirty="0" smtClean="0"/>
+              <a:t>Implementación</a:t>
+            </a:r>
+            <a:endParaRPr lang="es-AR" b="1" dirty="0"/>
+          </a:p>
+        </p:txBody>
+      </p:sp>
+      <p:sp>
+        <p:nvSpPr>
+          <p:cNvPr id="7" name="CuadroTexto 6"/>
+          <p:cNvSpPr txBox="1"/>
+          <p:nvPr/>
+        </p:nvSpPr>
+        <p:spPr>
+          <a:xfrm>
+            <a:off x="1463679" y="1145666"/>
+            <a:ext cx="1213794" cy="461665"/>
+          </a:xfrm>
+          <a:prstGeom prst="rect">
+            <a:avLst/>
+          </a:prstGeom>
+          <a:noFill/>
+        </p:spPr>
+        <p:txBody>
+          <a:bodyPr wrap="none" rtlCol="0">
+            <a:spAutoFit/>
+          </a:bodyPr>
+          <a:lstStyle/>
+          <a:p>
+            <a:r>
+              <a:rPr lang="es-AR" sz="2400" b="1" dirty="0" smtClean="0"/>
+              <a:t>Gestión</a:t>
+            </a:r>
+            <a:endParaRPr lang="es-AR" b="1" dirty="0"/>
+          </a:p>
+        </p:txBody>
+      </p:sp>
+      <p:pic>
+        <p:nvPicPr>
+          <p:cNvPr id="8" name="Imagen 7"/>
+          <p:cNvPicPr>
+            <a:picLocks noChangeAspect="1"/>
+          </p:cNvPicPr>
+          <p:nvPr/>
+        </p:nvPicPr>
+        <p:blipFill>
+          <a:blip r:embed="rId4" cstate="hqprint">
+            <a:extLst>
+              <a:ext uri="{28A0092B-C50C-407E-A947-70E740481C1C}">
+                <a14:useLocalDpi xmlns:a14="http://schemas.microsoft.com/office/drawing/2010/main" val="0"/>
+              </a:ext>
+            </a:extLst>
+          </a:blip>
+          <a:stretch>
+            <a:fillRect/>
+          </a:stretch>
+        </p:blipFill>
+        <p:spPr>
+          <a:xfrm>
+            <a:off x="1495570" y="3327465"/>
+            <a:ext cx="1021771" cy="1021771"/>
+          </a:xfrm>
+          <a:prstGeom prst="rect">
+            <a:avLst/>
+          </a:prstGeom>
+        </p:spPr>
+      </p:pic>
+      <p:pic>
+        <p:nvPicPr>
+          <p:cNvPr id="9" name="Imagen 8"/>
+          <p:cNvPicPr>
+            <a:picLocks noChangeAspect="1"/>
+          </p:cNvPicPr>
+          <p:nvPr/>
+        </p:nvPicPr>
+        <p:blipFill>
+          <a:blip r:embed="rId5" cstate="hqprint">
+            <a:extLst>
+              <a:ext uri="{28A0092B-C50C-407E-A947-70E740481C1C}">
+                <a14:useLocalDpi xmlns:a14="http://schemas.microsoft.com/office/drawing/2010/main" val="0"/>
+              </a:ext>
+            </a:extLst>
+          </a:blip>
+          <a:stretch>
+            <a:fillRect/>
+          </a:stretch>
+        </p:blipFill>
+        <p:spPr>
+          <a:xfrm>
+            <a:off x="1466130" y="1804556"/>
+            <a:ext cx="1080655" cy="1080655"/>
+          </a:xfrm>
+          <a:prstGeom prst="rect">
+            <a:avLst/>
+          </a:prstGeom>
+        </p:spPr>
+      </p:pic>
+      <p:sp>
+        <p:nvSpPr>
+          <p:cNvPr id="10" name="CuadroTexto 9"/>
+          <p:cNvSpPr txBox="1"/>
+          <p:nvPr/>
+        </p:nvSpPr>
+        <p:spPr>
+          <a:xfrm>
+            <a:off x="1753823" y="2897677"/>
+            <a:ext cx="505267" cy="400110"/>
+          </a:xfrm>
+          <a:prstGeom prst="rect">
+            <a:avLst/>
+          </a:prstGeom>
+          <a:noFill/>
+        </p:spPr>
+        <p:txBody>
+          <a:bodyPr wrap="none" rtlCol="0">
+            <a:spAutoFit/>
+          </a:bodyPr>
+          <a:lstStyle/>
+          <a:p>
+            <a:r>
+              <a:rPr lang="es-AR" sz="2000" dirty="0" err="1" smtClean="0">
+                <a:solidFill>
+                  <a:schemeClr val="accent4">
+                    <a:lumMod val="75000"/>
+                  </a:schemeClr>
+                </a:solidFill>
+              </a:rPr>
+              <a:t>Git</a:t>
+            </a:r>
+            <a:endParaRPr lang="es-AR" sz="2000" dirty="0">
+              <a:solidFill>
+                <a:schemeClr val="accent4">
+                  <a:lumMod val="75000"/>
+                </a:schemeClr>
+              </a:solidFill>
+            </a:endParaRPr>
+          </a:p>
+        </p:txBody>
+      </p:sp>
+      <p:sp>
+        <p:nvSpPr>
+          <p:cNvPr id="11" name="CuadroTexto 10"/>
+          <p:cNvSpPr txBox="1"/>
+          <p:nvPr/>
+        </p:nvSpPr>
+        <p:spPr>
+          <a:xfrm>
+            <a:off x="1495570" y="4349236"/>
+            <a:ext cx="947695" cy="400110"/>
+          </a:xfrm>
+          <a:prstGeom prst="rect">
+            <a:avLst/>
+          </a:prstGeom>
+          <a:noFill/>
+        </p:spPr>
+        <p:txBody>
+          <a:bodyPr wrap="none" rtlCol="0">
+            <a:spAutoFit/>
+          </a:bodyPr>
+          <a:lstStyle/>
+          <a:p>
+            <a:r>
+              <a:rPr lang="es-AR" sz="2000" dirty="0" smtClean="0">
+                <a:solidFill>
+                  <a:schemeClr val="accent4">
+                    <a:lumMod val="75000"/>
+                  </a:schemeClr>
+                </a:solidFill>
+              </a:rPr>
+              <a:t>GitHub</a:t>
+            </a:r>
+            <a:endParaRPr lang="es-AR" sz="2000" dirty="0">
+              <a:solidFill>
+                <a:schemeClr val="accent4">
+                  <a:lumMod val="75000"/>
+                </a:schemeClr>
+              </a:solidFill>
+            </a:endParaRPr>
+          </a:p>
+        </p:txBody>
+      </p:sp>
+      <p:sp>
+        <p:nvSpPr>
+          <p:cNvPr id="12" name="CuadroTexto 11"/>
+          <p:cNvSpPr txBox="1"/>
+          <p:nvPr/>
+        </p:nvSpPr>
+        <p:spPr>
+          <a:xfrm>
+            <a:off x="2952211" y="1145665"/>
+            <a:ext cx="2411238" cy="461665"/>
+          </a:xfrm>
+          <a:prstGeom prst="rect">
+            <a:avLst/>
+          </a:prstGeom>
+          <a:noFill/>
+        </p:spPr>
+        <p:txBody>
+          <a:bodyPr wrap="none" rtlCol="0">
+            <a:spAutoFit/>
+          </a:bodyPr>
+          <a:lstStyle/>
+          <a:p>
+            <a:r>
+              <a:rPr lang="es-AR" sz="2400" b="1" dirty="0" smtClean="0"/>
+              <a:t>Análisis y Diseño</a:t>
+            </a:r>
+            <a:endParaRPr lang="es-AR" sz="2400" b="1" dirty="0"/>
+          </a:p>
+        </p:txBody>
+      </p:sp>
+      <p:pic>
+        <p:nvPicPr>
+          <p:cNvPr id="13" name="Imagen 12"/>
+          <p:cNvPicPr>
+            <a:picLocks noChangeAspect="1"/>
+          </p:cNvPicPr>
+          <p:nvPr/>
+        </p:nvPicPr>
+        <p:blipFill>
+          <a:blip r:embed="rId6">
+            <a:extLst>
+              <a:ext uri="{28A0092B-C50C-407E-A947-70E740481C1C}">
+                <a14:useLocalDpi xmlns:a14="http://schemas.microsoft.com/office/drawing/2010/main" val="0"/>
+              </a:ext>
+            </a:extLst>
+          </a:blip>
+          <a:stretch>
+            <a:fillRect/>
+          </a:stretch>
+        </p:blipFill>
+        <p:spPr>
+          <a:xfrm>
+            <a:off x="3543037" y="1799360"/>
+            <a:ext cx="1091045" cy="1091045"/>
+          </a:xfrm>
+          <a:prstGeom prst="rect">
+            <a:avLst/>
+          </a:prstGeom>
+        </p:spPr>
+      </p:pic>
+      <p:pic>
+        <p:nvPicPr>
+          <p:cNvPr id="15" name="Imagen 14"/>
+          <p:cNvPicPr>
+            <a:picLocks noChangeAspect="1"/>
+          </p:cNvPicPr>
+          <p:nvPr/>
+        </p:nvPicPr>
+        <p:blipFill>
+          <a:blip r:embed="rId7">
+            <a:extLst>
+              <a:ext uri="{28A0092B-C50C-407E-A947-70E740481C1C}">
+                <a14:useLocalDpi xmlns:a14="http://schemas.microsoft.com/office/drawing/2010/main" val="0"/>
+              </a:ext>
+            </a:extLst>
+          </a:blip>
+          <a:stretch>
+            <a:fillRect/>
+          </a:stretch>
+        </p:blipFill>
+        <p:spPr>
+          <a:xfrm>
+            <a:off x="3543037" y="3267479"/>
+            <a:ext cx="1030908" cy="1030908"/>
+          </a:xfrm>
+          <a:prstGeom prst="rect">
+            <a:avLst/>
+          </a:prstGeom>
+        </p:spPr>
+      </p:pic>
+      <p:pic>
+        <p:nvPicPr>
+          <p:cNvPr id="16" name="Imagen 15"/>
+          <p:cNvPicPr>
+            <a:picLocks noChangeAspect="1"/>
+          </p:cNvPicPr>
+          <p:nvPr/>
+        </p:nvPicPr>
+        <p:blipFill>
+          <a:blip r:embed="rId8" cstate="hqprint">
+            <a:extLst>
+              <a:ext uri="{28A0092B-C50C-407E-A947-70E740481C1C}">
+                <a14:useLocalDpi xmlns:a14="http://schemas.microsoft.com/office/drawing/2010/main" val="0"/>
+              </a:ext>
+            </a:extLst>
+          </a:blip>
+          <a:stretch>
+            <a:fillRect/>
+          </a:stretch>
+        </p:blipFill>
+        <p:spPr>
+          <a:xfrm>
+            <a:off x="3502484" y="4675461"/>
+            <a:ext cx="1112014" cy="1119811"/>
+          </a:xfrm>
+          <a:prstGeom prst="rect">
+            <a:avLst/>
+          </a:prstGeom>
+        </p:spPr>
+      </p:pic>
+      <p:sp>
+        <p:nvSpPr>
+          <p:cNvPr id="17" name="CuadroTexto 16"/>
+          <p:cNvSpPr txBox="1"/>
+          <p:nvPr/>
+        </p:nvSpPr>
+        <p:spPr>
+          <a:xfrm>
+            <a:off x="3527347" y="5795272"/>
+            <a:ext cx="1122423" cy="400110"/>
+          </a:xfrm>
+          <a:prstGeom prst="rect">
+            <a:avLst/>
+          </a:prstGeom>
+          <a:noFill/>
+        </p:spPr>
+        <p:txBody>
+          <a:bodyPr wrap="none" rtlCol="0">
+            <a:spAutoFit/>
+          </a:bodyPr>
+          <a:lstStyle/>
+          <a:p>
+            <a:r>
+              <a:rPr lang="es-AR" sz="2000" dirty="0" smtClean="0">
+                <a:solidFill>
+                  <a:schemeClr val="accent4">
+                    <a:lumMod val="75000"/>
+                  </a:schemeClr>
+                </a:solidFill>
+              </a:rPr>
+              <a:t>DB-</a:t>
+            </a:r>
+            <a:r>
+              <a:rPr lang="es-AR" sz="2000" dirty="0" err="1" smtClean="0">
+                <a:solidFill>
+                  <a:schemeClr val="accent4">
+                    <a:lumMod val="75000"/>
+                  </a:schemeClr>
+                </a:solidFill>
+              </a:rPr>
+              <a:t>Main</a:t>
+            </a:r>
+            <a:endParaRPr lang="es-AR" sz="2000" dirty="0">
+              <a:solidFill>
+                <a:schemeClr val="accent4">
+                  <a:lumMod val="75000"/>
+                </a:schemeClr>
+              </a:solidFill>
+            </a:endParaRPr>
+          </a:p>
+        </p:txBody>
+      </p:sp>
+      <p:pic>
+        <p:nvPicPr>
+          <p:cNvPr id="18" name="Imagen 17"/>
+          <p:cNvPicPr>
+            <a:picLocks noChangeAspect="1"/>
+          </p:cNvPicPr>
+          <p:nvPr/>
+        </p:nvPicPr>
+        <p:blipFill>
+          <a:blip r:embed="rId9" cstate="hqprint">
+            <a:extLst>
+              <a:ext uri="{28A0092B-C50C-407E-A947-70E740481C1C}">
+                <a14:useLocalDpi xmlns:a14="http://schemas.microsoft.com/office/drawing/2010/main" val="0"/>
+              </a:ext>
+            </a:extLst>
+          </a:blip>
+          <a:stretch>
+            <a:fillRect/>
+          </a:stretch>
+        </p:blipFill>
+        <p:spPr>
+          <a:xfrm>
+            <a:off x="7568098" y="1799360"/>
+            <a:ext cx="791014" cy="791014"/>
+          </a:xfrm>
+          <a:prstGeom prst="rect">
+            <a:avLst/>
+          </a:prstGeom>
+        </p:spPr>
+      </p:pic>
+      <p:pic>
+        <p:nvPicPr>
+          <p:cNvPr id="19" name="Imagen 18"/>
+          <p:cNvPicPr>
+            <a:picLocks noChangeAspect="1"/>
+          </p:cNvPicPr>
+          <p:nvPr/>
+        </p:nvPicPr>
+        <p:blipFill>
+          <a:blip r:embed="rId10" cstate="hqprint">
+            <a:extLst>
+              <a:ext uri="{28A0092B-C50C-407E-A947-70E740481C1C}">
+                <a14:useLocalDpi xmlns:a14="http://schemas.microsoft.com/office/drawing/2010/main" val="0"/>
+              </a:ext>
+            </a:extLst>
+          </a:blip>
+          <a:stretch>
+            <a:fillRect/>
+          </a:stretch>
+        </p:blipFill>
+        <p:spPr>
+          <a:xfrm>
+            <a:off x="10077900" y="1790487"/>
+            <a:ext cx="1565393" cy="808760"/>
+          </a:xfrm>
+          <a:prstGeom prst="rect">
+            <a:avLst/>
+          </a:prstGeom>
+        </p:spPr>
+      </p:pic>
+      <p:pic>
+        <p:nvPicPr>
+          <p:cNvPr id="20" name="Imagen 19"/>
+          <p:cNvPicPr>
+            <a:picLocks noChangeAspect="1"/>
+          </p:cNvPicPr>
+          <p:nvPr/>
+        </p:nvPicPr>
+        <p:blipFill>
+          <a:blip r:embed="rId11" cstate="hqprint">
+            <a:extLst>
+              <a:ext uri="{28A0092B-C50C-407E-A947-70E740481C1C}">
+                <a14:useLocalDpi xmlns:a14="http://schemas.microsoft.com/office/drawing/2010/main" val="0"/>
+              </a:ext>
+            </a:extLst>
+          </a:blip>
+          <a:stretch>
+            <a:fillRect/>
+          </a:stretch>
+        </p:blipFill>
+        <p:spPr>
+          <a:xfrm>
+            <a:off x="5430497" y="3252831"/>
+            <a:ext cx="1849977" cy="903309"/>
+          </a:xfrm>
+          <a:prstGeom prst="rect">
+            <a:avLst/>
+          </a:prstGeom>
+        </p:spPr>
+      </p:pic>
+      <p:sp>
+        <p:nvSpPr>
+          <p:cNvPr id="22" name="CuadroTexto 21"/>
+          <p:cNvSpPr txBox="1"/>
+          <p:nvPr/>
+        </p:nvSpPr>
+        <p:spPr>
+          <a:xfrm>
+            <a:off x="7343082" y="2590374"/>
+            <a:ext cx="1241045" cy="400110"/>
+          </a:xfrm>
+          <a:prstGeom prst="rect">
+            <a:avLst/>
+          </a:prstGeom>
+          <a:noFill/>
+        </p:spPr>
+        <p:txBody>
+          <a:bodyPr wrap="none" rtlCol="0">
+            <a:spAutoFit/>
+          </a:bodyPr>
+          <a:lstStyle/>
+          <a:p>
+            <a:r>
+              <a:rPr lang="es-AR" sz="2000" dirty="0" err="1" smtClean="0">
+                <a:solidFill>
+                  <a:schemeClr val="accent4">
+                    <a:lumMod val="75000"/>
+                  </a:schemeClr>
+                </a:solidFill>
+              </a:rPr>
+              <a:t>Bootstrap</a:t>
+            </a:r>
+            <a:endParaRPr lang="es-AR" sz="2000" dirty="0">
+              <a:solidFill>
+                <a:schemeClr val="accent4">
+                  <a:lumMod val="75000"/>
+                </a:schemeClr>
+              </a:solidFill>
+            </a:endParaRPr>
+          </a:p>
+        </p:txBody>
+      </p:sp>
+      <p:pic>
+        <p:nvPicPr>
+          <p:cNvPr id="23" name="Imagen 22"/>
+          <p:cNvPicPr>
+            <a:picLocks noChangeAspect="1"/>
+          </p:cNvPicPr>
+          <p:nvPr/>
+        </p:nvPicPr>
+        <p:blipFill>
+          <a:blip r:embed="rId12" cstate="hqprint">
+            <a:extLst>
+              <a:ext uri="{28A0092B-C50C-407E-A947-70E740481C1C}">
+                <a14:useLocalDpi xmlns:a14="http://schemas.microsoft.com/office/drawing/2010/main" val="0"/>
+              </a:ext>
+            </a:extLst>
+          </a:blip>
+          <a:stretch>
+            <a:fillRect/>
+          </a:stretch>
+        </p:blipFill>
+        <p:spPr>
+          <a:xfrm>
+            <a:off x="7742030" y="3424405"/>
+            <a:ext cx="1614635" cy="544939"/>
+          </a:xfrm>
+          <a:prstGeom prst="rect">
+            <a:avLst/>
+          </a:prstGeom>
+        </p:spPr>
+      </p:pic>
+      <p:pic>
+        <p:nvPicPr>
+          <p:cNvPr id="24" name="Imagen 23"/>
+          <p:cNvPicPr>
+            <a:picLocks noChangeAspect="1"/>
+          </p:cNvPicPr>
+          <p:nvPr/>
+        </p:nvPicPr>
+        <p:blipFill>
+          <a:blip r:embed="rId13" cstate="hqprint">
+            <a:extLst>
+              <a:ext uri="{28A0092B-C50C-407E-A947-70E740481C1C}">
+                <a14:useLocalDpi xmlns:a14="http://schemas.microsoft.com/office/drawing/2010/main" val="0"/>
+              </a:ext>
+            </a:extLst>
+          </a:blip>
+          <a:stretch>
+            <a:fillRect/>
+          </a:stretch>
+        </p:blipFill>
+        <p:spPr>
+          <a:xfrm>
+            <a:off x="5864867" y="4668209"/>
+            <a:ext cx="981236" cy="1131515"/>
+          </a:xfrm>
+          <a:prstGeom prst="rect">
+            <a:avLst/>
+          </a:prstGeom>
+        </p:spPr>
+      </p:pic>
+      <p:pic>
+        <p:nvPicPr>
+          <p:cNvPr id="25" name="Imagen 24"/>
+          <p:cNvPicPr>
+            <a:picLocks noChangeAspect="1"/>
+          </p:cNvPicPr>
+          <p:nvPr/>
+        </p:nvPicPr>
+        <p:blipFill>
+          <a:blip r:embed="rId14">
+            <a:extLst>
+              <a:ext uri="{28A0092B-C50C-407E-A947-70E740481C1C}">
+                <a14:useLocalDpi xmlns:a14="http://schemas.microsoft.com/office/drawing/2010/main" val="0"/>
+              </a:ext>
+            </a:extLst>
+          </a:blip>
+          <a:stretch>
+            <a:fillRect/>
+          </a:stretch>
+        </p:blipFill>
+        <p:spPr>
+          <a:xfrm>
+            <a:off x="10171544" y="4519810"/>
+            <a:ext cx="1775007" cy="591669"/>
+          </a:xfrm>
+          <a:prstGeom prst="rect">
+            <a:avLst/>
+          </a:prstGeom>
+        </p:spPr>
+      </p:pic>
+      <p:pic>
+        <p:nvPicPr>
+          <p:cNvPr id="26" name="Imagen 25"/>
+          <p:cNvPicPr>
+            <a:picLocks noChangeAspect="1"/>
+          </p:cNvPicPr>
+          <p:nvPr/>
+        </p:nvPicPr>
+        <p:blipFill>
+          <a:blip r:embed="rId15">
+            <a:extLst>
+              <a:ext uri="{28A0092B-C50C-407E-A947-70E740481C1C}">
+                <a14:useLocalDpi xmlns:a14="http://schemas.microsoft.com/office/drawing/2010/main" val="0"/>
+              </a:ext>
+            </a:extLst>
+          </a:blip>
+          <a:stretch>
+            <a:fillRect/>
+          </a:stretch>
+        </p:blipFill>
+        <p:spPr>
+          <a:xfrm>
+            <a:off x="10632358" y="5336736"/>
+            <a:ext cx="853377" cy="853377"/>
+          </a:xfrm>
+          <a:prstGeom prst="rect">
+            <a:avLst/>
+          </a:prstGeom>
+        </p:spPr>
+      </p:pic>
+      <p:pic>
+        <p:nvPicPr>
+          <p:cNvPr id="27" name="Imagen 26"/>
+          <p:cNvPicPr>
+            <a:picLocks noChangeAspect="1"/>
+          </p:cNvPicPr>
+          <p:nvPr/>
+        </p:nvPicPr>
+        <p:blipFill>
+          <a:blip r:embed="rId16">
+            <a:extLst>
+              <a:ext uri="{28A0092B-C50C-407E-A947-70E740481C1C}">
+                <a14:useLocalDpi xmlns:a14="http://schemas.microsoft.com/office/drawing/2010/main" val="0"/>
+              </a:ext>
+            </a:extLst>
+          </a:blip>
+          <a:stretch>
+            <a:fillRect/>
+          </a:stretch>
+        </p:blipFill>
+        <p:spPr>
+          <a:xfrm>
+            <a:off x="9197501" y="2834762"/>
+            <a:ext cx="1629002" cy="428685"/>
+          </a:xfrm>
+          <a:prstGeom prst="rect">
+            <a:avLst/>
+          </a:prstGeom>
+        </p:spPr>
+      </p:pic>
+      <p:pic>
+        <p:nvPicPr>
+          <p:cNvPr id="28" name="Imagen 27"/>
+          <p:cNvPicPr>
+            <a:picLocks noChangeAspect="1"/>
+          </p:cNvPicPr>
+          <p:nvPr/>
+        </p:nvPicPr>
+        <p:blipFill>
+          <a:blip r:embed="rId17">
+            <a:extLst>
+              <a:ext uri="{28A0092B-C50C-407E-A947-70E740481C1C}">
+                <a14:useLocalDpi xmlns:a14="http://schemas.microsoft.com/office/drawing/2010/main" val="0"/>
+              </a:ext>
+            </a:extLst>
+          </a:blip>
+          <a:stretch>
+            <a:fillRect/>
+          </a:stretch>
+        </p:blipFill>
+        <p:spPr>
+          <a:xfrm>
+            <a:off x="8859041" y="4708154"/>
+            <a:ext cx="1051623" cy="1051623"/>
+          </a:xfrm>
+          <a:prstGeom prst="rect">
+            <a:avLst/>
+          </a:prstGeom>
+        </p:spPr>
+      </p:pic>
+      <p:pic>
+        <p:nvPicPr>
+          <p:cNvPr id="29" name="Imagen 28"/>
+          <p:cNvPicPr>
+            <a:picLocks noChangeAspect="1"/>
+          </p:cNvPicPr>
+          <p:nvPr/>
+        </p:nvPicPr>
+        <p:blipFill>
+          <a:blip r:embed="rId18" cstate="hqprint">
+            <a:extLst>
+              <a:ext uri="{28A0092B-C50C-407E-A947-70E740481C1C}">
+                <a14:useLocalDpi xmlns:a14="http://schemas.microsoft.com/office/drawing/2010/main" val="0"/>
+              </a:ext>
+            </a:extLst>
+          </a:blip>
+          <a:stretch>
+            <a:fillRect/>
+          </a:stretch>
+        </p:blipFill>
+        <p:spPr>
+          <a:xfrm>
+            <a:off x="6980200" y="4792101"/>
+            <a:ext cx="1792922" cy="896461"/>
+          </a:xfrm>
+          <a:prstGeom prst="rect">
+            <a:avLst/>
+          </a:prstGeom>
+        </p:spPr>
+      </p:pic>
+      <p:pic>
+        <p:nvPicPr>
+          <p:cNvPr id="1026" name="Picture 2" descr="https://upload.wikimedia.org/wikipedia/commons/thumb/f/fd/JQuery-Logo.svg/320px-JQuery-Logo.svg.png"/>
+          <p:cNvPicPr>
+            <a:picLocks noChangeAspect="1" noChangeArrowheads="1"/>
+          </p:cNvPicPr>
+          <p:nvPr/>
+        </p:nvPicPr>
+        <p:blipFill>
+          <a:blip r:embed="rId19">
+            <a:extLst>
+              <a:ext uri="{28A0092B-C50C-407E-A947-70E740481C1C}">
+                <a14:useLocalDpi xmlns:a14="http://schemas.microsoft.com/office/drawing/2010/main" val="0"/>
+              </a:ext>
+            </a:extLst>
+          </a:blip>
+          <a:srcRect/>
+          <a:stretch>
+            <a:fillRect/>
+          </a:stretch>
+        </p:blipFill>
+        <p:spPr bwMode="auto">
+          <a:xfrm>
+            <a:off x="9818222" y="3507580"/>
+            <a:ext cx="1615625" cy="393809"/>
+          </a:xfrm>
+          <a:prstGeom prst="rect">
+            <a:avLst/>
+          </a:prstGeom>
+          <a:noFill/>
+          <a:extLst>
+            <a:ext uri="{909E8E84-426E-40DD-AFC4-6F175D3DCCD1}">
+              <a14:hiddenFill xmlns:a14="http://schemas.microsoft.com/office/drawing/2010/main">
+                <a:solidFill>
+                  <a:srgbClr val="FFFFFF"/>
+                </a:solidFill>
+              </a14:hiddenFill>
+            </a:ext>
+          </a:extLst>
+        </p:spPr>
+      </p:pic>
+      <p:sp>
+        <p:nvSpPr>
+          <p:cNvPr id="32" name="CuadroTexto 31"/>
+          <p:cNvSpPr txBox="1"/>
+          <p:nvPr/>
+        </p:nvSpPr>
+        <p:spPr>
+          <a:xfrm>
+            <a:off x="5708204" y="5790003"/>
+            <a:ext cx="1225015" cy="400110"/>
+          </a:xfrm>
+          <a:prstGeom prst="rect">
+            <a:avLst/>
+          </a:prstGeom>
+          <a:noFill/>
+        </p:spPr>
+        <p:txBody>
+          <a:bodyPr wrap="none" rtlCol="0">
+            <a:spAutoFit/>
+          </a:bodyPr>
+          <a:lstStyle/>
+          <a:p>
+            <a:r>
+              <a:rPr lang="es-AR" sz="2000" dirty="0" err="1" smtClean="0">
+                <a:solidFill>
+                  <a:schemeClr val="accent4">
+                    <a:lumMod val="75000"/>
+                  </a:schemeClr>
+                </a:solidFill>
+              </a:rPr>
+              <a:t>NetBeans</a:t>
+            </a:r>
+            <a:endParaRPr lang="es-AR" sz="2000" dirty="0" smtClean="0">
+              <a:solidFill>
+                <a:schemeClr val="accent4">
+                  <a:lumMod val="75000"/>
+                </a:schemeClr>
+              </a:solidFill>
+            </a:endParaRPr>
+          </a:p>
+        </p:txBody>
+      </p:sp>
+      <p:sp>
+        <p:nvSpPr>
+          <p:cNvPr id="33" name="CuadroTexto 32"/>
+          <p:cNvSpPr txBox="1"/>
+          <p:nvPr/>
+        </p:nvSpPr>
+        <p:spPr>
+          <a:xfrm>
+            <a:off x="7100711" y="5799724"/>
+            <a:ext cx="1551900" cy="400110"/>
+          </a:xfrm>
+          <a:prstGeom prst="rect">
+            <a:avLst/>
+          </a:prstGeom>
+          <a:noFill/>
+        </p:spPr>
+        <p:txBody>
+          <a:bodyPr wrap="none" rtlCol="0">
+            <a:spAutoFit/>
+          </a:bodyPr>
+          <a:lstStyle/>
+          <a:p>
+            <a:r>
+              <a:rPr lang="es-AR" sz="2000" dirty="0" smtClean="0">
+                <a:solidFill>
+                  <a:schemeClr val="accent4">
+                    <a:lumMod val="75000"/>
+                  </a:schemeClr>
+                </a:solidFill>
+              </a:rPr>
+              <a:t>Sublime Text</a:t>
+            </a:r>
+            <a:endParaRPr lang="es-AR" sz="2000" dirty="0">
+              <a:solidFill>
+                <a:schemeClr val="accent4">
+                  <a:lumMod val="75000"/>
+                </a:schemeClr>
+              </a:solidFill>
+            </a:endParaRPr>
+          </a:p>
+        </p:txBody>
+      </p:sp>
+      <p:sp>
+        <p:nvSpPr>
+          <p:cNvPr id="34" name="CuadroTexto 33"/>
+          <p:cNvSpPr txBox="1"/>
+          <p:nvPr/>
+        </p:nvSpPr>
+        <p:spPr>
+          <a:xfrm>
+            <a:off x="8646410" y="5799724"/>
+            <a:ext cx="1588897" cy="400110"/>
+          </a:xfrm>
+          <a:prstGeom prst="rect">
+            <a:avLst/>
+          </a:prstGeom>
+          <a:noFill/>
+        </p:spPr>
+        <p:txBody>
+          <a:bodyPr wrap="none" rtlCol="0">
+            <a:spAutoFit/>
+          </a:bodyPr>
+          <a:lstStyle/>
+          <a:p>
+            <a:r>
+              <a:rPr lang="es-AR" sz="2000" dirty="0" err="1" smtClean="0">
+                <a:solidFill>
+                  <a:schemeClr val="accent4">
+                    <a:lumMod val="75000"/>
+                  </a:schemeClr>
+                </a:solidFill>
+              </a:rPr>
+              <a:t>Summernote</a:t>
+            </a:r>
+            <a:endParaRPr lang="es-AR" sz="2000" dirty="0">
+              <a:solidFill>
+                <a:schemeClr val="accent4">
+                  <a:lumMod val="75000"/>
+                </a:schemeClr>
+              </a:solidFill>
+            </a:endParaRPr>
+          </a:p>
+        </p:txBody>
+      </p:sp>
+    </p:spTree>
+    <p:extLst>
+      <p:ext uri="{BB962C8B-B14F-4D97-AF65-F5344CB8AC3E}">
+        <p14:creationId xmlns:p14="http://schemas.microsoft.com/office/powerpoint/2010/main" val="2982195199"/>
+      </p:ext>
+    </p:extLst>
+  </p:cSld>
+  <p:clrMapOvr>
+    <a:masterClrMapping/>
+  </p:clrMapOvr>
+</p:sld>
+</file>
+
+<file path=ppt/slides/slide25.xml><?xml version="1.0" encoding="utf-8"?>
+<p:sld xmlns:a="http://schemas.openxmlformats.org/drawingml/2006/main" xmlns:r="http://schemas.openxmlformats.org/officeDocument/2006/relationships" xmlns:p="http://schemas.openxmlformats.org/presentationml/2006/main">
+  <p:cSld>
+    <p:spTree>
+      <p:nvGrpSpPr>
+        <p:cNvPr id="1" name=""/>
+        <p:cNvGrpSpPr/>
+        <p:nvPr/>
+      </p:nvGrpSpPr>
+      <p:grpSpPr>
+        <a:xfrm>
+          <a:off x="0" y="0"/>
+          <a:ext cx="0" cy="0"/>
+          <a:chOff x="0" y="0"/>
+          <a:chExt cx="0" cy="0"/>
+        </a:xfrm>
+      </p:grpSpPr>
+      <p:sp>
+        <p:nvSpPr>
+          <p:cNvPr id="4" name="Rectángulo 3">
+            <a:extLst>
+              <a:ext uri="{FF2B5EF4-FFF2-40B4-BE49-F238E27FC236}">
+                <a16:creationId xmlns:a16="http://schemas.microsoft.com/office/drawing/2014/main" id="{B0F1B4F4-0C7A-4C0E-8584-95718BC545EC}"/>
+              </a:ext>
+            </a:extLst>
+          </p:cNvPr>
+          <p:cNvSpPr/>
+          <p:nvPr/>
+        </p:nvSpPr>
+        <p:spPr>
+          <a:xfrm>
+            <a:off x="2366075" y="1577741"/>
+            <a:ext cx="9825925" cy="3416320"/>
+          </a:xfrm>
+          <a:prstGeom prst="rect">
+            <a:avLst/>
+          </a:prstGeom>
+          <a:noFill/>
+        </p:spPr>
+        <p:txBody>
+          <a:bodyPr wrap="square" lIns="91440" tIns="45720" rIns="91440" bIns="45720">
+            <a:spAutoFit/>
+          </a:bodyPr>
+          <a:lstStyle/>
+          <a:p>
+            <a:pPr algn="ctr"/>
+            <a:r>
+              <a:rPr lang="es-ES" sz="7200" b="1" dirty="0">
+                <a:ln w="0"/>
+                <a:solidFill>
+                  <a:schemeClr val="accent1"/>
+                </a:solidFill>
+                <a:effectLst>
+                  <a:outerShdw blurRad="38100" dist="25400" dir="5400000" algn="ctr" rotWithShape="0">
+                    <a:srgbClr val="6E747A">
+                      <a:alpha val="43000"/>
+                    </a:srgbClr>
+                  </a:outerShdw>
+                </a:effectLst>
+              </a:rPr>
+              <a:t>Características destacadas y mejoras a futuro</a:t>
+            </a:r>
+            <a:endParaRPr lang="es-ES" sz="7200" b="1" cap="none" spc="0" dirty="0">
+              <a:ln w="0"/>
+              <a:solidFill>
+                <a:schemeClr val="accent1"/>
+              </a:solidFill>
+              <a:effectLst>
+                <a:outerShdw blurRad="38100" dist="25400" dir="5400000" algn="ctr" rotWithShape="0">
+                  <a:srgbClr val="6E747A">
+                    <a:alpha val="43000"/>
+                  </a:srgbClr>
+                </a:outerShdw>
+              </a:effectLst>
+            </a:endParaRPr>
+          </a:p>
+        </p:txBody>
+      </p:sp>
+    </p:spTree>
+    <p:extLst>
+      <p:ext uri="{BB962C8B-B14F-4D97-AF65-F5344CB8AC3E}">
+        <p14:creationId xmlns:p14="http://schemas.microsoft.com/office/powerpoint/2010/main" val="115837642"/>
+      </p:ext>
+    </p:extLst>
+  </p:cSld>
+  <p:clrMapOvr>
+    <a:masterClrMapping/>
+  </p:clrMapOvr>
+</p:sld>
+</file>
+
+<file path=ppt/slides/slide26.xml><?xml version="1.0" encoding="utf-8"?>
+<p:sld xmlns:a="http://schemas.openxmlformats.org/drawingml/2006/main" xmlns:r="http://schemas.openxmlformats.org/officeDocument/2006/relationships" xmlns:p="http://schemas.openxmlformats.org/presentationml/2006/main">
+  <p:cSld>
+    <p:spTree>
+      <p:nvGrpSpPr>
+        <p:cNvPr id="1" name=""/>
+        <p:cNvGrpSpPr/>
+        <p:nvPr/>
+      </p:nvGrpSpPr>
+      <p:grpSpPr>
+        <a:xfrm>
+          <a:off x="0" y="0"/>
+          <a:ext cx="0" cy="0"/>
+          <a:chOff x="0" y="0"/>
+          <a:chExt cx="0" cy="0"/>
+        </a:xfrm>
+      </p:grpSpPr>
+      <p:sp>
+        <p:nvSpPr>
+          <p:cNvPr id="4" name="Rectángulo 3">
+            <a:extLst>
+              <a:ext uri="{FF2B5EF4-FFF2-40B4-BE49-F238E27FC236}">
+                <a16:creationId xmlns:a16="http://schemas.microsoft.com/office/drawing/2014/main" id="{B0F1B4F4-0C7A-4C0E-8584-95718BC545EC}"/>
               </a:ext>
             </a:extLst>
           </p:cNvPr>
@@ -11977,17 +13280,24 @@
     </p:spTree>
     <p:extLst>
       <p:ext uri="{BB962C8B-B14F-4D97-AF65-F5344CB8AC3E}">
-        <p14:creationId xmlns:p14="http://schemas.microsoft.com/office/powerpoint/2010/main" xmlns="" val="115837642"/>
+        <p14:creationId xmlns:p14="http://schemas.microsoft.com/office/powerpoint/2010/main" val="115837642"/>
       </p:ext>
     </p:extLst>
   </p:cSld>
   <p:clrMapOvr>
     <a:masterClrMapping/>
   </p:clrMapOvr>
+  <p:timing>
+    <p:tnLst>
+      <p:par>
+        <p:cTn id="1" dur="indefinite" restart="never" nodeType="tmRoot"/>
+      </p:par>
+    </p:tnLst>
+  </p:timing>
 </p:sld>
 </file>
 
-<file path=ppt/slides/slide24.xml><?xml version="1.0" encoding="utf-8"?>
+<file path=ppt/slides/slide27.xml><?xml version="1.0" encoding="utf-8"?>
 <p:sld xmlns:a="http://schemas.openxmlformats.org/drawingml/2006/main" xmlns:r="http://schemas.openxmlformats.org/officeDocument/2006/relationships" xmlns:p="http://schemas.openxmlformats.org/presentationml/2006/main">
   <p:cSld>
     <p:spTree>
@@ -12069,10 +13379,17 @@
   <p:clrMapOvr>
     <a:masterClrMapping/>
   </p:clrMapOvr>
+  <p:timing>
+    <p:tnLst>
+      <p:par>
+        <p:cTn id="1" dur="indefinite" restart="never" nodeType="tmRoot"/>
+      </p:par>
+    </p:tnLst>
+  </p:timing>
 </p:sld>
 </file>
 
-<file path=ppt/slides/slide25.xml><?xml version="1.0" encoding="utf-8"?>
+<file path=ppt/slides/slide28.xml><?xml version="1.0" encoding="utf-8"?>
 <p:sld xmlns:a="http://schemas.openxmlformats.org/drawingml/2006/main" xmlns:r="http://schemas.openxmlformats.org/officeDocument/2006/relationships" xmlns:p="http://schemas.openxmlformats.org/presentationml/2006/main">
   <p:cSld>
     <p:spTree>
@@ -12094,7 +13411,7 @@
           <p:cNvPr id="4" name="Rectángulo 3">
             <a:extLst>
               <a:ext uri="{FF2B5EF4-FFF2-40B4-BE49-F238E27FC236}">
-                <a16:creationId xmlns:a16="http://schemas.microsoft.com/office/drawing/2014/main" xmlns="" id="{B0F1B4F4-0C7A-4C0E-8584-95718BC545EC}"/>
+                <a16:creationId xmlns:a16="http://schemas.microsoft.com/office/drawing/2014/main" id="{B0F1B4F4-0C7A-4C0E-8584-95718BC545EC}"/>
               </a:ext>
             </a:extLst>
           </p:cNvPr>
@@ -12153,17 +13470,24 @@
     </p:spTree>
     <p:extLst>
       <p:ext uri="{BB962C8B-B14F-4D97-AF65-F5344CB8AC3E}">
-        <p14:creationId xmlns:p14="http://schemas.microsoft.com/office/powerpoint/2010/main" xmlns="" val="3888593392"/>
+        <p14:creationId xmlns:p14="http://schemas.microsoft.com/office/powerpoint/2010/main" val="3888593392"/>
       </p:ext>
     </p:extLst>
   </p:cSld>
   <p:clrMapOvr>
     <a:masterClrMapping/>
   </p:clrMapOvr>
+  <p:timing>
+    <p:tnLst>
+      <p:par>
+        <p:cTn id="1" dur="indefinite" restart="never" nodeType="tmRoot"/>
+      </p:par>
+    </p:tnLst>
+  </p:timing>
 </p:sld>
 </file>
 
-<file path=ppt/slides/slide26.xml><?xml version="1.0" encoding="utf-8"?>
+<file path=ppt/slides/slide29.xml><?xml version="1.0" encoding="utf-8"?>
 <p:sld xmlns:a="http://schemas.openxmlformats.org/drawingml/2006/main" xmlns:r="http://schemas.openxmlformats.org/officeDocument/2006/relationships" xmlns:p="http://schemas.openxmlformats.org/presentationml/2006/main">
   <p:cSld>
     <p:spTree>
@@ -12185,7 +13509,7 @@
           <p:cNvPr id="2" name="Título 1">
             <a:extLst>
               <a:ext uri="{FF2B5EF4-FFF2-40B4-BE49-F238E27FC236}">
-                <a16:creationId xmlns:a16="http://schemas.microsoft.com/office/drawing/2014/main" xmlns="" id="{0ED6D180-92C1-4333-BA91-2BBA4DD94A3B}"/>
+                <a16:creationId xmlns:a16="http://schemas.microsoft.com/office/drawing/2014/main" id="{0ED6D180-92C1-4333-BA91-2BBA4DD94A3B}"/>
               </a:ext>
             </a:extLst>
           </p:cNvPr>
@@ -12222,7 +13546,7 @@
           <p:cNvPr id="6" name="CuadroTexto 5">
             <a:extLst>
               <a:ext uri="{FF2B5EF4-FFF2-40B4-BE49-F238E27FC236}">
-                <a16:creationId xmlns:a16="http://schemas.microsoft.com/office/drawing/2014/main" xmlns="" id="{BC8D092D-6667-447D-B473-A50467138064}"/>
+                <a16:creationId xmlns:a16="http://schemas.microsoft.com/office/drawing/2014/main" id="{BC8D092D-6667-447D-B473-A50467138064}"/>
               </a:ext>
             </a:extLst>
           </p:cNvPr>
@@ -12373,136 +13697,7 @@
     </p:spTree>
     <p:extLst>
       <p:ext uri="{BB962C8B-B14F-4D97-AF65-F5344CB8AC3E}">
-        <p14:creationId xmlns:p14="http://schemas.microsoft.com/office/powerpoint/2010/main" xmlns="" val="2147726924"/>
-      </p:ext>
-    </p:extLst>
-  </p:cSld>
-  <p:clrMapOvr>
-    <a:masterClrMapping/>
-  </p:clrMapOvr>
-</p:sld>
-</file>
-
-<file path=ppt/slides/slide27.xml><?xml version="1.0" encoding="utf-8"?>
-<p:sld xmlns:a="http://schemas.openxmlformats.org/drawingml/2006/main" xmlns:r="http://schemas.openxmlformats.org/officeDocument/2006/relationships" xmlns:p="http://schemas.openxmlformats.org/presentationml/2006/main">
-  <p:cSld>
-    <p:spTree>
-      <p:nvGrpSpPr>
-        <p:cNvPr id="1" name=""/>
-        <p:cNvGrpSpPr/>
-        <p:nvPr/>
-      </p:nvGrpSpPr>
-      <p:grpSpPr>
-        <a:xfrm>
-          <a:off x="0" y="0"/>
-          <a:ext cx="0" cy="0"/>
-          <a:chOff x="0" y="0"/>
-          <a:chExt cx="0" cy="0"/>
-        </a:xfrm>
-      </p:grpSpPr>
-      <p:sp>
-        <p:nvSpPr>
-          <p:cNvPr id="4" name="Rectángulo 3">
-            <a:extLst>
-              <a:ext uri="{FF2B5EF4-FFF2-40B4-BE49-F238E27FC236}">
-                <a16:creationId xmlns:a16="http://schemas.microsoft.com/office/drawing/2014/main" xmlns="" id="{B0F1B4F4-0C7A-4C0E-8584-95718BC545EC}"/>
-              </a:ext>
-            </a:extLst>
-          </p:cNvPr>
-          <p:cNvSpPr/>
-          <p:nvPr/>
-        </p:nvSpPr>
-        <p:spPr>
-          <a:xfrm rot="20412167">
-            <a:off x="3988076" y="2403824"/>
-            <a:ext cx="6633581" cy="1107996"/>
-          </a:xfrm>
-          <a:prstGeom prst="rect">
-            <a:avLst/>
-          </a:prstGeom>
-          <a:noFill/>
-        </p:spPr>
-        <p:txBody>
-          <a:bodyPr wrap="square" lIns="91440" tIns="45720" rIns="91440" bIns="45720">
-            <a:spAutoFit/>
-          </a:bodyPr>
-          <a:lstStyle/>
-          <a:p>
-            <a:pPr algn="ctr"/>
-            <a:r>
-              <a:rPr lang="es-ES" sz="6600" b="1" dirty="0">
-                <a:ln w="0"/>
-                <a:solidFill>
-                  <a:schemeClr val="accent1"/>
-                </a:solidFill>
-                <a:effectLst>
-                  <a:outerShdw blurRad="38100" dist="25400" dir="5400000" algn="ctr" rotWithShape="0">
-                    <a:srgbClr val="6E747A">
-                      <a:alpha val="43000"/>
-                    </a:srgbClr>
-                  </a:outerShdw>
-                </a:effectLst>
-              </a:rPr>
-              <a:t>¡</a:t>
-            </a:r>
-            <a:r>
-              <a:rPr lang="es-ES" sz="6600" b="1" cap="none" spc="0" dirty="0">
-                <a:ln w="0"/>
-                <a:solidFill>
-                  <a:schemeClr val="accent1"/>
-                </a:solidFill>
-                <a:effectLst>
-                  <a:outerShdw blurRad="38100" dist="25400" dir="5400000" algn="ctr" rotWithShape="0">
-                    <a:srgbClr val="6E747A">
-                      <a:alpha val="43000"/>
-                    </a:srgbClr>
-                  </a:outerShdw>
-                </a:effectLst>
-              </a:rPr>
-              <a:t>Muchas gracias!</a:t>
-            </a:r>
-          </a:p>
-        </p:txBody>
-      </p:sp>
-      <p:sp>
-        <p:nvSpPr>
-          <p:cNvPr id="2" name="CuadroTexto 1">
-            <a:extLst>
-              <a:ext uri="{FF2B5EF4-FFF2-40B4-BE49-F238E27FC236}">
-                <a16:creationId xmlns:a16="http://schemas.microsoft.com/office/drawing/2014/main" xmlns="" id="{BBF285E2-50A8-4654-BD24-220C20D7C57B}"/>
-              </a:ext>
-            </a:extLst>
-          </p:cNvPr>
-          <p:cNvSpPr txBox="1"/>
-          <p:nvPr/>
-        </p:nvSpPr>
-        <p:spPr>
-          <a:xfrm>
-            <a:off x="7202660" y="5767753"/>
-            <a:ext cx="4740812" cy="400110"/>
-          </a:xfrm>
-          <a:prstGeom prst="rect">
-            <a:avLst/>
-          </a:prstGeom>
-          <a:noFill/>
-        </p:spPr>
-        <p:txBody>
-          <a:bodyPr wrap="square" rtlCol="0">
-            <a:spAutoFit/>
-          </a:bodyPr>
-          <a:lstStyle/>
-          <a:p>
-            <a:r>
-              <a:rPr lang="es-AR" sz="2000" b="1" dirty="0"/>
-              <a:t>https://github.com/fge23/Sistema-VASPA</a:t>
-            </a:r>
-          </a:p>
-        </p:txBody>
-      </p:sp>
-    </p:spTree>
-    <p:extLst>
-      <p:ext uri="{BB962C8B-B14F-4D97-AF65-F5344CB8AC3E}">
-        <p14:creationId xmlns:p14="http://schemas.microsoft.com/office/powerpoint/2010/main" xmlns="" val="3442063561"/>
+        <p14:creationId xmlns:p14="http://schemas.microsoft.com/office/powerpoint/2010/main" val="2147726924"/>
       </p:ext>
     </p:extLst>
   </p:cSld>
@@ -12534,7 +13729,7 @@
           <p:cNvPr id="4" name="Título 3">
             <a:extLst>
               <a:ext uri="{FF2B5EF4-FFF2-40B4-BE49-F238E27FC236}">
-                <a16:creationId xmlns:a16="http://schemas.microsoft.com/office/drawing/2014/main" xmlns="" id="{FA4EADB5-92CE-4B25-BE21-7FC484AE680E}"/>
+                <a16:creationId xmlns:a16="http://schemas.microsoft.com/office/drawing/2014/main" id="{FA4EADB5-92CE-4B25-BE21-7FC484AE680E}"/>
               </a:ext>
             </a:extLst>
           </p:cNvPr>
@@ -12572,7 +13767,7 @@
           <p:cNvPr id="5" name="Subtítulo 4">
             <a:extLst>
               <a:ext uri="{FF2B5EF4-FFF2-40B4-BE49-F238E27FC236}">
-                <a16:creationId xmlns:a16="http://schemas.microsoft.com/office/drawing/2014/main" xmlns="" id="{7035CB29-6D24-4E02-AC9F-07DC0DE9312C}"/>
+                <a16:creationId xmlns:a16="http://schemas.microsoft.com/office/drawing/2014/main" id="{7035CB29-6D24-4E02-AC9F-07DC0DE9312C}"/>
               </a:ext>
             </a:extLst>
           </p:cNvPr>
@@ -12695,7 +13890,136 @@
     </p:spTree>
     <p:extLst>
       <p:ext uri="{BB962C8B-B14F-4D97-AF65-F5344CB8AC3E}">
-        <p14:creationId xmlns:p14="http://schemas.microsoft.com/office/powerpoint/2010/main" xmlns="" val="503208862"/>
+        <p14:creationId xmlns:p14="http://schemas.microsoft.com/office/powerpoint/2010/main" val="503208862"/>
+      </p:ext>
+    </p:extLst>
+  </p:cSld>
+  <p:clrMapOvr>
+    <a:masterClrMapping/>
+  </p:clrMapOvr>
+</p:sld>
+</file>
+
+<file path=ppt/slides/slide30.xml><?xml version="1.0" encoding="utf-8"?>
+<p:sld xmlns:a="http://schemas.openxmlformats.org/drawingml/2006/main" xmlns:r="http://schemas.openxmlformats.org/officeDocument/2006/relationships" xmlns:p="http://schemas.openxmlformats.org/presentationml/2006/main">
+  <p:cSld>
+    <p:spTree>
+      <p:nvGrpSpPr>
+        <p:cNvPr id="1" name=""/>
+        <p:cNvGrpSpPr/>
+        <p:nvPr/>
+      </p:nvGrpSpPr>
+      <p:grpSpPr>
+        <a:xfrm>
+          <a:off x="0" y="0"/>
+          <a:ext cx="0" cy="0"/>
+          <a:chOff x="0" y="0"/>
+          <a:chExt cx="0" cy="0"/>
+        </a:xfrm>
+      </p:grpSpPr>
+      <p:sp>
+        <p:nvSpPr>
+          <p:cNvPr id="4" name="Rectángulo 3">
+            <a:extLst>
+              <a:ext uri="{FF2B5EF4-FFF2-40B4-BE49-F238E27FC236}">
+                <a16:creationId xmlns:a16="http://schemas.microsoft.com/office/drawing/2014/main" id="{B0F1B4F4-0C7A-4C0E-8584-95718BC545EC}"/>
+              </a:ext>
+            </a:extLst>
+          </p:cNvPr>
+          <p:cNvSpPr/>
+          <p:nvPr/>
+        </p:nvSpPr>
+        <p:spPr>
+          <a:xfrm rot="20412167">
+            <a:off x="3988076" y="2403824"/>
+            <a:ext cx="6633581" cy="1107996"/>
+          </a:xfrm>
+          <a:prstGeom prst="rect">
+            <a:avLst/>
+          </a:prstGeom>
+          <a:noFill/>
+        </p:spPr>
+        <p:txBody>
+          <a:bodyPr wrap="square" lIns="91440" tIns="45720" rIns="91440" bIns="45720">
+            <a:spAutoFit/>
+          </a:bodyPr>
+          <a:lstStyle/>
+          <a:p>
+            <a:pPr algn="ctr"/>
+            <a:r>
+              <a:rPr lang="es-ES" sz="6600" b="1" dirty="0">
+                <a:ln w="0"/>
+                <a:solidFill>
+                  <a:schemeClr val="accent1"/>
+                </a:solidFill>
+                <a:effectLst>
+                  <a:outerShdw blurRad="38100" dist="25400" dir="5400000" algn="ctr" rotWithShape="0">
+                    <a:srgbClr val="6E747A">
+                      <a:alpha val="43000"/>
+                    </a:srgbClr>
+                  </a:outerShdw>
+                </a:effectLst>
+              </a:rPr>
+              <a:t>¡</a:t>
+            </a:r>
+            <a:r>
+              <a:rPr lang="es-ES" sz="6600" b="1" cap="none" spc="0" dirty="0">
+                <a:ln w="0"/>
+                <a:solidFill>
+                  <a:schemeClr val="accent1"/>
+                </a:solidFill>
+                <a:effectLst>
+                  <a:outerShdw blurRad="38100" dist="25400" dir="5400000" algn="ctr" rotWithShape="0">
+                    <a:srgbClr val="6E747A">
+                      <a:alpha val="43000"/>
+                    </a:srgbClr>
+                  </a:outerShdw>
+                </a:effectLst>
+              </a:rPr>
+              <a:t>Muchas gracias!</a:t>
+            </a:r>
+          </a:p>
+        </p:txBody>
+      </p:sp>
+      <p:sp>
+        <p:nvSpPr>
+          <p:cNvPr id="2" name="CuadroTexto 1">
+            <a:extLst>
+              <a:ext uri="{FF2B5EF4-FFF2-40B4-BE49-F238E27FC236}">
+                <a16:creationId xmlns:a16="http://schemas.microsoft.com/office/drawing/2014/main" id="{BBF285E2-50A8-4654-BD24-220C20D7C57B}"/>
+              </a:ext>
+            </a:extLst>
+          </p:cNvPr>
+          <p:cNvSpPr txBox="1"/>
+          <p:nvPr/>
+        </p:nvSpPr>
+        <p:spPr>
+          <a:xfrm>
+            <a:off x="7202660" y="5767753"/>
+            <a:ext cx="4740812" cy="400110"/>
+          </a:xfrm>
+          <a:prstGeom prst="rect">
+            <a:avLst/>
+          </a:prstGeom>
+          <a:noFill/>
+        </p:spPr>
+        <p:txBody>
+          <a:bodyPr wrap="square" rtlCol="0">
+            <a:spAutoFit/>
+          </a:bodyPr>
+          <a:lstStyle/>
+          <a:p>
+            <a:r>
+              <a:rPr lang="es-AR" sz="2000" b="1" dirty="0"/>
+              <a:t>https://github.com/fge23/Sistema-VASPA</a:t>
+            </a:r>
+          </a:p>
+        </p:txBody>
+      </p:sp>
+    </p:spTree>
+    <p:extLst>
+      <p:ext uri="{BB962C8B-B14F-4D97-AF65-F5344CB8AC3E}">
+        <p14:creationId xmlns:p14="http://schemas.microsoft.com/office/powerpoint/2010/main" val="3442063561"/>
       </p:ext>
     </p:extLst>
   </p:cSld>
@@ -12727,7 +14051,7 @@
           <p:cNvPr id="4" name="Título 3">
             <a:extLst>
               <a:ext uri="{FF2B5EF4-FFF2-40B4-BE49-F238E27FC236}">
-                <a16:creationId xmlns:a16="http://schemas.microsoft.com/office/drawing/2014/main" xmlns="" id="{FA4EADB5-92CE-4B25-BE21-7FC484AE680E}"/>
+                <a16:creationId xmlns:a16="http://schemas.microsoft.com/office/drawing/2014/main" id="{FA4EADB5-92CE-4B25-BE21-7FC484AE680E}"/>
               </a:ext>
             </a:extLst>
           </p:cNvPr>
@@ -12764,7 +14088,7 @@
           <p:cNvPr id="5" name="Subtítulo 4">
             <a:extLst>
               <a:ext uri="{FF2B5EF4-FFF2-40B4-BE49-F238E27FC236}">
-                <a16:creationId xmlns:a16="http://schemas.microsoft.com/office/drawing/2014/main" xmlns="" id="{7035CB29-6D24-4E02-AC9F-07DC0DE9312C}"/>
+                <a16:creationId xmlns:a16="http://schemas.microsoft.com/office/drawing/2014/main" id="{7035CB29-6D24-4E02-AC9F-07DC0DE9312C}"/>
               </a:ext>
             </a:extLst>
           </p:cNvPr>
@@ -12878,7 +14202,7 @@
           <p:cNvPr id="6" name="Imagen 5">
             <a:extLst>
               <a:ext uri="{FF2B5EF4-FFF2-40B4-BE49-F238E27FC236}">
-                <a16:creationId xmlns:a16="http://schemas.microsoft.com/office/drawing/2014/main" xmlns="" id="{D3E3C482-901A-431D-8EBF-659D1398387A}"/>
+                <a16:creationId xmlns:a16="http://schemas.microsoft.com/office/drawing/2014/main" id="{D3E3C482-901A-431D-8EBF-659D1398387A}"/>
               </a:ext>
             </a:extLst>
           </p:cNvPr>
@@ -12891,7 +14215,7 @@
           <a:blip r:embed="rId2" cstate="print">
             <a:extLst>
               <a:ext uri="{28A0092B-C50C-407E-A947-70E740481C1C}">
-                <a14:useLocalDpi xmlns:a14="http://schemas.microsoft.com/office/drawing/2010/main" xmlns="" val="0"/>
+                <a14:useLocalDpi xmlns:a14="http://schemas.microsoft.com/office/drawing/2010/main" val="0"/>
               </a:ext>
             </a:extLst>
           </a:blip>
@@ -12914,7 +14238,7 @@
           <p:cNvPr id="8" name="Imagen 7">
             <a:extLst>
               <a:ext uri="{FF2B5EF4-FFF2-40B4-BE49-F238E27FC236}">
-                <a16:creationId xmlns:a16="http://schemas.microsoft.com/office/drawing/2014/main" xmlns="" id="{F7FE4061-0AB6-4263-BAF9-1E3F442EB436}"/>
+                <a16:creationId xmlns:a16="http://schemas.microsoft.com/office/drawing/2014/main" id="{F7FE4061-0AB6-4263-BAF9-1E3F442EB436}"/>
               </a:ext>
             </a:extLst>
           </p:cNvPr>
@@ -12927,7 +14251,7 @@
           <a:blip r:embed="rId3" cstate="print">
             <a:extLst>
               <a:ext uri="{28A0092B-C50C-407E-A947-70E740481C1C}">
-                <a14:useLocalDpi xmlns:a14="http://schemas.microsoft.com/office/drawing/2010/main" xmlns="" val="0"/>
+                <a14:useLocalDpi xmlns:a14="http://schemas.microsoft.com/office/drawing/2010/main" val="0"/>
               </a:ext>
             </a:extLst>
           </a:blip>
@@ -12950,7 +14274,7 @@
           <p:cNvPr id="10" name="Imagen 9">
             <a:extLst>
               <a:ext uri="{FF2B5EF4-FFF2-40B4-BE49-F238E27FC236}">
-                <a16:creationId xmlns:a16="http://schemas.microsoft.com/office/drawing/2014/main" xmlns="" id="{9E93C3DC-EA10-4E41-BDEF-6D23E1C605A2}"/>
+                <a16:creationId xmlns:a16="http://schemas.microsoft.com/office/drawing/2014/main" id="{9E93C3DC-EA10-4E41-BDEF-6D23E1C605A2}"/>
               </a:ext>
             </a:extLst>
           </p:cNvPr>
@@ -12963,7 +14287,7 @@
           <a:blip r:embed="rId4" cstate="print">
             <a:extLst>
               <a:ext uri="{28A0092B-C50C-407E-A947-70E740481C1C}">
-                <a14:useLocalDpi xmlns:a14="http://schemas.microsoft.com/office/drawing/2010/main" xmlns="" val="0"/>
+                <a14:useLocalDpi xmlns:a14="http://schemas.microsoft.com/office/drawing/2010/main" val="0"/>
               </a:ext>
             </a:extLst>
           </a:blip>
@@ -12986,7 +14310,7 @@
           <p:cNvPr id="18" name="Imagen 17">
             <a:extLst>
               <a:ext uri="{FF2B5EF4-FFF2-40B4-BE49-F238E27FC236}">
-                <a16:creationId xmlns:a16="http://schemas.microsoft.com/office/drawing/2014/main" xmlns="" id="{8646EEDC-88A1-4D49-A526-A92135A622F0}"/>
+                <a16:creationId xmlns:a16="http://schemas.microsoft.com/office/drawing/2014/main" id="{8646EEDC-88A1-4D49-A526-A92135A622F0}"/>
               </a:ext>
             </a:extLst>
           </p:cNvPr>
@@ -12999,7 +14323,7 @@
           <a:blip r:embed="rId5" cstate="print">
             <a:extLst>
               <a:ext uri="{28A0092B-C50C-407E-A947-70E740481C1C}">
-                <a14:useLocalDpi xmlns:a14="http://schemas.microsoft.com/office/drawing/2010/main" xmlns="" val="0"/>
+                <a14:useLocalDpi xmlns:a14="http://schemas.microsoft.com/office/drawing/2010/main" val="0"/>
               </a:ext>
             </a:extLst>
           </a:blip>
@@ -13022,7 +14346,7 @@
           <p:cNvPr id="20" name="Imagen 19">
             <a:extLst>
               <a:ext uri="{FF2B5EF4-FFF2-40B4-BE49-F238E27FC236}">
-                <a16:creationId xmlns:a16="http://schemas.microsoft.com/office/drawing/2014/main" xmlns="" id="{4A2D40FB-590B-4A55-B259-6C3ECBBC258F}"/>
+                <a16:creationId xmlns:a16="http://schemas.microsoft.com/office/drawing/2014/main" id="{4A2D40FB-590B-4A55-B259-6C3ECBBC258F}"/>
               </a:ext>
             </a:extLst>
           </p:cNvPr>
@@ -13035,7 +14359,7 @@
           <a:blip r:embed="rId6" cstate="print">
             <a:extLst>
               <a:ext uri="{28A0092B-C50C-407E-A947-70E740481C1C}">
-                <a14:useLocalDpi xmlns:a14="http://schemas.microsoft.com/office/drawing/2010/main" xmlns="" val="0"/>
+                <a14:useLocalDpi xmlns:a14="http://schemas.microsoft.com/office/drawing/2010/main" val="0"/>
               </a:ext>
             </a:extLst>
           </a:blip>
@@ -13058,7 +14382,7 @@
           <p:cNvPr id="22" name="Imagen 21">
             <a:extLst>
               <a:ext uri="{FF2B5EF4-FFF2-40B4-BE49-F238E27FC236}">
-                <a16:creationId xmlns:a16="http://schemas.microsoft.com/office/drawing/2014/main" xmlns="" id="{B2430BC3-AAE9-4FD6-9B04-9E1C8B7005EE}"/>
+                <a16:creationId xmlns:a16="http://schemas.microsoft.com/office/drawing/2014/main" id="{B2430BC3-AAE9-4FD6-9B04-9E1C8B7005EE}"/>
               </a:ext>
             </a:extLst>
           </p:cNvPr>
@@ -13071,7 +14395,7 @@
           <a:blip r:embed="rId7" cstate="print">
             <a:extLst>
               <a:ext uri="{28A0092B-C50C-407E-A947-70E740481C1C}">
-                <a14:useLocalDpi xmlns:a14="http://schemas.microsoft.com/office/drawing/2010/main" xmlns="" val="0"/>
+                <a14:useLocalDpi xmlns:a14="http://schemas.microsoft.com/office/drawing/2010/main" val="0"/>
               </a:ext>
             </a:extLst>
           </a:blip>
@@ -13094,7 +14418,7 @@
           <p:cNvPr id="25" name="Grupo 24">
             <a:extLst>
               <a:ext uri="{FF2B5EF4-FFF2-40B4-BE49-F238E27FC236}">
-                <a16:creationId xmlns:a16="http://schemas.microsoft.com/office/drawing/2014/main" xmlns="" id="{6FBCDE22-F651-45B0-99A1-055E6ABDF7ED}"/>
+                <a16:creationId xmlns:a16="http://schemas.microsoft.com/office/drawing/2014/main" id="{6FBCDE22-F651-45B0-99A1-055E6ABDF7ED}"/>
               </a:ext>
             </a:extLst>
           </p:cNvPr>
@@ -13114,7 +14438,7 @@
             <p:cNvPr id="12" name="Imagen 11">
               <a:extLst>
                 <a:ext uri="{FF2B5EF4-FFF2-40B4-BE49-F238E27FC236}">
-                  <a16:creationId xmlns:a16="http://schemas.microsoft.com/office/drawing/2014/main" xmlns="" id="{8EF366B3-0A5E-4158-883D-ADDFEF56C8D1}"/>
+                  <a16:creationId xmlns:a16="http://schemas.microsoft.com/office/drawing/2014/main" id="{8EF366B3-0A5E-4158-883D-ADDFEF56C8D1}"/>
                 </a:ext>
               </a:extLst>
             </p:cNvPr>
@@ -13127,7 +14451,7 @@
             <a:blip r:embed="rId8" cstate="print">
               <a:extLst>
                 <a:ext uri="{28A0092B-C50C-407E-A947-70E740481C1C}">
-                  <a14:useLocalDpi xmlns:a14="http://schemas.microsoft.com/office/drawing/2010/main" xmlns="" val="0"/>
+                  <a14:useLocalDpi xmlns:a14="http://schemas.microsoft.com/office/drawing/2010/main" val="0"/>
                 </a:ext>
               </a:extLst>
             </a:blip>
@@ -13150,7 +14474,7 @@
             <p:cNvPr id="14" name="Imagen 13">
               <a:extLst>
                 <a:ext uri="{FF2B5EF4-FFF2-40B4-BE49-F238E27FC236}">
-                  <a16:creationId xmlns:a16="http://schemas.microsoft.com/office/drawing/2014/main" xmlns="" id="{16FD14F2-15D3-4DD2-9D3C-D16633A69E32}"/>
+                  <a16:creationId xmlns:a16="http://schemas.microsoft.com/office/drawing/2014/main" id="{16FD14F2-15D3-4DD2-9D3C-D16633A69E32}"/>
                 </a:ext>
               </a:extLst>
             </p:cNvPr>
@@ -13163,7 +14487,7 @@
             <a:blip r:embed="rId9" cstate="print">
               <a:extLst>
                 <a:ext uri="{28A0092B-C50C-407E-A947-70E740481C1C}">
-                  <a14:useLocalDpi xmlns:a14="http://schemas.microsoft.com/office/drawing/2010/main" xmlns="" val="0"/>
+                  <a14:useLocalDpi xmlns:a14="http://schemas.microsoft.com/office/drawing/2010/main" val="0"/>
                 </a:ext>
               </a:extLst>
             </a:blip>
@@ -13186,7 +14510,7 @@
             <p:cNvPr id="16" name="Imagen 15">
               <a:extLst>
                 <a:ext uri="{FF2B5EF4-FFF2-40B4-BE49-F238E27FC236}">
-                  <a16:creationId xmlns:a16="http://schemas.microsoft.com/office/drawing/2014/main" xmlns="" id="{F8D896A9-662E-4D9F-A70A-6AAF6F5C524E}"/>
+                  <a16:creationId xmlns:a16="http://schemas.microsoft.com/office/drawing/2014/main" id="{F8D896A9-662E-4D9F-A70A-6AAF6F5C524E}"/>
                 </a:ext>
               </a:extLst>
             </p:cNvPr>
@@ -13199,7 +14523,7 @@
             <a:blip r:embed="rId10" cstate="print">
               <a:extLst>
                 <a:ext uri="{28A0092B-C50C-407E-A947-70E740481C1C}">
-                  <a14:useLocalDpi xmlns:a14="http://schemas.microsoft.com/office/drawing/2010/main" xmlns="" val="0"/>
+                  <a14:useLocalDpi xmlns:a14="http://schemas.microsoft.com/office/drawing/2010/main" val="0"/>
                 </a:ext>
               </a:extLst>
             </a:blip>
@@ -13222,7 +14546,7 @@
             <p:cNvPr id="24" name="Imagen 23">
               <a:extLst>
                 <a:ext uri="{FF2B5EF4-FFF2-40B4-BE49-F238E27FC236}">
-                  <a16:creationId xmlns:a16="http://schemas.microsoft.com/office/drawing/2014/main" xmlns="" id="{34384560-A72D-4409-8A84-1ED46309C9E6}"/>
+                  <a16:creationId xmlns:a16="http://schemas.microsoft.com/office/drawing/2014/main" id="{34384560-A72D-4409-8A84-1ED46309C9E6}"/>
                 </a:ext>
               </a:extLst>
             </p:cNvPr>
@@ -13235,7 +14559,7 @@
             <a:blip r:embed="rId11" cstate="print">
               <a:extLst>
                 <a:ext uri="{28A0092B-C50C-407E-A947-70E740481C1C}">
-                  <a14:useLocalDpi xmlns:a14="http://schemas.microsoft.com/office/drawing/2010/main" xmlns="" val="0"/>
+                  <a14:useLocalDpi xmlns:a14="http://schemas.microsoft.com/office/drawing/2010/main" val="0"/>
                 </a:ext>
               </a:extLst>
             </a:blip>
@@ -13257,7 +14581,7 @@
     </p:spTree>
     <p:extLst>
       <p:ext uri="{BB962C8B-B14F-4D97-AF65-F5344CB8AC3E}">
-        <p14:creationId xmlns:p14="http://schemas.microsoft.com/office/powerpoint/2010/main" xmlns="" val="2893191071"/>
+        <p14:creationId xmlns:p14="http://schemas.microsoft.com/office/powerpoint/2010/main" val="2893191071"/>
       </p:ext>
     </p:extLst>
   </p:cSld>
@@ -13289,7 +14613,7 @@
           <p:cNvPr id="2" name="Título 1">
             <a:extLst>
               <a:ext uri="{FF2B5EF4-FFF2-40B4-BE49-F238E27FC236}">
-                <a16:creationId xmlns:a16="http://schemas.microsoft.com/office/drawing/2014/main" xmlns="" id="{0ED6D180-92C1-4333-BA91-2BBA4DD94A3B}"/>
+                <a16:creationId xmlns:a16="http://schemas.microsoft.com/office/drawing/2014/main" id="{0ED6D180-92C1-4333-BA91-2BBA4DD94A3B}"/>
               </a:ext>
             </a:extLst>
           </p:cNvPr>
@@ -13326,7 +14650,7 @@
           <p:cNvPr id="9" name="Elipse 8">
             <a:extLst>
               <a:ext uri="{FF2B5EF4-FFF2-40B4-BE49-F238E27FC236}">
-                <a16:creationId xmlns:a16="http://schemas.microsoft.com/office/drawing/2014/main" xmlns="" id="{669363E3-65EC-4B6C-B5A2-86799758077C}"/>
+                <a16:creationId xmlns:a16="http://schemas.microsoft.com/office/drawing/2014/main" id="{669363E3-65EC-4B6C-B5A2-86799758077C}"/>
               </a:ext>
             </a:extLst>
           </p:cNvPr>
@@ -13372,7 +14696,7 @@
           <p:cNvPr id="13" name="Elipse 12">
             <a:extLst>
               <a:ext uri="{FF2B5EF4-FFF2-40B4-BE49-F238E27FC236}">
-                <a16:creationId xmlns:a16="http://schemas.microsoft.com/office/drawing/2014/main" xmlns="" id="{8A714D8D-DDD7-450D-B61B-0A361401E840}"/>
+                <a16:creationId xmlns:a16="http://schemas.microsoft.com/office/drawing/2014/main" id="{8A714D8D-DDD7-450D-B61B-0A361401E840}"/>
               </a:ext>
             </a:extLst>
           </p:cNvPr>
@@ -13418,7 +14742,7 @@
           <p:cNvPr id="15" name="CuadroTexto 14">
             <a:extLst>
               <a:ext uri="{FF2B5EF4-FFF2-40B4-BE49-F238E27FC236}">
-                <a16:creationId xmlns:a16="http://schemas.microsoft.com/office/drawing/2014/main" xmlns="" id="{69C0BCF2-7C39-4E40-9C2B-2198580F3E40}"/>
+                <a16:creationId xmlns:a16="http://schemas.microsoft.com/office/drawing/2014/main" id="{69C0BCF2-7C39-4E40-9C2B-2198580F3E40}"/>
               </a:ext>
             </a:extLst>
           </p:cNvPr>
@@ -13465,7 +14789,7 @@
           <p:cNvPr id="17" name="CuadroTexto 16">
             <a:extLst>
               <a:ext uri="{FF2B5EF4-FFF2-40B4-BE49-F238E27FC236}">
-                <a16:creationId xmlns:a16="http://schemas.microsoft.com/office/drawing/2014/main" xmlns="" id="{F0BB235C-3047-4EFA-8B74-0EE023A1B6DF}"/>
+                <a16:creationId xmlns:a16="http://schemas.microsoft.com/office/drawing/2014/main" id="{F0BB235C-3047-4EFA-8B74-0EE023A1B6DF}"/>
               </a:ext>
             </a:extLst>
           </p:cNvPr>
@@ -13510,7 +14834,7 @@
     </p:spTree>
     <p:extLst>
       <p:ext uri="{BB962C8B-B14F-4D97-AF65-F5344CB8AC3E}">
-        <p14:creationId xmlns:p14="http://schemas.microsoft.com/office/powerpoint/2010/main" xmlns="" val="779257163"/>
+        <p14:creationId xmlns:p14="http://schemas.microsoft.com/office/powerpoint/2010/main" val="779257163"/>
       </p:ext>
     </p:extLst>
   </p:cSld>
@@ -13542,7 +14866,7 @@
           <p:cNvPr id="4" name="Rectángulo 3">
             <a:extLst>
               <a:ext uri="{FF2B5EF4-FFF2-40B4-BE49-F238E27FC236}">
-                <a16:creationId xmlns:a16="http://schemas.microsoft.com/office/drawing/2014/main" xmlns="" id="{B0F1B4F4-0C7A-4C0E-8584-95718BC545EC}"/>
+                <a16:creationId xmlns:a16="http://schemas.microsoft.com/office/drawing/2014/main" id="{B0F1B4F4-0C7A-4C0E-8584-95718BC545EC}"/>
               </a:ext>
             </a:extLst>
           </p:cNvPr>
@@ -13601,7 +14925,7 @@
     </p:spTree>
     <p:extLst>
       <p:ext uri="{BB962C8B-B14F-4D97-AF65-F5344CB8AC3E}">
-        <p14:creationId xmlns:p14="http://schemas.microsoft.com/office/powerpoint/2010/main" xmlns="" val="4228125147"/>
+        <p14:creationId xmlns:p14="http://schemas.microsoft.com/office/powerpoint/2010/main" val="4228125147"/>
       </p:ext>
     </p:extLst>
   </p:cSld>
@@ -13633,7 +14957,7 @@
           <p:cNvPr id="2" name="Título 1">
             <a:extLst>
               <a:ext uri="{FF2B5EF4-FFF2-40B4-BE49-F238E27FC236}">
-                <a16:creationId xmlns:a16="http://schemas.microsoft.com/office/drawing/2014/main" xmlns="" id="{0ED6D180-92C1-4333-BA91-2BBA4DD94A3B}"/>
+                <a16:creationId xmlns:a16="http://schemas.microsoft.com/office/drawing/2014/main" id="{0ED6D180-92C1-4333-BA91-2BBA4DD94A3B}"/>
               </a:ext>
             </a:extLst>
           </p:cNvPr>
@@ -13670,7 +14994,7 @@
           <p:cNvPr id="4" name="CuadroTexto 3">
             <a:extLst>
               <a:ext uri="{FF2B5EF4-FFF2-40B4-BE49-F238E27FC236}">
-                <a16:creationId xmlns:a16="http://schemas.microsoft.com/office/drawing/2014/main" xmlns="" id="{077AD978-631F-4986-B928-CABD7DCA36D6}"/>
+                <a16:creationId xmlns:a16="http://schemas.microsoft.com/office/drawing/2014/main" id="{077AD978-631F-4986-B928-CABD7DCA36D6}"/>
               </a:ext>
             </a:extLst>
           </p:cNvPr>
@@ -13818,7 +15142,7 @@
     </p:spTree>
     <p:extLst>
       <p:ext uri="{BB962C8B-B14F-4D97-AF65-F5344CB8AC3E}">
-        <p14:creationId xmlns:p14="http://schemas.microsoft.com/office/powerpoint/2010/main" xmlns="" val="3252879309"/>
+        <p14:creationId xmlns:p14="http://schemas.microsoft.com/office/powerpoint/2010/main" val="3252879309"/>
       </p:ext>
     </p:extLst>
   </p:cSld>
@@ -13850,7 +15174,7 @@
           <p:cNvPr id="2" name="Título 1">
             <a:extLst>
               <a:ext uri="{FF2B5EF4-FFF2-40B4-BE49-F238E27FC236}">
-                <a16:creationId xmlns:a16="http://schemas.microsoft.com/office/drawing/2014/main" xmlns="" id="{0ED6D180-92C1-4333-BA91-2BBA4DD94A3B}"/>
+                <a16:creationId xmlns:a16="http://schemas.microsoft.com/office/drawing/2014/main" id="{0ED6D180-92C1-4333-BA91-2BBA4DD94A3B}"/>
               </a:ext>
             </a:extLst>
           </p:cNvPr>
@@ -13887,7 +15211,7 @@
           <p:cNvPr id="6" name="CuadroTexto 5">
             <a:extLst>
               <a:ext uri="{FF2B5EF4-FFF2-40B4-BE49-F238E27FC236}">
-                <a16:creationId xmlns:a16="http://schemas.microsoft.com/office/drawing/2014/main" xmlns="" id="{BC8D092D-6667-447D-B473-A50467138064}"/>
+                <a16:creationId xmlns:a16="http://schemas.microsoft.com/office/drawing/2014/main" id="{BC8D092D-6667-447D-B473-A50467138064}"/>
               </a:ext>
             </a:extLst>
           </p:cNvPr>
@@ -13993,7 +15317,7 @@
     </p:spTree>
     <p:extLst>
       <p:ext uri="{BB962C8B-B14F-4D97-AF65-F5344CB8AC3E}">
-        <p14:creationId xmlns:p14="http://schemas.microsoft.com/office/powerpoint/2010/main" xmlns="" val="2333497509"/>
+        <p14:creationId xmlns:p14="http://schemas.microsoft.com/office/powerpoint/2010/main" val="2333497509"/>
       </p:ext>
     </p:extLst>
   </p:cSld>
@@ -14025,7 +15349,7 @@
           <p:cNvPr id="2" name="Título 1">
             <a:extLst>
               <a:ext uri="{FF2B5EF4-FFF2-40B4-BE49-F238E27FC236}">
-                <a16:creationId xmlns:a16="http://schemas.microsoft.com/office/drawing/2014/main" xmlns="" id="{0ED6D180-92C1-4333-BA91-2BBA4DD94A3B}"/>
+                <a16:creationId xmlns:a16="http://schemas.microsoft.com/office/drawing/2014/main" id="{0ED6D180-92C1-4333-BA91-2BBA4DD94A3B}"/>
               </a:ext>
             </a:extLst>
           </p:cNvPr>
@@ -14060,7 +15384,7 @@
     </p:spTree>
     <p:extLst>
       <p:ext uri="{BB962C8B-B14F-4D97-AF65-F5344CB8AC3E}">
-        <p14:creationId xmlns:p14="http://schemas.microsoft.com/office/powerpoint/2010/main" xmlns="" val="3543839896"/>
+        <p14:creationId xmlns:p14="http://schemas.microsoft.com/office/powerpoint/2010/main" val="3543839896"/>
       </p:ext>
     </p:extLst>
   </p:cSld>
@@ -14320,7 +15644,7 @@
   <a:extraClrSchemeLst/>
   <a:extLst>
     <a:ext uri="{05A4C25C-085E-4340-85A3-A5531E510DB2}">
-      <thm15:themeFamily xmlns:thm15="http://schemas.microsoft.com/office/thememl/2012/main" xmlns="" name="Parallax" id="{3388167B-A2EB-4685-9635-1831D9AEF8C4}" vid="{4F7A876A-7598-49CA-AFC8-8EDA2551E4A7}"/>
+      <thm15:themeFamily xmlns:thm15="http://schemas.microsoft.com/office/thememl/2012/main" name="Parallax" id="{3388167B-A2EB-4685-9635-1831D9AEF8C4}" vid="{4F7A876A-7598-49CA-AFC8-8EDA2551E4A7}"/>
     </a:ext>
   </a:extLst>
 </a:theme>
@@ -14581,7 +15905,7 @@
   <a:extraClrSchemeLst/>
   <a:extLst>
     <a:ext uri="{05A4C25C-085E-4340-85A3-A5531E510DB2}">
-      <thm15:themeFamily xmlns:thm15="http://schemas.microsoft.com/office/thememl/2012/main" xmlns="" name="Office Theme" id="{62F939B6-93AF-4DB8-9C6B-D6C7DFDC589F}" vid="{4A3C46E8-61CC-4603-A589-7422A47A8E4A}"/>
+      <thm15:themeFamily xmlns:thm15="http://schemas.microsoft.com/office/thememl/2012/main" name="Office Theme" id="{62F939B6-93AF-4DB8-9C6B-D6C7DFDC589F}" vid="{4A3C46E8-61CC-4603-A589-7422A47A8E4A}"/>
     </a:ext>
   </a:extLst>
 </a:theme>

</xml_diff>

<commit_message>
-Actualización de la presentación.
</commit_message>
<xml_diff>
--- a/Presentaciones/Presentación VASPA - Diciembre 2020 - Examen Final/Presentación VASPA - Diciembre 2020 - Examen Final.pptx
+++ b/Presentaciones/Presentación VASPA - Diciembre 2020 - Examen Final/Presentación VASPA - Diciembre 2020 - Examen Final.pptx
@@ -143,7 +143,7 @@
   </p:defaultTextStyle>
   <p:extLst>
     <p:ext uri="{EFAFB233-063F-42B5-8137-9DF3F51BA10A}">
-      <p15:sldGuideLst xmlns:p15="http://schemas.microsoft.com/office/powerpoint/2012/main">
+      <p15:sldGuideLst xmlns:p15="http://schemas.microsoft.com/office/powerpoint/2012/main" xmlns="">
         <p15:guide id="1" orient="horz" pos="2160">
           <p15:clr>
             <a:srgbClr val="A4A3A4"/>
@@ -161,18 +161,8 @@
 </file>
 
 <file path=ppt/charts/chart1.xml><?xml version="1.0" encoding="utf-8"?>
-<c:chartSpace xmlns:c="http://schemas.openxmlformats.org/drawingml/2006/chart" xmlns:a="http://schemas.openxmlformats.org/drawingml/2006/main" xmlns:r="http://schemas.openxmlformats.org/officeDocument/2006/relationships" xmlns:c16r2="http://schemas.microsoft.com/office/drawing/2015/06/chart">
-  <c:date1904 val="0"/>
-  <c:lang val="es-ES"/>
-  <c:roundedCorners val="0"/>
-  <mc:AlternateContent xmlns:mc="http://schemas.openxmlformats.org/markup-compatibility/2006">
-    <mc:Choice xmlns:c14="http://schemas.microsoft.com/office/drawing/2007/8/2/chart" Requires="c14">
-      <c14:style val="102"/>
-    </mc:Choice>
-    <mc:Fallback>
-      <c:style val="2"/>
-    </mc:Fallback>
-  </mc:AlternateContent>
+<c:chartSpace xmlns:c="http://schemas.openxmlformats.org/drawingml/2006/chart" xmlns:a="http://schemas.openxmlformats.org/drawingml/2006/main" xmlns:r="http://schemas.openxmlformats.org/officeDocument/2006/relationships">
+  <c:lang val="es-AR"/>
   <c:chart>
     <c:title>
       <c:tx>
@@ -205,7 +195,7 @@
           </a:p>
         </c:rich>
       </c:tx>
-      <c:overlay val="0"/>
+      <c:layout/>
       <c:spPr>
         <a:noFill/>
         <a:ln>
@@ -214,12 +204,10 @@
         <a:effectLst/>
       </c:spPr>
     </c:title>
-    <c:autoTitleDeleted val="0"/>
     <c:plotArea>
       <c:layout/>
       <c:lineChart>
         <c:grouping val="standard"/>
-        <c:varyColors val="0"/>
         <c:ser>
           <c:idx val="0"/>
           <c:order val="0"/>
@@ -345,8 +333,7 @@
               </c:numCache>
             </c:numRef>
           </c:val>
-          <c:smooth val="0"/>
-          <c:extLst>
+          <c:extLst xmlns:c16r2="http://schemas.microsoft.com/office/drawing/2015/06/chart">
             <c:ext xmlns:c16="http://schemas.microsoft.com/office/drawing/2014/chart" uri="{C3380CC4-5D6E-409C-BE32-E72D297353CC}">
               <c16:uniqueId val="{00000000-38D4-4551-A2C0-6F470BC3E09B}"/>
             </c:ext>
@@ -456,7 +443,7 @@
                   <c:v>65.569999999999993</c:v>
                 </c:pt>
                 <c:pt idx="5">
-                  <c:v>50.85</c:v>
+                  <c:v>50.849999999999994</c:v>
                 </c:pt>
                 <c:pt idx="6">
                   <c:v>46.42</c:v>
@@ -465,7 +452,7 @@
                   <c:v>24.419999999999987</c:v>
                 </c:pt>
                 <c:pt idx="8">
-                  <c:v>10.850000000000007</c:v>
+                  <c:v>10.850000000000009</c:v>
                 </c:pt>
                 <c:pt idx="9">
                   <c:v>6.42</c:v>
@@ -476,36 +463,25 @@
               </c:numCache>
             </c:numRef>
           </c:val>
-          <c:smooth val="0"/>
-          <c:extLst>
+          <c:extLst xmlns:c16r2="http://schemas.microsoft.com/office/drawing/2015/06/chart">
             <c:ext xmlns:c16="http://schemas.microsoft.com/office/drawing/2014/chart" uri="{C3380CC4-5D6E-409C-BE32-E72D297353CC}">
               <c16:uniqueId val="{00000001-38D4-4551-A2C0-6F470BC3E09B}"/>
             </c:ext>
           </c:extLst>
         </c:ser>
-        <c:dLbls>
-          <c:showLegendKey val="0"/>
-          <c:showVal val="0"/>
-          <c:showCatName val="0"/>
-          <c:showSerName val="0"/>
-          <c:showPercent val="0"/>
-          <c:showBubbleSize val="0"/>
-        </c:dLbls>
+        <c:dLbls/>
         <c:marker val="1"/>
-        <c:smooth val="0"/>
-        <c:axId val="43968000"/>
-        <c:axId val="43969536"/>
+        <c:axId val="85107456"/>
+        <c:axId val="85108992"/>
       </c:lineChart>
       <c:dateAx>
-        <c:axId val="43968000"/>
+        <c:axId val="85107456"/>
         <c:scaling>
           <c:orientation val="minMax"/>
         </c:scaling>
-        <c:delete val="0"/>
         <c:axPos val="b"/>
         <c:numFmt formatCode="m/d/yyyy" sourceLinked="1"/>
         <c:majorTickMark val="none"/>
-        <c:minorTickMark val="none"/>
         <c:tickLblPos val="nextTo"/>
         <c:spPr>
           <a:noFill/>
@@ -540,18 +516,17 @@
             <a:endParaRPr lang="es-AR"/>
           </a:p>
         </c:txPr>
-        <c:crossAx val="43969536"/>
+        <c:crossAx val="85108992"/>
         <c:crosses val="autoZero"/>
         <c:auto val="1"/>
         <c:lblOffset val="100"/>
         <c:baseTimeUnit val="days"/>
       </c:dateAx>
       <c:valAx>
-        <c:axId val="43969536"/>
+        <c:axId val="85108992"/>
         <c:scaling>
           <c:orientation val="minMax"/>
         </c:scaling>
-        <c:delete val="0"/>
         <c:axPos val="l"/>
         <c:majorGridlines>
           <c:spPr>
@@ -569,7 +544,6 @@
         </c:majorGridlines>
         <c:numFmt formatCode="General" sourceLinked="1"/>
         <c:majorTickMark val="none"/>
-        <c:minorTickMark val="none"/>
         <c:tickLblPos val="nextTo"/>
         <c:spPr>
           <a:noFill/>
@@ -598,7 +572,7 @@
             <a:endParaRPr lang="es-AR"/>
           </a:p>
         </c:txPr>
-        <c:crossAx val="43968000"/>
+        <c:crossAx val="85107456"/>
         <c:crosses val="autoZero"/>
         <c:crossBetween val="between"/>
       </c:valAx>
@@ -612,7 +586,7 @@
     </c:plotArea>
     <c:legend>
       <c:legendPos val="b"/>
-      <c:overlay val="0"/>
+      <c:layout/>
       <c:spPr>
         <a:noFill/>
         <a:ln>
@@ -643,14 +617,13 @@
     </c:legend>
     <c:plotVisOnly val="1"/>
     <c:dispBlanksAs val="gap"/>
-    <c:extLst>
+    <c:extLst xmlns:c16r2="http://schemas.microsoft.com/office/drawing/2015/06/chart">
       <c:ext xmlns:c16r3="http://schemas.microsoft.com/office/drawing/2017/03/chart" uri="{56B9EC1D-385E-4148-901F-78D8002777C0}">
         <c16r3:dataDisplayOptions16>
           <c16r3:dispNaAsBlank val="1"/>
         </c16r3:dataDisplayOptions16>
       </c:ext>
     </c:extLst>
-    <c:showDLblsOverMax val="0"/>
   </c:chart>
   <c:spPr>
     <a:solidFill>
@@ -677,9 +650,7 @@
       <a:endParaRPr lang="es-AR"/>
     </a:p>
   </c:txPr>
-  <c:externalData r:id="rId1">
-    <c:autoUpdate val="0"/>
-  </c:externalData>
+  <c:externalData r:id="rId1"/>
   <c:userShapes r:id="rId2"/>
 </c:chartSpace>
 </file>
@@ -1602,6 +1573,13 @@
         </dgm:presLayoutVars>
       </dgm:prSet>
       <dgm:spPr/>
+      <dgm:t>
+        <a:bodyPr/>
+        <a:lstStyle/>
+        <a:p>
+          <a:endParaRPr lang="es-AR"/>
+        </a:p>
+      </dgm:t>
     </dgm:pt>
     <dgm:pt modelId="{3D5C674D-195F-4346-A602-68D809648B83}" type="pres">
       <dgm:prSet presAssocID="{853FF75D-08FD-4C0B-97FF-B95C5121D1D7}" presName="parTxOnly" presStyleLbl="node1" presStyleIdx="0" presStyleCnt="4">
@@ -1612,6 +1590,13 @@
         </dgm:presLayoutVars>
       </dgm:prSet>
       <dgm:spPr/>
+      <dgm:t>
+        <a:bodyPr/>
+        <a:lstStyle/>
+        <a:p>
+          <a:endParaRPr lang="es-AR"/>
+        </a:p>
+      </dgm:t>
     </dgm:pt>
     <dgm:pt modelId="{4DCC4052-4221-44D0-84E2-29AAAD96FCB3}" type="pres">
       <dgm:prSet presAssocID="{888E8F23-D971-4F49-AF2A-2D3F7847711C}" presName="parTxOnlySpace" presStyleCnt="0"/>
@@ -1626,6 +1611,13 @@
         </dgm:presLayoutVars>
       </dgm:prSet>
       <dgm:spPr/>
+      <dgm:t>
+        <a:bodyPr/>
+        <a:lstStyle/>
+        <a:p>
+          <a:endParaRPr lang="es-AR"/>
+        </a:p>
+      </dgm:t>
     </dgm:pt>
     <dgm:pt modelId="{A6E2C1E9-D2ED-47B3-A71D-FDA80BA4D0C1}" type="pres">
       <dgm:prSet presAssocID="{431F7064-B371-4D30-9440-9276B420E393}" presName="parTxOnlySpace" presStyleCnt="0"/>
@@ -1640,6 +1632,13 @@
         </dgm:presLayoutVars>
       </dgm:prSet>
       <dgm:spPr/>
+      <dgm:t>
+        <a:bodyPr/>
+        <a:lstStyle/>
+        <a:p>
+          <a:endParaRPr lang="es-AR"/>
+        </a:p>
+      </dgm:t>
     </dgm:pt>
     <dgm:pt modelId="{FA28285D-C85B-47E5-8E04-E3031E7EB070}" type="pres">
       <dgm:prSet presAssocID="{50E5B106-8092-4055-AC3C-E16AB9A8A632}" presName="parTxOnlySpace" presStyleCnt="0"/>
@@ -1654,17 +1653,24 @@
         </dgm:presLayoutVars>
       </dgm:prSet>
       <dgm:spPr/>
+      <dgm:t>
+        <a:bodyPr/>
+        <a:lstStyle/>
+        <a:p>
+          <a:endParaRPr lang="es-AR"/>
+        </a:p>
+      </dgm:t>
     </dgm:pt>
   </dgm:ptLst>
   <dgm:cxnLst>
     <dgm:cxn modelId="{7D2F0A27-3D8B-4128-8CB3-A82F5F34B1DA}" type="presOf" srcId="{3B4EE390-B919-49DE-81BE-0780A08DDBFA}" destId="{AEA2C0A0-0FCA-4EB1-AA5B-89E50BC14E35}" srcOrd="0" destOrd="0" presId="urn:microsoft.com/office/officeart/2005/8/layout/chevron1"/>
+    <dgm:cxn modelId="{5E7AA7A8-CA8D-46F6-8417-A9E8900910E7}" type="presOf" srcId="{07D852F8-DC80-412E-99FF-CBC8CF6E9E53}" destId="{BB3205ED-EB8F-4AA2-A69D-916A25FD317F}" srcOrd="0" destOrd="0" presId="urn:microsoft.com/office/officeart/2005/8/layout/chevron1"/>
+    <dgm:cxn modelId="{24BDC4C3-8E68-4ABC-A0DA-A0FE0C4BE3D4}" srcId="{07D852F8-DC80-412E-99FF-CBC8CF6E9E53}" destId="{3E85E467-C11E-426F-9200-FC251BE43DEA}" srcOrd="1" destOrd="0" parTransId="{83EB3A9D-25F1-42C7-AA54-1B46554184BF}" sibTransId="{431F7064-B371-4D30-9440-9276B420E393}"/>
     <dgm:cxn modelId="{C846122C-05FD-4C41-8444-CC3A300BDFFE}" srcId="{07D852F8-DC80-412E-99FF-CBC8CF6E9E53}" destId="{853FF75D-08FD-4C0B-97FF-B95C5121D1D7}" srcOrd="0" destOrd="0" parTransId="{BD4839AE-4C9F-4F18-92E9-4B1323829560}" sibTransId="{888E8F23-D971-4F49-AF2A-2D3F7847711C}"/>
+    <dgm:cxn modelId="{403E4FC9-6B5A-4E42-8B00-B4A63F0B56C0}" type="presOf" srcId="{3E85E467-C11E-426F-9200-FC251BE43DEA}" destId="{6886AB32-2506-433F-9563-157CC1EA1348}" srcOrd="0" destOrd="0" presId="urn:microsoft.com/office/officeart/2005/8/layout/chevron1"/>
     <dgm:cxn modelId="{49728C46-9AF0-4404-B77C-0BF8753B1BE2}" srcId="{07D852F8-DC80-412E-99FF-CBC8CF6E9E53}" destId="{3B4EE390-B919-49DE-81BE-0780A08DDBFA}" srcOrd="2" destOrd="0" parTransId="{3B1FF57E-AA55-4079-B104-9BCA769CA707}" sibTransId="{50E5B106-8092-4055-AC3C-E16AB9A8A632}"/>
     <dgm:cxn modelId="{D7B69E66-919E-4FAC-945E-964D8A3AC565}" type="presOf" srcId="{FE8D9DF2-8BC9-4E07-8005-D845C397B55E}" destId="{09B459DE-37E0-4270-82CB-D68CAF9A376E}" srcOrd="0" destOrd="0" presId="urn:microsoft.com/office/officeart/2005/8/layout/chevron1"/>
     <dgm:cxn modelId="{D76B3C6A-BC4F-4872-BB7B-7982459BAA86}" type="presOf" srcId="{853FF75D-08FD-4C0B-97FF-B95C5121D1D7}" destId="{3D5C674D-195F-4346-A602-68D809648B83}" srcOrd="0" destOrd="0" presId="urn:microsoft.com/office/officeart/2005/8/layout/chevron1"/>
-    <dgm:cxn modelId="{5E7AA7A8-CA8D-46F6-8417-A9E8900910E7}" type="presOf" srcId="{07D852F8-DC80-412E-99FF-CBC8CF6E9E53}" destId="{BB3205ED-EB8F-4AA2-A69D-916A25FD317F}" srcOrd="0" destOrd="0" presId="urn:microsoft.com/office/officeart/2005/8/layout/chevron1"/>
-    <dgm:cxn modelId="{24BDC4C3-8E68-4ABC-A0DA-A0FE0C4BE3D4}" srcId="{07D852F8-DC80-412E-99FF-CBC8CF6E9E53}" destId="{3E85E467-C11E-426F-9200-FC251BE43DEA}" srcOrd="1" destOrd="0" parTransId="{83EB3A9D-25F1-42C7-AA54-1B46554184BF}" sibTransId="{431F7064-B371-4D30-9440-9276B420E393}"/>
-    <dgm:cxn modelId="{403E4FC9-6B5A-4E42-8B00-B4A63F0B56C0}" type="presOf" srcId="{3E85E467-C11E-426F-9200-FC251BE43DEA}" destId="{6886AB32-2506-433F-9563-157CC1EA1348}" srcOrd="0" destOrd="0" presId="urn:microsoft.com/office/officeart/2005/8/layout/chevron1"/>
     <dgm:cxn modelId="{61C2D7D0-DEE2-4010-B64E-4D1FEDBA0702}" srcId="{07D852F8-DC80-412E-99FF-CBC8CF6E9E53}" destId="{FE8D9DF2-8BC9-4E07-8005-D845C397B55E}" srcOrd="3" destOrd="0" parTransId="{5B8A1B7E-67AD-4057-819C-2245EC4F7AC4}" sibTransId="{5B54ED7F-A264-47E6-96E6-7D075AA7F363}"/>
     <dgm:cxn modelId="{2F515B5D-54B1-4237-891D-39EC55794076}" type="presParOf" srcId="{BB3205ED-EB8F-4AA2-A69D-916A25FD317F}" destId="{3D5C674D-195F-4346-A602-68D809648B83}" srcOrd="0" destOrd="0" presId="urn:microsoft.com/office/officeart/2005/8/layout/chevron1"/>
     <dgm:cxn modelId="{624BFC5C-F915-4A8E-B04A-57BF8C238C73}" type="presParOf" srcId="{BB3205ED-EB8F-4AA2-A69D-916A25FD317F}" destId="{4DCC4052-4221-44D0-84E2-29AAAD96FCB3}" srcOrd="1" destOrd="0" presId="urn:microsoft.com/office/officeart/2005/8/layout/chevron1"/>
@@ -1678,14 +1684,14 @@
   <dgm:whole/>
   <dgm:extLst>
     <a:ext uri="http://schemas.microsoft.com/office/drawing/2008/diagram">
-      <dsp:dataModelExt xmlns:dsp="http://schemas.microsoft.com/office/drawing/2008/diagram" relId="rId6" minVer="http://schemas.openxmlformats.org/drawingml/2006/diagram"/>
+      <dsp:dataModelExt xmlns:dsp="http://schemas.microsoft.com/office/drawing/2008/diagram" xmlns="" relId="rId6" minVer="http://schemas.openxmlformats.org/drawingml/2006/diagram"/>
     </a:ext>
   </dgm:extLst>
 </dgm:dataModel>
 </file>
 
 <file path=ppt/diagrams/drawing1.xml><?xml version="1.0" encoding="utf-8"?>
-<dsp:drawing xmlns:dgm="http://schemas.openxmlformats.org/drawingml/2006/diagram" xmlns:dsp="http://schemas.microsoft.com/office/drawing/2008/diagram" xmlns:a="http://schemas.openxmlformats.org/drawingml/2006/main">
+<dsp:drawing xmlns:dgm="http://schemas.openxmlformats.org/drawingml/2006/diagram" xmlns:a="http://schemas.openxmlformats.org/drawingml/2006/main" xmlns:dsp="http://schemas.microsoft.com/office/drawing/2008/diagram">
   <dsp:spTree>
     <dsp:nvGrpSpPr>
       <dsp:cNvPr id="0" name=""/>
@@ -1746,7 +1752,7 @@
         </a:bodyPr>
         <a:lstStyle/>
         <a:p>
-          <a:pPr marL="0" lvl="0" indent="0" algn="ctr" defTabSz="755650">
+          <a:pPr lvl="0" algn="ctr" defTabSz="755650">
             <a:lnSpc>
               <a:spcPct val="90000"/>
             </a:lnSpc>
@@ -1756,7 +1762,6 @@
             <a:spcAft>
               <a:spcPct val="35000"/>
             </a:spcAft>
-            <a:buNone/>
           </a:pPr>
           <a:r>
             <a:rPr lang="es-ES" sz="1700" kern="1200" dirty="0"/>
@@ -1766,8 +1771,8 @@
         </a:p>
       </dsp:txBody>
       <dsp:txXfrm>
-        <a:off x="442714" y="2190952"/>
-        <a:ext cx="1316831" cy="877887"/>
+        <a:off x="3770" y="2190952"/>
+        <a:ext cx="2194718" cy="877887"/>
       </dsp:txXfrm>
     </dsp:sp>
     <dsp:sp modelId="{6886AB32-2506-433F-9563-157CC1EA1348}">
@@ -1824,7 +1829,7 @@
         </a:bodyPr>
         <a:lstStyle/>
         <a:p>
-          <a:pPr marL="0" lvl="0" indent="0" algn="ctr" defTabSz="755650">
+          <a:pPr lvl="0" algn="ctr" defTabSz="755650">
             <a:lnSpc>
               <a:spcPct val="90000"/>
             </a:lnSpc>
@@ -1834,7 +1839,6 @@
             <a:spcAft>
               <a:spcPct val="35000"/>
             </a:spcAft>
-            <a:buNone/>
           </a:pPr>
           <a:r>
             <a:rPr lang="es-ES" sz="1700" kern="1200" dirty="0"/>
@@ -1844,8 +1848,8 @@
         </a:p>
       </dsp:txBody>
       <dsp:txXfrm>
-        <a:off x="2417961" y="2190952"/>
-        <a:ext cx="1316831" cy="877887"/>
+        <a:off x="1979017" y="2190952"/>
+        <a:ext cx="2194718" cy="877887"/>
       </dsp:txXfrm>
     </dsp:sp>
     <dsp:sp modelId="{AEA2C0A0-0FCA-4EB1-AA5B-89E50BC14E35}">
@@ -1902,7 +1906,7 @@
         </a:bodyPr>
         <a:lstStyle/>
         <a:p>
-          <a:pPr marL="0" lvl="0" indent="0" algn="ctr" defTabSz="755650">
+          <a:pPr lvl="0" algn="ctr" defTabSz="755650">
             <a:lnSpc>
               <a:spcPct val="90000"/>
             </a:lnSpc>
@@ -1912,7 +1916,6 @@
             <a:spcAft>
               <a:spcPct val="35000"/>
             </a:spcAft>
-            <a:buNone/>
           </a:pPr>
           <a:r>
             <a:rPr lang="es-ES" sz="1700" kern="1200" dirty="0"/>
@@ -1922,8 +1925,8 @@
         </a:p>
       </dsp:txBody>
       <dsp:txXfrm>
-        <a:off x="4393208" y="2190952"/>
-        <a:ext cx="1316831" cy="877887"/>
+        <a:off x="3954264" y="2190952"/>
+        <a:ext cx="2194718" cy="877887"/>
       </dsp:txXfrm>
     </dsp:sp>
     <dsp:sp modelId="{09B459DE-37E0-4270-82CB-D68CAF9A376E}">
@@ -1980,7 +1983,7 @@
         </a:bodyPr>
         <a:lstStyle/>
         <a:p>
-          <a:pPr marL="0" lvl="0" indent="0" algn="ctr" defTabSz="755650">
+          <a:pPr lvl="0" algn="ctr" defTabSz="755650">
             <a:lnSpc>
               <a:spcPct val="90000"/>
             </a:lnSpc>
@@ -1990,7 +1993,6 @@
             <a:spcAft>
               <a:spcPct val="35000"/>
             </a:spcAft>
-            <a:buNone/>
           </a:pPr>
           <a:r>
             <a:rPr lang="es-ES" sz="1700" kern="1200" dirty="0"/>
@@ -2000,8 +2002,8 @@
         </a:p>
       </dsp:txBody>
       <dsp:txXfrm>
-        <a:off x="6368454" y="2190952"/>
-        <a:ext cx="1316831" cy="877887"/>
+        <a:off x="5929510" y="2190952"/>
+        <a:ext cx="2194718" cy="877887"/>
       </dsp:txXfrm>
     </dsp:sp>
   </dsp:spTree>
@@ -3341,7 +3343,7 @@
         <cdr:cNvPr id="2" name="CuadroTexto 2">
           <a:extLst xmlns:a="http://schemas.openxmlformats.org/drawingml/2006/main">
             <a:ext uri="{FF2B5EF4-FFF2-40B4-BE49-F238E27FC236}">
-              <a16:creationId xmlns:a16="http://schemas.microsoft.com/office/drawing/2014/main" id="{29B4C296-372F-455A-BE5A-B512322B8EDE}"/>
+              <a16:creationId xmlns:a16="http://schemas.microsoft.com/office/drawing/2014/main" xmlns="" id="{29B4C296-372F-455A-BE5A-B512322B8EDE}"/>
             </a:ext>
           </a:extLst>
         </cdr:cNvPr>
@@ -3721,7 +3723,7 @@
     </p:spTree>
     <p:extLst>
       <p:ext uri="{BB962C8B-B14F-4D97-AF65-F5344CB8AC3E}">
-        <p14:creationId xmlns:p14="http://schemas.microsoft.com/office/powerpoint/2010/main" val="1580866007"/>
+        <p14:creationId xmlns:p14="http://schemas.microsoft.com/office/powerpoint/2010/main" xmlns="" val="1580866007"/>
       </p:ext>
     </p:extLst>
   </p:cSld>
@@ -3896,7 +3898,7 @@
     </p:spTree>
     <p:extLst>
       <p:ext uri="{BB962C8B-B14F-4D97-AF65-F5344CB8AC3E}">
-        <p14:creationId xmlns:p14="http://schemas.microsoft.com/office/powerpoint/2010/main" val="966578479"/>
+        <p14:creationId xmlns:p14="http://schemas.microsoft.com/office/powerpoint/2010/main" xmlns="" val="966578479"/>
       </p:ext>
     </p:extLst>
   </p:cSld>
@@ -4468,7 +4470,7 @@
           <p:cNvPr id="8" name="Imagen 7">
             <a:extLst>
               <a:ext uri="{FF2B5EF4-FFF2-40B4-BE49-F238E27FC236}">
-                <a16:creationId xmlns:a16="http://schemas.microsoft.com/office/drawing/2014/main" id="{153E41C7-C0FB-4283-8821-79FB890C108B}"/>
+                <a16:creationId xmlns:a16="http://schemas.microsoft.com/office/drawing/2014/main" xmlns="" id="{153E41C7-C0FB-4283-8821-79FB890C108B}"/>
               </a:ext>
             </a:extLst>
           </p:cNvPr>
@@ -4481,7 +4483,7 @@
           <a:blip r:embed="rId2" cstate="print">
             <a:extLst>
               <a:ext uri="{28A0092B-C50C-407E-A947-70E740481C1C}">
-                <a14:useLocalDpi xmlns:a14="http://schemas.microsoft.com/office/drawing/2010/main" val="0"/>
+                <a14:useLocalDpi xmlns:a14="http://schemas.microsoft.com/office/drawing/2010/main" xmlns="" val="0"/>
               </a:ext>
             </a:extLst>
           </a:blip>
@@ -4502,7 +4504,7 @@
     </p:spTree>
     <p:extLst>
       <p:ext uri="{BB962C8B-B14F-4D97-AF65-F5344CB8AC3E}">
-        <p14:creationId xmlns:p14="http://schemas.microsoft.com/office/powerpoint/2010/main" val="594578851"/>
+        <p14:creationId xmlns:p14="http://schemas.microsoft.com/office/powerpoint/2010/main" xmlns="" val="594578851"/>
       </p:ext>
     </p:extLst>
   </p:cSld>
@@ -4795,7 +4797,7 @@
     </p:spTree>
     <p:extLst>
       <p:ext uri="{BB962C8B-B14F-4D97-AF65-F5344CB8AC3E}">
-        <p14:creationId xmlns:p14="http://schemas.microsoft.com/office/powerpoint/2010/main" val="2858870748"/>
+        <p14:creationId xmlns:p14="http://schemas.microsoft.com/office/powerpoint/2010/main" xmlns="" val="2858870748"/>
       </p:ext>
     </p:extLst>
   </p:cSld>
@@ -5045,7 +5047,7 @@
     </p:spTree>
     <p:extLst>
       <p:ext uri="{BB962C8B-B14F-4D97-AF65-F5344CB8AC3E}">
-        <p14:creationId xmlns:p14="http://schemas.microsoft.com/office/powerpoint/2010/main" val="2887001581"/>
+        <p14:creationId xmlns:p14="http://schemas.microsoft.com/office/powerpoint/2010/main" xmlns="" val="2887001581"/>
       </p:ext>
     </p:extLst>
   </p:cSld>
@@ -5587,7 +5589,7 @@
     </p:spTree>
     <p:extLst>
       <p:ext uri="{BB962C8B-B14F-4D97-AF65-F5344CB8AC3E}">
-        <p14:creationId xmlns:p14="http://schemas.microsoft.com/office/powerpoint/2010/main" val="953477666"/>
+        <p14:creationId xmlns:p14="http://schemas.microsoft.com/office/powerpoint/2010/main" xmlns="" val="953477666"/>
       </p:ext>
     </p:extLst>
   </p:cSld>
@@ -5837,7 +5839,7 @@
     </p:spTree>
     <p:extLst>
       <p:ext uri="{BB962C8B-B14F-4D97-AF65-F5344CB8AC3E}">
-        <p14:creationId xmlns:p14="http://schemas.microsoft.com/office/powerpoint/2010/main" val="2881036134"/>
+        <p14:creationId xmlns:p14="http://schemas.microsoft.com/office/powerpoint/2010/main" xmlns="" val="2881036134"/>
       </p:ext>
     </p:extLst>
   </p:cSld>
@@ -6371,7 +6373,7 @@
     </p:spTree>
     <p:extLst>
       <p:ext uri="{BB962C8B-B14F-4D97-AF65-F5344CB8AC3E}">
-        <p14:creationId xmlns:p14="http://schemas.microsoft.com/office/powerpoint/2010/main" val="3557333580"/>
+        <p14:creationId xmlns:p14="http://schemas.microsoft.com/office/powerpoint/2010/main" xmlns="" val="3557333580"/>
       </p:ext>
     </p:extLst>
   </p:cSld>
@@ -6670,7 +6672,7 @@
     </p:spTree>
     <p:extLst>
       <p:ext uri="{BB962C8B-B14F-4D97-AF65-F5344CB8AC3E}">
-        <p14:creationId xmlns:p14="http://schemas.microsoft.com/office/powerpoint/2010/main" val="2020671905"/>
+        <p14:creationId xmlns:p14="http://schemas.microsoft.com/office/powerpoint/2010/main" xmlns="" val="2020671905"/>
       </p:ext>
     </p:extLst>
   </p:cSld>
@@ -6846,7 +6848,7 @@
     </p:spTree>
     <p:extLst>
       <p:ext uri="{BB962C8B-B14F-4D97-AF65-F5344CB8AC3E}">
-        <p14:creationId xmlns:p14="http://schemas.microsoft.com/office/powerpoint/2010/main" val="3698065381"/>
+        <p14:creationId xmlns:p14="http://schemas.microsoft.com/office/powerpoint/2010/main" xmlns="" val="3698065381"/>
       </p:ext>
     </p:extLst>
   </p:cSld>
@@ -7028,7 +7030,7 @@
     </p:spTree>
     <p:extLst>
       <p:ext uri="{BB962C8B-B14F-4D97-AF65-F5344CB8AC3E}">
-        <p14:creationId xmlns:p14="http://schemas.microsoft.com/office/powerpoint/2010/main" val="2361575083"/>
+        <p14:creationId xmlns:p14="http://schemas.microsoft.com/office/powerpoint/2010/main" xmlns="" val="2361575083"/>
       </p:ext>
     </p:extLst>
   </p:cSld>
@@ -7213,7 +7215,7 @@
           <p:cNvPr id="8" name="Imagen 7">
             <a:extLst>
               <a:ext uri="{FF2B5EF4-FFF2-40B4-BE49-F238E27FC236}">
-                <a16:creationId xmlns:a16="http://schemas.microsoft.com/office/drawing/2014/main" id="{F65BAB47-52C5-4418-98C7-5ABDFBAB2220}"/>
+                <a16:creationId xmlns:a16="http://schemas.microsoft.com/office/drawing/2014/main" xmlns="" id="{F65BAB47-52C5-4418-98C7-5ABDFBAB2220}"/>
               </a:ext>
             </a:extLst>
           </p:cNvPr>
@@ -7226,7 +7228,7 @@
           <a:blip r:embed="rId2" cstate="print">
             <a:extLst>
               <a:ext uri="{28A0092B-C50C-407E-A947-70E740481C1C}">
-                <a14:useLocalDpi xmlns:a14="http://schemas.microsoft.com/office/drawing/2010/main" val="0"/>
+                <a14:useLocalDpi xmlns:a14="http://schemas.microsoft.com/office/drawing/2010/main" xmlns="" val="0"/>
               </a:ext>
             </a:extLst>
           </a:blip>
@@ -7247,7 +7249,7 @@
     </p:spTree>
     <p:extLst>
       <p:ext uri="{BB962C8B-B14F-4D97-AF65-F5344CB8AC3E}">
-        <p14:creationId xmlns:p14="http://schemas.microsoft.com/office/powerpoint/2010/main" val="3522170283"/>
+        <p14:creationId xmlns:p14="http://schemas.microsoft.com/office/powerpoint/2010/main" xmlns="" val="3522170283"/>
       </p:ext>
     </p:extLst>
   </p:cSld>
@@ -7495,7 +7497,7 @@
     </p:spTree>
     <p:extLst>
       <p:ext uri="{BB962C8B-B14F-4D97-AF65-F5344CB8AC3E}">
-        <p14:creationId xmlns:p14="http://schemas.microsoft.com/office/powerpoint/2010/main" val="2921707453"/>
+        <p14:creationId xmlns:p14="http://schemas.microsoft.com/office/powerpoint/2010/main" xmlns="" val="2921707453"/>
       </p:ext>
     </p:extLst>
   </p:cSld>
@@ -7794,7 +7796,7 @@
     </p:spTree>
     <p:extLst>
       <p:ext uri="{BB962C8B-B14F-4D97-AF65-F5344CB8AC3E}">
-        <p14:creationId xmlns:p14="http://schemas.microsoft.com/office/powerpoint/2010/main" val="1855319959"/>
+        <p14:creationId xmlns:p14="http://schemas.microsoft.com/office/powerpoint/2010/main" xmlns="" val="1855319959"/>
       </p:ext>
     </p:extLst>
   </p:cSld>
@@ -8238,7 +8240,7 @@
     </p:spTree>
     <p:extLst>
       <p:ext uri="{BB962C8B-B14F-4D97-AF65-F5344CB8AC3E}">
-        <p14:creationId xmlns:p14="http://schemas.microsoft.com/office/powerpoint/2010/main" val="522982594"/>
+        <p14:creationId xmlns:p14="http://schemas.microsoft.com/office/powerpoint/2010/main" xmlns="" val="522982594"/>
       </p:ext>
     </p:extLst>
   </p:cSld>
@@ -8358,7 +8360,7 @@
     </p:spTree>
     <p:extLst>
       <p:ext uri="{BB962C8B-B14F-4D97-AF65-F5344CB8AC3E}">
-        <p14:creationId xmlns:p14="http://schemas.microsoft.com/office/powerpoint/2010/main" val="3355991177"/>
+        <p14:creationId xmlns:p14="http://schemas.microsoft.com/office/powerpoint/2010/main" xmlns="" val="3355991177"/>
       </p:ext>
     </p:extLst>
   </p:cSld>
@@ -8455,7 +8457,7 @@
     </p:spTree>
     <p:extLst>
       <p:ext uri="{BB962C8B-B14F-4D97-AF65-F5344CB8AC3E}">
-        <p14:creationId xmlns:p14="http://schemas.microsoft.com/office/powerpoint/2010/main" val="2067178301"/>
+        <p14:creationId xmlns:p14="http://schemas.microsoft.com/office/powerpoint/2010/main" xmlns="" val="2067178301"/>
       </p:ext>
     </p:extLst>
   </p:cSld>
@@ -8740,7 +8742,7 @@
     </p:spTree>
     <p:extLst>
       <p:ext uri="{BB962C8B-B14F-4D97-AF65-F5344CB8AC3E}">
-        <p14:creationId xmlns:p14="http://schemas.microsoft.com/office/powerpoint/2010/main" val="1822716033"/>
+        <p14:creationId xmlns:p14="http://schemas.microsoft.com/office/powerpoint/2010/main" xmlns="" val="1822716033"/>
       </p:ext>
     </p:extLst>
   </p:cSld>
@@ -9033,7 +9035,7 @@
     </p:spTree>
     <p:extLst>
       <p:ext uri="{BB962C8B-B14F-4D97-AF65-F5344CB8AC3E}">
-        <p14:creationId xmlns:p14="http://schemas.microsoft.com/office/powerpoint/2010/main" val="2752311715"/>
+        <p14:creationId xmlns:p14="http://schemas.microsoft.com/office/powerpoint/2010/main" xmlns="" val="2752311715"/>
       </p:ext>
     </p:extLst>
   </p:cSld>
@@ -9601,7 +9603,7 @@
     </p:spTree>
     <p:extLst>
       <p:ext uri="{BB962C8B-B14F-4D97-AF65-F5344CB8AC3E}">
-        <p14:creationId xmlns:p14="http://schemas.microsoft.com/office/powerpoint/2010/main" val="761644953"/>
+        <p14:creationId xmlns:p14="http://schemas.microsoft.com/office/powerpoint/2010/main" xmlns="" val="761644953"/>
       </p:ext>
     </p:extLst>
   </p:cSld>
@@ -10050,7 +10052,7 @@
           <p:cNvPr id="2" name="Título 1">
             <a:extLst>
               <a:ext uri="{FF2B5EF4-FFF2-40B4-BE49-F238E27FC236}">
-                <a16:creationId xmlns:a16="http://schemas.microsoft.com/office/drawing/2014/main" id="{8CE1749D-25BE-4B8A-9C39-0568C1DB7176}"/>
+                <a16:creationId xmlns:a16="http://schemas.microsoft.com/office/drawing/2014/main" xmlns="" id="{8CE1749D-25BE-4B8A-9C39-0568C1DB7176}"/>
               </a:ext>
             </a:extLst>
           </p:cNvPr>
@@ -10085,7 +10087,7 @@
           <p:cNvPr id="5" name="Subtítulo 2">
             <a:extLst>
               <a:ext uri="{FF2B5EF4-FFF2-40B4-BE49-F238E27FC236}">
-                <a16:creationId xmlns:a16="http://schemas.microsoft.com/office/drawing/2014/main" id="{77C0998F-42B9-4F94-A4C5-FB800997D545}"/>
+                <a16:creationId xmlns:a16="http://schemas.microsoft.com/office/drawing/2014/main" xmlns="" id="{77C0998F-42B9-4F94-A4C5-FB800997D545}"/>
               </a:ext>
             </a:extLst>
           </p:cNvPr>
@@ -10122,7 +10124,7 @@
           <p:cNvPr id="3" name="CuadroTexto 2">
             <a:extLst>
               <a:ext uri="{FF2B5EF4-FFF2-40B4-BE49-F238E27FC236}">
-                <a16:creationId xmlns:a16="http://schemas.microsoft.com/office/drawing/2014/main" id="{EC53297C-9824-45B9-8927-A6834EB1DBD1}"/>
+                <a16:creationId xmlns:a16="http://schemas.microsoft.com/office/drawing/2014/main" xmlns="" id="{EC53297C-9824-45B9-8927-A6834EB1DBD1}"/>
               </a:ext>
             </a:extLst>
           </p:cNvPr>
@@ -10195,7 +10197,7 @@
           <p:cNvPr id="6" name="Imagen 5">
             <a:extLst>
               <a:ext uri="{FF2B5EF4-FFF2-40B4-BE49-F238E27FC236}">
-                <a16:creationId xmlns:a16="http://schemas.microsoft.com/office/drawing/2014/main" id="{765DC11C-9D6D-4F31-9AC7-1EFE6E6D455C}"/>
+                <a16:creationId xmlns:a16="http://schemas.microsoft.com/office/drawing/2014/main" xmlns="" id="{765DC11C-9D6D-4F31-9AC7-1EFE6E6D455C}"/>
               </a:ext>
             </a:extLst>
           </p:cNvPr>
@@ -10208,7 +10210,7 @@
           <a:blip r:embed="rId2" cstate="print">
             <a:extLst>
               <a:ext uri="{28A0092B-C50C-407E-A947-70E740481C1C}">
-                <a14:useLocalDpi xmlns:a14="http://schemas.microsoft.com/office/drawing/2010/main" val="0"/>
+                <a14:useLocalDpi xmlns:a14="http://schemas.microsoft.com/office/drawing/2010/main" xmlns="" val="0"/>
               </a:ext>
             </a:extLst>
           </a:blip>
@@ -10229,7 +10231,7 @@
     </p:spTree>
     <p:extLst>
       <p:ext uri="{BB962C8B-B14F-4D97-AF65-F5344CB8AC3E}">
-        <p14:creationId xmlns:p14="http://schemas.microsoft.com/office/powerpoint/2010/main" val="2967959437"/>
+        <p14:creationId xmlns:p14="http://schemas.microsoft.com/office/powerpoint/2010/main" xmlns="" val="2967959437"/>
       </p:ext>
     </p:extLst>
   </p:cSld>
@@ -10261,7 +10263,7 @@
           <p:cNvPr id="2" name="Título 1">
             <a:extLst>
               <a:ext uri="{FF2B5EF4-FFF2-40B4-BE49-F238E27FC236}">
-                <a16:creationId xmlns:a16="http://schemas.microsoft.com/office/drawing/2014/main" id="{0ED6D180-92C1-4333-BA91-2BBA4DD94A3B}"/>
+                <a16:creationId xmlns:a16="http://schemas.microsoft.com/office/drawing/2014/main" xmlns="" id="{0ED6D180-92C1-4333-BA91-2BBA4DD94A3B}"/>
               </a:ext>
             </a:extLst>
           </p:cNvPr>
@@ -10298,7 +10300,7 @@
           <p:cNvPr id="3" name="CuadroTexto 2">
             <a:extLst>
               <a:ext uri="{FF2B5EF4-FFF2-40B4-BE49-F238E27FC236}">
-                <a16:creationId xmlns:a16="http://schemas.microsoft.com/office/drawing/2014/main" id="{E665F2E2-2B33-462D-9202-2EF114C0930E}"/>
+                <a16:creationId xmlns:a16="http://schemas.microsoft.com/office/drawing/2014/main" xmlns="" id="{E665F2E2-2B33-462D-9202-2EF114C0930E}"/>
               </a:ext>
             </a:extLst>
           </p:cNvPr>
@@ -10437,7 +10439,7 @@
     </p:spTree>
     <p:extLst>
       <p:ext uri="{BB962C8B-B14F-4D97-AF65-F5344CB8AC3E}">
-        <p14:creationId xmlns:p14="http://schemas.microsoft.com/office/powerpoint/2010/main" val="3543839896"/>
+        <p14:creationId xmlns:p14="http://schemas.microsoft.com/office/powerpoint/2010/main" xmlns="" val="3543839896"/>
       </p:ext>
     </p:extLst>
   </p:cSld>
@@ -10469,7 +10471,7 @@
           <p:cNvPr id="4" name="Rectángulo 3">
             <a:extLst>
               <a:ext uri="{FF2B5EF4-FFF2-40B4-BE49-F238E27FC236}">
-                <a16:creationId xmlns:a16="http://schemas.microsoft.com/office/drawing/2014/main" id="{B0F1B4F4-0C7A-4C0E-8584-95718BC545EC}"/>
+                <a16:creationId xmlns:a16="http://schemas.microsoft.com/office/drawing/2014/main" xmlns="" id="{B0F1B4F4-0C7A-4C0E-8584-95718BC545EC}"/>
               </a:ext>
             </a:extLst>
           </p:cNvPr>
@@ -10528,7 +10530,7 @@
     </p:spTree>
     <p:extLst>
       <p:ext uri="{BB962C8B-B14F-4D97-AF65-F5344CB8AC3E}">
-        <p14:creationId xmlns:p14="http://schemas.microsoft.com/office/powerpoint/2010/main" val="1715947005"/>
+        <p14:creationId xmlns:p14="http://schemas.microsoft.com/office/powerpoint/2010/main" xmlns="" val="1715947005"/>
       </p:ext>
     </p:extLst>
   </p:cSld>
@@ -10560,7 +10562,7 @@
           <p:cNvPr id="2" name="Título 1">
             <a:extLst>
               <a:ext uri="{FF2B5EF4-FFF2-40B4-BE49-F238E27FC236}">
-                <a16:creationId xmlns:a16="http://schemas.microsoft.com/office/drawing/2014/main" id="{0ED6D180-92C1-4333-BA91-2BBA4DD94A3B}"/>
+                <a16:creationId xmlns:a16="http://schemas.microsoft.com/office/drawing/2014/main" xmlns="" id="{0ED6D180-92C1-4333-BA91-2BBA4DD94A3B}"/>
               </a:ext>
             </a:extLst>
           </p:cNvPr>
@@ -10597,7 +10599,7 @@
           <p:cNvPr id="5" name="Diagrama 4">
             <a:extLst>
               <a:ext uri="{FF2B5EF4-FFF2-40B4-BE49-F238E27FC236}">
-                <a16:creationId xmlns:a16="http://schemas.microsoft.com/office/drawing/2014/main" id="{D29B3E67-509D-445E-9F92-4DFCE92BD789}"/>
+                <a16:creationId xmlns:a16="http://schemas.microsoft.com/office/drawing/2014/main" xmlns="" id="{D29B3E67-509D-445E-9F92-4DFCE92BD789}"/>
               </a:ext>
             </a:extLst>
           </p:cNvPr>
@@ -10605,7 +10607,7 @@
           <p:nvPr>
             <p:extLst>
               <p:ext uri="{D42A27DB-BD31-4B8C-83A1-F6EECF244321}">
-                <p14:modId xmlns:p14="http://schemas.microsoft.com/office/powerpoint/2010/main" val="573577508"/>
+                <p14:modId xmlns:p14="http://schemas.microsoft.com/office/powerpoint/2010/main" xmlns="" val="573577508"/>
               </p:ext>
             </p:extLst>
           </p:nvPr>
@@ -10625,7 +10627,7 @@
           <p:cNvPr id="7" name="CuadroTexto 6">
             <a:extLst>
               <a:ext uri="{FF2B5EF4-FFF2-40B4-BE49-F238E27FC236}">
-                <a16:creationId xmlns:a16="http://schemas.microsoft.com/office/drawing/2014/main" id="{EFF07B65-0D67-434E-9DAD-C6F8000B23BA}"/>
+                <a16:creationId xmlns:a16="http://schemas.microsoft.com/office/drawing/2014/main" xmlns="" id="{EFF07B65-0D67-434E-9DAD-C6F8000B23BA}"/>
               </a:ext>
             </a:extLst>
           </p:cNvPr>
@@ -10717,7 +10719,7 @@
           <p:cNvPr id="9" name="CuadroTexto 8">
             <a:extLst>
               <a:ext uri="{FF2B5EF4-FFF2-40B4-BE49-F238E27FC236}">
-                <a16:creationId xmlns:a16="http://schemas.microsoft.com/office/drawing/2014/main" id="{97CF3F33-5EF6-48E7-9958-F9C2744489F1}"/>
+                <a16:creationId xmlns:a16="http://schemas.microsoft.com/office/drawing/2014/main" xmlns="" id="{97CF3F33-5EF6-48E7-9958-F9C2744489F1}"/>
               </a:ext>
             </a:extLst>
           </p:cNvPr>
@@ -10760,7 +10762,7 @@
           <p:cNvPr id="11" name="CuadroTexto 10">
             <a:extLst>
               <a:ext uri="{FF2B5EF4-FFF2-40B4-BE49-F238E27FC236}">
-                <a16:creationId xmlns:a16="http://schemas.microsoft.com/office/drawing/2014/main" id="{CFB755FD-7818-4BD2-8DEB-A53F85894D7B}"/>
+                <a16:creationId xmlns:a16="http://schemas.microsoft.com/office/drawing/2014/main" xmlns="" id="{CFB755FD-7818-4BD2-8DEB-A53F85894D7B}"/>
               </a:ext>
             </a:extLst>
           </p:cNvPr>
@@ -10812,7 +10814,7 @@
           <p:cNvPr id="13" name="CuadroTexto 12">
             <a:extLst>
               <a:ext uri="{FF2B5EF4-FFF2-40B4-BE49-F238E27FC236}">
-                <a16:creationId xmlns:a16="http://schemas.microsoft.com/office/drawing/2014/main" id="{1DC2E036-AC7A-450A-BDD4-9A2A0F769C65}"/>
+                <a16:creationId xmlns:a16="http://schemas.microsoft.com/office/drawing/2014/main" xmlns="" id="{1DC2E036-AC7A-450A-BDD4-9A2A0F769C65}"/>
               </a:ext>
             </a:extLst>
           </p:cNvPr>
@@ -10855,7 +10857,7 @@
           <p:cNvPr id="15" name="CuadroTexto 14">
             <a:extLst>
               <a:ext uri="{FF2B5EF4-FFF2-40B4-BE49-F238E27FC236}">
-                <a16:creationId xmlns:a16="http://schemas.microsoft.com/office/drawing/2014/main" id="{6ECB2B3E-252C-4E7C-8FB7-1815D6E1E0A0}"/>
+                <a16:creationId xmlns:a16="http://schemas.microsoft.com/office/drawing/2014/main" xmlns="" id="{6ECB2B3E-252C-4E7C-8FB7-1815D6E1E0A0}"/>
               </a:ext>
             </a:extLst>
           </p:cNvPr>
@@ -10896,7 +10898,7 @@
     </p:spTree>
     <p:extLst>
       <p:ext uri="{BB962C8B-B14F-4D97-AF65-F5344CB8AC3E}">
-        <p14:creationId xmlns:p14="http://schemas.microsoft.com/office/powerpoint/2010/main" val="2198404308"/>
+        <p14:creationId xmlns:p14="http://schemas.microsoft.com/office/powerpoint/2010/main" xmlns="" val="2198404308"/>
       </p:ext>
     </p:extLst>
   </p:cSld>
@@ -10928,7 +10930,7 @@
           <p:cNvPr id="2" name="Título 1">
             <a:extLst>
               <a:ext uri="{FF2B5EF4-FFF2-40B4-BE49-F238E27FC236}">
-                <a16:creationId xmlns:a16="http://schemas.microsoft.com/office/drawing/2014/main" id="{0ED6D180-92C1-4333-BA91-2BBA4DD94A3B}"/>
+                <a16:creationId xmlns:a16="http://schemas.microsoft.com/office/drawing/2014/main" xmlns="" id="{0ED6D180-92C1-4333-BA91-2BBA4DD94A3B}"/>
               </a:ext>
             </a:extLst>
           </p:cNvPr>
@@ -10965,7 +10967,7 @@
           <p:cNvPr id="6" name="CuadroTexto 5">
             <a:extLst>
               <a:ext uri="{FF2B5EF4-FFF2-40B4-BE49-F238E27FC236}">
-                <a16:creationId xmlns:a16="http://schemas.microsoft.com/office/drawing/2014/main" id="{BC8D092D-6667-447D-B473-A50467138064}"/>
+                <a16:creationId xmlns:a16="http://schemas.microsoft.com/office/drawing/2014/main" xmlns="" id="{BC8D092D-6667-447D-B473-A50467138064}"/>
               </a:ext>
             </a:extLst>
           </p:cNvPr>
@@ -11154,7 +11156,7 @@
     </p:spTree>
     <p:extLst>
       <p:ext uri="{BB962C8B-B14F-4D97-AF65-F5344CB8AC3E}">
-        <p14:creationId xmlns:p14="http://schemas.microsoft.com/office/powerpoint/2010/main" val="435960141"/>
+        <p14:creationId xmlns:p14="http://schemas.microsoft.com/office/powerpoint/2010/main" xmlns="" val="435960141"/>
       </p:ext>
     </p:extLst>
   </p:cSld>
@@ -11186,7 +11188,7 @@
           <p:cNvPr id="2" name="Título 1">
             <a:extLst>
               <a:ext uri="{FF2B5EF4-FFF2-40B4-BE49-F238E27FC236}">
-                <a16:creationId xmlns:a16="http://schemas.microsoft.com/office/drawing/2014/main" id="{0ED6D180-92C1-4333-BA91-2BBA4DD94A3B}"/>
+                <a16:creationId xmlns:a16="http://schemas.microsoft.com/office/drawing/2014/main" xmlns="" id="{0ED6D180-92C1-4333-BA91-2BBA4DD94A3B}"/>
               </a:ext>
             </a:extLst>
           </p:cNvPr>
@@ -11223,7 +11225,7 @@
           <p:cNvPr id="4" name="CuadroTexto 3">
             <a:extLst>
               <a:ext uri="{FF2B5EF4-FFF2-40B4-BE49-F238E27FC236}">
-                <a16:creationId xmlns:a16="http://schemas.microsoft.com/office/drawing/2014/main" id="{8CA9892C-E43D-4950-A9DB-82D0909AEB99}"/>
+                <a16:creationId xmlns:a16="http://schemas.microsoft.com/office/drawing/2014/main" xmlns="" id="{8CA9892C-E43D-4950-A9DB-82D0909AEB99}"/>
               </a:ext>
             </a:extLst>
           </p:cNvPr>
@@ -11447,7 +11449,7 @@
           <p:cNvPr id="5" name="Imagen 4">
             <a:extLst>
               <a:ext uri="{FF2B5EF4-FFF2-40B4-BE49-F238E27FC236}">
-                <a16:creationId xmlns:a16="http://schemas.microsoft.com/office/drawing/2014/main" id="{8D68F66A-CBEF-48F6-ACAD-43B4CF6CA214}"/>
+                <a16:creationId xmlns:a16="http://schemas.microsoft.com/office/drawing/2014/main" xmlns="" id="{8D68F66A-CBEF-48F6-ACAD-43B4CF6CA214}"/>
               </a:ext>
             </a:extLst>
           </p:cNvPr>
@@ -11475,7 +11477,7 @@
     </p:spTree>
     <p:extLst>
       <p:ext uri="{BB962C8B-B14F-4D97-AF65-F5344CB8AC3E}">
-        <p14:creationId xmlns:p14="http://schemas.microsoft.com/office/powerpoint/2010/main" val="1725776676"/>
+        <p14:creationId xmlns:p14="http://schemas.microsoft.com/office/powerpoint/2010/main" xmlns="" val="1725776676"/>
       </p:ext>
     </p:extLst>
   </p:cSld>
@@ -11507,7 +11509,7 @@
           <p:cNvPr id="2" name="Título 1">
             <a:extLst>
               <a:ext uri="{FF2B5EF4-FFF2-40B4-BE49-F238E27FC236}">
-                <a16:creationId xmlns:a16="http://schemas.microsoft.com/office/drawing/2014/main" id="{0ED6D180-92C1-4333-BA91-2BBA4DD94A3B}"/>
+                <a16:creationId xmlns:a16="http://schemas.microsoft.com/office/drawing/2014/main" xmlns="" id="{0ED6D180-92C1-4333-BA91-2BBA4DD94A3B}"/>
               </a:ext>
             </a:extLst>
           </p:cNvPr>
@@ -11544,7 +11546,7 @@
           <p:cNvPr id="4" name="CuadroTexto 3">
             <a:extLst>
               <a:ext uri="{FF2B5EF4-FFF2-40B4-BE49-F238E27FC236}">
-                <a16:creationId xmlns:a16="http://schemas.microsoft.com/office/drawing/2014/main" id="{75A3151E-9801-4177-9D45-E0BCDCE47895}"/>
+                <a16:creationId xmlns:a16="http://schemas.microsoft.com/office/drawing/2014/main" xmlns="" id="{75A3151E-9801-4177-9D45-E0BCDCE47895}"/>
               </a:ext>
             </a:extLst>
           </p:cNvPr>
@@ -11723,7 +11725,7 @@
           <p:cNvPr id="3" name="Imagen 2">
             <a:extLst>
               <a:ext uri="{FF2B5EF4-FFF2-40B4-BE49-F238E27FC236}">
-                <a16:creationId xmlns:a16="http://schemas.microsoft.com/office/drawing/2014/main" id="{6739EDCA-90AA-497B-9BB2-9A681A92C9AE}"/>
+                <a16:creationId xmlns:a16="http://schemas.microsoft.com/office/drawing/2014/main" xmlns="" id="{6739EDCA-90AA-497B-9BB2-9A681A92C9AE}"/>
               </a:ext>
             </a:extLst>
           </p:cNvPr>
@@ -11753,7 +11755,7 @@
           <p:cNvPr id="7" name="Imagen 6">
             <a:extLst>
               <a:ext uri="{FF2B5EF4-FFF2-40B4-BE49-F238E27FC236}">
-                <a16:creationId xmlns:a16="http://schemas.microsoft.com/office/drawing/2014/main" id="{B60D751C-2D3B-4289-A03E-4A94D23B003E}"/>
+                <a16:creationId xmlns:a16="http://schemas.microsoft.com/office/drawing/2014/main" xmlns="" id="{B60D751C-2D3B-4289-A03E-4A94D23B003E}"/>
               </a:ext>
             </a:extLst>
           </p:cNvPr>
@@ -11766,7 +11768,7 @@
           <a:blip r:embed="rId3" cstate="print">
             <a:extLst>
               <a:ext uri="{28A0092B-C50C-407E-A947-70E740481C1C}">
-                <a14:useLocalDpi xmlns:a14="http://schemas.microsoft.com/office/drawing/2010/main" val="0"/>
+                <a14:useLocalDpi xmlns:a14="http://schemas.microsoft.com/office/drawing/2010/main" xmlns="" val="0"/>
               </a:ext>
             </a:extLst>
           </a:blip>
@@ -11787,7 +11789,7 @@
     </p:spTree>
     <p:extLst>
       <p:ext uri="{BB962C8B-B14F-4D97-AF65-F5344CB8AC3E}">
-        <p14:creationId xmlns:p14="http://schemas.microsoft.com/office/powerpoint/2010/main" val="1240761595"/>
+        <p14:creationId xmlns:p14="http://schemas.microsoft.com/office/powerpoint/2010/main" xmlns="" val="1240761595"/>
       </p:ext>
     </p:extLst>
   </p:cSld>
@@ -11819,7 +11821,7 @@
           <p:cNvPr id="2" name="Título 1">
             <a:extLst>
               <a:ext uri="{FF2B5EF4-FFF2-40B4-BE49-F238E27FC236}">
-                <a16:creationId xmlns:a16="http://schemas.microsoft.com/office/drawing/2014/main" id="{0ED6D180-92C1-4333-BA91-2BBA4DD94A3B}"/>
+                <a16:creationId xmlns:a16="http://schemas.microsoft.com/office/drawing/2014/main" xmlns="" id="{0ED6D180-92C1-4333-BA91-2BBA4DD94A3B}"/>
               </a:ext>
             </a:extLst>
           </p:cNvPr>
@@ -11856,7 +11858,7 @@
           <p:cNvPr id="6" name="CuadroTexto 5">
             <a:extLst>
               <a:ext uri="{FF2B5EF4-FFF2-40B4-BE49-F238E27FC236}">
-                <a16:creationId xmlns:a16="http://schemas.microsoft.com/office/drawing/2014/main" id="{F6D80EE5-216D-4845-9450-E702A6BBF160}"/>
+                <a16:creationId xmlns:a16="http://schemas.microsoft.com/office/drawing/2014/main" xmlns="" id="{F6D80EE5-216D-4845-9450-E702A6BBF160}"/>
               </a:ext>
             </a:extLst>
           </p:cNvPr>
@@ -12027,7 +12029,7 @@
     </p:spTree>
     <p:extLst>
       <p:ext uri="{BB962C8B-B14F-4D97-AF65-F5344CB8AC3E}">
-        <p14:creationId xmlns:p14="http://schemas.microsoft.com/office/powerpoint/2010/main" val="1139959922"/>
+        <p14:creationId xmlns:p14="http://schemas.microsoft.com/office/powerpoint/2010/main" xmlns="" val="1139959922"/>
       </p:ext>
     </p:extLst>
   </p:cSld>
@@ -12059,7 +12061,7 @@
           <p:cNvPr id="4" name="Rectángulo 3">
             <a:extLst>
               <a:ext uri="{FF2B5EF4-FFF2-40B4-BE49-F238E27FC236}">
-                <a16:creationId xmlns:a16="http://schemas.microsoft.com/office/drawing/2014/main" id="{B0F1B4F4-0C7A-4C0E-8584-95718BC545EC}"/>
+                <a16:creationId xmlns:a16="http://schemas.microsoft.com/office/drawing/2014/main" xmlns="" id="{B0F1B4F4-0C7A-4C0E-8584-95718BC545EC}"/>
               </a:ext>
             </a:extLst>
           </p:cNvPr>
@@ -12118,7 +12120,7 @@
     </p:spTree>
     <p:extLst>
       <p:ext uri="{BB962C8B-B14F-4D97-AF65-F5344CB8AC3E}">
-        <p14:creationId xmlns:p14="http://schemas.microsoft.com/office/powerpoint/2010/main" val="3874587205"/>
+        <p14:creationId xmlns:p14="http://schemas.microsoft.com/office/powerpoint/2010/main" xmlns="" val="3874587205"/>
       </p:ext>
     </p:extLst>
   </p:cSld>
@@ -12150,7 +12152,7 @@
           <p:cNvPr id="4" name="Rectángulo 3">
             <a:extLst>
               <a:ext uri="{FF2B5EF4-FFF2-40B4-BE49-F238E27FC236}">
-                <a16:creationId xmlns:a16="http://schemas.microsoft.com/office/drawing/2014/main" id="{B0F1B4F4-0C7A-4C0E-8584-95718BC545EC}"/>
+                <a16:creationId xmlns:a16="http://schemas.microsoft.com/office/drawing/2014/main" xmlns="" id="{B0F1B4F4-0C7A-4C0E-8584-95718BC545EC}"/>
               </a:ext>
             </a:extLst>
           </p:cNvPr>
@@ -12196,7 +12198,7 @@
     </p:spTree>
     <p:extLst>
       <p:ext uri="{BB962C8B-B14F-4D97-AF65-F5344CB8AC3E}">
-        <p14:creationId xmlns:p14="http://schemas.microsoft.com/office/powerpoint/2010/main" val="4258438740"/>
+        <p14:creationId xmlns:p14="http://schemas.microsoft.com/office/powerpoint/2010/main" xmlns="" val="4258438740"/>
       </p:ext>
     </p:extLst>
   </p:cSld>
@@ -12228,7 +12230,7 @@
           <p:cNvPr id="4" name="Gráfico 3">
             <a:extLst>
               <a:ext uri="{FF2B5EF4-FFF2-40B4-BE49-F238E27FC236}">
-                <a16:creationId xmlns:a16="http://schemas.microsoft.com/office/drawing/2014/main" id="{AEDE60AA-37AA-4383-BA26-5EA432BE4F35}"/>
+                <a16:creationId xmlns:a16="http://schemas.microsoft.com/office/drawing/2014/main" xmlns="" id="{AEDE60AA-37AA-4383-BA26-5EA432BE4F35}"/>
               </a:ext>
             </a:extLst>
           </p:cNvPr>
@@ -12236,7 +12238,7 @@
           <p:nvPr>
             <p:extLst>
               <p:ext uri="{D42A27DB-BD31-4B8C-83A1-F6EECF244321}">
-                <p14:modId xmlns:p14="http://schemas.microsoft.com/office/powerpoint/2010/main" val="171994633"/>
+                <p14:modId xmlns:p14="http://schemas.microsoft.com/office/powerpoint/2010/main" xmlns="" val="171994633"/>
               </p:ext>
             </p:extLst>
           </p:nvPr>
@@ -12256,7 +12258,7 @@
           <p:cNvPr id="3" name="CuadroTexto 2">
             <a:extLst>
               <a:ext uri="{FF2B5EF4-FFF2-40B4-BE49-F238E27FC236}">
-                <a16:creationId xmlns:a16="http://schemas.microsoft.com/office/drawing/2014/main" id="{29B4C296-372F-455A-BE5A-B512322B8EDE}"/>
+                <a16:creationId xmlns:a16="http://schemas.microsoft.com/office/drawing/2014/main" xmlns="" id="{29B4C296-372F-455A-BE5A-B512322B8EDE}"/>
               </a:ext>
             </a:extLst>
           </p:cNvPr>
@@ -12290,7 +12292,7 @@
     </p:spTree>
     <p:extLst>
       <p:ext uri="{BB962C8B-B14F-4D97-AF65-F5344CB8AC3E}">
-        <p14:creationId xmlns:p14="http://schemas.microsoft.com/office/powerpoint/2010/main" val="3883774572"/>
+        <p14:creationId xmlns:p14="http://schemas.microsoft.com/office/powerpoint/2010/main" xmlns="" val="3883774572"/>
       </p:ext>
     </p:extLst>
   </p:cSld>
@@ -12322,7 +12324,7 @@
           <p:cNvPr id="4" name="Título 3">
             <a:extLst>
               <a:ext uri="{FF2B5EF4-FFF2-40B4-BE49-F238E27FC236}">
-                <a16:creationId xmlns:a16="http://schemas.microsoft.com/office/drawing/2014/main" id="{FA4EADB5-92CE-4B25-BE21-7FC484AE680E}"/>
+                <a16:creationId xmlns:a16="http://schemas.microsoft.com/office/drawing/2014/main" xmlns="" id="{FA4EADB5-92CE-4B25-BE21-7FC484AE680E}"/>
               </a:ext>
             </a:extLst>
           </p:cNvPr>
@@ -12360,7 +12362,7 @@
           <p:cNvPr id="5" name="Subtítulo 4">
             <a:extLst>
               <a:ext uri="{FF2B5EF4-FFF2-40B4-BE49-F238E27FC236}">
-                <a16:creationId xmlns:a16="http://schemas.microsoft.com/office/drawing/2014/main" id="{7035CB29-6D24-4E02-AC9F-07DC0DE9312C}"/>
+                <a16:creationId xmlns:a16="http://schemas.microsoft.com/office/drawing/2014/main" xmlns="" id="{7035CB29-6D24-4E02-AC9F-07DC0DE9312C}"/>
               </a:ext>
             </a:extLst>
           </p:cNvPr>
@@ -12516,7 +12518,7 @@
     </p:spTree>
     <p:extLst>
       <p:ext uri="{BB962C8B-B14F-4D97-AF65-F5344CB8AC3E}">
-        <p14:creationId xmlns:p14="http://schemas.microsoft.com/office/powerpoint/2010/main" val="503208862"/>
+        <p14:creationId xmlns:p14="http://schemas.microsoft.com/office/powerpoint/2010/main" xmlns="" val="503208862"/>
       </p:ext>
     </p:extLst>
   </p:cSld>
@@ -12548,7 +12550,7 @@
           <p:cNvPr id="4" name="Rectángulo 3">
             <a:extLst>
               <a:ext uri="{FF2B5EF4-FFF2-40B4-BE49-F238E27FC236}">
-                <a16:creationId xmlns:a16="http://schemas.microsoft.com/office/drawing/2014/main" id="{B0F1B4F4-0C7A-4C0E-8584-95718BC545EC}"/>
+                <a16:creationId xmlns:a16="http://schemas.microsoft.com/office/drawing/2014/main" xmlns="" id="{B0F1B4F4-0C7A-4C0E-8584-95718BC545EC}"/>
               </a:ext>
             </a:extLst>
           </p:cNvPr>
@@ -12594,7 +12596,7 @@
     </p:spTree>
     <p:extLst>
       <p:ext uri="{BB962C8B-B14F-4D97-AF65-F5344CB8AC3E}">
-        <p14:creationId xmlns:p14="http://schemas.microsoft.com/office/powerpoint/2010/main" val="4003469650"/>
+        <p14:creationId xmlns:p14="http://schemas.microsoft.com/office/powerpoint/2010/main" xmlns="" val="4003469650"/>
       </p:ext>
     </p:extLst>
   </p:cSld>
@@ -12626,7 +12628,7 @@
           <p:cNvPr id="2" name="Título 1">
             <a:extLst>
               <a:ext uri="{FF2B5EF4-FFF2-40B4-BE49-F238E27FC236}">
-                <a16:creationId xmlns:a16="http://schemas.microsoft.com/office/drawing/2014/main" id="{0ED6D180-92C1-4333-BA91-2BBA4DD94A3B}"/>
+                <a16:creationId xmlns:a16="http://schemas.microsoft.com/office/drawing/2014/main" xmlns="" id="{0ED6D180-92C1-4333-BA91-2BBA4DD94A3B}"/>
               </a:ext>
             </a:extLst>
           </p:cNvPr>
@@ -12685,7 +12687,7 @@
     </p:spTree>
     <p:extLst>
       <p:ext uri="{BB962C8B-B14F-4D97-AF65-F5344CB8AC3E}">
-        <p14:creationId xmlns:p14="http://schemas.microsoft.com/office/powerpoint/2010/main" val="2470537140"/>
+        <p14:creationId xmlns:p14="http://schemas.microsoft.com/office/powerpoint/2010/main" xmlns="" val="2470537140"/>
       </p:ext>
     </p:extLst>
   </p:cSld>
@@ -12717,7 +12719,7 @@
           <p:cNvPr id="2" name="Título 1">
             <a:extLst>
               <a:ext uri="{FF2B5EF4-FFF2-40B4-BE49-F238E27FC236}">
-                <a16:creationId xmlns:a16="http://schemas.microsoft.com/office/drawing/2014/main" id="{0ED6D180-92C1-4333-BA91-2BBA4DD94A3B}"/>
+                <a16:creationId xmlns:a16="http://schemas.microsoft.com/office/drawing/2014/main" xmlns="" id="{0ED6D180-92C1-4333-BA91-2BBA4DD94A3B}"/>
               </a:ext>
             </a:extLst>
           </p:cNvPr>
@@ -12776,7 +12778,7 @@
     </p:spTree>
     <p:extLst>
       <p:ext uri="{BB962C8B-B14F-4D97-AF65-F5344CB8AC3E}">
-        <p14:creationId xmlns:p14="http://schemas.microsoft.com/office/powerpoint/2010/main" val="3950036555"/>
+        <p14:creationId xmlns:p14="http://schemas.microsoft.com/office/powerpoint/2010/main" xmlns="" val="3950036555"/>
       </p:ext>
     </p:extLst>
   </p:cSld>
@@ -12808,7 +12810,7 @@
           <p:cNvPr id="2" name="Título 1">
             <a:extLst>
               <a:ext uri="{FF2B5EF4-FFF2-40B4-BE49-F238E27FC236}">
-                <a16:creationId xmlns:a16="http://schemas.microsoft.com/office/drawing/2014/main" id="{0ED6D180-92C1-4333-BA91-2BBA4DD94A3B}"/>
+                <a16:creationId xmlns:a16="http://schemas.microsoft.com/office/drawing/2014/main" xmlns="" id="{0ED6D180-92C1-4333-BA91-2BBA4DD94A3B}"/>
               </a:ext>
             </a:extLst>
           </p:cNvPr>
@@ -12867,7 +12869,7 @@
     </p:spTree>
     <p:extLst>
       <p:ext uri="{BB962C8B-B14F-4D97-AF65-F5344CB8AC3E}">
-        <p14:creationId xmlns:p14="http://schemas.microsoft.com/office/powerpoint/2010/main" val="3027958132"/>
+        <p14:creationId xmlns:p14="http://schemas.microsoft.com/office/powerpoint/2010/main" xmlns="" val="3027958132"/>
       </p:ext>
     </p:extLst>
   </p:cSld>
@@ -12899,7 +12901,7 @@
           <p:cNvPr id="4" name="Rectángulo 3">
             <a:extLst>
               <a:ext uri="{FF2B5EF4-FFF2-40B4-BE49-F238E27FC236}">
-                <a16:creationId xmlns:a16="http://schemas.microsoft.com/office/drawing/2014/main" id="{B0F1B4F4-0C7A-4C0E-8584-95718BC545EC}"/>
+                <a16:creationId xmlns:a16="http://schemas.microsoft.com/office/drawing/2014/main" xmlns="" id="{B0F1B4F4-0C7A-4C0E-8584-95718BC545EC}"/>
               </a:ext>
             </a:extLst>
           </p:cNvPr>
@@ -12945,7 +12947,7 @@
     </p:spTree>
     <p:extLst>
       <p:ext uri="{BB962C8B-B14F-4D97-AF65-F5344CB8AC3E}">
-        <p14:creationId xmlns:p14="http://schemas.microsoft.com/office/powerpoint/2010/main" val="2803738474"/>
+        <p14:creationId xmlns:p14="http://schemas.microsoft.com/office/powerpoint/2010/main" xmlns="" val="2803738474"/>
       </p:ext>
     </p:extLst>
   </p:cSld>
@@ -13001,7 +13003,7 @@
     </p:spTree>
     <p:extLst>
       <p:ext uri="{BB962C8B-B14F-4D97-AF65-F5344CB8AC3E}">
-        <p14:creationId xmlns:p14="http://schemas.microsoft.com/office/powerpoint/2010/main" val="2861481179"/>
+        <p14:creationId xmlns:p14="http://schemas.microsoft.com/office/powerpoint/2010/main" xmlns="" val="2861481179"/>
       </p:ext>
     </p:extLst>
   </p:cSld>
@@ -13033,7 +13035,7 @@
           <p:cNvPr id="4" name="Rectángulo 3">
             <a:extLst>
               <a:ext uri="{FF2B5EF4-FFF2-40B4-BE49-F238E27FC236}">
-                <a16:creationId xmlns:a16="http://schemas.microsoft.com/office/drawing/2014/main" id="{B0F1B4F4-0C7A-4C0E-8584-95718BC545EC}"/>
+                <a16:creationId xmlns:a16="http://schemas.microsoft.com/office/drawing/2014/main" xmlns="" id="{B0F1B4F4-0C7A-4C0E-8584-95718BC545EC}"/>
               </a:ext>
             </a:extLst>
           </p:cNvPr>
@@ -13130,7 +13132,7 @@
     </p:spTree>
     <p:extLst>
       <p:ext uri="{BB962C8B-B14F-4D97-AF65-F5344CB8AC3E}">
-        <p14:creationId xmlns:p14="http://schemas.microsoft.com/office/powerpoint/2010/main" val="4125267999"/>
+        <p14:creationId xmlns:p14="http://schemas.microsoft.com/office/powerpoint/2010/main" xmlns="" val="4125267999"/>
       </p:ext>
     </p:extLst>
   </p:cSld>
@@ -13171,7 +13173,7 @@
           <a:blip r:embed="rId2" cstate="print">
             <a:extLst>
               <a:ext uri="{28A0092B-C50C-407E-A947-70E740481C1C}">
-                <a14:useLocalDpi xmlns:a14="http://schemas.microsoft.com/office/drawing/2010/main" val="0"/>
+                <a14:useLocalDpi xmlns:a14="http://schemas.microsoft.com/office/drawing/2010/main" xmlns="" val="0"/>
               </a:ext>
             </a:extLst>
           </a:blip>
@@ -13198,7 +13200,7 @@
           <a:blip r:embed="rId3" cstate="print">
             <a:extLst>
               <a:ext uri="{28A0092B-C50C-407E-A947-70E740481C1C}">
-                <a14:useLocalDpi xmlns:a14="http://schemas.microsoft.com/office/drawing/2010/main" val="0"/>
+                <a14:useLocalDpi xmlns:a14="http://schemas.microsoft.com/office/drawing/2010/main" xmlns="" val="0"/>
               </a:ext>
             </a:extLst>
           </a:blip>
@@ -13296,7 +13298,7 @@
           <a:blip r:embed="rId4" cstate="print">
             <a:extLst>
               <a:ext uri="{28A0092B-C50C-407E-A947-70E740481C1C}">
-                <a14:useLocalDpi xmlns:a14="http://schemas.microsoft.com/office/drawing/2010/main" val="0"/>
+                <a14:useLocalDpi xmlns:a14="http://schemas.microsoft.com/office/drawing/2010/main" xmlns="" val="0"/>
               </a:ext>
             </a:extLst>
           </a:blip>
@@ -13392,7 +13394,7 @@
           <a:blip r:embed="rId5" cstate="print">
             <a:extLst>
               <a:ext uri="{28A0092B-C50C-407E-A947-70E740481C1C}">
-                <a14:useLocalDpi xmlns:a14="http://schemas.microsoft.com/office/drawing/2010/main" val="0"/>
+                <a14:useLocalDpi xmlns:a14="http://schemas.microsoft.com/office/drawing/2010/main" xmlns="" val="0"/>
               </a:ext>
             </a:extLst>
           </a:blip>
@@ -13422,7 +13424,7 @@
           <a:blip r:embed="rId6" cstate="print">
             <a:extLst>
               <a:ext uri="{28A0092B-C50C-407E-A947-70E740481C1C}">
-                <a14:useLocalDpi xmlns:a14="http://schemas.microsoft.com/office/drawing/2010/main" val="0"/>
+                <a14:useLocalDpi xmlns:a14="http://schemas.microsoft.com/office/drawing/2010/main" xmlns="" val="0"/>
               </a:ext>
             </a:extLst>
           </a:blip>
@@ -13452,7 +13454,7 @@
           <a:blip r:embed="rId7" cstate="print">
             <a:extLst>
               <a:ext uri="{28A0092B-C50C-407E-A947-70E740481C1C}">
-                <a14:useLocalDpi xmlns:a14="http://schemas.microsoft.com/office/drawing/2010/main" val="0"/>
+                <a14:useLocalDpi xmlns:a14="http://schemas.microsoft.com/office/drawing/2010/main" xmlns="" val="0"/>
               </a:ext>
             </a:extLst>
           </a:blip>
@@ -13534,7 +13536,7 @@
           <a:blip r:embed="rId8" cstate="print">
             <a:extLst>
               <a:ext uri="{28A0092B-C50C-407E-A947-70E740481C1C}">
-                <a14:useLocalDpi xmlns:a14="http://schemas.microsoft.com/office/drawing/2010/main" val="0"/>
+                <a14:useLocalDpi xmlns:a14="http://schemas.microsoft.com/office/drawing/2010/main" xmlns="" val="0"/>
               </a:ext>
             </a:extLst>
           </a:blip>
@@ -13564,7 +13566,7 @@
           <a:blip r:embed="rId9" cstate="print">
             <a:extLst>
               <a:ext uri="{28A0092B-C50C-407E-A947-70E740481C1C}">
-                <a14:useLocalDpi xmlns:a14="http://schemas.microsoft.com/office/drawing/2010/main" val="0"/>
+                <a14:useLocalDpi xmlns:a14="http://schemas.microsoft.com/office/drawing/2010/main" xmlns="" val="0"/>
               </a:ext>
             </a:extLst>
           </a:blip>
@@ -13594,7 +13596,7 @@
           <a:blip r:embed="rId10" cstate="print">
             <a:extLst>
               <a:ext uri="{28A0092B-C50C-407E-A947-70E740481C1C}">
-                <a14:useLocalDpi xmlns:a14="http://schemas.microsoft.com/office/drawing/2010/main" val="0"/>
+                <a14:useLocalDpi xmlns:a14="http://schemas.microsoft.com/office/drawing/2010/main" xmlns="" val="0"/>
               </a:ext>
             </a:extLst>
           </a:blip>
@@ -13666,7 +13668,7 @@
           <a:blip r:embed="rId11" cstate="print">
             <a:extLst>
               <a:ext uri="{28A0092B-C50C-407E-A947-70E740481C1C}">
-                <a14:useLocalDpi xmlns:a14="http://schemas.microsoft.com/office/drawing/2010/main" val="0"/>
+                <a14:useLocalDpi xmlns:a14="http://schemas.microsoft.com/office/drawing/2010/main" xmlns="" val="0"/>
               </a:ext>
             </a:extLst>
           </a:blip>
@@ -13696,7 +13698,7 @@
           <a:blip r:embed="rId12" cstate="print">
             <a:extLst>
               <a:ext uri="{28A0092B-C50C-407E-A947-70E740481C1C}">
-                <a14:useLocalDpi xmlns:a14="http://schemas.microsoft.com/office/drawing/2010/main" val="0"/>
+                <a14:useLocalDpi xmlns:a14="http://schemas.microsoft.com/office/drawing/2010/main" xmlns="" val="0"/>
               </a:ext>
             </a:extLst>
           </a:blip>
@@ -13726,7 +13728,7 @@
           <a:blip r:embed="rId13" cstate="print">
             <a:extLst>
               <a:ext uri="{28A0092B-C50C-407E-A947-70E740481C1C}">
-                <a14:useLocalDpi xmlns:a14="http://schemas.microsoft.com/office/drawing/2010/main" val="0"/>
+                <a14:useLocalDpi xmlns:a14="http://schemas.microsoft.com/office/drawing/2010/main" xmlns="" val="0"/>
               </a:ext>
             </a:extLst>
           </a:blip>
@@ -13756,7 +13758,7 @@
           <a:blip r:embed="rId14" cstate="print">
             <a:extLst>
               <a:ext uri="{28A0092B-C50C-407E-A947-70E740481C1C}">
-                <a14:useLocalDpi xmlns:a14="http://schemas.microsoft.com/office/drawing/2010/main" val="0"/>
+                <a14:useLocalDpi xmlns:a14="http://schemas.microsoft.com/office/drawing/2010/main" xmlns="" val="0"/>
               </a:ext>
             </a:extLst>
           </a:blip>
@@ -13786,7 +13788,7 @@
           <a:blip r:embed="rId15" cstate="print">
             <a:extLst>
               <a:ext uri="{28A0092B-C50C-407E-A947-70E740481C1C}">
-                <a14:useLocalDpi xmlns:a14="http://schemas.microsoft.com/office/drawing/2010/main" val="0"/>
+                <a14:useLocalDpi xmlns:a14="http://schemas.microsoft.com/office/drawing/2010/main" xmlns="" val="0"/>
               </a:ext>
             </a:extLst>
           </a:blip>
@@ -13816,7 +13818,7 @@
           <a:blip r:embed="rId16" cstate="print">
             <a:extLst>
               <a:ext uri="{28A0092B-C50C-407E-A947-70E740481C1C}">
-                <a14:useLocalDpi xmlns:a14="http://schemas.microsoft.com/office/drawing/2010/main" val="0"/>
+                <a14:useLocalDpi xmlns:a14="http://schemas.microsoft.com/office/drawing/2010/main" xmlns="" val="0"/>
               </a:ext>
             </a:extLst>
           </a:blip>
@@ -13846,7 +13848,7 @@
           <a:blip r:embed="rId17" cstate="print">
             <a:extLst>
               <a:ext uri="{28A0092B-C50C-407E-A947-70E740481C1C}">
-                <a14:useLocalDpi xmlns:a14="http://schemas.microsoft.com/office/drawing/2010/main" val="0"/>
+                <a14:useLocalDpi xmlns:a14="http://schemas.microsoft.com/office/drawing/2010/main" xmlns="" val="0"/>
               </a:ext>
             </a:extLst>
           </a:blip>
@@ -13866,7 +13868,7 @@
           <a:noFill/>
           <a:extLst>
             <a:ext uri="{909E8E84-426E-40DD-AFC4-6F175D3DCCD1}">
-              <a14:hiddenFill xmlns:a14="http://schemas.microsoft.com/office/drawing/2010/main">
+              <a14:hiddenFill xmlns:a14="http://schemas.microsoft.com/office/drawing/2010/main" xmlns="">
                 <a:solidFill>
                   <a:srgbClr val="FFFFFF"/>
                 </a:solidFill>
@@ -13964,7 +13966,7 @@
           <p:cNvPr id="2" name="Picture 2">
             <a:extLst>
               <a:ext uri="{FF2B5EF4-FFF2-40B4-BE49-F238E27FC236}">
-                <a16:creationId xmlns:a16="http://schemas.microsoft.com/office/drawing/2014/main" id="{0CAF1ED9-ABEB-4E64-A9BA-A91A6C5DFDE2}"/>
+                <a16:creationId xmlns:a16="http://schemas.microsoft.com/office/drawing/2014/main" xmlns="" id="{0CAF1ED9-ABEB-4E64-A9BA-A91A6C5DFDE2}"/>
               </a:ext>
             </a:extLst>
           </p:cNvPr>
@@ -13977,7 +13979,7 @@
           <a:blip r:embed="rId18" cstate="print">
             <a:extLst>
               <a:ext uri="{28A0092B-C50C-407E-A947-70E740481C1C}">
-                <a14:useLocalDpi xmlns:a14="http://schemas.microsoft.com/office/drawing/2010/main" val="0"/>
+                <a14:useLocalDpi xmlns:a14="http://schemas.microsoft.com/office/drawing/2010/main" xmlns="" val="0"/>
               </a:ext>
             </a:extLst>
           </a:blip>
@@ -13997,7 +13999,7 @@
           <a:noFill/>
           <a:extLst>
             <a:ext uri="{909E8E84-426E-40DD-AFC4-6F175D3DCCD1}">
-              <a14:hiddenFill xmlns:a14="http://schemas.microsoft.com/office/drawing/2010/main">
+              <a14:hiddenFill xmlns:a14="http://schemas.microsoft.com/office/drawing/2010/main" xmlns="">
                 <a:solidFill>
                   <a:srgbClr val="FFFFFF"/>
                 </a:solidFill>
@@ -14011,7 +14013,7 @@
           <p:cNvPr id="31" name="CuadroTexto 30">
             <a:extLst>
               <a:ext uri="{FF2B5EF4-FFF2-40B4-BE49-F238E27FC236}">
-                <a16:creationId xmlns:a16="http://schemas.microsoft.com/office/drawing/2014/main" id="{E653EC3C-5DB9-4B37-AF01-85EDB5934CC1}"/>
+                <a16:creationId xmlns:a16="http://schemas.microsoft.com/office/drawing/2014/main" xmlns="" id="{E653EC3C-5DB9-4B37-AF01-85EDB5934CC1}"/>
               </a:ext>
             </a:extLst>
           </p:cNvPr>
@@ -14050,7 +14052,7 @@
     </p:spTree>
     <p:extLst>
       <p:ext uri="{BB962C8B-B14F-4D97-AF65-F5344CB8AC3E}">
-        <p14:creationId xmlns:p14="http://schemas.microsoft.com/office/powerpoint/2010/main" val="2982195199"/>
+        <p14:creationId xmlns:p14="http://schemas.microsoft.com/office/powerpoint/2010/main" xmlns="" val="2982195199"/>
       </p:ext>
     </p:extLst>
   </p:cSld>
@@ -14082,7 +14084,7 @@
           <p:cNvPr id="4" name="Rectángulo 3">
             <a:extLst>
               <a:ext uri="{FF2B5EF4-FFF2-40B4-BE49-F238E27FC236}">
-                <a16:creationId xmlns:a16="http://schemas.microsoft.com/office/drawing/2014/main" id="{B0F1B4F4-0C7A-4C0E-8584-95718BC545EC}"/>
+                <a16:creationId xmlns:a16="http://schemas.microsoft.com/office/drawing/2014/main" xmlns="" id="{B0F1B4F4-0C7A-4C0E-8584-95718BC545EC}"/>
               </a:ext>
             </a:extLst>
           </p:cNvPr>
@@ -14141,7 +14143,7 @@
     </p:spTree>
     <p:extLst>
       <p:ext uri="{BB962C8B-B14F-4D97-AF65-F5344CB8AC3E}">
-        <p14:creationId xmlns:p14="http://schemas.microsoft.com/office/powerpoint/2010/main" val="115837642"/>
+        <p14:creationId xmlns:p14="http://schemas.microsoft.com/office/powerpoint/2010/main" xmlns="" val="115837642"/>
       </p:ext>
     </p:extLst>
   </p:cSld>
@@ -14173,7 +14175,7 @@
           <p:cNvPr id="2" name="Título 1">
             <a:extLst>
               <a:ext uri="{FF2B5EF4-FFF2-40B4-BE49-F238E27FC236}">
-                <a16:creationId xmlns:a16="http://schemas.microsoft.com/office/drawing/2014/main" id="{0ED6D180-92C1-4333-BA91-2BBA4DD94A3B}"/>
+                <a16:creationId xmlns:a16="http://schemas.microsoft.com/office/drawing/2014/main" xmlns="" id="{0ED6D180-92C1-4333-BA91-2BBA4DD94A3B}"/>
               </a:ext>
             </a:extLst>
           </p:cNvPr>
@@ -14210,7 +14212,7 @@
           <p:cNvPr id="4" name="CuadroTexto 3">
             <a:extLst>
               <a:ext uri="{FF2B5EF4-FFF2-40B4-BE49-F238E27FC236}">
-                <a16:creationId xmlns:a16="http://schemas.microsoft.com/office/drawing/2014/main" id="{077AD978-631F-4986-B928-CABD7DCA36D6}"/>
+                <a16:creationId xmlns:a16="http://schemas.microsoft.com/office/drawing/2014/main" xmlns="" id="{077AD978-631F-4986-B928-CABD7DCA36D6}"/>
               </a:ext>
             </a:extLst>
           </p:cNvPr>
@@ -14369,7 +14371,7 @@
           <p:cNvPr id="5" name="Imagen 4">
             <a:extLst>
               <a:ext uri="{FF2B5EF4-FFF2-40B4-BE49-F238E27FC236}">
-                <a16:creationId xmlns:a16="http://schemas.microsoft.com/office/drawing/2014/main" id="{1E023EBF-D877-415B-8954-0B4E697AD581}"/>
+                <a16:creationId xmlns:a16="http://schemas.microsoft.com/office/drawing/2014/main" xmlns="" id="{1E023EBF-D877-415B-8954-0B4E697AD581}"/>
               </a:ext>
             </a:extLst>
           </p:cNvPr>
@@ -14382,7 +14384,7 @@
           <a:blip r:embed="rId2" cstate="print">
             <a:extLst>
               <a:ext uri="{28A0092B-C50C-407E-A947-70E740481C1C}">
-                <a14:useLocalDpi xmlns:a14="http://schemas.microsoft.com/office/drawing/2010/main" val="0"/>
+                <a14:useLocalDpi xmlns:a14="http://schemas.microsoft.com/office/drawing/2010/main" xmlns="" val="0"/>
               </a:ext>
             </a:extLst>
           </a:blip>
@@ -14405,7 +14407,7 @@
           <p:cNvPr id="10" name="Imagen 9">
             <a:extLst>
               <a:ext uri="{FF2B5EF4-FFF2-40B4-BE49-F238E27FC236}">
-                <a16:creationId xmlns:a16="http://schemas.microsoft.com/office/drawing/2014/main" id="{326EF8D7-F39B-4A9A-AE50-012A992DE84B}"/>
+                <a16:creationId xmlns:a16="http://schemas.microsoft.com/office/drawing/2014/main" xmlns="" id="{326EF8D7-F39B-4A9A-AE50-012A992DE84B}"/>
               </a:ext>
             </a:extLst>
           </p:cNvPr>
@@ -14449,7 +14451,7 @@
           <p:cNvPr id="6" name="Imagen 5">
             <a:extLst>
               <a:ext uri="{FF2B5EF4-FFF2-40B4-BE49-F238E27FC236}">
-                <a16:creationId xmlns:a16="http://schemas.microsoft.com/office/drawing/2014/main" id="{DF82BA4F-2D73-4C09-9504-536217F5A924}"/>
+                <a16:creationId xmlns:a16="http://schemas.microsoft.com/office/drawing/2014/main" xmlns="" id="{DF82BA4F-2D73-4C09-9504-536217F5A924}"/>
               </a:ext>
             </a:extLst>
           </p:cNvPr>
@@ -14493,7 +14495,7 @@
           <p:cNvPr id="11" name="Imagen 10">
             <a:extLst>
               <a:ext uri="{FF2B5EF4-FFF2-40B4-BE49-F238E27FC236}">
-                <a16:creationId xmlns:a16="http://schemas.microsoft.com/office/drawing/2014/main" id="{F882AEBF-FBBF-44B6-AE98-0132DEAB3BBB}"/>
+                <a16:creationId xmlns:a16="http://schemas.microsoft.com/office/drawing/2014/main" xmlns="" id="{F882AEBF-FBBF-44B6-AE98-0132DEAB3BBB}"/>
               </a:ext>
             </a:extLst>
           </p:cNvPr>
@@ -14534,7 +14536,7 @@
     </p:spTree>
     <p:extLst>
       <p:ext uri="{BB962C8B-B14F-4D97-AF65-F5344CB8AC3E}">
-        <p14:creationId xmlns:p14="http://schemas.microsoft.com/office/powerpoint/2010/main" val="3388820873"/>
+        <p14:creationId xmlns:p14="http://schemas.microsoft.com/office/powerpoint/2010/main" xmlns="" val="3388820873"/>
       </p:ext>
     </p:extLst>
   </p:cSld>
@@ -14566,7 +14568,7 @@
           <p:cNvPr id="4" name="Título 3">
             <a:extLst>
               <a:ext uri="{FF2B5EF4-FFF2-40B4-BE49-F238E27FC236}">
-                <a16:creationId xmlns:a16="http://schemas.microsoft.com/office/drawing/2014/main" id="{FA4EADB5-92CE-4B25-BE21-7FC484AE680E}"/>
+                <a16:creationId xmlns:a16="http://schemas.microsoft.com/office/drawing/2014/main" xmlns="" id="{FA4EADB5-92CE-4B25-BE21-7FC484AE680E}"/>
               </a:ext>
             </a:extLst>
           </p:cNvPr>
@@ -14603,7 +14605,7 @@
           <p:cNvPr id="5" name="Subtítulo 4">
             <a:extLst>
               <a:ext uri="{FF2B5EF4-FFF2-40B4-BE49-F238E27FC236}">
-                <a16:creationId xmlns:a16="http://schemas.microsoft.com/office/drawing/2014/main" id="{7035CB29-6D24-4E02-AC9F-07DC0DE9312C}"/>
+                <a16:creationId xmlns:a16="http://schemas.microsoft.com/office/drawing/2014/main" xmlns="" id="{7035CB29-6D24-4E02-AC9F-07DC0DE9312C}"/>
               </a:ext>
             </a:extLst>
           </p:cNvPr>
@@ -14715,7 +14717,7 @@
     </p:spTree>
     <p:extLst>
       <p:ext uri="{BB962C8B-B14F-4D97-AF65-F5344CB8AC3E}">
-        <p14:creationId xmlns:p14="http://schemas.microsoft.com/office/powerpoint/2010/main" val="2893191071"/>
+        <p14:creationId xmlns:p14="http://schemas.microsoft.com/office/powerpoint/2010/main" xmlns="" val="2893191071"/>
       </p:ext>
     </p:extLst>
   </p:cSld>
@@ -14747,7 +14749,7 @@
           <p:cNvPr id="2" name="Título 1">
             <a:extLst>
               <a:ext uri="{FF2B5EF4-FFF2-40B4-BE49-F238E27FC236}">
-                <a16:creationId xmlns:a16="http://schemas.microsoft.com/office/drawing/2014/main" id="{0ED6D180-92C1-4333-BA91-2BBA4DD94A3B}"/>
+                <a16:creationId xmlns:a16="http://schemas.microsoft.com/office/drawing/2014/main" xmlns="" id="{0ED6D180-92C1-4333-BA91-2BBA4DD94A3B}"/>
               </a:ext>
             </a:extLst>
           </p:cNvPr>
@@ -14784,7 +14786,7 @@
           <p:cNvPr id="4" name="CuadroTexto 3">
             <a:extLst>
               <a:ext uri="{FF2B5EF4-FFF2-40B4-BE49-F238E27FC236}">
-                <a16:creationId xmlns:a16="http://schemas.microsoft.com/office/drawing/2014/main" id="{077AD978-631F-4986-B928-CABD7DCA36D6}"/>
+                <a16:creationId xmlns:a16="http://schemas.microsoft.com/office/drawing/2014/main" xmlns="" id="{077AD978-631F-4986-B928-CABD7DCA36D6}"/>
               </a:ext>
             </a:extLst>
           </p:cNvPr>
@@ -14884,7 +14886,7 @@
           <p:cNvPr id="8" name="Imagen 7">
             <a:extLst>
               <a:ext uri="{FF2B5EF4-FFF2-40B4-BE49-F238E27FC236}">
-                <a16:creationId xmlns:a16="http://schemas.microsoft.com/office/drawing/2014/main" id="{B81F7B9F-2566-4432-A702-9A2E09780895}"/>
+                <a16:creationId xmlns:a16="http://schemas.microsoft.com/office/drawing/2014/main" xmlns="" id="{B81F7B9F-2566-4432-A702-9A2E09780895}"/>
               </a:ext>
             </a:extLst>
           </p:cNvPr>
@@ -14932,7 +14934,7 @@
           <p:cNvPr id="1030" name="Picture 6">
             <a:extLst>
               <a:ext uri="{FF2B5EF4-FFF2-40B4-BE49-F238E27FC236}">
-                <a16:creationId xmlns:a16="http://schemas.microsoft.com/office/drawing/2014/main" id="{CF4EDECE-D36E-41AF-B661-BA6A0825A01E}"/>
+                <a16:creationId xmlns:a16="http://schemas.microsoft.com/office/drawing/2014/main" xmlns="" id="{CF4EDECE-D36E-41AF-B661-BA6A0825A01E}"/>
               </a:ext>
             </a:extLst>
           </p:cNvPr>
@@ -14945,7 +14947,7 @@
           <a:blip r:embed="rId3" cstate="print">
             <a:extLst>
               <a:ext uri="{28A0092B-C50C-407E-A947-70E740481C1C}">
-                <a14:useLocalDpi xmlns:a14="http://schemas.microsoft.com/office/drawing/2010/main" val="0"/>
+                <a14:useLocalDpi xmlns:a14="http://schemas.microsoft.com/office/drawing/2010/main" xmlns="" val="0"/>
               </a:ext>
             </a:extLst>
           </a:blip>
@@ -14978,7 +14980,7 @@
           </a:effectLst>
           <a:extLst>
             <a:ext uri="{909E8E84-426E-40DD-AFC4-6F175D3DCCD1}">
-              <a14:hiddenFill xmlns:a14="http://schemas.microsoft.com/office/drawing/2010/main">
+              <a14:hiddenFill xmlns:a14="http://schemas.microsoft.com/office/drawing/2010/main" xmlns="">
                 <a:solidFill>
                   <a:srgbClr val="FFFFFF"/>
                 </a:solidFill>
@@ -14990,7 +14992,7 @@
     </p:spTree>
     <p:extLst>
       <p:ext uri="{BB962C8B-B14F-4D97-AF65-F5344CB8AC3E}">
-        <p14:creationId xmlns:p14="http://schemas.microsoft.com/office/powerpoint/2010/main" val="248188006"/>
+        <p14:creationId xmlns:p14="http://schemas.microsoft.com/office/powerpoint/2010/main" xmlns="" val="248188006"/>
       </p:ext>
     </p:extLst>
   </p:cSld>
@@ -15022,7 +15024,7 @@
           <p:cNvPr id="4" name="Rectángulo 3">
             <a:extLst>
               <a:ext uri="{FF2B5EF4-FFF2-40B4-BE49-F238E27FC236}">
-                <a16:creationId xmlns:a16="http://schemas.microsoft.com/office/drawing/2014/main" id="{B0F1B4F4-0C7A-4C0E-8584-95718BC545EC}"/>
+                <a16:creationId xmlns:a16="http://schemas.microsoft.com/office/drawing/2014/main" xmlns="" id="{B0F1B4F4-0C7A-4C0E-8584-95718BC545EC}"/>
               </a:ext>
             </a:extLst>
           </p:cNvPr>
@@ -15068,7 +15070,7 @@
     </p:spTree>
     <p:extLst>
       <p:ext uri="{BB962C8B-B14F-4D97-AF65-F5344CB8AC3E}">
-        <p14:creationId xmlns:p14="http://schemas.microsoft.com/office/powerpoint/2010/main" val="115837642"/>
+        <p14:creationId xmlns:p14="http://schemas.microsoft.com/office/powerpoint/2010/main" xmlns="" val="115837642"/>
       </p:ext>
     </p:extLst>
   </p:cSld>
@@ -15107,7 +15109,7 @@
         </p:nvSpPr>
         <p:spPr>
           <a:xfrm>
-            <a:off x="1127145" y="2907369"/>
+            <a:off x="1127145" y="3287197"/>
             <a:ext cx="4014273" cy="956609"/>
           </a:xfrm>
         </p:spPr>
@@ -15131,7 +15133,7 @@
           <p:cNvPr id="6" name="1 Título">
             <a:extLst>
               <a:ext uri="{FF2B5EF4-FFF2-40B4-BE49-F238E27FC236}">
-                <a16:creationId xmlns:a16="http://schemas.microsoft.com/office/drawing/2014/main" id="{F186F2D6-48EB-4235-B54E-B7DB7712C32E}"/>
+                <a16:creationId xmlns:a16="http://schemas.microsoft.com/office/drawing/2014/main" xmlns="" id="{F186F2D6-48EB-4235-B54E-B7DB7712C32E}"/>
               </a:ext>
             </a:extLst>
           </p:cNvPr>
@@ -15240,68 +15242,1015 @@
           </a:p>
         </p:txBody>
       </p:sp>
-      <p:pic>
-        <p:nvPicPr>
-          <p:cNvPr id="1026" name="Picture 2" descr="C:\Users\Usuario\Desktop\PRESENTACION FINAL - LDS\Flujo Videos - 1.png"/>
-          <p:cNvPicPr>
-            <a:picLocks noChangeAspect="1" noChangeArrowheads="1"/>
-          </p:cNvPicPr>
+      <p:sp>
+        <p:nvSpPr>
+          <p:cNvPr id="7" name="6 Rectángulo redondeado"/>
+          <p:cNvSpPr/>
           <p:nvPr/>
-        </p:nvPicPr>
-        <p:blipFill>
-          <a:blip r:embed="rId2" cstate="print"/>
-          <a:srcRect/>
-          <a:stretch>
-            <a:fillRect/>
-          </a:stretch>
-        </p:blipFill>
-        <p:spPr bwMode="auto">
+        </p:nvSpPr>
+        <p:spPr>
           <a:xfrm>
-            <a:off x="1478718" y="1359876"/>
-            <a:ext cx="8242057" cy="890955"/>
+            <a:off x="1533379" y="1533379"/>
+            <a:ext cx="1195753" cy="520505"/>
           </a:xfrm>
-          <a:prstGeom prst="rect">
+          <a:prstGeom prst="roundRect">
             <a:avLst/>
           </a:prstGeom>
-          <a:noFill/>
         </p:spPr>
-      </p:pic>
-      <p:pic>
-        <p:nvPicPr>
-          <p:cNvPr id="1027" name="Picture 3" descr="C:\Users\Usuario\Desktop\PRESENTACION FINAL - LDS\Flujo Videos - 2.png"/>
-          <p:cNvPicPr>
-            <a:picLocks noChangeAspect="1" noChangeArrowheads="1"/>
-          </p:cNvPicPr>
+        <p:style>
+          <a:lnRef idx="0">
+            <a:schemeClr val="accent3"/>
+          </a:lnRef>
+          <a:fillRef idx="3">
+            <a:schemeClr val="accent3"/>
+          </a:fillRef>
+          <a:effectRef idx="3">
+            <a:schemeClr val="accent3"/>
+          </a:effectRef>
+          <a:fontRef idx="minor">
+            <a:schemeClr val="lt1"/>
+          </a:fontRef>
+        </p:style>
+        <p:txBody>
+          <a:bodyPr rtlCol="0" anchor="ctr"/>
+          <a:lstStyle/>
+          <a:p>
+            <a:pPr algn="ctr"/>
+            <a:r>
+              <a:rPr lang="es-AR" sz="1400" dirty="0" smtClean="0"/>
+              <a:t>Inicio de Sesión</a:t>
+            </a:r>
+            <a:endParaRPr lang="es-AR" sz="1400" dirty="0"/>
+          </a:p>
+        </p:txBody>
+      </p:sp>
+      <p:sp>
+        <p:nvSpPr>
+          <p:cNvPr id="8" name="7 Rectángulo redondeado"/>
+          <p:cNvSpPr/>
           <p:nvPr/>
-        </p:nvPicPr>
-        <p:blipFill>
-          <a:blip r:embed="rId3" cstate="print"/>
-          <a:srcRect/>
-          <a:stretch>
-            <a:fillRect/>
-          </a:stretch>
-        </p:blipFill>
-        <p:spPr bwMode="auto">
+        </p:nvSpPr>
+        <p:spPr>
           <a:xfrm>
-            <a:off x="1374384" y="3888690"/>
-            <a:ext cx="10648803" cy="1879063"/>
+            <a:off x="3387969" y="1516965"/>
+            <a:ext cx="1195753" cy="520505"/>
           </a:xfrm>
-          <a:prstGeom prst="rect">
+          <a:prstGeom prst="roundRect">
             <a:avLst/>
           </a:prstGeom>
-          <a:noFill/>
         </p:spPr>
-      </p:pic>
+        <p:style>
+          <a:lnRef idx="0">
+            <a:schemeClr val="accent1"/>
+          </a:lnRef>
+          <a:fillRef idx="3">
+            <a:schemeClr val="accent1"/>
+          </a:fillRef>
+          <a:effectRef idx="3">
+            <a:schemeClr val="accent1"/>
+          </a:effectRef>
+          <a:fontRef idx="minor">
+            <a:schemeClr val="lt1"/>
+          </a:fontRef>
+        </p:style>
+        <p:txBody>
+          <a:bodyPr rtlCol="0" anchor="ctr"/>
+          <a:lstStyle/>
+          <a:p>
+            <a:pPr algn="ctr"/>
+            <a:r>
+              <a:rPr lang="es-AR" sz="1400" dirty="0" smtClean="0"/>
+              <a:t>Creación de Asignatura</a:t>
+            </a:r>
+            <a:endParaRPr lang="es-AR" sz="1400" dirty="0"/>
+          </a:p>
+        </p:txBody>
+      </p:sp>
+      <p:sp>
+        <p:nvSpPr>
+          <p:cNvPr id="9" name="8 Rectángulo redondeado"/>
+          <p:cNvSpPr/>
+          <p:nvPr/>
+        </p:nvSpPr>
+        <p:spPr>
+          <a:xfrm>
+            <a:off x="5256628" y="1514622"/>
+            <a:ext cx="1195753" cy="520505"/>
+          </a:xfrm>
+          <a:prstGeom prst="roundRect">
+            <a:avLst/>
+          </a:prstGeom>
+        </p:spPr>
+        <p:style>
+          <a:lnRef idx="0">
+            <a:schemeClr val="accent3"/>
+          </a:lnRef>
+          <a:fillRef idx="3">
+            <a:schemeClr val="accent3"/>
+          </a:fillRef>
+          <a:effectRef idx="3">
+            <a:schemeClr val="accent3"/>
+          </a:effectRef>
+          <a:fontRef idx="minor">
+            <a:schemeClr val="lt1"/>
+          </a:fontRef>
+        </p:style>
+        <p:txBody>
+          <a:bodyPr rtlCol="0" anchor="ctr"/>
+          <a:lstStyle/>
+          <a:p>
+            <a:pPr algn="ctr"/>
+            <a:r>
+              <a:rPr lang="es-AR" sz="1200" dirty="0" smtClean="0"/>
+              <a:t>Asociación Equipo de Cátedra</a:t>
+            </a:r>
+            <a:endParaRPr lang="es-AR" sz="1200" dirty="0"/>
+          </a:p>
+        </p:txBody>
+      </p:sp>
+      <p:sp>
+        <p:nvSpPr>
+          <p:cNvPr id="10" name="9 Rectángulo redondeado"/>
+          <p:cNvSpPr/>
+          <p:nvPr/>
+        </p:nvSpPr>
+        <p:spPr>
+          <a:xfrm>
+            <a:off x="7069015" y="1512277"/>
+            <a:ext cx="1195753" cy="520505"/>
+          </a:xfrm>
+          <a:prstGeom prst="roundRect">
+            <a:avLst/>
+          </a:prstGeom>
+        </p:spPr>
+        <p:style>
+          <a:lnRef idx="0">
+            <a:schemeClr val="accent1"/>
+          </a:lnRef>
+          <a:fillRef idx="3">
+            <a:schemeClr val="accent1"/>
+          </a:fillRef>
+          <a:effectRef idx="3">
+            <a:schemeClr val="accent1"/>
+          </a:effectRef>
+          <a:fontRef idx="minor">
+            <a:schemeClr val="lt1"/>
+          </a:fontRef>
+        </p:style>
+        <p:txBody>
+          <a:bodyPr rtlCol="0" anchor="ctr"/>
+          <a:lstStyle/>
+          <a:p>
+            <a:pPr algn="ctr"/>
+            <a:r>
+              <a:rPr lang="es-AR" sz="1200" dirty="0" smtClean="0"/>
+              <a:t>Creación Revisión de Plan</a:t>
+            </a:r>
+            <a:endParaRPr lang="es-AR" sz="1200" dirty="0"/>
+          </a:p>
+        </p:txBody>
+      </p:sp>
+      <p:sp>
+        <p:nvSpPr>
+          <p:cNvPr id="11" name="10 Rectángulo redondeado"/>
+          <p:cNvSpPr/>
+          <p:nvPr/>
+        </p:nvSpPr>
+        <p:spPr>
+          <a:xfrm>
+            <a:off x="8881402" y="1538067"/>
+            <a:ext cx="1195753" cy="520505"/>
+          </a:xfrm>
+          <a:prstGeom prst="roundRect">
+            <a:avLst/>
+          </a:prstGeom>
+        </p:spPr>
+        <p:style>
+          <a:lnRef idx="0">
+            <a:schemeClr val="accent3"/>
+          </a:lnRef>
+          <a:fillRef idx="3">
+            <a:schemeClr val="accent3"/>
+          </a:fillRef>
+          <a:effectRef idx="3">
+            <a:schemeClr val="accent3"/>
+          </a:effectRef>
+          <a:fontRef idx="minor">
+            <a:schemeClr val="lt1"/>
+          </a:fontRef>
+        </p:style>
+        <p:txBody>
+          <a:bodyPr rtlCol="0" anchor="ctr"/>
+          <a:lstStyle/>
+          <a:p>
+            <a:pPr algn="ctr"/>
+            <a:r>
+              <a:rPr lang="es-AR" sz="1200" dirty="0" smtClean="0"/>
+              <a:t>Vinculación de Asignatura</a:t>
+            </a:r>
+            <a:endParaRPr lang="es-AR" sz="1200" dirty="0"/>
+          </a:p>
+        </p:txBody>
+      </p:sp>
+      <p:cxnSp>
+        <p:nvCxnSpPr>
+          <p:cNvPr id="21" name="20 Conector recto de flecha"/>
+          <p:cNvCxnSpPr/>
+          <p:nvPr/>
+        </p:nvCxnSpPr>
+        <p:spPr>
+          <a:xfrm>
+            <a:off x="2757267" y="1800665"/>
+            <a:ext cx="618979" cy="0"/>
+          </a:xfrm>
+          <a:prstGeom prst="straightConnector1">
+            <a:avLst/>
+          </a:prstGeom>
+          <a:ln>
+            <a:tailEnd type="arrow"/>
+          </a:ln>
+        </p:spPr>
+        <p:style>
+          <a:lnRef idx="3">
+            <a:schemeClr val="dk1"/>
+          </a:lnRef>
+          <a:fillRef idx="0">
+            <a:schemeClr val="dk1"/>
+          </a:fillRef>
+          <a:effectRef idx="2">
+            <a:schemeClr val="dk1"/>
+          </a:effectRef>
+          <a:fontRef idx="minor">
+            <a:schemeClr val="tx1"/>
+          </a:fontRef>
+        </p:style>
+      </p:cxnSp>
+      <p:cxnSp>
+        <p:nvCxnSpPr>
+          <p:cNvPr id="22" name="21 Conector recto de flecha"/>
+          <p:cNvCxnSpPr/>
+          <p:nvPr/>
+        </p:nvCxnSpPr>
+        <p:spPr>
+          <a:xfrm>
+            <a:off x="4611857" y="1784252"/>
+            <a:ext cx="618979" cy="0"/>
+          </a:xfrm>
+          <a:prstGeom prst="straightConnector1">
+            <a:avLst/>
+          </a:prstGeom>
+          <a:ln>
+            <a:tailEnd type="arrow"/>
+          </a:ln>
+        </p:spPr>
+        <p:style>
+          <a:lnRef idx="3">
+            <a:schemeClr val="dk1"/>
+          </a:lnRef>
+          <a:fillRef idx="0">
+            <a:schemeClr val="dk1"/>
+          </a:fillRef>
+          <a:effectRef idx="2">
+            <a:schemeClr val="dk1"/>
+          </a:effectRef>
+          <a:fontRef idx="minor">
+            <a:schemeClr val="tx1"/>
+          </a:fontRef>
+        </p:style>
+      </p:cxnSp>
+      <p:cxnSp>
+        <p:nvCxnSpPr>
+          <p:cNvPr id="23" name="22 Conector recto de flecha"/>
+          <p:cNvCxnSpPr/>
+          <p:nvPr/>
+        </p:nvCxnSpPr>
+        <p:spPr>
+          <a:xfrm>
+            <a:off x="6454727" y="1798320"/>
+            <a:ext cx="618979" cy="0"/>
+          </a:xfrm>
+          <a:prstGeom prst="straightConnector1">
+            <a:avLst/>
+          </a:prstGeom>
+          <a:ln>
+            <a:tailEnd type="arrow"/>
+          </a:ln>
+        </p:spPr>
+        <p:style>
+          <a:lnRef idx="3">
+            <a:schemeClr val="dk1"/>
+          </a:lnRef>
+          <a:fillRef idx="0">
+            <a:schemeClr val="dk1"/>
+          </a:fillRef>
+          <a:effectRef idx="2">
+            <a:schemeClr val="dk1"/>
+          </a:effectRef>
+          <a:fontRef idx="minor">
+            <a:schemeClr val="tx1"/>
+          </a:fontRef>
+        </p:style>
+      </p:cxnSp>
+      <p:cxnSp>
+        <p:nvCxnSpPr>
+          <p:cNvPr id="24" name="23 Conector recto de flecha"/>
+          <p:cNvCxnSpPr/>
+          <p:nvPr/>
+        </p:nvCxnSpPr>
+        <p:spPr>
+          <a:xfrm>
+            <a:off x="8255390" y="1798320"/>
+            <a:ext cx="618979" cy="0"/>
+          </a:xfrm>
+          <a:prstGeom prst="straightConnector1">
+            <a:avLst/>
+          </a:prstGeom>
+          <a:ln>
+            <a:tailEnd type="arrow"/>
+          </a:ln>
+        </p:spPr>
+        <p:style>
+          <a:lnRef idx="3">
+            <a:schemeClr val="dk1"/>
+          </a:lnRef>
+          <a:fillRef idx="0">
+            <a:schemeClr val="dk1"/>
+          </a:fillRef>
+          <a:effectRef idx="2">
+            <a:schemeClr val="dk1"/>
+          </a:effectRef>
+          <a:fontRef idx="minor">
+            <a:schemeClr val="tx1"/>
+          </a:fontRef>
+        </p:style>
+      </p:cxnSp>
+      <p:sp>
+        <p:nvSpPr>
+          <p:cNvPr id="25" name="24 Rectángulo redondeado"/>
+          <p:cNvSpPr/>
+          <p:nvPr/>
+        </p:nvSpPr>
+        <p:spPr>
+          <a:xfrm>
+            <a:off x="1474763" y="4625926"/>
+            <a:ext cx="1195753" cy="520505"/>
+          </a:xfrm>
+          <a:prstGeom prst="roundRect">
+            <a:avLst/>
+          </a:prstGeom>
+        </p:spPr>
+        <p:style>
+          <a:lnRef idx="0">
+            <a:schemeClr val="accent3"/>
+          </a:lnRef>
+          <a:fillRef idx="3">
+            <a:schemeClr val="accent3"/>
+          </a:fillRef>
+          <a:effectRef idx="3">
+            <a:schemeClr val="accent3"/>
+          </a:effectRef>
+          <a:fontRef idx="minor">
+            <a:schemeClr val="lt1"/>
+          </a:fontRef>
+        </p:style>
+        <p:txBody>
+          <a:bodyPr rtlCol="0" anchor="ctr"/>
+          <a:lstStyle/>
+          <a:p>
+            <a:pPr algn="ctr"/>
+            <a:r>
+              <a:rPr lang="es-AR" sz="1200" dirty="0" smtClean="0"/>
+              <a:t>Búsqueda de Programa (No cargado)</a:t>
+            </a:r>
+            <a:endParaRPr lang="es-AR" sz="1200" dirty="0"/>
+          </a:p>
+        </p:txBody>
+      </p:sp>
+      <p:sp>
+        <p:nvSpPr>
+          <p:cNvPr id="26" name="25 Rectángulo redondeado"/>
+          <p:cNvSpPr/>
+          <p:nvPr/>
+        </p:nvSpPr>
+        <p:spPr>
+          <a:xfrm>
+            <a:off x="2949527" y="4609514"/>
+            <a:ext cx="1195753" cy="520505"/>
+          </a:xfrm>
+          <a:prstGeom prst="roundRect">
+            <a:avLst/>
+          </a:prstGeom>
+        </p:spPr>
+        <p:style>
+          <a:lnRef idx="0">
+            <a:schemeClr val="accent1"/>
+          </a:lnRef>
+          <a:fillRef idx="3">
+            <a:schemeClr val="accent1"/>
+          </a:fillRef>
+          <a:effectRef idx="3">
+            <a:schemeClr val="accent1"/>
+          </a:effectRef>
+          <a:fontRef idx="minor">
+            <a:schemeClr val="lt1"/>
+          </a:fontRef>
+        </p:style>
+        <p:txBody>
+          <a:bodyPr rtlCol="0" anchor="ctr"/>
+          <a:lstStyle/>
+          <a:p>
+            <a:pPr algn="ctr"/>
+            <a:r>
+              <a:rPr lang="es-AR" sz="1400" dirty="0" smtClean="0"/>
+              <a:t>Inicio de Sesión</a:t>
+            </a:r>
+            <a:endParaRPr lang="es-AR" sz="1400" dirty="0"/>
+          </a:p>
+        </p:txBody>
+      </p:sp>
+      <p:sp>
+        <p:nvSpPr>
+          <p:cNvPr id="27" name="26 Rectángulo redondeado"/>
+          <p:cNvSpPr/>
+          <p:nvPr/>
+        </p:nvSpPr>
+        <p:spPr>
+          <a:xfrm>
+            <a:off x="4438357" y="4607170"/>
+            <a:ext cx="1195753" cy="520505"/>
+          </a:xfrm>
+          <a:prstGeom prst="roundRect">
+            <a:avLst/>
+          </a:prstGeom>
+        </p:spPr>
+        <p:style>
+          <a:lnRef idx="0">
+            <a:schemeClr val="accent3"/>
+          </a:lnRef>
+          <a:fillRef idx="3">
+            <a:schemeClr val="accent3"/>
+          </a:fillRef>
+          <a:effectRef idx="3">
+            <a:schemeClr val="accent3"/>
+          </a:effectRef>
+          <a:fontRef idx="minor">
+            <a:schemeClr val="lt1"/>
+          </a:fontRef>
+        </p:style>
+        <p:txBody>
+          <a:bodyPr rtlCol="0" anchor="ctr"/>
+          <a:lstStyle/>
+          <a:p>
+            <a:pPr algn="ctr"/>
+            <a:r>
+              <a:rPr lang="es-AR" sz="1400" dirty="0" smtClean="0"/>
+              <a:t>Solicitud de Programa</a:t>
+            </a:r>
+            <a:endParaRPr lang="es-AR" sz="1400" dirty="0"/>
+          </a:p>
+        </p:txBody>
+      </p:sp>
+      <p:sp>
+        <p:nvSpPr>
+          <p:cNvPr id="28" name="27 Rectángulo redondeado"/>
+          <p:cNvSpPr/>
+          <p:nvPr/>
+        </p:nvSpPr>
+        <p:spPr>
+          <a:xfrm>
+            <a:off x="5955323" y="4590759"/>
+            <a:ext cx="1195753" cy="520505"/>
+          </a:xfrm>
+          <a:prstGeom prst="roundRect">
+            <a:avLst/>
+          </a:prstGeom>
+        </p:spPr>
+        <p:style>
+          <a:lnRef idx="0">
+            <a:schemeClr val="accent1"/>
+          </a:lnRef>
+          <a:fillRef idx="3">
+            <a:schemeClr val="accent1"/>
+          </a:fillRef>
+          <a:effectRef idx="3">
+            <a:schemeClr val="accent1"/>
+          </a:effectRef>
+          <a:fontRef idx="minor">
+            <a:schemeClr val="lt1"/>
+          </a:fontRef>
+        </p:style>
+        <p:txBody>
+          <a:bodyPr rtlCol="0" anchor="ctr"/>
+          <a:lstStyle/>
+          <a:p>
+            <a:pPr algn="ctr"/>
+            <a:r>
+              <a:rPr lang="es-AR" sz="1400" dirty="0" smtClean="0"/>
+              <a:t>Carga de Programa</a:t>
+            </a:r>
+            <a:endParaRPr lang="es-AR" sz="1400" dirty="0"/>
+          </a:p>
+        </p:txBody>
+      </p:sp>
+      <p:sp>
+        <p:nvSpPr>
+          <p:cNvPr id="29" name="28 Rectángulo redondeado"/>
+          <p:cNvSpPr/>
+          <p:nvPr/>
+        </p:nvSpPr>
+        <p:spPr>
+          <a:xfrm>
+            <a:off x="7458221" y="4560277"/>
+            <a:ext cx="1195753" cy="520505"/>
+          </a:xfrm>
+          <a:prstGeom prst="roundRect">
+            <a:avLst/>
+          </a:prstGeom>
+        </p:spPr>
+        <p:style>
+          <a:lnRef idx="0">
+            <a:schemeClr val="accent3"/>
+          </a:lnRef>
+          <a:fillRef idx="3">
+            <a:schemeClr val="accent3"/>
+          </a:fillRef>
+          <a:effectRef idx="3">
+            <a:schemeClr val="accent3"/>
+          </a:effectRef>
+          <a:fontRef idx="minor">
+            <a:schemeClr val="lt1"/>
+          </a:fontRef>
+        </p:style>
+        <p:txBody>
+          <a:bodyPr rtlCol="0" anchor="ctr"/>
+          <a:lstStyle/>
+          <a:p>
+            <a:pPr algn="ctr"/>
+            <a:r>
+              <a:rPr lang="es-AR" sz="1400" dirty="0" smtClean="0"/>
+              <a:t>Revisión de Programa</a:t>
+            </a:r>
+            <a:endParaRPr lang="es-AR" sz="1400" dirty="0"/>
+          </a:p>
+        </p:txBody>
+      </p:sp>
+      <p:sp>
+        <p:nvSpPr>
+          <p:cNvPr id="30" name="29 Rectángulo redondeado"/>
+          <p:cNvSpPr/>
+          <p:nvPr/>
+        </p:nvSpPr>
+        <p:spPr>
+          <a:xfrm>
+            <a:off x="8961120" y="4557933"/>
+            <a:ext cx="1195753" cy="520505"/>
+          </a:xfrm>
+          <a:prstGeom prst="roundRect">
+            <a:avLst/>
+          </a:prstGeom>
+        </p:spPr>
+        <p:style>
+          <a:lnRef idx="0">
+            <a:schemeClr val="accent1"/>
+          </a:lnRef>
+          <a:fillRef idx="3">
+            <a:schemeClr val="accent1"/>
+          </a:fillRef>
+          <a:effectRef idx="3">
+            <a:schemeClr val="accent1"/>
+          </a:effectRef>
+          <a:fontRef idx="minor">
+            <a:schemeClr val="lt1"/>
+          </a:fontRef>
+        </p:style>
+        <p:txBody>
+          <a:bodyPr rtlCol="0" anchor="ctr"/>
+          <a:lstStyle/>
+          <a:p>
+            <a:pPr algn="ctr"/>
+            <a:r>
+              <a:rPr lang="es-AR" sz="1400" dirty="0" smtClean="0"/>
+              <a:t>Subir Programa</a:t>
+            </a:r>
+            <a:endParaRPr lang="es-AR" sz="1400" dirty="0"/>
+          </a:p>
+        </p:txBody>
+      </p:sp>
+      <p:sp>
+        <p:nvSpPr>
+          <p:cNvPr id="31" name="30 Rectángulo redondeado"/>
+          <p:cNvSpPr/>
+          <p:nvPr/>
+        </p:nvSpPr>
+        <p:spPr>
+          <a:xfrm>
+            <a:off x="8972842" y="5582528"/>
+            <a:ext cx="1195753" cy="520505"/>
+          </a:xfrm>
+          <a:prstGeom prst="roundRect">
+            <a:avLst/>
+          </a:prstGeom>
+        </p:spPr>
+        <p:style>
+          <a:lnRef idx="0">
+            <a:schemeClr val="accent3"/>
+          </a:lnRef>
+          <a:fillRef idx="3">
+            <a:schemeClr val="accent3"/>
+          </a:fillRef>
+          <a:effectRef idx="3">
+            <a:schemeClr val="accent3"/>
+          </a:effectRef>
+          <a:fontRef idx="minor">
+            <a:schemeClr val="lt1"/>
+          </a:fontRef>
+        </p:style>
+        <p:txBody>
+          <a:bodyPr rtlCol="0" anchor="ctr"/>
+          <a:lstStyle/>
+          <a:p>
+            <a:pPr algn="ctr"/>
+            <a:r>
+              <a:rPr lang="es-AR" sz="1400" dirty="0" smtClean="0"/>
+              <a:t>Informe Gerencial</a:t>
+            </a:r>
+            <a:endParaRPr lang="es-AR" sz="1400" dirty="0"/>
+          </a:p>
+        </p:txBody>
+      </p:sp>
+      <p:sp>
+        <p:nvSpPr>
+          <p:cNvPr id="32" name="31 Rectángulo redondeado"/>
+          <p:cNvSpPr/>
+          <p:nvPr/>
+        </p:nvSpPr>
+        <p:spPr>
+          <a:xfrm>
+            <a:off x="10771164" y="5115952"/>
+            <a:ext cx="1195753" cy="520505"/>
+          </a:xfrm>
+          <a:prstGeom prst="roundRect">
+            <a:avLst/>
+          </a:prstGeom>
+        </p:spPr>
+        <p:style>
+          <a:lnRef idx="0">
+            <a:schemeClr val="accent1"/>
+          </a:lnRef>
+          <a:fillRef idx="3">
+            <a:schemeClr val="accent1"/>
+          </a:fillRef>
+          <a:effectRef idx="3">
+            <a:schemeClr val="accent1"/>
+          </a:effectRef>
+          <a:fontRef idx="minor">
+            <a:schemeClr val="lt1"/>
+          </a:fontRef>
+        </p:style>
+        <p:txBody>
+          <a:bodyPr rtlCol="0" anchor="ctr"/>
+          <a:lstStyle/>
+          <a:p>
+            <a:pPr algn="ctr"/>
+            <a:r>
+              <a:rPr lang="es-AR" sz="1200" dirty="0" smtClean="0"/>
+              <a:t>Búsqueda de Programa </a:t>
+            </a:r>
+            <a:r>
+              <a:rPr lang="es-AR" sz="1200" dirty="0" smtClean="0"/>
+              <a:t>(Móvil)</a:t>
+            </a:r>
+            <a:endParaRPr lang="es-AR" sz="1200" dirty="0"/>
+          </a:p>
+        </p:txBody>
+      </p:sp>
+      <p:sp>
+        <p:nvSpPr>
+          <p:cNvPr id="33" name="32 Rectángulo redondeado"/>
+          <p:cNvSpPr/>
+          <p:nvPr/>
+        </p:nvSpPr>
+        <p:spPr>
+          <a:xfrm>
+            <a:off x="10768819" y="3945988"/>
+            <a:ext cx="1195753" cy="520505"/>
+          </a:xfrm>
+          <a:prstGeom prst="roundRect">
+            <a:avLst/>
+          </a:prstGeom>
+        </p:spPr>
+        <p:style>
+          <a:lnRef idx="0">
+            <a:schemeClr val="accent3"/>
+          </a:lnRef>
+          <a:fillRef idx="3">
+            <a:schemeClr val="accent3"/>
+          </a:fillRef>
+          <a:effectRef idx="3">
+            <a:schemeClr val="accent3"/>
+          </a:effectRef>
+          <a:fontRef idx="minor">
+            <a:schemeClr val="lt1"/>
+          </a:fontRef>
+        </p:style>
+        <p:txBody>
+          <a:bodyPr rtlCol="0" anchor="ctr"/>
+          <a:lstStyle/>
+          <a:p>
+            <a:pPr algn="ctr"/>
+            <a:r>
+              <a:rPr lang="es-AR" sz="1200" dirty="0" smtClean="0"/>
+              <a:t>Búsqueda de Programa (Web)</a:t>
+            </a:r>
+            <a:endParaRPr lang="es-AR" sz="1200" dirty="0"/>
+          </a:p>
+        </p:txBody>
+      </p:sp>
+      <p:cxnSp>
+        <p:nvCxnSpPr>
+          <p:cNvPr id="34" name="33 Conector recto de flecha"/>
+          <p:cNvCxnSpPr>
+            <a:endCxn id="33" idx="1"/>
+          </p:cNvCxnSpPr>
+          <p:nvPr/>
+        </p:nvCxnSpPr>
+        <p:spPr>
+          <a:xfrm flipV="1">
+            <a:off x="10138116" y="4206241"/>
+            <a:ext cx="630703" cy="501747"/>
+          </a:xfrm>
+          <a:prstGeom prst="straightConnector1">
+            <a:avLst/>
+          </a:prstGeom>
+          <a:ln>
+            <a:tailEnd type="arrow"/>
+          </a:ln>
+        </p:spPr>
+        <p:style>
+          <a:lnRef idx="3">
+            <a:schemeClr val="dk1"/>
+          </a:lnRef>
+          <a:fillRef idx="0">
+            <a:schemeClr val="dk1"/>
+          </a:fillRef>
+          <a:effectRef idx="2">
+            <a:schemeClr val="dk1"/>
+          </a:effectRef>
+          <a:fontRef idx="minor">
+            <a:schemeClr val="tx1"/>
+          </a:fontRef>
+        </p:style>
+      </p:cxnSp>
+      <p:cxnSp>
+        <p:nvCxnSpPr>
+          <p:cNvPr id="36" name="35 Conector recto de flecha"/>
+          <p:cNvCxnSpPr>
+            <a:endCxn id="32" idx="1"/>
+          </p:cNvCxnSpPr>
+          <p:nvPr/>
+        </p:nvCxnSpPr>
+        <p:spPr>
+          <a:xfrm>
+            <a:off x="10152184" y="4890867"/>
+            <a:ext cx="618980" cy="485338"/>
+          </a:xfrm>
+          <a:prstGeom prst="straightConnector1">
+            <a:avLst/>
+          </a:prstGeom>
+          <a:ln>
+            <a:tailEnd type="arrow"/>
+          </a:ln>
+        </p:spPr>
+        <p:style>
+          <a:lnRef idx="3">
+            <a:schemeClr val="dk1"/>
+          </a:lnRef>
+          <a:fillRef idx="0">
+            <a:schemeClr val="dk1"/>
+          </a:fillRef>
+          <a:effectRef idx="2">
+            <a:schemeClr val="dk1"/>
+          </a:effectRef>
+          <a:fontRef idx="minor">
+            <a:schemeClr val="tx1"/>
+          </a:fontRef>
+        </p:style>
+      </p:cxnSp>
+      <p:cxnSp>
+        <p:nvCxnSpPr>
+          <p:cNvPr id="38" name="37 Conector recto de flecha"/>
+          <p:cNvCxnSpPr/>
+          <p:nvPr/>
+        </p:nvCxnSpPr>
+        <p:spPr>
+          <a:xfrm>
+            <a:off x="9566031" y="5092505"/>
+            <a:ext cx="0" cy="506437"/>
+          </a:xfrm>
+          <a:prstGeom prst="straightConnector1">
+            <a:avLst/>
+          </a:prstGeom>
+          <a:ln>
+            <a:tailEnd type="arrow"/>
+          </a:ln>
+        </p:spPr>
+        <p:style>
+          <a:lnRef idx="3">
+            <a:schemeClr val="dk1"/>
+          </a:lnRef>
+          <a:fillRef idx="0">
+            <a:schemeClr val="dk1"/>
+          </a:fillRef>
+          <a:effectRef idx="2">
+            <a:schemeClr val="dk1"/>
+          </a:effectRef>
+          <a:fontRef idx="minor">
+            <a:schemeClr val="tx1"/>
+          </a:fontRef>
+        </p:style>
+      </p:cxnSp>
+      <p:cxnSp>
+        <p:nvCxnSpPr>
+          <p:cNvPr id="58" name="57 Conector recto de flecha"/>
+          <p:cNvCxnSpPr/>
+          <p:nvPr/>
+        </p:nvCxnSpPr>
+        <p:spPr>
+          <a:xfrm flipV="1">
+            <a:off x="8665698" y="4836942"/>
+            <a:ext cx="293077" cy="2344"/>
+          </a:xfrm>
+          <a:prstGeom prst="straightConnector1">
+            <a:avLst/>
+          </a:prstGeom>
+          <a:ln>
+            <a:tailEnd type="arrow"/>
+          </a:ln>
+        </p:spPr>
+        <p:style>
+          <a:lnRef idx="3">
+            <a:schemeClr val="dk1"/>
+          </a:lnRef>
+          <a:fillRef idx="0">
+            <a:schemeClr val="dk1"/>
+          </a:fillRef>
+          <a:effectRef idx="2">
+            <a:schemeClr val="dk1"/>
+          </a:effectRef>
+          <a:fontRef idx="minor">
+            <a:schemeClr val="tx1"/>
+          </a:fontRef>
+        </p:style>
+      </p:cxnSp>
+      <p:cxnSp>
+        <p:nvCxnSpPr>
+          <p:cNvPr id="67" name="66 Conector recto de flecha"/>
+          <p:cNvCxnSpPr/>
+          <p:nvPr/>
+        </p:nvCxnSpPr>
+        <p:spPr>
+          <a:xfrm flipV="1">
+            <a:off x="7144042" y="4848665"/>
+            <a:ext cx="293077" cy="2344"/>
+          </a:xfrm>
+          <a:prstGeom prst="straightConnector1">
+            <a:avLst/>
+          </a:prstGeom>
+          <a:ln>
+            <a:tailEnd type="arrow"/>
+          </a:ln>
+        </p:spPr>
+        <p:style>
+          <a:lnRef idx="3">
+            <a:schemeClr val="dk1"/>
+          </a:lnRef>
+          <a:fillRef idx="0">
+            <a:schemeClr val="dk1"/>
+          </a:fillRef>
+          <a:effectRef idx="2">
+            <a:schemeClr val="dk1"/>
+          </a:effectRef>
+          <a:fontRef idx="minor">
+            <a:schemeClr val="tx1"/>
+          </a:fontRef>
+        </p:style>
+      </p:cxnSp>
+      <p:cxnSp>
+        <p:nvCxnSpPr>
+          <p:cNvPr id="68" name="67 Conector recto de flecha"/>
+          <p:cNvCxnSpPr/>
+          <p:nvPr/>
+        </p:nvCxnSpPr>
+        <p:spPr>
+          <a:xfrm flipV="1">
+            <a:off x="5650522" y="4874456"/>
+            <a:ext cx="293077" cy="2344"/>
+          </a:xfrm>
+          <a:prstGeom prst="straightConnector1">
+            <a:avLst/>
+          </a:prstGeom>
+          <a:ln>
+            <a:tailEnd type="arrow"/>
+          </a:ln>
+        </p:spPr>
+        <p:style>
+          <a:lnRef idx="3">
+            <a:schemeClr val="dk1"/>
+          </a:lnRef>
+          <a:fillRef idx="0">
+            <a:schemeClr val="dk1"/>
+          </a:fillRef>
+          <a:effectRef idx="2">
+            <a:schemeClr val="dk1"/>
+          </a:effectRef>
+          <a:fontRef idx="minor">
+            <a:schemeClr val="tx1"/>
+          </a:fontRef>
+        </p:style>
+      </p:cxnSp>
+      <p:cxnSp>
+        <p:nvCxnSpPr>
+          <p:cNvPr id="69" name="68 Conector recto de flecha"/>
+          <p:cNvCxnSpPr/>
+          <p:nvPr/>
+        </p:nvCxnSpPr>
+        <p:spPr>
+          <a:xfrm flipV="1">
+            <a:off x="4145279" y="4902591"/>
+            <a:ext cx="293077" cy="2344"/>
+          </a:xfrm>
+          <a:prstGeom prst="straightConnector1">
+            <a:avLst/>
+          </a:prstGeom>
+          <a:ln>
+            <a:tailEnd type="arrow"/>
+          </a:ln>
+        </p:spPr>
+        <p:style>
+          <a:lnRef idx="3">
+            <a:schemeClr val="dk1"/>
+          </a:lnRef>
+          <a:fillRef idx="0">
+            <a:schemeClr val="dk1"/>
+          </a:fillRef>
+          <a:effectRef idx="2">
+            <a:schemeClr val="dk1"/>
+          </a:effectRef>
+          <a:fontRef idx="minor">
+            <a:schemeClr val="tx1"/>
+          </a:fontRef>
+        </p:style>
+      </p:cxnSp>
+      <p:cxnSp>
+        <p:nvCxnSpPr>
+          <p:cNvPr id="70" name="69 Conector recto de flecha"/>
+          <p:cNvCxnSpPr/>
+          <p:nvPr/>
+        </p:nvCxnSpPr>
+        <p:spPr>
+          <a:xfrm flipV="1">
+            <a:off x="2668171" y="4916659"/>
+            <a:ext cx="293077" cy="2344"/>
+          </a:xfrm>
+          <a:prstGeom prst="straightConnector1">
+            <a:avLst/>
+          </a:prstGeom>
+          <a:ln>
+            <a:tailEnd type="arrow"/>
+          </a:ln>
+        </p:spPr>
+        <p:style>
+          <a:lnRef idx="3">
+            <a:schemeClr val="dk1"/>
+          </a:lnRef>
+          <a:fillRef idx="0">
+            <a:schemeClr val="dk1"/>
+          </a:fillRef>
+          <a:effectRef idx="2">
+            <a:schemeClr val="dk1"/>
+          </a:effectRef>
+          <a:fontRef idx="minor">
+            <a:schemeClr val="tx1"/>
+          </a:fontRef>
+        </p:style>
+      </p:cxnSp>
     </p:spTree>
     <p:extLst>
       <p:ext uri="{BB962C8B-B14F-4D97-AF65-F5344CB8AC3E}">
-        <p14:creationId xmlns:p14="http://schemas.microsoft.com/office/powerpoint/2010/main" val="3792767168"/>
+        <p14:creationId xmlns:p14="http://schemas.microsoft.com/office/powerpoint/2010/main" xmlns="" val="3792767168"/>
       </p:ext>
     </p:extLst>
   </p:cSld>
   <p:clrMapOvr>
     <a:masterClrMapping/>
   </p:clrMapOvr>
+  <p:timing>
+    <p:tnLst>
+      <p:par>
+        <p:cTn id="1" dur="indefinite" restart="never" nodeType="tmRoot"/>
+      </p:par>
+    </p:tnLst>
+  </p:timing>
 </p:sld>
 </file>
 
@@ -15327,7 +16276,7 @@
           <p:cNvPr id="4" name="Rectángulo 3">
             <a:extLst>
               <a:ext uri="{FF2B5EF4-FFF2-40B4-BE49-F238E27FC236}">
-                <a16:creationId xmlns:a16="http://schemas.microsoft.com/office/drawing/2014/main" id="{B0F1B4F4-0C7A-4C0E-8584-95718BC545EC}"/>
+                <a16:creationId xmlns:a16="http://schemas.microsoft.com/office/drawing/2014/main" xmlns="" id="{B0F1B4F4-0C7A-4C0E-8584-95718BC545EC}"/>
               </a:ext>
             </a:extLst>
           </p:cNvPr>
@@ -15386,13 +16335,20 @@
     </p:spTree>
     <p:extLst>
       <p:ext uri="{BB962C8B-B14F-4D97-AF65-F5344CB8AC3E}">
-        <p14:creationId xmlns:p14="http://schemas.microsoft.com/office/powerpoint/2010/main" val="3888593392"/>
+        <p14:creationId xmlns:p14="http://schemas.microsoft.com/office/powerpoint/2010/main" xmlns="" val="3888593392"/>
       </p:ext>
     </p:extLst>
   </p:cSld>
   <p:clrMapOvr>
     <a:masterClrMapping/>
   </p:clrMapOvr>
+  <p:timing>
+    <p:tnLst>
+      <p:par>
+        <p:cTn id="1" dur="indefinite" restart="never" nodeType="tmRoot"/>
+      </p:par>
+    </p:tnLst>
+  </p:timing>
 </p:sld>
 </file>
 
@@ -15418,7 +16374,7 @@
           <p:cNvPr id="2" name="Título 1">
             <a:extLst>
               <a:ext uri="{FF2B5EF4-FFF2-40B4-BE49-F238E27FC236}">
-                <a16:creationId xmlns:a16="http://schemas.microsoft.com/office/drawing/2014/main" id="{0ED6D180-92C1-4333-BA91-2BBA4DD94A3B}"/>
+                <a16:creationId xmlns:a16="http://schemas.microsoft.com/office/drawing/2014/main" xmlns="" id="{0ED6D180-92C1-4333-BA91-2BBA4DD94A3B}"/>
               </a:ext>
             </a:extLst>
           </p:cNvPr>
@@ -15455,7 +16411,7 @@
           <p:cNvPr id="6" name="CuadroTexto 5">
             <a:extLst>
               <a:ext uri="{FF2B5EF4-FFF2-40B4-BE49-F238E27FC236}">
-                <a16:creationId xmlns:a16="http://schemas.microsoft.com/office/drawing/2014/main" id="{BC8D092D-6667-447D-B473-A50467138064}"/>
+                <a16:creationId xmlns:a16="http://schemas.microsoft.com/office/drawing/2014/main" xmlns="" id="{BC8D092D-6667-447D-B473-A50467138064}"/>
               </a:ext>
             </a:extLst>
           </p:cNvPr>
@@ -15593,7 +16549,7 @@
     </p:spTree>
     <p:extLst>
       <p:ext uri="{BB962C8B-B14F-4D97-AF65-F5344CB8AC3E}">
-        <p14:creationId xmlns:p14="http://schemas.microsoft.com/office/powerpoint/2010/main" val="2147726924"/>
+        <p14:creationId xmlns:p14="http://schemas.microsoft.com/office/powerpoint/2010/main" xmlns="" val="2147726924"/>
       </p:ext>
     </p:extLst>
   </p:cSld>
@@ -15625,7 +16581,7 @@
           <p:cNvPr id="4" name="Rectángulo 3">
             <a:extLst>
               <a:ext uri="{FF2B5EF4-FFF2-40B4-BE49-F238E27FC236}">
-                <a16:creationId xmlns:a16="http://schemas.microsoft.com/office/drawing/2014/main" id="{B0F1B4F4-0C7A-4C0E-8584-95718BC545EC}"/>
+                <a16:creationId xmlns:a16="http://schemas.microsoft.com/office/drawing/2014/main" xmlns="" id="{B0F1B4F4-0C7A-4C0E-8584-95718BC545EC}"/>
               </a:ext>
             </a:extLst>
           </p:cNvPr>
@@ -15689,7 +16645,7 @@
           <p:cNvPr id="2" name="CuadroTexto 1">
             <a:extLst>
               <a:ext uri="{FF2B5EF4-FFF2-40B4-BE49-F238E27FC236}">
-                <a16:creationId xmlns:a16="http://schemas.microsoft.com/office/drawing/2014/main" id="{BBF285E2-50A8-4654-BD24-220C20D7C57B}"/>
+                <a16:creationId xmlns:a16="http://schemas.microsoft.com/office/drawing/2014/main" xmlns="" id="{BBF285E2-50A8-4654-BD24-220C20D7C57B}"/>
               </a:ext>
             </a:extLst>
           </p:cNvPr>
@@ -15722,7 +16678,7 @@
     </p:spTree>
     <p:extLst>
       <p:ext uri="{BB962C8B-B14F-4D97-AF65-F5344CB8AC3E}">
-        <p14:creationId xmlns:p14="http://schemas.microsoft.com/office/powerpoint/2010/main" val="3442063561"/>
+        <p14:creationId xmlns:p14="http://schemas.microsoft.com/office/powerpoint/2010/main" xmlns="" val="3442063561"/>
       </p:ext>
     </p:extLst>
   </p:cSld>
@@ -15754,7 +16710,7 @@
           <p:cNvPr id="2" name="Título 1">
             <a:extLst>
               <a:ext uri="{FF2B5EF4-FFF2-40B4-BE49-F238E27FC236}">
-                <a16:creationId xmlns:a16="http://schemas.microsoft.com/office/drawing/2014/main" id="{A08BF852-5F19-46F2-83FE-6528AEC95981}"/>
+                <a16:creationId xmlns:a16="http://schemas.microsoft.com/office/drawing/2014/main" xmlns="" id="{A08BF852-5F19-46F2-83FE-6528AEC95981}"/>
               </a:ext>
             </a:extLst>
           </p:cNvPr>
@@ -15799,7 +16755,7 @@
           <p:cNvPr id="3" name="Marcador de contenido 2">
             <a:extLst>
               <a:ext uri="{FF2B5EF4-FFF2-40B4-BE49-F238E27FC236}">
-                <a16:creationId xmlns:a16="http://schemas.microsoft.com/office/drawing/2014/main" id="{4825B7B8-2642-4E50-9E0D-E85148EB6652}"/>
+                <a16:creationId xmlns:a16="http://schemas.microsoft.com/office/drawing/2014/main" xmlns="" id="{4825B7B8-2642-4E50-9E0D-E85148EB6652}"/>
               </a:ext>
             </a:extLst>
           </p:cNvPr>
@@ -15898,7 +16854,7 @@
     </p:spTree>
     <p:extLst>
       <p:ext uri="{BB962C8B-B14F-4D97-AF65-F5344CB8AC3E}">
-        <p14:creationId xmlns:p14="http://schemas.microsoft.com/office/powerpoint/2010/main" val="493199861"/>
+        <p14:creationId xmlns:p14="http://schemas.microsoft.com/office/powerpoint/2010/main" xmlns="" val="493199861"/>
       </p:ext>
     </p:extLst>
   </p:cSld>
@@ -15981,7 +16937,7 @@
           <p:cNvPr id="9" name="Elipse 8">
             <a:extLst>
               <a:ext uri="{FF2B5EF4-FFF2-40B4-BE49-F238E27FC236}">
-                <a16:creationId xmlns:a16="http://schemas.microsoft.com/office/drawing/2014/main" id="{669363E3-65EC-4B6C-B5A2-86799758077C}"/>
+                <a16:creationId xmlns:a16="http://schemas.microsoft.com/office/drawing/2014/main" xmlns="" id="{669363E3-65EC-4B6C-B5A2-86799758077C}"/>
               </a:ext>
             </a:extLst>
           </p:cNvPr>
@@ -16030,7 +16986,7 @@
           <p:cNvPr id="11" name="Elipse 10">
             <a:extLst>
               <a:ext uri="{FF2B5EF4-FFF2-40B4-BE49-F238E27FC236}">
-                <a16:creationId xmlns:a16="http://schemas.microsoft.com/office/drawing/2014/main" id="{1B4CFB39-227C-45B0-9FFA-5482B1E7B481}"/>
+                <a16:creationId xmlns:a16="http://schemas.microsoft.com/office/drawing/2014/main" xmlns="" id="{1B4CFB39-227C-45B0-9FFA-5482B1E7B481}"/>
               </a:ext>
             </a:extLst>
           </p:cNvPr>
@@ -16079,7 +17035,7 @@
           <p:cNvPr id="2" name="Título 1">
             <a:extLst>
               <a:ext uri="{FF2B5EF4-FFF2-40B4-BE49-F238E27FC236}">
-                <a16:creationId xmlns:a16="http://schemas.microsoft.com/office/drawing/2014/main" id="{0ED6D180-92C1-4333-BA91-2BBA4DD94A3B}"/>
+                <a16:creationId xmlns:a16="http://schemas.microsoft.com/office/drawing/2014/main" xmlns="" id="{0ED6D180-92C1-4333-BA91-2BBA4DD94A3B}"/>
               </a:ext>
             </a:extLst>
           </p:cNvPr>
@@ -16116,7 +17072,7 @@
           <p:cNvPr id="15" name="CuadroTexto 14">
             <a:extLst>
               <a:ext uri="{FF2B5EF4-FFF2-40B4-BE49-F238E27FC236}">
-                <a16:creationId xmlns:a16="http://schemas.microsoft.com/office/drawing/2014/main" id="{69C0BCF2-7C39-4E40-9C2B-2198580F3E40}"/>
+                <a16:creationId xmlns:a16="http://schemas.microsoft.com/office/drawing/2014/main" xmlns="" id="{69C0BCF2-7C39-4E40-9C2B-2198580F3E40}"/>
               </a:ext>
             </a:extLst>
           </p:cNvPr>
@@ -16187,7 +17143,7 @@
           <p:cNvPr id="17" name="CuadroTexto 16">
             <a:extLst>
               <a:ext uri="{FF2B5EF4-FFF2-40B4-BE49-F238E27FC236}">
-                <a16:creationId xmlns:a16="http://schemas.microsoft.com/office/drawing/2014/main" id="{F0BB235C-3047-4EFA-8B74-0EE023A1B6DF}"/>
+                <a16:creationId xmlns:a16="http://schemas.microsoft.com/office/drawing/2014/main" xmlns="" id="{F0BB235C-3047-4EFA-8B74-0EE023A1B6DF}"/>
               </a:ext>
             </a:extLst>
           </p:cNvPr>
@@ -16228,7 +17184,7 @@
           <p:cNvPr id="12" name="Imagen 11">
             <a:extLst>
               <a:ext uri="{FF2B5EF4-FFF2-40B4-BE49-F238E27FC236}">
-                <a16:creationId xmlns:a16="http://schemas.microsoft.com/office/drawing/2014/main" id="{2A9D7A44-27F6-4502-B24D-E951B30D6332}"/>
+                <a16:creationId xmlns:a16="http://schemas.microsoft.com/office/drawing/2014/main" xmlns="" id="{2A9D7A44-27F6-4502-B24D-E951B30D6332}"/>
               </a:ext>
             </a:extLst>
           </p:cNvPr>
@@ -16241,7 +17197,7 @@
           <a:blip r:embed="rId2" cstate="print">
             <a:extLst>
               <a:ext uri="{28A0092B-C50C-407E-A947-70E740481C1C}">
-                <a14:useLocalDpi xmlns:a14="http://schemas.microsoft.com/office/drawing/2010/main" val="0"/>
+                <a14:useLocalDpi xmlns:a14="http://schemas.microsoft.com/office/drawing/2010/main" xmlns="" val="0"/>
               </a:ext>
             </a:extLst>
           </a:blip>
@@ -16264,7 +17220,7 @@
           <p:cNvPr id="19" name="Imagen 18">
             <a:extLst>
               <a:ext uri="{FF2B5EF4-FFF2-40B4-BE49-F238E27FC236}">
-                <a16:creationId xmlns:a16="http://schemas.microsoft.com/office/drawing/2014/main" id="{82895803-8F79-4265-84E7-2467F906676D}"/>
+                <a16:creationId xmlns:a16="http://schemas.microsoft.com/office/drawing/2014/main" xmlns="" id="{82895803-8F79-4265-84E7-2467F906676D}"/>
               </a:ext>
             </a:extLst>
           </p:cNvPr>
@@ -16277,7 +17233,7 @@
           <a:blip r:embed="rId3" cstate="print">
             <a:extLst>
               <a:ext uri="{28A0092B-C50C-407E-A947-70E740481C1C}">
-                <a14:useLocalDpi xmlns:a14="http://schemas.microsoft.com/office/drawing/2010/main" val="0"/>
+                <a14:useLocalDpi xmlns:a14="http://schemas.microsoft.com/office/drawing/2010/main" xmlns="" val="0"/>
               </a:ext>
             </a:extLst>
           </a:blip>
@@ -16298,7 +17254,7 @@
     </p:spTree>
     <p:extLst>
       <p:ext uri="{BB962C8B-B14F-4D97-AF65-F5344CB8AC3E}">
-        <p14:creationId xmlns:p14="http://schemas.microsoft.com/office/powerpoint/2010/main" val="779257163"/>
+        <p14:creationId xmlns:p14="http://schemas.microsoft.com/office/powerpoint/2010/main" xmlns="" val="779257163"/>
       </p:ext>
     </p:extLst>
   </p:cSld>
@@ -16330,7 +17286,7 @@
           <p:cNvPr id="4" name="Rectángulo 3">
             <a:extLst>
               <a:ext uri="{FF2B5EF4-FFF2-40B4-BE49-F238E27FC236}">
-                <a16:creationId xmlns:a16="http://schemas.microsoft.com/office/drawing/2014/main" id="{B0F1B4F4-0C7A-4C0E-8584-95718BC545EC}"/>
+                <a16:creationId xmlns:a16="http://schemas.microsoft.com/office/drawing/2014/main" xmlns="" id="{B0F1B4F4-0C7A-4C0E-8584-95718BC545EC}"/>
               </a:ext>
             </a:extLst>
           </p:cNvPr>
@@ -16389,7 +17345,7 @@
     </p:spTree>
     <p:extLst>
       <p:ext uri="{BB962C8B-B14F-4D97-AF65-F5344CB8AC3E}">
-        <p14:creationId xmlns:p14="http://schemas.microsoft.com/office/powerpoint/2010/main" val="4228125147"/>
+        <p14:creationId xmlns:p14="http://schemas.microsoft.com/office/powerpoint/2010/main" xmlns="" val="4228125147"/>
       </p:ext>
     </p:extLst>
   </p:cSld>
@@ -16421,7 +17377,7 @@
           <p:cNvPr id="2" name="Título 1">
             <a:extLst>
               <a:ext uri="{FF2B5EF4-FFF2-40B4-BE49-F238E27FC236}">
-                <a16:creationId xmlns:a16="http://schemas.microsoft.com/office/drawing/2014/main" id="{0ED6D180-92C1-4333-BA91-2BBA4DD94A3B}"/>
+                <a16:creationId xmlns:a16="http://schemas.microsoft.com/office/drawing/2014/main" xmlns="" id="{0ED6D180-92C1-4333-BA91-2BBA4DD94A3B}"/>
               </a:ext>
             </a:extLst>
           </p:cNvPr>
@@ -16458,7 +17414,7 @@
           <p:cNvPr id="4" name="CuadroTexto 3">
             <a:extLst>
               <a:ext uri="{FF2B5EF4-FFF2-40B4-BE49-F238E27FC236}">
-                <a16:creationId xmlns:a16="http://schemas.microsoft.com/office/drawing/2014/main" id="{077AD978-631F-4986-B928-CABD7DCA36D6}"/>
+                <a16:creationId xmlns:a16="http://schemas.microsoft.com/office/drawing/2014/main" xmlns="" id="{077AD978-631F-4986-B928-CABD7DCA36D6}"/>
               </a:ext>
             </a:extLst>
           </p:cNvPr>
@@ -16606,7 +17562,7 @@
     </p:spTree>
     <p:extLst>
       <p:ext uri="{BB962C8B-B14F-4D97-AF65-F5344CB8AC3E}">
-        <p14:creationId xmlns:p14="http://schemas.microsoft.com/office/powerpoint/2010/main" val="3252879309"/>
+        <p14:creationId xmlns:p14="http://schemas.microsoft.com/office/powerpoint/2010/main" xmlns="" val="3252879309"/>
       </p:ext>
     </p:extLst>
   </p:cSld>
@@ -16638,7 +17594,7 @@
           <p:cNvPr id="2" name="Título 1">
             <a:extLst>
               <a:ext uri="{FF2B5EF4-FFF2-40B4-BE49-F238E27FC236}">
-                <a16:creationId xmlns:a16="http://schemas.microsoft.com/office/drawing/2014/main" id="{0ED6D180-92C1-4333-BA91-2BBA4DD94A3B}"/>
+                <a16:creationId xmlns:a16="http://schemas.microsoft.com/office/drawing/2014/main" xmlns="" id="{0ED6D180-92C1-4333-BA91-2BBA4DD94A3B}"/>
               </a:ext>
             </a:extLst>
           </p:cNvPr>
@@ -16675,7 +17631,7 @@
           <p:cNvPr id="6" name="CuadroTexto 5">
             <a:extLst>
               <a:ext uri="{FF2B5EF4-FFF2-40B4-BE49-F238E27FC236}">
-                <a16:creationId xmlns:a16="http://schemas.microsoft.com/office/drawing/2014/main" id="{BC8D092D-6667-447D-B473-A50467138064}"/>
+                <a16:creationId xmlns:a16="http://schemas.microsoft.com/office/drawing/2014/main" xmlns="" id="{BC8D092D-6667-447D-B473-A50467138064}"/>
               </a:ext>
             </a:extLst>
           </p:cNvPr>
@@ -16781,7 +17737,7 @@
     </p:spTree>
     <p:extLst>
       <p:ext uri="{BB962C8B-B14F-4D97-AF65-F5344CB8AC3E}">
-        <p14:creationId xmlns:p14="http://schemas.microsoft.com/office/powerpoint/2010/main" val="2333497509"/>
+        <p14:creationId xmlns:p14="http://schemas.microsoft.com/office/powerpoint/2010/main" xmlns="" val="2333497509"/>
       </p:ext>
     </p:extLst>
   </p:cSld>
@@ -17041,7 +17997,7 @@
   <a:extraClrSchemeLst/>
   <a:extLst>
     <a:ext uri="{05A4C25C-085E-4340-85A3-A5531E510DB2}">
-      <thm15:themeFamily xmlns:thm15="http://schemas.microsoft.com/office/thememl/2012/main" name="Parallax" id="{3388167B-A2EB-4685-9635-1831D9AEF8C4}" vid="{4F7A876A-7598-49CA-AFC8-8EDA2551E4A7}"/>
+      <thm15:themeFamily xmlns:thm15="http://schemas.microsoft.com/office/thememl/2012/main" xmlns="" name="Parallax" id="{3388167B-A2EB-4685-9635-1831D9AEF8C4}" vid="{4F7A876A-7598-49CA-AFC8-8EDA2551E4A7}"/>
     </a:ext>
   </a:extLst>
 </a:theme>
@@ -17302,7 +18258,7 @@
   <a:extraClrSchemeLst/>
   <a:extLst>
     <a:ext uri="{05A4C25C-085E-4340-85A3-A5531E510DB2}">
-      <thm15:themeFamily xmlns:thm15="http://schemas.microsoft.com/office/thememl/2012/main" name="Office Theme" id="{62F939B6-93AF-4DB8-9C6B-D6C7DFDC589F}" vid="{4A3C46E8-61CC-4603-A589-7422A47A8E4A}"/>
+      <thm15:themeFamily xmlns:thm15="http://schemas.microsoft.com/office/thememl/2012/main" xmlns="" name="Office Theme" id="{62F939B6-93AF-4DB8-9C6B-D6C7DFDC589F}" vid="{4A3C46E8-61CC-4603-A589-7422A47A8E4A}"/>
     </a:ext>
   </a:extLst>
 </a:theme>

</xml_diff>

<commit_message>
-Actualización de secciones de la presentación final.
-Actualización y cierre del Seguimiento de Documentación.
</commit_message>
<xml_diff>
--- a/Presentaciones/Presentación VASPA - Diciembre 2020 - Examen Final/Presentación VASPA - Diciembre 2020 - Examen Final.pptx
+++ b/Presentaciones/Presentación VASPA - Diciembre 2020 - Examen Final/Presentación VASPA - Diciembre 2020 - Examen Final.pptx
@@ -143,7 +143,7 @@
   </p:defaultTextStyle>
   <p:extLst>
     <p:ext uri="{EFAFB233-063F-42B5-8137-9DF3F51BA10A}">
-      <p15:sldGuideLst xmlns:p15="http://schemas.microsoft.com/office/powerpoint/2012/main">
+      <p15:sldGuideLst xmlns="" xmlns:p15="http://schemas.microsoft.com/office/powerpoint/2012/main">
         <p15:guide id="1" orient="horz" pos="2160">
           <p15:clr>
             <a:srgbClr val="A4A3A4"/>
@@ -161,18 +161,9 @@
 </file>
 
 <file path=ppt/charts/chart1.xml><?xml version="1.0" encoding="utf-8"?>
-<c:chartSpace xmlns:c="http://schemas.openxmlformats.org/drawingml/2006/chart" xmlns:a="http://schemas.openxmlformats.org/drawingml/2006/main" xmlns:r="http://schemas.openxmlformats.org/officeDocument/2006/relationships" xmlns:c16r2="http://schemas.microsoft.com/office/drawing/2015/06/chart">
-  <c:date1904 val="0"/>
-  <c:lang val="es-ES"/>
-  <c:roundedCorners val="0"/>
-  <mc:AlternateContent xmlns:mc="http://schemas.openxmlformats.org/markup-compatibility/2006">
-    <mc:Choice xmlns:c14="http://schemas.microsoft.com/office/drawing/2007/8/2/chart" Requires="c14">
-      <c14:style val="102"/>
-    </mc:Choice>
-    <mc:Fallback>
-      <c:style val="2"/>
-    </mc:Fallback>
-  </mc:AlternateContent>
+<c:chartSpace xmlns:c="http://schemas.openxmlformats.org/drawingml/2006/chart" xmlns:a="http://schemas.openxmlformats.org/drawingml/2006/main" xmlns:r="http://schemas.openxmlformats.org/officeDocument/2006/relationships">
+  <c:date1904 val="1"/>
+  <c:lang val="es-AR"/>
   <c:chart>
     <c:title>
       <c:tx>
@@ -205,7 +196,7 @@
           </a:p>
         </c:rich>
       </c:tx>
-      <c:overlay val="0"/>
+      <c:layout/>
       <c:spPr>
         <a:noFill/>
         <a:ln>
@@ -214,12 +205,10 @@
         <a:effectLst/>
       </c:spPr>
     </c:title>
-    <c:autoTitleDeleted val="0"/>
     <c:plotArea>
       <c:layout/>
       <c:lineChart>
         <c:grouping val="standard"/>
-        <c:varyColors val="0"/>
         <c:ser>
           <c:idx val="0"/>
           <c:order val="0"/>
@@ -345,8 +334,7 @@
               </c:numCache>
             </c:numRef>
           </c:val>
-          <c:smooth val="0"/>
-          <c:extLst>
+          <c:extLst xmlns:c16r2="http://schemas.microsoft.com/office/drawing/2015/06/chart">
             <c:ext xmlns:c16="http://schemas.microsoft.com/office/drawing/2014/chart" uri="{C3380CC4-5D6E-409C-BE32-E72D297353CC}">
               <c16:uniqueId val="{00000000-38D4-4551-A2C0-6F470BC3E09B}"/>
             </c:ext>
@@ -465,7 +453,7 @@
                   <c:v>24.419999999999987</c:v>
                 </c:pt>
                 <c:pt idx="8">
-                  <c:v>10.850000000000009</c:v>
+                  <c:v>10.850000000000012</c:v>
                 </c:pt>
                 <c:pt idx="9">
                   <c:v>6.42</c:v>
@@ -476,36 +464,24 @@
               </c:numCache>
             </c:numRef>
           </c:val>
-          <c:smooth val="0"/>
-          <c:extLst>
+          <c:extLst xmlns:c16r2="http://schemas.microsoft.com/office/drawing/2015/06/chart">
             <c:ext xmlns:c16="http://schemas.microsoft.com/office/drawing/2014/chart" uri="{C3380CC4-5D6E-409C-BE32-E72D297353CC}">
               <c16:uniqueId val="{00000001-38D4-4551-A2C0-6F470BC3E09B}"/>
             </c:ext>
           </c:extLst>
         </c:ser>
-        <c:dLbls>
-          <c:showLegendKey val="0"/>
-          <c:showVal val="0"/>
-          <c:showCatName val="0"/>
-          <c:showSerName val="0"/>
-          <c:showPercent val="0"/>
-          <c:showBubbleSize val="0"/>
-        </c:dLbls>
         <c:marker val="1"/>
-        <c:smooth val="0"/>
-        <c:axId val="85107456"/>
-        <c:axId val="85108992"/>
+        <c:axId val="90199168"/>
+        <c:axId val="90200704"/>
       </c:lineChart>
       <c:dateAx>
-        <c:axId val="85107456"/>
+        <c:axId val="90199168"/>
         <c:scaling>
           <c:orientation val="minMax"/>
         </c:scaling>
-        <c:delete val="0"/>
         <c:axPos val="b"/>
         <c:numFmt formatCode="m/d/yyyy" sourceLinked="1"/>
         <c:majorTickMark val="none"/>
-        <c:minorTickMark val="none"/>
         <c:tickLblPos val="nextTo"/>
         <c:spPr>
           <a:noFill/>
@@ -540,18 +516,17 @@
             <a:endParaRPr lang="es-AR"/>
           </a:p>
         </c:txPr>
-        <c:crossAx val="85108992"/>
+        <c:crossAx val="90200704"/>
         <c:crosses val="autoZero"/>
         <c:auto val="1"/>
         <c:lblOffset val="100"/>
         <c:baseTimeUnit val="days"/>
       </c:dateAx>
       <c:valAx>
-        <c:axId val="85108992"/>
+        <c:axId val="90200704"/>
         <c:scaling>
           <c:orientation val="minMax"/>
         </c:scaling>
-        <c:delete val="0"/>
         <c:axPos val="l"/>
         <c:majorGridlines>
           <c:spPr>
@@ -569,7 +544,6 @@
         </c:majorGridlines>
         <c:numFmt formatCode="General" sourceLinked="1"/>
         <c:majorTickMark val="none"/>
-        <c:minorTickMark val="none"/>
         <c:tickLblPos val="nextTo"/>
         <c:spPr>
           <a:noFill/>
@@ -598,7 +572,7 @@
             <a:endParaRPr lang="es-AR"/>
           </a:p>
         </c:txPr>
-        <c:crossAx val="85107456"/>
+        <c:crossAx val="90199168"/>
         <c:crosses val="autoZero"/>
         <c:crossBetween val="between"/>
       </c:valAx>
@@ -612,7 +586,7 @@
     </c:plotArea>
     <c:legend>
       <c:legendPos val="b"/>
-      <c:overlay val="0"/>
+      <c:layout/>
       <c:spPr>
         <a:noFill/>
         <a:ln>
@@ -643,14 +617,13 @@
     </c:legend>
     <c:plotVisOnly val="1"/>
     <c:dispBlanksAs val="gap"/>
-    <c:extLst>
+    <c:extLst xmlns:c16r2="http://schemas.microsoft.com/office/drawing/2015/06/chart">
       <c:ext xmlns:c16r3="http://schemas.microsoft.com/office/drawing/2017/03/chart" uri="{56B9EC1D-385E-4148-901F-78D8002777C0}">
         <c16r3:dataDisplayOptions16>
           <c16r3:dispNaAsBlank val="1"/>
         </c16r3:dataDisplayOptions16>
       </c:ext>
     </c:extLst>
-    <c:showDLblsOverMax val="0"/>
   </c:chart>
   <c:spPr>
     <a:solidFill>
@@ -677,9 +650,7 @@
       <a:endParaRPr lang="es-AR"/>
     </a:p>
   </c:txPr>
-  <c:externalData r:id="rId1">
-    <c:autoUpdate val="0"/>
-  </c:externalData>
+  <c:externalData r:id="rId1"/>
   <c:userShapes r:id="rId2"/>
 </c:chartSpace>
 </file>
@@ -1446,7 +1417,22 @@
       </dgm:t>
     </dgm:pt>
     <dgm:pt modelId="{853FF75D-08FD-4C0B-97FF-B95C5121D1D7}">
-      <dgm:prSet phldrT="[Texto]"/>
+      <dgm:prSet phldrT="[Texto]">
+        <dgm:style>
+          <a:lnRef idx="0">
+            <a:schemeClr val="accent1"/>
+          </a:lnRef>
+          <a:fillRef idx="3">
+            <a:schemeClr val="accent1"/>
+          </a:fillRef>
+          <a:effectRef idx="3">
+            <a:schemeClr val="accent1"/>
+          </a:effectRef>
+          <a:fontRef idx="minor">
+            <a:schemeClr val="lt1"/>
+          </a:fontRef>
+        </dgm:style>
+      </dgm:prSet>
       <dgm:spPr/>
       <dgm:t>
         <a:bodyPr/>
@@ -1483,7 +1469,22 @@
       </dgm:t>
     </dgm:pt>
     <dgm:pt modelId="{3E85E467-C11E-426F-9200-FC251BE43DEA}">
-      <dgm:prSet phldrT="[Texto]"/>
+      <dgm:prSet phldrT="[Texto]">
+        <dgm:style>
+          <a:lnRef idx="0">
+            <a:schemeClr val="accent3"/>
+          </a:lnRef>
+          <a:fillRef idx="3">
+            <a:schemeClr val="accent3"/>
+          </a:fillRef>
+          <a:effectRef idx="3">
+            <a:schemeClr val="accent3"/>
+          </a:effectRef>
+          <a:fontRef idx="minor">
+            <a:schemeClr val="lt1"/>
+          </a:fontRef>
+        </dgm:style>
+      </dgm:prSet>
       <dgm:spPr/>
       <dgm:t>
         <a:bodyPr/>
@@ -1520,7 +1521,22 @@
       </dgm:t>
     </dgm:pt>
     <dgm:pt modelId="{3B4EE390-B919-49DE-81BE-0780A08DDBFA}">
-      <dgm:prSet phldrT="[Texto]"/>
+      <dgm:prSet phldrT="[Texto]">
+        <dgm:style>
+          <a:lnRef idx="0">
+            <a:schemeClr val="accent1"/>
+          </a:lnRef>
+          <a:fillRef idx="3">
+            <a:schemeClr val="accent1"/>
+          </a:fillRef>
+          <a:effectRef idx="3">
+            <a:schemeClr val="accent1"/>
+          </a:effectRef>
+          <a:fontRef idx="minor">
+            <a:schemeClr val="lt1"/>
+          </a:fontRef>
+        </dgm:style>
+      </dgm:prSet>
       <dgm:spPr/>
       <dgm:t>
         <a:bodyPr/>
@@ -1557,7 +1573,22 @@
       </dgm:t>
     </dgm:pt>
     <dgm:pt modelId="{FE8D9DF2-8BC9-4E07-8005-D845C397B55E}">
-      <dgm:prSet phldrT="[Texto]"/>
+      <dgm:prSet phldrT="[Texto]">
+        <dgm:style>
+          <a:lnRef idx="0">
+            <a:schemeClr val="accent3"/>
+          </a:lnRef>
+          <a:fillRef idx="3">
+            <a:schemeClr val="accent3"/>
+          </a:fillRef>
+          <a:effectRef idx="3">
+            <a:schemeClr val="accent3"/>
+          </a:effectRef>
+          <a:fontRef idx="minor">
+            <a:schemeClr val="lt1"/>
+          </a:fontRef>
+        </dgm:style>
+      </dgm:prSet>
       <dgm:spPr/>
       <dgm:t>
         <a:bodyPr/>
@@ -1602,6 +1633,13 @@
         </dgm:presLayoutVars>
       </dgm:prSet>
       <dgm:spPr/>
+      <dgm:t>
+        <a:bodyPr/>
+        <a:lstStyle/>
+        <a:p>
+          <a:endParaRPr lang="es-AR"/>
+        </a:p>
+      </dgm:t>
     </dgm:pt>
     <dgm:pt modelId="{3D5C674D-195F-4346-A602-68D809648B83}" type="pres">
       <dgm:prSet presAssocID="{853FF75D-08FD-4C0B-97FF-B95C5121D1D7}" presName="parTxOnly" presStyleLbl="node1" presStyleIdx="0" presStyleCnt="4">
@@ -1612,6 +1650,13 @@
         </dgm:presLayoutVars>
       </dgm:prSet>
       <dgm:spPr/>
+      <dgm:t>
+        <a:bodyPr/>
+        <a:lstStyle/>
+        <a:p>
+          <a:endParaRPr lang="es-AR"/>
+        </a:p>
+      </dgm:t>
     </dgm:pt>
     <dgm:pt modelId="{4DCC4052-4221-44D0-84E2-29AAAD96FCB3}" type="pres">
       <dgm:prSet presAssocID="{888E8F23-D971-4F49-AF2A-2D3F7847711C}" presName="parTxOnlySpace" presStyleCnt="0"/>
@@ -1626,6 +1671,13 @@
         </dgm:presLayoutVars>
       </dgm:prSet>
       <dgm:spPr/>
+      <dgm:t>
+        <a:bodyPr/>
+        <a:lstStyle/>
+        <a:p>
+          <a:endParaRPr lang="es-AR"/>
+        </a:p>
+      </dgm:t>
     </dgm:pt>
     <dgm:pt modelId="{A6E2C1E9-D2ED-47B3-A71D-FDA80BA4D0C1}" type="pres">
       <dgm:prSet presAssocID="{431F7064-B371-4D30-9440-9276B420E393}" presName="parTxOnlySpace" presStyleCnt="0"/>
@@ -1640,6 +1692,13 @@
         </dgm:presLayoutVars>
       </dgm:prSet>
       <dgm:spPr/>
+      <dgm:t>
+        <a:bodyPr/>
+        <a:lstStyle/>
+        <a:p>
+          <a:endParaRPr lang="es-AR"/>
+        </a:p>
+      </dgm:t>
     </dgm:pt>
     <dgm:pt modelId="{FA28285D-C85B-47E5-8E04-E3031E7EB070}" type="pres">
       <dgm:prSet presAssocID="{50E5B106-8092-4055-AC3C-E16AB9A8A632}" presName="parTxOnlySpace" presStyleCnt="0"/>
@@ -1654,17 +1713,24 @@
         </dgm:presLayoutVars>
       </dgm:prSet>
       <dgm:spPr/>
+      <dgm:t>
+        <a:bodyPr/>
+        <a:lstStyle/>
+        <a:p>
+          <a:endParaRPr lang="es-AR"/>
+        </a:p>
+      </dgm:t>
     </dgm:pt>
   </dgm:ptLst>
   <dgm:cxnLst>
     <dgm:cxn modelId="{7D2F0A27-3D8B-4128-8CB3-A82F5F34B1DA}" type="presOf" srcId="{3B4EE390-B919-49DE-81BE-0780A08DDBFA}" destId="{AEA2C0A0-0FCA-4EB1-AA5B-89E50BC14E35}" srcOrd="0" destOrd="0" presId="urn:microsoft.com/office/officeart/2005/8/layout/chevron1"/>
+    <dgm:cxn modelId="{5E7AA7A8-CA8D-46F6-8417-A9E8900910E7}" type="presOf" srcId="{07D852F8-DC80-412E-99FF-CBC8CF6E9E53}" destId="{BB3205ED-EB8F-4AA2-A69D-916A25FD317F}" srcOrd="0" destOrd="0" presId="urn:microsoft.com/office/officeart/2005/8/layout/chevron1"/>
+    <dgm:cxn modelId="{24BDC4C3-8E68-4ABC-A0DA-A0FE0C4BE3D4}" srcId="{07D852F8-DC80-412E-99FF-CBC8CF6E9E53}" destId="{3E85E467-C11E-426F-9200-FC251BE43DEA}" srcOrd="1" destOrd="0" parTransId="{83EB3A9D-25F1-42C7-AA54-1B46554184BF}" sibTransId="{431F7064-B371-4D30-9440-9276B420E393}"/>
     <dgm:cxn modelId="{C846122C-05FD-4C41-8444-CC3A300BDFFE}" srcId="{07D852F8-DC80-412E-99FF-CBC8CF6E9E53}" destId="{853FF75D-08FD-4C0B-97FF-B95C5121D1D7}" srcOrd="0" destOrd="0" parTransId="{BD4839AE-4C9F-4F18-92E9-4B1323829560}" sibTransId="{888E8F23-D971-4F49-AF2A-2D3F7847711C}"/>
+    <dgm:cxn modelId="{403E4FC9-6B5A-4E42-8B00-B4A63F0B56C0}" type="presOf" srcId="{3E85E467-C11E-426F-9200-FC251BE43DEA}" destId="{6886AB32-2506-433F-9563-157CC1EA1348}" srcOrd="0" destOrd="0" presId="urn:microsoft.com/office/officeart/2005/8/layout/chevron1"/>
     <dgm:cxn modelId="{49728C46-9AF0-4404-B77C-0BF8753B1BE2}" srcId="{07D852F8-DC80-412E-99FF-CBC8CF6E9E53}" destId="{3B4EE390-B919-49DE-81BE-0780A08DDBFA}" srcOrd="2" destOrd="0" parTransId="{3B1FF57E-AA55-4079-B104-9BCA769CA707}" sibTransId="{50E5B106-8092-4055-AC3C-E16AB9A8A632}"/>
     <dgm:cxn modelId="{D7B69E66-919E-4FAC-945E-964D8A3AC565}" type="presOf" srcId="{FE8D9DF2-8BC9-4E07-8005-D845C397B55E}" destId="{09B459DE-37E0-4270-82CB-D68CAF9A376E}" srcOrd="0" destOrd="0" presId="urn:microsoft.com/office/officeart/2005/8/layout/chevron1"/>
     <dgm:cxn modelId="{D76B3C6A-BC4F-4872-BB7B-7982459BAA86}" type="presOf" srcId="{853FF75D-08FD-4C0B-97FF-B95C5121D1D7}" destId="{3D5C674D-195F-4346-A602-68D809648B83}" srcOrd="0" destOrd="0" presId="urn:microsoft.com/office/officeart/2005/8/layout/chevron1"/>
-    <dgm:cxn modelId="{5E7AA7A8-CA8D-46F6-8417-A9E8900910E7}" type="presOf" srcId="{07D852F8-DC80-412E-99FF-CBC8CF6E9E53}" destId="{BB3205ED-EB8F-4AA2-A69D-916A25FD317F}" srcOrd="0" destOrd="0" presId="urn:microsoft.com/office/officeart/2005/8/layout/chevron1"/>
-    <dgm:cxn modelId="{24BDC4C3-8E68-4ABC-A0DA-A0FE0C4BE3D4}" srcId="{07D852F8-DC80-412E-99FF-CBC8CF6E9E53}" destId="{3E85E467-C11E-426F-9200-FC251BE43DEA}" srcOrd="1" destOrd="0" parTransId="{83EB3A9D-25F1-42C7-AA54-1B46554184BF}" sibTransId="{431F7064-B371-4D30-9440-9276B420E393}"/>
-    <dgm:cxn modelId="{403E4FC9-6B5A-4E42-8B00-B4A63F0B56C0}" type="presOf" srcId="{3E85E467-C11E-426F-9200-FC251BE43DEA}" destId="{6886AB32-2506-433F-9563-157CC1EA1348}" srcOrd="0" destOrd="0" presId="urn:microsoft.com/office/officeart/2005/8/layout/chevron1"/>
     <dgm:cxn modelId="{61C2D7D0-DEE2-4010-B64E-4D1FEDBA0702}" srcId="{07D852F8-DC80-412E-99FF-CBC8CF6E9E53}" destId="{FE8D9DF2-8BC9-4E07-8005-D845C397B55E}" srcOrd="3" destOrd="0" parTransId="{5B8A1B7E-67AD-4057-819C-2245EC4F7AC4}" sibTransId="{5B54ED7F-A264-47E6-96E6-7D075AA7F363}"/>
     <dgm:cxn modelId="{2F515B5D-54B1-4237-891D-39EC55794076}" type="presParOf" srcId="{BB3205ED-EB8F-4AA2-A69D-916A25FD317F}" destId="{3D5C674D-195F-4346-A602-68D809648B83}" srcOrd="0" destOrd="0" presId="urn:microsoft.com/office/officeart/2005/8/layout/chevron1"/>
     <dgm:cxn modelId="{624BFC5C-F915-4A8E-B04A-57BF8C238C73}" type="presParOf" srcId="{BB3205ED-EB8F-4AA2-A69D-916A25FD317F}" destId="{4DCC4052-4221-44D0-84E2-29AAAD96FCB3}" srcOrd="1" destOrd="0" presId="urn:microsoft.com/office/officeart/2005/8/layout/chevron1"/>
@@ -1678,14 +1744,14 @@
   <dgm:whole/>
   <dgm:extLst>
     <a:ext uri="http://schemas.microsoft.com/office/drawing/2008/diagram">
-      <dsp:dataModelExt xmlns:dsp="http://schemas.microsoft.com/office/drawing/2008/diagram" relId="rId6" minVer="http://schemas.openxmlformats.org/drawingml/2006/diagram"/>
+      <dsp:dataModelExt xmlns:dsp="http://schemas.microsoft.com/office/drawing/2008/diagram" xmlns="" relId="rId6" minVer="http://schemas.openxmlformats.org/drawingml/2006/diagram"/>
     </a:ext>
   </dgm:extLst>
 </dgm:dataModel>
 </file>
 
 <file path=ppt/diagrams/drawing1.xml><?xml version="1.0" encoding="utf-8"?>
-<dsp:drawing xmlns:dgm="http://schemas.openxmlformats.org/drawingml/2006/diagram" xmlns:dsp="http://schemas.microsoft.com/office/drawing/2008/diagram" xmlns:a="http://schemas.openxmlformats.org/drawingml/2006/main">
+<dsp:drawing xmlns:dgm="http://schemas.openxmlformats.org/drawingml/2006/diagram" xmlns:a="http://schemas.openxmlformats.org/drawingml/2006/main" xmlns:dsp="http://schemas.microsoft.com/office/drawing/2008/diagram">
   <dsp:spTree>
     <dsp:nvGrpSpPr>
       <dsp:cNvPr id="0" name=""/>
@@ -1705,36 +1771,56 @@
         <a:prstGeom prst="chevron">
           <a:avLst/>
         </a:prstGeom>
-        <a:solidFill>
-          <a:schemeClr val="accent1">
-            <a:hueOff val="0"/>
-            <a:satOff val="0"/>
-            <a:lumOff val="0"/>
-            <a:alphaOff val="0"/>
-          </a:schemeClr>
-        </a:solidFill>
-        <a:ln w="15875" cap="rnd" cmpd="sng" algn="ctr">
-          <a:solidFill>
-            <a:schemeClr val="lt1">
-              <a:hueOff val="0"/>
-              <a:satOff val="0"/>
-              <a:lumOff val="0"/>
-              <a:alphaOff val="0"/>
-            </a:schemeClr>
-          </a:solidFill>
-          <a:prstDash val="solid"/>
+        <a:gradFill rotWithShape="1">
+          <a:gsLst>
+            <a:gs pos="0">
+              <a:schemeClr val="accent1">
+                <a:tint val="96000"/>
+                <a:lumMod val="102000"/>
+              </a:schemeClr>
+            </a:gs>
+            <a:gs pos="100000">
+              <a:schemeClr val="accent1">
+                <a:shade val="88000"/>
+                <a:lumMod val="94000"/>
+              </a:schemeClr>
+            </a:gs>
+          </a:gsLst>
+          <a:path path="circle">
+            <a:fillToRect l="50000" t="100000" r="100000" b="50000"/>
+          </a:path>
+        </a:gradFill>
+        <a:ln>
+          <a:noFill/>
         </a:ln>
-        <a:effectLst/>
+        <a:effectLst>
+          <a:outerShdw blurRad="38100" dist="25400" dir="5400000" rotWithShape="0">
+            <a:srgbClr val="000000">
+              <a:alpha val="64000"/>
+            </a:srgbClr>
+          </a:outerShdw>
+        </a:effectLst>
+        <a:scene3d>
+          <a:camera prst="orthographicFront">
+            <a:rot lat="0" lon="0" rev="0"/>
+          </a:camera>
+          <a:lightRig rig="threePt" dir="tl">
+            <a:rot lat="0" lon="0" rev="1200000"/>
+          </a:lightRig>
+        </a:scene3d>
+        <a:sp3d>
+          <a:bevelT w="25400" h="12700"/>
+        </a:sp3d>
       </dsp:spPr>
       <dsp:style>
-        <a:lnRef idx="2">
-          <a:scrgbClr r="0" g="0" b="0"/>
+        <a:lnRef idx="0">
+          <a:schemeClr val="accent1"/>
         </a:lnRef>
-        <a:fillRef idx="1">
-          <a:scrgbClr r="0" g="0" b="0"/>
+        <a:fillRef idx="3">
+          <a:schemeClr val="accent1"/>
         </a:fillRef>
-        <a:effectRef idx="0">
-          <a:scrgbClr r="0" g="0" b="0"/>
+        <a:effectRef idx="3">
+          <a:schemeClr val="accent1"/>
         </a:effectRef>
         <a:fontRef idx="minor">
           <a:schemeClr val="lt1"/>
@@ -1746,7 +1832,7 @@
         </a:bodyPr>
         <a:lstStyle/>
         <a:p>
-          <a:pPr marL="0" lvl="0" indent="0" algn="ctr" defTabSz="755650">
+          <a:pPr lvl="0" algn="ctr" defTabSz="755650">
             <a:lnSpc>
               <a:spcPct val="90000"/>
             </a:lnSpc>
@@ -1756,7 +1842,6 @@
             <a:spcAft>
               <a:spcPct val="35000"/>
             </a:spcAft>
-            <a:buNone/>
           </a:pPr>
           <a:r>
             <a:rPr lang="es-ES" sz="1700" kern="1200" dirty="0"/>
@@ -1766,8 +1851,8 @@
         </a:p>
       </dsp:txBody>
       <dsp:txXfrm>
-        <a:off x="442714" y="2190952"/>
-        <a:ext cx="1316831" cy="877887"/>
+        <a:off x="3770" y="2190952"/>
+        <a:ext cx="2194718" cy="877887"/>
       </dsp:txXfrm>
     </dsp:sp>
     <dsp:sp modelId="{6886AB32-2506-433F-9563-157CC1EA1348}">
@@ -1783,36 +1868,56 @@
         <a:prstGeom prst="chevron">
           <a:avLst/>
         </a:prstGeom>
-        <a:solidFill>
-          <a:schemeClr val="accent1">
-            <a:hueOff val="0"/>
-            <a:satOff val="0"/>
-            <a:lumOff val="0"/>
-            <a:alphaOff val="0"/>
-          </a:schemeClr>
-        </a:solidFill>
-        <a:ln w="15875" cap="rnd" cmpd="sng" algn="ctr">
-          <a:solidFill>
-            <a:schemeClr val="lt1">
-              <a:hueOff val="0"/>
-              <a:satOff val="0"/>
-              <a:lumOff val="0"/>
-              <a:alphaOff val="0"/>
-            </a:schemeClr>
-          </a:solidFill>
-          <a:prstDash val="solid"/>
+        <a:gradFill rotWithShape="1">
+          <a:gsLst>
+            <a:gs pos="0">
+              <a:schemeClr val="accent3">
+                <a:tint val="96000"/>
+                <a:lumMod val="102000"/>
+              </a:schemeClr>
+            </a:gs>
+            <a:gs pos="100000">
+              <a:schemeClr val="accent3">
+                <a:shade val="88000"/>
+                <a:lumMod val="94000"/>
+              </a:schemeClr>
+            </a:gs>
+          </a:gsLst>
+          <a:path path="circle">
+            <a:fillToRect l="50000" t="100000" r="100000" b="50000"/>
+          </a:path>
+        </a:gradFill>
+        <a:ln>
+          <a:noFill/>
         </a:ln>
-        <a:effectLst/>
+        <a:effectLst>
+          <a:outerShdw blurRad="38100" dist="25400" dir="5400000" rotWithShape="0">
+            <a:srgbClr val="000000">
+              <a:alpha val="64000"/>
+            </a:srgbClr>
+          </a:outerShdw>
+        </a:effectLst>
+        <a:scene3d>
+          <a:camera prst="orthographicFront">
+            <a:rot lat="0" lon="0" rev="0"/>
+          </a:camera>
+          <a:lightRig rig="threePt" dir="tl">
+            <a:rot lat="0" lon="0" rev="1200000"/>
+          </a:lightRig>
+        </a:scene3d>
+        <a:sp3d>
+          <a:bevelT w="25400" h="12700"/>
+        </a:sp3d>
       </dsp:spPr>
       <dsp:style>
-        <a:lnRef idx="2">
-          <a:scrgbClr r="0" g="0" b="0"/>
+        <a:lnRef idx="0">
+          <a:schemeClr val="accent3"/>
         </a:lnRef>
-        <a:fillRef idx="1">
-          <a:scrgbClr r="0" g="0" b="0"/>
+        <a:fillRef idx="3">
+          <a:schemeClr val="accent3"/>
         </a:fillRef>
-        <a:effectRef idx="0">
-          <a:scrgbClr r="0" g="0" b="0"/>
+        <a:effectRef idx="3">
+          <a:schemeClr val="accent3"/>
         </a:effectRef>
         <a:fontRef idx="minor">
           <a:schemeClr val="lt1"/>
@@ -1824,7 +1929,7 @@
         </a:bodyPr>
         <a:lstStyle/>
         <a:p>
-          <a:pPr marL="0" lvl="0" indent="0" algn="ctr" defTabSz="755650">
+          <a:pPr lvl="0" algn="ctr" defTabSz="755650">
             <a:lnSpc>
               <a:spcPct val="90000"/>
             </a:lnSpc>
@@ -1834,7 +1939,6 @@
             <a:spcAft>
               <a:spcPct val="35000"/>
             </a:spcAft>
-            <a:buNone/>
           </a:pPr>
           <a:r>
             <a:rPr lang="es-ES" sz="1700" kern="1200" dirty="0"/>
@@ -1844,8 +1948,8 @@
         </a:p>
       </dsp:txBody>
       <dsp:txXfrm>
-        <a:off x="2417961" y="2190952"/>
-        <a:ext cx="1316831" cy="877887"/>
+        <a:off x="1979017" y="2190952"/>
+        <a:ext cx="2194718" cy="877887"/>
       </dsp:txXfrm>
     </dsp:sp>
     <dsp:sp modelId="{AEA2C0A0-0FCA-4EB1-AA5B-89E50BC14E35}">
@@ -1861,36 +1965,56 @@
         <a:prstGeom prst="chevron">
           <a:avLst/>
         </a:prstGeom>
-        <a:solidFill>
-          <a:schemeClr val="accent1">
-            <a:hueOff val="0"/>
-            <a:satOff val="0"/>
-            <a:lumOff val="0"/>
-            <a:alphaOff val="0"/>
-          </a:schemeClr>
-        </a:solidFill>
-        <a:ln w="15875" cap="rnd" cmpd="sng" algn="ctr">
-          <a:solidFill>
-            <a:schemeClr val="lt1">
-              <a:hueOff val="0"/>
-              <a:satOff val="0"/>
-              <a:lumOff val="0"/>
-              <a:alphaOff val="0"/>
-            </a:schemeClr>
-          </a:solidFill>
-          <a:prstDash val="solid"/>
+        <a:gradFill rotWithShape="1">
+          <a:gsLst>
+            <a:gs pos="0">
+              <a:schemeClr val="accent1">
+                <a:tint val="96000"/>
+                <a:lumMod val="102000"/>
+              </a:schemeClr>
+            </a:gs>
+            <a:gs pos="100000">
+              <a:schemeClr val="accent1">
+                <a:shade val="88000"/>
+                <a:lumMod val="94000"/>
+              </a:schemeClr>
+            </a:gs>
+          </a:gsLst>
+          <a:path path="circle">
+            <a:fillToRect l="50000" t="100000" r="100000" b="50000"/>
+          </a:path>
+        </a:gradFill>
+        <a:ln>
+          <a:noFill/>
         </a:ln>
-        <a:effectLst/>
+        <a:effectLst>
+          <a:outerShdw blurRad="38100" dist="25400" dir="5400000" rotWithShape="0">
+            <a:srgbClr val="000000">
+              <a:alpha val="64000"/>
+            </a:srgbClr>
+          </a:outerShdw>
+        </a:effectLst>
+        <a:scene3d>
+          <a:camera prst="orthographicFront">
+            <a:rot lat="0" lon="0" rev="0"/>
+          </a:camera>
+          <a:lightRig rig="threePt" dir="tl">
+            <a:rot lat="0" lon="0" rev="1200000"/>
+          </a:lightRig>
+        </a:scene3d>
+        <a:sp3d>
+          <a:bevelT w="25400" h="12700"/>
+        </a:sp3d>
       </dsp:spPr>
       <dsp:style>
-        <a:lnRef idx="2">
-          <a:scrgbClr r="0" g="0" b="0"/>
+        <a:lnRef idx="0">
+          <a:schemeClr val="accent1"/>
         </a:lnRef>
-        <a:fillRef idx="1">
-          <a:scrgbClr r="0" g="0" b="0"/>
+        <a:fillRef idx="3">
+          <a:schemeClr val="accent1"/>
         </a:fillRef>
-        <a:effectRef idx="0">
-          <a:scrgbClr r="0" g="0" b="0"/>
+        <a:effectRef idx="3">
+          <a:schemeClr val="accent1"/>
         </a:effectRef>
         <a:fontRef idx="minor">
           <a:schemeClr val="lt1"/>
@@ -1902,7 +2026,7 @@
         </a:bodyPr>
         <a:lstStyle/>
         <a:p>
-          <a:pPr marL="0" lvl="0" indent="0" algn="ctr" defTabSz="755650">
+          <a:pPr lvl="0" algn="ctr" defTabSz="755650">
             <a:lnSpc>
               <a:spcPct val="90000"/>
             </a:lnSpc>
@@ -1912,7 +2036,6 @@
             <a:spcAft>
               <a:spcPct val="35000"/>
             </a:spcAft>
-            <a:buNone/>
           </a:pPr>
           <a:r>
             <a:rPr lang="es-ES" sz="1700" kern="1200" dirty="0"/>
@@ -1922,8 +2045,8 @@
         </a:p>
       </dsp:txBody>
       <dsp:txXfrm>
-        <a:off x="4393208" y="2190952"/>
-        <a:ext cx="1316831" cy="877887"/>
+        <a:off x="3954264" y="2190952"/>
+        <a:ext cx="2194718" cy="877887"/>
       </dsp:txXfrm>
     </dsp:sp>
     <dsp:sp modelId="{09B459DE-37E0-4270-82CB-D68CAF9A376E}">
@@ -1939,36 +2062,56 @@
         <a:prstGeom prst="chevron">
           <a:avLst/>
         </a:prstGeom>
-        <a:solidFill>
-          <a:schemeClr val="accent1">
-            <a:hueOff val="0"/>
-            <a:satOff val="0"/>
-            <a:lumOff val="0"/>
-            <a:alphaOff val="0"/>
-          </a:schemeClr>
-        </a:solidFill>
-        <a:ln w="15875" cap="rnd" cmpd="sng" algn="ctr">
-          <a:solidFill>
-            <a:schemeClr val="lt1">
-              <a:hueOff val="0"/>
-              <a:satOff val="0"/>
-              <a:lumOff val="0"/>
-              <a:alphaOff val="0"/>
-            </a:schemeClr>
-          </a:solidFill>
-          <a:prstDash val="solid"/>
+        <a:gradFill rotWithShape="1">
+          <a:gsLst>
+            <a:gs pos="0">
+              <a:schemeClr val="accent3">
+                <a:tint val="96000"/>
+                <a:lumMod val="102000"/>
+              </a:schemeClr>
+            </a:gs>
+            <a:gs pos="100000">
+              <a:schemeClr val="accent3">
+                <a:shade val="88000"/>
+                <a:lumMod val="94000"/>
+              </a:schemeClr>
+            </a:gs>
+          </a:gsLst>
+          <a:path path="circle">
+            <a:fillToRect l="50000" t="100000" r="100000" b="50000"/>
+          </a:path>
+        </a:gradFill>
+        <a:ln>
+          <a:noFill/>
         </a:ln>
-        <a:effectLst/>
+        <a:effectLst>
+          <a:outerShdw blurRad="38100" dist="25400" dir="5400000" rotWithShape="0">
+            <a:srgbClr val="000000">
+              <a:alpha val="64000"/>
+            </a:srgbClr>
+          </a:outerShdw>
+        </a:effectLst>
+        <a:scene3d>
+          <a:camera prst="orthographicFront">
+            <a:rot lat="0" lon="0" rev="0"/>
+          </a:camera>
+          <a:lightRig rig="threePt" dir="tl">
+            <a:rot lat="0" lon="0" rev="1200000"/>
+          </a:lightRig>
+        </a:scene3d>
+        <a:sp3d>
+          <a:bevelT w="25400" h="12700"/>
+        </a:sp3d>
       </dsp:spPr>
       <dsp:style>
-        <a:lnRef idx="2">
-          <a:scrgbClr r="0" g="0" b="0"/>
+        <a:lnRef idx="0">
+          <a:schemeClr val="accent3"/>
         </a:lnRef>
-        <a:fillRef idx="1">
-          <a:scrgbClr r="0" g="0" b="0"/>
+        <a:fillRef idx="3">
+          <a:schemeClr val="accent3"/>
         </a:fillRef>
-        <a:effectRef idx="0">
-          <a:scrgbClr r="0" g="0" b="0"/>
+        <a:effectRef idx="3">
+          <a:schemeClr val="accent3"/>
         </a:effectRef>
         <a:fontRef idx="minor">
           <a:schemeClr val="lt1"/>
@@ -1980,7 +2123,7 @@
         </a:bodyPr>
         <a:lstStyle/>
         <a:p>
-          <a:pPr marL="0" lvl="0" indent="0" algn="ctr" defTabSz="755650">
+          <a:pPr lvl="0" algn="ctr" defTabSz="755650">
             <a:lnSpc>
               <a:spcPct val="90000"/>
             </a:lnSpc>
@@ -1990,7 +2133,6 @@
             <a:spcAft>
               <a:spcPct val="35000"/>
             </a:spcAft>
-            <a:buNone/>
           </a:pPr>
           <a:r>
             <a:rPr lang="es-ES" sz="1700" kern="1200" dirty="0"/>
@@ -2000,8 +2142,8 @@
         </a:p>
       </dsp:txBody>
       <dsp:txXfrm>
-        <a:off x="6368454" y="2190952"/>
-        <a:ext cx="1316831" cy="877887"/>
+        <a:off x="5929510" y="2190952"/>
+        <a:ext cx="2194718" cy="877887"/>
       </dsp:txXfrm>
     </dsp:sp>
   </dsp:spTree>
@@ -3341,7 +3483,7 @@
         <cdr:cNvPr id="2" name="CuadroTexto 2">
           <a:extLst xmlns:a="http://schemas.openxmlformats.org/drawingml/2006/main">
             <a:ext uri="{FF2B5EF4-FFF2-40B4-BE49-F238E27FC236}">
-              <a16:creationId xmlns:a16="http://schemas.microsoft.com/office/drawing/2014/main" id="{29B4C296-372F-455A-BE5A-B512322B8EDE}"/>
+              <a16:creationId xmlns="" xmlns:a16="http://schemas.microsoft.com/office/drawing/2014/main" id="{29B4C296-372F-455A-BE5A-B512322B8EDE}"/>
             </a:ext>
           </a:extLst>
         </cdr:cNvPr>
@@ -3552,7 +3694,7 @@
             <a:fld id="{F55F861E-3C59-4235-9924-AE3FDF166F3F}" type="datetimeFigureOut">
               <a:rPr lang="es-AR" smtClean="0"/>
               <a:pPr/>
-              <a:t>28/11/2020</a:t>
+              <a:t>02/12/2020</a:t>
             </a:fld>
             <a:endParaRPr lang="es-AR"/>
           </a:p>
@@ -3721,7 +3863,7 @@
     </p:spTree>
     <p:extLst>
       <p:ext uri="{BB962C8B-B14F-4D97-AF65-F5344CB8AC3E}">
-        <p14:creationId xmlns:p14="http://schemas.microsoft.com/office/powerpoint/2010/main" val="1580866007"/>
+        <p14:creationId xmlns="" xmlns:p14="http://schemas.microsoft.com/office/powerpoint/2010/main" val="1580866007"/>
       </p:ext>
     </p:extLst>
   </p:cSld>
@@ -3896,7 +4038,7 @@
     </p:spTree>
     <p:extLst>
       <p:ext uri="{BB962C8B-B14F-4D97-AF65-F5344CB8AC3E}">
-        <p14:creationId xmlns:p14="http://schemas.microsoft.com/office/powerpoint/2010/main" val="966578479"/>
+        <p14:creationId xmlns="" xmlns:p14="http://schemas.microsoft.com/office/powerpoint/2010/main" val="966578479"/>
       </p:ext>
     </p:extLst>
   </p:cSld>
@@ -4409,7 +4551,7 @@
             <a:fld id="{59D4168E-E6F0-4E6D-9E98-0FBF44047F1D}" type="datetimeFigureOut">
               <a:rPr lang="es-AR" smtClean="0"/>
               <a:pPr/>
-              <a:t>28/11/2020</a:t>
+              <a:t>02/12/2020</a:t>
             </a:fld>
             <a:endParaRPr lang="es-AR"/>
           </a:p>
@@ -4468,7 +4610,7 @@
           <p:cNvPr id="8" name="Imagen 7">
             <a:extLst>
               <a:ext uri="{FF2B5EF4-FFF2-40B4-BE49-F238E27FC236}">
-                <a16:creationId xmlns:a16="http://schemas.microsoft.com/office/drawing/2014/main" id="{153E41C7-C0FB-4283-8821-79FB890C108B}"/>
+                <a16:creationId xmlns="" xmlns:a16="http://schemas.microsoft.com/office/drawing/2014/main" id="{153E41C7-C0FB-4283-8821-79FB890C108B}"/>
               </a:ext>
             </a:extLst>
           </p:cNvPr>
@@ -4481,7 +4623,7 @@
           <a:blip r:embed="rId2" cstate="print">
             <a:extLst>
               <a:ext uri="{28A0092B-C50C-407E-A947-70E740481C1C}">
-                <a14:useLocalDpi xmlns:a14="http://schemas.microsoft.com/office/drawing/2010/main" val="0"/>
+                <a14:useLocalDpi xmlns="" xmlns:a14="http://schemas.microsoft.com/office/drawing/2010/main" val="0"/>
               </a:ext>
             </a:extLst>
           </a:blip>
@@ -4502,7 +4644,7 @@
     </p:spTree>
     <p:extLst>
       <p:ext uri="{BB962C8B-B14F-4D97-AF65-F5344CB8AC3E}">
-        <p14:creationId xmlns:p14="http://schemas.microsoft.com/office/powerpoint/2010/main" val="594578851"/>
+        <p14:creationId xmlns="" xmlns:p14="http://schemas.microsoft.com/office/powerpoint/2010/main" val="594578851"/>
       </p:ext>
     </p:extLst>
   </p:cSld>
@@ -4743,7 +4885,7 @@
             <a:fld id="{59D4168E-E6F0-4E6D-9E98-0FBF44047F1D}" type="datetimeFigureOut">
               <a:rPr lang="es-AR" smtClean="0"/>
               <a:pPr/>
-              <a:t>28/11/2020</a:t>
+              <a:t>02/12/2020</a:t>
             </a:fld>
             <a:endParaRPr lang="es-AR"/>
           </a:p>
@@ -4795,7 +4937,7 @@
     </p:spTree>
     <p:extLst>
       <p:ext uri="{BB962C8B-B14F-4D97-AF65-F5344CB8AC3E}">
-        <p14:creationId xmlns:p14="http://schemas.microsoft.com/office/powerpoint/2010/main" val="2858870748"/>
+        <p14:creationId xmlns="" xmlns:p14="http://schemas.microsoft.com/office/powerpoint/2010/main" val="2858870748"/>
       </p:ext>
     </p:extLst>
   </p:cSld>
@@ -4993,7 +5135,7 @@
             <a:fld id="{59D4168E-E6F0-4E6D-9E98-0FBF44047F1D}" type="datetimeFigureOut">
               <a:rPr lang="es-AR" smtClean="0"/>
               <a:pPr/>
-              <a:t>28/11/2020</a:t>
+              <a:t>02/12/2020</a:t>
             </a:fld>
             <a:endParaRPr lang="es-AR"/>
           </a:p>
@@ -5045,7 +5187,7 @@
     </p:spTree>
     <p:extLst>
       <p:ext uri="{BB962C8B-B14F-4D97-AF65-F5344CB8AC3E}">
-        <p14:creationId xmlns:p14="http://schemas.microsoft.com/office/powerpoint/2010/main" val="2887001581"/>
+        <p14:creationId xmlns="" xmlns:p14="http://schemas.microsoft.com/office/powerpoint/2010/main" val="2887001581"/>
       </p:ext>
     </p:extLst>
   </p:cSld>
@@ -5535,7 +5677,7 @@
             <a:fld id="{59D4168E-E6F0-4E6D-9E98-0FBF44047F1D}" type="datetimeFigureOut">
               <a:rPr lang="es-AR" smtClean="0"/>
               <a:pPr/>
-              <a:t>28/11/2020</a:t>
+              <a:t>02/12/2020</a:t>
             </a:fld>
             <a:endParaRPr lang="es-AR"/>
           </a:p>
@@ -5587,7 +5729,7 @@
     </p:spTree>
     <p:extLst>
       <p:ext uri="{BB962C8B-B14F-4D97-AF65-F5344CB8AC3E}">
-        <p14:creationId xmlns:p14="http://schemas.microsoft.com/office/powerpoint/2010/main" val="953477666"/>
+        <p14:creationId xmlns="" xmlns:p14="http://schemas.microsoft.com/office/powerpoint/2010/main" val="953477666"/>
       </p:ext>
     </p:extLst>
   </p:cSld>
@@ -5785,7 +5927,7 @@
             <a:fld id="{59D4168E-E6F0-4E6D-9E98-0FBF44047F1D}" type="datetimeFigureOut">
               <a:rPr lang="es-AR" smtClean="0"/>
               <a:pPr/>
-              <a:t>28/11/2020</a:t>
+              <a:t>02/12/2020</a:t>
             </a:fld>
             <a:endParaRPr lang="es-AR"/>
           </a:p>
@@ -5837,7 +5979,7 @@
     </p:spTree>
     <p:extLst>
       <p:ext uri="{BB962C8B-B14F-4D97-AF65-F5344CB8AC3E}">
-        <p14:creationId xmlns:p14="http://schemas.microsoft.com/office/powerpoint/2010/main" val="2881036134"/>
+        <p14:creationId xmlns="" xmlns:p14="http://schemas.microsoft.com/office/powerpoint/2010/main" val="2881036134"/>
       </p:ext>
     </p:extLst>
   </p:cSld>
@@ -6319,7 +6461,7 @@
             <a:fld id="{59D4168E-E6F0-4E6D-9E98-0FBF44047F1D}" type="datetimeFigureOut">
               <a:rPr lang="es-AR" smtClean="0"/>
               <a:pPr/>
-              <a:t>28/11/2020</a:t>
+              <a:t>02/12/2020</a:t>
             </a:fld>
             <a:endParaRPr lang="es-AR"/>
           </a:p>
@@ -6371,7 +6513,7 @@
     </p:spTree>
     <p:extLst>
       <p:ext uri="{BB962C8B-B14F-4D97-AF65-F5344CB8AC3E}">
-        <p14:creationId xmlns:p14="http://schemas.microsoft.com/office/powerpoint/2010/main" val="3557333580"/>
+        <p14:creationId xmlns="" xmlns:p14="http://schemas.microsoft.com/office/powerpoint/2010/main" val="3557333580"/>
       </p:ext>
     </p:extLst>
   </p:cSld>
@@ -6618,7 +6760,7 @@
             <a:fld id="{59D4168E-E6F0-4E6D-9E98-0FBF44047F1D}" type="datetimeFigureOut">
               <a:rPr lang="es-AR" smtClean="0"/>
               <a:pPr/>
-              <a:t>28/11/2020</a:t>
+              <a:t>02/12/2020</a:t>
             </a:fld>
             <a:endParaRPr lang="es-AR"/>
           </a:p>
@@ -6670,7 +6812,7 @@
     </p:spTree>
     <p:extLst>
       <p:ext uri="{BB962C8B-B14F-4D97-AF65-F5344CB8AC3E}">
-        <p14:creationId xmlns:p14="http://schemas.microsoft.com/office/powerpoint/2010/main" val="2020671905"/>
+        <p14:creationId xmlns="" xmlns:p14="http://schemas.microsoft.com/office/powerpoint/2010/main" val="2020671905"/>
       </p:ext>
     </p:extLst>
   </p:cSld>
@@ -6794,7 +6936,7 @@
             <a:fld id="{59D4168E-E6F0-4E6D-9E98-0FBF44047F1D}" type="datetimeFigureOut">
               <a:rPr lang="es-AR" smtClean="0"/>
               <a:pPr/>
-              <a:t>28/11/2020</a:t>
+              <a:t>02/12/2020</a:t>
             </a:fld>
             <a:endParaRPr lang="es-AR"/>
           </a:p>
@@ -6846,7 +6988,7 @@
     </p:spTree>
     <p:extLst>
       <p:ext uri="{BB962C8B-B14F-4D97-AF65-F5344CB8AC3E}">
-        <p14:creationId xmlns:p14="http://schemas.microsoft.com/office/powerpoint/2010/main" val="3698065381"/>
+        <p14:creationId xmlns="" xmlns:p14="http://schemas.microsoft.com/office/powerpoint/2010/main" val="3698065381"/>
       </p:ext>
     </p:extLst>
   </p:cSld>
@@ -6976,7 +7118,7 @@
             <a:fld id="{59D4168E-E6F0-4E6D-9E98-0FBF44047F1D}" type="datetimeFigureOut">
               <a:rPr lang="es-AR" smtClean="0"/>
               <a:pPr/>
-              <a:t>28/11/2020</a:t>
+              <a:t>02/12/2020</a:t>
             </a:fld>
             <a:endParaRPr lang="es-AR"/>
           </a:p>
@@ -7028,7 +7170,7 @@
     </p:spTree>
     <p:extLst>
       <p:ext uri="{BB962C8B-B14F-4D97-AF65-F5344CB8AC3E}">
-        <p14:creationId xmlns:p14="http://schemas.microsoft.com/office/powerpoint/2010/main" val="2361575083"/>
+        <p14:creationId xmlns="" xmlns:p14="http://schemas.microsoft.com/office/powerpoint/2010/main" val="2361575083"/>
       </p:ext>
     </p:extLst>
   </p:cSld>
@@ -7154,7 +7296,7 @@
             <a:fld id="{59D4168E-E6F0-4E6D-9E98-0FBF44047F1D}" type="datetimeFigureOut">
               <a:rPr lang="es-AR" smtClean="0"/>
               <a:pPr/>
-              <a:t>28/11/2020</a:t>
+              <a:t>02/12/2020</a:t>
             </a:fld>
             <a:endParaRPr lang="es-AR"/>
           </a:p>
@@ -7213,7 +7355,7 @@
           <p:cNvPr id="8" name="Imagen 7">
             <a:extLst>
               <a:ext uri="{FF2B5EF4-FFF2-40B4-BE49-F238E27FC236}">
-                <a16:creationId xmlns:a16="http://schemas.microsoft.com/office/drawing/2014/main" id="{F65BAB47-52C5-4418-98C7-5ABDFBAB2220}"/>
+                <a16:creationId xmlns="" xmlns:a16="http://schemas.microsoft.com/office/drawing/2014/main" id="{F65BAB47-52C5-4418-98C7-5ABDFBAB2220}"/>
               </a:ext>
             </a:extLst>
           </p:cNvPr>
@@ -7226,7 +7368,7 @@
           <a:blip r:embed="rId2" cstate="print">
             <a:extLst>
               <a:ext uri="{28A0092B-C50C-407E-A947-70E740481C1C}">
-                <a14:useLocalDpi xmlns:a14="http://schemas.microsoft.com/office/drawing/2010/main" val="0"/>
+                <a14:useLocalDpi xmlns="" xmlns:a14="http://schemas.microsoft.com/office/drawing/2010/main" val="0"/>
               </a:ext>
             </a:extLst>
           </a:blip>
@@ -7247,7 +7389,7 @@
     </p:spTree>
     <p:extLst>
       <p:ext uri="{BB962C8B-B14F-4D97-AF65-F5344CB8AC3E}">
-        <p14:creationId xmlns:p14="http://schemas.microsoft.com/office/powerpoint/2010/main" val="3522170283"/>
+        <p14:creationId xmlns="" xmlns:p14="http://schemas.microsoft.com/office/powerpoint/2010/main" val="3522170283"/>
       </p:ext>
     </p:extLst>
   </p:cSld>
@@ -7443,7 +7585,7 @@
             <a:fld id="{59D4168E-E6F0-4E6D-9E98-0FBF44047F1D}" type="datetimeFigureOut">
               <a:rPr lang="es-AR" smtClean="0"/>
               <a:pPr/>
-              <a:t>28/11/2020</a:t>
+              <a:t>02/12/2020</a:t>
             </a:fld>
             <a:endParaRPr lang="es-AR"/>
           </a:p>
@@ -7495,7 +7637,7 @@
     </p:spTree>
     <p:extLst>
       <p:ext uri="{BB962C8B-B14F-4D97-AF65-F5344CB8AC3E}">
-        <p14:creationId xmlns:p14="http://schemas.microsoft.com/office/powerpoint/2010/main" val="2921707453"/>
+        <p14:creationId xmlns="" xmlns:p14="http://schemas.microsoft.com/office/powerpoint/2010/main" val="2921707453"/>
       </p:ext>
     </p:extLst>
   </p:cSld>
@@ -7742,7 +7884,7 @@
             <a:fld id="{59D4168E-E6F0-4E6D-9E98-0FBF44047F1D}" type="datetimeFigureOut">
               <a:rPr lang="es-AR" smtClean="0"/>
               <a:pPr/>
-              <a:t>28/11/2020</a:t>
+              <a:t>02/12/2020</a:t>
             </a:fld>
             <a:endParaRPr lang="es-AR"/>
           </a:p>
@@ -7794,7 +7936,7 @@
     </p:spTree>
     <p:extLst>
       <p:ext uri="{BB962C8B-B14F-4D97-AF65-F5344CB8AC3E}">
-        <p14:creationId xmlns:p14="http://schemas.microsoft.com/office/powerpoint/2010/main" val="1855319959"/>
+        <p14:creationId xmlns="" xmlns:p14="http://schemas.microsoft.com/office/powerpoint/2010/main" val="1855319959"/>
       </p:ext>
     </p:extLst>
   </p:cSld>
@@ -8186,7 +8328,7 @@
             <a:fld id="{59D4168E-E6F0-4E6D-9E98-0FBF44047F1D}" type="datetimeFigureOut">
               <a:rPr lang="es-AR" smtClean="0"/>
               <a:pPr/>
-              <a:t>28/11/2020</a:t>
+              <a:t>02/12/2020</a:t>
             </a:fld>
             <a:endParaRPr lang="es-AR"/>
           </a:p>
@@ -8238,7 +8380,7 @@
     </p:spTree>
     <p:extLst>
       <p:ext uri="{BB962C8B-B14F-4D97-AF65-F5344CB8AC3E}">
-        <p14:creationId xmlns:p14="http://schemas.microsoft.com/office/powerpoint/2010/main" val="522982594"/>
+        <p14:creationId xmlns="" xmlns:p14="http://schemas.microsoft.com/office/powerpoint/2010/main" val="522982594"/>
       </p:ext>
     </p:extLst>
   </p:cSld>
@@ -8306,7 +8448,7 @@
             <a:fld id="{59D4168E-E6F0-4E6D-9E98-0FBF44047F1D}" type="datetimeFigureOut">
               <a:rPr lang="es-AR" smtClean="0"/>
               <a:pPr/>
-              <a:t>28/11/2020</a:t>
+              <a:t>02/12/2020</a:t>
             </a:fld>
             <a:endParaRPr lang="es-AR"/>
           </a:p>
@@ -8358,7 +8500,7 @@
     </p:spTree>
     <p:extLst>
       <p:ext uri="{BB962C8B-B14F-4D97-AF65-F5344CB8AC3E}">
-        <p14:creationId xmlns:p14="http://schemas.microsoft.com/office/powerpoint/2010/main" val="3355991177"/>
+        <p14:creationId xmlns="" xmlns:p14="http://schemas.microsoft.com/office/powerpoint/2010/main" val="3355991177"/>
       </p:ext>
     </p:extLst>
   </p:cSld>
@@ -8403,7 +8545,7 @@
             <a:fld id="{59D4168E-E6F0-4E6D-9E98-0FBF44047F1D}" type="datetimeFigureOut">
               <a:rPr lang="es-AR" smtClean="0"/>
               <a:pPr/>
-              <a:t>28/11/2020</a:t>
+              <a:t>02/12/2020</a:t>
             </a:fld>
             <a:endParaRPr lang="es-AR"/>
           </a:p>
@@ -8455,7 +8597,7 @@
     </p:spTree>
     <p:extLst>
       <p:ext uri="{BB962C8B-B14F-4D97-AF65-F5344CB8AC3E}">
-        <p14:creationId xmlns:p14="http://schemas.microsoft.com/office/powerpoint/2010/main" val="2067178301"/>
+        <p14:creationId xmlns="" xmlns:p14="http://schemas.microsoft.com/office/powerpoint/2010/main" val="2067178301"/>
       </p:ext>
     </p:extLst>
   </p:cSld>
@@ -8688,7 +8830,7 @@
             <a:fld id="{59D4168E-E6F0-4E6D-9E98-0FBF44047F1D}" type="datetimeFigureOut">
               <a:rPr lang="es-AR" smtClean="0"/>
               <a:pPr/>
-              <a:t>28/11/2020</a:t>
+              <a:t>02/12/2020</a:t>
             </a:fld>
             <a:endParaRPr lang="es-AR"/>
           </a:p>
@@ -8740,7 +8882,7 @@
     </p:spTree>
     <p:extLst>
       <p:ext uri="{BB962C8B-B14F-4D97-AF65-F5344CB8AC3E}">
-        <p14:creationId xmlns:p14="http://schemas.microsoft.com/office/powerpoint/2010/main" val="1822716033"/>
+        <p14:creationId xmlns="" xmlns:p14="http://schemas.microsoft.com/office/powerpoint/2010/main" val="1822716033"/>
       </p:ext>
     </p:extLst>
   </p:cSld>
@@ -8981,7 +9123,7 @@
             <a:fld id="{59D4168E-E6F0-4E6D-9E98-0FBF44047F1D}" type="datetimeFigureOut">
               <a:rPr lang="es-AR" smtClean="0"/>
               <a:pPr/>
-              <a:t>28/11/2020</a:t>
+              <a:t>02/12/2020</a:t>
             </a:fld>
             <a:endParaRPr lang="es-AR"/>
           </a:p>
@@ -9033,7 +9175,7 @@
     </p:spTree>
     <p:extLst>
       <p:ext uri="{BB962C8B-B14F-4D97-AF65-F5344CB8AC3E}">
-        <p14:creationId xmlns:p14="http://schemas.microsoft.com/office/powerpoint/2010/main" val="2752311715"/>
+        <p14:creationId xmlns="" xmlns:p14="http://schemas.microsoft.com/office/powerpoint/2010/main" val="2752311715"/>
       </p:ext>
     </p:extLst>
   </p:cSld>
@@ -9513,7 +9655,7 @@
             <a:fld id="{59D4168E-E6F0-4E6D-9E98-0FBF44047F1D}" type="datetimeFigureOut">
               <a:rPr lang="es-AR" smtClean="0"/>
               <a:pPr/>
-              <a:t>28/11/2020</a:t>
+              <a:t>02/12/2020</a:t>
             </a:fld>
             <a:endParaRPr lang="es-AR"/>
           </a:p>
@@ -9601,7 +9743,7 @@
     </p:spTree>
     <p:extLst>
       <p:ext uri="{BB962C8B-B14F-4D97-AF65-F5344CB8AC3E}">
-        <p14:creationId xmlns:p14="http://schemas.microsoft.com/office/powerpoint/2010/main" val="761644953"/>
+        <p14:creationId xmlns="" xmlns:p14="http://schemas.microsoft.com/office/powerpoint/2010/main" val="761644953"/>
       </p:ext>
     </p:extLst>
   </p:cSld>
@@ -10050,7 +10192,7 @@
           <p:cNvPr id="2" name="Título 1">
             <a:extLst>
               <a:ext uri="{FF2B5EF4-FFF2-40B4-BE49-F238E27FC236}">
-                <a16:creationId xmlns:a16="http://schemas.microsoft.com/office/drawing/2014/main" id="{8CE1749D-25BE-4B8A-9C39-0568C1DB7176}"/>
+                <a16:creationId xmlns="" xmlns:a16="http://schemas.microsoft.com/office/drawing/2014/main" id="{8CE1749D-25BE-4B8A-9C39-0568C1DB7176}"/>
               </a:ext>
             </a:extLst>
           </p:cNvPr>
@@ -10085,7 +10227,7 @@
           <p:cNvPr id="5" name="Subtítulo 2">
             <a:extLst>
               <a:ext uri="{FF2B5EF4-FFF2-40B4-BE49-F238E27FC236}">
-                <a16:creationId xmlns:a16="http://schemas.microsoft.com/office/drawing/2014/main" id="{77C0998F-42B9-4F94-A4C5-FB800997D545}"/>
+                <a16:creationId xmlns="" xmlns:a16="http://schemas.microsoft.com/office/drawing/2014/main" id="{77C0998F-42B9-4F94-A4C5-FB800997D545}"/>
               </a:ext>
             </a:extLst>
           </p:cNvPr>
@@ -10122,7 +10264,7 @@
           <p:cNvPr id="3" name="CuadroTexto 2">
             <a:extLst>
               <a:ext uri="{FF2B5EF4-FFF2-40B4-BE49-F238E27FC236}">
-                <a16:creationId xmlns:a16="http://schemas.microsoft.com/office/drawing/2014/main" id="{EC53297C-9824-45B9-8927-A6834EB1DBD1}"/>
+                <a16:creationId xmlns="" xmlns:a16="http://schemas.microsoft.com/office/drawing/2014/main" id="{EC53297C-9824-45B9-8927-A6834EB1DBD1}"/>
               </a:ext>
             </a:extLst>
           </p:cNvPr>
@@ -10132,7 +10274,7 @@
         <p:spPr>
           <a:xfrm>
             <a:off x="4579316" y="2878419"/>
-            <a:ext cx="6036055" cy="1384995"/>
+            <a:ext cx="6036055" cy="2215991"/>
           </a:xfrm>
           <a:prstGeom prst="rect">
             <a:avLst/>
@@ -10149,11 +10291,31 @@
               <a:rPr lang="es-AR" sz="2400" dirty="0">
                 <a:latin typeface="Georgia" panose="02040502050405020303" pitchFamily="18" charset="0"/>
               </a:rPr>
-              <a:t>VASPA Team:</a:t>
-            </a:r>
+              <a:t>VASPA </a:t>
+            </a:r>
+            <a:r>
+              <a:rPr lang="es-AR" sz="2400" dirty="0" err="1">
+                <a:latin typeface="Georgia" panose="02040502050405020303" pitchFamily="18" charset="0"/>
+              </a:rPr>
+              <a:t>Team</a:t>
+            </a:r>
+            <a:r>
+              <a:rPr lang="es-AR" sz="2400" dirty="0" smtClean="0">
+                <a:latin typeface="Georgia" panose="02040502050405020303" pitchFamily="18" charset="0"/>
+              </a:rPr>
+              <a:t>:</a:t>
+            </a:r>
+          </a:p>
+          <a:p>
+            <a:endParaRPr lang="es-AR" sz="2400" dirty="0">
+              <a:latin typeface="Georgia" panose="02040502050405020303" pitchFamily="18" charset="0"/>
+            </a:endParaRPr>
           </a:p>
           <a:p>
             <a:pPr marL="285750" indent="-285750">
+              <a:lnSpc>
+                <a:spcPct val="150000"/>
+              </a:lnSpc>
               <a:buFont typeface="Arial" panose="020B0604020202020204" pitchFamily="34" charset="0"/>
               <a:buChar char="•"/>
             </a:pPr>
@@ -10166,6 +10328,9 @@
           </a:p>
           <a:p>
             <a:pPr marL="285750" indent="-285750">
+              <a:lnSpc>
+                <a:spcPct val="150000"/>
+              </a:lnSpc>
               <a:buFont typeface="Arial" panose="020B0604020202020204" pitchFamily="34" charset="0"/>
               <a:buChar char="•"/>
             </a:pPr>
@@ -10178,6 +10343,9 @@
           </a:p>
           <a:p>
             <a:pPr marL="285750" indent="-285750">
+              <a:lnSpc>
+                <a:spcPct val="150000"/>
+              </a:lnSpc>
               <a:buFont typeface="Arial" panose="020B0604020202020204" pitchFamily="34" charset="0"/>
               <a:buChar char="•"/>
             </a:pPr>
@@ -10195,7 +10363,7 @@
           <p:cNvPr id="6" name="Imagen 5">
             <a:extLst>
               <a:ext uri="{FF2B5EF4-FFF2-40B4-BE49-F238E27FC236}">
-                <a16:creationId xmlns:a16="http://schemas.microsoft.com/office/drawing/2014/main" id="{765DC11C-9D6D-4F31-9AC7-1EFE6E6D455C}"/>
+                <a16:creationId xmlns="" xmlns:a16="http://schemas.microsoft.com/office/drawing/2014/main" id="{765DC11C-9D6D-4F31-9AC7-1EFE6E6D455C}"/>
               </a:ext>
             </a:extLst>
           </p:cNvPr>
@@ -10208,7 +10376,7 @@
           <a:blip r:embed="rId2" cstate="print">
             <a:extLst>
               <a:ext uri="{28A0092B-C50C-407E-A947-70E740481C1C}">
-                <a14:useLocalDpi xmlns:a14="http://schemas.microsoft.com/office/drawing/2010/main" val="0"/>
+                <a14:useLocalDpi xmlns="" xmlns:a14="http://schemas.microsoft.com/office/drawing/2010/main" val="0"/>
               </a:ext>
             </a:extLst>
           </a:blip>
@@ -10229,13 +10397,20 @@
     </p:spTree>
     <p:extLst>
       <p:ext uri="{BB962C8B-B14F-4D97-AF65-F5344CB8AC3E}">
-        <p14:creationId xmlns:p14="http://schemas.microsoft.com/office/powerpoint/2010/main" val="2967959437"/>
+        <p14:creationId xmlns="" xmlns:p14="http://schemas.microsoft.com/office/powerpoint/2010/main" val="2967959437"/>
       </p:ext>
     </p:extLst>
   </p:cSld>
   <p:clrMapOvr>
     <a:masterClrMapping/>
   </p:clrMapOvr>
+  <p:timing>
+    <p:tnLst>
+      <p:par>
+        <p:cTn id="1" dur="indefinite" restart="never" nodeType="tmRoot"/>
+      </p:par>
+    </p:tnLst>
+  </p:timing>
 </p:sld>
 </file>
 
@@ -10261,7 +10436,7 @@
           <p:cNvPr id="2" name="Título 1">
             <a:extLst>
               <a:ext uri="{FF2B5EF4-FFF2-40B4-BE49-F238E27FC236}">
-                <a16:creationId xmlns:a16="http://schemas.microsoft.com/office/drawing/2014/main" id="{0ED6D180-92C1-4333-BA91-2BBA4DD94A3B}"/>
+                <a16:creationId xmlns="" xmlns:a16="http://schemas.microsoft.com/office/drawing/2014/main" id="{0ED6D180-92C1-4333-BA91-2BBA4DD94A3B}"/>
               </a:ext>
             </a:extLst>
           </p:cNvPr>
@@ -10298,7 +10473,7 @@
           <p:cNvPr id="3" name="CuadroTexto 2">
             <a:extLst>
               <a:ext uri="{FF2B5EF4-FFF2-40B4-BE49-F238E27FC236}">
-                <a16:creationId xmlns:a16="http://schemas.microsoft.com/office/drawing/2014/main" id="{E665F2E2-2B33-462D-9202-2EF114C0930E}"/>
+                <a16:creationId xmlns="" xmlns:a16="http://schemas.microsoft.com/office/drawing/2014/main" id="{E665F2E2-2B33-462D-9202-2EF114C0930E}"/>
               </a:ext>
             </a:extLst>
           </p:cNvPr>
@@ -10437,7 +10612,7 @@
     </p:spTree>
     <p:extLst>
       <p:ext uri="{BB962C8B-B14F-4D97-AF65-F5344CB8AC3E}">
-        <p14:creationId xmlns:p14="http://schemas.microsoft.com/office/powerpoint/2010/main" val="3543839896"/>
+        <p14:creationId xmlns="" xmlns:p14="http://schemas.microsoft.com/office/powerpoint/2010/main" val="3543839896"/>
       </p:ext>
     </p:extLst>
   </p:cSld>
@@ -10469,7 +10644,7 @@
           <p:cNvPr id="4" name="Rectángulo 3">
             <a:extLst>
               <a:ext uri="{FF2B5EF4-FFF2-40B4-BE49-F238E27FC236}">
-                <a16:creationId xmlns:a16="http://schemas.microsoft.com/office/drawing/2014/main" id="{B0F1B4F4-0C7A-4C0E-8584-95718BC545EC}"/>
+                <a16:creationId xmlns="" xmlns:a16="http://schemas.microsoft.com/office/drawing/2014/main" id="{B0F1B4F4-0C7A-4C0E-8584-95718BC545EC}"/>
               </a:ext>
             </a:extLst>
           </p:cNvPr>
@@ -10528,7 +10703,7 @@
     </p:spTree>
     <p:extLst>
       <p:ext uri="{BB962C8B-B14F-4D97-AF65-F5344CB8AC3E}">
-        <p14:creationId xmlns:p14="http://schemas.microsoft.com/office/powerpoint/2010/main" val="1715947005"/>
+        <p14:creationId xmlns="" xmlns:p14="http://schemas.microsoft.com/office/powerpoint/2010/main" val="1715947005"/>
       </p:ext>
     </p:extLst>
   </p:cSld>
@@ -10560,7 +10735,7 @@
           <p:cNvPr id="2" name="Título 1">
             <a:extLst>
               <a:ext uri="{FF2B5EF4-FFF2-40B4-BE49-F238E27FC236}">
-                <a16:creationId xmlns:a16="http://schemas.microsoft.com/office/drawing/2014/main" id="{0ED6D180-92C1-4333-BA91-2BBA4DD94A3B}"/>
+                <a16:creationId xmlns="" xmlns:a16="http://schemas.microsoft.com/office/drawing/2014/main" id="{0ED6D180-92C1-4333-BA91-2BBA4DD94A3B}"/>
               </a:ext>
             </a:extLst>
           </p:cNvPr>
@@ -10597,7 +10772,7 @@
           <p:cNvPr id="5" name="Diagrama 4">
             <a:extLst>
               <a:ext uri="{FF2B5EF4-FFF2-40B4-BE49-F238E27FC236}">
-                <a16:creationId xmlns:a16="http://schemas.microsoft.com/office/drawing/2014/main" id="{D29B3E67-509D-445E-9F92-4DFCE92BD789}"/>
+                <a16:creationId xmlns="" xmlns:a16="http://schemas.microsoft.com/office/drawing/2014/main" id="{D29B3E67-509D-445E-9F92-4DFCE92BD789}"/>
               </a:ext>
             </a:extLst>
           </p:cNvPr>
@@ -10605,7 +10780,7 @@
           <p:nvPr>
             <p:extLst>
               <p:ext uri="{D42A27DB-BD31-4B8C-83A1-F6EECF244321}">
-                <p14:modId xmlns:p14="http://schemas.microsoft.com/office/powerpoint/2010/main" val="573577508"/>
+                <p14:modId xmlns="" xmlns:p14="http://schemas.microsoft.com/office/powerpoint/2010/main" val="573577508"/>
               </p:ext>
             </p:extLst>
           </p:nvPr>
@@ -10625,7 +10800,7 @@
           <p:cNvPr id="7" name="CuadroTexto 6">
             <a:extLst>
               <a:ext uri="{FF2B5EF4-FFF2-40B4-BE49-F238E27FC236}">
-                <a16:creationId xmlns:a16="http://schemas.microsoft.com/office/drawing/2014/main" id="{EFF07B65-0D67-434E-9DAD-C6F8000B23BA}"/>
+                <a16:creationId xmlns="" xmlns:a16="http://schemas.microsoft.com/office/drawing/2014/main" id="{EFF07B65-0D67-434E-9DAD-C6F8000B23BA}"/>
               </a:ext>
             </a:extLst>
           </p:cNvPr>
@@ -10717,7 +10892,7 @@
           <p:cNvPr id="9" name="CuadroTexto 8">
             <a:extLst>
               <a:ext uri="{FF2B5EF4-FFF2-40B4-BE49-F238E27FC236}">
-                <a16:creationId xmlns:a16="http://schemas.microsoft.com/office/drawing/2014/main" id="{97CF3F33-5EF6-48E7-9958-F9C2744489F1}"/>
+                <a16:creationId xmlns="" xmlns:a16="http://schemas.microsoft.com/office/drawing/2014/main" id="{97CF3F33-5EF6-48E7-9958-F9C2744489F1}"/>
               </a:ext>
             </a:extLst>
           </p:cNvPr>
@@ -10760,7 +10935,7 @@
           <p:cNvPr id="11" name="CuadroTexto 10">
             <a:extLst>
               <a:ext uri="{FF2B5EF4-FFF2-40B4-BE49-F238E27FC236}">
-                <a16:creationId xmlns:a16="http://schemas.microsoft.com/office/drawing/2014/main" id="{CFB755FD-7818-4BD2-8DEB-A53F85894D7B}"/>
+                <a16:creationId xmlns="" xmlns:a16="http://schemas.microsoft.com/office/drawing/2014/main" id="{CFB755FD-7818-4BD2-8DEB-A53F85894D7B}"/>
               </a:ext>
             </a:extLst>
           </p:cNvPr>
@@ -10812,7 +10987,7 @@
           <p:cNvPr id="13" name="CuadroTexto 12">
             <a:extLst>
               <a:ext uri="{FF2B5EF4-FFF2-40B4-BE49-F238E27FC236}">
-                <a16:creationId xmlns:a16="http://schemas.microsoft.com/office/drawing/2014/main" id="{1DC2E036-AC7A-450A-BDD4-9A2A0F769C65}"/>
+                <a16:creationId xmlns="" xmlns:a16="http://schemas.microsoft.com/office/drawing/2014/main" id="{1DC2E036-AC7A-450A-BDD4-9A2A0F769C65}"/>
               </a:ext>
             </a:extLst>
           </p:cNvPr>
@@ -10855,7 +11030,7 @@
           <p:cNvPr id="15" name="CuadroTexto 14">
             <a:extLst>
               <a:ext uri="{FF2B5EF4-FFF2-40B4-BE49-F238E27FC236}">
-                <a16:creationId xmlns:a16="http://schemas.microsoft.com/office/drawing/2014/main" id="{6ECB2B3E-252C-4E7C-8FB7-1815D6E1E0A0}"/>
+                <a16:creationId xmlns="" xmlns:a16="http://schemas.microsoft.com/office/drawing/2014/main" id="{6ECB2B3E-252C-4E7C-8FB7-1815D6E1E0A0}"/>
               </a:ext>
             </a:extLst>
           </p:cNvPr>
@@ -10896,13 +11071,20 @@
     </p:spTree>
     <p:extLst>
       <p:ext uri="{BB962C8B-B14F-4D97-AF65-F5344CB8AC3E}">
-        <p14:creationId xmlns:p14="http://schemas.microsoft.com/office/powerpoint/2010/main" val="2198404308"/>
+        <p14:creationId xmlns="" xmlns:p14="http://schemas.microsoft.com/office/powerpoint/2010/main" val="2198404308"/>
       </p:ext>
     </p:extLst>
   </p:cSld>
   <p:clrMapOvr>
     <a:masterClrMapping/>
   </p:clrMapOvr>
+  <p:timing>
+    <p:tnLst>
+      <p:par>
+        <p:cTn id="1" dur="indefinite" restart="never" nodeType="tmRoot"/>
+      </p:par>
+    </p:tnLst>
+  </p:timing>
 </p:sld>
 </file>
 
@@ -10928,7 +11110,7 @@
           <p:cNvPr id="2" name="Título 1">
             <a:extLst>
               <a:ext uri="{FF2B5EF4-FFF2-40B4-BE49-F238E27FC236}">
-                <a16:creationId xmlns:a16="http://schemas.microsoft.com/office/drawing/2014/main" id="{0ED6D180-92C1-4333-BA91-2BBA4DD94A3B}"/>
+                <a16:creationId xmlns="" xmlns:a16="http://schemas.microsoft.com/office/drawing/2014/main" id="{0ED6D180-92C1-4333-BA91-2BBA4DD94A3B}"/>
               </a:ext>
             </a:extLst>
           </p:cNvPr>
@@ -10965,7 +11147,7 @@
           <p:cNvPr id="6" name="CuadroTexto 5">
             <a:extLst>
               <a:ext uri="{FF2B5EF4-FFF2-40B4-BE49-F238E27FC236}">
-                <a16:creationId xmlns:a16="http://schemas.microsoft.com/office/drawing/2014/main" id="{BC8D092D-6667-447D-B473-A50467138064}"/>
+                <a16:creationId xmlns="" xmlns:a16="http://schemas.microsoft.com/office/drawing/2014/main" id="{BC8D092D-6667-447D-B473-A50467138064}"/>
               </a:ext>
             </a:extLst>
           </p:cNvPr>
@@ -11154,13 +11336,20 @@
     </p:spTree>
     <p:extLst>
       <p:ext uri="{BB962C8B-B14F-4D97-AF65-F5344CB8AC3E}">
-        <p14:creationId xmlns:p14="http://schemas.microsoft.com/office/powerpoint/2010/main" val="435960141"/>
+        <p14:creationId xmlns="" xmlns:p14="http://schemas.microsoft.com/office/powerpoint/2010/main" val="435960141"/>
       </p:ext>
     </p:extLst>
   </p:cSld>
   <p:clrMapOvr>
     <a:masterClrMapping/>
   </p:clrMapOvr>
+  <p:timing>
+    <p:tnLst>
+      <p:par>
+        <p:cTn id="1" dur="indefinite" restart="never" nodeType="tmRoot"/>
+      </p:par>
+    </p:tnLst>
+  </p:timing>
 </p:sld>
 </file>
 
@@ -11186,7 +11375,7 @@
           <p:cNvPr id="2" name="Título 1">
             <a:extLst>
               <a:ext uri="{FF2B5EF4-FFF2-40B4-BE49-F238E27FC236}">
-                <a16:creationId xmlns:a16="http://schemas.microsoft.com/office/drawing/2014/main" id="{0ED6D180-92C1-4333-BA91-2BBA4DD94A3B}"/>
+                <a16:creationId xmlns="" xmlns:a16="http://schemas.microsoft.com/office/drawing/2014/main" id="{0ED6D180-92C1-4333-BA91-2BBA4DD94A3B}"/>
               </a:ext>
             </a:extLst>
           </p:cNvPr>
@@ -11223,7 +11412,7 @@
           <p:cNvPr id="4" name="CuadroTexto 3">
             <a:extLst>
               <a:ext uri="{FF2B5EF4-FFF2-40B4-BE49-F238E27FC236}">
-                <a16:creationId xmlns:a16="http://schemas.microsoft.com/office/drawing/2014/main" id="{8CA9892C-E43D-4950-A9DB-82D0909AEB99}"/>
+                <a16:creationId xmlns="" xmlns:a16="http://schemas.microsoft.com/office/drawing/2014/main" id="{8CA9892C-E43D-4950-A9DB-82D0909AEB99}"/>
               </a:ext>
             </a:extLst>
           </p:cNvPr>
@@ -11447,7 +11636,7 @@
           <p:cNvPr id="5" name="Imagen 4">
             <a:extLst>
               <a:ext uri="{FF2B5EF4-FFF2-40B4-BE49-F238E27FC236}">
-                <a16:creationId xmlns:a16="http://schemas.microsoft.com/office/drawing/2014/main" id="{8D68F66A-CBEF-48F6-ACAD-43B4CF6CA214}"/>
+                <a16:creationId xmlns="" xmlns:a16="http://schemas.microsoft.com/office/drawing/2014/main" id="{8D68F66A-CBEF-48F6-ACAD-43B4CF6CA214}"/>
               </a:ext>
             </a:extLst>
           </p:cNvPr>
@@ -11475,7 +11664,7 @@
     </p:spTree>
     <p:extLst>
       <p:ext uri="{BB962C8B-B14F-4D97-AF65-F5344CB8AC3E}">
-        <p14:creationId xmlns:p14="http://schemas.microsoft.com/office/powerpoint/2010/main" val="1725776676"/>
+        <p14:creationId xmlns="" xmlns:p14="http://schemas.microsoft.com/office/powerpoint/2010/main" val="1725776676"/>
       </p:ext>
     </p:extLst>
   </p:cSld>
@@ -11507,7 +11696,7 @@
           <p:cNvPr id="2" name="Título 1">
             <a:extLst>
               <a:ext uri="{FF2B5EF4-FFF2-40B4-BE49-F238E27FC236}">
-                <a16:creationId xmlns:a16="http://schemas.microsoft.com/office/drawing/2014/main" id="{0ED6D180-92C1-4333-BA91-2BBA4DD94A3B}"/>
+                <a16:creationId xmlns="" xmlns:a16="http://schemas.microsoft.com/office/drawing/2014/main" id="{0ED6D180-92C1-4333-BA91-2BBA4DD94A3B}"/>
               </a:ext>
             </a:extLst>
           </p:cNvPr>
@@ -11544,7 +11733,7 @@
           <p:cNvPr id="4" name="CuadroTexto 3">
             <a:extLst>
               <a:ext uri="{FF2B5EF4-FFF2-40B4-BE49-F238E27FC236}">
-                <a16:creationId xmlns:a16="http://schemas.microsoft.com/office/drawing/2014/main" id="{75A3151E-9801-4177-9D45-E0BCDCE47895}"/>
+                <a16:creationId xmlns="" xmlns:a16="http://schemas.microsoft.com/office/drawing/2014/main" id="{75A3151E-9801-4177-9D45-E0BCDCE47895}"/>
               </a:ext>
             </a:extLst>
           </p:cNvPr>
@@ -11723,7 +11912,7 @@
           <p:cNvPr id="3" name="Imagen 2">
             <a:extLst>
               <a:ext uri="{FF2B5EF4-FFF2-40B4-BE49-F238E27FC236}">
-                <a16:creationId xmlns:a16="http://schemas.microsoft.com/office/drawing/2014/main" id="{6739EDCA-90AA-497B-9BB2-9A681A92C9AE}"/>
+                <a16:creationId xmlns="" xmlns:a16="http://schemas.microsoft.com/office/drawing/2014/main" id="{6739EDCA-90AA-497B-9BB2-9A681A92C9AE}"/>
               </a:ext>
             </a:extLst>
           </p:cNvPr>
@@ -11753,7 +11942,7 @@
           <p:cNvPr id="7" name="Imagen 6">
             <a:extLst>
               <a:ext uri="{FF2B5EF4-FFF2-40B4-BE49-F238E27FC236}">
-                <a16:creationId xmlns:a16="http://schemas.microsoft.com/office/drawing/2014/main" id="{B60D751C-2D3B-4289-A03E-4A94D23B003E}"/>
+                <a16:creationId xmlns="" xmlns:a16="http://schemas.microsoft.com/office/drawing/2014/main" id="{B60D751C-2D3B-4289-A03E-4A94D23B003E}"/>
               </a:ext>
             </a:extLst>
           </p:cNvPr>
@@ -11766,7 +11955,7 @@
           <a:blip r:embed="rId3" cstate="print">
             <a:extLst>
               <a:ext uri="{28A0092B-C50C-407E-A947-70E740481C1C}">
-                <a14:useLocalDpi xmlns:a14="http://schemas.microsoft.com/office/drawing/2010/main" val="0"/>
+                <a14:useLocalDpi xmlns="" xmlns:a14="http://schemas.microsoft.com/office/drawing/2010/main" val="0"/>
               </a:ext>
             </a:extLst>
           </a:blip>
@@ -11787,7 +11976,7 @@
     </p:spTree>
     <p:extLst>
       <p:ext uri="{BB962C8B-B14F-4D97-AF65-F5344CB8AC3E}">
-        <p14:creationId xmlns:p14="http://schemas.microsoft.com/office/powerpoint/2010/main" val="1240761595"/>
+        <p14:creationId xmlns="" xmlns:p14="http://schemas.microsoft.com/office/powerpoint/2010/main" val="1240761595"/>
       </p:ext>
     </p:extLst>
   </p:cSld>
@@ -11819,7 +12008,7 @@
           <p:cNvPr id="2" name="Título 1">
             <a:extLst>
               <a:ext uri="{FF2B5EF4-FFF2-40B4-BE49-F238E27FC236}">
-                <a16:creationId xmlns:a16="http://schemas.microsoft.com/office/drawing/2014/main" id="{0ED6D180-92C1-4333-BA91-2BBA4DD94A3B}"/>
+                <a16:creationId xmlns="" xmlns:a16="http://schemas.microsoft.com/office/drawing/2014/main" id="{0ED6D180-92C1-4333-BA91-2BBA4DD94A3B}"/>
               </a:ext>
             </a:extLst>
           </p:cNvPr>
@@ -11856,7 +12045,7 @@
           <p:cNvPr id="6" name="CuadroTexto 5">
             <a:extLst>
               <a:ext uri="{FF2B5EF4-FFF2-40B4-BE49-F238E27FC236}">
-                <a16:creationId xmlns:a16="http://schemas.microsoft.com/office/drawing/2014/main" id="{F6D80EE5-216D-4845-9450-E702A6BBF160}"/>
+                <a16:creationId xmlns="" xmlns:a16="http://schemas.microsoft.com/office/drawing/2014/main" id="{F6D80EE5-216D-4845-9450-E702A6BBF160}"/>
               </a:ext>
             </a:extLst>
           </p:cNvPr>
@@ -12027,7 +12216,7 @@
     </p:spTree>
     <p:extLst>
       <p:ext uri="{BB962C8B-B14F-4D97-AF65-F5344CB8AC3E}">
-        <p14:creationId xmlns:p14="http://schemas.microsoft.com/office/powerpoint/2010/main" val="1139959922"/>
+        <p14:creationId xmlns="" xmlns:p14="http://schemas.microsoft.com/office/powerpoint/2010/main" val="1139959922"/>
       </p:ext>
     </p:extLst>
   </p:cSld>
@@ -12059,7 +12248,7 @@
           <p:cNvPr id="4" name="Rectángulo 3">
             <a:extLst>
               <a:ext uri="{FF2B5EF4-FFF2-40B4-BE49-F238E27FC236}">
-                <a16:creationId xmlns:a16="http://schemas.microsoft.com/office/drawing/2014/main" id="{B0F1B4F4-0C7A-4C0E-8584-95718BC545EC}"/>
+                <a16:creationId xmlns="" xmlns:a16="http://schemas.microsoft.com/office/drawing/2014/main" id="{B0F1B4F4-0C7A-4C0E-8584-95718BC545EC}"/>
               </a:ext>
             </a:extLst>
           </p:cNvPr>
@@ -12118,7 +12307,7 @@
     </p:spTree>
     <p:extLst>
       <p:ext uri="{BB962C8B-B14F-4D97-AF65-F5344CB8AC3E}">
-        <p14:creationId xmlns:p14="http://schemas.microsoft.com/office/powerpoint/2010/main" val="3874587205"/>
+        <p14:creationId xmlns="" xmlns:p14="http://schemas.microsoft.com/office/powerpoint/2010/main" val="3874587205"/>
       </p:ext>
     </p:extLst>
   </p:cSld>
@@ -12150,7 +12339,7 @@
           <p:cNvPr id="4" name="Rectángulo 3">
             <a:extLst>
               <a:ext uri="{FF2B5EF4-FFF2-40B4-BE49-F238E27FC236}">
-                <a16:creationId xmlns:a16="http://schemas.microsoft.com/office/drawing/2014/main" id="{B0F1B4F4-0C7A-4C0E-8584-95718BC545EC}"/>
+                <a16:creationId xmlns="" xmlns:a16="http://schemas.microsoft.com/office/drawing/2014/main" id="{B0F1B4F4-0C7A-4C0E-8584-95718BC545EC}"/>
               </a:ext>
             </a:extLst>
           </p:cNvPr>
@@ -12196,7 +12385,7 @@
     </p:spTree>
     <p:extLst>
       <p:ext uri="{BB962C8B-B14F-4D97-AF65-F5344CB8AC3E}">
-        <p14:creationId xmlns:p14="http://schemas.microsoft.com/office/powerpoint/2010/main" val="4258438740"/>
+        <p14:creationId xmlns="" xmlns:p14="http://schemas.microsoft.com/office/powerpoint/2010/main" val="4258438740"/>
       </p:ext>
     </p:extLst>
   </p:cSld>
@@ -12228,7 +12417,7 @@
           <p:cNvPr id="4" name="Gráfico 3">
             <a:extLst>
               <a:ext uri="{FF2B5EF4-FFF2-40B4-BE49-F238E27FC236}">
-                <a16:creationId xmlns:a16="http://schemas.microsoft.com/office/drawing/2014/main" id="{AEDE60AA-37AA-4383-BA26-5EA432BE4F35}"/>
+                <a16:creationId xmlns="" xmlns:a16="http://schemas.microsoft.com/office/drawing/2014/main" id="{AEDE60AA-37AA-4383-BA26-5EA432BE4F35}"/>
               </a:ext>
             </a:extLst>
           </p:cNvPr>
@@ -12236,7 +12425,7 @@
           <p:nvPr>
             <p:extLst>
               <p:ext uri="{D42A27DB-BD31-4B8C-83A1-F6EECF244321}">
-                <p14:modId xmlns:p14="http://schemas.microsoft.com/office/powerpoint/2010/main" val="171994633"/>
+                <p14:modId xmlns="" xmlns:p14="http://schemas.microsoft.com/office/powerpoint/2010/main" val="171994633"/>
               </p:ext>
             </p:extLst>
           </p:nvPr>
@@ -12256,7 +12445,7 @@
           <p:cNvPr id="3" name="CuadroTexto 2">
             <a:extLst>
               <a:ext uri="{FF2B5EF4-FFF2-40B4-BE49-F238E27FC236}">
-                <a16:creationId xmlns:a16="http://schemas.microsoft.com/office/drawing/2014/main" id="{29B4C296-372F-455A-BE5A-B512322B8EDE}"/>
+                <a16:creationId xmlns="" xmlns:a16="http://schemas.microsoft.com/office/drawing/2014/main" id="{29B4C296-372F-455A-BE5A-B512322B8EDE}"/>
               </a:ext>
             </a:extLst>
           </p:cNvPr>
@@ -12290,7 +12479,7 @@
     </p:spTree>
     <p:extLst>
       <p:ext uri="{BB962C8B-B14F-4D97-AF65-F5344CB8AC3E}">
-        <p14:creationId xmlns:p14="http://schemas.microsoft.com/office/powerpoint/2010/main" val="3883774572"/>
+        <p14:creationId xmlns="" xmlns:p14="http://schemas.microsoft.com/office/powerpoint/2010/main" val="3883774572"/>
       </p:ext>
     </p:extLst>
   </p:cSld>
@@ -12322,7 +12511,7 @@
           <p:cNvPr id="4" name="Título 3">
             <a:extLst>
               <a:ext uri="{FF2B5EF4-FFF2-40B4-BE49-F238E27FC236}">
-                <a16:creationId xmlns:a16="http://schemas.microsoft.com/office/drawing/2014/main" id="{FA4EADB5-92CE-4B25-BE21-7FC484AE680E}"/>
+                <a16:creationId xmlns="" xmlns:a16="http://schemas.microsoft.com/office/drawing/2014/main" id="{FA4EADB5-92CE-4B25-BE21-7FC484AE680E}"/>
               </a:ext>
             </a:extLst>
           </p:cNvPr>
@@ -12360,7 +12549,7 @@
           <p:cNvPr id="5" name="Subtítulo 4">
             <a:extLst>
               <a:ext uri="{FF2B5EF4-FFF2-40B4-BE49-F238E27FC236}">
-                <a16:creationId xmlns:a16="http://schemas.microsoft.com/office/drawing/2014/main" id="{7035CB29-6D24-4E02-AC9F-07DC0DE9312C}"/>
+                <a16:creationId xmlns="" xmlns:a16="http://schemas.microsoft.com/office/drawing/2014/main" id="{7035CB29-6D24-4E02-AC9F-07DC0DE9312C}"/>
               </a:ext>
             </a:extLst>
           </p:cNvPr>
@@ -12516,13 +12705,20 @@
     </p:spTree>
     <p:extLst>
       <p:ext uri="{BB962C8B-B14F-4D97-AF65-F5344CB8AC3E}">
-        <p14:creationId xmlns:p14="http://schemas.microsoft.com/office/powerpoint/2010/main" val="503208862"/>
+        <p14:creationId xmlns="" xmlns:p14="http://schemas.microsoft.com/office/powerpoint/2010/main" val="503208862"/>
       </p:ext>
     </p:extLst>
   </p:cSld>
   <p:clrMapOvr>
     <a:masterClrMapping/>
   </p:clrMapOvr>
+  <p:timing>
+    <p:tnLst>
+      <p:par>
+        <p:cTn id="1" dur="indefinite" restart="never" nodeType="tmRoot"/>
+      </p:par>
+    </p:tnLst>
+  </p:timing>
 </p:sld>
 </file>
 
@@ -12548,7 +12744,7 @@
           <p:cNvPr id="4" name="Rectángulo 3">
             <a:extLst>
               <a:ext uri="{FF2B5EF4-FFF2-40B4-BE49-F238E27FC236}">
-                <a16:creationId xmlns:a16="http://schemas.microsoft.com/office/drawing/2014/main" id="{B0F1B4F4-0C7A-4C0E-8584-95718BC545EC}"/>
+                <a16:creationId xmlns="" xmlns:a16="http://schemas.microsoft.com/office/drawing/2014/main" id="{B0F1B4F4-0C7A-4C0E-8584-95718BC545EC}"/>
               </a:ext>
             </a:extLst>
           </p:cNvPr>
@@ -12594,7 +12790,7 @@
     </p:spTree>
     <p:extLst>
       <p:ext uri="{BB962C8B-B14F-4D97-AF65-F5344CB8AC3E}">
-        <p14:creationId xmlns:p14="http://schemas.microsoft.com/office/powerpoint/2010/main" val="4003469650"/>
+        <p14:creationId xmlns="" xmlns:p14="http://schemas.microsoft.com/office/powerpoint/2010/main" val="4003469650"/>
       </p:ext>
     </p:extLst>
   </p:cSld>
@@ -12626,7 +12822,7 @@
           <p:cNvPr id="2" name="Título 1">
             <a:extLst>
               <a:ext uri="{FF2B5EF4-FFF2-40B4-BE49-F238E27FC236}">
-                <a16:creationId xmlns:a16="http://schemas.microsoft.com/office/drawing/2014/main" id="{0ED6D180-92C1-4333-BA91-2BBA4DD94A3B}"/>
+                <a16:creationId xmlns="" xmlns:a16="http://schemas.microsoft.com/office/drawing/2014/main" id="{0ED6D180-92C1-4333-BA91-2BBA4DD94A3B}"/>
               </a:ext>
             </a:extLst>
           </p:cNvPr>
@@ -12685,7 +12881,7 @@
     </p:spTree>
     <p:extLst>
       <p:ext uri="{BB962C8B-B14F-4D97-AF65-F5344CB8AC3E}">
-        <p14:creationId xmlns:p14="http://schemas.microsoft.com/office/powerpoint/2010/main" val="2470537140"/>
+        <p14:creationId xmlns="" xmlns:p14="http://schemas.microsoft.com/office/powerpoint/2010/main" val="2470537140"/>
       </p:ext>
     </p:extLst>
   </p:cSld>
@@ -12717,7 +12913,7 @@
           <p:cNvPr id="2" name="Título 1">
             <a:extLst>
               <a:ext uri="{FF2B5EF4-FFF2-40B4-BE49-F238E27FC236}">
-                <a16:creationId xmlns:a16="http://schemas.microsoft.com/office/drawing/2014/main" id="{0ED6D180-92C1-4333-BA91-2BBA4DD94A3B}"/>
+                <a16:creationId xmlns="" xmlns:a16="http://schemas.microsoft.com/office/drawing/2014/main" id="{0ED6D180-92C1-4333-BA91-2BBA4DD94A3B}"/>
               </a:ext>
             </a:extLst>
           </p:cNvPr>
@@ -12776,7 +12972,7 @@
     </p:spTree>
     <p:extLst>
       <p:ext uri="{BB962C8B-B14F-4D97-AF65-F5344CB8AC3E}">
-        <p14:creationId xmlns:p14="http://schemas.microsoft.com/office/powerpoint/2010/main" val="3950036555"/>
+        <p14:creationId xmlns="" xmlns:p14="http://schemas.microsoft.com/office/powerpoint/2010/main" val="3950036555"/>
       </p:ext>
     </p:extLst>
   </p:cSld>
@@ -12808,7 +13004,7 @@
           <p:cNvPr id="2" name="Título 1">
             <a:extLst>
               <a:ext uri="{FF2B5EF4-FFF2-40B4-BE49-F238E27FC236}">
-                <a16:creationId xmlns:a16="http://schemas.microsoft.com/office/drawing/2014/main" id="{0ED6D180-92C1-4333-BA91-2BBA4DD94A3B}"/>
+                <a16:creationId xmlns="" xmlns:a16="http://schemas.microsoft.com/office/drawing/2014/main" id="{0ED6D180-92C1-4333-BA91-2BBA4DD94A3B}"/>
               </a:ext>
             </a:extLst>
           </p:cNvPr>
@@ -12867,7 +13063,7 @@
     </p:spTree>
     <p:extLst>
       <p:ext uri="{BB962C8B-B14F-4D97-AF65-F5344CB8AC3E}">
-        <p14:creationId xmlns:p14="http://schemas.microsoft.com/office/powerpoint/2010/main" val="3027958132"/>
+        <p14:creationId xmlns="" xmlns:p14="http://schemas.microsoft.com/office/powerpoint/2010/main" val="3027958132"/>
       </p:ext>
     </p:extLst>
   </p:cSld>
@@ -12899,7 +13095,7 @@
           <p:cNvPr id="4" name="Rectángulo 3">
             <a:extLst>
               <a:ext uri="{FF2B5EF4-FFF2-40B4-BE49-F238E27FC236}">
-                <a16:creationId xmlns:a16="http://schemas.microsoft.com/office/drawing/2014/main" id="{B0F1B4F4-0C7A-4C0E-8584-95718BC545EC}"/>
+                <a16:creationId xmlns="" xmlns:a16="http://schemas.microsoft.com/office/drawing/2014/main" id="{B0F1B4F4-0C7A-4C0E-8584-95718BC545EC}"/>
               </a:ext>
             </a:extLst>
           </p:cNvPr>
@@ -12945,7 +13141,7 @@
     </p:spTree>
     <p:extLst>
       <p:ext uri="{BB962C8B-B14F-4D97-AF65-F5344CB8AC3E}">
-        <p14:creationId xmlns:p14="http://schemas.microsoft.com/office/powerpoint/2010/main" val="2803738474"/>
+        <p14:creationId xmlns="" xmlns:p14="http://schemas.microsoft.com/office/powerpoint/2010/main" val="2803738474"/>
       </p:ext>
     </p:extLst>
   </p:cSld>
@@ -12972,42 +13168,829 @@
           <a:chExt cx="0" cy="0"/>
         </a:xfrm>
       </p:grpSpPr>
-      <p:pic>
-        <p:nvPicPr>
-          <p:cNvPr id="1026" name="Picture 2" descr="C:\Users\Usuario\Desktop\PRESENTACION FINAL - LDS\Flujo Pruebas.png"/>
-          <p:cNvPicPr>
-            <a:picLocks noChangeAspect="1" noChangeArrowheads="1"/>
-          </p:cNvPicPr>
+      <p:sp>
+        <p:nvSpPr>
+          <p:cNvPr id="3" name="2 Rectángulo redondeado"/>
+          <p:cNvSpPr/>
           <p:nvPr/>
-        </p:nvPicPr>
-        <p:blipFill>
-          <a:blip r:embed="rId2" cstate="print"/>
-          <a:srcRect/>
-          <a:stretch>
-            <a:fillRect/>
-          </a:stretch>
-        </p:blipFill>
-        <p:spPr bwMode="auto">
+        </p:nvSpPr>
+        <p:spPr>
           <a:xfrm>
-            <a:off x="0" y="0"/>
-            <a:ext cx="12192000" cy="6858000"/>
+            <a:off x="2897944" y="1617785"/>
+            <a:ext cx="1997611" cy="576775"/>
+          </a:xfrm>
+          <a:prstGeom prst="roundRect">
+            <a:avLst/>
+          </a:prstGeom>
+        </p:spPr>
+        <p:style>
+          <a:lnRef idx="0">
+            <a:schemeClr val="accent3"/>
+          </a:lnRef>
+          <a:fillRef idx="3">
+            <a:schemeClr val="accent3"/>
+          </a:fillRef>
+          <a:effectRef idx="3">
+            <a:schemeClr val="accent3"/>
+          </a:effectRef>
+          <a:fontRef idx="minor">
+            <a:schemeClr val="lt1"/>
+          </a:fontRef>
+        </p:style>
+        <p:txBody>
+          <a:bodyPr rtlCol="0" anchor="ctr"/>
+          <a:lstStyle/>
+          <a:p>
+            <a:pPr algn="ctr"/>
+            <a:r>
+              <a:rPr lang="es-AR" dirty="0" smtClean="0"/>
+              <a:t>Plan de Pruebas</a:t>
+            </a:r>
+            <a:endParaRPr lang="es-AR" dirty="0"/>
+          </a:p>
+        </p:txBody>
+      </p:sp>
+      <p:sp>
+        <p:nvSpPr>
+          <p:cNvPr id="4" name="3 Rectángulo redondeado"/>
+          <p:cNvSpPr/>
+          <p:nvPr/>
+        </p:nvSpPr>
+        <p:spPr>
+          <a:xfrm>
+            <a:off x="3008141" y="3810001"/>
+            <a:ext cx="1999957" cy="576775"/>
+          </a:xfrm>
+          <a:prstGeom prst="roundRect">
+            <a:avLst/>
+          </a:prstGeom>
+          <a:solidFill>
+            <a:srgbClr val="FF0000"/>
+          </a:solidFill>
+        </p:spPr>
+        <p:style>
+          <a:lnRef idx="2">
+            <a:schemeClr val="accent1">
+              <a:shade val="50000"/>
+            </a:schemeClr>
+          </a:lnRef>
+          <a:fillRef idx="1">
+            <a:schemeClr val="accent1"/>
+          </a:fillRef>
+          <a:effectRef idx="0">
+            <a:schemeClr val="accent1"/>
+          </a:effectRef>
+          <a:fontRef idx="minor">
+            <a:schemeClr val="lt1"/>
+          </a:fontRef>
+        </p:style>
+        <p:txBody>
+          <a:bodyPr rtlCol="0" anchor="ctr"/>
+          <a:lstStyle/>
+          <a:p>
+            <a:pPr algn="ctr"/>
+            <a:r>
+              <a:rPr lang="es-AR" dirty="0" smtClean="0"/>
+              <a:t>CU Desaprobado</a:t>
+            </a:r>
+            <a:endParaRPr lang="es-AR" dirty="0"/>
+          </a:p>
+        </p:txBody>
+      </p:sp>
+      <p:sp>
+        <p:nvSpPr>
+          <p:cNvPr id="5" name="4 Rectángulo redondeado"/>
+          <p:cNvSpPr/>
+          <p:nvPr/>
+        </p:nvSpPr>
+        <p:spPr>
+          <a:xfrm>
+            <a:off x="2808849" y="5242560"/>
+            <a:ext cx="2368061" cy="576775"/>
+          </a:xfrm>
+          <a:prstGeom prst="roundRect">
+            <a:avLst/>
+          </a:prstGeom>
+        </p:spPr>
+        <p:style>
+          <a:lnRef idx="0">
+            <a:schemeClr val="accent3"/>
+          </a:lnRef>
+          <a:fillRef idx="3">
+            <a:schemeClr val="accent3"/>
+          </a:fillRef>
+          <a:effectRef idx="3">
+            <a:schemeClr val="accent3"/>
+          </a:effectRef>
+          <a:fontRef idx="minor">
+            <a:schemeClr val="lt1"/>
+          </a:fontRef>
+        </p:style>
+        <p:txBody>
+          <a:bodyPr rtlCol="0" anchor="ctr"/>
+          <a:lstStyle/>
+          <a:p>
+            <a:pPr algn="ctr"/>
+            <a:r>
+              <a:rPr lang="es-AR" dirty="0" smtClean="0"/>
+              <a:t>Pruebas de Regresión</a:t>
+            </a:r>
+            <a:endParaRPr lang="es-AR" dirty="0"/>
+          </a:p>
+        </p:txBody>
+      </p:sp>
+      <p:sp>
+        <p:nvSpPr>
+          <p:cNvPr id="6" name="5 Rectángulo redondeado"/>
+          <p:cNvSpPr/>
+          <p:nvPr/>
+        </p:nvSpPr>
+        <p:spPr>
+          <a:xfrm>
+            <a:off x="8785274" y="5198013"/>
+            <a:ext cx="1765496" cy="576775"/>
+          </a:xfrm>
+          <a:prstGeom prst="roundRect">
+            <a:avLst/>
+          </a:prstGeom>
+          <a:solidFill>
+            <a:srgbClr val="00B050"/>
+          </a:solidFill>
+        </p:spPr>
+        <p:style>
+          <a:lnRef idx="0">
+            <a:schemeClr val="accent5"/>
+          </a:lnRef>
+          <a:fillRef idx="3">
+            <a:schemeClr val="accent5"/>
+          </a:fillRef>
+          <a:effectRef idx="3">
+            <a:schemeClr val="accent5"/>
+          </a:effectRef>
+          <a:fontRef idx="minor">
+            <a:schemeClr val="lt1"/>
+          </a:fontRef>
+        </p:style>
+        <p:txBody>
+          <a:bodyPr rtlCol="0" anchor="ctr"/>
+          <a:lstStyle/>
+          <a:p>
+            <a:pPr algn="ctr"/>
+            <a:r>
+              <a:rPr lang="es-AR" dirty="0" smtClean="0"/>
+              <a:t>CU Aprobado</a:t>
+            </a:r>
+            <a:endParaRPr lang="es-AR" dirty="0"/>
+          </a:p>
+        </p:txBody>
+      </p:sp>
+      <p:sp>
+        <p:nvSpPr>
+          <p:cNvPr id="7" name="6 Rectángulo redondeado"/>
+          <p:cNvSpPr/>
+          <p:nvPr/>
+        </p:nvSpPr>
+        <p:spPr>
+          <a:xfrm>
+            <a:off x="6503962" y="2846364"/>
+            <a:ext cx="1852247" cy="576775"/>
+          </a:xfrm>
+          <a:prstGeom prst="roundRect">
+            <a:avLst/>
+          </a:prstGeom>
+        </p:spPr>
+        <p:style>
+          <a:lnRef idx="0">
+            <a:schemeClr val="accent3"/>
+          </a:lnRef>
+          <a:fillRef idx="3">
+            <a:schemeClr val="accent3"/>
+          </a:fillRef>
+          <a:effectRef idx="3">
+            <a:schemeClr val="accent3"/>
+          </a:effectRef>
+          <a:fontRef idx="minor">
+            <a:schemeClr val="lt1"/>
+          </a:fontRef>
+        </p:style>
+        <p:txBody>
+          <a:bodyPr rtlCol="0" anchor="ctr"/>
+          <a:lstStyle/>
+          <a:p>
+            <a:pPr algn="ctr"/>
+            <a:r>
+              <a:rPr lang="es-AR" dirty="0" smtClean="0"/>
+              <a:t>Pruebas Iniciales</a:t>
+            </a:r>
+            <a:endParaRPr lang="es-AR" dirty="0"/>
+          </a:p>
+        </p:txBody>
+      </p:sp>
+      <p:sp>
+        <p:nvSpPr>
+          <p:cNvPr id="8" name="7 Rectángulo redondeado"/>
+          <p:cNvSpPr/>
+          <p:nvPr/>
+        </p:nvSpPr>
+        <p:spPr>
+          <a:xfrm>
+            <a:off x="6529753" y="1606062"/>
+            <a:ext cx="1812389" cy="576775"/>
+          </a:xfrm>
+          <a:prstGeom prst="roundRect">
+            <a:avLst/>
+          </a:prstGeom>
+        </p:spPr>
+        <p:style>
+          <a:lnRef idx="0">
+            <a:schemeClr val="accent3"/>
+          </a:lnRef>
+          <a:fillRef idx="3">
+            <a:schemeClr val="accent3"/>
+          </a:fillRef>
+          <a:effectRef idx="3">
+            <a:schemeClr val="accent3"/>
+          </a:effectRef>
+          <a:fontRef idx="minor">
+            <a:schemeClr val="lt1"/>
+          </a:fontRef>
+        </p:style>
+        <p:txBody>
+          <a:bodyPr rtlCol="0" anchor="ctr"/>
+          <a:lstStyle/>
+          <a:p>
+            <a:pPr algn="ctr"/>
+            <a:r>
+              <a:rPr lang="es-AR" dirty="0" smtClean="0"/>
+              <a:t>Casos de Prueba</a:t>
+            </a:r>
+            <a:endParaRPr lang="es-AR" dirty="0"/>
+          </a:p>
+        </p:txBody>
+      </p:sp>
+      <p:cxnSp>
+        <p:nvCxnSpPr>
+          <p:cNvPr id="10" name="9 Conector recto de flecha"/>
+          <p:cNvCxnSpPr>
+            <a:stCxn id="3" idx="3"/>
+          </p:cNvCxnSpPr>
+          <p:nvPr/>
+        </p:nvCxnSpPr>
+        <p:spPr>
+          <a:xfrm>
+            <a:off x="4895555" y="1906173"/>
+            <a:ext cx="1645922" cy="7033"/>
+          </a:xfrm>
+          <a:prstGeom prst="straightConnector1">
+            <a:avLst/>
+          </a:prstGeom>
+          <a:ln>
+            <a:tailEnd type="arrow"/>
+          </a:ln>
+        </p:spPr>
+        <p:style>
+          <a:lnRef idx="3">
+            <a:schemeClr val="dk1"/>
+          </a:lnRef>
+          <a:fillRef idx="0">
+            <a:schemeClr val="dk1"/>
+          </a:fillRef>
+          <a:effectRef idx="2">
+            <a:schemeClr val="dk1"/>
+          </a:effectRef>
+          <a:fontRef idx="minor">
+            <a:schemeClr val="tx1"/>
+          </a:fontRef>
+        </p:style>
+      </p:cxnSp>
+      <p:sp>
+        <p:nvSpPr>
+          <p:cNvPr id="12" name="11 CuadroTexto"/>
+          <p:cNvSpPr txBox="1"/>
+          <p:nvPr/>
+        </p:nvSpPr>
+        <p:spPr>
+          <a:xfrm>
+            <a:off x="5050302" y="1561514"/>
+            <a:ext cx="1448972" cy="369332"/>
           </a:xfrm>
           <a:prstGeom prst="rect">
             <a:avLst/>
           </a:prstGeom>
           <a:noFill/>
         </p:spPr>
-      </p:pic>
+        <p:txBody>
+          <a:bodyPr wrap="square" rtlCol="0">
+            <a:spAutoFit/>
+          </a:bodyPr>
+          <a:lstStyle/>
+          <a:p>
+            <a:r>
+              <a:rPr lang="es-AR" dirty="0" smtClean="0"/>
+              <a:t>Elaboración</a:t>
+            </a:r>
+            <a:endParaRPr lang="es-AR" dirty="0"/>
+          </a:p>
+        </p:txBody>
+      </p:sp>
+      <p:cxnSp>
+        <p:nvCxnSpPr>
+          <p:cNvPr id="17" name="16 Conector recto de flecha"/>
+          <p:cNvCxnSpPr>
+            <a:stCxn id="8" idx="2"/>
+          </p:cNvCxnSpPr>
+          <p:nvPr/>
+        </p:nvCxnSpPr>
+        <p:spPr>
+          <a:xfrm>
+            <a:off x="7435948" y="2182837"/>
+            <a:ext cx="5861" cy="658837"/>
+          </a:xfrm>
+          <a:prstGeom prst="straightConnector1">
+            <a:avLst/>
+          </a:prstGeom>
+          <a:ln>
+            <a:tailEnd type="arrow"/>
+          </a:ln>
+        </p:spPr>
+        <p:style>
+          <a:lnRef idx="3">
+            <a:schemeClr val="dk1"/>
+          </a:lnRef>
+          <a:fillRef idx="0">
+            <a:schemeClr val="dk1"/>
+          </a:fillRef>
+          <a:effectRef idx="2">
+            <a:schemeClr val="dk1"/>
+          </a:effectRef>
+          <a:fontRef idx="minor">
+            <a:schemeClr val="tx1"/>
+          </a:fontRef>
+        </p:style>
+      </p:cxnSp>
+      <p:sp>
+        <p:nvSpPr>
+          <p:cNvPr id="18" name="17 CuadroTexto"/>
+          <p:cNvSpPr txBox="1"/>
+          <p:nvPr/>
+        </p:nvSpPr>
+        <p:spPr>
+          <a:xfrm>
+            <a:off x="7469945" y="2293034"/>
+            <a:ext cx="1547446" cy="369332"/>
+          </a:xfrm>
+          <a:prstGeom prst="rect">
+            <a:avLst/>
+          </a:prstGeom>
+          <a:noFill/>
+        </p:spPr>
+        <p:txBody>
+          <a:bodyPr wrap="square" rtlCol="0">
+            <a:spAutoFit/>
+          </a:bodyPr>
+          <a:lstStyle/>
+          <a:p>
+            <a:r>
+              <a:rPr lang="es-AR" dirty="0" smtClean="0"/>
+              <a:t>Realización</a:t>
+            </a:r>
+            <a:endParaRPr lang="es-AR" dirty="0"/>
+          </a:p>
+        </p:txBody>
+      </p:sp>
+      <p:cxnSp>
+        <p:nvCxnSpPr>
+          <p:cNvPr id="25" name="24 Conector recto"/>
+          <p:cNvCxnSpPr>
+            <a:stCxn id="7" idx="1"/>
+          </p:cNvCxnSpPr>
+          <p:nvPr/>
+        </p:nvCxnSpPr>
+        <p:spPr>
+          <a:xfrm flipH="1">
+            <a:off x="4079631" y="3134752"/>
+            <a:ext cx="2424331" cy="2343"/>
+          </a:xfrm>
+          <a:prstGeom prst="line">
+            <a:avLst/>
+          </a:prstGeom>
+        </p:spPr>
+        <p:style>
+          <a:lnRef idx="3">
+            <a:schemeClr val="dk1"/>
+          </a:lnRef>
+          <a:fillRef idx="0">
+            <a:schemeClr val="dk1"/>
+          </a:fillRef>
+          <a:effectRef idx="2">
+            <a:schemeClr val="dk1"/>
+          </a:effectRef>
+          <a:fontRef idx="minor">
+            <a:schemeClr val="tx1"/>
+          </a:fontRef>
+        </p:style>
+      </p:cxnSp>
+      <p:cxnSp>
+        <p:nvCxnSpPr>
+          <p:cNvPr id="48" name="47 Conector recto de flecha"/>
+          <p:cNvCxnSpPr>
+            <a:endCxn id="4" idx="1"/>
+          </p:cNvCxnSpPr>
+          <p:nvPr/>
+        </p:nvCxnSpPr>
+        <p:spPr>
+          <a:xfrm>
+            <a:off x="2447778" y="4093698"/>
+            <a:ext cx="560363" cy="4691"/>
+          </a:xfrm>
+          <a:prstGeom prst="straightConnector1">
+            <a:avLst/>
+          </a:prstGeom>
+          <a:ln>
+            <a:tailEnd type="arrow"/>
+          </a:ln>
+        </p:spPr>
+        <p:style>
+          <a:lnRef idx="3">
+            <a:schemeClr val="dk1"/>
+          </a:lnRef>
+          <a:fillRef idx="0">
+            <a:schemeClr val="dk1"/>
+          </a:fillRef>
+          <a:effectRef idx="2">
+            <a:schemeClr val="dk1"/>
+          </a:effectRef>
+          <a:fontRef idx="minor">
+            <a:schemeClr val="tx1"/>
+          </a:fontRef>
+        </p:style>
+      </p:cxnSp>
+      <p:cxnSp>
+        <p:nvCxnSpPr>
+          <p:cNvPr id="49" name="48 Conector recto de flecha"/>
+          <p:cNvCxnSpPr/>
+          <p:nvPr/>
+        </p:nvCxnSpPr>
+        <p:spPr>
+          <a:xfrm>
+            <a:off x="4085493" y="3151163"/>
+            <a:ext cx="5861" cy="658837"/>
+          </a:xfrm>
+          <a:prstGeom prst="straightConnector1">
+            <a:avLst/>
+          </a:prstGeom>
+          <a:ln>
+            <a:tailEnd type="arrow"/>
+          </a:ln>
+        </p:spPr>
+        <p:style>
+          <a:lnRef idx="3">
+            <a:schemeClr val="dk1"/>
+          </a:lnRef>
+          <a:fillRef idx="0">
+            <a:schemeClr val="dk1"/>
+          </a:fillRef>
+          <a:effectRef idx="2">
+            <a:schemeClr val="dk1"/>
+          </a:effectRef>
+          <a:fontRef idx="minor">
+            <a:schemeClr val="tx1"/>
+          </a:fontRef>
+        </p:style>
+      </p:cxnSp>
+      <p:cxnSp>
+        <p:nvCxnSpPr>
+          <p:cNvPr id="51" name="50 Conector recto"/>
+          <p:cNvCxnSpPr>
+            <a:stCxn id="7" idx="3"/>
+          </p:cNvCxnSpPr>
+          <p:nvPr/>
+        </p:nvCxnSpPr>
+        <p:spPr>
+          <a:xfrm>
+            <a:off x="8356209" y="3134752"/>
+            <a:ext cx="1223889" cy="2343"/>
+          </a:xfrm>
+          <a:prstGeom prst="line">
+            <a:avLst/>
+          </a:prstGeom>
+        </p:spPr>
+        <p:style>
+          <a:lnRef idx="3">
+            <a:schemeClr val="dk1"/>
+          </a:lnRef>
+          <a:fillRef idx="0">
+            <a:schemeClr val="dk1"/>
+          </a:fillRef>
+          <a:effectRef idx="2">
+            <a:schemeClr val="dk1"/>
+          </a:effectRef>
+          <a:fontRef idx="minor">
+            <a:schemeClr val="tx1"/>
+          </a:fontRef>
+        </p:style>
+      </p:cxnSp>
+      <p:cxnSp>
+        <p:nvCxnSpPr>
+          <p:cNvPr id="53" name="52 Conector recto de flecha"/>
+          <p:cNvCxnSpPr/>
+          <p:nvPr/>
+        </p:nvCxnSpPr>
+        <p:spPr>
+          <a:xfrm flipH="1">
+            <a:off x="9551963" y="3137095"/>
+            <a:ext cx="14068" cy="2082019"/>
+          </a:xfrm>
+          <a:prstGeom prst="straightConnector1">
+            <a:avLst/>
+          </a:prstGeom>
+          <a:ln>
+            <a:tailEnd type="arrow"/>
+          </a:ln>
+        </p:spPr>
+        <p:style>
+          <a:lnRef idx="3">
+            <a:schemeClr val="dk1"/>
+          </a:lnRef>
+          <a:fillRef idx="0">
+            <a:schemeClr val="dk1"/>
+          </a:fillRef>
+          <a:effectRef idx="2">
+            <a:schemeClr val="dk1"/>
+          </a:effectRef>
+          <a:fontRef idx="minor">
+            <a:schemeClr val="tx1"/>
+          </a:fontRef>
+        </p:style>
+      </p:cxnSp>
+      <p:cxnSp>
+        <p:nvCxnSpPr>
+          <p:cNvPr id="55" name="54 Conector recto"/>
+          <p:cNvCxnSpPr/>
+          <p:nvPr/>
+        </p:nvCxnSpPr>
+        <p:spPr>
+          <a:xfrm>
+            <a:off x="2461846" y="4093698"/>
+            <a:ext cx="0" cy="1463040"/>
+          </a:xfrm>
+          <a:prstGeom prst="line">
+            <a:avLst/>
+          </a:prstGeom>
+        </p:spPr>
+        <p:style>
+          <a:lnRef idx="3">
+            <a:schemeClr val="dk1"/>
+          </a:lnRef>
+          <a:fillRef idx="0">
+            <a:schemeClr val="dk1"/>
+          </a:fillRef>
+          <a:effectRef idx="2">
+            <a:schemeClr val="dk1"/>
+          </a:effectRef>
+          <a:fontRef idx="minor">
+            <a:schemeClr val="tx1"/>
+          </a:fontRef>
+        </p:style>
+      </p:cxnSp>
+      <p:cxnSp>
+        <p:nvCxnSpPr>
+          <p:cNvPr id="60" name="59 Conector recto"/>
+          <p:cNvCxnSpPr>
+            <a:endCxn id="5" idx="1"/>
+          </p:cNvCxnSpPr>
+          <p:nvPr/>
+        </p:nvCxnSpPr>
+        <p:spPr>
+          <a:xfrm flipV="1">
+            <a:off x="2447778" y="5530948"/>
+            <a:ext cx="361071" cy="11723"/>
+          </a:xfrm>
+          <a:prstGeom prst="line">
+            <a:avLst/>
+          </a:prstGeom>
+        </p:spPr>
+        <p:style>
+          <a:lnRef idx="3">
+            <a:schemeClr val="dk1"/>
+          </a:lnRef>
+          <a:fillRef idx="0">
+            <a:schemeClr val="dk1"/>
+          </a:fillRef>
+          <a:effectRef idx="2">
+            <a:schemeClr val="dk1"/>
+          </a:effectRef>
+          <a:fontRef idx="minor">
+            <a:schemeClr val="tx1"/>
+          </a:fontRef>
+        </p:style>
+      </p:cxnSp>
+      <p:cxnSp>
+        <p:nvCxnSpPr>
+          <p:cNvPr id="63" name="62 Conector recto de flecha"/>
+          <p:cNvCxnSpPr>
+            <a:stCxn id="5" idx="3"/>
+            <a:endCxn id="6" idx="1"/>
+          </p:cNvCxnSpPr>
+          <p:nvPr/>
+        </p:nvCxnSpPr>
+        <p:spPr>
+          <a:xfrm flipV="1">
+            <a:off x="5176910" y="5486401"/>
+            <a:ext cx="3608364" cy="44547"/>
+          </a:xfrm>
+          <a:prstGeom prst="straightConnector1">
+            <a:avLst/>
+          </a:prstGeom>
+          <a:ln>
+            <a:tailEnd type="arrow"/>
+          </a:ln>
+        </p:spPr>
+        <p:style>
+          <a:lnRef idx="3">
+            <a:schemeClr val="dk1"/>
+          </a:lnRef>
+          <a:fillRef idx="0">
+            <a:schemeClr val="dk1"/>
+          </a:fillRef>
+          <a:effectRef idx="2">
+            <a:schemeClr val="dk1"/>
+          </a:effectRef>
+          <a:fontRef idx="minor">
+            <a:schemeClr val="tx1"/>
+          </a:fontRef>
+        </p:style>
+      </p:cxnSp>
+      <p:cxnSp>
+        <p:nvCxnSpPr>
+          <p:cNvPr id="65" name="64 Conector recto de flecha"/>
+          <p:cNvCxnSpPr/>
+          <p:nvPr/>
+        </p:nvCxnSpPr>
+        <p:spPr>
+          <a:xfrm flipH="1">
+            <a:off x="4049150" y="4414911"/>
+            <a:ext cx="15240" cy="855784"/>
+          </a:xfrm>
+          <a:prstGeom prst="straightConnector1">
+            <a:avLst/>
+          </a:prstGeom>
+          <a:ln>
+            <a:tailEnd type="arrow"/>
+          </a:ln>
+        </p:spPr>
+        <p:style>
+          <a:lnRef idx="3">
+            <a:schemeClr val="dk1"/>
+          </a:lnRef>
+          <a:fillRef idx="0">
+            <a:schemeClr val="dk1"/>
+          </a:fillRef>
+          <a:effectRef idx="2">
+            <a:schemeClr val="dk1"/>
+          </a:effectRef>
+          <a:fontRef idx="minor">
+            <a:schemeClr val="tx1"/>
+          </a:fontRef>
+        </p:style>
+      </p:cxnSp>
+      <p:sp>
+        <p:nvSpPr>
+          <p:cNvPr id="66" name="65 CuadroTexto"/>
+          <p:cNvSpPr txBox="1"/>
+          <p:nvPr/>
+        </p:nvSpPr>
+        <p:spPr>
+          <a:xfrm>
+            <a:off x="4220308" y="3249636"/>
+            <a:ext cx="1871003" cy="369332"/>
+          </a:xfrm>
+          <a:prstGeom prst="rect">
+            <a:avLst/>
+          </a:prstGeom>
+          <a:noFill/>
+        </p:spPr>
+        <p:txBody>
+          <a:bodyPr wrap="square" rtlCol="0">
+            <a:spAutoFit/>
+          </a:bodyPr>
+          <a:lstStyle/>
+          <a:p>
+            <a:r>
+              <a:rPr lang="es-AR" dirty="0" smtClean="0"/>
+              <a:t>Presentó errores</a:t>
+            </a:r>
+            <a:endParaRPr lang="es-AR" dirty="0"/>
+          </a:p>
+        </p:txBody>
+      </p:sp>
+      <p:sp>
+        <p:nvSpPr>
+          <p:cNvPr id="67" name="66 CuadroTexto"/>
+          <p:cNvSpPr txBox="1"/>
+          <p:nvPr/>
+        </p:nvSpPr>
+        <p:spPr>
+          <a:xfrm>
+            <a:off x="9664505" y="3812345"/>
+            <a:ext cx="2067950" cy="369332"/>
+          </a:xfrm>
+          <a:prstGeom prst="rect">
+            <a:avLst/>
+          </a:prstGeom>
+          <a:noFill/>
+        </p:spPr>
+        <p:txBody>
+          <a:bodyPr wrap="square" rtlCol="0">
+            <a:spAutoFit/>
+          </a:bodyPr>
+          <a:lstStyle/>
+          <a:p>
+            <a:r>
+              <a:rPr lang="es-AR" dirty="0" smtClean="0"/>
+              <a:t>No presentó errores</a:t>
+            </a:r>
+            <a:endParaRPr lang="es-AR" dirty="0"/>
+          </a:p>
+        </p:txBody>
+      </p:sp>
+      <p:sp>
+        <p:nvSpPr>
+          <p:cNvPr id="68" name="67 CuadroTexto"/>
+          <p:cNvSpPr txBox="1"/>
+          <p:nvPr/>
+        </p:nvSpPr>
+        <p:spPr>
+          <a:xfrm>
+            <a:off x="4037427" y="4586067"/>
+            <a:ext cx="2349305" cy="369332"/>
+          </a:xfrm>
+          <a:prstGeom prst="rect">
+            <a:avLst/>
+          </a:prstGeom>
+          <a:noFill/>
+        </p:spPr>
+        <p:txBody>
+          <a:bodyPr wrap="square" rtlCol="0">
+            <a:spAutoFit/>
+          </a:bodyPr>
+          <a:lstStyle/>
+          <a:p>
+            <a:r>
+              <a:rPr lang="es-AR" dirty="0" smtClean="0"/>
+              <a:t>Corrección de errores</a:t>
+            </a:r>
+            <a:endParaRPr lang="es-AR" dirty="0"/>
+          </a:p>
+        </p:txBody>
+      </p:sp>
+      <p:sp>
+        <p:nvSpPr>
+          <p:cNvPr id="69" name="68 CuadroTexto"/>
+          <p:cNvSpPr txBox="1"/>
+          <p:nvPr/>
+        </p:nvSpPr>
+        <p:spPr>
+          <a:xfrm>
+            <a:off x="5976425" y="5146431"/>
+            <a:ext cx="2067950" cy="369332"/>
+          </a:xfrm>
+          <a:prstGeom prst="rect">
+            <a:avLst/>
+          </a:prstGeom>
+          <a:noFill/>
+        </p:spPr>
+        <p:txBody>
+          <a:bodyPr wrap="square" rtlCol="0">
+            <a:spAutoFit/>
+          </a:bodyPr>
+          <a:lstStyle/>
+          <a:p>
+            <a:r>
+              <a:rPr lang="es-AR" dirty="0" smtClean="0"/>
+              <a:t>No presentó errores</a:t>
+            </a:r>
+            <a:endParaRPr lang="es-AR" dirty="0"/>
+          </a:p>
+        </p:txBody>
+      </p:sp>
     </p:spTree>
     <p:extLst>
       <p:ext uri="{BB962C8B-B14F-4D97-AF65-F5344CB8AC3E}">
-        <p14:creationId xmlns:p14="http://schemas.microsoft.com/office/powerpoint/2010/main" val="2861481179"/>
+        <p14:creationId xmlns="" xmlns:p14="http://schemas.microsoft.com/office/powerpoint/2010/main" val="2861481179"/>
       </p:ext>
     </p:extLst>
   </p:cSld>
   <p:clrMapOvr>
     <a:masterClrMapping/>
   </p:clrMapOvr>
+  <p:timing>
+    <p:tnLst>
+      <p:par>
+        <p:cTn id="1" dur="indefinite" restart="never" nodeType="tmRoot"/>
+      </p:par>
+    </p:tnLst>
+  </p:timing>
 </p:sld>
 </file>
 
@@ -13033,7 +14016,7 @@
           <p:cNvPr id="4" name="Rectángulo 3">
             <a:extLst>
               <a:ext uri="{FF2B5EF4-FFF2-40B4-BE49-F238E27FC236}">
-                <a16:creationId xmlns:a16="http://schemas.microsoft.com/office/drawing/2014/main" id="{B0F1B4F4-0C7A-4C0E-8584-95718BC545EC}"/>
+                <a16:creationId xmlns="" xmlns:a16="http://schemas.microsoft.com/office/drawing/2014/main" id="{B0F1B4F4-0C7A-4C0E-8584-95718BC545EC}"/>
               </a:ext>
             </a:extLst>
           </p:cNvPr>
@@ -13130,13 +14113,20 @@
     </p:spTree>
     <p:extLst>
       <p:ext uri="{BB962C8B-B14F-4D97-AF65-F5344CB8AC3E}">
-        <p14:creationId xmlns:p14="http://schemas.microsoft.com/office/powerpoint/2010/main" val="4125267999"/>
+        <p14:creationId xmlns="" xmlns:p14="http://schemas.microsoft.com/office/powerpoint/2010/main" val="4125267999"/>
       </p:ext>
     </p:extLst>
   </p:cSld>
   <p:clrMapOvr>
     <a:masterClrMapping/>
   </p:clrMapOvr>
+  <p:timing>
+    <p:tnLst>
+      <p:par>
+        <p:cTn id="1" dur="indefinite" restart="never" nodeType="tmRoot"/>
+      </p:par>
+    </p:tnLst>
+  </p:timing>
 </p:sld>
 </file>
 
@@ -13171,7 +14161,7 @@
           <a:blip r:embed="rId2" cstate="print">
             <a:extLst>
               <a:ext uri="{28A0092B-C50C-407E-A947-70E740481C1C}">
-                <a14:useLocalDpi xmlns:a14="http://schemas.microsoft.com/office/drawing/2010/main" val="0"/>
+                <a14:useLocalDpi xmlns="" xmlns:a14="http://schemas.microsoft.com/office/drawing/2010/main" val="0"/>
               </a:ext>
             </a:extLst>
           </a:blip>
@@ -13198,7 +14188,7 @@
           <a:blip r:embed="rId3" cstate="print">
             <a:extLst>
               <a:ext uri="{28A0092B-C50C-407E-A947-70E740481C1C}">
-                <a14:useLocalDpi xmlns:a14="http://schemas.microsoft.com/office/drawing/2010/main" val="0"/>
+                <a14:useLocalDpi xmlns="" xmlns:a14="http://schemas.microsoft.com/office/drawing/2010/main" val="0"/>
               </a:ext>
             </a:extLst>
           </a:blip>
@@ -13296,7 +14286,7 @@
           <a:blip r:embed="rId4" cstate="print">
             <a:extLst>
               <a:ext uri="{28A0092B-C50C-407E-A947-70E740481C1C}">
-                <a14:useLocalDpi xmlns:a14="http://schemas.microsoft.com/office/drawing/2010/main" val="0"/>
+                <a14:useLocalDpi xmlns="" xmlns:a14="http://schemas.microsoft.com/office/drawing/2010/main" val="0"/>
               </a:ext>
             </a:extLst>
           </a:blip>
@@ -13392,7 +14382,7 @@
           <a:blip r:embed="rId5" cstate="print">
             <a:extLst>
               <a:ext uri="{28A0092B-C50C-407E-A947-70E740481C1C}">
-                <a14:useLocalDpi xmlns:a14="http://schemas.microsoft.com/office/drawing/2010/main" val="0"/>
+                <a14:useLocalDpi xmlns="" xmlns:a14="http://schemas.microsoft.com/office/drawing/2010/main" val="0"/>
               </a:ext>
             </a:extLst>
           </a:blip>
@@ -13422,7 +14412,7 @@
           <a:blip r:embed="rId6" cstate="print">
             <a:extLst>
               <a:ext uri="{28A0092B-C50C-407E-A947-70E740481C1C}">
-                <a14:useLocalDpi xmlns:a14="http://schemas.microsoft.com/office/drawing/2010/main" val="0"/>
+                <a14:useLocalDpi xmlns="" xmlns:a14="http://schemas.microsoft.com/office/drawing/2010/main" val="0"/>
               </a:ext>
             </a:extLst>
           </a:blip>
@@ -13452,7 +14442,7 @@
           <a:blip r:embed="rId7" cstate="print">
             <a:extLst>
               <a:ext uri="{28A0092B-C50C-407E-A947-70E740481C1C}">
-                <a14:useLocalDpi xmlns:a14="http://schemas.microsoft.com/office/drawing/2010/main" val="0"/>
+                <a14:useLocalDpi xmlns="" xmlns:a14="http://schemas.microsoft.com/office/drawing/2010/main" val="0"/>
               </a:ext>
             </a:extLst>
           </a:blip>
@@ -13534,7 +14524,7 @@
           <a:blip r:embed="rId8" cstate="print">
             <a:extLst>
               <a:ext uri="{28A0092B-C50C-407E-A947-70E740481C1C}">
-                <a14:useLocalDpi xmlns:a14="http://schemas.microsoft.com/office/drawing/2010/main" val="0"/>
+                <a14:useLocalDpi xmlns="" xmlns:a14="http://schemas.microsoft.com/office/drawing/2010/main" val="0"/>
               </a:ext>
             </a:extLst>
           </a:blip>
@@ -13564,7 +14554,7 @@
           <a:blip r:embed="rId9" cstate="print">
             <a:extLst>
               <a:ext uri="{28A0092B-C50C-407E-A947-70E740481C1C}">
-                <a14:useLocalDpi xmlns:a14="http://schemas.microsoft.com/office/drawing/2010/main" val="0"/>
+                <a14:useLocalDpi xmlns="" xmlns:a14="http://schemas.microsoft.com/office/drawing/2010/main" val="0"/>
               </a:ext>
             </a:extLst>
           </a:blip>
@@ -13594,7 +14584,7 @@
           <a:blip r:embed="rId10" cstate="print">
             <a:extLst>
               <a:ext uri="{28A0092B-C50C-407E-A947-70E740481C1C}">
-                <a14:useLocalDpi xmlns:a14="http://schemas.microsoft.com/office/drawing/2010/main" val="0"/>
+                <a14:useLocalDpi xmlns="" xmlns:a14="http://schemas.microsoft.com/office/drawing/2010/main" val="0"/>
               </a:ext>
             </a:extLst>
           </a:blip>
@@ -13666,7 +14656,7 @@
           <a:blip r:embed="rId11" cstate="print">
             <a:extLst>
               <a:ext uri="{28A0092B-C50C-407E-A947-70E740481C1C}">
-                <a14:useLocalDpi xmlns:a14="http://schemas.microsoft.com/office/drawing/2010/main" val="0"/>
+                <a14:useLocalDpi xmlns="" xmlns:a14="http://schemas.microsoft.com/office/drawing/2010/main" val="0"/>
               </a:ext>
             </a:extLst>
           </a:blip>
@@ -13696,7 +14686,7 @@
           <a:blip r:embed="rId12" cstate="print">
             <a:extLst>
               <a:ext uri="{28A0092B-C50C-407E-A947-70E740481C1C}">
-                <a14:useLocalDpi xmlns:a14="http://schemas.microsoft.com/office/drawing/2010/main" val="0"/>
+                <a14:useLocalDpi xmlns="" xmlns:a14="http://schemas.microsoft.com/office/drawing/2010/main" val="0"/>
               </a:ext>
             </a:extLst>
           </a:blip>
@@ -13726,7 +14716,7 @@
           <a:blip r:embed="rId13" cstate="print">
             <a:extLst>
               <a:ext uri="{28A0092B-C50C-407E-A947-70E740481C1C}">
-                <a14:useLocalDpi xmlns:a14="http://schemas.microsoft.com/office/drawing/2010/main" val="0"/>
+                <a14:useLocalDpi xmlns="" xmlns:a14="http://schemas.microsoft.com/office/drawing/2010/main" val="0"/>
               </a:ext>
             </a:extLst>
           </a:blip>
@@ -13756,7 +14746,7 @@
           <a:blip r:embed="rId14" cstate="print">
             <a:extLst>
               <a:ext uri="{28A0092B-C50C-407E-A947-70E740481C1C}">
-                <a14:useLocalDpi xmlns:a14="http://schemas.microsoft.com/office/drawing/2010/main" val="0"/>
+                <a14:useLocalDpi xmlns="" xmlns:a14="http://schemas.microsoft.com/office/drawing/2010/main" val="0"/>
               </a:ext>
             </a:extLst>
           </a:blip>
@@ -13786,7 +14776,7 @@
           <a:blip r:embed="rId15" cstate="print">
             <a:extLst>
               <a:ext uri="{28A0092B-C50C-407E-A947-70E740481C1C}">
-                <a14:useLocalDpi xmlns:a14="http://schemas.microsoft.com/office/drawing/2010/main" val="0"/>
+                <a14:useLocalDpi xmlns="" xmlns:a14="http://schemas.microsoft.com/office/drawing/2010/main" val="0"/>
               </a:ext>
             </a:extLst>
           </a:blip>
@@ -13816,7 +14806,7 @@
           <a:blip r:embed="rId16" cstate="print">
             <a:extLst>
               <a:ext uri="{28A0092B-C50C-407E-A947-70E740481C1C}">
-                <a14:useLocalDpi xmlns:a14="http://schemas.microsoft.com/office/drawing/2010/main" val="0"/>
+                <a14:useLocalDpi xmlns="" xmlns:a14="http://schemas.microsoft.com/office/drawing/2010/main" val="0"/>
               </a:ext>
             </a:extLst>
           </a:blip>
@@ -13846,7 +14836,7 @@
           <a:blip r:embed="rId17" cstate="print">
             <a:extLst>
               <a:ext uri="{28A0092B-C50C-407E-A947-70E740481C1C}">
-                <a14:useLocalDpi xmlns:a14="http://schemas.microsoft.com/office/drawing/2010/main" val="0"/>
+                <a14:useLocalDpi xmlns="" xmlns:a14="http://schemas.microsoft.com/office/drawing/2010/main" val="0"/>
               </a:ext>
             </a:extLst>
           </a:blip>
@@ -13866,7 +14856,7 @@
           <a:noFill/>
           <a:extLst>
             <a:ext uri="{909E8E84-426E-40DD-AFC4-6F175D3DCCD1}">
-              <a14:hiddenFill xmlns:a14="http://schemas.microsoft.com/office/drawing/2010/main">
+              <a14:hiddenFill xmlns="" xmlns:a14="http://schemas.microsoft.com/office/drawing/2010/main">
                 <a:solidFill>
                   <a:srgbClr val="FFFFFF"/>
                 </a:solidFill>
@@ -13964,7 +14954,7 @@
           <p:cNvPr id="2" name="Picture 2">
             <a:extLst>
               <a:ext uri="{FF2B5EF4-FFF2-40B4-BE49-F238E27FC236}">
-                <a16:creationId xmlns:a16="http://schemas.microsoft.com/office/drawing/2014/main" id="{0CAF1ED9-ABEB-4E64-A9BA-A91A6C5DFDE2}"/>
+                <a16:creationId xmlns="" xmlns:a16="http://schemas.microsoft.com/office/drawing/2014/main" id="{0CAF1ED9-ABEB-4E64-A9BA-A91A6C5DFDE2}"/>
               </a:ext>
             </a:extLst>
           </p:cNvPr>
@@ -13977,7 +14967,7 @@
           <a:blip r:embed="rId18" cstate="print">
             <a:extLst>
               <a:ext uri="{28A0092B-C50C-407E-A947-70E740481C1C}">
-                <a14:useLocalDpi xmlns:a14="http://schemas.microsoft.com/office/drawing/2010/main" val="0"/>
+                <a14:useLocalDpi xmlns="" xmlns:a14="http://schemas.microsoft.com/office/drawing/2010/main" val="0"/>
               </a:ext>
             </a:extLst>
           </a:blip>
@@ -13997,7 +14987,7 @@
           <a:noFill/>
           <a:extLst>
             <a:ext uri="{909E8E84-426E-40DD-AFC4-6F175D3DCCD1}">
-              <a14:hiddenFill xmlns:a14="http://schemas.microsoft.com/office/drawing/2010/main">
+              <a14:hiddenFill xmlns="" xmlns:a14="http://schemas.microsoft.com/office/drawing/2010/main">
                 <a:solidFill>
                   <a:srgbClr val="FFFFFF"/>
                 </a:solidFill>
@@ -14011,7 +15001,7 @@
           <p:cNvPr id="31" name="CuadroTexto 30">
             <a:extLst>
               <a:ext uri="{FF2B5EF4-FFF2-40B4-BE49-F238E27FC236}">
-                <a16:creationId xmlns:a16="http://schemas.microsoft.com/office/drawing/2014/main" id="{E653EC3C-5DB9-4B37-AF01-85EDB5934CC1}"/>
+                <a16:creationId xmlns="" xmlns:a16="http://schemas.microsoft.com/office/drawing/2014/main" id="{E653EC3C-5DB9-4B37-AF01-85EDB5934CC1}"/>
               </a:ext>
             </a:extLst>
           </p:cNvPr>
@@ -14050,7 +15040,7 @@
     </p:spTree>
     <p:extLst>
       <p:ext uri="{BB962C8B-B14F-4D97-AF65-F5344CB8AC3E}">
-        <p14:creationId xmlns:p14="http://schemas.microsoft.com/office/powerpoint/2010/main" val="2982195199"/>
+        <p14:creationId xmlns="" xmlns:p14="http://schemas.microsoft.com/office/powerpoint/2010/main" val="2982195199"/>
       </p:ext>
     </p:extLst>
   </p:cSld>
@@ -14082,7 +15072,7 @@
           <p:cNvPr id="4" name="Rectángulo 3">
             <a:extLst>
               <a:ext uri="{FF2B5EF4-FFF2-40B4-BE49-F238E27FC236}">
-                <a16:creationId xmlns:a16="http://schemas.microsoft.com/office/drawing/2014/main" id="{B0F1B4F4-0C7A-4C0E-8584-95718BC545EC}"/>
+                <a16:creationId xmlns="" xmlns:a16="http://schemas.microsoft.com/office/drawing/2014/main" id="{B0F1B4F4-0C7A-4C0E-8584-95718BC545EC}"/>
               </a:ext>
             </a:extLst>
           </p:cNvPr>
@@ -14141,7 +15131,7 @@
     </p:spTree>
     <p:extLst>
       <p:ext uri="{BB962C8B-B14F-4D97-AF65-F5344CB8AC3E}">
-        <p14:creationId xmlns:p14="http://schemas.microsoft.com/office/powerpoint/2010/main" val="115837642"/>
+        <p14:creationId xmlns="" xmlns:p14="http://schemas.microsoft.com/office/powerpoint/2010/main" val="115837642"/>
       </p:ext>
     </p:extLst>
   </p:cSld>
@@ -14173,7 +15163,7 @@
           <p:cNvPr id="2" name="Título 1">
             <a:extLst>
               <a:ext uri="{FF2B5EF4-FFF2-40B4-BE49-F238E27FC236}">
-                <a16:creationId xmlns:a16="http://schemas.microsoft.com/office/drawing/2014/main" id="{0ED6D180-92C1-4333-BA91-2BBA4DD94A3B}"/>
+                <a16:creationId xmlns="" xmlns:a16="http://schemas.microsoft.com/office/drawing/2014/main" id="{0ED6D180-92C1-4333-BA91-2BBA4DD94A3B}"/>
               </a:ext>
             </a:extLst>
           </p:cNvPr>
@@ -14210,7 +15200,7 @@
           <p:cNvPr id="4" name="CuadroTexto 3">
             <a:extLst>
               <a:ext uri="{FF2B5EF4-FFF2-40B4-BE49-F238E27FC236}">
-                <a16:creationId xmlns:a16="http://schemas.microsoft.com/office/drawing/2014/main" id="{077AD978-631F-4986-B928-CABD7DCA36D6}"/>
+                <a16:creationId xmlns="" xmlns:a16="http://schemas.microsoft.com/office/drawing/2014/main" id="{077AD978-631F-4986-B928-CABD7DCA36D6}"/>
               </a:ext>
             </a:extLst>
           </p:cNvPr>
@@ -14354,11 +15344,17 @@
             </a:pPr>
             <a:r>
               <a:rPr lang="es-ES" sz="2000" b="0" i="0" u="none" strike="noStrike" baseline="0" dirty="0">
+                <a:solidFill>
+                  <a:srgbClr val="FF0000"/>
+                </a:solidFill>
                 <a:latin typeface="Georgia" panose="02040502050405020303" pitchFamily="18" charset="0"/>
               </a:rPr>
               <a:t>Control sobre programas disponibles y notificaciones enviadas</a:t>
             </a:r>
             <a:endParaRPr lang="es-AR" sz="2000" dirty="0">
+              <a:solidFill>
+                <a:srgbClr val="FF0000"/>
+              </a:solidFill>
               <a:latin typeface="Georgia" panose="02040502050405020303" pitchFamily="18" charset="0"/>
             </a:endParaRPr>
           </a:p>
@@ -14369,7 +15365,7 @@
           <p:cNvPr id="5" name="Imagen 4">
             <a:extLst>
               <a:ext uri="{FF2B5EF4-FFF2-40B4-BE49-F238E27FC236}">
-                <a16:creationId xmlns:a16="http://schemas.microsoft.com/office/drawing/2014/main" id="{1E023EBF-D877-415B-8954-0B4E697AD581}"/>
+                <a16:creationId xmlns="" xmlns:a16="http://schemas.microsoft.com/office/drawing/2014/main" id="{1E023EBF-D877-415B-8954-0B4E697AD581}"/>
               </a:ext>
             </a:extLst>
           </p:cNvPr>
@@ -14382,7 +15378,7 @@
           <a:blip r:embed="rId2" cstate="print">
             <a:extLst>
               <a:ext uri="{28A0092B-C50C-407E-A947-70E740481C1C}">
-                <a14:useLocalDpi xmlns:a14="http://schemas.microsoft.com/office/drawing/2010/main" val="0"/>
+                <a14:useLocalDpi xmlns="" xmlns:a14="http://schemas.microsoft.com/office/drawing/2010/main" val="0"/>
               </a:ext>
             </a:extLst>
           </a:blip>
@@ -14405,7 +15401,7 @@
           <p:cNvPr id="10" name="Imagen 9">
             <a:extLst>
               <a:ext uri="{FF2B5EF4-FFF2-40B4-BE49-F238E27FC236}">
-                <a16:creationId xmlns:a16="http://schemas.microsoft.com/office/drawing/2014/main" id="{326EF8D7-F39B-4A9A-AE50-012A992DE84B}"/>
+                <a16:creationId xmlns="" xmlns:a16="http://schemas.microsoft.com/office/drawing/2014/main" id="{326EF8D7-F39B-4A9A-AE50-012A992DE84B}"/>
               </a:ext>
             </a:extLst>
           </p:cNvPr>
@@ -14449,7 +15445,7 @@
           <p:cNvPr id="6" name="Imagen 5">
             <a:extLst>
               <a:ext uri="{FF2B5EF4-FFF2-40B4-BE49-F238E27FC236}">
-                <a16:creationId xmlns:a16="http://schemas.microsoft.com/office/drawing/2014/main" id="{DF82BA4F-2D73-4C09-9504-536217F5A924}"/>
+                <a16:creationId xmlns="" xmlns:a16="http://schemas.microsoft.com/office/drawing/2014/main" id="{DF82BA4F-2D73-4C09-9504-536217F5A924}"/>
               </a:ext>
             </a:extLst>
           </p:cNvPr>
@@ -14493,7 +15489,7 @@
           <p:cNvPr id="11" name="Imagen 10">
             <a:extLst>
               <a:ext uri="{FF2B5EF4-FFF2-40B4-BE49-F238E27FC236}">
-                <a16:creationId xmlns:a16="http://schemas.microsoft.com/office/drawing/2014/main" id="{F882AEBF-FBBF-44B6-AE98-0132DEAB3BBB}"/>
+                <a16:creationId xmlns="" xmlns:a16="http://schemas.microsoft.com/office/drawing/2014/main" id="{F882AEBF-FBBF-44B6-AE98-0132DEAB3BBB}"/>
               </a:ext>
             </a:extLst>
           </p:cNvPr>
@@ -14534,7 +15530,7 @@
     </p:spTree>
     <p:extLst>
       <p:ext uri="{BB962C8B-B14F-4D97-AF65-F5344CB8AC3E}">
-        <p14:creationId xmlns:p14="http://schemas.microsoft.com/office/powerpoint/2010/main" val="3388820873"/>
+        <p14:creationId xmlns="" xmlns:p14="http://schemas.microsoft.com/office/powerpoint/2010/main" val="3388820873"/>
       </p:ext>
     </p:extLst>
   </p:cSld>
@@ -14566,7 +15562,7 @@
           <p:cNvPr id="4" name="Título 3">
             <a:extLst>
               <a:ext uri="{FF2B5EF4-FFF2-40B4-BE49-F238E27FC236}">
-                <a16:creationId xmlns:a16="http://schemas.microsoft.com/office/drawing/2014/main" id="{FA4EADB5-92CE-4B25-BE21-7FC484AE680E}"/>
+                <a16:creationId xmlns="" xmlns:a16="http://schemas.microsoft.com/office/drawing/2014/main" id="{FA4EADB5-92CE-4B25-BE21-7FC484AE680E}"/>
               </a:ext>
             </a:extLst>
           </p:cNvPr>
@@ -14603,7 +15599,7 @@
           <p:cNvPr id="5" name="Subtítulo 4">
             <a:extLst>
               <a:ext uri="{FF2B5EF4-FFF2-40B4-BE49-F238E27FC236}">
-                <a16:creationId xmlns:a16="http://schemas.microsoft.com/office/drawing/2014/main" id="{7035CB29-6D24-4E02-AC9F-07DC0DE9312C}"/>
+                <a16:creationId xmlns="" xmlns:a16="http://schemas.microsoft.com/office/drawing/2014/main" id="{7035CB29-6D24-4E02-AC9F-07DC0DE9312C}"/>
               </a:ext>
             </a:extLst>
           </p:cNvPr>
@@ -14715,7 +15711,7 @@
     </p:spTree>
     <p:extLst>
       <p:ext uri="{BB962C8B-B14F-4D97-AF65-F5344CB8AC3E}">
-        <p14:creationId xmlns:p14="http://schemas.microsoft.com/office/powerpoint/2010/main" val="2893191071"/>
+        <p14:creationId xmlns="" xmlns:p14="http://schemas.microsoft.com/office/powerpoint/2010/main" val="2893191071"/>
       </p:ext>
     </p:extLst>
   </p:cSld>
@@ -14747,7 +15743,7 @@
           <p:cNvPr id="2" name="Título 1">
             <a:extLst>
               <a:ext uri="{FF2B5EF4-FFF2-40B4-BE49-F238E27FC236}">
-                <a16:creationId xmlns:a16="http://schemas.microsoft.com/office/drawing/2014/main" id="{0ED6D180-92C1-4333-BA91-2BBA4DD94A3B}"/>
+                <a16:creationId xmlns="" xmlns:a16="http://schemas.microsoft.com/office/drawing/2014/main" id="{0ED6D180-92C1-4333-BA91-2BBA4DD94A3B}"/>
               </a:ext>
             </a:extLst>
           </p:cNvPr>
@@ -14784,7 +15780,7 @@
           <p:cNvPr id="4" name="CuadroTexto 3">
             <a:extLst>
               <a:ext uri="{FF2B5EF4-FFF2-40B4-BE49-F238E27FC236}">
-                <a16:creationId xmlns:a16="http://schemas.microsoft.com/office/drawing/2014/main" id="{077AD978-631F-4986-B928-CABD7DCA36D6}"/>
+                <a16:creationId xmlns="" xmlns:a16="http://schemas.microsoft.com/office/drawing/2014/main" id="{077AD978-631F-4986-B928-CABD7DCA36D6}"/>
               </a:ext>
             </a:extLst>
           </p:cNvPr>
@@ -14875,7 +15871,7 @@
           <p:cNvPr id="8" name="Imagen 7">
             <a:extLst>
               <a:ext uri="{FF2B5EF4-FFF2-40B4-BE49-F238E27FC236}">
-                <a16:creationId xmlns:a16="http://schemas.microsoft.com/office/drawing/2014/main" id="{B81F7B9F-2566-4432-A702-9A2E09780895}"/>
+                <a16:creationId xmlns="" xmlns:a16="http://schemas.microsoft.com/office/drawing/2014/main" id="{B81F7B9F-2566-4432-A702-9A2E09780895}"/>
               </a:ext>
             </a:extLst>
           </p:cNvPr>
@@ -14923,7 +15919,7 @@
           <p:cNvPr id="1030" name="Picture 6">
             <a:extLst>
               <a:ext uri="{FF2B5EF4-FFF2-40B4-BE49-F238E27FC236}">
-                <a16:creationId xmlns:a16="http://schemas.microsoft.com/office/drawing/2014/main" id="{CF4EDECE-D36E-41AF-B661-BA6A0825A01E}"/>
+                <a16:creationId xmlns="" xmlns:a16="http://schemas.microsoft.com/office/drawing/2014/main" id="{CF4EDECE-D36E-41AF-B661-BA6A0825A01E}"/>
               </a:ext>
             </a:extLst>
           </p:cNvPr>
@@ -14936,7 +15932,7 @@
           <a:blip r:embed="rId3" cstate="print">
             <a:extLst>
               <a:ext uri="{28A0092B-C50C-407E-A947-70E740481C1C}">
-                <a14:useLocalDpi xmlns:a14="http://schemas.microsoft.com/office/drawing/2010/main" val="0"/>
+                <a14:useLocalDpi xmlns="" xmlns:a14="http://schemas.microsoft.com/office/drawing/2010/main" val="0"/>
               </a:ext>
             </a:extLst>
           </a:blip>
@@ -14969,7 +15965,7 @@
           </a:effectLst>
           <a:extLst>
             <a:ext uri="{909E8E84-426E-40DD-AFC4-6F175D3DCCD1}">
-              <a14:hiddenFill xmlns:a14="http://schemas.microsoft.com/office/drawing/2010/main">
+              <a14:hiddenFill xmlns="" xmlns:a14="http://schemas.microsoft.com/office/drawing/2010/main">
                 <a:solidFill>
                   <a:srgbClr val="FFFFFF"/>
                 </a:solidFill>
@@ -14981,7 +15977,7 @@
     </p:spTree>
     <p:extLst>
       <p:ext uri="{BB962C8B-B14F-4D97-AF65-F5344CB8AC3E}">
-        <p14:creationId xmlns:p14="http://schemas.microsoft.com/office/powerpoint/2010/main" val="248188006"/>
+        <p14:creationId xmlns="" xmlns:p14="http://schemas.microsoft.com/office/powerpoint/2010/main" val="248188006"/>
       </p:ext>
     </p:extLst>
   </p:cSld>
@@ -15013,7 +16009,7 @@
           <p:cNvPr id="4" name="Rectángulo 3">
             <a:extLst>
               <a:ext uri="{FF2B5EF4-FFF2-40B4-BE49-F238E27FC236}">
-                <a16:creationId xmlns:a16="http://schemas.microsoft.com/office/drawing/2014/main" id="{B0F1B4F4-0C7A-4C0E-8584-95718BC545EC}"/>
+                <a16:creationId xmlns="" xmlns:a16="http://schemas.microsoft.com/office/drawing/2014/main" id="{B0F1B4F4-0C7A-4C0E-8584-95718BC545EC}"/>
               </a:ext>
             </a:extLst>
           </p:cNvPr>
@@ -15059,7 +16055,7 @@
     </p:spTree>
     <p:extLst>
       <p:ext uri="{BB962C8B-B14F-4D97-AF65-F5344CB8AC3E}">
-        <p14:creationId xmlns:p14="http://schemas.microsoft.com/office/powerpoint/2010/main" val="115837642"/>
+        <p14:creationId xmlns="" xmlns:p14="http://schemas.microsoft.com/office/powerpoint/2010/main" val="115837642"/>
       </p:ext>
     </p:extLst>
   </p:cSld>
@@ -15122,7 +16118,7 @@
           <p:cNvPr id="6" name="1 Título">
             <a:extLst>
               <a:ext uri="{FF2B5EF4-FFF2-40B4-BE49-F238E27FC236}">
-                <a16:creationId xmlns:a16="http://schemas.microsoft.com/office/drawing/2014/main" id="{F186F2D6-48EB-4235-B54E-B7DB7712C32E}"/>
+                <a16:creationId xmlns="" xmlns:a16="http://schemas.microsoft.com/office/drawing/2014/main" id="{F186F2D6-48EB-4235-B54E-B7DB7712C32E}"/>
               </a:ext>
             </a:extLst>
           </p:cNvPr>
@@ -16208,7 +17204,7 @@
     </p:spTree>
     <p:extLst>
       <p:ext uri="{BB962C8B-B14F-4D97-AF65-F5344CB8AC3E}">
-        <p14:creationId xmlns:p14="http://schemas.microsoft.com/office/powerpoint/2010/main" val="3792767168"/>
+        <p14:creationId xmlns="" xmlns:p14="http://schemas.microsoft.com/office/powerpoint/2010/main" val="3792767168"/>
       </p:ext>
     </p:extLst>
   </p:cSld>
@@ -16240,7 +17236,7 @@
           <p:cNvPr id="4" name="Rectángulo 3">
             <a:extLst>
               <a:ext uri="{FF2B5EF4-FFF2-40B4-BE49-F238E27FC236}">
-                <a16:creationId xmlns:a16="http://schemas.microsoft.com/office/drawing/2014/main" id="{B0F1B4F4-0C7A-4C0E-8584-95718BC545EC}"/>
+                <a16:creationId xmlns="" xmlns:a16="http://schemas.microsoft.com/office/drawing/2014/main" id="{B0F1B4F4-0C7A-4C0E-8584-95718BC545EC}"/>
               </a:ext>
             </a:extLst>
           </p:cNvPr>
@@ -16299,7 +17295,7 @@
     </p:spTree>
     <p:extLst>
       <p:ext uri="{BB962C8B-B14F-4D97-AF65-F5344CB8AC3E}">
-        <p14:creationId xmlns:p14="http://schemas.microsoft.com/office/powerpoint/2010/main" val="3888593392"/>
+        <p14:creationId xmlns="" xmlns:p14="http://schemas.microsoft.com/office/powerpoint/2010/main" val="3888593392"/>
       </p:ext>
     </p:extLst>
   </p:cSld>
@@ -16331,7 +17327,7 @@
           <p:cNvPr id="2" name="Título 1">
             <a:extLst>
               <a:ext uri="{FF2B5EF4-FFF2-40B4-BE49-F238E27FC236}">
-                <a16:creationId xmlns:a16="http://schemas.microsoft.com/office/drawing/2014/main" id="{0ED6D180-92C1-4333-BA91-2BBA4DD94A3B}"/>
+                <a16:creationId xmlns="" xmlns:a16="http://schemas.microsoft.com/office/drawing/2014/main" id="{0ED6D180-92C1-4333-BA91-2BBA4DD94A3B}"/>
               </a:ext>
             </a:extLst>
           </p:cNvPr>
@@ -16368,7 +17364,7 @@
           <p:cNvPr id="6" name="CuadroTexto 5">
             <a:extLst>
               <a:ext uri="{FF2B5EF4-FFF2-40B4-BE49-F238E27FC236}">
-                <a16:creationId xmlns:a16="http://schemas.microsoft.com/office/drawing/2014/main" id="{BC8D092D-6667-447D-B473-A50467138064}"/>
+                <a16:creationId xmlns="" xmlns:a16="http://schemas.microsoft.com/office/drawing/2014/main" id="{BC8D092D-6667-447D-B473-A50467138064}"/>
               </a:ext>
             </a:extLst>
           </p:cNvPr>
@@ -16506,7 +17502,7 @@
     </p:spTree>
     <p:extLst>
       <p:ext uri="{BB962C8B-B14F-4D97-AF65-F5344CB8AC3E}">
-        <p14:creationId xmlns:p14="http://schemas.microsoft.com/office/powerpoint/2010/main" val="2147726924"/>
+        <p14:creationId xmlns="" xmlns:p14="http://schemas.microsoft.com/office/powerpoint/2010/main" val="2147726924"/>
       </p:ext>
     </p:extLst>
   </p:cSld>
@@ -16538,7 +17534,7 @@
           <p:cNvPr id="4" name="Rectángulo 3">
             <a:extLst>
               <a:ext uri="{FF2B5EF4-FFF2-40B4-BE49-F238E27FC236}">
-                <a16:creationId xmlns:a16="http://schemas.microsoft.com/office/drawing/2014/main" id="{B0F1B4F4-0C7A-4C0E-8584-95718BC545EC}"/>
+                <a16:creationId xmlns="" xmlns:a16="http://schemas.microsoft.com/office/drawing/2014/main" id="{B0F1B4F4-0C7A-4C0E-8584-95718BC545EC}"/>
               </a:ext>
             </a:extLst>
           </p:cNvPr>
@@ -16602,7 +17598,7 @@
           <p:cNvPr id="2" name="CuadroTexto 1">
             <a:extLst>
               <a:ext uri="{FF2B5EF4-FFF2-40B4-BE49-F238E27FC236}">
-                <a16:creationId xmlns:a16="http://schemas.microsoft.com/office/drawing/2014/main" id="{BBF285E2-50A8-4654-BD24-220C20D7C57B}"/>
+                <a16:creationId xmlns="" xmlns:a16="http://schemas.microsoft.com/office/drawing/2014/main" id="{BBF285E2-50A8-4654-BD24-220C20D7C57B}"/>
               </a:ext>
             </a:extLst>
           </p:cNvPr>
@@ -16635,7 +17631,7 @@
     </p:spTree>
     <p:extLst>
       <p:ext uri="{BB962C8B-B14F-4D97-AF65-F5344CB8AC3E}">
-        <p14:creationId xmlns:p14="http://schemas.microsoft.com/office/powerpoint/2010/main" val="3442063561"/>
+        <p14:creationId xmlns="" xmlns:p14="http://schemas.microsoft.com/office/powerpoint/2010/main" val="3442063561"/>
       </p:ext>
     </p:extLst>
   </p:cSld>
@@ -16667,7 +17663,7 @@
           <p:cNvPr id="2" name="Título 1">
             <a:extLst>
               <a:ext uri="{FF2B5EF4-FFF2-40B4-BE49-F238E27FC236}">
-                <a16:creationId xmlns:a16="http://schemas.microsoft.com/office/drawing/2014/main" id="{A08BF852-5F19-46F2-83FE-6528AEC95981}"/>
+                <a16:creationId xmlns="" xmlns:a16="http://schemas.microsoft.com/office/drawing/2014/main" id="{A08BF852-5F19-46F2-83FE-6528AEC95981}"/>
               </a:ext>
             </a:extLst>
           </p:cNvPr>
@@ -16712,7 +17708,7 @@
           <p:cNvPr id="3" name="Marcador de contenido 2">
             <a:extLst>
               <a:ext uri="{FF2B5EF4-FFF2-40B4-BE49-F238E27FC236}">
-                <a16:creationId xmlns:a16="http://schemas.microsoft.com/office/drawing/2014/main" id="{4825B7B8-2642-4E50-9E0D-E85148EB6652}"/>
+                <a16:creationId xmlns="" xmlns:a16="http://schemas.microsoft.com/office/drawing/2014/main" id="{4825B7B8-2642-4E50-9E0D-E85148EB6652}"/>
               </a:ext>
             </a:extLst>
           </p:cNvPr>
@@ -16826,7 +17822,7 @@
     </p:spTree>
     <p:extLst>
       <p:ext uri="{BB962C8B-B14F-4D97-AF65-F5344CB8AC3E}">
-        <p14:creationId xmlns:p14="http://schemas.microsoft.com/office/powerpoint/2010/main" val="493199861"/>
+        <p14:creationId xmlns="" xmlns:p14="http://schemas.microsoft.com/office/powerpoint/2010/main" val="493199861"/>
       </p:ext>
     </p:extLst>
   </p:cSld>
@@ -16909,7 +17905,7 @@
           <p:cNvPr id="9" name="Elipse 8">
             <a:extLst>
               <a:ext uri="{FF2B5EF4-FFF2-40B4-BE49-F238E27FC236}">
-                <a16:creationId xmlns:a16="http://schemas.microsoft.com/office/drawing/2014/main" id="{669363E3-65EC-4B6C-B5A2-86799758077C}"/>
+                <a16:creationId xmlns="" xmlns:a16="http://schemas.microsoft.com/office/drawing/2014/main" id="{669363E3-65EC-4B6C-B5A2-86799758077C}"/>
               </a:ext>
             </a:extLst>
           </p:cNvPr>
@@ -16924,20 +17920,15 @@
           <a:prstGeom prst="ellipse">
             <a:avLst/>
           </a:prstGeom>
-          <a:solidFill>
-            <a:srgbClr val="374D81"/>
-          </a:solidFill>
         </p:spPr>
         <p:style>
-          <a:lnRef idx="2">
-            <a:schemeClr val="accent1">
-              <a:shade val="50000"/>
-            </a:schemeClr>
+          <a:lnRef idx="0">
+            <a:schemeClr val="accent1"/>
           </a:lnRef>
-          <a:fillRef idx="1">
+          <a:fillRef idx="3">
             <a:schemeClr val="accent1"/>
           </a:fillRef>
-          <a:effectRef idx="0">
+          <a:effectRef idx="3">
             <a:schemeClr val="accent1"/>
           </a:effectRef>
           <a:fontRef idx="minor">
@@ -16958,7 +17949,7 @@
           <p:cNvPr id="11" name="Elipse 10">
             <a:extLst>
               <a:ext uri="{FF2B5EF4-FFF2-40B4-BE49-F238E27FC236}">
-                <a16:creationId xmlns:a16="http://schemas.microsoft.com/office/drawing/2014/main" id="{1B4CFB39-227C-45B0-9FFA-5482B1E7B481}"/>
+                <a16:creationId xmlns="" xmlns:a16="http://schemas.microsoft.com/office/drawing/2014/main" id="{1B4CFB39-227C-45B0-9FFA-5482B1E7B481}"/>
               </a:ext>
             </a:extLst>
           </p:cNvPr>
@@ -16973,21 +17964,16 @@
           <a:prstGeom prst="ellipse">
             <a:avLst/>
           </a:prstGeom>
-          <a:solidFill>
-            <a:srgbClr val="8EB9F9"/>
-          </a:solidFill>
         </p:spPr>
         <p:style>
-          <a:lnRef idx="2">
-            <a:schemeClr val="accent1">
-              <a:shade val="50000"/>
-            </a:schemeClr>
+          <a:lnRef idx="0">
+            <a:schemeClr val="accent2"/>
           </a:lnRef>
-          <a:fillRef idx="1">
-            <a:schemeClr val="accent1"/>
+          <a:fillRef idx="3">
+            <a:schemeClr val="accent2"/>
           </a:fillRef>
-          <a:effectRef idx="0">
-            <a:schemeClr val="accent1"/>
+          <a:effectRef idx="3">
+            <a:schemeClr val="accent2"/>
           </a:effectRef>
           <a:fontRef idx="minor">
             <a:schemeClr val="lt1"/>
@@ -17007,7 +17993,7 @@
           <p:cNvPr id="2" name="Título 1">
             <a:extLst>
               <a:ext uri="{FF2B5EF4-FFF2-40B4-BE49-F238E27FC236}">
-                <a16:creationId xmlns:a16="http://schemas.microsoft.com/office/drawing/2014/main" id="{0ED6D180-92C1-4333-BA91-2BBA4DD94A3B}"/>
+                <a16:creationId xmlns="" xmlns:a16="http://schemas.microsoft.com/office/drawing/2014/main" id="{0ED6D180-92C1-4333-BA91-2BBA4DD94A3B}"/>
               </a:ext>
             </a:extLst>
           </p:cNvPr>
@@ -17044,7 +18030,7 @@
           <p:cNvPr id="15" name="CuadroTexto 14">
             <a:extLst>
               <a:ext uri="{FF2B5EF4-FFF2-40B4-BE49-F238E27FC236}">
-                <a16:creationId xmlns:a16="http://schemas.microsoft.com/office/drawing/2014/main" id="{69C0BCF2-7C39-4E40-9C2B-2198580F3E40}"/>
+                <a16:creationId xmlns="" xmlns:a16="http://schemas.microsoft.com/office/drawing/2014/main" id="{69C0BCF2-7C39-4E40-9C2B-2198580F3E40}"/>
               </a:ext>
             </a:extLst>
           </p:cNvPr>
@@ -17115,7 +18101,7 @@
           <p:cNvPr id="17" name="CuadroTexto 16">
             <a:extLst>
               <a:ext uri="{FF2B5EF4-FFF2-40B4-BE49-F238E27FC236}">
-                <a16:creationId xmlns:a16="http://schemas.microsoft.com/office/drawing/2014/main" id="{F0BB235C-3047-4EFA-8B74-0EE023A1B6DF}"/>
+                <a16:creationId xmlns="" xmlns:a16="http://schemas.microsoft.com/office/drawing/2014/main" id="{F0BB235C-3047-4EFA-8B74-0EE023A1B6DF}"/>
               </a:ext>
             </a:extLst>
           </p:cNvPr>
@@ -17156,7 +18142,7 @@
           <p:cNvPr id="12" name="Imagen 11">
             <a:extLst>
               <a:ext uri="{FF2B5EF4-FFF2-40B4-BE49-F238E27FC236}">
-                <a16:creationId xmlns:a16="http://schemas.microsoft.com/office/drawing/2014/main" id="{2A9D7A44-27F6-4502-B24D-E951B30D6332}"/>
+                <a16:creationId xmlns="" xmlns:a16="http://schemas.microsoft.com/office/drawing/2014/main" id="{2A9D7A44-27F6-4502-B24D-E951B30D6332}"/>
               </a:ext>
             </a:extLst>
           </p:cNvPr>
@@ -17169,7 +18155,7 @@
           <a:blip r:embed="rId2" cstate="print">
             <a:extLst>
               <a:ext uri="{28A0092B-C50C-407E-A947-70E740481C1C}">
-                <a14:useLocalDpi xmlns:a14="http://schemas.microsoft.com/office/drawing/2010/main" val="0"/>
+                <a14:useLocalDpi xmlns="" xmlns:a14="http://schemas.microsoft.com/office/drawing/2010/main" val="0"/>
               </a:ext>
             </a:extLst>
           </a:blip>
@@ -17192,7 +18178,7 @@
           <p:cNvPr id="19" name="Imagen 18">
             <a:extLst>
               <a:ext uri="{FF2B5EF4-FFF2-40B4-BE49-F238E27FC236}">
-                <a16:creationId xmlns:a16="http://schemas.microsoft.com/office/drawing/2014/main" id="{82895803-8F79-4265-84E7-2467F906676D}"/>
+                <a16:creationId xmlns="" xmlns:a16="http://schemas.microsoft.com/office/drawing/2014/main" id="{82895803-8F79-4265-84E7-2467F906676D}"/>
               </a:ext>
             </a:extLst>
           </p:cNvPr>
@@ -17205,7 +18191,7 @@
           <a:blip r:embed="rId3" cstate="print">
             <a:extLst>
               <a:ext uri="{28A0092B-C50C-407E-A947-70E740481C1C}">
-                <a14:useLocalDpi xmlns:a14="http://schemas.microsoft.com/office/drawing/2010/main" val="0"/>
+                <a14:useLocalDpi xmlns="" xmlns:a14="http://schemas.microsoft.com/office/drawing/2010/main" val="0"/>
               </a:ext>
             </a:extLst>
           </a:blip>
@@ -17226,7 +18212,7 @@
     </p:spTree>
     <p:extLst>
       <p:ext uri="{BB962C8B-B14F-4D97-AF65-F5344CB8AC3E}">
-        <p14:creationId xmlns:p14="http://schemas.microsoft.com/office/powerpoint/2010/main" val="779257163"/>
+        <p14:creationId xmlns="" xmlns:p14="http://schemas.microsoft.com/office/powerpoint/2010/main" val="779257163"/>
       </p:ext>
     </p:extLst>
   </p:cSld>
@@ -17258,7 +18244,7 @@
           <p:cNvPr id="4" name="Rectángulo 3">
             <a:extLst>
               <a:ext uri="{FF2B5EF4-FFF2-40B4-BE49-F238E27FC236}">
-                <a16:creationId xmlns:a16="http://schemas.microsoft.com/office/drawing/2014/main" id="{B0F1B4F4-0C7A-4C0E-8584-95718BC545EC}"/>
+                <a16:creationId xmlns="" xmlns:a16="http://schemas.microsoft.com/office/drawing/2014/main" id="{B0F1B4F4-0C7A-4C0E-8584-95718BC545EC}"/>
               </a:ext>
             </a:extLst>
           </p:cNvPr>
@@ -17317,7 +18303,7 @@
     </p:spTree>
     <p:extLst>
       <p:ext uri="{BB962C8B-B14F-4D97-AF65-F5344CB8AC3E}">
-        <p14:creationId xmlns:p14="http://schemas.microsoft.com/office/powerpoint/2010/main" val="4228125147"/>
+        <p14:creationId xmlns="" xmlns:p14="http://schemas.microsoft.com/office/powerpoint/2010/main" val="4228125147"/>
       </p:ext>
     </p:extLst>
   </p:cSld>
@@ -17349,7 +18335,7 @@
           <p:cNvPr id="2" name="Título 1">
             <a:extLst>
               <a:ext uri="{FF2B5EF4-FFF2-40B4-BE49-F238E27FC236}">
-                <a16:creationId xmlns:a16="http://schemas.microsoft.com/office/drawing/2014/main" id="{0ED6D180-92C1-4333-BA91-2BBA4DD94A3B}"/>
+                <a16:creationId xmlns="" xmlns:a16="http://schemas.microsoft.com/office/drawing/2014/main" id="{0ED6D180-92C1-4333-BA91-2BBA4DD94A3B}"/>
               </a:ext>
             </a:extLst>
           </p:cNvPr>
@@ -17386,7 +18372,7 @@
           <p:cNvPr id="4" name="CuadroTexto 3">
             <a:extLst>
               <a:ext uri="{FF2B5EF4-FFF2-40B4-BE49-F238E27FC236}">
-                <a16:creationId xmlns:a16="http://schemas.microsoft.com/office/drawing/2014/main" id="{077AD978-631F-4986-B928-CABD7DCA36D6}"/>
+                <a16:creationId xmlns="" xmlns:a16="http://schemas.microsoft.com/office/drawing/2014/main" id="{077AD978-631F-4986-B928-CABD7DCA36D6}"/>
               </a:ext>
             </a:extLst>
           </p:cNvPr>
@@ -17509,7 +18495,7 @@
     </p:spTree>
     <p:extLst>
       <p:ext uri="{BB962C8B-B14F-4D97-AF65-F5344CB8AC3E}">
-        <p14:creationId xmlns:p14="http://schemas.microsoft.com/office/powerpoint/2010/main" val="3252879309"/>
+        <p14:creationId xmlns="" xmlns:p14="http://schemas.microsoft.com/office/powerpoint/2010/main" val="3252879309"/>
       </p:ext>
     </p:extLst>
   </p:cSld>
@@ -17541,7 +18527,7 @@
           <p:cNvPr id="2" name="Título 1">
             <a:extLst>
               <a:ext uri="{FF2B5EF4-FFF2-40B4-BE49-F238E27FC236}">
-                <a16:creationId xmlns:a16="http://schemas.microsoft.com/office/drawing/2014/main" id="{0ED6D180-92C1-4333-BA91-2BBA4DD94A3B}"/>
+                <a16:creationId xmlns="" xmlns:a16="http://schemas.microsoft.com/office/drawing/2014/main" id="{0ED6D180-92C1-4333-BA91-2BBA4DD94A3B}"/>
               </a:ext>
             </a:extLst>
           </p:cNvPr>
@@ -17578,7 +18564,7 @@
           <p:cNvPr id="6" name="CuadroTexto 5">
             <a:extLst>
               <a:ext uri="{FF2B5EF4-FFF2-40B4-BE49-F238E27FC236}">
-                <a16:creationId xmlns:a16="http://schemas.microsoft.com/office/drawing/2014/main" id="{BC8D092D-6667-447D-B473-A50467138064}"/>
+                <a16:creationId xmlns="" xmlns:a16="http://schemas.microsoft.com/office/drawing/2014/main" id="{BC8D092D-6667-447D-B473-A50467138064}"/>
               </a:ext>
             </a:extLst>
           </p:cNvPr>
@@ -17616,6 +18602,9 @@
             </a:pPr>
             <a:r>
               <a:rPr lang="es-ES" sz="2000" b="0" i="0" u="none" strike="noStrike" baseline="0" dirty="0">
+                <a:solidFill>
+                  <a:srgbClr val="FF0000"/>
+                </a:solidFill>
                 <a:latin typeface="Georgia" panose="02040502050405020303" pitchFamily="18" charset="0"/>
               </a:rPr>
               <a:t>Cambio de Proyecto</a:t>
@@ -17623,6 +18612,9 @@
           </a:p>
           <a:p>
             <a:endParaRPr lang="es-ES" sz="2000" b="0" i="0" u="none" strike="noStrike" baseline="0" dirty="0">
+              <a:solidFill>
+                <a:srgbClr val="FF0000"/>
+              </a:solidFill>
               <a:latin typeface="Georgia" panose="02040502050405020303" pitchFamily="18" charset="0"/>
             </a:endParaRPr>
           </a:p>
@@ -17633,11 +18625,17 @@
             </a:pPr>
             <a:r>
               <a:rPr lang="es-ES" sz="2000" dirty="0">
+                <a:solidFill>
+                  <a:srgbClr val="FF0000"/>
+                </a:solidFill>
                 <a:latin typeface="Georgia" panose="02040502050405020303" pitchFamily="18" charset="0"/>
               </a:rPr>
               <a:t>Cursada exitosa</a:t>
             </a:r>
             <a:endParaRPr lang="es-ES" sz="2000" b="0" i="0" u="none" strike="noStrike" baseline="0" dirty="0">
+              <a:solidFill>
+                <a:srgbClr val="FF0000"/>
+              </a:solidFill>
               <a:latin typeface="Georgia" panose="02040502050405020303" pitchFamily="18" charset="0"/>
             </a:endParaRPr>
           </a:p>
@@ -17684,7 +18682,7 @@
     </p:spTree>
     <p:extLst>
       <p:ext uri="{BB962C8B-B14F-4D97-AF65-F5344CB8AC3E}">
-        <p14:creationId xmlns:p14="http://schemas.microsoft.com/office/powerpoint/2010/main" val="2333497509"/>
+        <p14:creationId xmlns="" xmlns:p14="http://schemas.microsoft.com/office/powerpoint/2010/main" val="2333497509"/>
       </p:ext>
     </p:extLst>
   </p:cSld>
@@ -17944,7 +18942,7 @@
   <a:extraClrSchemeLst/>
   <a:extLst>
     <a:ext uri="{05A4C25C-085E-4340-85A3-A5531E510DB2}">
-      <thm15:themeFamily xmlns:thm15="http://schemas.microsoft.com/office/thememl/2012/main" name="Parallax" id="{3388167B-A2EB-4685-9635-1831D9AEF8C4}" vid="{4F7A876A-7598-49CA-AFC8-8EDA2551E4A7}"/>
+      <thm15:themeFamily xmlns="" xmlns:thm15="http://schemas.microsoft.com/office/thememl/2012/main" name="Parallax" id="{3388167B-A2EB-4685-9635-1831D9AEF8C4}" vid="{4F7A876A-7598-49CA-AFC8-8EDA2551E4A7}"/>
     </a:ext>
   </a:extLst>
 </a:theme>
@@ -18205,7 +19203,7 @@
   <a:extraClrSchemeLst/>
   <a:extLst>
     <a:ext uri="{05A4C25C-085E-4340-85A3-A5531E510DB2}">
-      <thm15:themeFamily xmlns:thm15="http://schemas.microsoft.com/office/thememl/2012/main" name="Office Theme" id="{62F939B6-93AF-4DB8-9C6B-D6C7DFDC589F}" vid="{4A3C46E8-61CC-4603-A589-7422A47A8E4A}"/>
+      <thm15:themeFamily xmlns="" xmlns:thm15="http://schemas.microsoft.com/office/thememl/2012/main" name="Office Theme" id="{62F939B6-93AF-4DB8-9C6B-D6C7DFDC589F}" vid="{4A3C46E8-61CC-4603-A589-7422A47A8E4A}"/>
     </a:ext>
   </a:extLst>
 </a:theme>

</xml_diff>

<commit_message>
Se actualiza la presentación final (sección de riesgos)
</commit_message>
<xml_diff>
--- a/Presentaciones/Presentación VASPA - Diciembre 2020 - Examen Final/Presentación VASPA - Diciembre 2020 - Examen Final.pptx
+++ b/Presentaciones/Presentación VASPA - Diciembre 2020 - Examen Final/Presentación VASPA - Diciembre 2020 - Examen Final.pptx
@@ -5,7 +5,7 @@
     <p:sldMasterId id="2147483933" r:id="rId1"/>
   </p:sldMasterIdLst>
   <p:notesMasterIdLst>
-    <p:notesMasterId r:id="rId37"/>
+    <p:notesMasterId r:id="rId36"/>
   </p:notesMasterIdLst>
   <p:sldIdLst>
     <p:sldId id="267" r:id="rId2"/>
@@ -28,21 +28,20 @@
     <p:sldId id="397" r:id="rId19"/>
     <p:sldId id="379" r:id="rId20"/>
     <p:sldId id="398" r:id="rId21"/>
-    <p:sldId id="380" r:id="rId22"/>
-    <p:sldId id="393" r:id="rId23"/>
-    <p:sldId id="394" r:id="rId24"/>
-    <p:sldId id="399" r:id="rId25"/>
-    <p:sldId id="381" r:id="rId26"/>
-    <p:sldId id="387" r:id="rId27"/>
-    <p:sldId id="395" r:id="rId28"/>
-    <p:sldId id="388" r:id="rId29"/>
-    <p:sldId id="401" r:id="rId30"/>
-    <p:sldId id="402" r:id="rId31"/>
-    <p:sldId id="391" r:id="rId32"/>
-    <p:sldId id="396" r:id="rId33"/>
-    <p:sldId id="389" r:id="rId34"/>
-    <p:sldId id="390" r:id="rId35"/>
-    <p:sldId id="275" r:id="rId36"/>
+    <p:sldId id="404" r:id="rId22"/>
+    <p:sldId id="405" r:id="rId23"/>
+    <p:sldId id="399" r:id="rId24"/>
+    <p:sldId id="381" r:id="rId25"/>
+    <p:sldId id="387" r:id="rId26"/>
+    <p:sldId id="395" r:id="rId27"/>
+    <p:sldId id="388" r:id="rId28"/>
+    <p:sldId id="401" r:id="rId29"/>
+    <p:sldId id="402" r:id="rId30"/>
+    <p:sldId id="391" r:id="rId31"/>
+    <p:sldId id="396" r:id="rId32"/>
+    <p:sldId id="389" r:id="rId33"/>
+    <p:sldId id="390" r:id="rId34"/>
+    <p:sldId id="275" r:id="rId35"/>
   </p:sldIdLst>
   <p:sldSz cx="12192000" cy="6858000"/>
   <p:notesSz cx="6858000" cy="9144000"/>
@@ -205,6 +204,7 @@
           </a:p>
         </c:rich>
       </c:tx>
+      <c:layout/>
       <c:overlay val="0"/>
       <c:spPr>
         <a:noFill/>
@@ -612,6 +612,7 @@
     </c:plotArea>
     <c:legend>
       <c:legendPos val="b"/>
+      <c:layout/>
       <c:overlay val="0"/>
       <c:spPr>
         <a:noFill/>
@@ -643,6 +644,7 @@
     </c:legend>
     <c:plotVisOnly val="1"/>
     <c:dispBlanksAs val="gap"/>
+    <c:showDLblsOverMax val="0"/>
     <c:extLst>
       <c:ext xmlns:c16r3="http://schemas.microsoft.com/office/drawing/2017/03/chart" uri="{56B9EC1D-385E-4148-901F-78D8002777C0}">
         <c16r3:dataDisplayOptions16>
@@ -650,7 +652,6 @@
         </c16r3:dataDisplayOptions16>
       </c:ext>
     </c:extLst>
-    <c:showDLblsOverMax val="0"/>
   </c:chart>
   <c:spPr>
     <a:solidFill>
@@ -685,6 +686,753 @@
 </file>
 
 <file path=ppt/diagrams/colors1.xml><?xml version="1.0" encoding="utf-8"?>
+<dgm:colorsDef xmlns:dgm="http://schemas.openxmlformats.org/drawingml/2006/diagram" xmlns:a="http://schemas.openxmlformats.org/drawingml/2006/main" uniqueId="urn:microsoft.com/office/officeart/2005/8/colors/accent1_2">
+  <dgm:title val=""/>
+  <dgm:desc val=""/>
+  <dgm:catLst>
+    <dgm:cat type="accent1" pri="11200"/>
+  </dgm:catLst>
+  <dgm:styleLbl name="node0">
+    <dgm:fillClrLst meth="repeat">
+      <a:schemeClr val="accent1"/>
+    </dgm:fillClrLst>
+    <dgm:linClrLst meth="repeat">
+      <a:schemeClr val="lt1"/>
+    </dgm:linClrLst>
+    <dgm:effectClrLst/>
+    <dgm:txLinClrLst/>
+    <dgm:txFillClrLst/>
+    <dgm:txEffectClrLst/>
+  </dgm:styleLbl>
+  <dgm:styleLbl name="alignNode1">
+    <dgm:fillClrLst meth="repeat">
+      <a:schemeClr val="accent1"/>
+    </dgm:fillClrLst>
+    <dgm:linClrLst meth="repeat">
+      <a:schemeClr val="accent1"/>
+    </dgm:linClrLst>
+    <dgm:effectClrLst/>
+    <dgm:txLinClrLst/>
+    <dgm:txFillClrLst/>
+    <dgm:txEffectClrLst/>
+  </dgm:styleLbl>
+  <dgm:styleLbl name="node1">
+    <dgm:fillClrLst meth="repeat">
+      <a:schemeClr val="accent1"/>
+    </dgm:fillClrLst>
+    <dgm:linClrLst meth="repeat">
+      <a:schemeClr val="lt1"/>
+    </dgm:linClrLst>
+    <dgm:effectClrLst/>
+    <dgm:txLinClrLst/>
+    <dgm:txFillClrLst/>
+    <dgm:txEffectClrLst/>
+  </dgm:styleLbl>
+  <dgm:styleLbl name="lnNode1">
+    <dgm:fillClrLst meth="repeat">
+      <a:schemeClr val="accent1"/>
+    </dgm:fillClrLst>
+    <dgm:linClrLst meth="repeat">
+      <a:schemeClr val="lt1"/>
+    </dgm:linClrLst>
+    <dgm:effectClrLst/>
+    <dgm:txLinClrLst/>
+    <dgm:txFillClrLst/>
+    <dgm:txEffectClrLst/>
+  </dgm:styleLbl>
+  <dgm:styleLbl name="vennNode1">
+    <dgm:fillClrLst meth="repeat">
+      <a:schemeClr val="accent1">
+        <a:alpha val="50000"/>
+      </a:schemeClr>
+    </dgm:fillClrLst>
+    <dgm:linClrLst meth="repeat">
+      <a:schemeClr val="lt1"/>
+    </dgm:linClrLst>
+    <dgm:effectClrLst/>
+    <dgm:txLinClrLst/>
+    <dgm:txFillClrLst/>
+    <dgm:txEffectClrLst/>
+  </dgm:styleLbl>
+  <dgm:styleLbl name="node2">
+    <dgm:fillClrLst meth="repeat">
+      <a:schemeClr val="accent1"/>
+    </dgm:fillClrLst>
+    <dgm:linClrLst meth="repeat">
+      <a:schemeClr val="lt1"/>
+    </dgm:linClrLst>
+    <dgm:effectClrLst/>
+    <dgm:txLinClrLst/>
+    <dgm:txFillClrLst/>
+    <dgm:txEffectClrLst/>
+  </dgm:styleLbl>
+  <dgm:styleLbl name="node3">
+    <dgm:fillClrLst meth="repeat">
+      <a:schemeClr val="accent1"/>
+    </dgm:fillClrLst>
+    <dgm:linClrLst meth="repeat">
+      <a:schemeClr val="lt1"/>
+    </dgm:linClrLst>
+    <dgm:effectClrLst/>
+    <dgm:txLinClrLst/>
+    <dgm:txFillClrLst/>
+    <dgm:txEffectClrLst/>
+  </dgm:styleLbl>
+  <dgm:styleLbl name="node4">
+    <dgm:fillClrLst meth="repeat">
+      <a:schemeClr val="accent1"/>
+    </dgm:fillClrLst>
+    <dgm:linClrLst meth="repeat">
+      <a:schemeClr val="lt1"/>
+    </dgm:linClrLst>
+    <dgm:effectClrLst/>
+    <dgm:txLinClrLst/>
+    <dgm:txFillClrLst/>
+    <dgm:txEffectClrLst/>
+  </dgm:styleLbl>
+  <dgm:styleLbl name="fgImgPlace1">
+    <dgm:fillClrLst meth="repeat">
+      <a:schemeClr val="accent1">
+        <a:tint val="50000"/>
+      </a:schemeClr>
+    </dgm:fillClrLst>
+    <dgm:linClrLst meth="repeat">
+      <a:schemeClr val="lt1"/>
+    </dgm:linClrLst>
+    <dgm:effectClrLst/>
+    <dgm:txLinClrLst/>
+    <dgm:txFillClrLst meth="repeat">
+      <a:schemeClr val="lt1"/>
+    </dgm:txFillClrLst>
+    <dgm:txEffectClrLst/>
+  </dgm:styleLbl>
+  <dgm:styleLbl name="alignImgPlace1">
+    <dgm:fillClrLst meth="repeat">
+      <a:schemeClr val="accent1">
+        <a:tint val="50000"/>
+      </a:schemeClr>
+    </dgm:fillClrLst>
+    <dgm:linClrLst meth="repeat">
+      <a:schemeClr val="lt1"/>
+    </dgm:linClrLst>
+    <dgm:effectClrLst/>
+    <dgm:txLinClrLst/>
+    <dgm:txFillClrLst meth="repeat">
+      <a:schemeClr val="lt1"/>
+    </dgm:txFillClrLst>
+    <dgm:txEffectClrLst/>
+  </dgm:styleLbl>
+  <dgm:styleLbl name="bgImgPlace1">
+    <dgm:fillClrLst meth="repeat">
+      <a:schemeClr val="accent1">
+        <a:tint val="50000"/>
+      </a:schemeClr>
+    </dgm:fillClrLst>
+    <dgm:linClrLst meth="repeat">
+      <a:schemeClr val="lt1"/>
+    </dgm:linClrLst>
+    <dgm:effectClrLst/>
+    <dgm:txLinClrLst/>
+    <dgm:txFillClrLst meth="repeat">
+      <a:schemeClr val="lt1"/>
+    </dgm:txFillClrLst>
+    <dgm:txEffectClrLst/>
+  </dgm:styleLbl>
+  <dgm:styleLbl name="sibTrans2D1">
+    <dgm:fillClrLst meth="repeat">
+      <a:schemeClr val="accent1">
+        <a:tint val="60000"/>
+      </a:schemeClr>
+    </dgm:fillClrLst>
+    <dgm:linClrLst meth="repeat">
+      <a:schemeClr val="accent1">
+        <a:tint val="60000"/>
+      </a:schemeClr>
+    </dgm:linClrLst>
+    <dgm:effectClrLst/>
+    <dgm:txLinClrLst/>
+    <dgm:txFillClrLst/>
+    <dgm:txEffectClrLst/>
+  </dgm:styleLbl>
+  <dgm:styleLbl name="fgSibTrans2D1">
+    <dgm:fillClrLst meth="repeat">
+      <a:schemeClr val="accent1">
+        <a:tint val="60000"/>
+      </a:schemeClr>
+    </dgm:fillClrLst>
+    <dgm:linClrLst meth="repeat">
+      <a:schemeClr val="accent1">
+        <a:tint val="60000"/>
+      </a:schemeClr>
+    </dgm:linClrLst>
+    <dgm:effectClrLst/>
+    <dgm:txLinClrLst/>
+    <dgm:txFillClrLst/>
+    <dgm:txEffectClrLst/>
+  </dgm:styleLbl>
+  <dgm:styleLbl name="bgSibTrans2D1">
+    <dgm:fillClrLst meth="repeat">
+      <a:schemeClr val="accent1">
+        <a:tint val="60000"/>
+      </a:schemeClr>
+    </dgm:fillClrLst>
+    <dgm:linClrLst meth="repeat">
+      <a:schemeClr val="accent1">
+        <a:tint val="60000"/>
+      </a:schemeClr>
+    </dgm:linClrLst>
+    <dgm:effectClrLst/>
+    <dgm:txLinClrLst/>
+    <dgm:txFillClrLst/>
+    <dgm:txEffectClrLst/>
+  </dgm:styleLbl>
+  <dgm:styleLbl name="sibTrans1D1">
+    <dgm:fillClrLst meth="repeat">
+      <a:schemeClr val="accent1"/>
+    </dgm:fillClrLst>
+    <dgm:linClrLst meth="repeat">
+      <a:schemeClr val="accent1"/>
+    </dgm:linClrLst>
+    <dgm:effectClrLst/>
+    <dgm:txLinClrLst/>
+    <dgm:txFillClrLst meth="repeat">
+      <a:schemeClr val="tx1"/>
+    </dgm:txFillClrLst>
+    <dgm:txEffectClrLst/>
+  </dgm:styleLbl>
+  <dgm:styleLbl name="callout">
+    <dgm:fillClrLst meth="repeat">
+      <a:schemeClr val="accent1"/>
+    </dgm:fillClrLst>
+    <dgm:linClrLst meth="repeat">
+      <a:schemeClr val="accent1">
+        <a:tint val="50000"/>
+      </a:schemeClr>
+    </dgm:linClrLst>
+    <dgm:effectClrLst/>
+    <dgm:txLinClrLst/>
+    <dgm:txFillClrLst meth="repeat">
+      <a:schemeClr val="tx1"/>
+    </dgm:txFillClrLst>
+    <dgm:txEffectClrLst/>
+  </dgm:styleLbl>
+  <dgm:styleLbl name="asst0">
+    <dgm:fillClrLst meth="repeat">
+      <a:schemeClr val="accent1"/>
+    </dgm:fillClrLst>
+    <dgm:linClrLst meth="repeat">
+      <a:schemeClr val="lt1"/>
+    </dgm:linClrLst>
+    <dgm:effectClrLst/>
+    <dgm:txLinClrLst/>
+    <dgm:txFillClrLst/>
+    <dgm:txEffectClrLst/>
+  </dgm:styleLbl>
+  <dgm:styleLbl name="asst1">
+    <dgm:fillClrLst meth="repeat">
+      <a:schemeClr val="accent1"/>
+    </dgm:fillClrLst>
+    <dgm:linClrLst meth="repeat">
+      <a:schemeClr val="lt1"/>
+    </dgm:linClrLst>
+    <dgm:effectClrLst/>
+    <dgm:txLinClrLst/>
+    <dgm:txFillClrLst/>
+    <dgm:txEffectClrLst/>
+  </dgm:styleLbl>
+  <dgm:styleLbl name="asst2">
+    <dgm:fillClrLst meth="repeat">
+      <a:schemeClr val="accent1"/>
+    </dgm:fillClrLst>
+    <dgm:linClrLst meth="repeat">
+      <a:schemeClr val="lt1"/>
+    </dgm:linClrLst>
+    <dgm:effectClrLst/>
+    <dgm:txLinClrLst/>
+    <dgm:txFillClrLst/>
+    <dgm:txEffectClrLst/>
+  </dgm:styleLbl>
+  <dgm:styleLbl name="asst3">
+    <dgm:fillClrLst meth="repeat">
+      <a:schemeClr val="accent1"/>
+    </dgm:fillClrLst>
+    <dgm:linClrLst meth="repeat">
+      <a:schemeClr val="lt1"/>
+    </dgm:linClrLst>
+    <dgm:effectClrLst/>
+    <dgm:txLinClrLst/>
+    <dgm:txFillClrLst/>
+    <dgm:txEffectClrLst/>
+  </dgm:styleLbl>
+  <dgm:styleLbl name="asst4">
+    <dgm:fillClrLst meth="repeat">
+      <a:schemeClr val="accent1"/>
+    </dgm:fillClrLst>
+    <dgm:linClrLst meth="repeat">
+      <a:schemeClr val="lt1"/>
+    </dgm:linClrLst>
+    <dgm:effectClrLst/>
+    <dgm:txLinClrLst/>
+    <dgm:txFillClrLst/>
+    <dgm:txEffectClrLst/>
+  </dgm:styleLbl>
+  <dgm:styleLbl name="parChTrans2D1">
+    <dgm:fillClrLst meth="repeat">
+      <a:schemeClr val="accent1">
+        <a:tint val="60000"/>
+      </a:schemeClr>
+    </dgm:fillClrLst>
+    <dgm:linClrLst meth="repeat">
+      <a:schemeClr val="accent1">
+        <a:tint val="60000"/>
+      </a:schemeClr>
+    </dgm:linClrLst>
+    <dgm:effectClrLst/>
+    <dgm:txLinClrLst/>
+    <dgm:txFillClrLst meth="repeat">
+      <a:schemeClr val="lt1"/>
+    </dgm:txFillClrLst>
+    <dgm:txEffectClrLst/>
+  </dgm:styleLbl>
+  <dgm:styleLbl name="parChTrans2D2">
+    <dgm:fillClrLst meth="repeat">
+      <a:schemeClr val="accent1"/>
+    </dgm:fillClrLst>
+    <dgm:linClrLst meth="repeat">
+      <a:schemeClr val="accent1"/>
+    </dgm:linClrLst>
+    <dgm:effectClrLst/>
+    <dgm:txLinClrLst/>
+    <dgm:txFillClrLst meth="repeat">
+      <a:schemeClr val="lt1"/>
+    </dgm:txFillClrLst>
+    <dgm:txEffectClrLst/>
+  </dgm:styleLbl>
+  <dgm:styleLbl name="parChTrans2D3">
+    <dgm:fillClrLst meth="repeat">
+      <a:schemeClr val="accent1"/>
+    </dgm:fillClrLst>
+    <dgm:linClrLst meth="repeat">
+      <a:schemeClr val="accent1"/>
+    </dgm:linClrLst>
+    <dgm:effectClrLst/>
+    <dgm:txLinClrLst/>
+    <dgm:txFillClrLst meth="repeat">
+      <a:schemeClr val="lt1"/>
+    </dgm:txFillClrLst>
+    <dgm:txEffectClrLst/>
+  </dgm:styleLbl>
+  <dgm:styleLbl name="parChTrans2D4">
+    <dgm:fillClrLst meth="repeat">
+      <a:schemeClr val="accent1"/>
+    </dgm:fillClrLst>
+    <dgm:linClrLst meth="repeat">
+      <a:schemeClr val="accent1"/>
+    </dgm:linClrLst>
+    <dgm:effectClrLst/>
+    <dgm:txLinClrLst/>
+    <dgm:txFillClrLst meth="repeat">
+      <a:schemeClr val="lt1"/>
+    </dgm:txFillClrLst>
+    <dgm:txEffectClrLst/>
+  </dgm:styleLbl>
+  <dgm:styleLbl name="parChTrans1D1">
+    <dgm:fillClrLst meth="repeat">
+      <a:schemeClr val="accent1"/>
+    </dgm:fillClrLst>
+    <dgm:linClrLst meth="repeat">
+      <a:schemeClr val="accent1">
+        <a:shade val="60000"/>
+      </a:schemeClr>
+    </dgm:linClrLst>
+    <dgm:effectClrLst/>
+    <dgm:txLinClrLst/>
+    <dgm:txFillClrLst meth="repeat">
+      <a:schemeClr val="tx1"/>
+    </dgm:txFillClrLst>
+    <dgm:txEffectClrLst/>
+  </dgm:styleLbl>
+  <dgm:styleLbl name="parChTrans1D2">
+    <dgm:fillClrLst meth="repeat">
+      <a:schemeClr val="accent1"/>
+    </dgm:fillClrLst>
+    <dgm:linClrLst meth="repeat">
+      <a:schemeClr val="accent1">
+        <a:shade val="60000"/>
+      </a:schemeClr>
+    </dgm:linClrLst>
+    <dgm:effectClrLst/>
+    <dgm:txLinClrLst/>
+    <dgm:txFillClrLst meth="repeat">
+      <a:schemeClr val="tx1"/>
+    </dgm:txFillClrLst>
+    <dgm:txEffectClrLst/>
+  </dgm:styleLbl>
+  <dgm:styleLbl name="parChTrans1D3">
+    <dgm:fillClrLst meth="repeat">
+      <a:schemeClr val="accent1"/>
+    </dgm:fillClrLst>
+    <dgm:linClrLst meth="repeat">
+      <a:schemeClr val="accent1">
+        <a:shade val="80000"/>
+      </a:schemeClr>
+    </dgm:linClrLst>
+    <dgm:effectClrLst/>
+    <dgm:txLinClrLst/>
+    <dgm:txFillClrLst meth="repeat">
+      <a:schemeClr val="tx1"/>
+    </dgm:txFillClrLst>
+    <dgm:txEffectClrLst/>
+  </dgm:styleLbl>
+  <dgm:styleLbl name="parChTrans1D4">
+    <dgm:fillClrLst meth="repeat">
+      <a:schemeClr val="accent1"/>
+    </dgm:fillClrLst>
+    <dgm:linClrLst meth="repeat">
+      <a:schemeClr val="accent1">
+        <a:shade val="80000"/>
+      </a:schemeClr>
+    </dgm:linClrLst>
+    <dgm:effectClrLst/>
+    <dgm:txLinClrLst/>
+    <dgm:txFillClrLst meth="repeat">
+      <a:schemeClr val="tx1"/>
+    </dgm:txFillClrLst>
+    <dgm:txEffectClrLst/>
+  </dgm:styleLbl>
+  <dgm:styleLbl name="fgAcc1">
+    <dgm:fillClrLst meth="repeat">
+      <a:schemeClr val="lt1">
+        <a:alpha val="90000"/>
+      </a:schemeClr>
+    </dgm:fillClrLst>
+    <dgm:linClrLst meth="repeat">
+      <a:schemeClr val="accent1"/>
+    </dgm:linClrLst>
+    <dgm:effectClrLst/>
+    <dgm:txLinClrLst/>
+    <dgm:txFillClrLst meth="repeat">
+      <a:schemeClr val="dk1"/>
+    </dgm:txFillClrLst>
+    <dgm:txEffectClrLst/>
+  </dgm:styleLbl>
+  <dgm:styleLbl name="conFgAcc1">
+    <dgm:fillClrLst meth="repeat">
+      <a:schemeClr val="lt1">
+        <a:alpha val="90000"/>
+      </a:schemeClr>
+    </dgm:fillClrLst>
+    <dgm:linClrLst meth="repeat">
+      <a:schemeClr val="accent1"/>
+    </dgm:linClrLst>
+    <dgm:effectClrLst/>
+    <dgm:txLinClrLst/>
+    <dgm:txFillClrLst meth="repeat">
+      <a:schemeClr val="dk1"/>
+    </dgm:txFillClrLst>
+    <dgm:txEffectClrLst/>
+  </dgm:styleLbl>
+  <dgm:styleLbl name="alignAcc1">
+    <dgm:fillClrLst meth="repeat">
+      <a:schemeClr val="lt1">
+        <a:alpha val="90000"/>
+      </a:schemeClr>
+    </dgm:fillClrLst>
+    <dgm:linClrLst meth="repeat">
+      <a:schemeClr val="accent1"/>
+    </dgm:linClrLst>
+    <dgm:effectClrLst/>
+    <dgm:txLinClrLst/>
+    <dgm:txFillClrLst meth="repeat">
+      <a:schemeClr val="dk1"/>
+    </dgm:txFillClrLst>
+    <dgm:txEffectClrLst/>
+  </dgm:styleLbl>
+  <dgm:styleLbl name="trAlignAcc1">
+    <dgm:fillClrLst meth="repeat">
+      <a:schemeClr val="lt1">
+        <a:alpha val="40000"/>
+      </a:schemeClr>
+    </dgm:fillClrLst>
+    <dgm:linClrLst meth="repeat">
+      <a:schemeClr val="accent1"/>
+    </dgm:linClrLst>
+    <dgm:effectClrLst/>
+    <dgm:txLinClrLst/>
+    <dgm:txFillClrLst meth="repeat">
+      <a:schemeClr val="dk1"/>
+    </dgm:txFillClrLst>
+    <dgm:txEffectClrLst/>
+  </dgm:styleLbl>
+  <dgm:styleLbl name="bgAcc1">
+    <dgm:fillClrLst meth="repeat">
+      <a:schemeClr val="lt1">
+        <a:alpha val="90000"/>
+      </a:schemeClr>
+    </dgm:fillClrLst>
+    <dgm:linClrLst meth="repeat">
+      <a:schemeClr val="accent1"/>
+    </dgm:linClrLst>
+    <dgm:effectClrLst/>
+    <dgm:txLinClrLst/>
+    <dgm:txFillClrLst meth="repeat">
+      <a:schemeClr val="dk1"/>
+    </dgm:txFillClrLst>
+    <dgm:txEffectClrLst/>
+  </dgm:styleLbl>
+  <dgm:styleLbl name="solidFgAcc1">
+    <dgm:fillClrLst meth="repeat">
+      <a:schemeClr val="lt1"/>
+    </dgm:fillClrLst>
+    <dgm:linClrLst meth="repeat">
+      <a:schemeClr val="accent1"/>
+    </dgm:linClrLst>
+    <dgm:effectClrLst/>
+    <dgm:txLinClrLst/>
+    <dgm:txFillClrLst meth="repeat">
+      <a:schemeClr val="dk1"/>
+    </dgm:txFillClrLst>
+    <dgm:txEffectClrLst/>
+  </dgm:styleLbl>
+  <dgm:styleLbl name="solidAlignAcc1">
+    <dgm:fillClrLst meth="repeat">
+      <a:schemeClr val="lt1"/>
+    </dgm:fillClrLst>
+    <dgm:linClrLst meth="repeat">
+      <a:schemeClr val="accent1"/>
+    </dgm:linClrLst>
+    <dgm:effectClrLst/>
+    <dgm:txLinClrLst/>
+    <dgm:txFillClrLst meth="repeat">
+      <a:schemeClr val="dk1"/>
+    </dgm:txFillClrLst>
+    <dgm:txEffectClrLst/>
+  </dgm:styleLbl>
+  <dgm:styleLbl name="solidBgAcc1">
+    <dgm:fillClrLst meth="repeat">
+      <a:schemeClr val="lt1"/>
+    </dgm:fillClrLst>
+    <dgm:linClrLst meth="repeat">
+      <a:schemeClr val="accent1"/>
+    </dgm:linClrLst>
+    <dgm:effectClrLst/>
+    <dgm:txLinClrLst/>
+    <dgm:txFillClrLst meth="repeat">
+      <a:schemeClr val="dk1"/>
+    </dgm:txFillClrLst>
+    <dgm:txEffectClrLst/>
+  </dgm:styleLbl>
+  <dgm:styleLbl name="fgAccFollowNode1">
+    <dgm:fillClrLst meth="repeat">
+      <a:schemeClr val="accent1">
+        <a:alpha val="90000"/>
+        <a:tint val="40000"/>
+      </a:schemeClr>
+    </dgm:fillClrLst>
+    <dgm:linClrLst meth="repeat">
+      <a:schemeClr val="accent1">
+        <a:alpha val="90000"/>
+        <a:tint val="40000"/>
+      </a:schemeClr>
+    </dgm:linClrLst>
+    <dgm:effectClrLst/>
+    <dgm:txLinClrLst/>
+    <dgm:txFillClrLst meth="repeat">
+      <a:schemeClr val="dk1"/>
+    </dgm:txFillClrLst>
+    <dgm:txEffectClrLst/>
+  </dgm:styleLbl>
+  <dgm:styleLbl name="alignAccFollowNode1">
+    <dgm:fillClrLst meth="repeat">
+      <a:schemeClr val="accent1">
+        <a:alpha val="90000"/>
+        <a:tint val="40000"/>
+      </a:schemeClr>
+    </dgm:fillClrLst>
+    <dgm:linClrLst meth="repeat">
+      <a:schemeClr val="accent1">
+        <a:alpha val="90000"/>
+        <a:tint val="40000"/>
+      </a:schemeClr>
+    </dgm:linClrLst>
+    <dgm:effectClrLst/>
+    <dgm:txLinClrLst/>
+    <dgm:txFillClrLst meth="repeat">
+      <a:schemeClr val="dk1"/>
+    </dgm:txFillClrLst>
+    <dgm:txEffectClrLst/>
+  </dgm:styleLbl>
+  <dgm:styleLbl name="bgAccFollowNode1">
+    <dgm:fillClrLst meth="repeat">
+      <a:schemeClr val="accent1">
+        <a:alpha val="90000"/>
+        <a:tint val="40000"/>
+      </a:schemeClr>
+    </dgm:fillClrLst>
+    <dgm:linClrLst meth="repeat">
+      <a:schemeClr val="accent1">
+        <a:alpha val="90000"/>
+        <a:tint val="40000"/>
+      </a:schemeClr>
+    </dgm:linClrLst>
+    <dgm:effectClrLst/>
+    <dgm:txLinClrLst/>
+    <dgm:txFillClrLst meth="repeat">
+      <a:schemeClr val="dk1"/>
+    </dgm:txFillClrLst>
+    <dgm:txEffectClrLst/>
+  </dgm:styleLbl>
+  <dgm:styleLbl name="fgAcc0">
+    <dgm:fillClrLst meth="repeat">
+      <a:schemeClr val="lt1">
+        <a:alpha val="90000"/>
+      </a:schemeClr>
+    </dgm:fillClrLst>
+    <dgm:linClrLst meth="repeat">
+      <a:schemeClr val="accent1"/>
+    </dgm:linClrLst>
+    <dgm:effectClrLst/>
+    <dgm:txLinClrLst/>
+    <dgm:txFillClrLst meth="repeat">
+      <a:schemeClr val="dk1"/>
+    </dgm:txFillClrLst>
+    <dgm:txEffectClrLst/>
+  </dgm:styleLbl>
+  <dgm:styleLbl name="fgAcc2">
+    <dgm:fillClrLst meth="repeat">
+      <a:schemeClr val="lt1">
+        <a:alpha val="90000"/>
+      </a:schemeClr>
+    </dgm:fillClrLst>
+    <dgm:linClrLst meth="repeat">
+      <a:schemeClr val="accent1"/>
+    </dgm:linClrLst>
+    <dgm:effectClrLst/>
+    <dgm:txLinClrLst/>
+    <dgm:txFillClrLst meth="repeat">
+      <a:schemeClr val="dk1"/>
+    </dgm:txFillClrLst>
+    <dgm:txEffectClrLst/>
+  </dgm:styleLbl>
+  <dgm:styleLbl name="fgAcc3">
+    <dgm:fillClrLst meth="repeat">
+      <a:schemeClr val="lt1">
+        <a:alpha val="90000"/>
+      </a:schemeClr>
+    </dgm:fillClrLst>
+    <dgm:linClrLst meth="repeat">
+      <a:schemeClr val="accent1"/>
+    </dgm:linClrLst>
+    <dgm:effectClrLst/>
+    <dgm:txLinClrLst/>
+    <dgm:txFillClrLst meth="repeat">
+      <a:schemeClr val="dk1"/>
+    </dgm:txFillClrLst>
+    <dgm:txEffectClrLst/>
+  </dgm:styleLbl>
+  <dgm:styleLbl name="fgAcc4">
+    <dgm:fillClrLst meth="repeat">
+      <a:schemeClr val="lt1">
+        <a:alpha val="90000"/>
+      </a:schemeClr>
+    </dgm:fillClrLst>
+    <dgm:linClrLst meth="repeat">
+      <a:schemeClr val="accent1"/>
+    </dgm:linClrLst>
+    <dgm:effectClrLst/>
+    <dgm:txLinClrLst/>
+    <dgm:txFillClrLst meth="repeat">
+      <a:schemeClr val="dk1"/>
+    </dgm:txFillClrLst>
+    <dgm:txEffectClrLst/>
+  </dgm:styleLbl>
+  <dgm:styleLbl name="bgShp">
+    <dgm:fillClrLst meth="repeat">
+      <a:schemeClr val="accent1">
+        <a:tint val="40000"/>
+      </a:schemeClr>
+    </dgm:fillClrLst>
+    <dgm:linClrLst meth="repeat">
+      <a:schemeClr val="accent1"/>
+    </dgm:linClrLst>
+    <dgm:effectClrLst/>
+    <dgm:txLinClrLst/>
+    <dgm:txFillClrLst meth="repeat">
+      <a:schemeClr val="dk1"/>
+    </dgm:txFillClrLst>
+    <dgm:txEffectClrLst/>
+  </dgm:styleLbl>
+  <dgm:styleLbl name="dkBgShp">
+    <dgm:fillClrLst meth="repeat">
+      <a:schemeClr val="accent1">
+        <a:shade val="80000"/>
+      </a:schemeClr>
+    </dgm:fillClrLst>
+    <dgm:linClrLst meth="repeat">
+      <a:schemeClr val="accent1"/>
+    </dgm:linClrLst>
+    <dgm:effectClrLst/>
+    <dgm:txLinClrLst/>
+    <dgm:txFillClrLst meth="repeat">
+      <a:schemeClr val="lt1"/>
+    </dgm:txFillClrLst>
+    <dgm:txEffectClrLst/>
+  </dgm:styleLbl>
+  <dgm:styleLbl name="trBgShp">
+    <dgm:fillClrLst meth="repeat">
+      <a:schemeClr val="accent1">
+        <a:tint val="50000"/>
+        <a:alpha val="40000"/>
+      </a:schemeClr>
+    </dgm:fillClrLst>
+    <dgm:linClrLst meth="repeat">
+      <a:schemeClr val="accent1"/>
+    </dgm:linClrLst>
+    <dgm:effectClrLst/>
+    <dgm:txLinClrLst/>
+    <dgm:txFillClrLst meth="repeat">
+      <a:schemeClr val="lt1"/>
+    </dgm:txFillClrLst>
+    <dgm:txEffectClrLst/>
+  </dgm:styleLbl>
+  <dgm:styleLbl name="fgShp">
+    <dgm:fillClrLst meth="repeat">
+      <a:schemeClr val="accent1">
+        <a:tint val="60000"/>
+      </a:schemeClr>
+    </dgm:fillClrLst>
+    <dgm:linClrLst meth="repeat">
+      <a:schemeClr val="lt1"/>
+    </dgm:linClrLst>
+    <dgm:effectClrLst/>
+    <dgm:txLinClrLst/>
+    <dgm:txFillClrLst meth="repeat">
+      <a:schemeClr val="dk1"/>
+    </dgm:txFillClrLst>
+    <dgm:txEffectClrLst/>
+  </dgm:styleLbl>
+  <dgm:styleLbl name="revTx">
+    <dgm:fillClrLst meth="repeat">
+      <a:schemeClr val="lt1">
+        <a:alpha val="0"/>
+      </a:schemeClr>
+    </dgm:fillClrLst>
+    <dgm:linClrLst meth="repeat">
+      <a:schemeClr val="dk1">
+        <a:alpha val="0"/>
+      </a:schemeClr>
+    </dgm:linClrLst>
+    <dgm:effectClrLst/>
+    <dgm:txLinClrLst/>
+    <dgm:txFillClrLst meth="repeat">
+      <a:schemeClr val="tx1"/>
+    </dgm:txFillClrLst>
+    <dgm:txEffectClrLst/>
+  </dgm:styleLbl>
+</dgm:colorsDef>
+</file>
+
+<file path=ppt/diagrams/colors2.xml><?xml version="1.0" encoding="utf-8"?>
 <dgm:colorsDef xmlns:dgm="http://schemas.openxmlformats.org/drawingml/2006/diagram" xmlns:a="http://schemas.openxmlformats.org/drawingml/2006/main" uniqueId="urn:microsoft.com/office/officeart/2005/8/colors/accent1_2">
   <dgm:title val=""/>
   <dgm:desc val=""/>
@@ -1662,6 +2410,13 @@
         </dgm:presLayoutVars>
       </dgm:prSet>
       <dgm:spPr/>
+      <dgm:t>
+        <a:bodyPr/>
+        <a:lstStyle/>
+        <a:p>
+          <a:endParaRPr lang="es-ES"/>
+        </a:p>
+      </dgm:t>
     </dgm:pt>
     <dgm:pt modelId="{3D5C674D-195F-4346-A602-68D809648B83}" type="pres">
       <dgm:prSet presAssocID="{853FF75D-08FD-4C0B-97FF-B95C5121D1D7}" presName="parTxOnly" presStyleLbl="node1" presStyleIdx="0" presStyleCnt="4">
@@ -1672,6 +2427,13 @@
         </dgm:presLayoutVars>
       </dgm:prSet>
       <dgm:spPr/>
+      <dgm:t>
+        <a:bodyPr/>
+        <a:lstStyle/>
+        <a:p>
+          <a:endParaRPr lang="es-ES"/>
+        </a:p>
+      </dgm:t>
     </dgm:pt>
     <dgm:pt modelId="{4DCC4052-4221-44D0-84E2-29AAAD96FCB3}" type="pres">
       <dgm:prSet presAssocID="{888E8F23-D971-4F49-AF2A-2D3F7847711C}" presName="parTxOnlySpace" presStyleCnt="0"/>
@@ -1686,6 +2448,13 @@
         </dgm:presLayoutVars>
       </dgm:prSet>
       <dgm:spPr/>
+      <dgm:t>
+        <a:bodyPr/>
+        <a:lstStyle/>
+        <a:p>
+          <a:endParaRPr lang="es-ES"/>
+        </a:p>
+      </dgm:t>
     </dgm:pt>
     <dgm:pt modelId="{A6E2C1E9-D2ED-47B3-A71D-FDA80BA4D0C1}" type="pres">
       <dgm:prSet presAssocID="{431F7064-B371-4D30-9440-9276B420E393}" presName="parTxOnlySpace" presStyleCnt="0"/>
@@ -1700,6 +2469,13 @@
         </dgm:presLayoutVars>
       </dgm:prSet>
       <dgm:spPr/>
+      <dgm:t>
+        <a:bodyPr/>
+        <a:lstStyle/>
+        <a:p>
+          <a:endParaRPr lang="es-ES"/>
+        </a:p>
+      </dgm:t>
     </dgm:pt>
     <dgm:pt modelId="{FA28285D-C85B-47E5-8E04-E3031E7EB070}" type="pres">
       <dgm:prSet presAssocID="{50E5B106-8092-4055-AC3C-E16AB9A8A632}" presName="parTxOnlySpace" presStyleCnt="0"/>
@@ -1714,18 +2490,334 @@
         </dgm:presLayoutVars>
       </dgm:prSet>
       <dgm:spPr/>
+      <dgm:t>
+        <a:bodyPr/>
+        <a:lstStyle/>
+        <a:p>
+          <a:endParaRPr lang="es-ES"/>
+        </a:p>
+      </dgm:t>
     </dgm:pt>
   </dgm:ptLst>
   <dgm:cxnLst>
+    <dgm:cxn modelId="{5E7AA7A8-CA8D-46F6-8417-A9E8900910E7}" type="presOf" srcId="{07D852F8-DC80-412E-99FF-CBC8CF6E9E53}" destId="{BB3205ED-EB8F-4AA2-A69D-916A25FD317F}" srcOrd="0" destOrd="0" presId="urn:microsoft.com/office/officeart/2005/8/layout/chevron1"/>
+    <dgm:cxn modelId="{49728C46-9AF0-4404-B77C-0BF8753B1BE2}" srcId="{07D852F8-DC80-412E-99FF-CBC8CF6E9E53}" destId="{3B4EE390-B919-49DE-81BE-0780A08DDBFA}" srcOrd="2" destOrd="0" parTransId="{3B1FF57E-AA55-4079-B104-9BCA769CA707}" sibTransId="{50E5B106-8092-4055-AC3C-E16AB9A8A632}"/>
+    <dgm:cxn modelId="{24BDC4C3-8E68-4ABC-A0DA-A0FE0C4BE3D4}" srcId="{07D852F8-DC80-412E-99FF-CBC8CF6E9E53}" destId="{3E85E467-C11E-426F-9200-FC251BE43DEA}" srcOrd="1" destOrd="0" parTransId="{83EB3A9D-25F1-42C7-AA54-1B46554184BF}" sibTransId="{431F7064-B371-4D30-9440-9276B420E393}"/>
+    <dgm:cxn modelId="{C846122C-05FD-4C41-8444-CC3A300BDFFE}" srcId="{07D852F8-DC80-412E-99FF-CBC8CF6E9E53}" destId="{853FF75D-08FD-4C0B-97FF-B95C5121D1D7}" srcOrd="0" destOrd="0" parTransId="{BD4839AE-4C9F-4F18-92E9-4B1323829560}" sibTransId="{888E8F23-D971-4F49-AF2A-2D3F7847711C}"/>
     <dgm:cxn modelId="{7D2F0A27-3D8B-4128-8CB3-A82F5F34B1DA}" type="presOf" srcId="{3B4EE390-B919-49DE-81BE-0780A08DDBFA}" destId="{AEA2C0A0-0FCA-4EB1-AA5B-89E50BC14E35}" srcOrd="0" destOrd="0" presId="urn:microsoft.com/office/officeart/2005/8/layout/chevron1"/>
+    <dgm:cxn modelId="{D76B3C6A-BC4F-4872-BB7B-7982459BAA86}" type="presOf" srcId="{853FF75D-08FD-4C0B-97FF-B95C5121D1D7}" destId="{3D5C674D-195F-4346-A602-68D809648B83}" srcOrd="0" destOrd="0" presId="urn:microsoft.com/office/officeart/2005/8/layout/chevron1"/>
+    <dgm:cxn modelId="{61C2D7D0-DEE2-4010-B64E-4D1FEDBA0702}" srcId="{07D852F8-DC80-412E-99FF-CBC8CF6E9E53}" destId="{FE8D9DF2-8BC9-4E07-8005-D845C397B55E}" srcOrd="3" destOrd="0" parTransId="{5B8A1B7E-67AD-4057-819C-2245EC4F7AC4}" sibTransId="{5B54ED7F-A264-47E6-96E6-7D075AA7F363}"/>
+    <dgm:cxn modelId="{403E4FC9-6B5A-4E42-8B00-B4A63F0B56C0}" type="presOf" srcId="{3E85E467-C11E-426F-9200-FC251BE43DEA}" destId="{6886AB32-2506-433F-9563-157CC1EA1348}" srcOrd="0" destOrd="0" presId="urn:microsoft.com/office/officeart/2005/8/layout/chevron1"/>
+    <dgm:cxn modelId="{D7B69E66-919E-4FAC-945E-964D8A3AC565}" type="presOf" srcId="{FE8D9DF2-8BC9-4E07-8005-D845C397B55E}" destId="{09B459DE-37E0-4270-82CB-D68CAF9A376E}" srcOrd="0" destOrd="0" presId="urn:microsoft.com/office/officeart/2005/8/layout/chevron1"/>
+    <dgm:cxn modelId="{2F515B5D-54B1-4237-891D-39EC55794076}" type="presParOf" srcId="{BB3205ED-EB8F-4AA2-A69D-916A25FD317F}" destId="{3D5C674D-195F-4346-A602-68D809648B83}" srcOrd="0" destOrd="0" presId="urn:microsoft.com/office/officeart/2005/8/layout/chevron1"/>
+    <dgm:cxn modelId="{624BFC5C-F915-4A8E-B04A-57BF8C238C73}" type="presParOf" srcId="{BB3205ED-EB8F-4AA2-A69D-916A25FD317F}" destId="{4DCC4052-4221-44D0-84E2-29AAAD96FCB3}" srcOrd="1" destOrd="0" presId="urn:microsoft.com/office/officeart/2005/8/layout/chevron1"/>
+    <dgm:cxn modelId="{6BB152CA-DFDB-44B7-9F2B-2AD9DCE38131}" type="presParOf" srcId="{BB3205ED-EB8F-4AA2-A69D-916A25FD317F}" destId="{6886AB32-2506-433F-9563-157CC1EA1348}" srcOrd="2" destOrd="0" presId="urn:microsoft.com/office/officeart/2005/8/layout/chevron1"/>
+    <dgm:cxn modelId="{61B2447E-213A-4AEB-AEA2-D6100A84A07D}" type="presParOf" srcId="{BB3205ED-EB8F-4AA2-A69D-916A25FD317F}" destId="{A6E2C1E9-D2ED-47B3-A71D-FDA80BA4D0C1}" srcOrd="3" destOrd="0" presId="urn:microsoft.com/office/officeart/2005/8/layout/chevron1"/>
+    <dgm:cxn modelId="{E57AB7C5-2D91-4B2A-A2AD-3AA7E7B0F05D}" type="presParOf" srcId="{BB3205ED-EB8F-4AA2-A69D-916A25FD317F}" destId="{AEA2C0A0-0FCA-4EB1-AA5B-89E50BC14E35}" srcOrd="4" destOrd="0" presId="urn:microsoft.com/office/officeart/2005/8/layout/chevron1"/>
+    <dgm:cxn modelId="{281714DE-CEDA-46A3-B2D6-4125F4E98C23}" type="presParOf" srcId="{BB3205ED-EB8F-4AA2-A69D-916A25FD317F}" destId="{FA28285D-C85B-47E5-8E04-E3031E7EB070}" srcOrd="5" destOrd="0" presId="urn:microsoft.com/office/officeart/2005/8/layout/chevron1"/>
+    <dgm:cxn modelId="{F170EEC6-5C4A-4BDE-A26C-F56538B2BBED}" type="presParOf" srcId="{BB3205ED-EB8F-4AA2-A69D-916A25FD317F}" destId="{09B459DE-37E0-4270-82CB-D68CAF9A376E}" srcOrd="6" destOrd="0" presId="urn:microsoft.com/office/officeart/2005/8/layout/chevron1"/>
+  </dgm:cxnLst>
+  <dgm:bg/>
+  <dgm:whole/>
+  <dgm:extLst>
+    <a:ext uri="http://schemas.microsoft.com/office/drawing/2008/diagram">
+      <dsp:dataModelExt xmlns:dsp="http://schemas.microsoft.com/office/drawing/2008/diagram" relId="rId6" minVer="http://schemas.openxmlformats.org/drawingml/2006/diagram"/>
+    </a:ext>
+  </dgm:extLst>
+</dgm:dataModel>
+</file>
+
+<file path=ppt/diagrams/data2.xml><?xml version="1.0" encoding="utf-8"?>
+<dgm:dataModel xmlns:dgm="http://schemas.openxmlformats.org/drawingml/2006/diagram" xmlns:a="http://schemas.openxmlformats.org/drawingml/2006/main">
+  <dgm:ptLst>
+    <dgm:pt modelId="{07D852F8-DC80-412E-99FF-CBC8CF6E9E53}" type="doc">
+      <dgm:prSet loTypeId="urn:microsoft.com/office/officeart/2005/8/layout/chevron1" loCatId="process" qsTypeId="urn:microsoft.com/office/officeart/2005/8/quickstyle/simple4" qsCatId="simple" csTypeId="urn:microsoft.com/office/officeart/2005/8/colors/accent1_2" csCatId="accent1" phldr="1"/>
+      <dgm:spPr/>
+      <dgm:t>
+        <a:bodyPr/>
+        <a:lstStyle/>
+        <a:p>
+          <a:endParaRPr lang="es-AR"/>
+        </a:p>
+      </dgm:t>
+    </dgm:pt>
+    <dgm:pt modelId="{853FF75D-08FD-4C0B-97FF-B95C5121D1D7}">
+      <dgm:prSet phldrT="[Texto]"/>
+      <dgm:spPr/>
+      <dgm:t>
+        <a:bodyPr/>
+        <a:lstStyle/>
+        <a:p>
+          <a:r>
+            <a:rPr lang="es-ES" dirty="0"/>
+            <a:t>Inicio</a:t>
+          </a:r>
+          <a:endParaRPr lang="es-AR" dirty="0"/>
+        </a:p>
+      </dgm:t>
+    </dgm:pt>
+    <dgm:pt modelId="{BD4839AE-4C9F-4F18-92E9-4B1323829560}" type="parTrans" cxnId="{C846122C-05FD-4C41-8444-CC3A300BDFFE}">
+      <dgm:prSet/>
+      <dgm:spPr/>
+      <dgm:t>
+        <a:bodyPr/>
+        <a:lstStyle/>
+        <a:p>
+          <a:endParaRPr lang="es-AR"/>
+        </a:p>
+      </dgm:t>
+    </dgm:pt>
+    <dgm:pt modelId="{888E8F23-D971-4F49-AF2A-2D3F7847711C}" type="sibTrans" cxnId="{C846122C-05FD-4C41-8444-CC3A300BDFFE}">
+      <dgm:prSet/>
+      <dgm:spPr/>
+      <dgm:t>
+        <a:bodyPr/>
+        <a:lstStyle/>
+        <a:p>
+          <a:endParaRPr lang="es-AR"/>
+        </a:p>
+      </dgm:t>
+    </dgm:pt>
+    <dgm:pt modelId="{3E85E467-C11E-426F-9200-FC251BE43DEA}">
+      <dgm:prSet phldrT="[Texto]"/>
+      <dgm:spPr/>
+      <dgm:t>
+        <a:bodyPr/>
+        <a:lstStyle/>
+        <a:p>
+          <a:r>
+            <a:rPr lang="es-ES" dirty="0"/>
+            <a:t>Elaboración</a:t>
+          </a:r>
+          <a:endParaRPr lang="es-AR" dirty="0"/>
+        </a:p>
+      </dgm:t>
+    </dgm:pt>
+    <dgm:pt modelId="{83EB3A9D-25F1-42C7-AA54-1B46554184BF}" type="parTrans" cxnId="{24BDC4C3-8E68-4ABC-A0DA-A0FE0C4BE3D4}">
+      <dgm:prSet/>
+      <dgm:spPr/>
+      <dgm:t>
+        <a:bodyPr/>
+        <a:lstStyle/>
+        <a:p>
+          <a:endParaRPr lang="es-AR"/>
+        </a:p>
+      </dgm:t>
+    </dgm:pt>
+    <dgm:pt modelId="{431F7064-B371-4D30-9440-9276B420E393}" type="sibTrans" cxnId="{24BDC4C3-8E68-4ABC-A0DA-A0FE0C4BE3D4}">
+      <dgm:prSet/>
+      <dgm:spPr/>
+      <dgm:t>
+        <a:bodyPr/>
+        <a:lstStyle/>
+        <a:p>
+          <a:endParaRPr lang="es-AR"/>
+        </a:p>
+      </dgm:t>
+    </dgm:pt>
+    <dgm:pt modelId="{3B4EE390-B919-49DE-81BE-0780A08DDBFA}">
+      <dgm:prSet phldrT="[Texto]"/>
+      <dgm:spPr/>
+      <dgm:t>
+        <a:bodyPr/>
+        <a:lstStyle/>
+        <a:p>
+          <a:r>
+            <a:rPr lang="es-ES" dirty="0"/>
+            <a:t>Construcción</a:t>
+          </a:r>
+          <a:endParaRPr lang="es-AR" dirty="0"/>
+        </a:p>
+      </dgm:t>
+    </dgm:pt>
+    <dgm:pt modelId="{3B1FF57E-AA55-4079-B104-9BCA769CA707}" type="parTrans" cxnId="{49728C46-9AF0-4404-B77C-0BF8753B1BE2}">
+      <dgm:prSet/>
+      <dgm:spPr/>
+      <dgm:t>
+        <a:bodyPr/>
+        <a:lstStyle/>
+        <a:p>
+          <a:endParaRPr lang="es-AR"/>
+        </a:p>
+      </dgm:t>
+    </dgm:pt>
+    <dgm:pt modelId="{50E5B106-8092-4055-AC3C-E16AB9A8A632}" type="sibTrans" cxnId="{49728C46-9AF0-4404-B77C-0BF8753B1BE2}">
+      <dgm:prSet/>
+      <dgm:spPr/>
+      <dgm:t>
+        <a:bodyPr/>
+        <a:lstStyle/>
+        <a:p>
+          <a:endParaRPr lang="es-AR"/>
+        </a:p>
+      </dgm:t>
+    </dgm:pt>
+    <dgm:pt modelId="{FE8D9DF2-8BC9-4E07-8005-D845C397B55E}">
+      <dgm:prSet phldrT="[Texto]"/>
+      <dgm:spPr/>
+      <dgm:t>
+        <a:bodyPr/>
+        <a:lstStyle/>
+        <a:p>
+          <a:r>
+            <a:rPr lang="es-ES" dirty="0"/>
+            <a:t>Transición</a:t>
+          </a:r>
+          <a:endParaRPr lang="es-AR" dirty="0"/>
+        </a:p>
+      </dgm:t>
+    </dgm:pt>
+    <dgm:pt modelId="{5B8A1B7E-67AD-4057-819C-2245EC4F7AC4}" type="parTrans" cxnId="{61C2D7D0-DEE2-4010-B64E-4D1FEDBA0702}">
+      <dgm:prSet/>
+      <dgm:spPr/>
+      <dgm:t>
+        <a:bodyPr/>
+        <a:lstStyle/>
+        <a:p>
+          <a:endParaRPr lang="es-AR"/>
+        </a:p>
+      </dgm:t>
+    </dgm:pt>
+    <dgm:pt modelId="{5B54ED7F-A264-47E6-96E6-7D075AA7F363}" type="sibTrans" cxnId="{61C2D7D0-DEE2-4010-B64E-4D1FEDBA0702}">
+      <dgm:prSet/>
+      <dgm:spPr/>
+      <dgm:t>
+        <a:bodyPr/>
+        <a:lstStyle/>
+        <a:p>
+          <a:endParaRPr lang="es-AR"/>
+        </a:p>
+      </dgm:t>
+    </dgm:pt>
+    <dgm:pt modelId="{BB3205ED-EB8F-4AA2-A69D-916A25FD317F}" type="pres">
+      <dgm:prSet presAssocID="{07D852F8-DC80-412E-99FF-CBC8CF6E9E53}" presName="Name0" presStyleCnt="0">
+        <dgm:presLayoutVars>
+          <dgm:dir/>
+          <dgm:animLvl val="lvl"/>
+          <dgm:resizeHandles val="exact"/>
+        </dgm:presLayoutVars>
+      </dgm:prSet>
+      <dgm:spPr/>
+      <dgm:t>
+        <a:bodyPr/>
+        <a:lstStyle/>
+        <a:p>
+          <a:endParaRPr lang="es-ES"/>
+        </a:p>
+      </dgm:t>
+    </dgm:pt>
+    <dgm:pt modelId="{3D5C674D-195F-4346-A602-68D809648B83}" type="pres">
+      <dgm:prSet presAssocID="{853FF75D-08FD-4C0B-97FF-B95C5121D1D7}" presName="parTxOnly" presStyleLbl="node1" presStyleIdx="0" presStyleCnt="4">
+        <dgm:presLayoutVars>
+          <dgm:chMax val="0"/>
+          <dgm:chPref val="0"/>
+          <dgm:bulletEnabled val="1"/>
+        </dgm:presLayoutVars>
+      </dgm:prSet>
+      <dgm:spPr/>
+      <dgm:t>
+        <a:bodyPr/>
+        <a:lstStyle/>
+        <a:p>
+          <a:endParaRPr lang="es-ES"/>
+        </a:p>
+      </dgm:t>
+    </dgm:pt>
+    <dgm:pt modelId="{4DCC4052-4221-44D0-84E2-29AAAD96FCB3}" type="pres">
+      <dgm:prSet presAssocID="{888E8F23-D971-4F49-AF2A-2D3F7847711C}" presName="parTxOnlySpace" presStyleCnt="0"/>
+      <dgm:spPr/>
+      <dgm:t>
+        <a:bodyPr/>
+        <a:lstStyle/>
+        <a:p>
+          <a:endParaRPr lang="es-ES"/>
+        </a:p>
+      </dgm:t>
+    </dgm:pt>
+    <dgm:pt modelId="{6886AB32-2506-433F-9563-157CC1EA1348}" type="pres">
+      <dgm:prSet presAssocID="{3E85E467-C11E-426F-9200-FC251BE43DEA}" presName="parTxOnly" presStyleLbl="node1" presStyleIdx="1" presStyleCnt="4">
+        <dgm:presLayoutVars>
+          <dgm:chMax val="0"/>
+          <dgm:chPref val="0"/>
+          <dgm:bulletEnabled val="1"/>
+        </dgm:presLayoutVars>
+      </dgm:prSet>
+      <dgm:spPr/>
+      <dgm:t>
+        <a:bodyPr/>
+        <a:lstStyle/>
+        <a:p>
+          <a:endParaRPr lang="es-ES"/>
+        </a:p>
+      </dgm:t>
+    </dgm:pt>
+    <dgm:pt modelId="{A6E2C1E9-D2ED-47B3-A71D-FDA80BA4D0C1}" type="pres">
+      <dgm:prSet presAssocID="{431F7064-B371-4D30-9440-9276B420E393}" presName="parTxOnlySpace" presStyleCnt="0"/>
+      <dgm:spPr/>
+      <dgm:t>
+        <a:bodyPr/>
+        <a:lstStyle/>
+        <a:p>
+          <a:endParaRPr lang="es-ES"/>
+        </a:p>
+      </dgm:t>
+    </dgm:pt>
+    <dgm:pt modelId="{AEA2C0A0-0FCA-4EB1-AA5B-89E50BC14E35}" type="pres">
+      <dgm:prSet presAssocID="{3B4EE390-B919-49DE-81BE-0780A08DDBFA}" presName="parTxOnly" presStyleLbl="node1" presStyleIdx="2" presStyleCnt="4">
+        <dgm:presLayoutVars>
+          <dgm:chMax val="0"/>
+          <dgm:chPref val="0"/>
+          <dgm:bulletEnabled val="1"/>
+        </dgm:presLayoutVars>
+      </dgm:prSet>
+      <dgm:spPr/>
+      <dgm:t>
+        <a:bodyPr/>
+        <a:lstStyle/>
+        <a:p>
+          <a:endParaRPr lang="es-ES"/>
+        </a:p>
+      </dgm:t>
+    </dgm:pt>
+    <dgm:pt modelId="{FA28285D-C85B-47E5-8E04-E3031E7EB070}" type="pres">
+      <dgm:prSet presAssocID="{50E5B106-8092-4055-AC3C-E16AB9A8A632}" presName="parTxOnlySpace" presStyleCnt="0"/>
+      <dgm:spPr/>
+      <dgm:t>
+        <a:bodyPr/>
+        <a:lstStyle/>
+        <a:p>
+          <a:endParaRPr lang="es-ES"/>
+        </a:p>
+      </dgm:t>
+    </dgm:pt>
+    <dgm:pt modelId="{09B459DE-37E0-4270-82CB-D68CAF9A376E}" type="pres">
+      <dgm:prSet presAssocID="{FE8D9DF2-8BC9-4E07-8005-D845C397B55E}" presName="parTxOnly" presStyleLbl="node1" presStyleIdx="3" presStyleCnt="4">
+        <dgm:presLayoutVars>
+          <dgm:chMax val="0"/>
+          <dgm:chPref val="0"/>
+          <dgm:bulletEnabled val="1"/>
+        </dgm:presLayoutVars>
+      </dgm:prSet>
+      <dgm:spPr/>
+      <dgm:t>
+        <a:bodyPr/>
+        <a:lstStyle/>
+        <a:p>
+          <a:endParaRPr lang="es-ES"/>
+        </a:p>
+      </dgm:t>
+    </dgm:pt>
+  </dgm:ptLst>
+  <dgm:cxnLst>
+    <dgm:cxn modelId="{5E7AA7A8-CA8D-46F6-8417-A9E8900910E7}" type="presOf" srcId="{07D852F8-DC80-412E-99FF-CBC8CF6E9E53}" destId="{BB3205ED-EB8F-4AA2-A69D-916A25FD317F}" srcOrd="0" destOrd="0" presId="urn:microsoft.com/office/officeart/2005/8/layout/chevron1"/>
+    <dgm:cxn modelId="{49728C46-9AF0-4404-B77C-0BF8753B1BE2}" srcId="{07D852F8-DC80-412E-99FF-CBC8CF6E9E53}" destId="{3B4EE390-B919-49DE-81BE-0780A08DDBFA}" srcOrd="2" destOrd="0" parTransId="{3B1FF57E-AA55-4079-B104-9BCA769CA707}" sibTransId="{50E5B106-8092-4055-AC3C-E16AB9A8A632}"/>
+    <dgm:cxn modelId="{24BDC4C3-8E68-4ABC-A0DA-A0FE0C4BE3D4}" srcId="{07D852F8-DC80-412E-99FF-CBC8CF6E9E53}" destId="{3E85E467-C11E-426F-9200-FC251BE43DEA}" srcOrd="1" destOrd="0" parTransId="{83EB3A9D-25F1-42C7-AA54-1B46554184BF}" sibTransId="{431F7064-B371-4D30-9440-9276B420E393}"/>
     <dgm:cxn modelId="{C846122C-05FD-4C41-8444-CC3A300BDFFE}" srcId="{07D852F8-DC80-412E-99FF-CBC8CF6E9E53}" destId="{853FF75D-08FD-4C0B-97FF-B95C5121D1D7}" srcOrd="0" destOrd="0" parTransId="{BD4839AE-4C9F-4F18-92E9-4B1323829560}" sibTransId="{888E8F23-D971-4F49-AF2A-2D3F7847711C}"/>
-    <dgm:cxn modelId="{49728C46-9AF0-4404-B77C-0BF8753B1BE2}" srcId="{07D852F8-DC80-412E-99FF-CBC8CF6E9E53}" destId="{3B4EE390-B919-49DE-81BE-0780A08DDBFA}" srcOrd="2" destOrd="0" parTransId="{3B1FF57E-AA55-4079-B104-9BCA769CA707}" sibTransId="{50E5B106-8092-4055-AC3C-E16AB9A8A632}"/>
+    <dgm:cxn modelId="{7D2F0A27-3D8B-4128-8CB3-A82F5F34B1DA}" type="presOf" srcId="{3B4EE390-B919-49DE-81BE-0780A08DDBFA}" destId="{AEA2C0A0-0FCA-4EB1-AA5B-89E50BC14E35}" srcOrd="0" destOrd="0" presId="urn:microsoft.com/office/officeart/2005/8/layout/chevron1"/>
+    <dgm:cxn modelId="{D76B3C6A-BC4F-4872-BB7B-7982459BAA86}" type="presOf" srcId="{853FF75D-08FD-4C0B-97FF-B95C5121D1D7}" destId="{3D5C674D-195F-4346-A602-68D809648B83}" srcOrd="0" destOrd="0" presId="urn:microsoft.com/office/officeart/2005/8/layout/chevron1"/>
+    <dgm:cxn modelId="{61C2D7D0-DEE2-4010-B64E-4D1FEDBA0702}" srcId="{07D852F8-DC80-412E-99FF-CBC8CF6E9E53}" destId="{FE8D9DF2-8BC9-4E07-8005-D845C397B55E}" srcOrd="3" destOrd="0" parTransId="{5B8A1B7E-67AD-4057-819C-2245EC4F7AC4}" sibTransId="{5B54ED7F-A264-47E6-96E6-7D075AA7F363}"/>
+    <dgm:cxn modelId="{403E4FC9-6B5A-4E42-8B00-B4A63F0B56C0}" type="presOf" srcId="{3E85E467-C11E-426F-9200-FC251BE43DEA}" destId="{6886AB32-2506-433F-9563-157CC1EA1348}" srcOrd="0" destOrd="0" presId="urn:microsoft.com/office/officeart/2005/8/layout/chevron1"/>
     <dgm:cxn modelId="{D7B69E66-919E-4FAC-945E-964D8A3AC565}" type="presOf" srcId="{FE8D9DF2-8BC9-4E07-8005-D845C397B55E}" destId="{09B459DE-37E0-4270-82CB-D68CAF9A376E}" srcOrd="0" destOrd="0" presId="urn:microsoft.com/office/officeart/2005/8/layout/chevron1"/>
-    <dgm:cxn modelId="{D76B3C6A-BC4F-4872-BB7B-7982459BAA86}" type="presOf" srcId="{853FF75D-08FD-4C0B-97FF-B95C5121D1D7}" destId="{3D5C674D-195F-4346-A602-68D809648B83}" srcOrd="0" destOrd="0" presId="urn:microsoft.com/office/officeart/2005/8/layout/chevron1"/>
-    <dgm:cxn modelId="{5E7AA7A8-CA8D-46F6-8417-A9E8900910E7}" type="presOf" srcId="{07D852F8-DC80-412E-99FF-CBC8CF6E9E53}" destId="{BB3205ED-EB8F-4AA2-A69D-916A25FD317F}" srcOrd="0" destOrd="0" presId="urn:microsoft.com/office/officeart/2005/8/layout/chevron1"/>
-    <dgm:cxn modelId="{24BDC4C3-8E68-4ABC-A0DA-A0FE0C4BE3D4}" srcId="{07D852F8-DC80-412E-99FF-CBC8CF6E9E53}" destId="{3E85E467-C11E-426F-9200-FC251BE43DEA}" srcOrd="1" destOrd="0" parTransId="{83EB3A9D-25F1-42C7-AA54-1B46554184BF}" sibTransId="{431F7064-B371-4D30-9440-9276B420E393}"/>
-    <dgm:cxn modelId="{403E4FC9-6B5A-4E42-8B00-B4A63F0B56C0}" type="presOf" srcId="{3E85E467-C11E-426F-9200-FC251BE43DEA}" destId="{6886AB32-2506-433F-9563-157CC1EA1348}" srcOrd="0" destOrd="0" presId="urn:microsoft.com/office/officeart/2005/8/layout/chevron1"/>
-    <dgm:cxn modelId="{61C2D7D0-DEE2-4010-B64E-4D1FEDBA0702}" srcId="{07D852F8-DC80-412E-99FF-CBC8CF6E9E53}" destId="{FE8D9DF2-8BC9-4E07-8005-D845C397B55E}" srcOrd="3" destOrd="0" parTransId="{5B8A1B7E-67AD-4057-819C-2245EC4F7AC4}" sibTransId="{5B54ED7F-A264-47E6-96E6-7D075AA7F363}"/>
     <dgm:cxn modelId="{2F515B5D-54B1-4237-891D-39EC55794076}" type="presParOf" srcId="{BB3205ED-EB8F-4AA2-A69D-916A25FD317F}" destId="{3D5C674D-195F-4346-A602-68D809648B83}" srcOrd="0" destOrd="0" presId="urn:microsoft.com/office/officeart/2005/8/layout/chevron1"/>
     <dgm:cxn modelId="{624BFC5C-F915-4A8E-B04A-57BF8C238C73}" type="presParOf" srcId="{BB3205ED-EB8F-4AA2-A69D-916A25FD317F}" destId="{4DCC4052-4221-44D0-84E2-29AAAD96FCB3}" srcOrd="1" destOrd="0" presId="urn:microsoft.com/office/officeart/2005/8/layout/chevron1"/>
     <dgm:cxn modelId="{6BB152CA-DFDB-44B7-9F2B-2AD9DCE38131}" type="presParOf" srcId="{BB3205ED-EB8F-4AA2-A69D-916A25FD317F}" destId="{6886AB32-2506-433F-9563-157CC1EA1348}" srcOrd="2" destOrd="0" presId="urn:microsoft.com/office/officeart/2005/8/layout/chevron1"/>
@@ -1826,7 +2918,7 @@
         </a:bodyPr>
         <a:lstStyle/>
         <a:p>
-          <a:pPr marL="0" lvl="0" indent="0" algn="ctr" defTabSz="755650">
+          <a:pPr lvl="0" algn="ctr" defTabSz="755650">
             <a:lnSpc>
               <a:spcPct val="90000"/>
             </a:lnSpc>
@@ -1836,7 +2928,6 @@
             <a:spcAft>
               <a:spcPct val="35000"/>
             </a:spcAft>
-            <a:buNone/>
           </a:pPr>
           <a:r>
             <a:rPr lang="es-ES" sz="1700" kern="1200" dirty="0"/>
@@ -1924,7 +3015,7 @@
         </a:bodyPr>
         <a:lstStyle/>
         <a:p>
-          <a:pPr marL="0" lvl="0" indent="0" algn="ctr" defTabSz="755650">
+          <a:pPr lvl="0" algn="ctr" defTabSz="755650">
             <a:lnSpc>
               <a:spcPct val="90000"/>
             </a:lnSpc>
@@ -1934,7 +3025,6 @@
             <a:spcAft>
               <a:spcPct val="35000"/>
             </a:spcAft>
-            <a:buNone/>
           </a:pPr>
           <a:r>
             <a:rPr lang="es-ES" sz="1700" kern="1200" dirty="0"/>
@@ -2022,7 +3112,7 @@
         </a:bodyPr>
         <a:lstStyle/>
         <a:p>
-          <a:pPr marL="0" lvl="0" indent="0" algn="ctr" defTabSz="755650">
+          <a:pPr lvl="0" algn="ctr" defTabSz="755650">
             <a:lnSpc>
               <a:spcPct val="90000"/>
             </a:lnSpc>
@@ -2032,7 +3122,6 @@
             <a:spcAft>
               <a:spcPct val="35000"/>
             </a:spcAft>
-            <a:buNone/>
           </a:pPr>
           <a:r>
             <a:rPr lang="es-ES" sz="1700" kern="1200" dirty="0"/>
@@ -2120,7 +3209,7 @@
         </a:bodyPr>
         <a:lstStyle/>
         <a:p>
-          <a:pPr marL="0" lvl="0" indent="0" algn="ctr" defTabSz="755650">
+          <a:pPr lvl="0" algn="ctr" defTabSz="755650">
             <a:lnSpc>
               <a:spcPct val="90000"/>
             </a:lnSpc>
@@ -2130,7 +3219,378 @@
             <a:spcAft>
               <a:spcPct val="35000"/>
             </a:spcAft>
-            <a:buNone/>
+          </a:pPr>
+          <a:r>
+            <a:rPr lang="es-ES" sz="1700" kern="1200" dirty="0"/>
+            <a:t>Transición</a:t>
+          </a:r>
+          <a:endParaRPr lang="es-AR" sz="1700" kern="1200" dirty="0"/>
+        </a:p>
+      </dsp:txBody>
+      <dsp:txXfrm>
+        <a:off x="6368454" y="2190952"/>
+        <a:ext cx="1316831" cy="877887"/>
+      </dsp:txXfrm>
+    </dsp:sp>
+  </dsp:spTree>
+</dsp:drawing>
+</file>
+
+<file path=ppt/diagrams/drawing2.xml><?xml version="1.0" encoding="utf-8"?>
+<dsp:drawing xmlns:dgm="http://schemas.openxmlformats.org/drawingml/2006/diagram" xmlns:dsp="http://schemas.microsoft.com/office/drawing/2008/diagram" xmlns:a="http://schemas.openxmlformats.org/drawingml/2006/main">
+  <dsp:spTree>
+    <dsp:nvGrpSpPr>
+      <dsp:cNvPr id="0" name=""/>
+      <dsp:cNvGrpSpPr/>
+    </dsp:nvGrpSpPr>
+    <dsp:grpSpPr/>
+    <dsp:sp modelId="{3D5C674D-195F-4346-A602-68D809648B83}">
+      <dsp:nvSpPr>
+        <dsp:cNvPr id="0" name=""/>
+        <dsp:cNvSpPr/>
+      </dsp:nvSpPr>
+      <dsp:spPr>
+        <a:xfrm>
+          <a:off x="3770" y="2190952"/>
+          <a:ext cx="2194718" cy="877887"/>
+        </a:xfrm>
+        <a:prstGeom prst="chevron">
+          <a:avLst/>
+        </a:prstGeom>
+        <a:gradFill rotWithShape="0">
+          <a:gsLst>
+            <a:gs pos="0">
+              <a:schemeClr val="accent1">
+                <a:hueOff val="0"/>
+                <a:satOff val="0"/>
+                <a:lumOff val="0"/>
+                <a:alphaOff val="0"/>
+                <a:tint val="96000"/>
+                <a:lumMod val="102000"/>
+              </a:schemeClr>
+            </a:gs>
+            <a:gs pos="100000">
+              <a:schemeClr val="accent1">
+                <a:hueOff val="0"/>
+                <a:satOff val="0"/>
+                <a:lumOff val="0"/>
+                <a:alphaOff val="0"/>
+                <a:shade val="88000"/>
+                <a:lumMod val="94000"/>
+              </a:schemeClr>
+            </a:gs>
+          </a:gsLst>
+          <a:path path="circle">
+            <a:fillToRect l="50000" t="100000" r="100000" b="50000"/>
+          </a:path>
+        </a:gradFill>
+        <a:ln>
+          <a:noFill/>
+        </a:ln>
+        <a:effectLst>
+          <a:reflection blurRad="12700" stA="26000" endPos="32000" dist="12700" dir="5400000" sy="-100000" rotWithShape="0"/>
+        </a:effectLst>
+      </dsp:spPr>
+      <dsp:style>
+        <a:lnRef idx="0">
+          <a:scrgbClr r="0" g="0" b="0"/>
+        </a:lnRef>
+        <a:fillRef idx="3">
+          <a:scrgbClr r="0" g="0" b="0"/>
+        </a:fillRef>
+        <a:effectRef idx="2">
+          <a:scrgbClr r="0" g="0" b="0"/>
+        </a:effectRef>
+        <a:fontRef idx="minor">
+          <a:schemeClr val="lt1"/>
+        </a:fontRef>
+      </dsp:style>
+      <dsp:txBody>
+        <a:bodyPr spcFirstLastPara="0" vert="horz" wrap="square" lIns="68009" tIns="22670" rIns="22670" bIns="22670" numCol="1" spcCol="1270" anchor="ctr" anchorCtr="0">
+          <a:noAutofit/>
+        </a:bodyPr>
+        <a:lstStyle/>
+        <a:p>
+          <a:pPr lvl="0" algn="ctr" defTabSz="755650">
+            <a:lnSpc>
+              <a:spcPct val="90000"/>
+            </a:lnSpc>
+            <a:spcBef>
+              <a:spcPct val="0"/>
+            </a:spcBef>
+            <a:spcAft>
+              <a:spcPct val="35000"/>
+            </a:spcAft>
+          </a:pPr>
+          <a:r>
+            <a:rPr lang="es-ES" sz="1700" kern="1200" dirty="0"/>
+            <a:t>Inicio</a:t>
+          </a:r>
+          <a:endParaRPr lang="es-AR" sz="1700" kern="1200" dirty="0"/>
+        </a:p>
+      </dsp:txBody>
+      <dsp:txXfrm>
+        <a:off x="442714" y="2190952"/>
+        <a:ext cx="1316831" cy="877887"/>
+      </dsp:txXfrm>
+    </dsp:sp>
+    <dsp:sp modelId="{6886AB32-2506-433F-9563-157CC1EA1348}">
+      <dsp:nvSpPr>
+        <dsp:cNvPr id="0" name=""/>
+        <dsp:cNvSpPr/>
+      </dsp:nvSpPr>
+      <dsp:spPr>
+        <a:xfrm>
+          <a:off x="1979017" y="2190952"/>
+          <a:ext cx="2194718" cy="877887"/>
+        </a:xfrm>
+        <a:prstGeom prst="chevron">
+          <a:avLst/>
+        </a:prstGeom>
+        <a:gradFill rotWithShape="0">
+          <a:gsLst>
+            <a:gs pos="0">
+              <a:schemeClr val="accent1">
+                <a:hueOff val="0"/>
+                <a:satOff val="0"/>
+                <a:lumOff val="0"/>
+                <a:alphaOff val="0"/>
+                <a:tint val="96000"/>
+                <a:lumMod val="102000"/>
+              </a:schemeClr>
+            </a:gs>
+            <a:gs pos="100000">
+              <a:schemeClr val="accent1">
+                <a:hueOff val="0"/>
+                <a:satOff val="0"/>
+                <a:lumOff val="0"/>
+                <a:alphaOff val="0"/>
+                <a:shade val="88000"/>
+                <a:lumMod val="94000"/>
+              </a:schemeClr>
+            </a:gs>
+          </a:gsLst>
+          <a:path path="circle">
+            <a:fillToRect l="50000" t="100000" r="100000" b="50000"/>
+          </a:path>
+        </a:gradFill>
+        <a:ln>
+          <a:noFill/>
+        </a:ln>
+        <a:effectLst>
+          <a:reflection blurRad="12700" stA="26000" endPos="32000" dist="12700" dir="5400000" sy="-100000" rotWithShape="0"/>
+        </a:effectLst>
+      </dsp:spPr>
+      <dsp:style>
+        <a:lnRef idx="0">
+          <a:scrgbClr r="0" g="0" b="0"/>
+        </a:lnRef>
+        <a:fillRef idx="3">
+          <a:scrgbClr r="0" g="0" b="0"/>
+        </a:fillRef>
+        <a:effectRef idx="2">
+          <a:scrgbClr r="0" g="0" b="0"/>
+        </a:effectRef>
+        <a:fontRef idx="minor">
+          <a:schemeClr val="lt1"/>
+        </a:fontRef>
+      </dsp:style>
+      <dsp:txBody>
+        <a:bodyPr spcFirstLastPara="0" vert="horz" wrap="square" lIns="68009" tIns="22670" rIns="22670" bIns="22670" numCol="1" spcCol="1270" anchor="ctr" anchorCtr="0">
+          <a:noAutofit/>
+        </a:bodyPr>
+        <a:lstStyle/>
+        <a:p>
+          <a:pPr lvl="0" algn="ctr" defTabSz="755650">
+            <a:lnSpc>
+              <a:spcPct val="90000"/>
+            </a:lnSpc>
+            <a:spcBef>
+              <a:spcPct val="0"/>
+            </a:spcBef>
+            <a:spcAft>
+              <a:spcPct val="35000"/>
+            </a:spcAft>
+          </a:pPr>
+          <a:r>
+            <a:rPr lang="es-ES" sz="1700" kern="1200" dirty="0"/>
+            <a:t>Elaboración</a:t>
+          </a:r>
+          <a:endParaRPr lang="es-AR" sz="1700" kern="1200" dirty="0"/>
+        </a:p>
+      </dsp:txBody>
+      <dsp:txXfrm>
+        <a:off x="2417961" y="2190952"/>
+        <a:ext cx="1316831" cy="877887"/>
+      </dsp:txXfrm>
+    </dsp:sp>
+    <dsp:sp modelId="{AEA2C0A0-0FCA-4EB1-AA5B-89E50BC14E35}">
+      <dsp:nvSpPr>
+        <dsp:cNvPr id="0" name=""/>
+        <dsp:cNvSpPr/>
+      </dsp:nvSpPr>
+      <dsp:spPr>
+        <a:xfrm>
+          <a:off x="3954264" y="2190952"/>
+          <a:ext cx="2194718" cy="877887"/>
+        </a:xfrm>
+        <a:prstGeom prst="chevron">
+          <a:avLst/>
+        </a:prstGeom>
+        <a:gradFill rotWithShape="0">
+          <a:gsLst>
+            <a:gs pos="0">
+              <a:schemeClr val="accent1">
+                <a:hueOff val="0"/>
+                <a:satOff val="0"/>
+                <a:lumOff val="0"/>
+                <a:alphaOff val="0"/>
+                <a:tint val="96000"/>
+                <a:lumMod val="102000"/>
+              </a:schemeClr>
+            </a:gs>
+            <a:gs pos="100000">
+              <a:schemeClr val="accent1">
+                <a:hueOff val="0"/>
+                <a:satOff val="0"/>
+                <a:lumOff val="0"/>
+                <a:alphaOff val="0"/>
+                <a:shade val="88000"/>
+                <a:lumMod val="94000"/>
+              </a:schemeClr>
+            </a:gs>
+          </a:gsLst>
+          <a:path path="circle">
+            <a:fillToRect l="50000" t="100000" r="100000" b="50000"/>
+          </a:path>
+        </a:gradFill>
+        <a:ln>
+          <a:noFill/>
+        </a:ln>
+        <a:effectLst>
+          <a:reflection blurRad="12700" stA="26000" endPos="32000" dist="12700" dir="5400000" sy="-100000" rotWithShape="0"/>
+        </a:effectLst>
+      </dsp:spPr>
+      <dsp:style>
+        <a:lnRef idx="0">
+          <a:scrgbClr r="0" g="0" b="0"/>
+        </a:lnRef>
+        <a:fillRef idx="3">
+          <a:scrgbClr r="0" g="0" b="0"/>
+        </a:fillRef>
+        <a:effectRef idx="2">
+          <a:scrgbClr r="0" g="0" b="0"/>
+        </a:effectRef>
+        <a:fontRef idx="minor">
+          <a:schemeClr val="lt1"/>
+        </a:fontRef>
+      </dsp:style>
+      <dsp:txBody>
+        <a:bodyPr spcFirstLastPara="0" vert="horz" wrap="square" lIns="68009" tIns="22670" rIns="22670" bIns="22670" numCol="1" spcCol="1270" anchor="ctr" anchorCtr="0">
+          <a:noAutofit/>
+        </a:bodyPr>
+        <a:lstStyle/>
+        <a:p>
+          <a:pPr lvl="0" algn="ctr" defTabSz="755650">
+            <a:lnSpc>
+              <a:spcPct val="90000"/>
+            </a:lnSpc>
+            <a:spcBef>
+              <a:spcPct val="0"/>
+            </a:spcBef>
+            <a:spcAft>
+              <a:spcPct val="35000"/>
+            </a:spcAft>
+          </a:pPr>
+          <a:r>
+            <a:rPr lang="es-ES" sz="1700" kern="1200" dirty="0"/>
+            <a:t>Construcción</a:t>
+          </a:r>
+          <a:endParaRPr lang="es-AR" sz="1700" kern="1200" dirty="0"/>
+        </a:p>
+      </dsp:txBody>
+      <dsp:txXfrm>
+        <a:off x="4393208" y="2190952"/>
+        <a:ext cx="1316831" cy="877887"/>
+      </dsp:txXfrm>
+    </dsp:sp>
+    <dsp:sp modelId="{09B459DE-37E0-4270-82CB-D68CAF9A376E}">
+      <dsp:nvSpPr>
+        <dsp:cNvPr id="0" name=""/>
+        <dsp:cNvSpPr/>
+      </dsp:nvSpPr>
+      <dsp:spPr>
+        <a:xfrm>
+          <a:off x="5929510" y="2190952"/>
+          <a:ext cx="2194718" cy="877887"/>
+        </a:xfrm>
+        <a:prstGeom prst="chevron">
+          <a:avLst/>
+        </a:prstGeom>
+        <a:gradFill rotWithShape="0">
+          <a:gsLst>
+            <a:gs pos="0">
+              <a:schemeClr val="accent1">
+                <a:hueOff val="0"/>
+                <a:satOff val="0"/>
+                <a:lumOff val="0"/>
+                <a:alphaOff val="0"/>
+                <a:tint val="96000"/>
+                <a:lumMod val="102000"/>
+              </a:schemeClr>
+            </a:gs>
+            <a:gs pos="100000">
+              <a:schemeClr val="accent1">
+                <a:hueOff val="0"/>
+                <a:satOff val="0"/>
+                <a:lumOff val="0"/>
+                <a:alphaOff val="0"/>
+                <a:shade val="88000"/>
+                <a:lumMod val="94000"/>
+              </a:schemeClr>
+            </a:gs>
+          </a:gsLst>
+          <a:path path="circle">
+            <a:fillToRect l="50000" t="100000" r="100000" b="50000"/>
+          </a:path>
+        </a:gradFill>
+        <a:ln>
+          <a:noFill/>
+        </a:ln>
+        <a:effectLst>
+          <a:reflection blurRad="12700" stA="26000" endPos="32000" dist="12700" dir="5400000" sy="-100000" rotWithShape="0"/>
+        </a:effectLst>
+      </dsp:spPr>
+      <dsp:style>
+        <a:lnRef idx="0">
+          <a:scrgbClr r="0" g="0" b="0"/>
+        </a:lnRef>
+        <a:fillRef idx="3">
+          <a:scrgbClr r="0" g="0" b="0"/>
+        </a:fillRef>
+        <a:effectRef idx="2">
+          <a:scrgbClr r="0" g="0" b="0"/>
+        </a:effectRef>
+        <a:fontRef idx="minor">
+          <a:schemeClr val="lt1"/>
+        </a:fontRef>
+      </dsp:style>
+      <dsp:txBody>
+        <a:bodyPr spcFirstLastPara="0" vert="horz" wrap="square" lIns="68009" tIns="22670" rIns="22670" bIns="22670" numCol="1" spcCol="1270" anchor="ctr" anchorCtr="0">
+          <a:noAutofit/>
+        </a:bodyPr>
+        <a:lstStyle/>
+        <a:p>
+          <a:pPr lvl="0" algn="ctr" defTabSz="755650">
+            <a:lnSpc>
+              <a:spcPct val="90000"/>
+            </a:lnSpc>
+            <a:spcBef>
+              <a:spcPct val="0"/>
+            </a:spcBef>
+            <a:spcAft>
+              <a:spcPct val="35000"/>
+            </a:spcAft>
           </a:pPr>
           <a:r>
             <a:rPr lang="es-ES" sz="1700" kern="1200" dirty="0"/>
@@ -2149,6 +3609,289 @@
 </file>
 
 <file path=ppt/diagrams/layout1.xml><?xml version="1.0" encoding="utf-8"?>
+<dgm:layoutDef xmlns:dgm="http://schemas.openxmlformats.org/drawingml/2006/diagram" xmlns:a="http://schemas.openxmlformats.org/drawingml/2006/main" uniqueId="urn:microsoft.com/office/officeart/2005/8/layout/chevron1">
+  <dgm:title val=""/>
+  <dgm:desc val=""/>
+  <dgm:catLst>
+    <dgm:cat type="process" pri="9000"/>
+  </dgm:catLst>
+  <dgm:sampData useDef="1">
+    <dgm:dataModel>
+      <dgm:ptLst/>
+      <dgm:bg/>
+      <dgm:whole/>
+    </dgm:dataModel>
+  </dgm:sampData>
+  <dgm:styleData>
+    <dgm:dataModel>
+      <dgm:ptLst>
+        <dgm:pt modelId="0" type="doc"/>
+        <dgm:pt modelId="1"/>
+        <dgm:pt modelId="2"/>
+      </dgm:ptLst>
+      <dgm:cxnLst>
+        <dgm:cxn modelId="3" srcId="0" destId="1" srcOrd="0" destOrd="0"/>
+        <dgm:cxn modelId="4" srcId="0" destId="2" srcOrd="1" destOrd="0"/>
+      </dgm:cxnLst>
+      <dgm:bg/>
+      <dgm:whole/>
+    </dgm:dataModel>
+  </dgm:styleData>
+  <dgm:clrData>
+    <dgm:dataModel>
+      <dgm:ptLst>
+        <dgm:pt modelId="0" type="doc"/>
+        <dgm:pt modelId="1"/>
+        <dgm:pt modelId="2"/>
+        <dgm:pt modelId="3"/>
+        <dgm:pt modelId="4"/>
+      </dgm:ptLst>
+      <dgm:cxnLst>
+        <dgm:cxn modelId="5" srcId="0" destId="1" srcOrd="0" destOrd="0"/>
+        <dgm:cxn modelId="6" srcId="0" destId="2" srcOrd="1" destOrd="0"/>
+        <dgm:cxn modelId="7" srcId="0" destId="3" srcOrd="2" destOrd="0"/>
+        <dgm:cxn modelId="8" srcId="0" destId="4" srcOrd="3" destOrd="0"/>
+      </dgm:cxnLst>
+      <dgm:bg/>
+      <dgm:whole/>
+    </dgm:dataModel>
+  </dgm:clrData>
+  <dgm:layoutNode name="Name0">
+    <dgm:varLst>
+      <dgm:dir/>
+      <dgm:animLvl val="lvl"/>
+      <dgm:resizeHandles val="exact"/>
+    </dgm:varLst>
+    <dgm:choose name="Name1">
+      <dgm:if name="Name2" func="var" arg="dir" op="equ" val="norm">
+        <dgm:alg type="lin"/>
+      </dgm:if>
+      <dgm:else name="Name3">
+        <dgm:alg type="lin">
+          <dgm:param type="linDir" val="fromR"/>
+        </dgm:alg>
+      </dgm:else>
+    </dgm:choose>
+    <dgm:shape xmlns:r="http://schemas.openxmlformats.org/officeDocument/2006/relationships" r:blip="">
+      <dgm:adjLst/>
+    </dgm:shape>
+    <dgm:presOf/>
+    <dgm:choose name="Name4">
+      <dgm:if name="Name5" axis="des" func="maxDepth" op="gte" val="2">
+        <dgm:constrLst>
+          <dgm:constr type="h" for="ch" forName="composite" refType="h"/>
+          <dgm:constr type="w" for="ch" forName="composite" refType="w"/>
+          <dgm:constr type="w" for="des" forName="parTx"/>
+          <dgm:constr type="h" for="des" forName="parTx" op="equ"/>
+          <dgm:constr type="w" for="des" forName="desTx"/>
+          <dgm:constr type="h" for="des" forName="desTx" op="equ"/>
+          <dgm:constr type="primFontSz" for="des" forName="parTx" val="65"/>
+          <dgm:constr type="secFontSz" for="des" forName="desTx" refType="primFontSz" refFor="des" refForName="parTx" op="equ"/>
+          <dgm:constr type="h" for="des" forName="parTx" refType="primFontSz" refFor="des" refForName="parTx" fact="1.5"/>
+          <dgm:constr type="h" for="des" forName="desTx" refType="primFontSz" refFor="des" refForName="parTx" fact="0.5"/>
+          <dgm:constr type="w" for="ch" forName="space" op="equ" val="-6"/>
+        </dgm:constrLst>
+        <dgm:ruleLst>
+          <dgm:rule type="w" for="ch" forName="composite" val="0" fact="NaN" max="NaN"/>
+          <dgm:rule type="primFontSz" for="des" forName="parTx" val="5" fact="NaN" max="NaN"/>
+        </dgm:ruleLst>
+        <dgm:forEach name="Name6" axis="ch" ptType="node">
+          <dgm:layoutNode name="composite">
+            <dgm:alg type="composite"/>
+            <dgm:shape xmlns:r="http://schemas.openxmlformats.org/officeDocument/2006/relationships" r:blip="">
+              <dgm:adjLst/>
+            </dgm:shape>
+            <dgm:presOf/>
+            <dgm:choose name="Name7">
+              <dgm:if name="Name8" func="var" arg="dir" op="equ" val="norm">
+                <dgm:constrLst>
+                  <dgm:constr type="l" for="ch" forName="parTx"/>
+                  <dgm:constr type="w" for="ch" forName="parTx" refType="w"/>
+                  <dgm:constr type="t" for="ch" forName="parTx"/>
+                  <dgm:constr type="l" for="ch" forName="desTx"/>
+                  <dgm:constr type="w" for="ch" forName="desTx" refType="w" refFor="ch" refForName="parTx" fact="0.8"/>
+                  <dgm:constr type="t" for="ch" forName="desTx" refType="h" refFor="ch" refForName="parTx" fact="1.125"/>
+                </dgm:constrLst>
+              </dgm:if>
+              <dgm:else name="Name9">
+                <dgm:constrLst>
+                  <dgm:constr type="l" for="ch" forName="parTx"/>
+                  <dgm:constr type="w" for="ch" forName="parTx" refType="w"/>
+                  <dgm:constr type="t" for="ch" forName="parTx"/>
+                  <dgm:constr type="l" for="ch" forName="desTx" refType="w" fact="0.2"/>
+                  <dgm:constr type="w" for="ch" forName="desTx" refType="w" refFor="ch" refForName="parTx" fact="0.8"/>
+                  <dgm:constr type="t" for="ch" forName="desTx" refType="h" refFor="ch" refForName="parTx" fact="1.125"/>
+                </dgm:constrLst>
+              </dgm:else>
+            </dgm:choose>
+            <dgm:ruleLst>
+              <dgm:rule type="h" val="INF" fact="NaN" max="NaN"/>
+            </dgm:ruleLst>
+            <dgm:layoutNode name="parTx">
+              <dgm:varLst>
+                <dgm:chMax val="0"/>
+                <dgm:chPref val="0"/>
+                <dgm:bulletEnabled val="1"/>
+              </dgm:varLst>
+              <dgm:alg type="tx"/>
+              <dgm:choose name="Name10">
+                <dgm:if name="Name11" func="var" arg="dir" op="equ" val="norm">
+                  <dgm:shape xmlns:r="http://schemas.openxmlformats.org/officeDocument/2006/relationships" type="chevron" r:blip="">
+                    <dgm:adjLst/>
+                  </dgm:shape>
+                </dgm:if>
+                <dgm:else name="Name12">
+                  <dgm:shape xmlns:r="http://schemas.openxmlformats.org/officeDocument/2006/relationships" rot="180" type="chevron" r:blip="">
+                    <dgm:adjLst/>
+                  </dgm:shape>
+                </dgm:else>
+              </dgm:choose>
+              <dgm:presOf axis="self" ptType="node"/>
+              <dgm:choose name="Name13">
+                <dgm:if name="Name14" func="var" arg="dir" op="equ" val="norm">
+                  <dgm:constrLst>
+                    <dgm:constr type="h" refType="w" op="lte" fact="0.4"/>
+                    <dgm:constr type="h"/>
+                    <dgm:constr type="tMarg" refType="primFontSz" fact="0.105"/>
+                    <dgm:constr type="bMarg" refType="primFontSz" fact="0.105"/>
+                    <dgm:constr type="lMarg" refType="primFontSz" fact="0.315"/>
+                    <dgm:constr type="rMarg" refType="primFontSz" fact="0.105"/>
+                  </dgm:constrLst>
+                </dgm:if>
+                <dgm:else name="Name15">
+                  <dgm:constrLst>
+                    <dgm:constr type="h" refType="w" op="lte" fact="0.4"/>
+                    <dgm:constr type="h"/>
+                    <dgm:constr type="tMarg" refType="primFontSz" fact="0.105"/>
+                    <dgm:constr type="bMarg" refType="primFontSz" fact="0.105"/>
+                    <dgm:constr type="lMarg" refType="primFontSz" fact="0.105"/>
+                    <dgm:constr type="rMarg" refType="primFontSz" fact="0.315"/>
+                  </dgm:constrLst>
+                </dgm:else>
+              </dgm:choose>
+              <dgm:ruleLst>
+                <dgm:rule type="h" val="INF" fact="NaN" max="NaN"/>
+              </dgm:ruleLst>
+            </dgm:layoutNode>
+            <dgm:layoutNode name="desTx" styleLbl="revTx">
+              <dgm:varLst>
+                <dgm:bulletEnabled val="1"/>
+              </dgm:varLst>
+              <dgm:alg type="tx">
+                <dgm:param type="stBulletLvl" val="1"/>
+              </dgm:alg>
+              <dgm:choose name="Name16">
+                <dgm:if name="Name17" axis="ch" ptType="node" func="cnt" op="gte" val="1">
+                  <dgm:shape xmlns:r="http://schemas.openxmlformats.org/officeDocument/2006/relationships" type="rect" r:blip="">
+                    <dgm:adjLst/>
+                  </dgm:shape>
+                </dgm:if>
+                <dgm:else name="Name18">
+                  <dgm:shape xmlns:r="http://schemas.openxmlformats.org/officeDocument/2006/relationships" type="rect" r:blip="" hideGeom="1">
+                    <dgm:adjLst/>
+                  </dgm:shape>
+                </dgm:else>
+              </dgm:choose>
+              <dgm:presOf axis="des" ptType="node"/>
+              <dgm:constrLst>
+                <dgm:constr type="secFontSz" val="65"/>
+                <dgm:constr type="primFontSz" refType="secFontSz"/>
+                <dgm:constr type="h"/>
+                <dgm:constr type="tMarg"/>
+                <dgm:constr type="bMarg"/>
+                <dgm:constr type="rMarg"/>
+                <dgm:constr type="lMarg"/>
+              </dgm:constrLst>
+              <dgm:ruleLst>
+                <dgm:rule type="h" val="INF" fact="NaN" max="NaN"/>
+              </dgm:ruleLst>
+            </dgm:layoutNode>
+          </dgm:layoutNode>
+          <dgm:forEach name="Name19" axis="followSib" ptType="sibTrans" cnt="1">
+            <dgm:layoutNode name="space">
+              <dgm:alg type="sp"/>
+              <dgm:shape xmlns:r="http://schemas.openxmlformats.org/officeDocument/2006/relationships" r:blip="">
+                <dgm:adjLst/>
+              </dgm:shape>
+              <dgm:presOf/>
+              <dgm:constrLst/>
+              <dgm:ruleLst/>
+            </dgm:layoutNode>
+          </dgm:forEach>
+        </dgm:forEach>
+      </dgm:if>
+      <dgm:else name="Name20">
+        <dgm:constrLst>
+          <dgm:constr type="w" for="ch" forName="parTxOnly" refType="w"/>
+          <dgm:constr type="h" for="des" forName="parTxOnly" op="equ"/>
+          <dgm:constr type="primFontSz" for="des" forName="parTxOnly" op="equ" val="65"/>
+          <dgm:constr type="w" for="ch" forName="parTxOnlySpace" refType="w" refFor="ch" refForName="parTxOnly" fact="-0.1"/>
+        </dgm:constrLst>
+        <dgm:ruleLst/>
+        <dgm:forEach name="Name21" axis="ch" ptType="node">
+          <dgm:layoutNode name="parTxOnly">
+            <dgm:varLst>
+              <dgm:chMax val="0"/>
+              <dgm:chPref val="0"/>
+              <dgm:bulletEnabled val="1"/>
+            </dgm:varLst>
+            <dgm:alg type="tx"/>
+            <dgm:choose name="Name22">
+              <dgm:if name="Name23" func="var" arg="dir" op="equ" val="norm">
+                <dgm:shape xmlns:r="http://schemas.openxmlformats.org/officeDocument/2006/relationships" type="chevron" r:blip="">
+                  <dgm:adjLst/>
+                </dgm:shape>
+              </dgm:if>
+              <dgm:else name="Name24">
+                <dgm:shape xmlns:r="http://schemas.openxmlformats.org/officeDocument/2006/relationships" rot="180" type="chevron" r:blip="">
+                  <dgm:adjLst/>
+                </dgm:shape>
+              </dgm:else>
+            </dgm:choose>
+            <dgm:presOf axis="self" ptType="node"/>
+            <dgm:choose name="Name25">
+              <dgm:if name="Name26" func="var" arg="dir" op="equ" val="norm">
+                <dgm:constrLst>
+                  <dgm:constr type="h" refType="w" op="equ" fact="0.4"/>
+                  <dgm:constr type="tMarg" refType="primFontSz" fact="0.105"/>
+                  <dgm:constr type="bMarg" refType="primFontSz" fact="0.105"/>
+                  <dgm:constr type="lMarg" refType="primFontSz" fact="0.315"/>
+                  <dgm:constr type="rMarg" refType="primFontSz" fact="0.105"/>
+                </dgm:constrLst>
+              </dgm:if>
+              <dgm:else name="Name27">
+                <dgm:constrLst>
+                  <dgm:constr type="h" refType="w" op="equ" fact="0.4"/>
+                  <dgm:constr type="tMarg" refType="primFontSz" fact="0.105"/>
+                  <dgm:constr type="bMarg" refType="primFontSz" fact="0.105"/>
+                  <dgm:constr type="lMarg" refType="primFontSz" fact="0.105"/>
+                  <dgm:constr type="rMarg" refType="primFontSz" fact="0.315"/>
+                </dgm:constrLst>
+              </dgm:else>
+            </dgm:choose>
+            <dgm:ruleLst>
+              <dgm:rule type="primFontSz" val="5" fact="NaN" max="NaN"/>
+            </dgm:ruleLst>
+          </dgm:layoutNode>
+          <dgm:forEach name="Name28" axis="followSib" ptType="sibTrans" cnt="1">
+            <dgm:layoutNode name="parTxOnlySpace">
+              <dgm:alg type="sp"/>
+              <dgm:shape xmlns:r="http://schemas.openxmlformats.org/officeDocument/2006/relationships" r:blip="">
+                <dgm:adjLst/>
+              </dgm:shape>
+              <dgm:presOf/>
+              <dgm:constrLst/>
+              <dgm:ruleLst/>
+            </dgm:layoutNode>
+          </dgm:forEach>
+        </dgm:forEach>
+      </dgm:else>
+    </dgm:choose>
+  </dgm:layoutNode>
+</dgm:layoutDef>
+</file>
+
+<file path=ppt/diagrams/layout2.xml><?xml version="1.0" encoding="utf-8"?>
 <dgm:layoutDef xmlns:dgm="http://schemas.openxmlformats.org/drawingml/2006/diagram" xmlns:a="http://schemas.openxmlformats.org/drawingml/2006/main" uniqueId="urn:microsoft.com/office/officeart/2005/8/layout/chevron1">
   <dgm:title val=""/>
   <dgm:desc val=""/>
@@ -3465,6 +5208,1040 @@
 </dgm:styleDef>
 </file>
 
+<file path=ppt/diagrams/quickStyle2.xml><?xml version="1.0" encoding="utf-8"?>
+<dgm:styleDef xmlns:dgm="http://schemas.openxmlformats.org/drawingml/2006/diagram" xmlns:a="http://schemas.openxmlformats.org/drawingml/2006/main" uniqueId="urn:microsoft.com/office/officeart/2005/8/quickstyle/simple4">
+  <dgm:title val=""/>
+  <dgm:desc val=""/>
+  <dgm:catLst>
+    <dgm:cat type="simple" pri="10400"/>
+  </dgm:catLst>
+  <dgm:scene3d>
+    <a:camera prst="orthographicFront"/>
+    <a:lightRig rig="threePt" dir="t"/>
+  </dgm:scene3d>
+  <dgm:styleLbl name="node0">
+    <dgm:scene3d>
+      <a:camera prst="orthographicFront"/>
+      <a:lightRig rig="threePt" dir="t"/>
+    </dgm:scene3d>
+    <dgm:sp3d/>
+    <dgm:txPr/>
+    <dgm:style>
+      <a:lnRef idx="0">
+        <a:scrgbClr r="0" g="0" b="0"/>
+      </a:lnRef>
+      <a:fillRef idx="3">
+        <a:scrgbClr r="0" g="0" b="0"/>
+      </a:fillRef>
+      <a:effectRef idx="2">
+        <a:scrgbClr r="0" g="0" b="0"/>
+      </a:effectRef>
+      <a:fontRef idx="minor">
+        <a:schemeClr val="lt1"/>
+      </a:fontRef>
+    </dgm:style>
+  </dgm:styleLbl>
+  <dgm:styleLbl name="lnNode1">
+    <dgm:scene3d>
+      <a:camera prst="orthographicFront"/>
+      <a:lightRig rig="threePt" dir="t"/>
+    </dgm:scene3d>
+    <dgm:sp3d/>
+    <dgm:txPr/>
+    <dgm:style>
+      <a:lnRef idx="1">
+        <a:scrgbClr r="0" g="0" b="0"/>
+      </a:lnRef>
+      <a:fillRef idx="3">
+        <a:scrgbClr r="0" g="0" b="0"/>
+      </a:fillRef>
+      <a:effectRef idx="2">
+        <a:scrgbClr r="0" g="0" b="0"/>
+      </a:effectRef>
+      <a:fontRef idx="minor">
+        <a:schemeClr val="lt1"/>
+      </a:fontRef>
+    </dgm:style>
+  </dgm:styleLbl>
+  <dgm:styleLbl name="vennNode1">
+    <dgm:scene3d>
+      <a:camera prst="orthographicFront"/>
+      <a:lightRig rig="threePt" dir="t"/>
+    </dgm:scene3d>
+    <dgm:sp3d/>
+    <dgm:txPr/>
+    <dgm:style>
+      <a:lnRef idx="0">
+        <a:scrgbClr r="0" g="0" b="0"/>
+      </a:lnRef>
+      <a:fillRef idx="3">
+        <a:scrgbClr r="0" g="0" b="0"/>
+      </a:fillRef>
+      <a:effectRef idx="0">
+        <a:scrgbClr r="0" g="0" b="0"/>
+      </a:effectRef>
+      <a:fontRef idx="minor">
+        <a:schemeClr val="tx1"/>
+      </a:fontRef>
+    </dgm:style>
+  </dgm:styleLbl>
+  <dgm:styleLbl name="alignNode1">
+    <dgm:scene3d>
+      <a:camera prst="orthographicFront"/>
+      <a:lightRig rig="threePt" dir="t"/>
+    </dgm:scene3d>
+    <dgm:sp3d/>
+    <dgm:txPr/>
+    <dgm:style>
+      <a:lnRef idx="1">
+        <a:scrgbClr r="0" g="0" b="0"/>
+      </a:lnRef>
+      <a:fillRef idx="3">
+        <a:scrgbClr r="0" g="0" b="0"/>
+      </a:fillRef>
+      <a:effectRef idx="2">
+        <a:scrgbClr r="0" g="0" b="0"/>
+      </a:effectRef>
+      <a:fontRef idx="minor">
+        <a:schemeClr val="lt1"/>
+      </a:fontRef>
+    </dgm:style>
+  </dgm:styleLbl>
+  <dgm:styleLbl name="node1">
+    <dgm:scene3d>
+      <a:camera prst="orthographicFront"/>
+      <a:lightRig rig="threePt" dir="t"/>
+    </dgm:scene3d>
+    <dgm:sp3d/>
+    <dgm:txPr/>
+    <dgm:style>
+      <a:lnRef idx="0">
+        <a:scrgbClr r="0" g="0" b="0"/>
+      </a:lnRef>
+      <a:fillRef idx="3">
+        <a:scrgbClr r="0" g="0" b="0"/>
+      </a:fillRef>
+      <a:effectRef idx="2">
+        <a:scrgbClr r="0" g="0" b="0"/>
+      </a:effectRef>
+      <a:fontRef idx="minor">
+        <a:schemeClr val="lt1"/>
+      </a:fontRef>
+    </dgm:style>
+  </dgm:styleLbl>
+  <dgm:styleLbl name="node2">
+    <dgm:scene3d>
+      <a:camera prst="orthographicFront"/>
+      <a:lightRig rig="threePt" dir="t"/>
+    </dgm:scene3d>
+    <dgm:sp3d/>
+    <dgm:txPr/>
+    <dgm:style>
+      <a:lnRef idx="0">
+        <a:scrgbClr r="0" g="0" b="0"/>
+      </a:lnRef>
+      <a:fillRef idx="3">
+        <a:scrgbClr r="0" g="0" b="0"/>
+      </a:fillRef>
+      <a:effectRef idx="2">
+        <a:scrgbClr r="0" g="0" b="0"/>
+      </a:effectRef>
+      <a:fontRef idx="minor">
+        <a:schemeClr val="lt1"/>
+      </a:fontRef>
+    </dgm:style>
+  </dgm:styleLbl>
+  <dgm:styleLbl name="node3">
+    <dgm:scene3d>
+      <a:camera prst="orthographicFront"/>
+      <a:lightRig rig="threePt" dir="t"/>
+    </dgm:scene3d>
+    <dgm:sp3d/>
+    <dgm:txPr/>
+    <dgm:style>
+      <a:lnRef idx="0">
+        <a:scrgbClr r="0" g="0" b="0"/>
+      </a:lnRef>
+      <a:fillRef idx="3">
+        <a:scrgbClr r="0" g="0" b="0"/>
+      </a:fillRef>
+      <a:effectRef idx="2">
+        <a:scrgbClr r="0" g="0" b="0"/>
+      </a:effectRef>
+      <a:fontRef idx="minor">
+        <a:schemeClr val="lt1"/>
+      </a:fontRef>
+    </dgm:style>
+  </dgm:styleLbl>
+  <dgm:styleLbl name="node4">
+    <dgm:scene3d>
+      <a:camera prst="orthographicFront"/>
+      <a:lightRig rig="threePt" dir="t"/>
+    </dgm:scene3d>
+    <dgm:sp3d/>
+    <dgm:txPr/>
+    <dgm:style>
+      <a:lnRef idx="0">
+        <a:scrgbClr r="0" g="0" b="0"/>
+      </a:lnRef>
+      <a:fillRef idx="3">
+        <a:scrgbClr r="0" g="0" b="0"/>
+      </a:fillRef>
+      <a:effectRef idx="2">
+        <a:scrgbClr r="0" g="0" b="0"/>
+      </a:effectRef>
+      <a:fontRef idx="minor">
+        <a:schemeClr val="lt1"/>
+      </a:fontRef>
+    </dgm:style>
+  </dgm:styleLbl>
+  <dgm:styleLbl name="fgImgPlace1">
+    <dgm:scene3d>
+      <a:camera prst="orthographicFront"/>
+      <a:lightRig rig="threePt" dir="t"/>
+    </dgm:scene3d>
+    <dgm:sp3d/>
+    <dgm:txPr/>
+    <dgm:style>
+      <a:lnRef idx="0">
+        <a:scrgbClr r="0" g="0" b="0"/>
+      </a:lnRef>
+      <a:fillRef idx="1">
+        <a:scrgbClr r="0" g="0" b="0"/>
+      </a:fillRef>
+      <a:effectRef idx="2">
+        <a:scrgbClr r="0" g="0" b="0"/>
+      </a:effectRef>
+      <a:fontRef idx="minor"/>
+    </dgm:style>
+  </dgm:styleLbl>
+  <dgm:styleLbl name="alignImgPlace1">
+    <dgm:scene3d>
+      <a:camera prst="orthographicFront"/>
+      <a:lightRig rig="threePt" dir="t"/>
+    </dgm:scene3d>
+    <dgm:sp3d/>
+    <dgm:txPr/>
+    <dgm:style>
+      <a:lnRef idx="0">
+        <a:scrgbClr r="0" g="0" b="0"/>
+      </a:lnRef>
+      <a:fillRef idx="1">
+        <a:scrgbClr r="0" g="0" b="0"/>
+      </a:fillRef>
+      <a:effectRef idx="2">
+        <a:scrgbClr r="0" g="0" b="0"/>
+      </a:effectRef>
+      <a:fontRef idx="minor"/>
+    </dgm:style>
+  </dgm:styleLbl>
+  <dgm:styleLbl name="bgImgPlace1">
+    <dgm:scene3d>
+      <a:camera prst="orthographicFront"/>
+      <a:lightRig rig="threePt" dir="t"/>
+    </dgm:scene3d>
+    <dgm:sp3d/>
+    <dgm:txPr/>
+    <dgm:style>
+      <a:lnRef idx="0">
+        <a:scrgbClr r="0" g="0" b="0"/>
+      </a:lnRef>
+      <a:fillRef idx="1">
+        <a:scrgbClr r="0" g="0" b="0"/>
+      </a:fillRef>
+      <a:effectRef idx="2">
+        <a:scrgbClr r="0" g="0" b="0"/>
+      </a:effectRef>
+      <a:fontRef idx="minor"/>
+    </dgm:style>
+  </dgm:styleLbl>
+  <dgm:styleLbl name="sibTrans2D1">
+    <dgm:scene3d>
+      <a:camera prst="orthographicFront"/>
+      <a:lightRig rig="threePt" dir="t"/>
+    </dgm:scene3d>
+    <dgm:sp3d/>
+    <dgm:txPr/>
+    <dgm:style>
+      <a:lnRef idx="0">
+        <a:scrgbClr r="0" g="0" b="0"/>
+      </a:lnRef>
+      <a:fillRef idx="3">
+        <a:scrgbClr r="0" g="0" b="0"/>
+      </a:fillRef>
+      <a:effectRef idx="2">
+        <a:scrgbClr r="0" g="0" b="0"/>
+      </a:effectRef>
+      <a:fontRef idx="minor">
+        <a:schemeClr val="lt1"/>
+      </a:fontRef>
+    </dgm:style>
+  </dgm:styleLbl>
+  <dgm:styleLbl name="fgSibTrans2D1">
+    <dgm:scene3d>
+      <a:camera prst="orthographicFront"/>
+      <a:lightRig rig="threePt" dir="t"/>
+    </dgm:scene3d>
+    <dgm:sp3d/>
+    <dgm:txPr/>
+    <dgm:style>
+      <a:lnRef idx="0">
+        <a:scrgbClr r="0" g="0" b="0"/>
+      </a:lnRef>
+      <a:fillRef idx="3">
+        <a:scrgbClr r="0" g="0" b="0"/>
+      </a:fillRef>
+      <a:effectRef idx="2">
+        <a:scrgbClr r="0" g="0" b="0"/>
+      </a:effectRef>
+      <a:fontRef idx="minor">
+        <a:schemeClr val="lt1"/>
+      </a:fontRef>
+    </dgm:style>
+  </dgm:styleLbl>
+  <dgm:styleLbl name="bgSibTrans2D1">
+    <dgm:scene3d>
+      <a:camera prst="orthographicFront"/>
+      <a:lightRig rig="threePt" dir="t"/>
+    </dgm:scene3d>
+    <dgm:sp3d/>
+    <dgm:txPr/>
+    <dgm:style>
+      <a:lnRef idx="0">
+        <a:scrgbClr r="0" g="0" b="0"/>
+      </a:lnRef>
+      <a:fillRef idx="3">
+        <a:scrgbClr r="0" g="0" b="0"/>
+      </a:fillRef>
+      <a:effectRef idx="2">
+        <a:scrgbClr r="0" g="0" b="0"/>
+      </a:effectRef>
+      <a:fontRef idx="minor">
+        <a:schemeClr val="lt1"/>
+      </a:fontRef>
+    </dgm:style>
+  </dgm:styleLbl>
+  <dgm:styleLbl name="sibTrans1D1">
+    <dgm:scene3d>
+      <a:camera prst="orthographicFront"/>
+      <a:lightRig rig="threePt" dir="t"/>
+    </dgm:scene3d>
+    <dgm:sp3d/>
+    <dgm:txPr/>
+    <dgm:style>
+      <a:lnRef idx="1">
+        <a:scrgbClr r="0" g="0" b="0"/>
+      </a:lnRef>
+      <a:fillRef idx="0">
+        <a:scrgbClr r="0" g="0" b="0"/>
+      </a:fillRef>
+      <a:effectRef idx="0">
+        <a:scrgbClr r="0" g="0" b="0"/>
+      </a:effectRef>
+      <a:fontRef idx="minor"/>
+    </dgm:style>
+  </dgm:styleLbl>
+  <dgm:styleLbl name="callout">
+    <dgm:scene3d>
+      <a:camera prst="orthographicFront"/>
+      <a:lightRig rig="threePt" dir="t"/>
+    </dgm:scene3d>
+    <dgm:sp3d/>
+    <dgm:txPr/>
+    <dgm:style>
+      <a:lnRef idx="2">
+        <a:scrgbClr r="0" g="0" b="0"/>
+      </a:lnRef>
+      <a:fillRef idx="1">
+        <a:scrgbClr r="0" g="0" b="0"/>
+      </a:fillRef>
+      <a:effectRef idx="1">
+        <a:scrgbClr r="0" g="0" b="0"/>
+      </a:effectRef>
+      <a:fontRef idx="minor"/>
+    </dgm:style>
+  </dgm:styleLbl>
+  <dgm:styleLbl name="asst0">
+    <dgm:scene3d>
+      <a:camera prst="orthographicFront"/>
+      <a:lightRig rig="threePt" dir="t"/>
+    </dgm:scene3d>
+    <dgm:sp3d/>
+    <dgm:txPr/>
+    <dgm:style>
+      <a:lnRef idx="0">
+        <a:scrgbClr r="0" g="0" b="0"/>
+      </a:lnRef>
+      <a:fillRef idx="3">
+        <a:scrgbClr r="0" g="0" b="0"/>
+      </a:fillRef>
+      <a:effectRef idx="2">
+        <a:scrgbClr r="0" g="0" b="0"/>
+      </a:effectRef>
+      <a:fontRef idx="minor">
+        <a:schemeClr val="lt1"/>
+      </a:fontRef>
+    </dgm:style>
+  </dgm:styleLbl>
+  <dgm:styleLbl name="asst1">
+    <dgm:scene3d>
+      <a:camera prst="orthographicFront"/>
+      <a:lightRig rig="threePt" dir="t"/>
+    </dgm:scene3d>
+    <dgm:sp3d/>
+    <dgm:txPr/>
+    <dgm:style>
+      <a:lnRef idx="0">
+        <a:scrgbClr r="0" g="0" b="0"/>
+      </a:lnRef>
+      <a:fillRef idx="3">
+        <a:scrgbClr r="0" g="0" b="0"/>
+      </a:fillRef>
+      <a:effectRef idx="2">
+        <a:scrgbClr r="0" g="0" b="0"/>
+      </a:effectRef>
+      <a:fontRef idx="minor">
+        <a:schemeClr val="lt1"/>
+      </a:fontRef>
+    </dgm:style>
+  </dgm:styleLbl>
+  <dgm:styleLbl name="asst2">
+    <dgm:scene3d>
+      <a:camera prst="orthographicFront"/>
+      <a:lightRig rig="threePt" dir="t"/>
+    </dgm:scene3d>
+    <dgm:sp3d/>
+    <dgm:txPr/>
+    <dgm:style>
+      <a:lnRef idx="0">
+        <a:scrgbClr r="0" g="0" b="0"/>
+      </a:lnRef>
+      <a:fillRef idx="3">
+        <a:scrgbClr r="0" g="0" b="0"/>
+      </a:fillRef>
+      <a:effectRef idx="2">
+        <a:scrgbClr r="0" g="0" b="0"/>
+      </a:effectRef>
+      <a:fontRef idx="minor">
+        <a:schemeClr val="lt1"/>
+      </a:fontRef>
+    </dgm:style>
+  </dgm:styleLbl>
+  <dgm:styleLbl name="asst3">
+    <dgm:scene3d>
+      <a:camera prst="orthographicFront"/>
+      <a:lightRig rig="threePt" dir="t"/>
+    </dgm:scene3d>
+    <dgm:sp3d/>
+    <dgm:txPr/>
+    <dgm:style>
+      <a:lnRef idx="0">
+        <a:scrgbClr r="0" g="0" b="0"/>
+      </a:lnRef>
+      <a:fillRef idx="3">
+        <a:scrgbClr r="0" g="0" b="0"/>
+      </a:fillRef>
+      <a:effectRef idx="2">
+        <a:scrgbClr r="0" g="0" b="0"/>
+      </a:effectRef>
+      <a:fontRef idx="minor">
+        <a:schemeClr val="lt1"/>
+      </a:fontRef>
+    </dgm:style>
+  </dgm:styleLbl>
+  <dgm:styleLbl name="asst4">
+    <dgm:scene3d>
+      <a:camera prst="orthographicFront"/>
+      <a:lightRig rig="threePt" dir="t"/>
+    </dgm:scene3d>
+    <dgm:sp3d/>
+    <dgm:txPr/>
+    <dgm:style>
+      <a:lnRef idx="0">
+        <a:scrgbClr r="0" g="0" b="0"/>
+      </a:lnRef>
+      <a:fillRef idx="3">
+        <a:scrgbClr r="0" g="0" b="0"/>
+      </a:fillRef>
+      <a:effectRef idx="2">
+        <a:scrgbClr r="0" g="0" b="0"/>
+      </a:effectRef>
+      <a:fontRef idx="minor">
+        <a:schemeClr val="lt1"/>
+      </a:fontRef>
+    </dgm:style>
+  </dgm:styleLbl>
+  <dgm:styleLbl name="parChTrans2D1">
+    <dgm:scene3d>
+      <a:camera prst="orthographicFront"/>
+      <a:lightRig rig="threePt" dir="t"/>
+    </dgm:scene3d>
+    <dgm:sp3d/>
+    <dgm:txPr/>
+    <dgm:style>
+      <a:lnRef idx="0">
+        <a:scrgbClr r="0" g="0" b="0"/>
+      </a:lnRef>
+      <a:fillRef idx="3">
+        <a:scrgbClr r="0" g="0" b="0"/>
+      </a:fillRef>
+      <a:effectRef idx="2">
+        <a:scrgbClr r="0" g="0" b="0"/>
+      </a:effectRef>
+      <a:fontRef idx="minor">
+        <a:schemeClr val="lt1"/>
+      </a:fontRef>
+    </dgm:style>
+  </dgm:styleLbl>
+  <dgm:styleLbl name="parChTrans2D2">
+    <dgm:scene3d>
+      <a:camera prst="orthographicFront"/>
+      <a:lightRig rig="threePt" dir="t"/>
+    </dgm:scene3d>
+    <dgm:sp3d/>
+    <dgm:txPr/>
+    <dgm:style>
+      <a:lnRef idx="0">
+        <a:scrgbClr r="0" g="0" b="0"/>
+      </a:lnRef>
+      <a:fillRef idx="3">
+        <a:scrgbClr r="0" g="0" b="0"/>
+      </a:fillRef>
+      <a:effectRef idx="2">
+        <a:scrgbClr r="0" g="0" b="0"/>
+      </a:effectRef>
+      <a:fontRef idx="minor">
+        <a:schemeClr val="lt1"/>
+      </a:fontRef>
+    </dgm:style>
+  </dgm:styleLbl>
+  <dgm:styleLbl name="parChTrans2D3">
+    <dgm:scene3d>
+      <a:camera prst="orthographicFront"/>
+      <a:lightRig rig="threePt" dir="t"/>
+    </dgm:scene3d>
+    <dgm:sp3d/>
+    <dgm:txPr/>
+    <dgm:style>
+      <a:lnRef idx="1">
+        <a:scrgbClr r="0" g="0" b="0"/>
+      </a:lnRef>
+      <a:fillRef idx="3">
+        <a:scrgbClr r="0" g="0" b="0"/>
+      </a:fillRef>
+      <a:effectRef idx="2">
+        <a:scrgbClr r="0" g="0" b="0"/>
+      </a:effectRef>
+      <a:fontRef idx="minor">
+        <a:schemeClr val="lt1"/>
+      </a:fontRef>
+    </dgm:style>
+  </dgm:styleLbl>
+  <dgm:styleLbl name="parChTrans2D4">
+    <dgm:scene3d>
+      <a:camera prst="orthographicFront"/>
+      <a:lightRig rig="threePt" dir="t"/>
+    </dgm:scene3d>
+    <dgm:sp3d/>
+    <dgm:txPr/>
+    <dgm:style>
+      <a:lnRef idx="1">
+        <a:scrgbClr r="0" g="0" b="0"/>
+      </a:lnRef>
+      <a:fillRef idx="3">
+        <a:scrgbClr r="0" g="0" b="0"/>
+      </a:fillRef>
+      <a:effectRef idx="2">
+        <a:scrgbClr r="0" g="0" b="0"/>
+      </a:effectRef>
+      <a:fontRef idx="minor">
+        <a:schemeClr val="lt1"/>
+      </a:fontRef>
+    </dgm:style>
+  </dgm:styleLbl>
+  <dgm:styleLbl name="parChTrans1D1">
+    <dgm:scene3d>
+      <a:camera prst="orthographicFront"/>
+      <a:lightRig rig="threePt" dir="t"/>
+    </dgm:scene3d>
+    <dgm:sp3d/>
+    <dgm:txPr/>
+    <dgm:style>
+      <a:lnRef idx="1">
+        <a:scrgbClr r="0" g="0" b="0"/>
+      </a:lnRef>
+      <a:fillRef idx="0">
+        <a:scrgbClr r="0" g="0" b="0"/>
+      </a:fillRef>
+      <a:effectRef idx="0">
+        <a:scrgbClr r="0" g="0" b="0"/>
+      </a:effectRef>
+      <a:fontRef idx="minor"/>
+    </dgm:style>
+  </dgm:styleLbl>
+  <dgm:styleLbl name="parChTrans1D2">
+    <dgm:scene3d>
+      <a:camera prst="orthographicFront"/>
+      <a:lightRig rig="threePt" dir="t"/>
+    </dgm:scene3d>
+    <dgm:sp3d/>
+    <dgm:txPr/>
+    <dgm:style>
+      <a:lnRef idx="1">
+        <a:scrgbClr r="0" g="0" b="0"/>
+      </a:lnRef>
+      <a:fillRef idx="0">
+        <a:scrgbClr r="0" g="0" b="0"/>
+      </a:fillRef>
+      <a:effectRef idx="0">
+        <a:scrgbClr r="0" g="0" b="0"/>
+      </a:effectRef>
+      <a:fontRef idx="minor"/>
+    </dgm:style>
+  </dgm:styleLbl>
+  <dgm:styleLbl name="parChTrans1D3">
+    <dgm:scene3d>
+      <a:camera prst="orthographicFront"/>
+      <a:lightRig rig="threePt" dir="t"/>
+    </dgm:scene3d>
+    <dgm:sp3d/>
+    <dgm:txPr/>
+    <dgm:style>
+      <a:lnRef idx="1">
+        <a:scrgbClr r="0" g="0" b="0"/>
+      </a:lnRef>
+      <a:fillRef idx="0">
+        <a:scrgbClr r="0" g="0" b="0"/>
+      </a:fillRef>
+      <a:effectRef idx="0">
+        <a:scrgbClr r="0" g="0" b="0"/>
+      </a:effectRef>
+      <a:fontRef idx="minor"/>
+    </dgm:style>
+  </dgm:styleLbl>
+  <dgm:styleLbl name="parChTrans1D4">
+    <dgm:scene3d>
+      <a:camera prst="orthographicFront"/>
+      <a:lightRig rig="threePt" dir="t"/>
+    </dgm:scene3d>
+    <dgm:sp3d/>
+    <dgm:txPr/>
+    <dgm:style>
+      <a:lnRef idx="1">
+        <a:scrgbClr r="0" g="0" b="0"/>
+      </a:lnRef>
+      <a:fillRef idx="0">
+        <a:scrgbClr r="0" g="0" b="0"/>
+      </a:fillRef>
+      <a:effectRef idx="0">
+        <a:scrgbClr r="0" g="0" b="0"/>
+      </a:effectRef>
+      <a:fontRef idx="minor"/>
+    </dgm:style>
+  </dgm:styleLbl>
+  <dgm:styleLbl name="fgAcc1">
+    <dgm:scene3d>
+      <a:camera prst="orthographicFront"/>
+      <a:lightRig rig="threePt" dir="t"/>
+    </dgm:scene3d>
+    <dgm:sp3d/>
+    <dgm:txPr/>
+    <dgm:style>
+      <a:lnRef idx="1">
+        <a:scrgbClr r="0" g="0" b="0"/>
+      </a:lnRef>
+      <a:fillRef idx="1">
+        <a:scrgbClr r="0" g="0" b="0"/>
+      </a:fillRef>
+      <a:effectRef idx="0">
+        <a:scrgbClr r="0" g="0" b="0"/>
+      </a:effectRef>
+      <a:fontRef idx="minor"/>
+    </dgm:style>
+  </dgm:styleLbl>
+  <dgm:styleLbl name="conFgAcc1">
+    <dgm:scene3d>
+      <a:camera prst="orthographicFront"/>
+      <a:lightRig rig="threePt" dir="t"/>
+    </dgm:scene3d>
+    <dgm:sp3d/>
+    <dgm:txPr/>
+    <dgm:style>
+      <a:lnRef idx="1">
+        <a:scrgbClr r="0" g="0" b="0"/>
+      </a:lnRef>
+      <a:fillRef idx="1">
+        <a:scrgbClr r="0" g="0" b="0"/>
+      </a:fillRef>
+      <a:effectRef idx="0">
+        <a:scrgbClr r="0" g="0" b="0"/>
+      </a:effectRef>
+      <a:fontRef idx="minor"/>
+    </dgm:style>
+  </dgm:styleLbl>
+  <dgm:styleLbl name="alignAcc1">
+    <dgm:scene3d>
+      <a:camera prst="orthographicFront"/>
+      <a:lightRig rig="threePt" dir="t"/>
+    </dgm:scene3d>
+    <dgm:sp3d/>
+    <dgm:txPr/>
+    <dgm:style>
+      <a:lnRef idx="1">
+        <a:scrgbClr r="0" g="0" b="0"/>
+      </a:lnRef>
+      <a:fillRef idx="1">
+        <a:scrgbClr r="0" g="0" b="0"/>
+      </a:fillRef>
+      <a:effectRef idx="0">
+        <a:scrgbClr r="0" g="0" b="0"/>
+      </a:effectRef>
+      <a:fontRef idx="minor"/>
+    </dgm:style>
+  </dgm:styleLbl>
+  <dgm:styleLbl name="trAlignAcc1">
+    <dgm:scene3d>
+      <a:camera prst="orthographicFront"/>
+      <a:lightRig rig="threePt" dir="t"/>
+    </dgm:scene3d>
+    <dgm:sp3d/>
+    <dgm:txPr/>
+    <dgm:style>
+      <a:lnRef idx="1">
+        <a:scrgbClr r="0" g="0" b="0"/>
+      </a:lnRef>
+      <a:fillRef idx="1">
+        <a:scrgbClr r="0" g="0" b="0"/>
+      </a:fillRef>
+      <a:effectRef idx="0">
+        <a:scrgbClr r="0" g="0" b="0"/>
+      </a:effectRef>
+      <a:fontRef idx="minor"/>
+    </dgm:style>
+  </dgm:styleLbl>
+  <dgm:styleLbl name="bgAcc1">
+    <dgm:scene3d>
+      <a:camera prst="orthographicFront"/>
+      <a:lightRig rig="threePt" dir="t"/>
+    </dgm:scene3d>
+    <dgm:sp3d/>
+    <dgm:txPr/>
+    <dgm:style>
+      <a:lnRef idx="1">
+        <a:scrgbClr r="0" g="0" b="0"/>
+      </a:lnRef>
+      <a:fillRef idx="1">
+        <a:scrgbClr r="0" g="0" b="0"/>
+      </a:fillRef>
+      <a:effectRef idx="0">
+        <a:scrgbClr r="0" g="0" b="0"/>
+      </a:effectRef>
+      <a:fontRef idx="minor"/>
+    </dgm:style>
+  </dgm:styleLbl>
+  <dgm:styleLbl name="solidFgAcc1">
+    <dgm:scene3d>
+      <a:camera prst="orthographicFront"/>
+      <a:lightRig rig="threePt" dir="t"/>
+    </dgm:scene3d>
+    <dgm:sp3d/>
+    <dgm:txPr/>
+    <dgm:style>
+      <a:lnRef idx="1">
+        <a:scrgbClr r="0" g="0" b="0"/>
+      </a:lnRef>
+      <a:fillRef idx="1">
+        <a:scrgbClr r="0" g="0" b="0"/>
+      </a:fillRef>
+      <a:effectRef idx="0">
+        <a:scrgbClr r="0" g="0" b="0"/>
+      </a:effectRef>
+      <a:fontRef idx="minor"/>
+    </dgm:style>
+  </dgm:styleLbl>
+  <dgm:styleLbl name="solidAlignAcc1">
+    <dgm:scene3d>
+      <a:camera prst="orthographicFront"/>
+      <a:lightRig rig="threePt" dir="t"/>
+    </dgm:scene3d>
+    <dgm:sp3d/>
+    <dgm:txPr/>
+    <dgm:style>
+      <a:lnRef idx="1">
+        <a:scrgbClr r="0" g="0" b="0"/>
+      </a:lnRef>
+      <a:fillRef idx="1">
+        <a:scrgbClr r="0" g="0" b="0"/>
+      </a:fillRef>
+      <a:effectRef idx="0">
+        <a:scrgbClr r="0" g="0" b="0"/>
+      </a:effectRef>
+      <a:fontRef idx="minor"/>
+    </dgm:style>
+  </dgm:styleLbl>
+  <dgm:styleLbl name="solidBgAcc1">
+    <dgm:scene3d>
+      <a:camera prst="orthographicFront"/>
+      <a:lightRig rig="threePt" dir="t"/>
+    </dgm:scene3d>
+    <dgm:sp3d/>
+    <dgm:txPr/>
+    <dgm:style>
+      <a:lnRef idx="1">
+        <a:scrgbClr r="0" g="0" b="0"/>
+      </a:lnRef>
+      <a:fillRef idx="1">
+        <a:scrgbClr r="0" g="0" b="0"/>
+      </a:fillRef>
+      <a:effectRef idx="0">
+        <a:scrgbClr r="0" g="0" b="0"/>
+      </a:effectRef>
+      <a:fontRef idx="minor"/>
+    </dgm:style>
+  </dgm:styleLbl>
+  <dgm:styleLbl name="fgAccFollowNode1">
+    <dgm:scene3d>
+      <a:camera prst="orthographicFront"/>
+      <a:lightRig rig="threePt" dir="t"/>
+    </dgm:scene3d>
+    <dgm:sp3d/>
+    <dgm:txPr/>
+    <dgm:style>
+      <a:lnRef idx="1">
+        <a:scrgbClr r="0" g="0" b="0"/>
+      </a:lnRef>
+      <a:fillRef idx="1">
+        <a:scrgbClr r="0" g="0" b="0"/>
+      </a:fillRef>
+      <a:effectRef idx="0">
+        <a:scrgbClr r="0" g="0" b="0"/>
+      </a:effectRef>
+      <a:fontRef idx="minor"/>
+    </dgm:style>
+  </dgm:styleLbl>
+  <dgm:styleLbl name="alignAccFollowNode1">
+    <dgm:scene3d>
+      <a:camera prst="orthographicFront"/>
+      <a:lightRig rig="threePt" dir="t"/>
+    </dgm:scene3d>
+    <dgm:sp3d/>
+    <dgm:txPr/>
+    <dgm:style>
+      <a:lnRef idx="1">
+        <a:scrgbClr r="0" g="0" b="0"/>
+      </a:lnRef>
+      <a:fillRef idx="1">
+        <a:scrgbClr r="0" g="0" b="0"/>
+      </a:fillRef>
+      <a:effectRef idx="0">
+        <a:scrgbClr r="0" g="0" b="0"/>
+      </a:effectRef>
+      <a:fontRef idx="minor"/>
+    </dgm:style>
+  </dgm:styleLbl>
+  <dgm:styleLbl name="bgAccFollowNode1">
+    <dgm:scene3d>
+      <a:camera prst="orthographicFront"/>
+      <a:lightRig rig="threePt" dir="t"/>
+    </dgm:scene3d>
+    <dgm:sp3d/>
+    <dgm:txPr/>
+    <dgm:style>
+      <a:lnRef idx="1">
+        <a:scrgbClr r="0" g="0" b="0"/>
+      </a:lnRef>
+      <a:fillRef idx="1">
+        <a:scrgbClr r="0" g="0" b="0"/>
+      </a:fillRef>
+      <a:effectRef idx="0">
+        <a:scrgbClr r="0" g="0" b="0"/>
+      </a:effectRef>
+      <a:fontRef idx="minor"/>
+    </dgm:style>
+  </dgm:styleLbl>
+  <dgm:styleLbl name="fgAcc0">
+    <dgm:scene3d>
+      <a:camera prst="orthographicFront"/>
+      <a:lightRig rig="threePt" dir="t"/>
+    </dgm:scene3d>
+    <dgm:sp3d/>
+    <dgm:txPr/>
+    <dgm:style>
+      <a:lnRef idx="1">
+        <a:scrgbClr r="0" g="0" b="0"/>
+      </a:lnRef>
+      <a:fillRef idx="1">
+        <a:scrgbClr r="0" g="0" b="0"/>
+      </a:fillRef>
+      <a:effectRef idx="0">
+        <a:scrgbClr r="0" g="0" b="0"/>
+      </a:effectRef>
+      <a:fontRef idx="minor"/>
+    </dgm:style>
+  </dgm:styleLbl>
+  <dgm:styleLbl name="fgAcc2">
+    <dgm:scene3d>
+      <a:camera prst="orthographicFront"/>
+      <a:lightRig rig="threePt" dir="t"/>
+    </dgm:scene3d>
+    <dgm:sp3d/>
+    <dgm:txPr/>
+    <dgm:style>
+      <a:lnRef idx="1">
+        <a:scrgbClr r="0" g="0" b="0"/>
+      </a:lnRef>
+      <a:fillRef idx="1">
+        <a:scrgbClr r="0" g="0" b="0"/>
+      </a:fillRef>
+      <a:effectRef idx="0">
+        <a:scrgbClr r="0" g="0" b="0"/>
+      </a:effectRef>
+      <a:fontRef idx="minor"/>
+    </dgm:style>
+  </dgm:styleLbl>
+  <dgm:styleLbl name="fgAcc3">
+    <dgm:scene3d>
+      <a:camera prst="orthographicFront"/>
+      <a:lightRig rig="threePt" dir="t"/>
+    </dgm:scene3d>
+    <dgm:sp3d/>
+    <dgm:txPr/>
+    <dgm:style>
+      <a:lnRef idx="1">
+        <a:scrgbClr r="0" g="0" b="0"/>
+      </a:lnRef>
+      <a:fillRef idx="1">
+        <a:scrgbClr r="0" g="0" b="0"/>
+      </a:fillRef>
+      <a:effectRef idx="0">
+        <a:scrgbClr r="0" g="0" b="0"/>
+      </a:effectRef>
+      <a:fontRef idx="minor"/>
+    </dgm:style>
+  </dgm:styleLbl>
+  <dgm:styleLbl name="fgAcc4">
+    <dgm:scene3d>
+      <a:camera prst="orthographicFront"/>
+      <a:lightRig rig="threePt" dir="t"/>
+    </dgm:scene3d>
+    <dgm:sp3d/>
+    <dgm:txPr/>
+    <dgm:style>
+      <a:lnRef idx="1">
+        <a:scrgbClr r="0" g="0" b="0"/>
+      </a:lnRef>
+      <a:fillRef idx="1">
+        <a:scrgbClr r="0" g="0" b="0"/>
+      </a:fillRef>
+      <a:effectRef idx="0">
+        <a:scrgbClr r="0" g="0" b="0"/>
+      </a:effectRef>
+      <a:fontRef idx="minor"/>
+    </dgm:style>
+  </dgm:styleLbl>
+  <dgm:styleLbl name="bgShp">
+    <dgm:scene3d>
+      <a:camera prst="orthographicFront"/>
+      <a:lightRig rig="threePt" dir="t"/>
+    </dgm:scene3d>
+    <dgm:sp3d/>
+    <dgm:txPr/>
+    <dgm:style>
+      <a:lnRef idx="0">
+        <a:scrgbClr r="0" g="0" b="0"/>
+      </a:lnRef>
+      <a:fillRef idx="1">
+        <a:scrgbClr r="0" g="0" b="0"/>
+      </a:fillRef>
+      <a:effectRef idx="2">
+        <a:scrgbClr r="0" g="0" b="0"/>
+      </a:effectRef>
+      <a:fontRef idx="minor"/>
+    </dgm:style>
+  </dgm:styleLbl>
+  <dgm:styleLbl name="dkBgShp">
+    <dgm:scene3d>
+      <a:camera prst="orthographicFront"/>
+      <a:lightRig rig="threePt" dir="t"/>
+    </dgm:scene3d>
+    <dgm:sp3d/>
+    <dgm:txPr/>
+    <dgm:style>
+      <a:lnRef idx="0">
+        <a:scrgbClr r="0" g="0" b="0"/>
+      </a:lnRef>
+      <a:fillRef idx="1">
+        <a:scrgbClr r="0" g="0" b="0"/>
+      </a:fillRef>
+      <a:effectRef idx="2">
+        <a:scrgbClr r="0" g="0" b="0"/>
+      </a:effectRef>
+      <a:fontRef idx="minor"/>
+    </dgm:style>
+  </dgm:styleLbl>
+  <dgm:styleLbl name="trBgShp">
+    <dgm:scene3d>
+      <a:camera prst="orthographicFront"/>
+      <a:lightRig rig="threePt" dir="t"/>
+    </dgm:scene3d>
+    <dgm:sp3d/>
+    <dgm:txPr/>
+    <dgm:style>
+      <a:lnRef idx="0">
+        <a:scrgbClr r="0" g="0" b="0"/>
+      </a:lnRef>
+      <a:fillRef idx="1">
+        <a:scrgbClr r="0" g="0" b="0"/>
+      </a:fillRef>
+      <a:effectRef idx="0">
+        <a:scrgbClr r="0" g="0" b="0"/>
+      </a:effectRef>
+      <a:fontRef idx="minor"/>
+    </dgm:style>
+  </dgm:styleLbl>
+  <dgm:styleLbl name="fgShp">
+    <dgm:scene3d>
+      <a:camera prst="orthographicFront"/>
+      <a:lightRig rig="threePt" dir="t"/>
+    </dgm:scene3d>
+    <dgm:sp3d/>
+    <dgm:txPr/>
+    <dgm:style>
+      <a:lnRef idx="0">
+        <a:scrgbClr r="0" g="0" b="0"/>
+      </a:lnRef>
+      <a:fillRef idx="3">
+        <a:scrgbClr r="0" g="0" b="0"/>
+      </a:fillRef>
+      <a:effectRef idx="2">
+        <a:scrgbClr r="0" g="0" b="0"/>
+      </a:effectRef>
+      <a:fontRef idx="minor"/>
+    </dgm:style>
+  </dgm:styleLbl>
+  <dgm:styleLbl name="revTx">
+    <dgm:scene3d>
+      <a:camera prst="orthographicFront"/>
+      <a:lightRig rig="threePt" dir="t"/>
+    </dgm:scene3d>
+    <dgm:sp3d/>
+    <dgm:txPr/>
+    <dgm:style>
+      <a:lnRef idx="0">
+        <a:scrgbClr r="0" g="0" b="0"/>
+      </a:lnRef>
+      <a:fillRef idx="0">
+        <a:scrgbClr r="0" g="0" b="0"/>
+      </a:fillRef>
+      <a:effectRef idx="0">
+        <a:scrgbClr r="0" g="0" b="0"/>
+      </a:effectRef>
+      <a:fontRef idx="minor"/>
+    </dgm:style>
+  </dgm:styleLbl>
+</dgm:styleDef>
+</file>
+
 <file path=ppt/drawings/drawing1.xml><?xml version="1.0" encoding="utf-8"?>
 <c:userShapes xmlns:c="http://schemas.openxmlformats.org/drawingml/2006/chart">
   <cdr:relSizeAnchor xmlns:cdr="http://schemas.openxmlformats.org/drawingml/2006/chartDrawing">
@@ -3692,7 +6469,7 @@
             <a:fld id="{F55F861E-3C59-4235-9924-AE3FDF166F3F}" type="datetimeFigureOut">
               <a:rPr lang="es-AR" smtClean="0"/>
               <a:pPr/>
-              <a:t>2/12/2020</a:t>
+              <a:t>03/12/2020</a:t>
             </a:fld>
             <a:endParaRPr lang="es-AR"/>
           </a:p>
@@ -4549,7 +7326,7 @@
             <a:fld id="{59D4168E-E6F0-4E6D-9E98-0FBF44047F1D}" type="datetimeFigureOut">
               <a:rPr lang="es-AR" smtClean="0"/>
               <a:pPr/>
-              <a:t>2/12/2020</a:t>
+              <a:t>03/12/2020</a:t>
             </a:fld>
             <a:endParaRPr lang="es-AR"/>
           </a:p>
@@ -4883,7 +7660,7 @@
             <a:fld id="{59D4168E-E6F0-4E6D-9E98-0FBF44047F1D}" type="datetimeFigureOut">
               <a:rPr lang="es-AR" smtClean="0"/>
               <a:pPr/>
-              <a:t>2/12/2020</a:t>
+              <a:t>03/12/2020</a:t>
             </a:fld>
             <a:endParaRPr lang="es-AR"/>
           </a:p>
@@ -5133,7 +7910,7 @@
             <a:fld id="{59D4168E-E6F0-4E6D-9E98-0FBF44047F1D}" type="datetimeFigureOut">
               <a:rPr lang="es-AR" smtClean="0"/>
               <a:pPr/>
-              <a:t>2/12/2020</a:t>
+              <a:t>03/12/2020</a:t>
             </a:fld>
             <a:endParaRPr lang="es-AR"/>
           </a:p>
@@ -5675,7 +8452,7 @@
             <a:fld id="{59D4168E-E6F0-4E6D-9E98-0FBF44047F1D}" type="datetimeFigureOut">
               <a:rPr lang="es-AR" smtClean="0"/>
               <a:pPr/>
-              <a:t>2/12/2020</a:t>
+              <a:t>03/12/2020</a:t>
             </a:fld>
             <a:endParaRPr lang="es-AR"/>
           </a:p>
@@ -5925,7 +8702,7 @@
             <a:fld id="{59D4168E-E6F0-4E6D-9E98-0FBF44047F1D}" type="datetimeFigureOut">
               <a:rPr lang="es-AR" smtClean="0"/>
               <a:pPr/>
-              <a:t>2/12/2020</a:t>
+              <a:t>03/12/2020</a:t>
             </a:fld>
             <a:endParaRPr lang="es-AR"/>
           </a:p>
@@ -6459,7 +9236,7 @@
             <a:fld id="{59D4168E-E6F0-4E6D-9E98-0FBF44047F1D}" type="datetimeFigureOut">
               <a:rPr lang="es-AR" smtClean="0"/>
               <a:pPr/>
-              <a:t>2/12/2020</a:t>
+              <a:t>03/12/2020</a:t>
             </a:fld>
             <a:endParaRPr lang="es-AR"/>
           </a:p>
@@ -6758,7 +9535,7 @@
             <a:fld id="{59D4168E-E6F0-4E6D-9E98-0FBF44047F1D}" type="datetimeFigureOut">
               <a:rPr lang="es-AR" smtClean="0"/>
               <a:pPr/>
-              <a:t>2/12/2020</a:t>
+              <a:t>03/12/2020</a:t>
             </a:fld>
             <a:endParaRPr lang="es-AR"/>
           </a:p>
@@ -6934,7 +9711,7 @@
             <a:fld id="{59D4168E-E6F0-4E6D-9E98-0FBF44047F1D}" type="datetimeFigureOut">
               <a:rPr lang="es-AR" smtClean="0"/>
               <a:pPr/>
-              <a:t>2/12/2020</a:t>
+              <a:t>03/12/2020</a:t>
             </a:fld>
             <a:endParaRPr lang="es-AR"/>
           </a:p>
@@ -7116,7 +9893,7 @@
             <a:fld id="{59D4168E-E6F0-4E6D-9E98-0FBF44047F1D}" type="datetimeFigureOut">
               <a:rPr lang="es-AR" smtClean="0"/>
               <a:pPr/>
-              <a:t>2/12/2020</a:t>
+              <a:t>03/12/2020</a:t>
             </a:fld>
             <a:endParaRPr lang="es-AR"/>
           </a:p>
@@ -7294,7 +10071,7 @@
             <a:fld id="{59D4168E-E6F0-4E6D-9E98-0FBF44047F1D}" type="datetimeFigureOut">
               <a:rPr lang="es-AR" smtClean="0"/>
               <a:pPr/>
-              <a:t>2/12/2020</a:t>
+              <a:t>03/12/2020</a:t>
             </a:fld>
             <a:endParaRPr lang="es-AR"/>
           </a:p>
@@ -7583,7 +10360,7 @@
             <a:fld id="{59D4168E-E6F0-4E6D-9E98-0FBF44047F1D}" type="datetimeFigureOut">
               <a:rPr lang="es-AR" smtClean="0"/>
               <a:pPr/>
-              <a:t>2/12/2020</a:t>
+              <a:t>03/12/2020</a:t>
             </a:fld>
             <a:endParaRPr lang="es-AR"/>
           </a:p>
@@ -7882,7 +10659,7 @@
             <a:fld id="{59D4168E-E6F0-4E6D-9E98-0FBF44047F1D}" type="datetimeFigureOut">
               <a:rPr lang="es-AR" smtClean="0"/>
               <a:pPr/>
-              <a:t>2/12/2020</a:t>
+              <a:t>03/12/2020</a:t>
             </a:fld>
             <a:endParaRPr lang="es-AR"/>
           </a:p>
@@ -8326,7 +11103,7 @@
             <a:fld id="{59D4168E-E6F0-4E6D-9E98-0FBF44047F1D}" type="datetimeFigureOut">
               <a:rPr lang="es-AR" smtClean="0"/>
               <a:pPr/>
-              <a:t>2/12/2020</a:t>
+              <a:t>03/12/2020</a:t>
             </a:fld>
             <a:endParaRPr lang="es-AR"/>
           </a:p>
@@ -8446,7 +11223,7 @@
             <a:fld id="{59D4168E-E6F0-4E6D-9E98-0FBF44047F1D}" type="datetimeFigureOut">
               <a:rPr lang="es-AR" smtClean="0"/>
               <a:pPr/>
-              <a:t>2/12/2020</a:t>
+              <a:t>03/12/2020</a:t>
             </a:fld>
             <a:endParaRPr lang="es-AR"/>
           </a:p>
@@ -8543,7 +11320,7 @@
             <a:fld id="{59D4168E-E6F0-4E6D-9E98-0FBF44047F1D}" type="datetimeFigureOut">
               <a:rPr lang="es-AR" smtClean="0"/>
               <a:pPr/>
-              <a:t>2/12/2020</a:t>
+              <a:t>03/12/2020</a:t>
             </a:fld>
             <a:endParaRPr lang="es-AR"/>
           </a:p>
@@ -8828,7 +11605,7 @@
             <a:fld id="{59D4168E-E6F0-4E6D-9E98-0FBF44047F1D}" type="datetimeFigureOut">
               <a:rPr lang="es-AR" smtClean="0"/>
               <a:pPr/>
-              <a:t>2/12/2020</a:t>
+              <a:t>03/12/2020</a:t>
             </a:fld>
             <a:endParaRPr lang="es-AR"/>
           </a:p>
@@ -9121,7 +11898,7 @@
             <a:fld id="{59D4168E-E6F0-4E6D-9E98-0FBF44047F1D}" type="datetimeFigureOut">
               <a:rPr lang="es-AR" smtClean="0"/>
               <a:pPr/>
-              <a:t>2/12/2020</a:t>
+              <a:t>03/12/2020</a:t>
             </a:fld>
             <a:endParaRPr lang="es-AR"/>
           </a:p>
@@ -9653,7 +12430,7 @@
             <a:fld id="{59D4168E-E6F0-4E6D-9E98-0FBF44047F1D}" type="datetimeFigureOut">
               <a:rPr lang="es-AR" smtClean="0"/>
               <a:pPr/>
-              <a:t>2/12/2020</a:t>
+              <a:t>03/12/2020</a:t>
             </a:fld>
             <a:endParaRPr lang="es-AR"/>
           </a:p>
@@ -12711,8 +15488,37 @@
                   </a:outerShdw>
                 </a:effectLst>
               </a:rPr>
-              <a:t>Gestión de riesgos</a:t>
-            </a:r>
+              <a:t>Gestión de </a:t>
+            </a:r>
+            <a:r>
+              <a:rPr lang="es-ES" sz="7200" b="1" dirty="0" smtClean="0">
+                <a:ln w="0"/>
+                <a:solidFill>
+                  <a:schemeClr val="accent1"/>
+                </a:solidFill>
+                <a:effectLst>
+                  <a:outerShdw blurRad="38100" dist="25400" dir="5400000" algn="ctr" rotWithShape="0">
+                    <a:srgbClr val="6E747A">
+                      <a:alpha val="43000"/>
+                    </a:srgbClr>
+                  </a:outerShdw>
+                </a:effectLst>
+              </a:rPr>
+              <a:t>Riesgos</a:t>
+            </a:r>
+            <a:endParaRPr lang="es-ES" sz="7200" b="1" dirty="0">
+              <a:ln w="0"/>
+              <a:solidFill>
+                <a:schemeClr val="accent1"/>
+              </a:solidFill>
+              <a:effectLst>
+                <a:outerShdw blurRad="38100" dist="25400" dir="5400000" algn="ctr" rotWithShape="0">
+                  <a:srgbClr val="6E747A">
+                    <a:alpha val="43000"/>
+                  </a:srgbClr>
+                </a:outerShdw>
+              </a:effectLst>
+            </a:endParaRPr>
           </a:p>
         </p:txBody>
       </p:sp>
@@ -12778,39 +15584,333 @@
               <a:rPr lang="es-ES" sz="4000" dirty="0">
                 <a:latin typeface="Georgia" panose="02040502050405020303" pitchFamily="18" charset="0"/>
               </a:rPr>
-              <a:t>Gestión de Riesgos</a:t>
-            </a:r>
+              <a:t>Resumen de </a:t>
+            </a:r>
+            <a:r>
+              <a:rPr lang="es-ES" sz="4000" dirty="0" smtClean="0">
+                <a:latin typeface="Georgia" panose="02040502050405020303" pitchFamily="18" charset="0"/>
+              </a:rPr>
+              <a:t>la Gestión Riesgos I</a:t>
+            </a:r>
+            <a:endParaRPr lang="es-ES" sz="4000" dirty="0">
+              <a:latin typeface="Georgia" panose="02040502050405020303" pitchFamily="18" charset="0"/>
+            </a:endParaRPr>
           </a:p>
         </p:txBody>
       </p:sp>
-      <p:pic>
-        <p:nvPicPr>
-          <p:cNvPr id="4" name="Imagen 3"/>
-          <p:cNvPicPr>
-            <a:picLocks noChangeAspect="1"/>
-          </p:cNvPicPr>
+      <p:graphicFrame>
+        <p:nvGraphicFramePr>
+          <p:cNvPr id="5" name="Diagrama 4">
+            <a:extLst>
+              <a:ext uri="{FF2B5EF4-FFF2-40B4-BE49-F238E27FC236}">
+                <a16:creationId xmlns:a16="http://schemas.microsoft.com/office/drawing/2014/main" id="{D29B3E67-509D-445E-9F92-4DFCE92BD789}"/>
+              </a:ext>
+            </a:extLst>
+          </p:cNvPr>
+          <p:cNvGraphicFramePr/>
+          <p:nvPr>
+            <p:extLst/>
+          </p:nvPr>
+        </p:nvGraphicFramePr>
+        <p:xfrm>
+          <a:off x="2181410" y="1878104"/>
+          <a:ext cx="8128000" cy="5259792"/>
+        </p:xfrm>
+        <a:graphic>
+          <a:graphicData uri="http://schemas.openxmlformats.org/drawingml/2006/diagram">
+            <dgm:relIds xmlns:dgm="http://schemas.openxmlformats.org/drawingml/2006/diagram" xmlns:r="http://schemas.openxmlformats.org/officeDocument/2006/relationships" r:dm="rId2" r:lo="rId3" r:qs="rId4" r:cs="rId5"/>
+          </a:graphicData>
+        </a:graphic>
+      </p:graphicFrame>
+      <p:sp>
+        <p:nvSpPr>
+          <p:cNvPr id="7" name="CuadroTexto 6">
+            <a:extLst>
+              <a:ext uri="{FF2B5EF4-FFF2-40B4-BE49-F238E27FC236}">
+                <a16:creationId xmlns:a16="http://schemas.microsoft.com/office/drawing/2014/main" id="{EFF07B65-0D67-434E-9DAD-C6F8000B23BA}"/>
+              </a:ext>
+            </a:extLst>
+          </p:cNvPr>
+          <p:cNvSpPr txBox="1"/>
           <p:nvPr/>
-        </p:nvPicPr>
-        <p:blipFill>
-          <a:blip r:embed="rId2" cstate="print"/>
-          <a:stretch>
-            <a:fillRect/>
-          </a:stretch>
-        </p:blipFill>
+        </p:nvSpPr>
         <p:spPr>
           <a:xfrm>
-            <a:off x="0" y="0"/>
-            <a:ext cx="12192000" cy="6858000"/>
+            <a:off x="2638611" y="1878104"/>
+            <a:ext cx="7252447" cy="1938992"/>
           </a:xfrm>
           <a:prstGeom prst="rect">
             <a:avLst/>
           </a:prstGeom>
+          <a:noFill/>
         </p:spPr>
-      </p:pic>
+        <p:txBody>
+          <a:bodyPr wrap="square">
+            <a:spAutoFit/>
+          </a:bodyPr>
+          <a:lstStyle/>
+          <a:p>
+            <a:pPr marL="342900" indent="-342900">
+              <a:buFont typeface="Arial" panose="020B0604020202020204" pitchFamily="34" charset="0"/>
+              <a:buChar char="•"/>
+            </a:pPr>
+            <a:r>
+              <a:rPr lang="es-ES" sz="2000" dirty="0" smtClean="0">
+                <a:latin typeface="Georgia" panose="02040502050405020303" pitchFamily="18" charset="0"/>
+              </a:rPr>
+              <a:t>Se realizo en 11 iteraciones.</a:t>
+            </a:r>
+            <a:endParaRPr lang="es-ES" sz="2000" dirty="0">
+              <a:latin typeface="Georgia" panose="02040502050405020303" pitchFamily="18" charset="0"/>
+            </a:endParaRPr>
+          </a:p>
+          <a:p>
+            <a:pPr marL="342900" indent="-342900">
+              <a:buFont typeface="Arial" panose="020B0604020202020204" pitchFamily="34" charset="0"/>
+              <a:buChar char="•"/>
+            </a:pPr>
+            <a:endParaRPr lang="es-ES" sz="2000" dirty="0">
+              <a:latin typeface="Georgia" panose="02040502050405020303" pitchFamily="18" charset="0"/>
+            </a:endParaRPr>
+          </a:p>
+          <a:p>
+            <a:pPr marL="342900" indent="-342900">
+              <a:buFont typeface="Arial" panose="020B0604020202020204" pitchFamily="34" charset="0"/>
+              <a:buChar char="•"/>
+            </a:pPr>
+            <a:r>
+              <a:rPr lang="es-ES" sz="2000" dirty="0">
+                <a:latin typeface="Georgia" panose="02040502050405020303" pitchFamily="18" charset="0"/>
+              </a:rPr>
+              <a:t>24 riesgos </a:t>
+            </a:r>
+            <a:r>
+              <a:rPr lang="es-ES" sz="2000" dirty="0" smtClean="0">
+                <a:latin typeface="Georgia" panose="02040502050405020303" pitchFamily="18" charset="0"/>
+              </a:rPr>
+              <a:t>gestionados </a:t>
+            </a:r>
+            <a:r>
+              <a:rPr lang="es-ES" sz="2000" dirty="0" smtClean="0">
+                <a:latin typeface="Georgia" panose="02040502050405020303" pitchFamily="18" charset="0"/>
+                <a:sym typeface="Wingdings" panose="05000000000000000000" pitchFamily="2" charset="2"/>
+              </a:rPr>
+              <a:t> todos cerrados</a:t>
+            </a:r>
+            <a:endParaRPr lang="es-ES" sz="2000" dirty="0" smtClean="0">
+              <a:latin typeface="Georgia" panose="02040502050405020303" pitchFamily="18" charset="0"/>
+            </a:endParaRPr>
+          </a:p>
+          <a:p>
+            <a:endParaRPr lang="es-ES" sz="2000" dirty="0">
+              <a:latin typeface="Georgia" panose="02040502050405020303" pitchFamily="18" charset="0"/>
+            </a:endParaRPr>
+          </a:p>
+          <a:p>
+            <a:pPr marL="342900" indent="-342900">
+              <a:buFont typeface="Arial" panose="020B0604020202020204" pitchFamily="34" charset="0"/>
+              <a:buChar char="•"/>
+            </a:pPr>
+            <a:endParaRPr lang="es-ES" sz="2000" dirty="0">
+              <a:latin typeface="Georgia" panose="02040502050405020303" pitchFamily="18" charset="0"/>
+            </a:endParaRPr>
+          </a:p>
+          <a:p>
+            <a:pPr marL="342900" indent="-342900">
+              <a:buFont typeface="Arial" panose="020B0604020202020204" pitchFamily="34" charset="0"/>
+              <a:buChar char="•"/>
+            </a:pPr>
+            <a:endParaRPr lang="es-ES" sz="2000" b="0" i="0" u="none" strike="noStrike" baseline="0" dirty="0">
+              <a:latin typeface="Georgia" panose="02040502050405020303" pitchFamily="18" charset="0"/>
+            </a:endParaRPr>
+          </a:p>
+        </p:txBody>
+      </p:sp>
+      <p:sp>
+        <p:nvSpPr>
+          <p:cNvPr id="9" name="CuadroTexto 8">
+            <a:extLst>
+              <a:ext uri="{FF2B5EF4-FFF2-40B4-BE49-F238E27FC236}">
+                <a16:creationId xmlns:a16="http://schemas.microsoft.com/office/drawing/2014/main" id="{97CF3F33-5EF6-48E7-9958-F9C2744489F1}"/>
+              </a:ext>
+            </a:extLst>
+          </p:cNvPr>
+          <p:cNvSpPr txBox="1"/>
+          <p:nvPr/>
+        </p:nvSpPr>
+        <p:spPr>
+          <a:xfrm>
+            <a:off x="2439891" y="4930893"/>
+            <a:ext cx="1586753" cy="369332"/>
+          </a:xfrm>
+          <a:prstGeom prst="rect">
+            <a:avLst/>
+          </a:prstGeom>
+          <a:noFill/>
+        </p:spPr>
+        <p:txBody>
+          <a:bodyPr wrap="square">
+            <a:spAutoFit/>
+          </a:bodyPr>
+          <a:lstStyle/>
+          <a:p>
+            <a:r>
+              <a:rPr lang="es-ES" dirty="0">
+                <a:solidFill>
+                  <a:srgbClr val="000000"/>
+                </a:solidFill>
+                <a:latin typeface="Georgia" panose="02040502050405020303" pitchFamily="18" charset="0"/>
+              </a:rPr>
+              <a:t>0</a:t>
+            </a:r>
+            <a:r>
+              <a:rPr lang="es-ES" dirty="0" smtClean="0">
+                <a:solidFill>
+                  <a:srgbClr val="000000"/>
+                </a:solidFill>
+                <a:latin typeface="Georgia" panose="02040502050405020303" pitchFamily="18" charset="0"/>
+              </a:rPr>
+              <a:t> riesgos</a:t>
+            </a:r>
+            <a:endParaRPr lang="es-AR" dirty="0">
+              <a:latin typeface="Georgia" panose="02040502050405020303" pitchFamily="18" charset="0"/>
+            </a:endParaRPr>
+          </a:p>
+        </p:txBody>
+      </p:sp>
+      <p:sp>
+        <p:nvSpPr>
+          <p:cNvPr id="11" name="CuadroTexto 10">
+            <a:extLst>
+              <a:ext uri="{FF2B5EF4-FFF2-40B4-BE49-F238E27FC236}">
+                <a16:creationId xmlns:a16="http://schemas.microsoft.com/office/drawing/2014/main" id="{CFB755FD-7818-4BD2-8DEB-A53F85894D7B}"/>
+              </a:ext>
+            </a:extLst>
+          </p:cNvPr>
+          <p:cNvSpPr txBox="1"/>
+          <p:nvPr/>
+        </p:nvSpPr>
+        <p:spPr>
+          <a:xfrm>
+            <a:off x="4285125" y="4930893"/>
+            <a:ext cx="1586753" cy="369332"/>
+          </a:xfrm>
+          <a:prstGeom prst="rect">
+            <a:avLst/>
+          </a:prstGeom>
+          <a:noFill/>
+        </p:spPr>
+        <p:txBody>
+          <a:bodyPr wrap="square">
+            <a:spAutoFit/>
+          </a:bodyPr>
+          <a:lstStyle/>
+          <a:p>
+            <a:r>
+              <a:rPr lang="es-ES" dirty="0" smtClean="0">
+                <a:solidFill>
+                  <a:srgbClr val="000000"/>
+                </a:solidFill>
+                <a:latin typeface="Georgia" panose="02040502050405020303" pitchFamily="18" charset="0"/>
+              </a:rPr>
+              <a:t>6 riesgos</a:t>
+            </a:r>
+            <a:endParaRPr lang="es-AR" dirty="0">
+              <a:latin typeface="Georgia" panose="02040502050405020303" pitchFamily="18" charset="0"/>
+            </a:endParaRPr>
+          </a:p>
+        </p:txBody>
+      </p:sp>
+      <p:sp>
+        <p:nvSpPr>
+          <p:cNvPr id="13" name="CuadroTexto 12">
+            <a:extLst>
+              <a:ext uri="{FF2B5EF4-FFF2-40B4-BE49-F238E27FC236}">
+                <a16:creationId xmlns:a16="http://schemas.microsoft.com/office/drawing/2014/main" id="{1DC2E036-AC7A-450A-BDD4-9A2A0F769C65}"/>
+              </a:ext>
+            </a:extLst>
+          </p:cNvPr>
+          <p:cNvSpPr txBox="1"/>
+          <p:nvPr/>
+        </p:nvSpPr>
+        <p:spPr>
+          <a:xfrm>
+            <a:off x="6245410" y="4930893"/>
+            <a:ext cx="1586753" cy="369332"/>
+          </a:xfrm>
+          <a:prstGeom prst="rect">
+            <a:avLst/>
+          </a:prstGeom>
+          <a:noFill/>
+        </p:spPr>
+        <p:txBody>
+          <a:bodyPr wrap="square">
+            <a:spAutoFit/>
+          </a:bodyPr>
+          <a:lstStyle/>
+          <a:p>
+            <a:r>
+              <a:rPr lang="es-ES" sz="1800" dirty="0" smtClean="0">
+                <a:solidFill>
+                  <a:srgbClr val="000000"/>
+                </a:solidFill>
+                <a:latin typeface="Georgia" panose="02040502050405020303" pitchFamily="18" charset="0"/>
+              </a:rPr>
+              <a:t>17 riesgos</a:t>
+            </a:r>
+            <a:endParaRPr lang="es-AR" dirty="0">
+              <a:latin typeface="Georgia" panose="02040502050405020303" pitchFamily="18" charset="0"/>
+            </a:endParaRPr>
+          </a:p>
+        </p:txBody>
+      </p:sp>
+      <p:sp>
+        <p:nvSpPr>
+          <p:cNvPr id="15" name="CuadroTexto 14">
+            <a:extLst>
+              <a:ext uri="{FF2B5EF4-FFF2-40B4-BE49-F238E27FC236}">
+                <a16:creationId xmlns:a16="http://schemas.microsoft.com/office/drawing/2014/main" id="{6ECB2B3E-252C-4E7C-8FB7-1815D6E1E0A0}"/>
+              </a:ext>
+            </a:extLst>
+          </p:cNvPr>
+          <p:cNvSpPr txBox="1"/>
+          <p:nvPr/>
+        </p:nvSpPr>
+        <p:spPr>
+          <a:xfrm>
+            <a:off x="8304305" y="4930893"/>
+            <a:ext cx="1586753" cy="369332"/>
+          </a:xfrm>
+          <a:prstGeom prst="rect">
+            <a:avLst/>
+          </a:prstGeom>
+          <a:noFill/>
+        </p:spPr>
+        <p:txBody>
+          <a:bodyPr wrap="square">
+            <a:spAutoFit/>
+          </a:bodyPr>
+          <a:lstStyle/>
+          <a:p>
+            <a:r>
+              <a:rPr lang="es-ES" dirty="0" smtClean="0">
+                <a:solidFill>
+                  <a:srgbClr val="000000"/>
+                </a:solidFill>
+                <a:latin typeface="Georgia" panose="02040502050405020303" pitchFamily="18" charset="0"/>
+              </a:rPr>
+              <a:t>1 riesgo</a:t>
+            </a:r>
+            <a:endParaRPr lang="es-AR" dirty="0">
+              <a:latin typeface="Georgia" panose="02040502050405020303" pitchFamily="18" charset="0"/>
+            </a:endParaRPr>
+          </a:p>
+        </p:txBody>
+      </p:sp>
     </p:spTree>
     <p:extLst>
       <p:ext uri="{BB962C8B-B14F-4D97-AF65-F5344CB8AC3E}">
-        <p14:creationId xmlns:p14="http://schemas.microsoft.com/office/powerpoint/2010/main" val="2470537140"/>
+        <p14:creationId xmlns:p14="http://schemas.microsoft.com/office/powerpoint/2010/main" val="3884785151"/>
       </p:ext>
     </p:extLst>
   </p:cSld>
@@ -12869,39 +15969,423 @@
               <a:rPr lang="es-ES" sz="4000" dirty="0">
                 <a:latin typeface="Georgia" panose="02040502050405020303" pitchFamily="18" charset="0"/>
               </a:rPr>
-              <a:t>Gestión de Riesgos</a:t>
-            </a:r>
+              <a:t>Resumen de la Gestión Riesgos </a:t>
+            </a:r>
+            <a:r>
+              <a:rPr lang="es-ES" sz="4000" dirty="0" smtClean="0">
+                <a:latin typeface="Georgia" panose="02040502050405020303" pitchFamily="18" charset="0"/>
+              </a:rPr>
+              <a:t>II</a:t>
+            </a:r>
+            <a:endParaRPr lang="es-ES" sz="4000" dirty="0">
+              <a:latin typeface="Georgia" panose="02040502050405020303" pitchFamily="18" charset="0"/>
+            </a:endParaRPr>
           </a:p>
         </p:txBody>
       </p:sp>
-      <p:pic>
-        <p:nvPicPr>
-          <p:cNvPr id="3" name="Imagen 2"/>
-          <p:cNvPicPr>
-            <a:picLocks noChangeAspect="1"/>
-          </p:cNvPicPr>
+      <p:sp>
+        <p:nvSpPr>
+          <p:cNvPr id="7" name="CuadroTexto 6">
+            <a:extLst>
+              <a:ext uri="{FF2B5EF4-FFF2-40B4-BE49-F238E27FC236}">
+                <a16:creationId xmlns:a16="http://schemas.microsoft.com/office/drawing/2014/main" id="{EFF07B65-0D67-434E-9DAD-C6F8000B23BA}"/>
+              </a:ext>
+            </a:extLst>
+          </p:cNvPr>
+          <p:cNvSpPr txBox="1"/>
           <p:nvPr/>
-        </p:nvPicPr>
-        <p:blipFill>
-          <a:blip r:embed="rId2" cstate="print"/>
-          <a:stretch>
-            <a:fillRect/>
-          </a:stretch>
-        </p:blipFill>
+        </p:nvSpPr>
         <p:spPr>
           <a:xfrm>
-            <a:off x="0" y="0"/>
-            <a:ext cx="12211894" cy="6858000"/>
+            <a:off x="1593277" y="1275018"/>
+            <a:ext cx="8159240" cy="1015663"/>
           </a:xfrm>
           <a:prstGeom prst="rect">
             <a:avLst/>
           </a:prstGeom>
+          <a:noFill/>
         </p:spPr>
-      </p:pic>
+        <p:txBody>
+          <a:bodyPr wrap="square">
+            <a:spAutoFit/>
+          </a:bodyPr>
+          <a:lstStyle/>
+          <a:p>
+            <a:pPr marL="342900" indent="-342900">
+              <a:buFont typeface="Arial" panose="020B0604020202020204" pitchFamily="34" charset="0"/>
+              <a:buChar char="•"/>
+            </a:pPr>
+            <a:r>
+              <a:rPr lang="es-ES" sz="2000" dirty="0" smtClean="0">
+                <a:latin typeface="Georgia" panose="02040502050405020303" pitchFamily="18" charset="0"/>
+              </a:rPr>
+              <a:t>Algunos riesgos destacados</a:t>
+            </a:r>
+            <a:endParaRPr lang="es-ES" sz="2000" dirty="0">
+              <a:latin typeface="Georgia" panose="02040502050405020303" pitchFamily="18" charset="0"/>
+            </a:endParaRPr>
+          </a:p>
+          <a:p>
+            <a:endParaRPr lang="es-ES" sz="2000" dirty="0">
+              <a:latin typeface="Georgia" panose="02040502050405020303" pitchFamily="18" charset="0"/>
+            </a:endParaRPr>
+          </a:p>
+          <a:p>
+            <a:pPr marL="342900" indent="-342900">
+              <a:buFont typeface="Arial" panose="020B0604020202020204" pitchFamily="34" charset="0"/>
+              <a:buChar char="•"/>
+            </a:pPr>
+            <a:endParaRPr lang="es-ES" sz="2000" b="0" i="0" u="none" strike="noStrike" baseline="0" dirty="0">
+              <a:latin typeface="Georgia" panose="02040502050405020303" pitchFamily="18" charset="0"/>
+            </a:endParaRPr>
+          </a:p>
+        </p:txBody>
+      </p:sp>
+      <p:graphicFrame>
+        <p:nvGraphicFramePr>
+          <p:cNvPr id="3" name="Tabla 2"/>
+          <p:cNvGraphicFramePr>
+            <a:graphicFrameLocks noGrp="1"/>
+          </p:cNvGraphicFramePr>
+          <p:nvPr>
+            <p:extLst>
+              <p:ext uri="{D42A27DB-BD31-4B8C-83A1-F6EECF244321}">
+                <p14:modId xmlns:p14="http://schemas.microsoft.com/office/powerpoint/2010/main" val="1557697573"/>
+              </p:ext>
+            </p:extLst>
+          </p:nvPr>
+        </p:nvGraphicFramePr>
+        <p:xfrm>
+          <a:off x="1694231" y="1879832"/>
+          <a:ext cx="10239798" cy="4480560"/>
+        </p:xfrm>
+        <a:graphic>
+          <a:graphicData uri="http://schemas.openxmlformats.org/drawingml/2006/table">
+            <a:tbl>
+              <a:tblPr firstRow="1" bandRow="1">
+                <a:tableStyleId>{5C22544A-7EE6-4342-B048-85BDC9FD1C3A}</a:tableStyleId>
+              </a:tblPr>
+              <a:tblGrid>
+                <a:gridCol w="3413266">
+                  <a:extLst>
+                    <a:ext uri="{9D8B030D-6E8A-4147-A177-3AD203B41FA5}">
+                      <a16:colId xmlns:a16="http://schemas.microsoft.com/office/drawing/2014/main" val="3881838570"/>
+                    </a:ext>
+                  </a:extLst>
+                </a:gridCol>
+                <a:gridCol w="3413266">
+                  <a:extLst>
+                    <a:ext uri="{9D8B030D-6E8A-4147-A177-3AD203B41FA5}">
+                      <a16:colId xmlns:a16="http://schemas.microsoft.com/office/drawing/2014/main" val="3419108840"/>
+                    </a:ext>
+                  </a:extLst>
+                </a:gridCol>
+                <a:gridCol w="3413266">
+                  <a:extLst>
+                    <a:ext uri="{9D8B030D-6E8A-4147-A177-3AD203B41FA5}">
+                      <a16:colId xmlns:a16="http://schemas.microsoft.com/office/drawing/2014/main" val="2021820195"/>
+                    </a:ext>
+                  </a:extLst>
+                </a:gridCol>
+              </a:tblGrid>
+              <a:tr h="249382">
+                <a:tc>
+                  <a:txBody>
+                    <a:bodyPr/>
+                    <a:lstStyle/>
+                    <a:p>
+                      <a:r>
+                        <a:rPr lang="es-AR" dirty="0" smtClean="0"/>
+                        <a:t>Elaboración</a:t>
+                      </a:r>
+                      <a:endParaRPr lang="es-AR" dirty="0"/>
+                    </a:p>
+                  </a:txBody>
+                  <a:tcPr/>
+                </a:tc>
+                <a:tc>
+                  <a:txBody>
+                    <a:bodyPr/>
+                    <a:lstStyle/>
+                    <a:p>
+                      <a:r>
+                        <a:rPr lang="es-AR" dirty="0" smtClean="0"/>
+                        <a:t>Construcción</a:t>
+                      </a:r>
+                      <a:endParaRPr lang="es-AR" dirty="0"/>
+                    </a:p>
+                  </a:txBody>
+                  <a:tcPr/>
+                </a:tc>
+                <a:tc>
+                  <a:txBody>
+                    <a:bodyPr/>
+                    <a:lstStyle/>
+                    <a:p>
+                      <a:r>
+                        <a:rPr lang="es-AR" dirty="0" smtClean="0"/>
+                        <a:t>Transición</a:t>
+                      </a:r>
+                      <a:endParaRPr lang="es-AR" dirty="0"/>
+                    </a:p>
+                  </a:txBody>
+                  <a:tcPr/>
+                </a:tc>
+                <a:extLst>
+                  <a:ext uri="{0D108BD9-81ED-4DB2-BD59-A6C34878D82A}">
+                    <a16:rowId xmlns:a16="http://schemas.microsoft.com/office/drawing/2014/main" val="2807931946"/>
+                  </a:ext>
+                </a:extLst>
+              </a:tr>
+              <a:tr h="990984">
+                <a:tc>
+                  <a:txBody>
+                    <a:bodyPr/>
+                    <a:lstStyle/>
+                    <a:p>
+                      <a:r>
+                        <a:rPr lang="es-AR" dirty="0" smtClean="0"/>
+                        <a:t>No lograr la generación del programa de asignatura en PDF por la falta de experiencia del grupo de desarrollo. </a:t>
+                      </a:r>
+                      <a:r>
+                        <a:rPr lang="es-AR" b="1" dirty="0" smtClean="0"/>
+                        <a:t>Eliminado</a:t>
+                      </a:r>
+                      <a:endParaRPr lang="es-AR" b="1" dirty="0"/>
+                    </a:p>
+                  </a:txBody>
+                  <a:tcPr/>
+                </a:tc>
+                <a:tc>
+                  <a:txBody>
+                    <a:bodyPr/>
+                    <a:lstStyle/>
+                    <a:p>
+                      <a:r>
+                        <a:rPr lang="es-AR" dirty="0" smtClean="0"/>
+                        <a:t>No poder implementar la aplicación móvil debido a la falta de experiencia de los integrantes en el desarrollo de aplicaciones móviles con </a:t>
+                      </a:r>
+                      <a:r>
+                        <a:rPr lang="es-AR" dirty="0" err="1" smtClean="0"/>
+                        <a:t>Ionic</a:t>
+                      </a:r>
+                      <a:r>
+                        <a:rPr lang="es-AR" dirty="0" smtClean="0"/>
+                        <a:t>. </a:t>
+                      </a:r>
+                      <a:r>
+                        <a:rPr lang="es-AR" b="1" dirty="0" smtClean="0"/>
+                        <a:t>Eliminado</a:t>
+                      </a:r>
+                      <a:endParaRPr lang="es-AR" b="1" dirty="0"/>
+                    </a:p>
+                  </a:txBody>
+                  <a:tcPr/>
+                </a:tc>
+                <a:tc>
+                  <a:txBody>
+                    <a:bodyPr/>
+                    <a:lstStyle/>
+                    <a:p>
+                      <a:r>
+                        <a:rPr lang="es-AR" dirty="0" smtClean="0"/>
+                        <a:t>La memoria del proyecto no sea de agrado para el equipo docente.</a:t>
+                      </a:r>
+                    </a:p>
+                    <a:p>
+                      <a:r>
+                        <a:rPr lang="es-AR" b="1" dirty="0" smtClean="0"/>
+                        <a:t>Eliminado</a:t>
+                      </a:r>
+                      <a:endParaRPr lang="es-AR" b="1" dirty="0"/>
+                    </a:p>
+                  </a:txBody>
+                  <a:tcPr/>
+                </a:tc>
+                <a:extLst>
+                  <a:ext uri="{0D108BD9-81ED-4DB2-BD59-A6C34878D82A}">
+                    <a16:rowId xmlns:a16="http://schemas.microsoft.com/office/drawing/2014/main" val="369058642"/>
+                  </a:ext>
+                </a:extLst>
+              </a:tr>
+              <a:tr h="990984">
+                <a:tc>
+                  <a:txBody>
+                    <a:bodyPr/>
+                    <a:lstStyle/>
+                    <a:p>
+                      <a:r>
+                        <a:rPr lang="es-AR" dirty="0" smtClean="0"/>
+                        <a:t>El proceso de firmas de los programas de asignaturas no esté definido por completo. </a:t>
+                      </a:r>
+                      <a:r>
+                        <a:rPr lang="es-AR" b="1" dirty="0" smtClean="0"/>
+                        <a:t>Eliminado</a:t>
+                      </a:r>
+                      <a:endParaRPr lang="es-AR" b="1" dirty="0"/>
+                    </a:p>
+                  </a:txBody>
+                  <a:tcPr/>
+                </a:tc>
+                <a:tc>
+                  <a:txBody>
+                    <a:bodyPr/>
+                    <a:lstStyle/>
+                    <a:p>
+                      <a:r>
+                        <a:rPr lang="es-AR" dirty="0" smtClean="0"/>
+                        <a:t>No se realicen reuniones con el equipo docente, una vez finalizada la cursada para mostrar avances del proyecto y/o  realizar consultas. </a:t>
+                      </a:r>
+                      <a:r>
+                        <a:rPr lang="es-AR" b="1" dirty="0" smtClean="0"/>
+                        <a:t>Eliminado</a:t>
+                      </a:r>
+                      <a:endParaRPr lang="es-AR" b="1" dirty="0"/>
+                    </a:p>
+                  </a:txBody>
+                  <a:tcPr/>
+                </a:tc>
+                <a:tc>
+                  <a:txBody>
+                    <a:bodyPr/>
+                    <a:lstStyle/>
+                    <a:p>
+                      <a:endParaRPr lang="es-AR" dirty="0"/>
+                    </a:p>
+                  </a:txBody>
+                  <a:tcPr/>
+                </a:tc>
+                <a:extLst>
+                  <a:ext uri="{0D108BD9-81ED-4DB2-BD59-A6C34878D82A}">
+                    <a16:rowId xmlns:a16="http://schemas.microsoft.com/office/drawing/2014/main" val="2013989916"/>
+                  </a:ext>
+                </a:extLst>
+              </a:tr>
+              <a:tr h="990984">
+                <a:tc>
+                  <a:txBody>
+                    <a:bodyPr/>
+                    <a:lstStyle/>
+                    <a:p>
+                      <a:r>
+                        <a:rPr lang="es-AR" dirty="0" smtClean="0"/>
+                        <a:t>Falta de utilización de las herramientas </a:t>
+                      </a:r>
+                      <a:r>
+                        <a:rPr lang="es-AR" dirty="0" err="1" smtClean="0"/>
+                        <a:t>Git</a:t>
+                      </a:r>
+                      <a:r>
+                        <a:rPr lang="es-AR" dirty="0" smtClean="0"/>
+                        <a:t> y GitHub para el control de versión</a:t>
+                      </a:r>
+                      <a:r>
+                        <a:rPr lang="es-AR" baseline="0" dirty="0" smtClean="0"/>
+                        <a:t> del proyecto. </a:t>
+                      </a:r>
+                      <a:r>
+                        <a:rPr lang="es-AR" b="1" baseline="0" dirty="0" smtClean="0"/>
+                        <a:t>Eliminado</a:t>
+                      </a:r>
+                      <a:endParaRPr lang="es-AR" b="1" dirty="0"/>
+                    </a:p>
+                  </a:txBody>
+                  <a:tcPr/>
+                </a:tc>
+                <a:tc>
+                  <a:txBody>
+                    <a:bodyPr/>
+                    <a:lstStyle/>
+                    <a:p>
+                      <a:r>
+                        <a:rPr lang="es-AR" dirty="0" smtClean="0"/>
+                        <a:t>Tener problemas (errores) al volver a ejecutar la app móvil debido a un cambio de versión del </a:t>
+                      </a:r>
+                      <a:r>
+                        <a:rPr lang="es-AR" dirty="0" err="1" smtClean="0"/>
+                        <a:t>framework</a:t>
+                      </a:r>
+                      <a:r>
+                        <a:rPr lang="es-AR" dirty="0" smtClean="0"/>
+                        <a:t> </a:t>
+                      </a:r>
+                      <a:r>
+                        <a:rPr lang="es-AR" dirty="0" err="1" smtClean="0"/>
+                        <a:t>Ionic</a:t>
+                      </a:r>
+                      <a:r>
+                        <a:rPr lang="es-AR" dirty="0" smtClean="0"/>
+                        <a:t>. </a:t>
+                      </a:r>
+                      <a:r>
+                        <a:rPr lang="es-AR" b="1" dirty="0" smtClean="0"/>
+                        <a:t>Contingencia</a:t>
+                      </a:r>
+                      <a:endParaRPr lang="es-AR" b="1" dirty="0"/>
+                    </a:p>
+                  </a:txBody>
+                  <a:tcPr/>
+                </a:tc>
+                <a:tc>
+                  <a:txBody>
+                    <a:bodyPr/>
+                    <a:lstStyle/>
+                    <a:p>
+                      <a:r>
+                        <a:rPr lang="es-AR" dirty="0" smtClean="0">
+                          <a:solidFill>
+                            <a:srgbClr val="FF0000"/>
+                          </a:solidFill>
+                        </a:rPr>
+                        <a:t>Nota:</a:t>
+                      </a:r>
+                      <a:r>
+                        <a:rPr lang="es-AR" baseline="0" dirty="0" smtClean="0">
+                          <a:solidFill>
+                            <a:srgbClr val="FF0000"/>
+                          </a:solidFill>
+                        </a:rPr>
+                        <a:t> Seguramente mencionare dos riesgos por etapa si no </a:t>
+                      </a:r>
+                      <a:r>
+                        <a:rPr lang="es-AR" baseline="0" smtClean="0">
+                          <a:solidFill>
+                            <a:srgbClr val="FF0000"/>
+                          </a:solidFill>
+                        </a:rPr>
+                        <a:t>es mucho, lo </a:t>
+                      </a:r>
+                      <a:r>
+                        <a:rPr lang="es-AR" baseline="0" dirty="0" smtClean="0">
+                          <a:solidFill>
+                            <a:srgbClr val="FF0000"/>
+                          </a:solidFill>
+                        </a:rPr>
+                        <a:t>deje por las dudas</a:t>
+                      </a:r>
+                      <a:endParaRPr lang="es-AR" dirty="0">
+                        <a:solidFill>
+                          <a:srgbClr val="FF0000"/>
+                        </a:solidFill>
+                      </a:endParaRPr>
+                    </a:p>
+                  </a:txBody>
+                  <a:tcPr/>
+                </a:tc>
+                <a:extLst>
+                  <a:ext uri="{0D108BD9-81ED-4DB2-BD59-A6C34878D82A}">
+                    <a16:rowId xmlns:a16="http://schemas.microsoft.com/office/drawing/2014/main" val="554149636"/>
+                  </a:ext>
+                </a:extLst>
+              </a:tr>
+            </a:tbl>
+          </a:graphicData>
+        </a:graphic>
+      </p:graphicFrame>
     </p:spTree>
     <p:extLst>
       <p:ext uri="{BB962C8B-B14F-4D97-AF65-F5344CB8AC3E}">
-        <p14:creationId xmlns:p14="http://schemas.microsoft.com/office/powerpoint/2010/main" val="3950036555"/>
+        <p14:creationId xmlns:p14="http://schemas.microsoft.com/office/powerpoint/2010/main" val="3829638035"/>
       </p:ext>
     </p:extLst>
   </p:cSld>
@@ -12912,97 +16396,6 @@
 </file>
 
 <file path=ppt/slides/slide23.xml><?xml version="1.0" encoding="utf-8"?>
-<p:sld xmlns:a="http://schemas.openxmlformats.org/drawingml/2006/main" xmlns:r="http://schemas.openxmlformats.org/officeDocument/2006/relationships" xmlns:p="http://schemas.openxmlformats.org/presentationml/2006/main">
-  <p:cSld>
-    <p:spTree>
-      <p:nvGrpSpPr>
-        <p:cNvPr id="1" name=""/>
-        <p:cNvGrpSpPr/>
-        <p:nvPr/>
-      </p:nvGrpSpPr>
-      <p:grpSpPr>
-        <a:xfrm>
-          <a:off x="0" y="0"/>
-          <a:ext cx="0" cy="0"/>
-          <a:chOff x="0" y="0"/>
-          <a:chExt cx="0" cy="0"/>
-        </a:xfrm>
-      </p:grpSpPr>
-      <p:sp>
-        <p:nvSpPr>
-          <p:cNvPr id="2" name="Título 1">
-            <a:extLst>
-              <a:ext uri="{FF2B5EF4-FFF2-40B4-BE49-F238E27FC236}">
-                <a16:creationId xmlns:a16="http://schemas.microsoft.com/office/drawing/2014/main" id="{0ED6D180-92C1-4333-BA91-2BBA4DD94A3B}"/>
-              </a:ext>
-            </a:extLst>
-          </p:cNvPr>
-          <p:cNvSpPr>
-            <a:spLocks noGrp="1"/>
-          </p:cNvSpPr>
-          <p:nvPr>
-            <p:ph type="title"/>
-          </p:nvPr>
-        </p:nvSpPr>
-        <p:spPr>
-          <a:xfrm>
-            <a:off x="1270000" y="0"/>
-            <a:ext cx="10922000" cy="1752599"/>
-          </a:xfrm>
-        </p:spPr>
-        <p:txBody>
-          <a:bodyPr>
-            <a:normAutofit/>
-          </a:bodyPr>
-          <a:lstStyle/>
-          <a:p>
-            <a:r>
-              <a:rPr lang="es-ES" sz="4000" dirty="0">
-                <a:latin typeface="Georgia" panose="02040502050405020303" pitchFamily="18" charset="0"/>
-              </a:rPr>
-              <a:t>Gestión de Riesgos</a:t>
-            </a:r>
-          </a:p>
-        </p:txBody>
-      </p:sp>
-      <p:pic>
-        <p:nvPicPr>
-          <p:cNvPr id="3" name="Imagen 2"/>
-          <p:cNvPicPr>
-            <a:picLocks noChangeAspect="1"/>
-          </p:cNvPicPr>
-          <p:nvPr/>
-        </p:nvPicPr>
-        <p:blipFill>
-          <a:blip r:embed="rId2" cstate="print"/>
-          <a:stretch>
-            <a:fillRect/>
-          </a:stretch>
-        </p:blipFill>
-        <p:spPr>
-          <a:xfrm>
-            <a:off x="0" y="0"/>
-            <a:ext cx="12192000" cy="6863479"/>
-          </a:xfrm>
-          <a:prstGeom prst="rect">
-            <a:avLst/>
-          </a:prstGeom>
-        </p:spPr>
-      </p:pic>
-    </p:spTree>
-    <p:extLst>
-      <p:ext uri="{BB962C8B-B14F-4D97-AF65-F5344CB8AC3E}">
-        <p14:creationId xmlns:p14="http://schemas.microsoft.com/office/powerpoint/2010/main" val="3027958132"/>
-      </p:ext>
-    </p:extLst>
-  </p:cSld>
-  <p:clrMapOvr>
-    <a:masterClrMapping/>
-  </p:clrMapOvr>
-</p:sld>
-</file>
-
-<file path=ppt/slides/slide24.xml><?xml version="1.0" encoding="utf-8"?>
 <p:sld xmlns:a="http://schemas.openxmlformats.org/drawingml/2006/main" xmlns:r="http://schemas.openxmlformats.org/officeDocument/2006/relationships" xmlns:p="http://schemas.openxmlformats.org/presentationml/2006/main">
   <p:cSld>
     <p:spTree>
@@ -13080,7 +16473,7 @@
 </p:sld>
 </file>
 
-<file path=ppt/slides/slide25.xml><?xml version="1.0" encoding="utf-8"?>
+<file path=ppt/slides/slide24.xml><?xml version="1.0" encoding="utf-8"?>
 <p:sld xmlns:a="http://schemas.openxmlformats.org/drawingml/2006/main" xmlns:r="http://schemas.openxmlformats.org/officeDocument/2006/relationships" xmlns:p="http://schemas.openxmlformats.org/presentationml/2006/main">
   <p:cSld>
     <p:spTree>
@@ -13904,7 +17297,7 @@
 </p:sld>
 </file>
 
-<file path=ppt/slides/slide26.xml><?xml version="1.0" encoding="utf-8"?>
+<file path=ppt/slides/slide25.xml><?xml version="1.0" encoding="utf-8"?>
 <p:sld xmlns:a="http://schemas.openxmlformats.org/drawingml/2006/main" xmlns:r="http://schemas.openxmlformats.org/officeDocument/2006/relationships" xmlns:p="http://schemas.openxmlformats.org/presentationml/2006/main">
   <p:cSld>
     <p:spTree>
@@ -14033,7 +17426,7 @@
 </p:sld>
 </file>
 
-<file path=ppt/slides/slide27.xml><?xml version="1.0" encoding="utf-8"?>
+<file path=ppt/slides/slide26.xml><?xml version="1.0" encoding="utf-8"?>
 <p:sld xmlns:a="http://schemas.openxmlformats.org/drawingml/2006/main" xmlns:r="http://schemas.openxmlformats.org/officeDocument/2006/relationships" xmlns:p="http://schemas.openxmlformats.org/presentationml/2006/main">
   <p:cSld>
     <p:spTree>
@@ -14186,7 +17579,7 @@
           <p:nvPr/>
         </p:nvPicPr>
         <p:blipFill>
-          <a:blip r:embed="rId4" cstate="print">
+          <a:blip r:embed="rId4" cstate="hqprint">
             <a:extLst>
               <a:ext uri="{28A0092B-C50C-407E-A947-70E740481C1C}">
                 <a14:useLocalDpi xmlns:a14="http://schemas.microsoft.com/office/drawing/2010/main" val="0"/>
@@ -14818,7 +18211,7 @@
         </p:nvSpPr>
         <p:spPr>
           <a:xfrm>
-            <a:off x="8132877" y="5814812"/>
+            <a:off x="8243716" y="5814812"/>
             <a:ext cx="1588897" cy="400110"/>
           </a:xfrm>
           <a:prstGeom prst="rect">
@@ -14953,7 +18346,7 @@
 </p:sld>
 </file>
 
-<file path=ppt/slides/slide28.xml><?xml version="1.0" encoding="utf-8"?>
+<file path=ppt/slides/slide27.xml><?xml version="1.0" encoding="utf-8"?>
 <p:sld xmlns:a="http://schemas.openxmlformats.org/drawingml/2006/main" xmlns:r="http://schemas.openxmlformats.org/officeDocument/2006/relationships" xmlns:p="http://schemas.openxmlformats.org/presentationml/2006/main">
   <p:cSld>
     <p:spTree>
@@ -15044,7 +18437,7 @@
 </p:sld>
 </file>
 
-<file path=ppt/slides/slide29.xml><?xml version="1.0" encoding="utf-8"?>
+<file path=ppt/slides/slide28.xml><?xml version="1.0" encoding="utf-8"?>
 <p:sld xmlns:a="http://schemas.openxmlformats.org/drawingml/2006/main" xmlns:r="http://schemas.openxmlformats.org/officeDocument/2006/relationships" xmlns:p="http://schemas.openxmlformats.org/presentationml/2006/main">
   <p:cSld>
     <p:spTree>
@@ -15470,188 +18863,7 @@
 </p:sld>
 </file>
 
-<file path=ppt/slides/slide3.xml><?xml version="1.0" encoding="utf-8"?>
-<p:sld xmlns:a="http://schemas.openxmlformats.org/drawingml/2006/main" xmlns:r="http://schemas.openxmlformats.org/officeDocument/2006/relationships" xmlns:p="http://schemas.openxmlformats.org/presentationml/2006/main">
-  <p:cSld>
-    <p:spTree>
-      <p:nvGrpSpPr>
-        <p:cNvPr id="1" name=""/>
-        <p:cNvGrpSpPr/>
-        <p:nvPr/>
-      </p:nvGrpSpPr>
-      <p:grpSpPr>
-        <a:xfrm>
-          <a:off x="0" y="0"/>
-          <a:ext cx="0" cy="0"/>
-          <a:chOff x="0" y="0"/>
-          <a:chExt cx="0" cy="0"/>
-        </a:xfrm>
-      </p:grpSpPr>
-      <p:sp>
-        <p:nvSpPr>
-          <p:cNvPr id="4" name="Título 3">
-            <a:extLst>
-              <a:ext uri="{FF2B5EF4-FFF2-40B4-BE49-F238E27FC236}">
-                <a16:creationId xmlns:a16="http://schemas.microsoft.com/office/drawing/2014/main" id="{FA4EADB5-92CE-4B25-BE21-7FC484AE680E}"/>
-              </a:ext>
-            </a:extLst>
-          </p:cNvPr>
-          <p:cNvSpPr>
-            <a:spLocks noGrp="1"/>
-          </p:cNvSpPr>
-          <p:nvPr>
-            <p:ph type="ctrTitle"/>
-          </p:nvPr>
-        </p:nvSpPr>
-        <p:spPr>
-          <a:xfrm>
-            <a:off x="1506071" y="190615"/>
-            <a:ext cx="9380980" cy="1240040"/>
-          </a:xfrm>
-        </p:spPr>
-        <p:txBody>
-          <a:bodyPr>
-            <a:normAutofit/>
-          </a:bodyPr>
-          <a:lstStyle/>
-          <a:p>
-            <a:r>
-              <a:rPr lang="es-AR" sz="4800" dirty="0">
-                <a:latin typeface="Georgia" panose="02040502050405020303" pitchFamily="18" charset="0"/>
-              </a:rPr>
-              <a:t>Temario II – Implementación</a:t>
-            </a:r>
-          </a:p>
-        </p:txBody>
-      </p:sp>
-      <p:sp>
-        <p:nvSpPr>
-          <p:cNvPr id="5" name="Subtítulo 4">
-            <a:extLst>
-              <a:ext uri="{FF2B5EF4-FFF2-40B4-BE49-F238E27FC236}">
-                <a16:creationId xmlns:a16="http://schemas.microsoft.com/office/drawing/2014/main" id="{7035CB29-6D24-4E02-AC9F-07DC0DE9312C}"/>
-              </a:ext>
-            </a:extLst>
-          </p:cNvPr>
-          <p:cNvSpPr>
-            <a:spLocks noGrp="1"/>
-          </p:cNvSpPr>
-          <p:nvPr>
-            <p:ph type="subTitle" idx="1"/>
-          </p:nvPr>
-        </p:nvSpPr>
-        <p:spPr>
-          <a:xfrm>
-            <a:off x="3349802" y="1794227"/>
-            <a:ext cx="8770480" cy="4732079"/>
-          </a:xfrm>
-        </p:spPr>
-        <p:txBody>
-          <a:bodyPr>
-            <a:normAutofit/>
-          </a:bodyPr>
-          <a:lstStyle/>
-          <a:p>
-            <a:pPr marL="342900" indent="-342900" algn="l">
-              <a:buFont typeface="Arial" panose="020B0604020202020204" pitchFamily="34" charset="0"/>
-              <a:buChar char="•"/>
-            </a:pPr>
-            <a:r>
-              <a:rPr lang="es-AR" sz="2400" dirty="0">
-                <a:latin typeface="Georgia" panose="02040502050405020303" pitchFamily="18" charset="0"/>
-              </a:rPr>
-              <a:t>Implementación de Casos de Uso:</a:t>
-            </a:r>
-          </a:p>
-          <a:p>
-            <a:pPr marL="342900" indent="-342900" algn="l">
-              <a:buFont typeface="Arial" panose="020B0604020202020204" pitchFamily="34" charset="0"/>
-              <a:buChar char="•"/>
-            </a:pPr>
-            <a:r>
-              <a:rPr lang="es-AR" sz="2400" dirty="0">
-                <a:latin typeface="Georgia" panose="02040502050405020303" pitchFamily="18" charset="0"/>
-              </a:rPr>
-              <a:t>Sistema Web:</a:t>
-            </a:r>
-          </a:p>
-          <a:p>
-            <a:pPr marL="800100" lvl="1" indent="-342900" algn="l">
-              <a:buFont typeface="Arial" panose="020B0604020202020204" pitchFamily="34" charset="0"/>
-              <a:buChar char="•"/>
-            </a:pPr>
-            <a:r>
-              <a:rPr lang="es-AR" sz="2200" dirty="0">
-                <a:latin typeface="Georgia" panose="02040502050405020303" pitchFamily="18" charset="0"/>
-              </a:rPr>
-              <a:t>Carga de datos</a:t>
-            </a:r>
-          </a:p>
-          <a:p>
-            <a:pPr marL="800100" lvl="1" indent="-342900" algn="l">
-              <a:buFont typeface="Arial" panose="020B0604020202020204" pitchFamily="34" charset="0"/>
-              <a:buChar char="•"/>
-            </a:pPr>
-            <a:r>
-              <a:rPr lang="es-AR" sz="2200" dirty="0">
-                <a:latin typeface="Georgia" panose="02040502050405020303" pitchFamily="18" charset="0"/>
-              </a:rPr>
-              <a:t>Flujo principal</a:t>
-            </a:r>
-          </a:p>
-          <a:p>
-            <a:pPr lvl="1" algn="l"/>
-            <a:endParaRPr lang="es-AR" sz="2200" dirty="0">
-              <a:latin typeface="Georgia" panose="02040502050405020303" pitchFamily="18" charset="0"/>
-            </a:endParaRPr>
-          </a:p>
-          <a:p>
-            <a:pPr marL="342900" indent="-342900" algn="l">
-              <a:buFont typeface="Arial" panose="020B0604020202020204" pitchFamily="34" charset="0"/>
-              <a:buChar char="•"/>
-            </a:pPr>
-            <a:r>
-              <a:rPr lang="es-AR" sz="2400" dirty="0">
-                <a:latin typeface="Georgia" panose="02040502050405020303" pitchFamily="18" charset="0"/>
-              </a:rPr>
-              <a:t>Aplicación móvil </a:t>
-            </a:r>
-          </a:p>
-          <a:p>
-            <a:pPr marL="800100" lvl="1" indent="-342900" algn="l">
-              <a:buFont typeface="Arial" panose="020B0604020202020204" pitchFamily="34" charset="0"/>
-              <a:buChar char="•"/>
-            </a:pPr>
-            <a:r>
-              <a:rPr lang="es-AR" sz="2300" dirty="0">
-                <a:latin typeface="Georgia" panose="02040502050405020303" pitchFamily="18" charset="0"/>
-              </a:rPr>
-              <a:t>Búsqueda y Visualización de Programa en PDF</a:t>
-            </a:r>
-          </a:p>
-          <a:p>
-            <a:pPr marL="342900" indent="-342900" algn="l">
-              <a:buFont typeface="Arial" panose="020B0604020202020204" pitchFamily="34" charset="0"/>
-              <a:buChar char="•"/>
-            </a:pPr>
-            <a:endParaRPr lang="es-AR" dirty="0"/>
-          </a:p>
-        </p:txBody>
-      </p:sp>
-    </p:spTree>
-    <p:extLst>
-      <p:ext uri="{BB962C8B-B14F-4D97-AF65-F5344CB8AC3E}">
-        <p14:creationId xmlns:p14="http://schemas.microsoft.com/office/powerpoint/2010/main" val="2893191071"/>
-      </p:ext>
-    </p:extLst>
-  </p:cSld>
-  <p:clrMapOvr>
-    <a:masterClrMapping/>
-  </p:clrMapOvr>
-</p:sld>
-</file>
-
-<file path=ppt/slides/slide30.xml><?xml version="1.0" encoding="utf-8"?>
+<file path=ppt/slides/slide29.xml><?xml version="1.0" encoding="utf-8"?>
 <p:sld xmlns:a="http://schemas.openxmlformats.org/drawingml/2006/main" xmlns:r="http://schemas.openxmlformats.org/officeDocument/2006/relationships" xmlns:p="http://schemas.openxmlformats.org/presentationml/2006/main">
   <p:cSld>
     <p:spTree>
@@ -15917,7 +19129,188 @@
 </p:sld>
 </file>
 
-<file path=ppt/slides/slide31.xml><?xml version="1.0" encoding="utf-8"?>
+<file path=ppt/slides/slide3.xml><?xml version="1.0" encoding="utf-8"?>
+<p:sld xmlns:a="http://schemas.openxmlformats.org/drawingml/2006/main" xmlns:r="http://schemas.openxmlformats.org/officeDocument/2006/relationships" xmlns:p="http://schemas.openxmlformats.org/presentationml/2006/main">
+  <p:cSld>
+    <p:spTree>
+      <p:nvGrpSpPr>
+        <p:cNvPr id="1" name=""/>
+        <p:cNvGrpSpPr/>
+        <p:nvPr/>
+      </p:nvGrpSpPr>
+      <p:grpSpPr>
+        <a:xfrm>
+          <a:off x="0" y="0"/>
+          <a:ext cx="0" cy="0"/>
+          <a:chOff x="0" y="0"/>
+          <a:chExt cx="0" cy="0"/>
+        </a:xfrm>
+      </p:grpSpPr>
+      <p:sp>
+        <p:nvSpPr>
+          <p:cNvPr id="4" name="Título 3">
+            <a:extLst>
+              <a:ext uri="{FF2B5EF4-FFF2-40B4-BE49-F238E27FC236}">
+                <a16:creationId xmlns:a16="http://schemas.microsoft.com/office/drawing/2014/main" id="{FA4EADB5-92CE-4B25-BE21-7FC484AE680E}"/>
+              </a:ext>
+            </a:extLst>
+          </p:cNvPr>
+          <p:cNvSpPr>
+            <a:spLocks noGrp="1"/>
+          </p:cNvSpPr>
+          <p:nvPr>
+            <p:ph type="ctrTitle"/>
+          </p:nvPr>
+        </p:nvSpPr>
+        <p:spPr>
+          <a:xfrm>
+            <a:off x="1506071" y="190615"/>
+            <a:ext cx="9380980" cy="1240040"/>
+          </a:xfrm>
+        </p:spPr>
+        <p:txBody>
+          <a:bodyPr>
+            <a:normAutofit/>
+          </a:bodyPr>
+          <a:lstStyle/>
+          <a:p>
+            <a:r>
+              <a:rPr lang="es-AR" sz="4800" dirty="0">
+                <a:latin typeface="Georgia" panose="02040502050405020303" pitchFamily="18" charset="0"/>
+              </a:rPr>
+              <a:t>Temario II – Implementación</a:t>
+            </a:r>
+          </a:p>
+        </p:txBody>
+      </p:sp>
+      <p:sp>
+        <p:nvSpPr>
+          <p:cNvPr id="5" name="Subtítulo 4">
+            <a:extLst>
+              <a:ext uri="{FF2B5EF4-FFF2-40B4-BE49-F238E27FC236}">
+                <a16:creationId xmlns:a16="http://schemas.microsoft.com/office/drawing/2014/main" id="{7035CB29-6D24-4E02-AC9F-07DC0DE9312C}"/>
+              </a:ext>
+            </a:extLst>
+          </p:cNvPr>
+          <p:cNvSpPr>
+            <a:spLocks noGrp="1"/>
+          </p:cNvSpPr>
+          <p:nvPr>
+            <p:ph type="subTitle" idx="1"/>
+          </p:nvPr>
+        </p:nvSpPr>
+        <p:spPr>
+          <a:xfrm>
+            <a:off x="3349802" y="1794227"/>
+            <a:ext cx="8770480" cy="4732079"/>
+          </a:xfrm>
+        </p:spPr>
+        <p:txBody>
+          <a:bodyPr>
+            <a:normAutofit/>
+          </a:bodyPr>
+          <a:lstStyle/>
+          <a:p>
+            <a:pPr marL="342900" indent="-342900" algn="l">
+              <a:buFont typeface="Arial" panose="020B0604020202020204" pitchFamily="34" charset="0"/>
+              <a:buChar char="•"/>
+            </a:pPr>
+            <a:r>
+              <a:rPr lang="es-AR" sz="2400" dirty="0">
+                <a:latin typeface="Georgia" panose="02040502050405020303" pitchFamily="18" charset="0"/>
+              </a:rPr>
+              <a:t>Implementación de Casos de Uso:</a:t>
+            </a:r>
+          </a:p>
+          <a:p>
+            <a:pPr marL="342900" indent="-342900" algn="l">
+              <a:buFont typeface="Arial" panose="020B0604020202020204" pitchFamily="34" charset="0"/>
+              <a:buChar char="•"/>
+            </a:pPr>
+            <a:r>
+              <a:rPr lang="es-AR" sz="2400" dirty="0">
+                <a:latin typeface="Georgia" panose="02040502050405020303" pitchFamily="18" charset="0"/>
+              </a:rPr>
+              <a:t>Sistema Web:</a:t>
+            </a:r>
+          </a:p>
+          <a:p>
+            <a:pPr marL="800100" lvl="1" indent="-342900" algn="l">
+              <a:buFont typeface="Arial" panose="020B0604020202020204" pitchFamily="34" charset="0"/>
+              <a:buChar char="•"/>
+            </a:pPr>
+            <a:r>
+              <a:rPr lang="es-AR" sz="2200" dirty="0">
+                <a:latin typeface="Georgia" panose="02040502050405020303" pitchFamily="18" charset="0"/>
+              </a:rPr>
+              <a:t>Carga de datos</a:t>
+            </a:r>
+          </a:p>
+          <a:p>
+            <a:pPr marL="800100" lvl="1" indent="-342900" algn="l">
+              <a:buFont typeface="Arial" panose="020B0604020202020204" pitchFamily="34" charset="0"/>
+              <a:buChar char="•"/>
+            </a:pPr>
+            <a:r>
+              <a:rPr lang="es-AR" sz="2200" dirty="0">
+                <a:latin typeface="Georgia" panose="02040502050405020303" pitchFamily="18" charset="0"/>
+              </a:rPr>
+              <a:t>Flujo principal</a:t>
+            </a:r>
+          </a:p>
+          <a:p>
+            <a:pPr lvl="1" algn="l"/>
+            <a:endParaRPr lang="es-AR" sz="2200" dirty="0">
+              <a:latin typeface="Georgia" panose="02040502050405020303" pitchFamily="18" charset="0"/>
+            </a:endParaRPr>
+          </a:p>
+          <a:p>
+            <a:pPr marL="342900" indent="-342900" algn="l">
+              <a:buFont typeface="Arial" panose="020B0604020202020204" pitchFamily="34" charset="0"/>
+              <a:buChar char="•"/>
+            </a:pPr>
+            <a:r>
+              <a:rPr lang="es-AR" sz="2400" dirty="0">
+                <a:latin typeface="Georgia" panose="02040502050405020303" pitchFamily="18" charset="0"/>
+              </a:rPr>
+              <a:t>Aplicación móvil </a:t>
+            </a:r>
+          </a:p>
+          <a:p>
+            <a:pPr marL="800100" lvl="1" indent="-342900" algn="l">
+              <a:buFont typeface="Arial" panose="020B0604020202020204" pitchFamily="34" charset="0"/>
+              <a:buChar char="•"/>
+            </a:pPr>
+            <a:r>
+              <a:rPr lang="es-AR" sz="2300" dirty="0">
+                <a:latin typeface="Georgia" panose="02040502050405020303" pitchFamily="18" charset="0"/>
+              </a:rPr>
+              <a:t>Búsqueda y Visualización de Programa en PDF</a:t>
+            </a:r>
+          </a:p>
+          <a:p>
+            <a:pPr marL="342900" indent="-342900" algn="l">
+              <a:buFont typeface="Arial" panose="020B0604020202020204" pitchFamily="34" charset="0"/>
+              <a:buChar char="•"/>
+            </a:pPr>
+            <a:endParaRPr lang="es-AR" dirty="0"/>
+          </a:p>
+        </p:txBody>
+      </p:sp>
+    </p:spTree>
+    <p:extLst>
+      <p:ext uri="{BB962C8B-B14F-4D97-AF65-F5344CB8AC3E}">
+        <p14:creationId xmlns:p14="http://schemas.microsoft.com/office/powerpoint/2010/main" val="2893191071"/>
+      </p:ext>
+    </p:extLst>
+  </p:cSld>
+  <p:clrMapOvr>
+    <a:masterClrMapping/>
+  </p:clrMapOvr>
+</p:sld>
+</file>
+
+<file path=ppt/slides/slide30.xml><?xml version="1.0" encoding="utf-8"?>
 <p:sld xmlns:a="http://schemas.openxmlformats.org/drawingml/2006/main" xmlns:r="http://schemas.openxmlformats.org/officeDocument/2006/relationships" xmlns:p="http://schemas.openxmlformats.org/presentationml/2006/main">
   <p:cSld>
     <p:spTree>
@@ -15995,7 +19388,7 @@
 </p:sld>
 </file>
 
-<file path=ppt/slides/slide32.xml><?xml version="1.0" encoding="utf-8"?>
+<file path=ppt/slides/slide31.xml><?xml version="1.0" encoding="utf-8"?>
 <p:sld xmlns:a="http://schemas.openxmlformats.org/drawingml/2006/main" xmlns:r="http://schemas.openxmlformats.org/officeDocument/2006/relationships" xmlns:p="http://schemas.openxmlformats.org/presentationml/2006/main">
   <p:cSld>
     <p:spTree>
@@ -17144,7 +20537,7 @@
 </p:sld>
 </file>
 
-<file path=ppt/slides/slide33.xml><?xml version="1.0" encoding="utf-8"?>
+<file path=ppt/slides/slide32.xml><?xml version="1.0" encoding="utf-8"?>
 <p:sld xmlns:a="http://schemas.openxmlformats.org/drawingml/2006/main" xmlns:r="http://schemas.openxmlformats.org/officeDocument/2006/relationships" xmlns:p="http://schemas.openxmlformats.org/presentationml/2006/main">
   <p:cSld>
     <p:spTree>
@@ -17235,7 +20628,7 @@
 </p:sld>
 </file>
 
-<file path=ppt/slides/slide34.xml><?xml version="1.0" encoding="utf-8"?>
+<file path=ppt/slides/slide33.xml><?xml version="1.0" encoding="utf-8"?>
 <p:sld xmlns:a="http://schemas.openxmlformats.org/drawingml/2006/main" xmlns:r="http://schemas.openxmlformats.org/officeDocument/2006/relationships" xmlns:p="http://schemas.openxmlformats.org/presentationml/2006/main">
   <p:cSld>
     <p:spTree>
@@ -17442,7 +20835,7 @@
 </p:sld>
 </file>
 
-<file path=ppt/slides/slide35.xml><?xml version="1.0" encoding="utf-8"?>
+<file path=ppt/slides/slide34.xml><?xml version="1.0" encoding="utf-8"?>
 <p:sld xmlns:a="http://schemas.openxmlformats.org/drawingml/2006/main" xmlns:r="http://schemas.openxmlformats.org/officeDocument/2006/relationships" xmlns:p="http://schemas.openxmlformats.org/presentationml/2006/main">
   <p:cSld>
     <p:spTree>

</xml_diff>

<commit_message>
Se realizan correciones en la presentación final
</commit_message>
<xml_diff>
--- a/Presentaciones/Presentación VASPA - Diciembre 2020 - Examen Final/Presentación VASPA - Diciembre 2020 - Examen Final.pptx
+++ b/Presentaciones/Presentación VASPA - Diciembre 2020 - Examen Final/Presentación VASPA - Diciembre 2020 - Examen Final.pptx
@@ -642,6 +642,7 @@
     </c:legend>
     <c:plotVisOnly val="1"/>
     <c:dispBlanksAs val="gap"/>
+    <c:showDLblsOverMax val="0"/>
     <c:extLst>
       <c:ext xmlns:c16r3="http://schemas.microsoft.com/office/drawing/2017/03/chart" uri="{56B9EC1D-385E-4148-901F-78D8002777C0}">
         <c16r3:dataDisplayOptions16>
@@ -649,7 +650,6 @@
         </c16r3:dataDisplayOptions16>
       </c:ext>
     </c:extLst>
-    <c:showDLblsOverMax val="0"/>
   </c:chart>
   <c:spPr>
     <a:solidFill>
@@ -2408,6 +2408,13 @@
         </dgm:presLayoutVars>
       </dgm:prSet>
       <dgm:spPr/>
+      <dgm:t>
+        <a:bodyPr/>
+        <a:lstStyle/>
+        <a:p>
+          <a:endParaRPr lang="es-ES"/>
+        </a:p>
+      </dgm:t>
     </dgm:pt>
     <dgm:pt modelId="{3D5C674D-195F-4346-A602-68D809648B83}" type="pres">
       <dgm:prSet presAssocID="{853FF75D-08FD-4C0B-97FF-B95C5121D1D7}" presName="parTxOnly" presStyleLbl="node1" presStyleIdx="0" presStyleCnt="4">
@@ -2418,6 +2425,13 @@
         </dgm:presLayoutVars>
       </dgm:prSet>
       <dgm:spPr/>
+      <dgm:t>
+        <a:bodyPr/>
+        <a:lstStyle/>
+        <a:p>
+          <a:endParaRPr lang="es-ES"/>
+        </a:p>
+      </dgm:t>
     </dgm:pt>
     <dgm:pt modelId="{4DCC4052-4221-44D0-84E2-29AAAD96FCB3}" type="pres">
       <dgm:prSet presAssocID="{888E8F23-D971-4F49-AF2A-2D3F7847711C}" presName="parTxOnlySpace" presStyleCnt="0"/>
@@ -2432,6 +2446,13 @@
         </dgm:presLayoutVars>
       </dgm:prSet>
       <dgm:spPr/>
+      <dgm:t>
+        <a:bodyPr/>
+        <a:lstStyle/>
+        <a:p>
+          <a:endParaRPr lang="es-ES"/>
+        </a:p>
+      </dgm:t>
     </dgm:pt>
     <dgm:pt modelId="{A6E2C1E9-D2ED-47B3-A71D-FDA80BA4D0C1}" type="pres">
       <dgm:prSet presAssocID="{431F7064-B371-4D30-9440-9276B420E393}" presName="parTxOnlySpace" presStyleCnt="0"/>
@@ -2446,6 +2467,13 @@
         </dgm:presLayoutVars>
       </dgm:prSet>
       <dgm:spPr/>
+      <dgm:t>
+        <a:bodyPr/>
+        <a:lstStyle/>
+        <a:p>
+          <a:endParaRPr lang="es-ES"/>
+        </a:p>
+      </dgm:t>
     </dgm:pt>
     <dgm:pt modelId="{FA28285D-C85B-47E5-8E04-E3031E7EB070}" type="pres">
       <dgm:prSet presAssocID="{50E5B106-8092-4055-AC3C-E16AB9A8A632}" presName="parTxOnlySpace" presStyleCnt="0"/>
@@ -2460,18 +2488,25 @@
         </dgm:presLayoutVars>
       </dgm:prSet>
       <dgm:spPr/>
+      <dgm:t>
+        <a:bodyPr/>
+        <a:lstStyle/>
+        <a:p>
+          <a:endParaRPr lang="es-ES"/>
+        </a:p>
+      </dgm:t>
     </dgm:pt>
   </dgm:ptLst>
   <dgm:cxnLst>
+    <dgm:cxn modelId="{5E7AA7A8-CA8D-46F6-8417-A9E8900910E7}" type="presOf" srcId="{07D852F8-DC80-412E-99FF-CBC8CF6E9E53}" destId="{BB3205ED-EB8F-4AA2-A69D-916A25FD317F}" srcOrd="0" destOrd="0" presId="urn:microsoft.com/office/officeart/2005/8/layout/chevron1"/>
+    <dgm:cxn modelId="{49728C46-9AF0-4404-B77C-0BF8753B1BE2}" srcId="{07D852F8-DC80-412E-99FF-CBC8CF6E9E53}" destId="{3B4EE390-B919-49DE-81BE-0780A08DDBFA}" srcOrd="2" destOrd="0" parTransId="{3B1FF57E-AA55-4079-B104-9BCA769CA707}" sibTransId="{50E5B106-8092-4055-AC3C-E16AB9A8A632}"/>
+    <dgm:cxn modelId="{24BDC4C3-8E68-4ABC-A0DA-A0FE0C4BE3D4}" srcId="{07D852F8-DC80-412E-99FF-CBC8CF6E9E53}" destId="{3E85E467-C11E-426F-9200-FC251BE43DEA}" srcOrd="1" destOrd="0" parTransId="{83EB3A9D-25F1-42C7-AA54-1B46554184BF}" sibTransId="{431F7064-B371-4D30-9440-9276B420E393}"/>
+    <dgm:cxn modelId="{C846122C-05FD-4C41-8444-CC3A300BDFFE}" srcId="{07D852F8-DC80-412E-99FF-CBC8CF6E9E53}" destId="{853FF75D-08FD-4C0B-97FF-B95C5121D1D7}" srcOrd="0" destOrd="0" parTransId="{BD4839AE-4C9F-4F18-92E9-4B1323829560}" sibTransId="{888E8F23-D971-4F49-AF2A-2D3F7847711C}"/>
     <dgm:cxn modelId="{7D2F0A27-3D8B-4128-8CB3-A82F5F34B1DA}" type="presOf" srcId="{3B4EE390-B919-49DE-81BE-0780A08DDBFA}" destId="{AEA2C0A0-0FCA-4EB1-AA5B-89E50BC14E35}" srcOrd="0" destOrd="0" presId="urn:microsoft.com/office/officeart/2005/8/layout/chevron1"/>
-    <dgm:cxn modelId="{C846122C-05FD-4C41-8444-CC3A300BDFFE}" srcId="{07D852F8-DC80-412E-99FF-CBC8CF6E9E53}" destId="{853FF75D-08FD-4C0B-97FF-B95C5121D1D7}" srcOrd="0" destOrd="0" parTransId="{BD4839AE-4C9F-4F18-92E9-4B1323829560}" sibTransId="{888E8F23-D971-4F49-AF2A-2D3F7847711C}"/>
-    <dgm:cxn modelId="{49728C46-9AF0-4404-B77C-0BF8753B1BE2}" srcId="{07D852F8-DC80-412E-99FF-CBC8CF6E9E53}" destId="{3B4EE390-B919-49DE-81BE-0780A08DDBFA}" srcOrd="2" destOrd="0" parTransId="{3B1FF57E-AA55-4079-B104-9BCA769CA707}" sibTransId="{50E5B106-8092-4055-AC3C-E16AB9A8A632}"/>
+    <dgm:cxn modelId="{D76B3C6A-BC4F-4872-BB7B-7982459BAA86}" type="presOf" srcId="{853FF75D-08FD-4C0B-97FF-B95C5121D1D7}" destId="{3D5C674D-195F-4346-A602-68D809648B83}" srcOrd="0" destOrd="0" presId="urn:microsoft.com/office/officeart/2005/8/layout/chevron1"/>
+    <dgm:cxn modelId="{61C2D7D0-DEE2-4010-B64E-4D1FEDBA0702}" srcId="{07D852F8-DC80-412E-99FF-CBC8CF6E9E53}" destId="{FE8D9DF2-8BC9-4E07-8005-D845C397B55E}" srcOrd="3" destOrd="0" parTransId="{5B8A1B7E-67AD-4057-819C-2245EC4F7AC4}" sibTransId="{5B54ED7F-A264-47E6-96E6-7D075AA7F363}"/>
+    <dgm:cxn modelId="{403E4FC9-6B5A-4E42-8B00-B4A63F0B56C0}" type="presOf" srcId="{3E85E467-C11E-426F-9200-FC251BE43DEA}" destId="{6886AB32-2506-433F-9563-157CC1EA1348}" srcOrd="0" destOrd="0" presId="urn:microsoft.com/office/officeart/2005/8/layout/chevron1"/>
     <dgm:cxn modelId="{D7B69E66-919E-4FAC-945E-964D8A3AC565}" type="presOf" srcId="{FE8D9DF2-8BC9-4E07-8005-D845C397B55E}" destId="{09B459DE-37E0-4270-82CB-D68CAF9A376E}" srcOrd="0" destOrd="0" presId="urn:microsoft.com/office/officeart/2005/8/layout/chevron1"/>
-    <dgm:cxn modelId="{D76B3C6A-BC4F-4872-BB7B-7982459BAA86}" type="presOf" srcId="{853FF75D-08FD-4C0B-97FF-B95C5121D1D7}" destId="{3D5C674D-195F-4346-A602-68D809648B83}" srcOrd="0" destOrd="0" presId="urn:microsoft.com/office/officeart/2005/8/layout/chevron1"/>
-    <dgm:cxn modelId="{5E7AA7A8-CA8D-46F6-8417-A9E8900910E7}" type="presOf" srcId="{07D852F8-DC80-412E-99FF-CBC8CF6E9E53}" destId="{BB3205ED-EB8F-4AA2-A69D-916A25FD317F}" srcOrd="0" destOrd="0" presId="urn:microsoft.com/office/officeart/2005/8/layout/chevron1"/>
-    <dgm:cxn modelId="{24BDC4C3-8E68-4ABC-A0DA-A0FE0C4BE3D4}" srcId="{07D852F8-DC80-412E-99FF-CBC8CF6E9E53}" destId="{3E85E467-C11E-426F-9200-FC251BE43DEA}" srcOrd="1" destOrd="0" parTransId="{83EB3A9D-25F1-42C7-AA54-1B46554184BF}" sibTransId="{431F7064-B371-4D30-9440-9276B420E393}"/>
-    <dgm:cxn modelId="{403E4FC9-6B5A-4E42-8B00-B4A63F0B56C0}" type="presOf" srcId="{3E85E467-C11E-426F-9200-FC251BE43DEA}" destId="{6886AB32-2506-433F-9563-157CC1EA1348}" srcOrd="0" destOrd="0" presId="urn:microsoft.com/office/officeart/2005/8/layout/chevron1"/>
-    <dgm:cxn modelId="{61C2D7D0-DEE2-4010-B64E-4D1FEDBA0702}" srcId="{07D852F8-DC80-412E-99FF-CBC8CF6E9E53}" destId="{FE8D9DF2-8BC9-4E07-8005-D845C397B55E}" srcOrd="3" destOrd="0" parTransId="{5B8A1B7E-67AD-4057-819C-2245EC4F7AC4}" sibTransId="{5B54ED7F-A264-47E6-96E6-7D075AA7F363}"/>
     <dgm:cxn modelId="{2F515B5D-54B1-4237-891D-39EC55794076}" type="presParOf" srcId="{BB3205ED-EB8F-4AA2-A69D-916A25FD317F}" destId="{3D5C674D-195F-4346-A602-68D809648B83}" srcOrd="0" destOrd="0" presId="urn:microsoft.com/office/officeart/2005/8/layout/chevron1"/>
     <dgm:cxn modelId="{624BFC5C-F915-4A8E-B04A-57BF8C238C73}" type="presParOf" srcId="{BB3205ED-EB8F-4AA2-A69D-916A25FD317F}" destId="{4DCC4052-4221-44D0-84E2-29AAAD96FCB3}" srcOrd="1" destOrd="0" presId="urn:microsoft.com/office/officeart/2005/8/layout/chevron1"/>
     <dgm:cxn modelId="{6BB152CA-DFDB-44B7-9F2B-2AD9DCE38131}" type="presParOf" srcId="{BB3205ED-EB8F-4AA2-A69D-916A25FD317F}" destId="{6886AB32-2506-433F-9563-157CC1EA1348}" srcOrd="2" destOrd="0" presId="urn:microsoft.com/office/officeart/2005/8/layout/chevron1"/>
@@ -2661,6 +2696,13 @@
         </dgm:presLayoutVars>
       </dgm:prSet>
       <dgm:spPr/>
+      <dgm:t>
+        <a:bodyPr/>
+        <a:lstStyle/>
+        <a:p>
+          <a:endParaRPr lang="es-ES"/>
+        </a:p>
+      </dgm:t>
     </dgm:pt>
     <dgm:pt modelId="{3D5C674D-195F-4346-A602-68D809648B83}" type="pres">
       <dgm:prSet presAssocID="{853FF75D-08FD-4C0B-97FF-B95C5121D1D7}" presName="parTxOnly" presStyleLbl="node1" presStyleIdx="0" presStyleCnt="4">
@@ -2671,6 +2713,13 @@
         </dgm:presLayoutVars>
       </dgm:prSet>
       <dgm:spPr/>
+      <dgm:t>
+        <a:bodyPr/>
+        <a:lstStyle/>
+        <a:p>
+          <a:endParaRPr lang="es-ES"/>
+        </a:p>
+      </dgm:t>
     </dgm:pt>
     <dgm:pt modelId="{4DCC4052-4221-44D0-84E2-29AAAD96FCB3}" type="pres">
       <dgm:prSet presAssocID="{888E8F23-D971-4F49-AF2A-2D3F7847711C}" presName="parTxOnlySpace" presStyleCnt="0"/>
@@ -2685,6 +2734,13 @@
         </dgm:presLayoutVars>
       </dgm:prSet>
       <dgm:spPr/>
+      <dgm:t>
+        <a:bodyPr/>
+        <a:lstStyle/>
+        <a:p>
+          <a:endParaRPr lang="es-ES"/>
+        </a:p>
+      </dgm:t>
     </dgm:pt>
     <dgm:pt modelId="{A6E2C1E9-D2ED-47B3-A71D-FDA80BA4D0C1}" type="pres">
       <dgm:prSet presAssocID="{431F7064-B371-4D30-9440-9276B420E393}" presName="parTxOnlySpace" presStyleCnt="0"/>
@@ -2699,6 +2755,13 @@
         </dgm:presLayoutVars>
       </dgm:prSet>
       <dgm:spPr/>
+      <dgm:t>
+        <a:bodyPr/>
+        <a:lstStyle/>
+        <a:p>
+          <a:endParaRPr lang="es-ES"/>
+        </a:p>
+      </dgm:t>
     </dgm:pt>
     <dgm:pt modelId="{FA28285D-C85B-47E5-8E04-E3031E7EB070}" type="pres">
       <dgm:prSet presAssocID="{50E5B106-8092-4055-AC3C-E16AB9A8A632}" presName="parTxOnlySpace" presStyleCnt="0"/>
@@ -2713,18 +2776,25 @@
         </dgm:presLayoutVars>
       </dgm:prSet>
       <dgm:spPr/>
+      <dgm:t>
+        <a:bodyPr/>
+        <a:lstStyle/>
+        <a:p>
+          <a:endParaRPr lang="es-ES"/>
+        </a:p>
+      </dgm:t>
     </dgm:pt>
   </dgm:ptLst>
   <dgm:cxnLst>
+    <dgm:cxn modelId="{5E7AA7A8-CA8D-46F6-8417-A9E8900910E7}" type="presOf" srcId="{07D852F8-DC80-412E-99FF-CBC8CF6E9E53}" destId="{BB3205ED-EB8F-4AA2-A69D-916A25FD317F}" srcOrd="0" destOrd="0" presId="urn:microsoft.com/office/officeart/2005/8/layout/chevron1"/>
+    <dgm:cxn modelId="{49728C46-9AF0-4404-B77C-0BF8753B1BE2}" srcId="{07D852F8-DC80-412E-99FF-CBC8CF6E9E53}" destId="{3B4EE390-B919-49DE-81BE-0780A08DDBFA}" srcOrd="2" destOrd="0" parTransId="{3B1FF57E-AA55-4079-B104-9BCA769CA707}" sibTransId="{50E5B106-8092-4055-AC3C-E16AB9A8A632}"/>
+    <dgm:cxn modelId="{24BDC4C3-8E68-4ABC-A0DA-A0FE0C4BE3D4}" srcId="{07D852F8-DC80-412E-99FF-CBC8CF6E9E53}" destId="{3E85E467-C11E-426F-9200-FC251BE43DEA}" srcOrd="1" destOrd="0" parTransId="{83EB3A9D-25F1-42C7-AA54-1B46554184BF}" sibTransId="{431F7064-B371-4D30-9440-9276B420E393}"/>
+    <dgm:cxn modelId="{C846122C-05FD-4C41-8444-CC3A300BDFFE}" srcId="{07D852F8-DC80-412E-99FF-CBC8CF6E9E53}" destId="{853FF75D-08FD-4C0B-97FF-B95C5121D1D7}" srcOrd="0" destOrd="0" parTransId="{BD4839AE-4C9F-4F18-92E9-4B1323829560}" sibTransId="{888E8F23-D971-4F49-AF2A-2D3F7847711C}"/>
     <dgm:cxn modelId="{7D2F0A27-3D8B-4128-8CB3-A82F5F34B1DA}" type="presOf" srcId="{3B4EE390-B919-49DE-81BE-0780A08DDBFA}" destId="{AEA2C0A0-0FCA-4EB1-AA5B-89E50BC14E35}" srcOrd="0" destOrd="0" presId="urn:microsoft.com/office/officeart/2005/8/layout/chevron1"/>
-    <dgm:cxn modelId="{C846122C-05FD-4C41-8444-CC3A300BDFFE}" srcId="{07D852F8-DC80-412E-99FF-CBC8CF6E9E53}" destId="{853FF75D-08FD-4C0B-97FF-B95C5121D1D7}" srcOrd="0" destOrd="0" parTransId="{BD4839AE-4C9F-4F18-92E9-4B1323829560}" sibTransId="{888E8F23-D971-4F49-AF2A-2D3F7847711C}"/>
-    <dgm:cxn modelId="{49728C46-9AF0-4404-B77C-0BF8753B1BE2}" srcId="{07D852F8-DC80-412E-99FF-CBC8CF6E9E53}" destId="{3B4EE390-B919-49DE-81BE-0780A08DDBFA}" srcOrd="2" destOrd="0" parTransId="{3B1FF57E-AA55-4079-B104-9BCA769CA707}" sibTransId="{50E5B106-8092-4055-AC3C-E16AB9A8A632}"/>
+    <dgm:cxn modelId="{D76B3C6A-BC4F-4872-BB7B-7982459BAA86}" type="presOf" srcId="{853FF75D-08FD-4C0B-97FF-B95C5121D1D7}" destId="{3D5C674D-195F-4346-A602-68D809648B83}" srcOrd="0" destOrd="0" presId="urn:microsoft.com/office/officeart/2005/8/layout/chevron1"/>
+    <dgm:cxn modelId="{61C2D7D0-DEE2-4010-B64E-4D1FEDBA0702}" srcId="{07D852F8-DC80-412E-99FF-CBC8CF6E9E53}" destId="{FE8D9DF2-8BC9-4E07-8005-D845C397B55E}" srcOrd="3" destOrd="0" parTransId="{5B8A1B7E-67AD-4057-819C-2245EC4F7AC4}" sibTransId="{5B54ED7F-A264-47E6-96E6-7D075AA7F363}"/>
+    <dgm:cxn modelId="{403E4FC9-6B5A-4E42-8B00-B4A63F0B56C0}" type="presOf" srcId="{3E85E467-C11E-426F-9200-FC251BE43DEA}" destId="{6886AB32-2506-433F-9563-157CC1EA1348}" srcOrd="0" destOrd="0" presId="urn:microsoft.com/office/officeart/2005/8/layout/chevron1"/>
     <dgm:cxn modelId="{D7B69E66-919E-4FAC-945E-964D8A3AC565}" type="presOf" srcId="{FE8D9DF2-8BC9-4E07-8005-D845C397B55E}" destId="{09B459DE-37E0-4270-82CB-D68CAF9A376E}" srcOrd="0" destOrd="0" presId="urn:microsoft.com/office/officeart/2005/8/layout/chevron1"/>
-    <dgm:cxn modelId="{D76B3C6A-BC4F-4872-BB7B-7982459BAA86}" type="presOf" srcId="{853FF75D-08FD-4C0B-97FF-B95C5121D1D7}" destId="{3D5C674D-195F-4346-A602-68D809648B83}" srcOrd="0" destOrd="0" presId="urn:microsoft.com/office/officeart/2005/8/layout/chevron1"/>
-    <dgm:cxn modelId="{5E7AA7A8-CA8D-46F6-8417-A9E8900910E7}" type="presOf" srcId="{07D852F8-DC80-412E-99FF-CBC8CF6E9E53}" destId="{BB3205ED-EB8F-4AA2-A69D-916A25FD317F}" srcOrd="0" destOrd="0" presId="urn:microsoft.com/office/officeart/2005/8/layout/chevron1"/>
-    <dgm:cxn modelId="{24BDC4C3-8E68-4ABC-A0DA-A0FE0C4BE3D4}" srcId="{07D852F8-DC80-412E-99FF-CBC8CF6E9E53}" destId="{3E85E467-C11E-426F-9200-FC251BE43DEA}" srcOrd="1" destOrd="0" parTransId="{83EB3A9D-25F1-42C7-AA54-1B46554184BF}" sibTransId="{431F7064-B371-4D30-9440-9276B420E393}"/>
-    <dgm:cxn modelId="{403E4FC9-6B5A-4E42-8B00-B4A63F0B56C0}" type="presOf" srcId="{3E85E467-C11E-426F-9200-FC251BE43DEA}" destId="{6886AB32-2506-433F-9563-157CC1EA1348}" srcOrd="0" destOrd="0" presId="urn:microsoft.com/office/officeart/2005/8/layout/chevron1"/>
-    <dgm:cxn modelId="{61C2D7D0-DEE2-4010-B64E-4D1FEDBA0702}" srcId="{07D852F8-DC80-412E-99FF-CBC8CF6E9E53}" destId="{FE8D9DF2-8BC9-4E07-8005-D845C397B55E}" srcOrd="3" destOrd="0" parTransId="{5B8A1B7E-67AD-4057-819C-2245EC4F7AC4}" sibTransId="{5B54ED7F-A264-47E6-96E6-7D075AA7F363}"/>
     <dgm:cxn modelId="{2F515B5D-54B1-4237-891D-39EC55794076}" type="presParOf" srcId="{BB3205ED-EB8F-4AA2-A69D-916A25FD317F}" destId="{3D5C674D-195F-4346-A602-68D809648B83}" srcOrd="0" destOrd="0" presId="urn:microsoft.com/office/officeart/2005/8/layout/chevron1"/>
     <dgm:cxn modelId="{624BFC5C-F915-4A8E-B04A-57BF8C238C73}" type="presParOf" srcId="{BB3205ED-EB8F-4AA2-A69D-916A25FD317F}" destId="{4DCC4052-4221-44D0-84E2-29AAAD96FCB3}" srcOrd="1" destOrd="0" presId="urn:microsoft.com/office/officeart/2005/8/layout/chevron1"/>
     <dgm:cxn modelId="{6BB152CA-DFDB-44B7-9F2B-2AD9DCE38131}" type="presParOf" srcId="{BB3205ED-EB8F-4AA2-A69D-916A25FD317F}" destId="{6886AB32-2506-433F-9563-157CC1EA1348}" srcOrd="2" destOrd="0" presId="urn:microsoft.com/office/officeart/2005/8/layout/chevron1"/>
@@ -2825,7 +2895,7 @@
         </a:bodyPr>
         <a:lstStyle/>
         <a:p>
-          <a:pPr marL="0" lvl="0" indent="0" algn="ctr" defTabSz="755650">
+          <a:pPr lvl="0" algn="ctr" defTabSz="755650">
             <a:lnSpc>
               <a:spcPct val="90000"/>
             </a:lnSpc>
@@ -2835,7 +2905,6 @@
             <a:spcAft>
               <a:spcPct val="35000"/>
             </a:spcAft>
-            <a:buNone/>
           </a:pPr>
           <a:r>
             <a:rPr lang="es-ES" sz="1700" kern="1200" dirty="0"/>
@@ -2923,7 +2992,7 @@
         </a:bodyPr>
         <a:lstStyle/>
         <a:p>
-          <a:pPr marL="0" lvl="0" indent="0" algn="ctr" defTabSz="755650">
+          <a:pPr lvl="0" algn="ctr" defTabSz="755650">
             <a:lnSpc>
               <a:spcPct val="90000"/>
             </a:lnSpc>
@@ -2933,7 +3002,6 @@
             <a:spcAft>
               <a:spcPct val="35000"/>
             </a:spcAft>
-            <a:buNone/>
           </a:pPr>
           <a:r>
             <a:rPr lang="es-ES" sz="1700" kern="1200" dirty="0"/>
@@ -3021,7 +3089,7 @@
         </a:bodyPr>
         <a:lstStyle/>
         <a:p>
-          <a:pPr marL="0" lvl="0" indent="0" algn="ctr" defTabSz="755650">
+          <a:pPr lvl="0" algn="ctr" defTabSz="755650">
             <a:lnSpc>
               <a:spcPct val="90000"/>
             </a:lnSpc>
@@ -3031,7 +3099,6 @@
             <a:spcAft>
               <a:spcPct val="35000"/>
             </a:spcAft>
-            <a:buNone/>
           </a:pPr>
           <a:r>
             <a:rPr lang="es-ES" sz="1700" kern="1200" dirty="0"/>
@@ -3119,7 +3186,7 @@
         </a:bodyPr>
         <a:lstStyle/>
         <a:p>
-          <a:pPr marL="0" lvl="0" indent="0" algn="ctr" defTabSz="755650">
+          <a:pPr lvl="0" algn="ctr" defTabSz="755650">
             <a:lnSpc>
               <a:spcPct val="90000"/>
             </a:lnSpc>
@@ -3129,7 +3196,6 @@
             <a:spcAft>
               <a:spcPct val="35000"/>
             </a:spcAft>
-            <a:buNone/>
           </a:pPr>
           <a:r>
             <a:rPr lang="es-ES" sz="1700" kern="1200" dirty="0"/>
@@ -3222,7 +3288,7 @@
         </a:bodyPr>
         <a:lstStyle/>
         <a:p>
-          <a:pPr marL="0" lvl="0" indent="0" algn="ctr" defTabSz="755650">
+          <a:pPr lvl="0" algn="ctr" defTabSz="755650">
             <a:lnSpc>
               <a:spcPct val="90000"/>
             </a:lnSpc>
@@ -3232,7 +3298,6 @@
             <a:spcAft>
               <a:spcPct val="35000"/>
             </a:spcAft>
-            <a:buNone/>
           </a:pPr>
           <a:r>
             <a:rPr lang="es-ES" sz="1700" kern="1200" dirty="0"/>
@@ -3313,7 +3378,7 @@
         </a:bodyPr>
         <a:lstStyle/>
         <a:p>
-          <a:pPr marL="0" lvl="0" indent="0" algn="ctr" defTabSz="755650">
+          <a:pPr lvl="0" algn="ctr" defTabSz="755650">
             <a:lnSpc>
               <a:spcPct val="90000"/>
             </a:lnSpc>
@@ -3323,7 +3388,6 @@
             <a:spcAft>
               <a:spcPct val="35000"/>
             </a:spcAft>
-            <a:buNone/>
           </a:pPr>
           <a:r>
             <a:rPr lang="es-ES" sz="1700" kern="1200" dirty="0"/>
@@ -3404,7 +3468,7 @@
         </a:bodyPr>
         <a:lstStyle/>
         <a:p>
-          <a:pPr marL="0" lvl="0" indent="0" algn="ctr" defTabSz="755650">
+          <a:pPr lvl="0" algn="ctr" defTabSz="755650">
             <a:lnSpc>
               <a:spcPct val="90000"/>
             </a:lnSpc>
@@ -3414,7 +3478,6 @@
             <a:spcAft>
               <a:spcPct val="35000"/>
             </a:spcAft>
-            <a:buNone/>
           </a:pPr>
           <a:r>
             <a:rPr lang="es-ES" sz="1700" kern="1200" dirty="0"/>
@@ -3495,7 +3558,7 @@
         </a:bodyPr>
         <a:lstStyle/>
         <a:p>
-          <a:pPr marL="0" lvl="0" indent="0" algn="ctr" defTabSz="755650">
+          <a:pPr lvl="0" algn="ctr" defTabSz="755650">
             <a:lnSpc>
               <a:spcPct val="90000"/>
             </a:lnSpc>
@@ -3505,7 +3568,6 @@
             <a:spcAft>
               <a:spcPct val="35000"/>
             </a:spcAft>
-            <a:buNone/>
           </a:pPr>
           <a:r>
             <a:rPr lang="es-ES" sz="1700" kern="1200" dirty="0"/>
@@ -6384,7 +6446,7 @@
             <a:fld id="{F55F861E-3C59-4235-9924-AE3FDF166F3F}" type="datetimeFigureOut">
               <a:rPr lang="es-AR" smtClean="0"/>
               <a:pPr/>
-              <a:t>4/12/2020</a:t>
+              <a:t>05/12/2020</a:t>
             </a:fld>
             <a:endParaRPr lang="es-AR"/>
           </a:p>
@@ -7241,7 +7303,7 @@
             <a:fld id="{59D4168E-E6F0-4E6D-9E98-0FBF44047F1D}" type="datetimeFigureOut">
               <a:rPr lang="es-AR" smtClean="0"/>
               <a:pPr/>
-              <a:t>4/12/2020</a:t>
+              <a:t>05/12/2020</a:t>
             </a:fld>
             <a:endParaRPr lang="es-AR"/>
           </a:p>
@@ -7575,7 +7637,7 @@
             <a:fld id="{59D4168E-E6F0-4E6D-9E98-0FBF44047F1D}" type="datetimeFigureOut">
               <a:rPr lang="es-AR" smtClean="0"/>
               <a:pPr/>
-              <a:t>4/12/2020</a:t>
+              <a:t>05/12/2020</a:t>
             </a:fld>
             <a:endParaRPr lang="es-AR"/>
           </a:p>
@@ -7825,7 +7887,7 @@
             <a:fld id="{59D4168E-E6F0-4E6D-9E98-0FBF44047F1D}" type="datetimeFigureOut">
               <a:rPr lang="es-AR" smtClean="0"/>
               <a:pPr/>
-              <a:t>4/12/2020</a:t>
+              <a:t>05/12/2020</a:t>
             </a:fld>
             <a:endParaRPr lang="es-AR"/>
           </a:p>
@@ -8367,7 +8429,7 @@
             <a:fld id="{59D4168E-E6F0-4E6D-9E98-0FBF44047F1D}" type="datetimeFigureOut">
               <a:rPr lang="es-AR" smtClean="0"/>
               <a:pPr/>
-              <a:t>4/12/2020</a:t>
+              <a:t>05/12/2020</a:t>
             </a:fld>
             <a:endParaRPr lang="es-AR"/>
           </a:p>
@@ -8617,7 +8679,7 @@
             <a:fld id="{59D4168E-E6F0-4E6D-9E98-0FBF44047F1D}" type="datetimeFigureOut">
               <a:rPr lang="es-AR" smtClean="0"/>
               <a:pPr/>
-              <a:t>4/12/2020</a:t>
+              <a:t>05/12/2020</a:t>
             </a:fld>
             <a:endParaRPr lang="es-AR"/>
           </a:p>
@@ -9151,7 +9213,7 @@
             <a:fld id="{59D4168E-E6F0-4E6D-9E98-0FBF44047F1D}" type="datetimeFigureOut">
               <a:rPr lang="es-AR" smtClean="0"/>
               <a:pPr/>
-              <a:t>4/12/2020</a:t>
+              <a:t>05/12/2020</a:t>
             </a:fld>
             <a:endParaRPr lang="es-AR"/>
           </a:p>
@@ -9450,7 +9512,7 @@
             <a:fld id="{59D4168E-E6F0-4E6D-9E98-0FBF44047F1D}" type="datetimeFigureOut">
               <a:rPr lang="es-AR" smtClean="0"/>
               <a:pPr/>
-              <a:t>4/12/2020</a:t>
+              <a:t>05/12/2020</a:t>
             </a:fld>
             <a:endParaRPr lang="es-AR"/>
           </a:p>
@@ -9626,7 +9688,7 @@
             <a:fld id="{59D4168E-E6F0-4E6D-9E98-0FBF44047F1D}" type="datetimeFigureOut">
               <a:rPr lang="es-AR" smtClean="0"/>
               <a:pPr/>
-              <a:t>4/12/2020</a:t>
+              <a:t>05/12/2020</a:t>
             </a:fld>
             <a:endParaRPr lang="es-AR"/>
           </a:p>
@@ -9808,7 +9870,7 @@
             <a:fld id="{59D4168E-E6F0-4E6D-9E98-0FBF44047F1D}" type="datetimeFigureOut">
               <a:rPr lang="es-AR" smtClean="0"/>
               <a:pPr/>
-              <a:t>4/12/2020</a:t>
+              <a:t>05/12/2020</a:t>
             </a:fld>
             <a:endParaRPr lang="es-AR"/>
           </a:p>
@@ -9986,7 +10048,7 @@
             <a:fld id="{59D4168E-E6F0-4E6D-9E98-0FBF44047F1D}" type="datetimeFigureOut">
               <a:rPr lang="es-AR" smtClean="0"/>
               <a:pPr/>
-              <a:t>4/12/2020</a:t>
+              <a:t>05/12/2020</a:t>
             </a:fld>
             <a:endParaRPr lang="es-AR"/>
           </a:p>
@@ -10275,7 +10337,7 @@
             <a:fld id="{59D4168E-E6F0-4E6D-9E98-0FBF44047F1D}" type="datetimeFigureOut">
               <a:rPr lang="es-AR" smtClean="0"/>
               <a:pPr/>
-              <a:t>4/12/2020</a:t>
+              <a:t>05/12/2020</a:t>
             </a:fld>
             <a:endParaRPr lang="es-AR"/>
           </a:p>
@@ -10574,7 +10636,7 @@
             <a:fld id="{59D4168E-E6F0-4E6D-9E98-0FBF44047F1D}" type="datetimeFigureOut">
               <a:rPr lang="es-AR" smtClean="0"/>
               <a:pPr/>
-              <a:t>4/12/2020</a:t>
+              <a:t>05/12/2020</a:t>
             </a:fld>
             <a:endParaRPr lang="es-AR"/>
           </a:p>
@@ -11018,7 +11080,7 @@
             <a:fld id="{59D4168E-E6F0-4E6D-9E98-0FBF44047F1D}" type="datetimeFigureOut">
               <a:rPr lang="es-AR" smtClean="0"/>
               <a:pPr/>
-              <a:t>4/12/2020</a:t>
+              <a:t>05/12/2020</a:t>
             </a:fld>
             <a:endParaRPr lang="es-AR"/>
           </a:p>
@@ -11138,7 +11200,7 @@
             <a:fld id="{59D4168E-E6F0-4E6D-9E98-0FBF44047F1D}" type="datetimeFigureOut">
               <a:rPr lang="es-AR" smtClean="0"/>
               <a:pPr/>
-              <a:t>4/12/2020</a:t>
+              <a:t>05/12/2020</a:t>
             </a:fld>
             <a:endParaRPr lang="es-AR"/>
           </a:p>
@@ -11235,7 +11297,7 @@
             <a:fld id="{59D4168E-E6F0-4E6D-9E98-0FBF44047F1D}" type="datetimeFigureOut">
               <a:rPr lang="es-AR" smtClean="0"/>
               <a:pPr/>
-              <a:t>4/12/2020</a:t>
+              <a:t>05/12/2020</a:t>
             </a:fld>
             <a:endParaRPr lang="es-AR"/>
           </a:p>
@@ -11520,7 +11582,7 @@
             <a:fld id="{59D4168E-E6F0-4E6D-9E98-0FBF44047F1D}" type="datetimeFigureOut">
               <a:rPr lang="es-AR" smtClean="0"/>
               <a:pPr/>
-              <a:t>4/12/2020</a:t>
+              <a:t>05/12/2020</a:t>
             </a:fld>
             <a:endParaRPr lang="es-AR"/>
           </a:p>
@@ -11813,7 +11875,7 @@
             <a:fld id="{59D4168E-E6F0-4E6D-9E98-0FBF44047F1D}" type="datetimeFigureOut">
               <a:rPr lang="es-AR" smtClean="0"/>
               <a:pPr/>
-              <a:t>4/12/2020</a:t>
+              <a:t>05/12/2020</a:t>
             </a:fld>
             <a:endParaRPr lang="es-AR"/>
           </a:p>
@@ -12345,7 +12407,7 @@
             <a:fld id="{59D4168E-E6F0-4E6D-9E98-0FBF44047F1D}" type="datetimeFigureOut">
               <a:rPr lang="es-AR" smtClean="0"/>
               <a:pPr/>
-              <a:t>4/12/2020</a:t>
+              <a:t>05/12/2020</a:t>
             </a:fld>
             <a:endParaRPr lang="es-AR"/>
           </a:p>
@@ -15470,7 +15532,19 @@
               <a:rPr lang="es-ES" sz="4000" dirty="0">
                 <a:latin typeface="Georgia" panose="02040502050405020303" pitchFamily="18" charset="0"/>
               </a:rPr>
-              <a:t>Resumen de la Gestión Riesgos I</a:t>
+              <a:t>Resumen de la </a:t>
+            </a:r>
+            <a:r>
+              <a:rPr lang="es-ES" sz="4000" dirty="0" smtClean="0">
+                <a:latin typeface="Georgia" panose="02040502050405020303" pitchFamily="18" charset="0"/>
+              </a:rPr>
+              <a:t>Gestión de </a:t>
+            </a:r>
+            <a:r>
+              <a:rPr lang="es-ES" sz="4000" dirty="0">
+                <a:latin typeface="Georgia" panose="02040502050405020303" pitchFamily="18" charset="0"/>
+              </a:rPr>
+              <a:t>Riesgos I</a:t>
             </a:r>
           </a:p>
         </p:txBody>
@@ -15561,7 +15635,14 @@
                 <a:latin typeface="Georgia" panose="02040502050405020303" pitchFamily="18" charset="0"/>
                 <a:sym typeface="Wingdings" panose="05000000000000000000" pitchFamily="2" charset="2"/>
               </a:rPr>
-              <a:t> todos cerrados</a:t>
+              <a:t> todos </a:t>
+            </a:r>
+            <a:r>
+              <a:rPr lang="es-ES" sz="2000" dirty="0" smtClean="0">
+                <a:latin typeface="Georgia" panose="02040502050405020303" pitchFamily="18" charset="0"/>
+                <a:sym typeface="Wingdings" panose="05000000000000000000" pitchFamily="2" charset="2"/>
+              </a:rPr>
+              <a:t>fueron mitigados</a:t>
             </a:r>
             <a:endParaRPr lang="es-ES" sz="2000" dirty="0">
               <a:latin typeface="Georgia" panose="02040502050405020303" pitchFamily="18" charset="0"/>
@@ -15826,7 +15907,19 @@
               <a:rPr lang="es-ES" sz="4000" dirty="0">
                 <a:latin typeface="Georgia" panose="02040502050405020303" pitchFamily="18" charset="0"/>
               </a:rPr>
-              <a:t>Resumen de la Gestión Riesgos II</a:t>
+              <a:t>Resumen de la Gestión </a:t>
+            </a:r>
+            <a:r>
+              <a:rPr lang="es-ES" sz="4000" dirty="0" smtClean="0">
+                <a:latin typeface="Georgia" panose="02040502050405020303" pitchFamily="18" charset="0"/>
+              </a:rPr>
+              <a:t>de Riesgos </a:t>
+            </a:r>
+            <a:r>
+              <a:rPr lang="es-ES" sz="4000" dirty="0">
+                <a:latin typeface="Georgia" panose="02040502050405020303" pitchFamily="18" charset="0"/>
+              </a:rPr>
+              <a:t>II</a:t>
             </a:r>
           </a:p>
         </p:txBody>
@@ -15845,7 +15938,7 @@
         </p:nvSpPr>
         <p:spPr>
           <a:xfrm>
-            <a:off x="1593277" y="1275018"/>
+            <a:off x="1593277" y="1649095"/>
             <a:ext cx="8159240" cy="1015663"/>
           </a:xfrm>
           <a:prstGeom prst="rect">
@@ -15895,14 +15988,14 @@
           <p:nvPr>
             <p:extLst>
               <p:ext uri="{D42A27DB-BD31-4B8C-83A1-F6EECF244321}">
-                <p14:modId xmlns:p14="http://schemas.microsoft.com/office/powerpoint/2010/main" val="1557697573"/>
+                <p14:modId xmlns:p14="http://schemas.microsoft.com/office/powerpoint/2010/main" val="1005187938"/>
               </p:ext>
             </p:extLst>
           </p:nvPr>
         </p:nvGraphicFramePr>
         <p:xfrm>
-          <a:off x="1694231" y="1879832"/>
-          <a:ext cx="10239798" cy="4480560"/>
+          <a:off x="1694231" y="2544854"/>
+          <a:ext cx="10239798" cy="3017520"/>
         </p:xfrm>
         <a:graphic>
           <a:graphicData uri="http://schemas.openxmlformats.org/drawingml/2006/table">
@@ -16002,20 +16095,29 @@
                     <a:bodyPr/>
                     <a:lstStyle/>
                     <a:p>
+                      <a:pPr marL="0" marR="0" lvl="0" indent="0" algn="l" defTabSz="457200" rtl="0" eaLnBrk="1" fontAlgn="auto" latinLnBrk="0" hangingPunct="1">
+                        <a:lnSpc>
+                          <a:spcPct val="100000"/>
+                        </a:lnSpc>
+                        <a:spcBef>
+                          <a:spcPts val="0"/>
+                        </a:spcBef>
+                        <a:spcAft>
+                          <a:spcPts val="0"/>
+                        </a:spcAft>
+                        <a:buClrTx/>
+                        <a:buSzTx/>
+                        <a:buFontTx/>
+                        <a:buNone/>
+                        <a:tabLst/>
+                        <a:defRPr/>
+                      </a:pPr>
                       <a:r>
-                        <a:rPr lang="es-AR" dirty="0"/>
-                        <a:t>No poder implementar la aplicación móvil debido a la falta de experiencia de los integrantes en el desarrollo de aplicaciones móviles con </a:t>
+                        <a:rPr lang="es-AR" dirty="0" smtClean="0"/>
+                        <a:t>No se realicen reuniones con el equipo docente, una vez finalizada la cursada para mostrar avances del proyecto y/o  realizar consultas. </a:t>
                       </a:r>
                       <a:r>
-                        <a:rPr lang="es-AR" dirty="0" err="1"/>
-                        <a:t>Ionic</a:t>
-                      </a:r>
-                      <a:r>
-                        <a:rPr lang="es-AR" dirty="0"/>
-                        <a:t>. </a:t>
-                      </a:r>
-                      <a:r>
-                        <a:rPr lang="es-AR" b="1" dirty="0"/>
+                        <a:rPr lang="es-AR" b="1" dirty="0" smtClean="0"/>
                         <a:t>Eliminado</a:t>
                       </a:r>
                     </a:p>
@@ -16028,15 +16130,26 @@
                     <a:lstStyle/>
                     <a:p>
                       <a:r>
-                        <a:rPr lang="es-AR" dirty="0"/>
-                        <a:t>La memoria del proyecto no sea de agrado para el equipo docente.</a:t>
+                        <a:rPr lang="es-AR" dirty="0" smtClean="0"/>
+                        <a:t>No recibir</a:t>
                       </a:r>
-                    </a:p>
-                    <a:p>
                       <a:r>
-                        <a:rPr lang="es-AR" b="1" dirty="0"/>
+                        <a:rPr lang="es-AR" baseline="0" dirty="0" smtClean="0"/>
+                        <a:t> la aprobación de la memoria por parte del equipo docente, esto imposibilitaría poder  rendir la asignatura en Diciembre</a:t>
+                      </a:r>
+                      <a:r>
+                        <a:rPr lang="es-AR" dirty="0" smtClean="0"/>
+                        <a:t>.</a:t>
+                      </a:r>
+                      <a:r>
+                        <a:rPr lang="es-AR" baseline="0" dirty="0"/>
+                        <a:t> </a:t>
+                      </a:r>
+                      <a:r>
+                        <a:rPr lang="es-AR" b="1" dirty="0" smtClean="0"/>
                         <a:t>Eliminado</a:t>
                       </a:r>
+                      <a:endParaRPr lang="es-AR" b="1" dirty="0"/>
                     </a:p>
                   </a:txBody>
                   <a:tcPr/>
@@ -16044,57 +16157,6 @@
                 <a:extLst>
                   <a:ext uri="{0D108BD9-81ED-4DB2-BD59-A6C34878D82A}">
                     <a16:rowId xmlns:a16="http://schemas.microsoft.com/office/drawing/2014/main" val="369058642"/>
-                  </a:ext>
-                </a:extLst>
-              </a:tr>
-              <a:tr h="990984">
-                <a:tc>
-                  <a:txBody>
-                    <a:bodyPr/>
-                    <a:lstStyle/>
-                    <a:p>
-                      <a:r>
-                        <a:rPr lang="es-AR" dirty="0"/>
-                        <a:t>El proceso de firmas de los programas de asignaturas no esté definido por completo. </a:t>
-                      </a:r>
-                      <a:r>
-                        <a:rPr lang="es-AR" b="1" dirty="0"/>
-                        <a:t>Eliminado</a:t>
-                      </a:r>
-                    </a:p>
-                  </a:txBody>
-                  <a:tcPr/>
-                </a:tc>
-                <a:tc>
-                  <a:txBody>
-                    <a:bodyPr/>
-                    <a:lstStyle/>
-                    <a:p>
-                      <a:r>
-                        <a:rPr lang="es-AR" dirty="0"/>
-                        <a:t>No se realicen reuniones con el equipo docente, una vez finalizada la cursada para mostrar avances del proyecto y/o  realizar consultas. </a:t>
-                      </a:r>
-                      <a:r>
-                        <a:rPr lang="es-AR" b="1" dirty="0"/>
-                        <a:t>Eliminado</a:t>
-                      </a:r>
-                    </a:p>
-                  </a:txBody>
-                  <a:tcPr/>
-                </a:tc>
-                <a:tc>
-                  <a:txBody>
-                    <a:bodyPr/>
-                    <a:lstStyle/>
-                    <a:p>
-                      <a:endParaRPr lang="es-AR" dirty="0"/>
-                    </a:p>
-                  </a:txBody>
-                  <a:tcPr/>
-                </a:tc>
-                <a:extLst>
-                  <a:ext uri="{0D108BD9-81ED-4DB2-BD59-A6C34878D82A}">
-                    <a16:rowId xmlns:a16="http://schemas.microsoft.com/office/drawing/2014/main" val="2013989916"/>
                   </a:ext>
                 </a:extLst>
               </a:tr>
@@ -16167,38 +16229,6 @@
                     <a:bodyPr/>
                     <a:lstStyle/>
                     <a:p>
-                      <a:r>
-                        <a:rPr lang="es-AR" dirty="0">
-                          <a:solidFill>
-                            <a:srgbClr val="FF0000"/>
-                          </a:solidFill>
-                        </a:rPr>
-                        <a:t>Nota:</a:t>
-                      </a:r>
-                      <a:r>
-                        <a:rPr lang="es-AR" baseline="0" dirty="0">
-                          <a:solidFill>
-                            <a:srgbClr val="FF0000"/>
-                          </a:solidFill>
-                        </a:rPr>
-                        <a:t> Seguramente mencionare dos riesgos por etapa si no </a:t>
-                      </a:r>
-                      <a:r>
-                        <a:rPr lang="es-AR" baseline="0">
-                          <a:solidFill>
-                            <a:srgbClr val="FF0000"/>
-                          </a:solidFill>
-                        </a:rPr>
-                        <a:t>es mucho, lo </a:t>
-                      </a:r>
-                      <a:r>
-                        <a:rPr lang="es-AR" baseline="0" dirty="0">
-                          <a:solidFill>
-                            <a:srgbClr val="FF0000"/>
-                          </a:solidFill>
-                        </a:rPr>
-                        <a:t>deje por las dudas</a:t>
-                      </a:r>
                       <a:endParaRPr lang="es-AR" dirty="0">
                         <a:solidFill>
                           <a:srgbClr val="FF0000"/>
@@ -18342,7 +18372,7 @@
         <p:spPr>
           <a:xfrm>
             <a:off x="1607992" y="1757878"/>
-            <a:ext cx="4732724" cy="5016758"/>
+            <a:ext cx="4732724" cy="4401205"/>
           </a:xfrm>
           <a:prstGeom prst="rect">
             <a:avLst/>
@@ -18476,44 +18506,17 @@
             </a:pPr>
             <a:r>
               <a:rPr lang="es-ES" sz="2000" b="0" i="0" u="none" strike="noStrike" baseline="0" dirty="0">
-                <a:solidFill>
-                  <a:srgbClr val="FF0000"/>
-                </a:solidFill>
                 <a:latin typeface="Georgia" panose="02040502050405020303" pitchFamily="18" charset="0"/>
               </a:rPr>
-              <a:t>Control sobre programas disponibles y notificaciones enviadas (yo dejaría esto y </a:t>
-            </a:r>
-            <a:r>
-              <a:rPr lang="es-ES" sz="2000" b="0" i="0" u="none" strike="noStrike" baseline="0" dirty="0" err="1">
-                <a:solidFill>
-                  <a:srgbClr val="FF0000"/>
-                </a:solidFill>
+              <a:t>Control sobre programas disponibles y notificaciones </a:t>
+            </a:r>
+            <a:r>
+              <a:rPr lang="es-ES" sz="2000" b="0" i="0" u="none" strike="noStrike" baseline="0" dirty="0" smtClean="0">
                 <a:latin typeface="Georgia" panose="02040502050405020303" pitchFamily="18" charset="0"/>
               </a:rPr>
-              <a:t>sacaria</a:t>
-            </a:r>
-            <a:r>
-              <a:rPr lang="es-ES" sz="2000" b="0" i="0" u="none" strike="noStrike" baseline="0" dirty="0">
-                <a:solidFill>
-                  <a:srgbClr val="FF0000"/>
-                </a:solidFill>
-                <a:latin typeface="Georgia" panose="02040502050405020303" pitchFamily="18" charset="0"/>
-              </a:rPr>
-              <a:t> el punto de arriba </a:t>
-            </a:r>
-            <a:r>
-              <a:rPr lang="es-ES" sz="2000" b="0" i="0" u="none" strike="noStrike" baseline="0">
-                <a:solidFill>
-                  <a:srgbClr val="FF0000"/>
-                </a:solidFill>
-                <a:latin typeface="Georgia" panose="02040502050405020303" pitchFamily="18" charset="0"/>
-              </a:rPr>
-              <a:t>de ultima)</a:t>
+              <a:t>enviadas</a:t>
             </a:r>
             <a:endParaRPr lang="es-AR" sz="2000" dirty="0">
-              <a:solidFill>
-                <a:srgbClr val="FF0000"/>
-              </a:solidFill>
               <a:latin typeface="Georgia" panose="02040502050405020303" pitchFamily="18" charset="0"/>
             </a:endParaRPr>
           </a:p>
@@ -21701,7 +21704,7 @@
         <p:spPr>
           <a:xfrm>
             <a:off x="2469776" y="1950620"/>
-            <a:ext cx="7252447" cy="2862322"/>
+            <a:ext cx="7252447" cy="2246769"/>
           </a:xfrm>
           <a:prstGeom prst="rect">
             <a:avLst/>
@@ -21729,9 +21732,6 @@
             </a:pPr>
             <a:r>
               <a:rPr lang="es-ES" sz="2000" b="0" i="0" u="none" strike="noStrike" baseline="0" dirty="0">
-                <a:solidFill>
-                  <a:srgbClr val="FF0000"/>
-                </a:solidFill>
                 <a:latin typeface="Georgia" panose="02040502050405020303" pitchFamily="18" charset="0"/>
               </a:rPr>
               <a:t>Cambio de Proyecto</a:t>
@@ -21751,37 +21751,16 @@
               <a:buChar char="•"/>
             </a:pPr>
             <a:r>
-              <a:rPr lang="es-ES" sz="2000" dirty="0">
-                <a:solidFill>
-                  <a:srgbClr val="FF0000"/>
-                </a:solidFill>
+              <a:rPr lang="es-ES" sz="2000" b="0" i="0" u="none" strike="noStrike" baseline="0" dirty="0" smtClean="0">
                 <a:latin typeface="Georgia" panose="02040502050405020303" pitchFamily="18" charset="0"/>
               </a:rPr>
-              <a:t>Cursada exitosa </a:t>
-            </a:r>
-            <a:endParaRPr lang="es-ES" sz="2000" dirty="0">
-              <a:solidFill>
-                <a:srgbClr val="FF0000"/>
-              </a:solidFill>
-              <a:latin typeface="Georgia" panose="02040502050405020303" pitchFamily="18" charset="0"/>
-              <a:sym typeface="Wingdings" panose="05000000000000000000" pitchFamily="2" charset="2"/>
-            </a:endParaRPr>
-          </a:p>
-          <a:p>
-            <a:endParaRPr lang="es-ES" sz="2000" b="0" i="0" u="none" strike="noStrike" baseline="0" dirty="0">
-              <a:latin typeface="Georgia" panose="02040502050405020303" pitchFamily="18" charset="0"/>
-            </a:endParaRPr>
-          </a:p>
-          <a:p>
-            <a:pPr marL="342900" indent="-342900">
-              <a:buFont typeface="Arial" panose="020B0604020202020204" pitchFamily="34" charset="0"/>
-              <a:buChar char="•"/>
-            </a:pPr>
+              <a:t>Contacto </a:t>
+            </a:r>
             <a:r>
               <a:rPr lang="es-ES" sz="2000" b="0" i="0" u="none" strike="noStrike" baseline="0" dirty="0">
                 <a:latin typeface="Georgia" panose="02040502050405020303" pitchFamily="18" charset="0"/>
               </a:rPr>
-              <a:t>Contacto mediante correo electrónico por nuestra aplicación móvil</a:t>
+              <a:t>mediante correo electrónico por nuestra aplicación móvil</a:t>
             </a:r>
           </a:p>
           <a:p>

</xml_diff>

<commit_message>
- Actualización de la presentación final.
</commit_message>
<xml_diff>
--- a/Presentaciones/Presentación VASPA - Diciembre 2020 - Examen Final/Presentación VASPA - Diciembre 2020 - Examen Final.pptx
+++ b/Presentaciones/Presentación VASPA - Diciembre 2020 - Examen Final/Presentación VASPA - Diciembre 2020 - Examen Final.pptx
@@ -142,7 +142,7 @@
   </p:defaultTextStyle>
   <p:extLst>
     <p:ext uri="{EFAFB233-063F-42B5-8137-9DF3F51BA10A}">
-      <p15:sldGuideLst xmlns:p15="http://schemas.microsoft.com/office/powerpoint/2012/main">
+      <p15:sldGuideLst xmlns:p15="http://schemas.microsoft.com/office/powerpoint/2012/main" xmlns="">
         <p15:guide id="1" orient="horz" pos="2160">
           <p15:clr>
             <a:srgbClr val="A4A3A4"/>
@@ -160,18 +160,8 @@
 </file>
 
 <file path=ppt/charts/chart1.xml><?xml version="1.0" encoding="utf-8"?>
-<c:chartSpace xmlns:c="http://schemas.openxmlformats.org/drawingml/2006/chart" xmlns:a="http://schemas.openxmlformats.org/drawingml/2006/main" xmlns:r="http://schemas.openxmlformats.org/officeDocument/2006/relationships" xmlns:c16r2="http://schemas.microsoft.com/office/drawing/2015/06/chart">
-  <c:date1904 val="0"/>
-  <c:lang val="es-ES"/>
-  <c:roundedCorners val="0"/>
-  <mc:AlternateContent xmlns:mc="http://schemas.openxmlformats.org/markup-compatibility/2006">
-    <mc:Choice xmlns:c14="http://schemas.microsoft.com/office/drawing/2007/8/2/chart" Requires="c14">
-      <c14:style val="102"/>
-    </mc:Choice>
-    <mc:Fallback>
-      <c:style val="2"/>
-    </mc:Fallback>
-  </mc:AlternateContent>
+<c:chartSpace xmlns:c="http://schemas.openxmlformats.org/drawingml/2006/chart" xmlns:a="http://schemas.openxmlformats.org/drawingml/2006/main" xmlns:r="http://schemas.openxmlformats.org/officeDocument/2006/relationships">
+  <c:lang val="es-AR"/>
   <c:chart>
     <c:title>
       <c:tx>
@@ -204,7 +194,7 @@
           </a:p>
         </c:rich>
       </c:tx>
-      <c:overlay val="0"/>
+      <c:layout/>
       <c:spPr>
         <a:noFill/>
         <a:ln>
@@ -213,12 +203,10 @@
         <a:effectLst/>
       </c:spPr>
     </c:title>
-    <c:autoTitleDeleted val="0"/>
     <c:plotArea>
       <c:layout/>
       <c:lineChart>
         <c:grouping val="standard"/>
-        <c:varyColors val="0"/>
         <c:ser>
           <c:idx val="0"/>
           <c:order val="0"/>
@@ -344,8 +332,7 @@
               </c:numCache>
             </c:numRef>
           </c:val>
-          <c:smooth val="0"/>
-          <c:extLst>
+          <c:extLst xmlns:c16r2="http://schemas.microsoft.com/office/drawing/2015/06/chart">
             <c:ext xmlns:c16="http://schemas.microsoft.com/office/drawing/2014/chart" uri="{C3380CC4-5D6E-409C-BE32-E72D297353CC}">
               <c16:uniqueId val="{00000000-38D4-4551-A2C0-6F470BC3E09B}"/>
             </c:ext>
@@ -455,7 +442,7 @@
                   <c:v>65.569999999999993</c:v>
                 </c:pt>
                 <c:pt idx="5">
-                  <c:v>50.849999999999994</c:v>
+                  <c:v>50.85</c:v>
                 </c:pt>
                 <c:pt idx="6">
                   <c:v>46.42</c:v>
@@ -464,7 +451,7 @@
                   <c:v>24.419999999999987</c:v>
                 </c:pt>
                 <c:pt idx="8">
-                  <c:v>10.850000000000012</c:v>
+                  <c:v>10.850000000000014</c:v>
                 </c:pt>
                 <c:pt idx="9">
                   <c:v>6.42</c:v>
@@ -475,36 +462,25 @@
               </c:numCache>
             </c:numRef>
           </c:val>
-          <c:smooth val="0"/>
-          <c:extLst>
+          <c:extLst xmlns:c16r2="http://schemas.microsoft.com/office/drawing/2015/06/chart">
             <c:ext xmlns:c16="http://schemas.microsoft.com/office/drawing/2014/chart" uri="{C3380CC4-5D6E-409C-BE32-E72D297353CC}">
               <c16:uniqueId val="{00000001-38D4-4551-A2C0-6F470BC3E09B}"/>
             </c:ext>
           </c:extLst>
         </c:ser>
-        <c:dLbls>
-          <c:showLegendKey val="0"/>
-          <c:showVal val="0"/>
-          <c:showCatName val="0"/>
-          <c:showSerName val="0"/>
-          <c:showPercent val="0"/>
-          <c:showBubbleSize val="0"/>
-        </c:dLbls>
+        <c:dLbls/>
         <c:marker val="1"/>
-        <c:smooth val="0"/>
-        <c:axId val="90199168"/>
-        <c:axId val="90200704"/>
+        <c:axId val="78987648"/>
+        <c:axId val="78989184"/>
       </c:lineChart>
       <c:dateAx>
-        <c:axId val="90199168"/>
+        <c:axId val="78987648"/>
         <c:scaling>
           <c:orientation val="minMax"/>
         </c:scaling>
-        <c:delete val="0"/>
         <c:axPos val="b"/>
         <c:numFmt formatCode="m/d/yyyy" sourceLinked="1"/>
         <c:majorTickMark val="none"/>
-        <c:minorTickMark val="none"/>
         <c:tickLblPos val="nextTo"/>
         <c:spPr>
           <a:noFill/>
@@ -539,18 +515,17 @@
             <a:endParaRPr lang="es-AR"/>
           </a:p>
         </c:txPr>
-        <c:crossAx val="90200704"/>
+        <c:crossAx val="78989184"/>
         <c:crosses val="autoZero"/>
         <c:auto val="1"/>
         <c:lblOffset val="100"/>
         <c:baseTimeUnit val="days"/>
       </c:dateAx>
       <c:valAx>
-        <c:axId val="90200704"/>
+        <c:axId val="78989184"/>
         <c:scaling>
           <c:orientation val="minMax"/>
         </c:scaling>
-        <c:delete val="0"/>
         <c:axPos val="l"/>
         <c:majorGridlines>
           <c:spPr>
@@ -568,7 +543,6 @@
         </c:majorGridlines>
         <c:numFmt formatCode="General" sourceLinked="1"/>
         <c:majorTickMark val="none"/>
-        <c:minorTickMark val="none"/>
         <c:tickLblPos val="nextTo"/>
         <c:spPr>
           <a:noFill/>
@@ -597,7 +571,7 @@
             <a:endParaRPr lang="es-AR"/>
           </a:p>
         </c:txPr>
-        <c:crossAx val="90199168"/>
+        <c:crossAx val="78987648"/>
         <c:crosses val="autoZero"/>
         <c:crossBetween val="between"/>
       </c:valAx>
@@ -611,7 +585,7 @@
     </c:plotArea>
     <c:legend>
       <c:legendPos val="b"/>
-      <c:overlay val="0"/>
+      <c:layout/>
       <c:spPr>
         <a:noFill/>
         <a:ln>
@@ -642,14 +616,13 @@
     </c:legend>
     <c:plotVisOnly val="1"/>
     <c:dispBlanksAs val="gap"/>
-    <c:extLst>
+    <c:extLst xmlns:c16r2="http://schemas.microsoft.com/office/drawing/2015/06/chart">
       <c:ext xmlns:c16r3="http://schemas.microsoft.com/office/drawing/2017/03/chart" uri="{56B9EC1D-385E-4148-901F-78D8002777C0}">
         <c16r3:dataDisplayOptions16>
           <c16r3:dispNaAsBlank val="1"/>
         </c16r3:dataDisplayOptions16>
       </c:ext>
     </c:extLst>
-    <c:showDLblsOverMax val="0"/>
   </c:chart>
   <c:spPr>
     <a:solidFill>
@@ -676,9 +649,7 @@
       <a:endParaRPr lang="es-AR"/>
     </a:p>
   </c:txPr>
-  <c:externalData r:id="rId1">
-    <c:autoUpdate val="0"/>
-  </c:externalData>
+  <c:externalData r:id="rId1"/>
   <c:userShapes r:id="rId2"/>
 </c:chartSpace>
 </file>
@@ -2408,6 +2379,13 @@
         </dgm:presLayoutVars>
       </dgm:prSet>
       <dgm:spPr/>
+      <dgm:t>
+        <a:bodyPr/>
+        <a:lstStyle/>
+        <a:p>
+          <a:endParaRPr lang="es-AR"/>
+        </a:p>
+      </dgm:t>
     </dgm:pt>
     <dgm:pt modelId="{3D5C674D-195F-4346-A602-68D809648B83}" type="pres">
       <dgm:prSet presAssocID="{853FF75D-08FD-4C0B-97FF-B95C5121D1D7}" presName="parTxOnly" presStyleLbl="node1" presStyleIdx="0" presStyleCnt="4">
@@ -2418,6 +2396,13 @@
         </dgm:presLayoutVars>
       </dgm:prSet>
       <dgm:spPr/>
+      <dgm:t>
+        <a:bodyPr/>
+        <a:lstStyle/>
+        <a:p>
+          <a:endParaRPr lang="es-AR"/>
+        </a:p>
+      </dgm:t>
     </dgm:pt>
     <dgm:pt modelId="{4DCC4052-4221-44D0-84E2-29AAAD96FCB3}" type="pres">
       <dgm:prSet presAssocID="{888E8F23-D971-4F49-AF2A-2D3F7847711C}" presName="parTxOnlySpace" presStyleCnt="0"/>
@@ -2432,6 +2417,13 @@
         </dgm:presLayoutVars>
       </dgm:prSet>
       <dgm:spPr/>
+      <dgm:t>
+        <a:bodyPr/>
+        <a:lstStyle/>
+        <a:p>
+          <a:endParaRPr lang="es-AR"/>
+        </a:p>
+      </dgm:t>
     </dgm:pt>
     <dgm:pt modelId="{A6E2C1E9-D2ED-47B3-A71D-FDA80BA4D0C1}" type="pres">
       <dgm:prSet presAssocID="{431F7064-B371-4D30-9440-9276B420E393}" presName="parTxOnlySpace" presStyleCnt="0"/>
@@ -2446,6 +2438,13 @@
         </dgm:presLayoutVars>
       </dgm:prSet>
       <dgm:spPr/>
+      <dgm:t>
+        <a:bodyPr/>
+        <a:lstStyle/>
+        <a:p>
+          <a:endParaRPr lang="es-AR"/>
+        </a:p>
+      </dgm:t>
     </dgm:pt>
     <dgm:pt modelId="{FA28285D-C85B-47E5-8E04-E3031E7EB070}" type="pres">
       <dgm:prSet presAssocID="{50E5B106-8092-4055-AC3C-E16AB9A8A632}" presName="parTxOnlySpace" presStyleCnt="0"/>
@@ -2460,17 +2459,24 @@
         </dgm:presLayoutVars>
       </dgm:prSet>
       <dgm:spPr/>
+      <dgm:t>
+        <a:bodyPr/>
+        <a:lstStyle/>
+        <a:p>
+          <a:endParaRPr lang="es-AR"/>
+        </a:p>
+      </dgm:t>
     </dgm:pt>
   </dgm:ptLst>
   <dgm:cxnLst>
     <dgm:cxn modelId="{7D2F0A27-3D8B-4128-8CB3-A82F5F34B1DA}" type="presOf" srcId="{3B4EE390-B919-49DE-81BE-0780A08DDBFA}" destId="{AEA2C0A0-0FCA-4EB1-AA5B-89E50BC14E35}" srcOrd="0" destOrd="0" presId="urn:microsoft.com/office/officeart/2005/8/layout/chevron1"/>
+    <dgm:cxn modelId="{5E7AA7A8-CA8D-46F6-8417-A9E8900910E7}" type="presOf" srcId="{07D852F8-DC80-412E-99FF-CBC8CF6E9E53}" destId="{BB3205ED-EB8F-4AA2-A69D-916A25FD317F}" srcOrd="0" destOrd="0" presId="urn:microsoft.com/office/officeart/2005/8/layout/chevron1"/>
+    <dgm:cxn modelId="{24BDC4C3-8E68-4ABC-A0DA-A0FE0C4BE3D4}" srcId="{07D852F8-DC80-412E-99FF-CBC8CF6E9E53}" destId="{3E85E467-C11E-426F-9200-FC251BE43DEA}" srcOrd="1" destOrd="0" parTransId="{83EB3A9D-25F1-42C7-AA54-1B46554184BF}" sibTransId="{431F7064-B371-4D30-9440-9276B420E393}"/>
     <dgm:cxn modelId="{C846122C-05FD-4C41-8444-CC3A300BDFFE}" srcId="{07D852F8-DC80-412E-99FF-CBC8CF6E9E53}" destId="{853FF75D-08FD-4C0B-97FF-B95C5121D1D7}" srcOrd="0" destOrd="0" parTransId="{BD4839AE-4C9F-4F18-92E9-4B1323829560}" sibTransId="{888E8F23-D971-4F49-AF2A-2D3F7847711C}"/>
+    <dgm:cxn modelId="{403E4FC9-6B5A-4E42-8B00-B4A63F0B56C0}" type="presOf" srcId="{3E85E467-C11E-426F-9200-FC251BE43DEA}" destId="{6886AB32-2506-433F-9563-157CC1EA1348}" srcOrd="0" destOrd="0" presId="urn:microsoft.com/office/officeart/2005/8/layout/chevron1"/>
     <dgm:cxn modelId="{49728C46-9AF0-4404-B77C-0BF8753B1BE2}" srcId="{07D852F8-DC80-412E-99FF-CBC8CF6E9E53}" destId="{3B4EE390-B919-49DE-81BE-0780A08DDBFA}" srcOrd="2" destOrd="0" parTransId="{3B1FF57E-AA55-4079-B104-9BCA769CA707}" sibTransId="{50E5B106-8092-4055-AC3C-E16AB9A8A632}"/>
     <dgm:cxn modelId="{D7B69E66-919E-4FAC-945E-964D8A3AC565}" type="presOf" srcId="{FE8D9DF2-8BC9-4E07-8005-D845C397B55E}" destId="{09B459DE-37E0-4270-82CB-D68CAF9A376E}" srcOrd="0" destOrd="0" presId="urn:microsoft.com/office/officeart/2005/8/layout/chevron1"/>
     <dgm:cxn modelId="{D76B3C6A-BC4F-4872-BB7B-7982459BAA86}" type="presOf" srcId="{853FF75D-08FD-4C0B-97FF-B95C5121D1D7}" destId="{3D5C674D-195F-4346-A602-68D809648B83}" srcOrd="0" destOrd="0" presId="urn:microsoft.com/office/officeart/2005/8/layout/chevron1"/>
-    <dgm:cxn modelId="{5E7AA7A8-CA8D-46F6-8417-A9E8900910E7}" type="presOf" srcId="{07D852F8-DC80-412E-99FF-CBC8CF6E9E53}" destId="{BB3205ED-EB8F-4AA2-A69D-916A25FD317F}" srcOrd="0" destOrd="0" presId="urn:microsoft.com/office/officeart/2005/8/layout/chevron1"/>
-    <dgm:cxn modelId="{24BDC4C3-8E68-4ABC-A0DA-A0FE0C4BE3D4}" srcId="{07D852F8-DC80-412E-99FF-CBC8CF6E9E53}" destId="{3E85E467-C11E-426F-9200-FC251BE43DEA}" srcOrd="1" destOrd="0" parTransId="{83EB3A9D-25F1-42C7-AA54-1B46554184BF}" sibTransId="{431F7064-B371-4D30-9440-9276B420E393}"/>
-    <dgm:cxn modelId="{403E4FC9-6B5A-4E42-8B00-B4A63F0B56C0}" type="presOf" srcId="{3E85E467-C11E-426F-9200-FC251BE43DEA}" destId="{6886AB32-2506-433F-9563-157CC1EA1348}" srcOrd="0" destOrd="0" presId="urn:microsoft.com/office/officeart/2005/8/layout/chevron1"/>
     <dgm:cxn modelId="{61C2D7D0-DEE2-4010-B64E-4D1FEDBA0702}" srcId="{07D852F8-DC80-412E-99FF-CBC8CF6E9E53}" destId="{FE8D9DF2-8BC9-4E07-8005-D845C397B55E}" srcOrd="3" destOrd="0" parTransId="{5B8A1B7E-67AD-4057-819C-2245EC4F7AC4}" sibTransId="{5B54ED7F-A264-47E6-96E6-7D075AA7F363}"/>
     <dgm:cxn modelId="{2F515B5D-54B1-4237-891D-39EC55794076}" type="presParOf" srcId="{BB3205ED-EB8F-4AA2-A69D-916A25FD317F}" destId="{3D5C674D-195F-4346-A602-68D809648B83}" srcOrd="0" destOrd="0" presId="urn:microsoft.com/office/officeart/2005/8/layout/chevron1"/>
     <dgm:cxn modelId="{624BFC5C-F915-4A8E-B04A-57BF8C238C73}" type="presParOf" srcId="{BB3205ED-EB8F-4AA2-A69D-916A25FD317F}" destId="{4DCC4052-4221-44D0-84E2-29AAAD96FCB3}" srcOrd="1" destOrd="0" presId="urn:microsoft.com/office/officeart/2005/8/layout/chevron1"/>
@@ -2484,7 +2490,7 @@
   <dgm:whole/>
   <dgm:extLst>
     <a:ext uri="http://schemas.microsoft.com/office/drawing/2008/diagram">
-      <dsp:dataModelExt xmlns:dsp="http://schemas.microsoft.com/office/drawing/2008/diagram" relId="rId6" minVer="http://schemas.openxmlformats.org/drawingml/2006/diagram"/>
+      <dsp:dataModelExt xmlns:dsp="http://schemas.microsoft.com/office/drawing/2008/diagram" xmlns="" relId="rId6" minVer="http://schemas.openxmlformats.org/drawingml/2006/diagram"/>
     </a:ext>
   </dgm:extLst>
 </dgm:dataModel>
@@ -2505,7 +2511,22 @@
       </dgm:t>
     </dgm:pt>
     <dgm:pt modelId="{853FF75D-08FD-4C0B-97FF-B95C5121D1D7}">
-      <dgm:prSet phldrT="[Texto]"/>
+      <dgm:prSet phldrT="[Texto]">
+        <dgm:style>
+          <a:lnRef idx="0">
+            <a:schemeClr val="accent1"/>
+          </a:lnRef>
+          <a:fillRef idx="3">
+            <a:schemeClr val="accent1"/>
+          </a:fillRef>
+          <a:effectRef idx="3">
+            <a:schemeClr val="accent1"/>
+          </a:effectRef>
+          <a:fontRef idx="minor">
+            <a:schemeClr val="lt1"/>
+          </a:fontRef>
+        </dgm:style>
+      </dgm:prSet>
       <dgm:spPr/>
       <dgm:t>
         <a:bodyPr/>
@@ -2542,7 +2563,22 @@
       </dgm:t>
     </dgm:pt>
     <dgm:pt modelId="{3E85E467-C11E-426F-9200-FC251BE43DEA}">
-      <dgm:prSet phldrT="[Texto]"/>
+      <dgm:prSet phldrT="[Texto]">
+        <dgm:style>
+          <a:lnRef idx="0">
+            <a:schemeClr val="accent3"/>
+          </a:lnRef>
+          <a:fillRef idx="3">
+            <a:schemeClr val="accent3"/>
+          </a:fillRef>
+          <a:effectRef idx="3">
+            <a:schemeClr val="accent3"/>
+          </a:effectRef>
+          <a:fontRef idx="minor">
+            <a:schemeClr val="lt1"/>
+          </a:fontRef>
+        </dgm:style>
+      </dgm:prSet>
       <dgm:spPr/>
       <dgm:t>
         <a:bodyPr/>
@@ -2579,7 +2615,22 @@
       </dgm:t>
     </dgm:pt>
     <dgm:pt modelId="{3B4EE390-B919-49DE-81BE-0780A08DDBFA}">
-      <dgm:prSet phldrT="[Texto]"/>
+      <dgm:prSet phldrT="[Texto]">
+        <dgm:style>
+          <a:lnRef idx="0">
+            <a:schemeClr val="accent1"/>
+          </a:lnRef>
+          <a:fillRef idx="3">
+            <a:schemeClr val="accent1"/>
+          </a:fillRef>
+          <a:effectRef idx="3">
+            <a:schemeClr val="accent1"/>
+          </a:effectRef>
+          <a:fontRef idx="minor">
+            <a:schemeClr val="lt1"/>
+          </a:fontRef>
+        </dgm:style>
+      </dgm:prSet>
       <dgm:spPr/>
       <dgm:t>
         <a:bodyPr/>
@@ -2616,7 +2667,22 @@
       </dgm:t>
     </dgm:pt>
     <dgm:pt modelId="{FE8D9DF2-8BC9-4E07-8005-D845C397B55E}">
-      <dgm:prSet phldrT="[Texto]"/>
+      <dgm:prSet phldrT="[Texto]">
+        <dgm:style>
+          <a:lnRef idx="0">
+            <a:schemeClr val="accent3"/>
+          </a:lnRef>
+          <a:fillRef idx="3">
+            <a:schemeClr val="accent3"/>
+          </a:fillRef>
+          <a:effectRef idx="3">
+            <a:schemeClr val="accent3"/>
+          </a:effectRef>
+          <a:fontRef idx="minor">
+            <a:schemeClr val="lt1"/>
+          </a:fontRef>
+        </dgm:style>
+      </dgm:prSet>
       <dgm:spPr/>
       <dgm:t>
         <a:bodyPr/>
@@ -2661,6 +2727,13 @@
         </dgm:presLayoutVars>
       </dgm:prSet>
       <dgm:spPr/>
+      <dgm:t>
+        <a:bodyPr/>
+        <a:lstStyle/>
+        <a:p>
+          <a:endParaRPr lang="es-AR"/>
+        </a:p>
+      </dgm:t>
     </dgm:pt>
     <dgm:pt modelId="{3D5C674D-195F-4346-A602-68D809648B83}" type="pres">
       <dgm:prSet presAssocID="{853FF75D-08FD-4C0B-97FF-B95C5121D1D7}" presName="parTxOnly" presStyleLbl="node1" presStyleIdx="0" presStyleCnt="4">
@@ -2671,6 +2744,13 @@
         </dgm:presLayoutVars>
       </dgm:prSet>
       <dgm:spPr/>
+      <dgm:t>
+        <a:bodyPr/>
+        <a:lstStyle/>
+        <a:p>
+          <a:endParaRPr lang="es-AR"/>
+        </a:p>
+      </dgm:t>
     </dgm:pt>
     <dgm:pt modelId="{4DCC4052-4221-44D0-84E2-29AAAD96FCB3}" type="pres">
       <dgm:prSet presAssocID="{888E8F23-D971-4F49-AF2A-2D3F7847711C}" presName="parTxOnlySpace" presStyleCnt="0"/>
@@ -2685,6 +2765,13 @@
         </dgm:presLayoutVars>
       </dgm:prSet>
       <dgm:spPr/>
+      <dgm:t>
+        <a:bodyPr/>
+        <a:lstStyle/>
+        <a:p>
+          <a:endParaRPr lang="es-AR"/>
+        </a:p>
+      </dgm:t>
     </dgm:pt>
     <dgm:pt modelId="{A6E2C1E9-D2ED-47B3-A71D-FDA80BA4D0C1}" type="pres">
       <dgm:prSet presAssocID="{431F7064-B371-4D30-9440-9276B420E393}" presName="parTxOnlySpace" presStyleCnt="0"/>
@@ -2699,6 +2786,13 @@
         </dgm:presLayoutVars>
       </dgm:prSet>
       <dgm:spPr/>
+      <dgm:t>
+        <a:bodyPr/>
+        <a:lstStyle/>
+        <a:p>
+          <a:endParaRPr lang="es-AR"/>
+        </a:p>
+      </dgm:t>
     </dgm:pt>
     <dgm:pt modelId="{FA28285D-C85B-47E5-8E04-E3031E7EB070}" type="pres">
       <dgm:prSet presAssocID="{50E5B106-8092-4055-AC3C-E16AB9A8A632}" presName="parTxOnlySpace" presStyleCnt="0"/>
@@ -2713,17 +2807,24 @@
         </dgm:presLayoutVars>
       </dgm:prSet>
       <dgm:spPr/>
+      <dgm:t>
+        <a:bodyPr/>
+        <a:lstStyle/>
+        <a:p>
+          <a:endParaRPr lang="es-AR"/>
+        </a:p>
+      </dgm:t>
     </dgm:pt>
   </dgm:ptLst>
   <dgm:cxnLst>
     <dgm:cxn modelId="{7D2F0A27-3D8B-4128-8CB3-A82F5F34B1DA}" type="presOf" srcId="{3B4EE390-B919-49DE-81BE-0780A08DDBFA}" destId="{AEA2C0A0-0FCA-4EB1-AA5B-89E50BC14E35}" srcOrd="0" destOrd="0" presId="urn:microsoft.com/office/officeart/2005/8/layout/chevron1"/>
+    <dgm:cxn modelId="{5E7AA7A8-CA8D-46F6-8417-A9E8900910E7}" type="presOf" srcId="{07D852F8-DC80-412E-99FF-CBC8CF6E9E53}" destId="{BB3205ED-EB8F-4AA2-A69D-916A25FD317F}" srcOrd="0" destOrd="0" presId="urn:microsoft.com/office/officeart/2005/8/layout/chevron1"/>
+    <dgm:cxn modelId="{24BDC4C3-8E68-4ABC-A0DA-A0FE0C4BE3D4}" srcId="{07D852F8-DC80-412E-99FF-CBC8CF6E9E53}" destId="{3E85E467-C11E-426F-9200-FC251BE43DEA}" srcOrd="1" destOrd="0" parTransId="{83EB3A9D-25F1-42C7-AA54-1B46554184BF}" sibTransId="{431F7064-B371-4D30-9440-9276B420E393}"/>
     <dgm:cxn modelId="{C846122C-05FD-4C41-8444-CC3A300BDFFE}" srcId="{07D852F8-DC80-412E-99FF-CBC8CF6E9E53}" destId="{853FF75D-08FD-4C0B-97FF-B95C5121D1D7}" srcOrd="0" destOrd="0" parTransId="{BD4839AE-4C9F-4F18-92E9-4B1323829560}" sibTransId="{888E8F23-D971-4F49-AF2A-2D3F7847711C}"/>
+    <dgm:cxn modelId="{403E4FC9-6B5A-4E42-8B00-B4A63F0B56C0}" type="presOf" srcId="{3E85E467-C11E-426F-9200-FC251BE43DEA}" destId="{6886AB32-2506-433F-9563-157CC1EA1348}" srcOrd="0" destOrd="0" presId="urn:microsoft.com/office/officeart/2005/8/layout/chevron1"/>
     <dgm:cxn modelId="{49728C46-9AF0-4404-B77C-0BF8753B1BE2}" srcId="{07D852F8-DC80-412E-99FF-CBC8CF6E9E53}" destId="{3B4EE390-B919-49DE-81BE-0780A08DDBFA}" srcOrd="2" destOrd="0" parTransId="{3B1FF57E-AA55-4079-B104-9BCA769CA707}" sibTransId="{50E5B106-8092-4055-AC3C-E16AB9A8A632}"/>
     <dgm:cxn modelId="{D7B69E66-919E-4FAC-945E-964D8A3AC565}" type="presOf" srcId="{FE8D9DF2-8BC9-4E07-8005-D845C397B55E}" destId="{09B459DE-37E0-4270-82CB-D68CAF9A376E}" srcOrd="0" destOrd="0" presId="urn:microsoft.com/office/officeart/2005/8/layout/chevron1"/>
     <dgm:cxn modelId="{D76B3C6A-BC4F-4872-BB7B-7982459BAA86}" type="presOf" srcId="{853FF75D-08FD-4C0B-97FF-B95C5121D1D7}" destId="{3D5C674D-195F-4346-A602-68D809648B83}" srcOrd="0" destOrd="0" presId="urn:microsoft.com/office/officeart/2005/8/layout/chevron1"/>
-    <dgm:cxn modelId="{5E7AA7A8-CA8D-46F6-8417-A9E8900910E7}" type="presOf" srcId="{07D852F8-DC80-412E-99FF-CBC8CF6E9E53}" destId="{BB3205ED-EB8F-4AA2-A69D-916A25FD317F}" srcOrd="0" destOrd="0" presId="urn:microsoft.com/office/officeart/2005/8/layout/chevron1"/>
-    <dgm:cxn modelId="{24BDC4C3-8E68-4ABC-A0DA-A0FE0C4BE3D4}" srcId="{07D852F8-DC80-412E-99FF-CBC8CF6E9E53}" destId="{3E85E467-C11E-426F-9200-FC251BE43DEA}" srcOrd="1" destOrd="0" parTransId="{83EB3A9D-25F1-42C7-AA54-1B46554184BF}" sibTransId="{431F7064-B371-4D30-9440-9276B420E393}"/>
-    <dgm:cxn modelId="{403E4FC9-6B5A-4E42-8B00-B4A63F0B56C0}" type="presOf" srcId="{3E85E467-C11E-426F-9200-FC251BE43DEA}" destId="{6886AB32-2506-433F-9563-157CC1EA1348}" srcOrd="0" destOrd="0" presId="urn:microsoft.com/office/officeart/2005/8/layout/chevron1"/>
     <dgm:cxn modelId="{61C2D7D0-DEE2-4010-B64E-4D1FEDBA0702}" srcId="{07D852F8-DC80-412E-99FF-CBC8CF6E9E53}" destId="{FE8D9DF2-8BC9-4E07-8005-D845C397B55E}" srcOrd="3" destOrd="0" parTransId="{5B8A1B7E-67AD-4057-819C-2245EC4F7AC4}" sibTransId="{5B54ED7F-A264-47E6-96E6-7D075AA7F363}"/>
     <dgm:cxn modelId="{2F515B5D-54B1-4237-891D-39EC55794076}" type="presParOf" srcId="{BB3205ED-EB8F-4AA2-A69D-916A25FD317F}" destId="{3D5C674D-195F-4346-A602-68D809648B83}" srcOrd="0" destOrd="0" presId="urn:microsoft.com/office/officeart/2005/8/layout/chevron1"/>
     <dgm:cxn modelId="{624BFC5C-F915-4A8E-B04A-57BF8C238C73}" type="presParOf" srcId="{BB3205ED-EB8F-4AA2-A69D-916A25FD317F}" destId="{4DCC4052-4221-44D0-84E2-29AAAD96FCB3}" srcOrd="1" destOrd="0" presId="urn:microsoft.com/office/officeart/2005/8/layout/chevron1"/>
@@ -2737,14 +2838,14 @@
   <dgm:whole/>
   <dgm:extLst>
     <a:ext uri="http://schemas.microsoft.com/office/drawing/2008/diagram">
-      <dsp:dataModelExt xmlns:dsp="http://schemas.microsoft.com/office/drawing/2008/diagram" relId="rId6" minVer="http://schemas.openxmlformats.org/drawingml/2006/diagram"/>
+      <dsp:dataModelExt xmlns:dsp="http://schemas.microsoft.com/office/drawing/2008/diagram" xmlns="" relId="rId6" minVer="http://schemas.openxmlformats.org/drawingml/2006/diagram"/>
     </a:ext>
   </dgm:extLst>
 </dgm:dataModel>
 </file>
 
 <file path=ppt/diagrams/drawing1.xml><?xml version="1.0" encoding="utf-8"?>
-<dsp:drawing xmlns:dgm="http://schemas.openxmlformats.org/drawingml/2006/diagram" xmlns:dsp="http://schemas.microsoft.com/office/drawing/2008/diagram" xmlns:a="http://schemas.openxmlformats.org/drawingml/2006/main">
+<dsp:drawing xmlns:dgm="http://schemas.openxmlformats.org/drawingml/2006/diagram" xmlns:a="http://schemas.openxmlformats.org/drawingml/2006/main" xmlns:dsp="http://schemas.microsoft.com/office/drawing/2008/diagram">
   <dsp:spTree>
     <dsp:nvGrpSpPr>
       <dsp:cNvPr id="0" name=""/>
@@ -2825,7 +2926,7 @@
         </a:bodyPr>
         <a:lstStyle/>
         <a:p>
-          <a:pPr marL="0" lvl="0" indent="0" algn="ctr" defTabSz="755650">
+          <a:pPr lvl="0" algn="ctr" defTabSz="755650">
             <a:lnSpc>
               <a:spcPct val="90000"/>
             </a:lnSpc>
@@ -2835,7 +2936,6 @@
             <a:spcAft>
               <a:spcPct val="35000"/>
             </a:spcAft>
-            <a:buNone/>
           </a:pPr>
           <a:r>
             <a:rPr lang="es-ES" sz="1700" kern="1200" dirty="0"/>
@@ -2845,8 +2945,8 @@
         </a:p>
       </dsp:txBody>
       <dsp:txXfrm>
-        <a:off x="442714" y="2190952"/>
-        <a:ext cx="1316831" cy="877887"/>
+        <a:off x="3770" y="2190952"/>
+        <a:ext cx="2194718" cy="877887"/>
       </dsp:txXfrm>
     </dsp:sp>
     <dsp:sp modelId="{6886AB32-2506-433F-9563-157CC1EA1348}">
@@ -2923,7 +3023,7 @@
         </a:bodyPr>
         <a:lstStyle/>
         <a:p>
-          <a:pPr marL="0" lvl="0" indent="0" algn="ctr" defTabSz="755650">
+          <a:pPr lvl="0" algn="ctr" defTabSz="755650">
             <a:lnSpc>
               <a:spcPct val="90000"/>
             </a:lnSpc>
@@ -2933,7 +3033,6 @@
             <a:spcAft>
               <a:spcPct val="35000"/>
             </a:spcAft>
-            <a:buNone/>
           </a:pPr>
           <a:r>
             <a:rPr lang="es-ES" sz="1700" kern="1200" dirty="0"/>
@@ -2943,8 +3042,8 @@
         </a:p>
       </dsp:txBody>
       <dsp:txXfrm>
-        <a:off x="2417961" y="2190952"/>
-        <a:ext cx="1316831" cy="877887"/>
+        <a:off x="1979017" y="2190952"/>
+        <a:ext cx="2194718" cy="877887"/>
       </dsp:txXfrm>
     </dsp:sp>
     <dsp:sp modelId="{AEA2C0A0-0FCA-4EB1-AA5B-89E50BC14E35}">
@@ -3021,7 +3120,7 @@
         </a:bodyPr>
         <a:lstStyle/>
         <a:p>
-          <a:pPr marL="0" lvl="0" indent="0" algn="ctr" defTabSz="755650">
+          <a:pPr lvl="0" algn="ctr" defTabSz="755650">
             <a:lnSpc>
               <a:spcPct val="90000"/>
             </a:lnSpc>
@@ -3031,7 +3130,6 @@
             <a:spcAft>
               <a:spcPct val="35000"/>
             </a:spcAft>
-            <a:buNone/>
           </a:pPr>
           <a:r>
             <a:rPr lang="es-ES" sz="1700" kern="1200" dirty="0"/>
@@ -3041,8 +3139,8 @@
         </a:p>
       </dsp:txBody>
       <dsp:txXfrm>
-        <a:off x="4393208" y="2190952"/>
-        <a:ext cx="1316831" cy="877887"/>
+        <a:off x="3954264" y="2190952"/>
+        <a:ext cx="2194718" cy="877887"/>
       </dsp:txXfrm>
     </dsp:sp>
     <dsp:sp modelId="{09B459DE-37E0-4270-82CB-D68CAF9A376E}">
@@ -3119,7 +3217,7 @@
         </a:bodyPr>
         <a:lstStyle/>
         <a:p>
-          <a:pPr marL="0" lvl="0" indent="0" algn="ctr" defTabSz="755650">
+          <a:pPr lvl="0" algn="ctr" defTabSz="755650">
             <a:lnSpc>
               <a:spcPct val="90000"/>
             </a:lnSpc>
@@ -3129,7 +3227,6 @@
             <a:spcAft>
               <a:spcPct val="35000"/>
             </a:spcAft>
-            <a:buNone/>
           </a:pPr>
           <a:r>
             <a:rPr lang="es-ES" sz="1700" kern="1200" dirty="0"/>
@@ -3139,8 +3236,8 @@
         </a:p>
       </dsp:txBody>
       <dsp:txXfrm>
-        <a:off x="6368454" y="2190952"/>
-        <a:ext cx="1316831" cy="877887"/>
+        <a:off x="5929510" y="2190952"/>
+        <a:ext cx="2194718" cy="877887"/>
       </dsp:txXfrm>
     </dsp:sp>
   </dsp:spTree>
@@ -3148,7 +3245,7 @@
 </file>
 
 <file path=ppt/diagrams/drawing2.xml><?xml version="1.0" encoding="utf-8"?>
-<dsp:drawing xmlns:dgm="http://schemas.openxmlformats.org/drawingml/2006/diagram" xmlns:dsp="http://schemas.microsoft.com/office/drawing/2008/diagram" xmlns:a="http://schemas.openxmlformats.org/drawingml/2006/main">
+<dsp:drawing xmlns:dgm="http://schemas.openxmlformats.org/drawingml/2006/diagram" xmlns:a="http://schemas.openxmlformats.org/drawingml/2006/main" xmlns:dsp="http://schemas.microsoft.com/office/drawing/2008/diagram">
   <dsp:spTree>
     <dsp:nvGrpSpPr>
       <dsp:cNvPr id="0" name=""/>
@@ -3168,24 +3265,16 @@
         <a:prstGeom prst="chevron">
           <a:avLst/>
         </a:prstGeom>
-        <a:gradFill rotWithShape="0">
+        <a:gradFill rotWithShape="1">
           <a:gsLst>
             <a:gs pos="0">
               <a:schemeClr val="accent1">
-                <a:hueOff val="0"/>
-                <a:satOff val="0"/>
-                <a:lumOff val="0"/>
-                <a:alphaOff val="0"/>
                 <a:tint val="96000"/>
                 <a:lumMod val="102000"/>
               </a:schemeClr>
             </a:gs>
             <a:gs pos="100000">
               <a:schemeClr val="accent1">
-                <a:hueOff val="0"/>
-                <a:satOff val="0"/>
-                <a:lumOff val="0"/>
-                <a:alphaOff val="0"/>
                 <a:shade val="88000"/>
                 <a:lumMod val="94000"/>
               </a:schemeClr>
@@ -3199,18 +3288,33 @@
           <a:noFill/>
         </a:ln>
         <a:effectLst>
-          <a:reflection blurRad="12700" stA="26000" endPos="32000" dist="12700" dir="5400000" sy="-100000" rotWithShape="0"/>
+          <a:outerShdw blurRad="38100" dist="25400" dir="5400000" rotWithShape="0">
+            <a:srgbClr val="000000">
+              <a:alpha val="64000"/>
+            </a:srgbClr>
+          </a:outerShdw>
         </a:effectLst>
+        <a:scene3d>
+          <a:camera prst="orthographicFront">
+            <a:rot lat="0" lon="0" rev="0"/>
+          </a:camera>
+          <a:lightRig rig="threePt" dir="tl">
+            <a:rot lat="0" lon="0" rev="1200000"/>
+          </a:lightRig>
+        </a:scene3d>
+        <a:sp3d>
+          <a:bevelT w="25400" h="12700"/>
+        </a:sp3d>
       </dsp:spPr>
       <dsp:style>
         <a:lnRef idx="0">
-          <a:scrgbClr r="0" g="0" b="0"/>
+          <a:schemeClr val="accent1"/>
         </a:lnRef>
         <a:fillRef idx="3">
-          <a:scrgbClr r="0" g="0" b="0"/>
+          <a:schemeClr val="accent1"/>
         </a:fillRef>
-        <a:effectRef idx="2">
-          <a:scrgbClr r="0" g="0" b="0"/>
+        <a:effectRef idx="3">
+          <a:schemeClr val="accent1"/>
         </a:effectRef>
         <a:fontRef idx="minor">
           <a:schemeClr val="lt1"/>
@@ -3222,7 +3326,7 @@
         </a:bodyPr>
         <a:lstStyle/>
         <a:p>
-          <a:pPr marL="0" lvl="0" indent="0" algn="ctr" defTabSz="755650">
+          <a:pPr lvl="0" algn="ctr" defTabSz="755650">
             <a:lnSpc>
               <a:spcPct val="90000"/>
             </a:lnSpc>
@@ -3232,7 +3336,6 @@
             <a:spcAft>
               <a:spcPct val="35000"/>
             </a:spcAft>
-            <a:buNone/>
           </a:pPr>
           <a:r>
             <a:rPr lang="es-ES" sz="1700" kern="1200" dirty="0"/>
@@ -3242,8 +3345,8 @@
         </a:p>
       </dsp:txBody>
       <dsp:txXfrm>
-        <a:off x="442714" y="2190952"/>
-        <a:ext cx="1316831" cy="877887"/>
+        <a:off x="3770" y="2190952"/>
+        <a:ext cx="2194718" cy="877887"/>
       </dsp:txXfrm>
     </dsp:sp>
     <dsp:sp modelId="{6886AB32-2506-433F-9563-157CC1EA1348}">
@@ -3259,24 +3362,16 @@
         <a:prstGeom prst="chevron">
           <a:avLst/>
         </a:prstGeom>
-        <a:gradFill rotWithShape="0">
+        <a:gradFill rotWithShape="1">
           <a:gsLst>
             <a:gs pos="0">
-              <a:schemeClr val="accent1">
-                <a:hueOff val="0"/>
-                <a:satOff val="0"/>
-                <a:lumOff val="0"/>
-                <a:alphaOff val="0"/>
+              <a:schemeClr val="accent3">
                 <a:tint val="96000"/>
                 <a:lumMod val="102000"/>
               </a:schemeClr>
             </a:gs>
             <a:gs pos="100000">
-              <a:schemeClr val="accent1">
-                <a:hueOff val="0"/>
-                <a:satOff val="0"/>
-                <a:lumOff val="0"/>
-                <a:alphaOff val="0"/>
+              <a:schemeClr val="accent3">
                 <a:shade val="88000"/>
                 <a:lumMod val="94000"/>
               </a:schemeClr>
@@ -3290,18 +3385,33 @@
           <a:noFill/>
         </a:ln>
         <a:effectLst>
-          <a:reflection blurRad="12700" stA="26000" endPos="32000" dist="12700" dir="5400000" sy="-100000" rotWithShape="0"/>
+          <a:outerShdw blurRad="38100" dist="25400" dir="5400000" rotWithShape="0">
+            <a:srgbClr val="000000">
+              <a:alpha val="64000"/>
+            </a:srgbClr>
+          </a:outerShdw>
         </a:effectLst>
+        <a:scene3d>
+          <a:camera prst="orthographicFront">
+            <a:rot lat="0" lon="0" rev="0"/>
+          </a:camera>
+          <a:lightRig rig="threePt" dir="tl">
+            <a:rot lat="0" lon="0" rev="1200000"/>
+          </a:lightRig>
+        </a:scene3d>
+        <a:sp3d>
+          <a:bevelT w="25400" h="12700"/>
+        </a:sp3d>
       </dsp:spPr>
       <dsp:style>
         <a:lnRef idx="0">
-          <a:scrgbClr r="0" g="0" b="0"/>
+          <a:schemeClr val="accent3"/>
         </a:lnRef>
         <a:fillRef idx="3">
-          <a:scrgbClr r="0" g="0" b="0"/>
+          <a:schemeClr val="accent3"/>
         </a:fillRef>
-        <a:effectRef idx="2">
-          <a:scrgbClr r="0" g="0" b="0"/>
+        <a:effectRef idx="3">
+          <a:schemeClr val="accent3"/>
         </a:effectRef>
         <a:fontRef idx="minor">
           <a:schemeClr val="lt1"/>
@@ -3313,7 +3423,7 @@
         </a:bodyPr>
         <a:lstStyle/>
         <a:p>
-          <a:pPr marL="0" lvl="0" indent="0" algn="ctr" defTabSz="755650">
+          <a:pPr lvl="0" algn="ctr" defTabSz="755650">
             <a:lnSpc>
               <a:spcPct val="90000"/>
             </a:lnSpc>
@@ -3323,7 +3433,6 @@
             <a:spcAft>
               <a:spcPct val="35000"/>
             </a:spcAft>
-            <a:buNone/>
           </a:pPr>
           <a:r>
             <a:rPr lang="es-ES" sz="1700" kern="1200" dirty="0"/>
@@ -3333,8 +3442,8 @@
         </a:p>
       </dsp:txBody>
       <dsp:txXfrm>
-        <a:off x="2417961" y="2190952"/>
-        <a:ext cx="1316831" cy="877887"/>
+        <a:off x="1979017" y="2190952"/>
+        <a:ext cx="2194718" cy="877887"/>
       </dsp:txXfrm>
     </dsp:sp>
     <dsp:sp modelId="{AEA2C0A0-0FCA-4EB1-AA5B-89E50BC14E35}">
@@ -3350,24 +3459,16 @@
         <a:prstGeom prst="chevron">
           <a:avLst/>
         </a:prstGeom>
-        <a:gradFill rotWithShape="0">
+        <a:gradFill rotWithShape="1">
           <a:gsLst>
             <a:gs pos="0">
               <a:schemeClr val="accent1">
-                <a:hueOff val="0"/>
-                <a:satOff val="0"/>
-                <a:lumOff val="0"/>
-                <a:alphaOff val="0"/>
                 <a:tint val="96000"/>
                 <a:lumMod val="102000"/>
               </a:schemeClr>
             </a:gs>
             <a:gs pos="100000">
               <a:schemeClr val="accent1">
-                <a:hueOff val="0"/>
-                <a:satOff val="0"/>
-                <a:lumOff val="0"/>
-                <a:alphaOff val="0"/>
                 <a:shade val="88000"/>
                 <a:lumMod val="94000"/>
               </a:schemeClr>
@@ -3381,18 +3482,33 @@
           <a:noFill/>
         </a:ln>
         <a:effectLst>
-          <a:reflection blurRad="12700" stA="26000" endPos="32000" dist="12700" dir="5400000" sy="-100000" rotWithShape="0"/>
+          <a:outerShdw blurRad="38100" dist="25400" dir="5400000" rotWithShape="0">
+            <a:srgbClr val="000000">
+              <a:alpha val="64000"/>
+            </a:srgbClr>
+          </a:outerShdw>
         </a:effectLst>
+        <a:scene3d>
+          <a:camera prst="orthographicFront">
+            <a:rot lat="0" lon="0" rev="0"/>
+          </a:camera>
+          <a:lightRig rig="threePt" dir="tl">
+            <a:rot lat="0" lon="0" rev="1200000"/>
+          </a:lightRig>
+        </a:scene3d>
+        <a:sp3d>
+          <a:bevelT w="25400" h="12700"/>
+        </a:sp3d>
       </dsp:spPr>
       <dsp:style>
         <a:lnRef idx="0">
-          <a:scrgbClr r="0" g="0" b="0"/>
+          <a:schemeClr val="accent1"/>
         </a:lnRef>
         <a:fillRef idx="3">
-          <a:scrgbClr r="0" g="0" b="0"/>
+          <a:schemeClr val="accent1"/>
         </a:fillRef>
-        <a:effectRef idx="2">
-          <a:scrgbClr r="0" g="0" b="0"/>
+        <a:effectRef idx="3">
+          <a:schemeClr val="accent1"/>
         </a:effectRef>
         <a:fontRef idx="minor">
           <a:schemeClr val="lt1"/>
@@ -3404,7 +3520,7 @@
         </a:bodyPr>
         <a:lstStyle/>
         <a:p>
-          <a:pPr marL="0" lvl="0" indent="0" algn="ctr" defTabSz="755650">
+          <a:pPr lvl="0" algn="ctr" defTabSz="755650">
             <a:lnSpc>
               <a:spcPct val="90000"/>
             </a:lnSpc>
@@ -3414,7 +3530,6 @@
             <a:spcAft>
               <a:spcPct val="35000"/>
             </a:spcAft>
-            <a:buNone/>
           </a:pPr>
           <a:r>
             <a:rPr lang="es-ES" sz="1700" kern="1200" dirty="0"/>
@@ -3424,8 +3539,8 @@
         </a:p>
       </dsp:txBody>
       <dsp:txXfrm>
-        <a:off x="4393208" y="2190952"/>
-        <a:ext cx="1316831" cy="877887"/>
+        <a:off x="3954264" y="2190952"/>
+        <a:ext cx="2194718" cy="877887"/>
       </dsp:txXfrm>
     </dsp:sp>
     <dsp:sp modelId="{09B459DE-37E0-4270-82CB-D68CAF9A376E}">
@@ -3441,24 +3556,16 @@
         <a:prstGeom prst="chevron">
           <a:avLst/>
         </a:prstGeom>
-        <a:gradFill rotWithShape="0">
+        <a:gradFill rotWithShape="1">
           <a:gsLst>
             <a:gs pos="0">
-              <a:schemeClr val="accent1">
-                <a:hueOff val="0"/>
-                <a:satOff val="0"/>
-                <a:lumOff val="0"/>
-                <a:alphaOff val="0"/>
+              <a:schemeClr val="accent3">
                 <a:tint val="96000"/>
                 <a:lumMod val="102000"/>
               </a:schemeClr>
             </a:gs>
             <a:gs pos="100000">
-              <a:schemeClr val="accent1">
-                <a:hueOff val="0"/>
-                <a:satOff val="0"/>
-                <a:lumOff val="0"/>
-                <a:alphaOff val="0"/>
+              <a:schemeClr val="accent3">
                 <a:shade val="88000"/>
                 <a:lumMod val="94000"/>
               </a:schemeClr>
@@ -3472,18 +3579,33 @@
           <a:noFill/>
         </a:ln>
         <a:effectLst>
-          <a:reflection blurRad="12700" stA="26000" endPos="32000" dist="12700" dir="5400000" sy="-100000" rotWithShape="0"/>
+          <a:outerShdw blurRad="38100" dist="25400" dir="5400000" rotWithShape="0">
+            <a:srgbClr val="000000">
+              <a:alpha val="64000"/>
+            </a:srgbClr>
+          </a:outerShdw>
         </a:effectLst>
+        <a:scene3d>
+          <a:camera prst="orthographicFront">
+            <a:rot lat="0" lon="0" rev="0"/>
+          </a:camera>
+          <a:lightRig rig="threePt" dir="tl">
+            <a:rot lat="0" lon="0" rev="1200000"/>
+          </a:lightRig>
+        </a:scene3d>
+        <a:sp3d>
+          <a:bevelT w="25400" h="12700"/>
+        </a:sp3d>
       </dsp:spPr>
       <dsp:style>
         <a:lnRef idx="0">
-          <a:scrgbClr r="0" g="0" b="0"/>
+          <a:schemeClr val="accent3"/>
         </a:lnRef>
         <a:fillRef idx="3">
-          <a:scrgbClr r="0" g="0" b="0"/>
+          <a:schemeClr val="accent3"/>
         </a:fillRef>
-        <a:effectRef idx="2">
-          <a:scrgbClr r="0" g="0" b="0"/>
+        <a:effectRef idx="3">
+          <a:schemeClr val="accent3"/>
         </a:effectRef>
         <a:fontRef idx="minor">
           <a:schemeClr val="lt1"/>
@@ -3495,7 +3617,7 @@
         </a:bodyPr>
         <a:lstStyle/>
         <a:p>
-          <a:pPr marL="0" lvl="0" indent="0" algn="ctr" defTabSz="755650">
+          <a:pPr lvl="0" algn="ctr" defTabSz="755650">
             <a:lnSpc>
               <a:spcPct val="90000"/>
             </a:lnSpc>
@@ -3505,7 +3627,6 @@
             <a:spcAft>
               <a:spcPct val="35000"/>
             </a:spcAft>
-            <a:buNone/>
           </a:pPr>
           <a:r>
             <a:rPr lang="es-ES" sz="1700" kern="1200" dirty="0"/>
@@ -3515,8 +3636,8 @@
         </a:p>
       </dsp:txBody>
       <dsp:txXfrm>
-        <a:off x="6368454" y="2190952"/>
-        <a:ext cx="1316831" cy="877887"/>
+        <a:off x="5929510" y="2190952"/>
+        <a:ext cx="2194718" cy="877887"/>
       </dsp:txXfrm>
     </dsp:sp>
   </dsp:spTree>
@@ -6173,7 +6294,7 @@
         <cdr:cNvPr id="2" name="CuadroTexto 2">
           <a:extLst xmlns:a="http://schemas.openxmlformats.org/drawingml/2006/main">
             <a:ext uri="{FF2B5EF4-FFF2-40B4-BE49-F238E27FC236}">
-              <a16:creationId xmlns:a16="http://schemas.microsoft.com/office/drawing/2014/main" id="{29B4C296-372F-455A-BE5A-B512322B8EDE}"/>
+              <a16:creationId xmlns:a16="http://schemas.microsoft.com/office/drawing/2014/main" xmlns="" id="{29B4C296-372F-455A-BE5A-B512322B8EDE}"/>
             </a:ext>
           </a:extLst>
         </cdr:cNvPr>
@@ -6384,7 +6505,7 @@
             <a:fld id="{F55F861E-3C59-4235-9924-AE3FDF166F3F}" type="datetimeFigureOut">
               <a:rPr lang="es-AR" smtClean="0"/>
               <a:pPr/>
-              <a:t>7/12/2020</a:t>
+              <a:t>07/12/2020</a:t>
             </a:fld>
             <a:endParaRPr lang="es-AR"/>
           </a:p>
@@ -6553,7 +6674,7 @@
     </p:spTree>
     <p:extLst>
       <p:ext uri="{BB962C8B-B14F-4D97-AF65-F5344CB8AC3E}">
-        <p14:creationId xmlns:p14="http://schemas.microsoft.com/office/powerpoint/2010/main" val="1580866007"/>
+        <p14:creationId xmlns:p14="http://schemas.microsoft.com/office/powerpoint/2010/main" xmlns="" val="1580866007"/>
       </p:ext>
     </p:extLst>
   </p:cSld>
@@ -6728,7 +6849,7 @@
     </p:spTree>
     <p:extLst>
       <p:ext uri="{BB962C8B-B14F-4D97-AF65-F5344CB8AC3E}">
-        <p14:creationId xmlns:p14="http://schemas.microsoft.com/office/powerpoint/2010/main" val="966578479"/>
+        <p14:creationId xmlns:p14="http://schemas.microsoft.com/office/powerpoint/2010/main" xmlns="" val="966578479"/>
       </p:ext>
     </p:extLst>
   </p:cSld>
@@ -7241,7 +7362,7 @@
             <a:fld id="{59D4168E-E6F0-4E6D-9E98-0FBF44047F1D}" type="datetimeFigureOut">
               <a:rPr lang="es-AR" smtClean="0"/>
               <a:pPr/>
-              <a:t>7/12/2020</a:t>
+              <a:t>07/12/2020</a:t>
             </a:fld>
             <a:endParaRPr lang="es-AR"/>
           </a:p>
@@ -7300,7 +7421,7 @@
           <p:cNvPr id="8" name="Imagen 7">
             <a:extLst>
               <a:ext uri="{FF2B5EF4-FFF2-40B4-BE49-F238E27FC236}">
-                <a16:creationId xmlns:a16="http://schemas.microsoft.com/office/drawing/2014/main" id="{153E41C7-C0FB-4283-8821-79FB890C108B}"/>
+                <a16:creationId xmlns:a16="http://schemas.microsoft.com/office/drawing/2014/main" xmlns="" id="{153E41C7-C0FB-4283-8821-79FB890C108B}"/>
               </a:ext>
             </a:extLst>
           </p:cNvPr>
@@ -7313,7 +7434,7 @@
           <a:blip r:embed="rId2" cstate="print">
             <a:extLst>
               <a:ext uri="{28A0092B-C50C-407E-A947-70E740481C1C}">
-                <a14:useLocalDpi xmlns:a14="http://schemas.microsoft.com/office/drawing/2010/main" val="0"/>
+                <a14:useLocalDpi xmlns:a14="http://schemas.microsoft.com/office/drawing/2010/main" xmlns="" val="0"/>
               </a:ext>
             </a:extLst>
           </a:blip>
@@ -7334,7 +7455,7 @@
     </p:spTree>
     <p:extLst>
       <p:ext uri="{BB962C8B-B14F-4D97-AF65-F5344CB8AC3E}">
-        <p14:creationId xmlns:p14="http://schemas.microsoft.com/office/powerpoint/2010/main" val="594578851"/>
+        <p14:creationId xmlns:p14="http://schemas.microsoft.com/office/powerpoint/2010/main" xmlns="" val="594578851"/>
       </p:ext>
     </p:extLst>
   </p:cSld>
@@ -7575,7 +7696,7 @@
             <a:fld id="{59D4168E-E6F0-4E6D-9E98-0FBF44047F1D}" type="datetimeFigureOut">
               <a:rPr lang="es-AR" smtClean="0"/>
               <a:pPr/>
-              <a:t>7/12/2020</a:t>
+              <a:t>07/12/2020</a:t>
             </a:fld>
             <a:endParaRPr lang="es-AR"/>
           </a:p>
@@ -7627,7 +7748,7 @@
     </p:spTree>
     <p:extLst>
       <p:ext uri="{BB962C8B-B14F-4D97-AF65-F5344CB8AC3E}">
-        <p14:creationId xmlns:p14="http://schemas.microsoft.com/office/powerpoint/2010/main" val="2858870748"/>
+        <p14:creationId xmlns:p14="http://schemas.microsoft.com/office/powerpoint/2010/main" xmlns="" val="2858870748"/>
       </p:ext>
     </p:extLst>
   </p:cSld>
@@ -7825,7 +7946,7 @@
             <a:fld id="{59D4168E-E6F0-4E6D-9E98-0FBF44047F1D}" type="datetimeFigureOut">
               <a:rPr lang="es-AR" smtClean="0"/>
               <a:pPr/>
-              <a:t>7/12/2020</a:t>
+              <a:t>07/12/2020</a:t>
             </a:fld>
             <a:endParaRPr lang="es-AR"/>
           </a:p>
@@ -7877,7 +7998,7 @@
     </p:spTree>
     <p:extLst>
       <p:ext uri="{BB962C8B-B14F-4D97-AF65-F5344CB8AC3E}">
-        <p14:creationId xmlns:p14="http://schemas.microsoft.com/office/powerpoint/2010/main" val="2887001581"/>
+        <p14:creationId xmlns:p14="http://schemas.microsoft.com/office/powerpoint/2010/main" xmlns="" val="2887001581"/>
       </p:ext>
     </p:extLst>
   </p:cSld>
@@ -8367,7 +8488,7 @@
             <a:fld id="{59D4168E-E6F0-4E6D-9E98-0FBF44047F1D}" type="datetimeFigureOut">
               <a:rPr lang="es-AR" smtClean="0"/>
               <a:pPr/>
-              <a:t>7/12/2020</a:t>
+              <a:t>07/12/2020</a:t>
             </a:fld>
             <a:endParaRPr lang="es-AR"/>
           </a:p>
@@ -8419,7 +8540,7 @@
     </p:spTree>
     <p:extLst>
       <p:ext uri="{BB962C8B-B14F-4D97-AF65-F5344CB8AC3E}">
-        <p14:creationId xmlns:p14="http://schemas.microsoft.com/office/powerpoint/2010/main" val="953477666"/>
+        <p14:creationId xmlns:p14="http://schemas.microsoft.com/office/powerpoint/2010/main" xmlns="" val="953477666"/>
       </p:ext>
     </p:extLst>
   </p:cSld>
@@ -8617,7 +8738,7 @@
             <a:fld id="{59D4168E-E6F0-4E6D-9E98-0FBF44047F1D}" type="datetimeFigureOut">
               <a:rPr lang="es-AR" smtClean="0"/>
               <a:pPr/>
-              <a:t>7/12/2020</a:t>
+              <a:t>07/12/2020</a:t>
             </a:fld>
             <a:endParaRPr lang="es-AR"/>
           </a:p>
@@ -8669,7 +8790,7 @@
     </p:spTree>
     <p:extLst>
       <p:ext uri="{BB962C8B-B14F-4D97-AF65-F5344CB8AC3E}">
-        <p14:creationId xmlns:p14="http://schemas.microsoft.com/office/powerpoint/2010/main" val="2881036134"/>
+        <p14:creationId xmlns:p14="http://schemas.microsoft.com/office/powerpoint/2010/main" xmlns="" val="2881036134"/>
       </p:ext>
     </p:extLst>
   </p:cSld>
@@ -9151,7 +9272,7 @@
             <a:fld id="{59D4168E-E6F0-4E6D-9E98-0FBF44047F1D}" type="datetimeFigureOut">
               <a:rPr lang="es-AR" smtClean="0"/>
               <a:pPr/>
-              <a:t>7/12/2020</a:t>
+              <a:t>07/12/2020</a:t>
             </a:fld>
             <a:endParaRPr lang="es-AR"/>
           </a:p>
@@ -9203,7 +9324,7 @@
     </p:spTree>
     <p:extLst>
       <p:ext uri="{BB962C8B-B14F-4D97-AF65-F5344CB8AC3E}">
-        <p14:creationId xmlns:p14="http://schemas.microsoft.com/office/powerpoint/2010/main" val="3557333580"/>
+        <p14:creationId xmlns:p14="http://schemas.microsoft.com/office/powerpoint/2010/main" xmlns="" val="3557333580"/>
       </p:ext>
     </p:extLst>
   </p:cSld>
@@ -9450,7 +9571,7 @@
             <a:fld id="{59D4168E-E6F0-4E6D-9E98-0FBF44047F1D}" type="datetimeFigureOut">
               <a:rPr lang="es-AR" smtClean="0"/>
               <a:pPr/>
-              <a:t>7/12/2020</a:t>
+              <a:t>07/12/2020</a:t>
             </a:fld>
             <a:endParaRPr lang="es-AR"/>
           </a:p>
@@ -9502,7 +9623,7 @@
     </p:spTree>
     <p:extLst>
       <p:ext uri="{BB962C8B-B14F-4D97-AF65-F5344CB8AC3E}">
-        <p14:creationId xmlns:p14="http://schemas.microsoft.com/office/powerpoint/2010/main" val="2020671905"/>
+        <p14:creationId xmlns:p14="http://schemas.microsoft.com/office/powerpoint/2010/main" xmlns="" val="2020671905"/>
       </p:ext>
     </p:extLst>
   </p:cSld>
@@ -9626,7 +9747,7 @@
             <a:fld id="{59D4168E-E6F0-4E6D-9E98-0FBF44047F1D}" type="datetimeFigureOut">
               <a:rPr lang="es-AR" smtClean="0"/>
               <a:pPr/>
-              <a:t>7/12/2020</a:t>
+              <a:t>07/12/2020</a:t>
             </a:fld>
             <a:endParaRPr lang="es-AR"/>
           </a:p>
@@ -9678,7 +9799,7 @@
     </p:spTree>
     <p:extLst>
       <p:ext uri="{BB962C8B-B14F-4D97-AF65-F5344CB8AC3E}">
-        <p14:creationId xmlns:p14="http://schemas.microsoft.com/office/powerpoint/2010/main" val="3698065381"/>
+        <p14:creationId xmlns:p14="http://schemas.microsoft.com/office/powerpoint/2010/main" xmlns="" val="3698065381"/>
       </p:ext>
     </p:extLst>
   </p:cSld>
@@ -9808,7 +9929,7 @@
             <a:fld id="{59D4168E-E6F0-4E6D-9E98-0FBF44047F1D}" type="datetimeFigureOut">
               <a:rPr lang="es-AR" smtClean="0"/>
               <a:pPr/>
-              <a:t>7/12/2020</a:t>
+              <a:t>07/12/2020</a:t>
             </a:fld>
             <a:endParaRPr lang="es-AR"/>
           </a:p>
@@ -9860,7 +9981,7 @@
     </p:spTree>
     <p:extLst>
       <p:ext uri="{BB962C8B-B14F-4D97-AF65-F5344CB8AC3E}">
-        <p14:creationId xmlns:p14="http://schemas.microsoft.com/office/powerpoint/2010/main" val="2361575083"/>
+        <p14:creationId xmlns:p14="http://schemas.microsoft.com/office/powerpoint/2010/main" xmlns="" val="2361575083"/>
       </p:ext>
     </p:extLst>
   </p:cSld>
@@ -9986,7 +10107,7 @@
             <a:fld id="{59D4168E-E6F0-4E6D-9E98-0FBF44047F1D}" type="datetimeFigureOut">
               <a:rPr lang="es-AR" smtClean="0"/>
               <a:pPr/>
-              <a:t>7/12/2020</a:t>
+              <a:t>07/12/2020</a:t>
             </a:fld>
             <a:endParaRPr lang="es-AR"/>
           </a:p>
@@ -10045,7 +10166,7 @@
           <p:cNvPr id="8" name="Imagen 7">
             <a:extLst>
               <a:ext uri="{FF2B5EF4-FFF2-40B4-BE49-F238E27FC236}">
-                <a16:creationId xmlns:a16="http://schemas.microsoft.com/office/drawing/2014/main" id="{F65BAB47-52C5-4418-98C7-5ABDFBAB2220}"/>
+                <a16:creationId xmlns:a16="http://schemas.microsoft.com/office/drawing/2014/main" xmlns="" id="{F65BAB47-52C5-4418-98C7-5ABDFBAB2220}"/>
               </a:ext>
             </a:extLst>
           </p:cNvPr>
@@ -10058,7 +10179,7 @@
           <a:blip r:embed="rId2" cstate="print">
             <a:extLst>
               <a:ext uri="{28A0092B-C50C-407E-A947-70E740481C1C}">
-                <a14:useLocalDpi xmlns:a14="http://schemas.microsoft.com/office/drawing/2010/main" val="0"/>
+                <a14:useLocalDpi xmlns:a14="http://schemas.microsoft.com/office/drawing/2010/main" xmlns="" val="0"/>
               </a:ext>
             </a:extLst>
           </a:blip>
@@ -10079,7 +10200,7 @@
     </p:spTree>
     <p:extLst>
       <p:ext uri="{BB962C8B-B14F-4D97-AF65-F5344CB8AC3E}">
-        <p14:creationId xmlns:p14="http://schemas.microsoft.com/office/powerpoint/2010/main" val="3522170283"/>
+        <p14:creationId xmlns:p14="http://schemas.microsoft.com/office/powerpoint/2010/main" xmlns="" val="3522170283"/>
       </p:ext>
     </p:extLst>
   </p:cSld>
@@ -10275,7 +10396,7 @@
             <a:fld id="{59D4168E-E6F0-4E6D-9E98-0FBF44047F1D}" type="datetimeFigureOut">
               <a:rPr lang="es-AR" smtClean="0"/>
               <a:pPr/>
-              <a:t>7/12/2020</a:t>
+              <a:t>07/12/2020</a:t>
             </a:fld>
             <a:endParaRPr lang="es-AR"/>
           </a:p>
@@ -10327,7 +10448,7 @@
     </p:spTree>
     <p:extLst>
       <p:ext uri="{BB962C8B-B14F-4D97-AF65-F5344CB8AC3E}">
-        <p14:creationId xmlns:p14="http://schemas.microsoft.com/office/powerpoint/2010/main" val="2921707453"/>
+        <p14:creationId xmlns:p14="http://schemas.microsoft.com/office/powerpoint/2010/main" xmlns="" val="2921707453"/>
       </p:ext>
     </p:extLst>
   </p:cSld>
@@ -10574,7 +10695,7 @@
             <a:fld id="{59D4168E-E6F0-4E6D-9E98-0FBF44047F1D}" type="datetimeFigureOut">
               <a:rPr lang="es-AR" smtClean="0"/>
               <a:pPr/>
-              <a:t>7/12/2020</a:t>
+              <a:t>07/12/2020</a:t>
             </a:fld>
             <a:endParaRPr lang="es-AR"/>
           </a:p>
@@ -10626,7 +10747,7 @@
     </p:spTree>
     <p:extLst>
       <p:ext uri="{BB962C8B-B14F-4D97-AF65-F5344CB8AC3E}">
-        <p14:creationId xmlns:p14="http://schemas.microsoft.com/office/powerpoint/2010/main" val="1855319959"/>
+        <p14:creationId xmlns:p14="http://schemas.microsoft.com/office/powerpoint/2010/main" xmlns="" val="1855319959"/>
       </p:ext>
     </p:extLst>
   </p:cSld>
@@ -11018,7 +11139,7 @@
             <a:fld id="{59D4168E-E6F0-4E6D-9E98-0FBF44047F1D}" type="datetimeFigureOut">
               <a:rPr lang="es-AR" smtClean="0"/>
               <a:pPr/>
-              <a:t>7/12/2020</a:t>
+              <a:t>07/12/2020</a:t>
             </a:fld>
             <a:endParaRPr lang="es-AR"/>
           </a:p>
@@ -11070,7 +11191,7 @@
     </p:spTree>
     <p:extLst>
       <p:ext uri="{BB962C8B-B14F-4D97-AF65-F5344CB8AC3E}">
-        <p14:creationId xmlns:p14="http://schemas.microsoft.com/office/powerpoint/2010/main" val="522982594"/>
+        <p14:creationId xmlns:p14="http://schemas.microsoft.com/office/powerpoint/2010/main" xmlns="" val="522982594"/>
       </p:ext>
     </p:extLst>
   </p:cSld>
@@ -11138,7 +11259,7 @@
             <a:fld id="{59D4168E-E6F0-4E6D-9E98-0FBF44047F1D}" type="datetimeFigureOut">
               <a:rPr lang="es-AR" smtClean="0"/>
               <a:pPr/>
-              <a:t>7/12/2020</a:t>
+              <a:t>07/12/2020</a:t>
             </a:fld>
             <a:endParaRPr lang="es-AR"/>
           </a:p>
@@ -11190,7 +11311,7 @@
     </p:spTree>
     <p:extLst>
       <p:ext uri="{BB962C8B-B14F-4D97-AF65-F5344CB8AC3E}">
-        <p14:creationId xmlns:p14="http://schemas.microsoft.com/office/powerpoint/2010/main" val="3355991177"/>
+        <p14:creationId xmlns:p14="http://schemas.microsoft.com/office/powerpoint/2010/main" xmlns="" val="3355991177"/>
       </p:ext>
     </p:extLst>
   </p:cSld>
@@ -11235,7 +11356,7 @@
             <a:fld id="{59D4168E-E6F0-4E6D-9E98-0FBF44047F1D}" type="datetimeFigureOut">
               <a:rPr lang="es-AR" smtClean="0"/>
               <a:pPr/>
-              <a:t>7/12/2020</a:t>
+              <a:t>07/12/2020</a:t>
             </a:fld>
             <a:endParaRPr lang="es-AR"/>
           </a:p>
@@ -11287,7 +11408,7 @@
     </p:spTree>
     <p:extLst>
       <p:ext uri="{BB962C8B-B14F-4D97-AF65-F5344CB8AC3E}">
-        <p14:creationId xmlns:p14="http://schemas.microsoft.com/office/powerpoint/2010/main" val="2067178301"/>
+        <p14:creationId xmlns:p14="http://schemas.microsoft.com/office/powerpoint/2010/main" xmlns="" val="2067178301"/>
       </p:ext>
     </p:extLst>
   </p:cSld>
@@ -11520,7 +11641,7 @@
             <a:fld id="{59D4168E-E6F0-4E6D-9E98-0FBF44047F1D}" type="datetimeFigureOut">
               <a:rPr lang="es-AR" smtClean="0"/>
               <a:pPr/>
-              <a:t>7/12/2020</a:t>
+              <a:t>07/12/2020</a:t>
             </a:fld>
             <a:endParaRPr lang="es-AR"/>
           </a:p>
@@ -11572,7 +11693,7 @@
     </p:spTree>
     <p:extLst>
       <p:ext uri="{BB962C8B-B14F-4D97-AF65-F5344CB8AC3E}">
-        <p14:creationId xmlns:p14="http://schemas.microsoft.com/office/powerpoint/2010/main" val="1822716033"/>
+        <p14:creationId xmlns:p14="http://schemas.microsoft.com/office/powerpoint/2010/main" xmlns="" val="1822716033"/>
       </p:ext>
     </p:extLst>
   </p:cSld>
@@ -11813,7 +11934,7 @@
             <a:fld id="{59D4168E-E6F0-4E6D-9E98-0FBF44047F1D}" type="datetimeFigureOut">
               <a:rPr lang="es-AR" smtClean="0"/>
               <a:pPr/>
-              <a:t>7/12/2020</a:t>
+              <a:t>07/12/2020</a:t>
             </a:fld>
             <a:endParaRPr lang="es-AR"/>
           </a:p>
@@ -11865,7 +11986,7 @@
     </p:spTree>
     <p:extLst>
       <p:ext uri="{BB962C8B-B14F-4D97-AF65-F5344CB8AC3E}">
-        <p14:creationId xmlns:p14="http://schemas.microsoft.com/office/powerpoint/2010/main" val="2752311715"/>
+        <p14:creationId xmlns:p14="http://schemas.microsoft.com/office/powerpoint/2010/main" xmlns="" val="2752311715"/>
       </p:ext>
     </p:extLst>
   </p:cSld>
@@ -12345,7 +12466,7 @@
             <a:fld id="{59D4168E-E6F0-4E6D-9E98-0FBF44047F1D}" type="datetimeFigureOut">
               <a:rPr lang="es-AR" smtClean="0"/>
               <a:pPr/>
-              <a:t>7/12/2020</a:t>
+              <a:t>07/12/2020</a:t>
             </a:fld>
             <a:endParaRPr lang="es-AR"/>
           </a:p>
@@ -12433,7 +12554,7 @@
     </p:spTree>
     <p:extLst>
       <p:ext uri="{BB962C8B-B14F-4D97-AF65-F5344CB8AC3E}">
-        <p14:creationId xmlns:p14="http://schemas.microsoft.com/office/powerpoint/2010/main" val="761644953"/>
+        <p14:creationId xmlns:p14="http://schemas.microsoft.com/office/powerpoint/2010/main" xmlns="" val="761644953"/>
       </p:ext>
     </p:extLst>
   </p:cSld>
@@ -12882,7 +13003,7 @@
           <p:cNvPr id="2" name="Título 1">
             <a:extLst>
               <a:ext uri="{FF2B5EF4-FFF2-40B4-BE49-F238E27FC236}">
-                <a16:creationId xmlns:a16="http://schemas.microsoft.com/office/drawing/2014/main" id="{8CE1749D-25BE-4B8A-9C39-0568C1DB7176}"/>
+                <a16:creationId xmlns:a16="http://schemas.microsoft.com/office/drawing/2014/main" xmlns="" id="{8CE1749D-25BE-4B8A-9C39-0568C1DB7176}"/>
               </a:ext>
             </a:extLst>
           </p:cNvPr>
@@ -12917,7 +13038,7 @@
           <p:cNvPr id="5" name="Subtítulo 2">
             <a:extLst>
               <a:ext uri="{FF2B5EF4-FFF2-40B4-BE49-F238E27FC236}">
-                <a16:creationId xmlns:a16="http://schemas.microsoft.com/office/drawing/2014/main" id="{77C0998F-42B9-4F94-A4C5-FB800997D545}"/>
+                <a16:creationId xmlns:a16="http://schemas.microsoft.com/office/drawing/2014/main" xmlns="" id="{77C0998F-42B9-4F94-A4C5-FB800997D545}"/>
               </a:ext>
             </a:extLst>
           </p:cNvPr>
@@ -12954,7 +13075,7 @@
           <p:cNvPr id="3" name="CuadroTexto 2">
             <a:extLst>
               <a:ext uri="{FF2B5EF4-FFF2-40B4-BE49-F238E27FC236}">
-                <a16:creationId xmlns:a16="http://schemas.microsoft.com/office/drawing/2014/main" id="{EC53297C-9824-45B9-8927-A6834EB1DBD1}"/>
+                <a16:creationId xmlns:a16="http://schemas.microsoft.com/office/drawing/2014/main" xmlns="" id="{EC53297C-9824-45B9-8927-A6834EB1DBD1}"/>
               </a:ext>
             </a:extLst>
           </p:cNvPr>
@@ -13041,7 +13162,7 @@
           <p:cNvPr id="6" name="Imagen 5">
             <a:extLst>
               <a:ext uri="{FF2B5EF4-FFF2-40B4-BE49-F238E27FC236}">
-                <a16:creationId xmlns:a16="http://schemas.microsoft.com/office/drawing/2014/main" id="{765DC11C-9D6D-4F31-9AC7-1EFE6E6D455C}"/>
+                <a16:creationId xmlns:a16="http://schemas.microsoft.com/office/drawing/2014/main" xmlns="" id="{765DC11C-9D6D-4F31-9AC7-1EFE6E6D455C}"/>
               </a:ext>
             </a:extLst>
           </p:cNvPr>
@@ -13054,7 +13175,7 @@
           <a:blip r:embed="rId2" cstate="print">
             <a:extLst>
               <a:ext uri="{28A0092B-C50C-407E-A947-70E740481C1C}">
-                <a14:useLocalDpi xmlns:a14="http://schemas.microsoft.com/office/drawing/2010/main" val="0"/>
+                <a14:useLocalDpi xmlns:a14="http://schemas.microsoft.com/office/drawing/2010/main" xmlns="" val="0"/>
               </a:ext>
             </a:extLst>
           </a:blip>
@@ -13075,13 +13196,20 @@
     </p:spTree>
     <p:extLst>
       <p:ext uri="{BB962C8B-B14F-4D97-AF65-F5344CB8AC3E}">
-        <p14:creationId xmlns:p14="http://schemas.microsoft.com/office/powerpoint/2010/main" val="2967959437"/>
+        <p14:creationId xmlns:p14="http://schemas.microsoft.com/office/powerpoint/2010/main" xmlns="" val="2967959437"/>
       </p:ext>
     </p:extLst>
   </p:cSld>
   <p:clrMapOvr>
     <a:masterClrMapping/>
   </p:clrMapOvr>
+  <p:timing>
+    <p:tnLst>
+      <p:par>
+        <p:cTn id="1" dur="indefinite" restart="never" nodeType="tmRoot"/>
+      </p:par>
+    </p:tnLst>
+  </p:timing>
 </p:sld>
 </file>
 
@@ -13107,7 +13235,7 @@
           <p:cNvPr id="2" name="Título 1">
             <a:extLst>
               <a:ext uri="{FF2B5EF4-FFF2-40B4-BE49-F238E27FC236}">
-                <a16:creationId xmlns:a16="http://schemas.microsoft.com/office/drawing/2014/main" id="{0ED6D180-92C1-4333-BA91-2BBA4DD94A3B}"/>
+                <a16:creationId xmlns:a16="http://schemas.microsoft.com/office/drawing/2014/main" xmlns="" id="{0ED6D180-92C1-4333-BA91-2BBA4DD94A3B}"/>
               </a:ext>
             </a:extLst>
           </p:cNvPr>
@@ -13144,7 +13272,7 @@
           <p:cNvPr id="3" name="CuadroTexto 2">
             <a:extLst>
               <a:ext uri="{FF2B5EF4-FFF2-40B4-BE49-F238E27FC236}">
-                <a16:creationId xmlns:a16="http://schemas.microsoft.com/office/drawing/2014/main" id="{E665F2E2-2B33-462D-9202-2EF114C0930E}"/>
+                <a16:creationId xmlns:a16="http://schemas.microsoft.com/office/drawing/2014/main" xmlns="" id="{E665F2E2-2B33-462D-9202-2EF114C0930E}"/>
               </a:ext>
             </a:extLst>
           </p:cNvPr>
@@ -13254,7 +13382,7 @@
     </p:spTree>
     <p:extLst>
       <p:ext uri="{BB962C8B-B14F-4D97-AF65-F5344CB8AC3E}">
-        <p14:creationId xmlns:p14="http://schemas.microsoft.com/office/powerpoint/2010/main" val="3543839896"/>
+        <p14:creationId xmlns:p14="http://schemas.microsoft.com/office/powerpoint/2010/main" xmlns="" val="3543839896"/>
       </p:ext>
     </p:extLst>
   </p:cSld>
@@ -13286,7 +13414,7 @@
           <p:cNvPr id="4" name="Rectángulo 3">
             <a:extLst>
               <a:ext uri="{FF2B5EF4-FFF2-40B4-BE49-F238E27FC236}">
-                <a16:creationId xmlns:a16="http://schemas.microsoft.com/office/drawing/2014/main" id="{B0F1B4F4-0C7A-4C0E-8584-95718BC545EC}"/>
+                <a16:creationId xmlns:a16="http://schemas.microsoft.com/office/drawing/2014/main" xmlns="" id="{B0F1B4F4-0C7A-4C0E-8584-95718BC545EC}"/>
               </a:ext>
             </a:extLst>
           </p:cNvPr>
@@ -13345,7 +13473,7 @@
     </p:spTree>
     <p:extLst>
       <p:ext uri="{BB962C8B-B14F-4D97-AF65-F5344CB8AC3E}">
-        <p14:creationId xmlns:p14="http://schemas.microsoft.com/office/powerpoint/2010/main" val="1715947005"/>
+        <p14:creationId xmlns:p14="http://schemas.microsoft.com/office/powerpoint/2010/main" xmlns="" val="1715947005"/>
       </p:ext>
     </p:extLst>
   </p:cSld>
@@ -13377,7 +13505,7 @@
           <p:cNvPr id="2" name="Título 1">
             <a:extLst>
               <a:ext uri="{FF2B5EF4-FFF2-40B4-BE49-F238E27FC236}">
-                <a16:creationId xmlns:a16="http://schemas.microsoft.com/office/drawing/2014/main" id="{0ED6D180-92C1-4333-BA91-2BBA4DD94A3B}"/>
+                <a16:creationId xmlns:a16="http://schemas.microsoft.com/office/drawing/2014/main" xmlns="" id="{0ED6D180-92C1-4333-BA91-2BBA4DD94A3B}"/>
               </a:ext>
             </a:extLst>
           </p:cNvPr>
@@ -13414,7 +13542,7 @@
           <p:cNvPr id="5" name="Diagrama 4">
             <a:extLst>
               <a:ext uri="{FF2B5EF4-FFF2-40B4-BE49-F238E27FC236}">
-                <a16:creationId xmlns:a16="http://schemas.microsoft.com/office/drawing/2014/main" id="{D29B3E67-509D-445E-9F92-4DFCE92BD789}"/>
+                <a16:creationId xmlns:a16="http://schemas.microsoft.com/office/drawing/2014/main" xmlns="" id="{D29B3E67-509D-445E-9F92-4DFCE92BD789}"/>
               </a:ext>
             </a:extLst>
           </p:cNvPr>
@@ -13422,7 +13550,7 @@
           <p:nvPr>
             <p:extLst>
               <p:ext uri="{D42A27DB-BD31-4B8C-83A1-F6EECF244321}">
-                <p14:modId xmlns:p14="http://schemas.microsoft.com/office/powerpoint/2010/main" val="573577508"/>
+                <p14:modId xmlns:p14="http://schemas.microsoft.com/office/powerpoint/2010/main" xmlns="" val="573577508"/>
               </p:ext>
             </p:extLst>
           </p:nvPr>
@@ -13442,7 +13570,7 @@
           <p:cNvPr id="7" name="CuadroTexto 6">
             <a:extLst>
               <a:ext uri="{FF2B5EF4-FFF2-40B4-BE49-F238E27FC236}">
-                <a16:creationId xmlns:a16="http://schemas.microsoft.com/office/drawing/2014/main" id="{EFF07B65-0D67-434E-9DAD-C6F8000B23BA}"/>
+                <a16:creationId xmlns:a16="http://schemas.microsoft.com/office/drawing/2014/main" xmlns="" id="{EFF07B65-0D67-434E-9DAD-C6F8000B23BA}"/>
               </a:ext>
             </a:extLst>
           </p:cNvPr>
@@ -13534,7 +13662,7 @@
           <p:cNvPr id="9" name="CuadroTexto 8">
             <a:extLst>
               <a:ext uri="{FF2B5EF4-FFF2-40B4-BE49-F238E27FC236}">
-                <a16:creationId xmlns:a16="http://schemas.microsoft.com/office/drawing/2014/main" id="{97CF3F33-5EF6-48E7-9958-F9C2744489F1}"/>
+                <a16:creationId xmlns:a16="http://schemas.microsoft.com/office/drawing/2014/main" xmlns="" id="{97CF3F33-5EF6-48E7-9958-F9C2744489F1}"/>
               </a:ext>
             </a:extLst>
           </p:cNvPr>
@@ -13577,7 +13705,7 @@
           <p:cNvPr id="11" name="CuadroTexto 10">
             <a:extLst>
               <a:ext uri="{FF2B5EF4-FFF2-40B4-BE49-F238E27FC236}">
-                <a16:creationId xmlns:a16="http://schemas.microsoft.com/office/drawing/2014/main" id="{CFB755FD-7818-4BD2-8DEB-A53F85894D7B}"/>
+                <a16:creationId xmlns:a16="http://schemas.microsoft.com/office/drawing/2014/main" xmlns="" id="{CFB755FD-7818-4BD2-8DEB-A53F85894D7B}"/>
               </a:ext>
             </a:extLst>
           </p:cNvPr>
@@ -13629,7 +13757,7 @@
           <p:cNvPr id="13" name="CuadroTexto 12">
             <a:extLst>
               <a:ext uri="{FF2B5EF4-FFF2-40B4-BE49-F238E27FC236}">
-                <a16:creationId xmlns:a16="http://schemas.microsoft.com/office/drawing/2014/main" id="{1DC2E036-AC7A-450A-BDD4-9A2A0F769C65}"/>
+                <a16:creationId xmlns:a16="http://schemas.microsoft.com/office/drawing/2014/main" xmlns="" id="{1DC2E036-AC7A-450A-BDD4-9A2A0F769C65}"/>
               </a:ext>
             </a:extLst>
           </p:cNvPr>
@@ -13672,7 +13800,7 @@
           <p:cNvPr id="15" name="CuadroTexto 14">
             <a:extLst>
               <a:ext uri="{FF2B5EF4-FFF2-40B4-BE49-F238E27FC236}">
-                <a16:creationId xmlns:a16="http://schemas.microsoft.com/office/drawing/2014/main" id="{6ECB2B3E-252C-4E7C-8FB7-1815D6E1E0A0}"/>
+                <a16:creationId xmlns:a16="http://schemas.microsoft.com/office/drawing/2014/main" xmlns="" id="{6ECB2B3E-252C-4E7C-8FB7-1815D6E1E0A0}"/>
               </a:ext>
             </a:extLst>
           </p:cNvPr>
@@ -13713,7 +13841,7 @@
     </p:spTree>
     <p:extLst>
       <p:ext uri="{BB962C8B-B14F-4D97-AF65-F5344CB8AC3E}">
-        <p14:creationId xmlns:p14="http://schemas.microsoft.com/office/powerpoint/2010/main" val="2198404308"/>
+        <p14:creationId xmlns:p14="http://schemas.microsoft.com/office/powerpoint/2010/main" xmlns="" val="2198404308"/>
       </p:ext>
     </p:extLst>
   </p:cSld>
@@ -13745,7 +13873,7 @@
           <p:cNvPr id="2" name="Título 1">
             <a:extLst>
               <a:ext uri="{FF2B5EF4-FFF2-40B4-BE49-F238E27FC236}">
-                <a16:creationId xmlns:a16="http://schemas.microsoft.com/office/drawing/2014/main" id="{0ED6D180-92C1-4333-BA91-2BBA4DD94A3B}"/>
+                <a16:creationId xmlns:a16="http://schemas.microsoft.com/office/drawing/2014/main" xmlns="" id="{0ED6D180-92C1-4333-BA91-2BBA4DD94A3B}"/>
               </a:ext>
             </a:extLst>
           </p:cNvPr>
@@ -13782,7 +13910,7 @@
           <p:cNvPr id="6" name="CuadroTexto 5">
             <a:extLst>
               <a:ext uri="{FF2B5EF4-FFF2-40B4-BE49-F238E27FC236}">
-                <a16:creationId xmlns:a16="http://schemas.microsoft.com/office/drawing/2014/main" id="{BC8D092D-6667-447D-B473-A50467138064}"/>
+                <a16:creationId xmlns:a16="http://schemas.microsoft.com/office/drawing/2014/main" xmlns="" id="{BC8D092D-6667-447D-B473-A50467138064}"/>
               </a:ext>
             </a:extLst>
           </p:cNvPr>
@@ -13971,7 +14099,7 @@
     </p:spTree>
     <p:extLst>
       <p:ext uri="{BB962C8B-B14F-4D97-AF65-F5344CB8AC3E}">
-        <p14:creationId xmlns:p14="http://schemas.microsoft.com/office/powerpoint/2010/main" val="435960141"/>
+        <p14:creationId xmlns:p14="http://schemas.microsoft.com/office/powerpoint/2010/main" xmlns="" val="435960141"/>
       </p:ext>
     </p:extLst>
   </p:cSld>
@@ -14003,7 +14131,7 @@
           <p:cNvPr id="2" name="Título 1">
             <a:extLst>
               <a:ext uri="{FF2B5EF4-FFF2-40B4-BE49-F238E27FC236}">
-                <a16:creationId xmlns:a16="http://schemas.microsoft.com/office/drawing/2014/main" id="{0ED6D180-92C1-4333-BA91-2BBA4DD94A3B}"/>
+                <a16:creationId xmlns:a16="http://schemas.microsoft.com/office/drawing/2014/main" xmlns="" id="{0ED6D180-92C1-4333-BA91-2BBA4DD94A3B}"/>
               </a:ext>
             </a:extLst>
           </p:cNvPr>
@@ -14040,7 +14168,7 @@
           <p:cNvPr id="4" name="CuadroTexto 3">
             <a:extLst>
               <a:ext uri="{FF2B5EF4-FFF2-40B4-BE49-F238E27FC236}">
-                <a16:creationId xmlns:a16="http://schemas.microsoft.com/office/drawing/2014/main" id="{8CA9892C-E43D-4950-A9DB-82D0909AEB99}"/>
+                <a16:creationId xmlns:a16="http://schemas.microsoft.com/office/drawing/2014/main" xmlns="" id="{8CA9892C-E43D-4950-A9DB-82D0909AEB99}"/>
               </a:ext>
             </a:extLst>
           </p:cNvPr>
@@ -14264,7 +14392,7 @@
           <p:cNvPr id="5" name="Imagen 4">
             <a:extLst>
               <a:ext uri="{FF2B5EF4-FFF2-40B4-BE49-F238E27FC236}">
-                <a16:creationId xmlns:a16="http://schemas.microsoft.com/office/drawing/2014/main" id="{8D68F66A-CBEF-48F6-ACAD-43B4CF6CA214}"/>
+                <a16:creationId xmlns:a16="http://schemas.microsoft.com/office/drawing/2014/main" xmlns="" id="{8D68F66A-CBEF-48F6-ACAD-43B4CF6CA214}"/>
               </a:ext>
             </a:extLst>
           </p:cNvPr>
@@ -14292,7 +14420,7 @@
     </p:spTree>
     <p:extLst>
       <p:ext uri="{BB962C8B-B14F-4D97-AF65-F5344CB8AC3E}">
-        <p14:creationId xmlns:p14="http://schemas.microsoft.com/office/powerpoint/2010/main" val="1725776676"/>
+        <p14:creationId xmlns:p14="http://schemas.microsoft.com/office/powerpoint/2010/main" xmlns="" val="1725776676"/>
       </p:ext>
     </p:extLst>
   </p:cSld>
@@ -14324,7 +14452,7 @@
           <p:cNvPr id="2" name="Título 1">
             <a:extLst>
               <a:ext uri="{FF2B5EF4-FFF2-40B4-BE49-F238E27FC236}">
-                <a16:creationId xmlns:a16="http://schemas.microsoft.com/office/drawing/2014/main" id="{0ED6D180-92C1-4333-BA91-2BBA4DD94A3B}"/>
+                <a16:creationId xmlns:a16="http://schemas.microsoft.com/office/drawing/2014/main" xmlns="" id="{0ED6D180-92C1-4333-BA91-2BBA4DD94A3B}"/>
               </a:ext>
             </a:extLst>
           </p:cNvPr>
@@ -14361,7 +14489,7 @@
           <p:cNvPr id="4" name="CuadroTexto 3">
             <a:extLst>
               <a:ext uri="{FF2B5EF4-FFF2-40B4-BE49-F238E27FC236}">
-                <a16:creationId xmlns:a16="http://schemas.microsoft.com/office/drawing/2014/main" id="{75A3151E-9801-4177-9D45-E0BCDCE47895}"/>
+                <a16:creationId xmlns:a16="http://schemas.microsoft.com/office/drawing/2014/main" xmlns="" id="{75A3151E-9801-4177-9D45-E0BCDCE47895}"/>
               </a:ext>
             </a:extLst>
           </p:cNvPr>
@@ -14540,7 +14668,7 @@
           <p:cNvPr id="3" name="Imagen 2">
             <a:extLst>
               <a:ext uri="{FF2B5EF4-FFF2-40B4-BE49-F238E27FC236}">
-                <a16:creationId xmlns:a16="http://schemas.microsoft.com/office/drawing/2014/main" id="{6739EDCA-90AA-497B-9BB2-9A681A92C9AE}"/>
+                <a16:creationId xmlns:a16="http://schemas.microsoft.com/office/drawing/2014/main" xmlns="" id="{6739EDCA-90AA-497B-9BB2-9A681A92C9AE}"/>
               </a:ext>
             </a:extLst>
           </p:cNvPr>
@@ -14570,7 +14698,7 @@
           <p:cNvPr id="7" name="Imagen 6">
             <a:extLst>
               <a:ext uri="{FF2B5EF4-FFF2-40B4-BE49-F238E27FC236}">
-                <a16:creationId xmlns:a16="http://schemas.microsoft.com/office/drawing/2014/main" id="{B60D751C-2D3B-4289-A03E-4A94D23B003E}"/>
+                <a16:creationId xmlns:a16="http://schemas.microsoft.com/office/drawing/2014/main" xmlns="" id="{B60D751C-2D3B-4289-A03E-4A94D23B003E}"/>
               </a:ext>
             </a:extLst>
           </p:cNvPr>
@@ -14583,7 +14711,7 @@
           <a:blip r:embed="rId3" cstate="print">
             <a:extLst>
               <a:ext uri="{28A0092B-C50C-407E-A947-70E740481C1C}">
-                <a14:useLocalDpi xmlns:a14="http://schemas.microsoft.com/office/drawing/2010/main" val="0"/>
+                <a14:useLocalDpi xmlns:a14="http://schemas.microsoft.com/office/drawing/2010/main" xmlns="" val="0"/>
               </a:ext>
             </a:extLst>
           </a:blip>
@@ -14604,7 +14732,7 @@
     </p:spTree>
     <p:extLst>
       <p:ext uri="{BB962C8B-B14F-4D97-AF65-F5344CB8AC3E}">
-        <p14:creationId xmlns:p14="http://schemas.microsoft.com/office/powerpoint/2010/main" val="1240761595"/>
+        <p14:creationId xmlns:p14="http://schemas.microsoft.com/office/powerpoint/2010/main" xmlns="" val="1240761595"/>
       </p:ext>
     </p:extLst>
   </p:cSld>
@@ -14636,7 +14764,7 @@
           <p:cNvPr id="2" name="Título 1">
             <a:extLst>
               <a:ext uri="{FF2B5EF4-FFF2-40B4-BE49-F238E27FC236}">
-                <a16:creationId xmlns:a16="http://schemas.microsoft.com/office/drawing/2014/main" id="{0ED6D180-92C1-4333-BA91-2BBA4DD94A3B}"/>
+                <a16:creationId xmlns:a16="http://schemas.microsoft.com/office/drawing/2014/main" xmlns="" id="{0ED6D180-92C1-4333-BA91-2BBA4DD94A3B}"/>
               </a:ext>
             </a:extLst>
           </p:cNvPr>
@@ -14673,7 +14801,7 @@
           <p:cNvPr id="6" name="CuadroTexto 5">
             <a:extLst>
               <a:ext uri="{FF2B5EF4-FFF2-40B4-BE49-F238E27FC236}">
-                <a16:creationId xmlns:a16="http://schemas.microsoft.com/office/drawing/2014/main" id="{F6D80EE5-216D-4845-9450-E702A6BBF160}"/>
+                <a16:creationId xmlns:a16="http://schemas.microsoft.com/office/drawing/2014/main" xmlns="" id="{F6D80EE5-216D-4845-9450-E702A6BBF160}"/>
               </a:ext>
             </a:extLst>
           </p:cNvPr>
@@ -14844,7 +14972,7 @@
     </p:spTree>
     <p:extLst>
       <p:ext uri="{BB962C8B-B14F-4D97-AF65-F5344CB8AC3E}">
-        <p14:creationId xmlns:p14="http://schemas.microsoft.com/office/powerpoint/2010/main" val="1139959922"/>
+        <p14:creationId xmlns:p14="http://schemas.microsoft.com/office/powerpoint/2010/main" xmlns="" val="1139959922"/>
       </p:ext>
     </p:extLst>
   </p:cSld>
@@ -14876,7 +15004,7 @@
           <p:cNvPr id="4" name="Rectángulo 3">
             <a:extLst>
               <a:ext uri="{FF2B5EF4-FFF2-40B4-BE49-F238E27FC236}">
-                <a16:creationId xmlns:a16="http://schemas.microsoft.com/office/drawing/2014/main" id="{B0F1B4F4-0C7A-4C0E-8584-95718BC545EC}"/>
+                <a16:creationId xmlns:a16="http://schemas.microsoft.com/office/drawing/2014/main" xmlns="" id="{B0F1B4F4-0C7A-4C0E-8584-95718BC545EC}"/>
               </a:ext>
             </a:extLst>
           </p:cNvPr>
@@ -14935,7 +15063,7 @@
     </p:spTree>
     <p:extLst>
       <p:ext uri="{BB962C8B-B14F-4D97-AF65-F5344CB8AC3E}">
-        <p14:creationId xmlns:p14="http://schemas.microsoft.com/office/powerpoint/2010/main" val="3874587205"/>
+        <p14:creationId xmlns:p14="http://schemas.microsoft.com/office/powerpoint/2010/main" xmlns="" val="3874587205"/>
       </p:ext>
     </p:extLst>
   </p:cSld>
@@ -14967,7 +15095,7 @@
           <p:cNvPr id="4" name="Rectángulo 3">
             <a:extLst>
               <a:ext uri="{FF2B5EF4-FFF2-40B4-BE49-F238E27FC236}">
-                <a16:creationId xmlns:a16="http://schemas.microsoft.com/office/drawing/2014/main" id="{B0F1B4F4-0C7A-4C0E-8584-95718BC545EC}"/>
+                <a16:creationId xmlns:a16="http://schemas.microsoft.com/office/drawing/2014/main" xmlns="" id="{B0F1B4F4-0C7A-4C0E-8584-95718BC545EC}"/>
               </a:ext>
             </a:extLst>
           </p:cNvPr>
@@ -15013,7 +15141,7 @@
     </p:spTree>
     <p:extLst>
       <p:ext uri="{BB962C8B-B14F-4D97-AF65-F5344CB8AC3E}">
-        <p14:creationId xmlns:p14="http://schemas.microsoft.com/office/powerpoint/2010/main" val="4258438740"/>
+        <p14:creationId xmlns:p14="http://schemas.microsoft.com/office/powerpoint/2010/main" xmlns="" val="4258438740"/>
       </p:ext>
     </p:extLst>
   </p:cSld>
@@ -15045,7 +15173,7 @@
           <p:cNvPr id="4" name="Gráfico 3">
             <a:extLst>
               <a:ext uri="{FF2B5EF4-FFF2-40B4-BE49-F238E27FC236}">
-                <a16:creationId xmlns:a16="http://schemas.microsoft.com/office/drawing/2014/main" id="{AEDE60AA-37AA-4383-BA26-5EA432BE4F35}"/>
+                <a16:creationId xmlns:a16="http://schemas.microsoft.com/office/drawing/2014/main" xmlns="" id="{AEDE60AA-37AA-4383-BA26-5EA432BE4F35}"/>
               </a:ext>
             </a:extLst>
           </p:cNvPr>
@@ -15053,7 +15181,7 @@
           <p:nvPr>
             <p:extLst>
               <p:ext uri="{D42A27DB-BD31-4B8C-83A1-F6EECF244321}">
-                <p14:modId xmlns:p14="http://schemas.microsoft.com/office/powerpoint/2010/main" val="171994633"/>
+                <p14:modId xmlns:p14="http://schemas.microsoft.com/office/powerpoint/2010/main" xmlns="" val="171994633"/>
               </p:ext>
             </p:extLst>
           </p:nvPr>
@@ -15073,7 +15201,7 @@
           <p:cNvPr id="3" name="CuadroTexto 2">
             <a:extLst>
               <a:ext uri="{FF2B5EF4-FFF2-40B4-BE49-F238E27FC236}">
-                <a16:creationId xmlns:a16="http://schemas.microsoft.com/office/drawing/2014/main" id="{29B4C296-372F-455A-BE5A-B512322B8EDE}"/>
+                <a16:creationId xmlns:a16="http://schemas.microsoft.com/office/drawing/2014/main" xmlns="" id="{29B4C296-372F-455A-BE5A-B512322B8EDE}"/>
               </a:ext>
             </a:extLst>
           </p:cNvPr>
@@ -15107,7 +15235,7 @@
     </p:spTree>
     <p:extLst>
       <p:ext uri="{BB962C8B-B14F-4D97-AF65-F5344CB8AC3E}">
-        <p14:creationId xmlns:p14="http://schemas.microsoft.com/office/powerpoint/2010/main" val="3883774572"/>
+        <p14:creationId xmlns:p14="http://schemas.microsoft.com/office/powerpoint/2010/main" xmlns="" val="3883774572"/>
       </p:ext>
     </p:extLst>
   </p:cSld>
@@ -15139,7 +15267,7 @@
           <p:cNvPr id="4" name="Título 3">
             <a:extLst>
               <a:ext uri="{FF2B5EF4-FFF2-40B4-BE49-F238E27FC236}">
-                <a16:creationId xmlns:a16="http://schemas.microsoft.com/office/drawing/2014/main" id="{FA4EADB5-92CE-4B25-BE21-7FC484AE680E}"/>
+                <a16:creationId xmlns:a16="http://schemas.microsoft.com/office/drawing/2014/main" xmlns="" id="{FA4EADB5-92CE-4B25-BE21-7FC484AE680E}"/>
               </a:ext>
             </a:extLst>
           </p:cNvPr>
@@ -15177,7 +15305,7 @@
           <p:cNvPr id="5" name="Subtítulo 4">
             <a:extLst>
               <a:ext uri="{FF2B5EF4-FFF2-40B4-BE49-F238E27FC236}">
-                <a16:creationId xmlns:a16="http://schemas.microsoft.com/office/drawing/2014/main" id="{7035CB29-6D24-4E02-AC9F-07DC0DE9312C}"/>
+                <a16:creationId xmlns:a16="http://schemas.microsoft.com/office/drawing/2014/main" xmlns="" id="{7035CB29-6D24-4E02-AC9F-07DC0DE9312C}"/>
               </a:ext>
             </a:extLst>
           </p:cNvPr>
@@ -15333,13 +15461,20 @@
     </p:spTree>
     <p:extLst>
       <p:ext uri="{BB962C8B-B14F-4D97-AF65-F5344CB8AC3E}">
-        <p14:creationId xmlns:p14="http://schemas.microsoft.com/office/powerpoint/2010/main" val="503208862"/>
+        <p14:creationId xmlns:p14="http://schemas.microsoft.com/office/powerpoint/2010/main" xmlns="" val="503208862"/>
       </p:ext>
     </p:extLst>
   </p:cSld>
   <p:clrMapOvr>
     <a:masterClrMapping/>
   </p:clrMapOvr>
+  <p:timing>
+    <p:tnLst>
+      <p:par>
+        <p:cTn id="1" dur="indefinite" restart="never" nodeType="tmRoot"/>
+      </p:par>
+    </p:tnLst>
+  </p:timing>
 </p:sld>
 </file>
 
@@ -15365,7 +15500,7 @@
           <p:cNvPr id="4" name="Rectángulo 3">
             <a:extLst>
               <a:ext uri="{FF2B5EF4-FFF2-40B4-BE49-F238E27FC236}">
-                <a16:creationId xmlns:a16="http://schemas.microsoft.com/office/drawing/2014/main" id="{B0F1B4F4-0C7A-4C0E-8584-95718BC545EC}"/>
+                <a16:creationId xmlns:a16="http://schemas.microsoft.com/office/drawing/2014/main" xmlns="" id="{B0F1B4F4-0C7A-4C0E-8584-95718BC545EC}"/>
               </a:ext>
             </a:extLst>
           </p:cNvPr>
@@ -15411,7 +15546,7 @@
     </p:spTree>
     <p:extLst>
       <p:ext uri="{BB962C8B-B14F-4D97-AF65-F5344CB8AC3E}">
-        <p14:creationId xmlns:p14="http://schemas.microsoft.com/office/powerpoint/2010/main" val="4003469650"/>
+        <p14:creationId xmlns:p14="http://schemas.microsoft.com/office/powerpoint/2010/main" xmlns="" val="4003469650"/>
       </p:ext>
     </p:extLst>
   </p:cSld>
@@ -15443,7 +15578,7 @@
           <p:cNvPr id="2" name="Título 1">
             <a:extLst>
               <a:ext uri="{FF2B5EF4-FFF2-40B4-BE49-F238E27FC236}">
-                <a16:creationId xmlns:a16="http://schemas.microsoft.com/office/drawing/2014/main" id="{0ED6D180-92C1-4333-BA91-2BBA4DD94A3B}"/>
+                <a16:creationId xmlns:a16="http://schemas.microsoft.com/office/drawing/2014/main" xmlns="" id="{0ED6D180-92C1-4333-BA91-2BBA4DD94A3B}"/>
               </a:ext>
             </a:extLst>
           </p:cNvPr>
@@ -15480,7 +15615,7 @@
           <p:cNvPr id="5" name="Diagrama 4">
             <a:extLst>
               <a:ext uri="{FF2B5EF4-FFF2-40B4-BE49-F238E27FC236}">
-                <a16:creationId xmlns:a16="http://schemas.microsoft.com/office/drawing/2014/main" id="{D29B3E67-509D-445E-9F92-4DFCE92BD789}"/>
+                <a16:creationId xmlns:a16="http://schemas.microsoft.com/office/drawing/2014/main" xmlns="" id="{D29B3E67-509D-445E-9F92-4DFCE92BD789}"/>
               </a:ext>
             </a:extLst>
           </p:cNvPr>
@@ -15502,7 +15637,7 @@
           <p:cNvPr id="7" name="CuadroTexto 6">
             <a:extLst>
               <a:ext uri="{FF2B5EF4-FFF2-40B4-BE49-F238E27FC236}">
-                <a16:creationId xmlns:a16="http://schemas.microsoft.com/office/drawing/2014/main" id="{EFF07B65-0D67-434E-9DAD-C6F8000B23BA}"/>
+                <a16:creationId xmlns:a16="http://schemas.microsoft.com/office/drawing/2014/main" xmlns="" id="{EFF07B65-0D67-434E-9DAD-C6F8000B23BA}"/>
               </a:ext>
             </a:extLst>
           </p:cNvPr>
@@ -15597,7 +15732,7 @@
           <p:cNvPr id="9" name="CuadroTexto 8">
             <a:extLst>
               <a:ext uri="{FF2B5EF4-FFF2-40B4-BE49-F238E27FC236}">
-                <a16:creationId xmlns:a16="http://schemas.microsoft.com/office/drawing/2014/main" id="{97CF3F33-5EF6-48E7-9958-F9C2744489F1}"/>
+                <a16:creationId xmlns:a16="http://schemas.microsoft.com/office/drawing/2014/main" xmlns="" id="{97CF3F33-5EF6-48E7-9958-F9C2744489F1}"/>
               </a:ext>
             </a:extLst>
           </p:cNvPr>
@@ -15640,7 +15775,7 @@
           <p:cNvPr id="11" name="CuadroTexto 10">
             <a:extLst>
               <a:ext uri="{FF2B5EF4-FFF2-40B4-BE49-F238E27FC236}">
-                <a16:creationId xmlns:a16="http://schemas.microsoft.com/office/drawing/2014/main" id="{CFB755FD-7818-4BD2-8DEB-A53F85894D7B}"/>
+                <a16:creationId xmlns:a16="http://schemas.microsoft.com/office/drawing/2014/main" xmlns="" id="{CFB755FD-7818-4BD2-8DEB-A53F85894D7B}"/>
               </a:ext>
             </a:extLst>
           </p:cNvPr>
@@ -15683,7 +15818,7 @@
           <p:cNvPr id="13" name="CuadroTexto 12">
             <a:extLst>
               <a:ext uri="{FF2B5EF4-FFF2-40B4-BE49-F238E27FC236}">
-                <a16:creationId xmlns:a16="http://schemas.microsoft.com/office/drawing/2014/main" id="{1DC2E036-AC7A-450A-BDD4-9A2A0F769C65}"/>
+                <a16:creationId xmlns:a16="http://schemas.microsoft.com/office/drawing/2014/main" xmlns="" id="{1DC2E036-AC7A-450A-BDD4-9A2A0F769C65}"/>
               </a:ext>
             </a:extLst>
           </p:cNvPr>
@@ -15726,7 +15861,7 @@
           <p:cNvPr id="15" name="CuadroTexto 14">
             <a:extLst>
               <a:ext uri="{FF2B5EF4-FFF2-40B4-BE49-F238E27FC236}">
-                <a16:creationId xmlns:a16="http://schemas.microsoft.com/office/drawing/2014/main" id="{6ECB2B3E-252C-4E7C-8FB7-1815D6E1E0A0}"/>
+                <a16:creationId xmlns:a16="http://schemas.microsoft.com/office/drawing/2014/main" xmlns="" id="{6ECB2B3E-252C-4E7C-8FB7-1815D6E1E0A0}"/>
               </a:ext>
             </a:extLst>
           </p:cNvPr>
@@ -15767,7 +15902,7 @@
     </p:spTree>
     <p:extLst>
       <p:ext uri="{BB962C8B-B14F-4D97-AF65-F5344CB8AC3E}">
-        <p14:creationId xmlns:p14="http://schemas.microsoft.com/office/powerpoint/2010/main" val="3884785151"/>
+        <p14:creationId xmlns:p14="http://schemas.microsoft.com/office/powerpoint/2010/main" xmlns="" val="3884785151"/>
       </p:ext>
     </p:extLst>
   </p:cSld>
@@ -15799,7 +15934,7 @@
           <p:cNvPr id="2" name="Título 1">
             <a:extLst>
               <a:ext uri="{FF2B5EF4-FFF2-40B4-BE49-F238E27FC236}">
-                <a16:creationId xmlns:a16="http://schemas.microsoft.com/office/drawing/2014/main" id="{0ED6D180-92C1-4333-BA91-2BBA4DD94A3B}"/>
+                <a16:creationId xmlns:a16="http://schemas.microsoft.com/office/drawing/2014/main" xmlns="" id="{0ED6D180-92C1-4333-BA91-2BBA4DD94A3B}"/>
               </a:ext>
             </a:extLst>
           </p:cNvPr>
@@ -15836,7 +15971,7 @@
           <p:cNvPr id="7" name="CuadroTexto 6">
             <a:extLst>
               <a:ext uri="{FF2B5EF4-FFF2-40B4-BE49-F238E27FC236}">
-                <a16:creationId xmlns:a16="http://schemas.microsoft.com/office/drawing/2014/main" id="{EFF07B65-0D67-434E-9DAD-C6F8000B23BA}"/>
+                <a16:creationId xmlns:a16="http://schemas.microsoft.com/office/drawing/2014/main" xmlns="" id="{EFF07B65-0D67-434E-9DAD-C6F8000B23BA}"/>
               </a:ext>
             </a:extLst>
           </p:cNvPr>
@@ -15895,7 +16030,7 @@
           <p:nvPr>
             <p:extLst>
               <p:ext uri="{D42A27DB-BD31-4B8C-83A1-F6EECF244321}">
-                <p14:modId xmlns:p14="http://schemas.microsoft.com/office/powerpoint/2010/main" val="1005187938"/>
+                <p14:modId xmlns:p14="http://schemas.microsoft.com/office/powerpoint/2010/main" xmlns="" val="1005187938"/>
               </p:ext>
             </p:extLst>
           </p:nvPr>
@@ -15914,21 +16049,21 @@
                 <a:gridCol w="3413266">
                   <a:extLst>
                     <a:ext uri="{9D8B030D-6E8A-4147-A177-3AD203B41FA5}">
-                      <a16:colId xmlns:a16="http://schemas.microsoft.com/office/drawing/2014/main" val="3881838570"/>
+                      <a16:colId xmlns:a16="http://schemas.microsoft.com/office/drawing/2014/main" xmlns="" val="3881838570"/>
                     </a:ext>
                   </a:extLst>
                 </a:gridCol>
                 <a:gridCol w="3413266">
                   <a:extLst>
                     <a:ext uri="{9D8B030D-6E8A-4147-A177-3AD203B41FA5}">
-                      <a16:colId xmlns:a16="http://schemas.microsoft.com/office/drawing/2014/main" val="3419108840"/>
+                      <a16:colId xmlns:a16="http://schemas.microsoft.com/office/drawing/2014/main" xmlns="" val="3419108840"/>
                     </a:ext>
                   </a:extLst>
                 </a:gridCol>
                 <a:gridCol w="3413266">
                   <a:extLst>
                     <a:ext uri="{9D8B030D-6E8A-4147-A177-3AD203B41FA5}">
-                      <a16:colId xmlns:a16="http://schemas.microsoft.com/office/drawing/2014/main" val="2021820195"/>
+                      <a16:colId xmlns:a16="http://schemas.microsoft.com/office/drawing/2014/main" xmlns="" val="2021820195"/>
                     </a:ext>
                   </a:extLst>
                 </a:gridCol>
@@ -15975,7 +16110,7 @@
                 </a:tc>
                 <a:extLst>
                   <a:ext uri="{0D108BD9-81ED-4DB2-BD59-A6C34878D82A}">
-                    <a16:rowId xmlns:a16="http://schemas.microsoft.com/office/drawing/2014/main" val="2807931946"/>
+                    <a16:rowId xmlns:a16="http://schemas.microsoft.com/office/drawing/2014/main" xmlns="" val="2807931946"/>
                   </a:ext>
                 </a:extLst>
               </a:tr>
@@ -16062,7 +16197,7 @@
                 </a:tc>
                 <a:extLst>
                   <a:ext uri="{0D108BD9-81ED-4DB2-BD59-A6C34878D82A}">
-                    <a16:rowId xmlns:a16="http://schemas.microsoft.com/office/drawing/2014/main" val="369058642"/>
+                    <a16:rowId xmlns:a16="http://schemas.microsoft.com/office/drawing/2014/main" xmlns="" val="369058642"/>
                   </a:ext>
                 </a:extLst>
               </a:tr>
@@ -16146,7 +16281,7 @@
                 </a:tc>
                 <a:extLst>
                   <a:ext uri="{0D108BD9-81ED-4DB2-BD59-A6C34878D82A}">
-                    <a16:rowId xmlns:a16="http://schemas.microsoft.com/office/drawing/2014/main" val="554149636"/>
+                    <a16:rowId xmlns:a16="http://schemas.microsoft.com/office/drawing/2014/main" xmlns="" val="554149636"/>
                   </a:ext>
                 </a:extLst>
               </a:tr>
@@ -16157,7 +16292,7 @@
     </p:spTree>
     <p:extLst>
       <p:ext uri="{BB962C8B-B14F-4D97-AF65-F5344CB8AC3E}">
-        <p14:creationId xmlns:p14="http://schemas.microsoft.com/office/powerpoint/2010/main" val="3829638035"/>
+        <p14:creationId xmlns:p14="http://schemas.microsoft.com/office/powerpoint/2010/main" xmlns="" val="3829638035"/>
       </p:ext>
     </p:extLst>
   </p:cSld>
@@ -16189,7 +16324,7 @@
           <p:cNvPr id="4" name="Rectángulo 3">
             <a:extLst>
               <a:ext uri="{FF2B5EF4-FFF2-40B4-BE49-F238E27FC236}">
-                <a16:creationId xmlns:a16="http://schemas.microsoft.com/office/drawing/2014/main" id="{B0F1B4F4-0C7A-4C0E-8584-95718BC545EC}"/>
+                <a16:creationId xmlns:a16="http://schemas.microsoft.com/office/drawing/2014/main" xmlns="" id="{B0F1B4F4-0C7A-4C0E-8584-95718BC545EC}"/>
               </a:ext>
             </a:extLst>
           </p:cNvPr>
@@ -16235,7 +16370,7 @@
     </p:spTree>
     <p:extLst>
       <p:ext uri="{BB962C8B-B14F-4D97-AF65-F5344CB8AC3E}">
-        <p14:creationId xmlns:p14="http://schemas.microsoft.com/office/powerpoint/2010/main" val="2803738474"/>
+        <p14:creationId xmlns:p14="http://schemas.microsoft.com/office/powerpoint/2010/main" xmlns="" val="2803738474"/>
       </p:ext>
     </p:extLst>
   </p:cSld>
@@ -17077,7 +17212,7 @@
     </p:spTree>
     <p:extLst>
       <p:ext uri="{BB962C8B-B14F-4D97-AF65-F5344CB8AC3E}">
-        <p14:creationId xmlns:p14="http://schemas.microsoft.com/office/powerpoint/2010/main" val="2861481179"/>
+        <p14:creationId xmlns:p14="http://schemas.microsoft.com/office/powerpoint/2010/main" xmlns="" val="2861481179"/>
       </p:ext>
     </p:extLst>
   </p:cSld>
@@ -17109,7 +17244,7 @@
           <p:cNvPr id="4" name="Rectángulo 3">
             <a:extLst>
               <a:ext uri="{FF2B5EF4-FFF2-40B4-BE49-F238E27FC236}">
-                <a16:creationId xmlns:a16="http://schemas.microsoft.com/office/drawing/2014/main" id="{B0F1B4F4-0C7A-4C0E-8584-95718BC545EC}"/>
+                <a16:creationId xmlns:a16="http://schemas.microsoft.com/office/drawing/2014/main" xmlns="" id="{B0F1B4F4-0C7A-4C0E-8584-95718BC545EC}"/>
               </a:ext>
             </a:extLst>
           </p:cNvPr>
@@ -17206,7 +17341,7 @@
     </p:spTree>
     <p:extLst>
       <p:ext uri="{BB962C8B-B14F-4D97-AF65-F5344CB8AC3E}">
-        <p14:creationId xmlns:p14="http://schemas.microsoft.com/office/powerpoint/2010/main" val="4125267999"/>
+        <p14:creationId xmlns:p14="http://schemas.microsoft.com/office/powerpoint/2010/main" xmlns="" val="4125267999"/>
       </p:ext>
     </p:extLst>
   </p:cSld>
@@ -17247,7 +17382,7 @@
           <a:blip r:embed="rId2" cstate="print">
             <a:extLst>
               <a:ext uri="{28A0092B-C50C-407E-A947-70E740481C1C}">
-                <a14:useLocalDpi xmlns:a14="http://schemas.microsoft.com/office/drawing/2010/main" val="0"/>
+                <a14:useLocalDpi xmlns:a14="http://schemas.microsoft.com/office/drawing/2010/main" xmlns="" val="0"/>
               </a:ext>
             </a:extLst>
           </a:blip>
@@ -17274,7 +17409,7 @@
           <a:blip r:embed="rId3" cstate="print">
             <a:extLst>
               <a:ext uri="{28A0092B-C50C-407E-A947-70E740481C1C}">
-                <a14:useLocalDpi xmlns:a14="http://schemas.microsoft.com/office/drawing/2010/main" val="0"/>
+                <a14:useLocalDpi xmlns:a14="http://schemas.microsoft.com/office/drawing/2010/main" xmlns="" val="0"/>
               </a:ext>
             </a:extLst>
           </a:blip>
@@ -17369,10 +17504,10 @@
           <p:nvPr/>
         </p:nvPicPr>
         <p:blipFill>
-          <a:blip r:embed="rId4" cstate="hqprint">
+          <a:blip r:embed="rId4" cstate="print">
             <a:extLst>
               <a:ext uri="{28A0092B-C50C-407E-A947-70E740481C1C}">
-                <a14:useLocalDpi xmlns:a14="http://schemas.microsoft.com/office/drawing/2010/main" val="0"/>
+                <a14:useLocalDpi xmlns:a14="http://schemas.microsoft.com/office/drawing/2010/main" xmlns="" val="0"/>
               </a:ext>
             </a:extLst>
           </a:blip>
@@ -17468,7 +17603,7 @@
           <a:blip r:embed="rId5" cstate="print">
             <a:extLst>
               <a:ext uri="{28A0092B-C50C-407E-A947-70E740481C1C}">
-                <a14:useLocalDpi xmlns:a14="http://schemas.microsoft.com/office/drawing/2010/main" val="0"/>
+                <a14:useLocalDpi xmlns:a14="http://schemas.microsoft.com/office/drawing/2010/main" xmlns="" val="0"/>
               </a:ext>
             </a:extLst>
           </a:blip>
@@ -17498,7 +17633,7 @@
           <a:blip r:embed="rId6" cstate="print">
             <a:extLst>
               <a:ext uri="{28A0092B-C50C-407E-A947-70E740481C1C}">
-                <a14:useLocalDpi xmlns:a14="http://schemas.microsoft.com/office/drawing/2010/main" val="0"/>
+                <a14:useLocalDpi xmlns:a14="http://schemas.microsoft.com/office/drawing/2010/main" xmlns="" val="0"/>
               </a:ext>
             </a:extLst>
           </a:blip>
@@ -17528,7 +17663,7 @@
           <a:blip r:embed="rId7" cstate="print">
             <a:extLst>
               <a:ext uri="{28A0092B-C50C-407E-A947-70E740481C1C}">
-                <a14:useLocalDpi xmlns:a14="http://schemas.microsoft.com/office/drawing/2010/main" val="0"/>
+                <a14:useLocalDpi xmlns:a14="http://schemas.microsoft.com/office/drawing/2010/main" xmlns="" val="0"/>
               </a:ext>
             </a:extLst>
           </a:blip>
@@ -17610,7 +17745,7 @@
           <a:blip r:embed="rId8" cstate="print">
             <a:extLst>
               <a:ext uri="{28A0092B-C50C-407E-A947-70E740481C1C}">
-                <a14:useLocalDpi xmlns:a14="http://schemas.microsoft.com/office/drawing/2010/main" val="0"/>
+                <a14:useLocalDpi xmlns:a14="http://schemas.microsoft.com/office/drawing/2010/main" xmlns="" val="0"/>
               </a:ext>
             </a:extLst>
           </a:blip>
@@ -17640,7 +17775,7 @@
           <a:blip r:embed="rId9" cstate="print">
             <a:extLst>
               <a:ext uri="{28A0092B-C50C-407E-A947-70E740481C1C}">
-                <a14:useLocalDpi xmlns:a14="http://schemas.microsoft.com/office/drawing/2010/main" val="0"/>
+                <a14:useLocalDpi xmlns:a14="http://schemas.microsoft.com/office/drawing/2010/main" xmlns="" val="0"/>
               </a:ext>
             </a:extLst>
           </a:blip>
@@ -17670,7 +17805,7 @@
           <a:blip r:embed="rId10" cstate="print">
             <a:extLst>
               <a:ext uri="{28A0092B-C50C-407E-A947-70E740481C1C}">
-                <a14:useLocalDpi xmlns:a14="http://schemas.microsoft.com/office/drawing/2010/main" val="0"/>
+                <a14:useLocalDpi xmlns:a14="http://schemas.microsoft.com/office/drawing/2010/main" xmlns="" val="0"/>
               </a:ext>
             </a:extLst>
           </a:blip>
@@ -17742,7 +17877,7 @@
           <a:blip r:embed="rId11" cstate="print">
             <a:extLst>
               <a:ext uri="{28A0092B-C50C-407E-A947-70E740481C1C}">
-                <a14:useLocalDpi xmlns:a14="http://schemas.microsoft.com/office/drawing/2010/main" val="0"/>
+                <a14:useLocalDpi xmlns:a14="http://schemas.microsoft.com/office/drawing/2010/main" xmlns="" val="0"/>
               </a:ext>
             </a:extLst>
           </a:blip>
@@ -17772,7 +17907,7 @@
           <a:blip r:embed="rId12" cstate="print">
             <a:extLst>
               <a:ext uri="{28A0092B-C50C-407E-A947-70E740481C1C}">
-                <a14:useLocalDpi xmlns:a14="http://schemas.microsoft.com/office/drawing/2010/main" val="0"/>
+                <a14:useLocalDpi xmlns:a14="http://schemas.microsoft.com/office/drawing/2010/main" xmlns="" val="0"/>
               </a:ext>
             </a:extLst>
           </a:blip>
@@ -17802,7 +17937,7 @@
           <a:blip r:embed="rId13" cstate="print">
             <a:extLst>
               <a:ext uri="{28A0092B-C50C-407E-A947-70E740481C1C}">
-                <a14:useLocalDpi xmlns:a14="http://schemas.microsoft.com/office/drawing/2010/main" val="0"/>
+                <a14:useLocalDpi xmlns:a14="http://schemas.microsoft.com/office/drawing/2010/main" xmlns="" val="0"/>
               </a:ext>
             </a:extLst>
           </a:blip>
@@ -17832,7 +17967,7 @@
           <a:blip r:embed="rId14" cstate="print">
             <a:extLst>
               <a:ext uri="{28A0092B-C50C-407E-A947-70E740481C1C}">
-                <a14:useLocalDpi xmlns:a14="http://schemas.microsoft.com/office/drawing/2010/main" val="0"/>
+                <a14:useLocalDpi xmlns:a14="http://schemas.microsoft.com/office/drawing/2010/main" xmlns="" val="0"/>
               </a:ext>
             </a:extLst>
           </a:blip>
@@ -17862,7 +17997,7 @@
           <a:blip r:embed="rId15" cstate="print">
             <a:extLst>
               <a:ext uri="{28A0092B-C50C-407E-A947-70E740481C1C}">
-                <a14:useLocalDpi xmlns:a14="http://schemas.microsoft.com/office/drawing/2010/main" val="0"/>
+                <a14:useLocalDpi xmlns:a14="http://schemas.microsoft.com/office/drawing/2010/main" xmlns="" val="0"/>
               </a:ext>
             </a:extLst>
           </a:blip>
@@ -17892,7 +18027,7 @@
           <a:blip r:embed="rId16" cstate="print">
             <a:extLst>
               <a:ext uri="{28A0092B-C50C-407E-A947-70E740481C1C}">
-                <a14:useLocalDpi xmlns:a14="http://schemas.microsoft.com/office/drawing/2010/main" val="0"/>
+                <a14:useLocalDpi xmlns:a14="http://schemas.microsoft.com/office/drawing/2010/main" xmlns="" val="0"/>
               </a:ext>
             </a:extLst>
           </a:blip>
@@ -17922,7 +18057,7 @@
           <a:blip r:embed="rId17" cstate="print">
             <a:extLst>
               <a:ext uri="{28A0092B-C50C-407E-A947-70E740481C1C}">
-                <a14:useLocalDpi xmlns:a14="http://schemas.microsoft.com/office/drawing/2010/main" val="0"/>
+                <a14:useLocalDpi xmlns:a14="http://schemas.microsoft.com/office/drawing/2010/main" xmlns="" val="0"/>
               </a:ext>
             </a:extLst>
           </a:blip>
@@ -17942,7 +18077,7 @@
           <a:noFill/>
           <a:extLst>
             <a:ext uri="{909E8E84-426E-40DD-AFC4-6F175D3DCCD1}">
-              <a14:hiddenFill xmlns:a14="http://schemas.microsoft.com/office/drawing/2010/main">
+              <a14:hiddenFill xmlns:a14="http://schemas.microsoft.com/office/drawing/2010/main" xmlns="">
                 <a:solidFill>
                   <a:srgbClr val="FFFFFF"/>
                 </a:solidFill>
@@ -18040,7 +18175,7 @@
           <p:cNvPr id="2" name="Picture 2">
             <a:extLst>
               <a:ext uri="{FF2B5EF4-FFF2-40B4-BE49-F238E27FC236}">
-                <a16:creationId xmlns:a16="http://schemas.microsoft.com/office/drawing/2014/main" id="{0CAF1ED9-ABEB-4E64-A9BA-A91A6C5DFDE2}"/>
+                <a16:creationId xmlns:a16="http://schemas.microsoft.com/office/drawing/2014/main" xmlns="" id="{0CAF1ED9-ABEB-4E64-A9BA-A91A6C5DFDE2}"/>
               </a:ext>
             </a:extLst>
           </p:cNvPr>
@@ -18053,7 +18188,7 @@
           <a:blip r:embed="rId18" cstate="print">
             <a:extLst>
               <a:ext uri="{28A0092B-C50C-407E-A947-70E740481C1C}">
-                <a14:useLocalDpi xmlns:a14="http://schemas.microsoft.com/office/drawing/2010/main" val="0"/>
+                <a14:useLocalDpi xmlns:a14="http://schemas.microsoft.com/office/drawing/2010/main" xmlns="" val="0"/>
               </a:ext>
             </a:extLst>
           </a:blip>
@@ -18073,7 +18208,7 @@
           <a:noFill/>
           <a:extLst>
             <a:ext uri="{909E8E84-426E-40DD-AFC4-6F175D3DCCD1}">
-              <a14:hiddenFill xmlns:a14="http://schemas.microsoft.com/office/drawing/2010/main">
+              <a14:hiddenFill xmlns:a14="http://schemas.microsoft.com/office/drawing/2010/main" xmlns="">
                 <a:solidFill>
                   <a:srgbClr val="FFFFFF"/>
                 </a:solidFill>
@@ -18087,7 +18222,7 @@
           <p:cNvPr id="31" name="CuadroTexto 30">
             <a:extLst>
               <a:ext uri="{FF2B5EF4-FFF2-40B4-BE49-F238E27FC236}">
-                <a16:creationId xmlns:a16="http://schemas.microsoft.com/office/drawing/2014/main" id="{E653EC3C-5DB9-4B37-AF01-85EDB5934CC1}"/>
+                <a16:creationId xmlns:a16="http://schemas.microsoft.com/office/drawing/2014/main" xmlns="" id="{E653EC3C-5DB9-4B37-AF01-85EDB5934CC1}"/>
               </a:ext>
             </a:extLst>
           </p:cNvPr>
@@ -18126,7 +18261,7 @@
     </p:spTree>
     <p:extLst>
       <p:ext uri="{BB962C8B-B14F-4D97-AF65-F5344CB8AC3E}">
-        <p14:creationId xmlns:p14="http://schemas.microsoft.com/office/powerpoint/2010/main" val="2982195199"/>
+        <p14:creationId xmlns:p14="http://schemas.microsoft.com/office/powerpoint/2010/main" xmlns="" val="2982195199"/>
       </p:ext>
     </p:extLst>
   </p:cSld>
@@ -18158,7 +18293,7 @@
           <p:cNvPr id="4" name="Rectángulo 3">
             <a:extLst>
               <a:ext uri="{FF2B5EF4-FFF2-40B4-BE49-F238E27FC236}">
-                <a16:creationId xmlns:a16="http://schemas.microsoft.com/office/drawing/2014/main" id="{B0F1B4F4-0C7A-4C0E-8584-95718BC545EC}"/>
+                <a16:creationId xmlns:a16="http://schemas.microsoft.com/office/drawing/2014/main" xmlns="" id="{B0F1B4F4-0C7A-4C0E-8584-95718BC545EC}"/>
               </a:ext>
             </a:extLst>
           </p:cNvPr>
@@ -18217,7 +18352,7 @@
     </p:spTree>
     <p:extLst>
       <p:ext uri="{BB962C8B-B14F-4D97-AF65-F5344CB8AC3E}">
-        <p14:creationId xmlns:p14="http://schemas.microsoft.com/office/powerpoint/2010/main" val="115837642"/>
+        <p14:creationId xmlns:p14="http://schemas.microsoft.com/office/powerpoint/2010/main" xmlns="" val="115837642"/>
       </p:ext>
     </p:extLst>
   </p:cSld>
@@ -18249,7 +18384,7 @@
           <p:cNvPr id="2" name="Título 1">
             <a:extLst>
               <a:ext uri="{FF2B5EF4-FFF2-40B4-BE49-F238E27FC236}">
-                <a16:creationId xmlns:a16="http://schemas.microsoft.com/office/drawing/2014/main" id="{0ED6D180-92C1-4333-BA91-2BBA4DD94A3B}"/>
+                <a16:creationId xmlns:a16="http://schemas.microsoft.com/office/drawing/2014/main" xmlns="" id="{0ED6D180-92C1-4333-BA91-2BBA4DD94A3B}"/>
               </a:ext>
             </a:extLst>
           </p:cNvPr>
@@ -18286,7 +18421,7 @@
           <p:cNvPr id="4" name="CuadroTexto 3">
             <a:extLst>
               <a:ext uri="{FF2B5EF4-FFF2-40B4-BE49-F238E27FC236}">
-                <a16:creationId xmlns:a16="http://schemas.microsoft.com/office/drawing/2014/main" id="{077AD978-631F-4986-B928-CABD7DCA36D6}"/>
+                <a16:creationId xmlns:a16="http://schemas.microsoft.com/office/drawing/2014/main" xmlns="" id="{077AD978-631F-4986-B928-CABD7DCA36D6}"/>
               </a:ext>
             </a:extLst>
           </p:cNvPr>
@@ -18445,7 +18580,7 @@
           <p:cNvPr id="5" name="Imagen 4">
             <a:extLst>
               <a:ext uri="{FF2B5EF4-FFF2-40B4-BE49-F238E27FC236}">
-                <a16:creationId xmlns:a16="http://schemas.microsoft.com/office/drawing/2014/main" id="{1E023EBF-D877-415B-8954-0B4E697AD581}"/>
+                <a16:creationId xmlns:a16="http://schemas.microsoft.com/office/drawing/2014/main" xmlns="" id="{1E023EBF-D877-415B-8954-0B4E697AD581}"/>
               </a:ext>
             </a:extLst>
           </p:cNvPr>
@@ -18458,7 +18593,7 @@
           <a:blip r:embed="rId2" cstate="print">
             <a:extLst>
               <a:ext uri="{28A0092B-C50C-407E-A947-70E740481C1C}">
-                <a14:useLocalDpi xmlns:a14="http://schemas.microsoft.com/office/drawing/2010/main" val="0"/>
+                <a14:useLocalDpi xmlns:a14="http://schemas.microsoft.com/office/drawing/2010/main" xmlns="" val="0"/>
               </a:ext>
             </a:extLst>
           </a:blip>
@@ -18481,7 +18616,7 @@
           <p:cNvPr id="10" name="Imagen 9">
             <a:extLst>
               <a:ext uri="{FF2B5EF4-FFF2-40B4-BE49-F238E27FC236}">
-                <a16:creationId xmlns:a16="http://schemas.microsoft.com/office/drawing/2014/main" id="{326EF8D7-F39B-4A9A-AE50-012A992DE84B}"/>
+                <a16:creationId xmlns:a16="http://schemas.microsoft.com/office/drawing/2014/main" xmlns="" id="{326EF8D7-F39B-4A9A-AE50-012A992DE84B}"/>
               </a:ext>
             </a:extLst>
           </p:cNvPr>
@@ -18525,7 +18660,7 @@
           <p:cNvPr id="6" name="Imagen 5">
             <a:extLst>
               <a:ext uri="{FF2B5EF4-FFF2-40B4-BE49-F238E27FC236}">
-                <a16:creationId xmlns:a16="http://schemas.microsoft.com/office/drawing/2014/main" id="{DF82BA4F-2D73-4C09-9504-536217F5A924}"/>
+                <a16:creationId xmlns:a16="http://schemas.microsoft.com/office/drawing/2014/main" xmlns="" id="{DF82BA4F-2D73-4C09-9504-536217F5A924}"/>
               </a:ext>
             </a:extLst>
           </p:cNvPr>
@@ -18569,7 +18704,7 @@
           <p:cNvPr id="11" name="Imagen 10">
             <a:extLst>
               <a:ext uri="{FF2B5EF4-FFF2-40B4-BE49-F238E27FC236}">
-                <a16:creationId xmlns:a16="http://schemas.microsoft.com/office/drawing/2014/main" id="{F882AEBF-FBBF-44B6-AE98-0132DEAB3BBB}"/>
+                <a16:creationId xmlns:a16="http://schemas.microsoft.com/office/drawing/2014/main" xmlns="" id="{F882AEBF-FBBF-44B6-AE98-0132DEAB3BBB}"/>
               </a:ext>
             </a:extLst>
           </p:cNvPr>
@@ -18610,7 +18745,7 @@
     </p:spTree>
     <p:extLst>
       <p:ext uri="{BB962C8B-B14F-4D97-AF65-F5344CB8AC3E}">
-        <p14:creationId xmlns:p14="http://schemas.microsoft.com/office/powerpoint/2010/main" val="3388820873"/>
+        <p14:creationId xmlns:p14="http://schemas.microsoft.com/office/powerpoint/2010/main" xmlns="" val="3388820873"/>
       </p:ext>
     </p:extLst>
   </p:cSld>
@@ -18642,7 +18777,7 @@
           <p:cNvPr id="2" name="Título 1">
             <a:extLst>
               <a:ext uri="{FF2B5EF4-FFF2-40B4-BE49-F238E27FC236}">
-                <a16:creationId xmlns:a16="http://schemas.microsoft.com/office/drawing/2014/main" id="{0ED6D180-92C1-4333-BA91-2BBA4DD94A3B}"/>
+                <a16:creationId xmlns:a16="http://schemas.microsoft.com/office/drawing/2014/main" xmlns="" id="{0ED6D180-92C1-4333-BA91-2BBA4DD94A3B}"/>
               </a:ext>
             </a:extLst>
           </p:cNvPr>
@@ -18679,7 +18814,7 @@
           <p:cNvPr id="4" name="CuadroTexto 3">
             <a:extLst>
               <a:ext uri="{FF2B5EF4-FFF2-40B4-BE49-F238E27FC236}">
-                <a16:creationId xmlns:a16="http://schemas.microsoft.com/office/drawing/2014/main" id="{077AD978-631F-4986-B928-CABD7DCA36D6}"/>
+                <a16:creationId xmlns:a16="http://schemas.microsoft.com/office/drawing/2014/main" xmlns="" id="{077AD978-631F-4986-B928-CABD7DCA36D6}"/>
               </a:ext>
             </a:extLst>
           </p:cNvPr>
@@ -18770,7 +18905,7 @@
           <p:cNvPr id="8" name="Imagen 7">
             <a:extLst>
               <a:ext uri="{FF2B5EF4-FFF2-40B4-BE49-F238E27FC236}">
-                <a16:creationId xmlns:a16="http://schemas.microsoft.com/office/drawing/2014/main" id="{B81F7B9F-2566-4432-A702-9A2E09780895}"/>
+                <a16:creationId xmlns:a16="http://schemas.microsoft.com/office/drawing/2014/main" xmlns="" id="{B81F7B9F-2566-4432-A702-9A2E09780895}"/>
               </a:ext>
             </a:extLst>
           </p:cNvPr>
@@ -18818,7 +18953,7 @@
           <p:cNvPr id="1030" name="Picture 6">
             <a:extLst>
               <a:ext uri="{FF2B5EF4-FFF2-40B4-BE49-F238E27FC236}">
-                <a16:creationId xmlns:a16="http://schemas.microsoft.com/office/drawing/2014/main" id="{CF4EDECE-D36E-41AF-B661-BA6A0825A01E}"/>
+                <a16:creationId xmlns:a16="http://schemas.microsoft.com/office/drawing/2014/main" xmlns="" id="{CF4EDECE-D36E-41AF-B661-BA6A0825A01E}"/>
               </a:ext>
             </a:extLst>
           </p:cNvPr>
@@ -18831,7 +18966,7 @@
           <a:blip r:embed="rId3" cstate="print">
             <a:extLst>
               <a:ext uri="{28A0092B-C50C-407E-A947-70E740481C1C}">
-                <a14:useLocalDpi xmlns:a14="http://schemas.microsoft.com/office/drawing/2010/main" val="0"/>
+                <a14:useLocalDpi xmlns:a14="http://schemas.microsoft.com/office/drawing/2010/main" xmlns="" val="0"/>
               </a:ext>
             </a:extLst>
           </a:blip>
@@ -18864,7 +18999,7 @@
           </a:effectLst>
           <a:extLst>
             <a:ext uri="{909E8E84-426E-40DD-AFC4-6F175D3DCCD1}">
-              <a14:hiddenFill xmlns:a14="http://schemas.microsoft.com/office/drawing/2010/main">
+              <a14:hiddenFill xmlns:a14="http://schemas.microsoft.com/office/drawing/2010/main" xmlns="">
                 <a:solidFill>
                   <a:srgbClr val="FFFFFF"/>
                 </a:solidFill>
@@ -18876,7 +19011,7 @@
     </p:spTree>
     <p:extLst>
       <p:ext uri="{BB962C8B-B14F-4D97-AF65-F5344CB8AC3E}">
-        <p14:creationId xmlns:p14="http://schemas.microsoft.com/office/powerpoint/2010/main" val="248188006"/>
+        <p14:creationId xmlns:p14="http://schemas.microsoft.com/office/powerpoint/2010/main" xmlns="" val="248188006"/>
       </p:ext>
     </p:extLst>
   </p:cSld>
@@ -18908,7 +19043,7 @@
           <p:cNvPr id="4" name="Título 3">
             <a:extLst>
               <a:ext uri="{FF2B5EF4-FFF2-40B4-BE49-F238E27FC236}">
-                <a16:creationId xmlns:a16="http://schemas.microsoft.com/office/drawing/2014/main" id="{FA4EADB5-92CE-4B25-BE21-7FC484AE680E}"/>
+                <a16:creationId xmlns:a16="http://schemas.microsoft.com/office/drawing/2014/main" xmlns="" id="{FA4EADB5-92CE-4B25-BE21-7FC484AE680E}"/>
               </a:ext>
             </a:extLst>
           </p:cNvPr>
@@ -18945,7 +19080,7 @@
           <p:cNvPr id="5" name="Subtítulo 4">
             <a:extLst>
               <a:ext uri="{FF2B5EF4-FFF2-40B4-BE49-F238E27FC236}">
-                <a16:creationId xmlns:a16="http://schemas.microsoft.com/office/drawing/2014/main" id="{7035CB29-6D24-4E02-AC9F-07DC0DE9312C}"/>
+                <a16:creationId xmlns:a16="http://schemas.microsoft.com/office/drawing/2014/main" xmlns="" id="{7035CB29-6D24-4E02-AC9F-07DC0DE9312C}"/>
               </a:ext>
             </a:extLst>
           </p:cNvPr>
@@ -19057,13 +19192,20 @@
     </p:spTree>
     <p:extLst>
       <p:ext uri="{BB962C8B-B14F-4D97-AF65-F5344CB8AC3E}">
-        <p14:creationId xmlns:p14="http://schemas.microsoft.com/office/powerpoint/2010/main" val="2893191071"/>
+        <p14:creationId xmlns:p14="http://schemas.microsoft.com/office/powerpoint/2010/main" xmlns="" val="2893191071"/>
       </p:ext>
     </p:extLst>
   </p:cSld>
   <p:clrMapOvr>
     <a:masterClrMapping/>
   </p:clrMapOvr>
+  <p:timing>
+    <p:tnLst>
+      <p:par>
+        <p:cTn id="1" dur="indefinite" restart="never" nodeType="tmRoot"/>
+      </p:par>
+    </p:tnLst>
+  </p:timing>
 </p:sld>
 </file>
 
@@ -19089,7 +19231,7 @@
           <p:cNvPr id="4" name="Rectángulo 3">
             <a:extLst>
               <a:ext uri="{FF2B5EF4-FFF2-40B4-BE49-F238E27FC236}">
-                <a16:creationId xmlns:a16="http://schemas.microsoft.com/office/drawing/2014/main" id="{B0F1B4F4-0C7A-4C0E-8584-95718BC545EC}"/>
+                <a16:creationId xmlns:a16="http://schemas.microsoft.com/office/drawing/2014/main" xmlns="" id="{B0F1B4F4-0C7A-4C0E-8584-95718BC545EC}"/>
               </a:ext>
             </a:extLst>
           </p:cNvPr>
@@ -19135,7 +19277,7 @@
     </p:spTree>
     <p:extLst>
       <p:ext uri="{BB962C8B-B14F-4D97-AF65-F5344CB8AC3E}">
-        <p14:creationId xmlns:p14="http://schemas.microsoft.com/office/powerpoint/2010/main" val="115837642"/>
+        <p14:creationId xmlns:p14="http://schemas.microsoft.com/office/powerpoint/2010/main" xmlns="" val="115837642"/>
       </p:ext>
     </p:extLst>
   </p:cSld>
@@ -19198,7 +19340,7 @@
           <p:cNvPr id="6" name="1 Título">
             <a:extLst>
               <a:ext uri="{FF2B5EF4-FFF2-40B4-BE49-F238E27FC236}">
-                <a16:creationId xmlns:a16="http://schemas.microsoft.com/office/drawing/2014/main" id="{F186F2D6-48EB-4235-B54E-B7DB7712C32E}"/>
+                <a16:creationId xmlns:a16="http://schemas.microsoft.com/office/drawing/2014/main" xmlns="" id="{F186F2D6-48EB-4235-B54E-B7DB7712C32E}"/>
               </a:ext>
             </a:extLst>
           </p:cNvPr>
@@ -20033,6 +20175,9 @@
           <a:ln>
             <a:tailEnd type="arrow"/>
           </a:ln>
+          <a:effectLst>
+            <a:reflection blurRad="12700" stA="26000" endPos="32000" dist="12700" dir="5400000" sy="-100000" rotWithShape="0"/>
+          </a:effectLst>
         </p:spPr>
         <p:style>
           <a:lnRef idx="3">
@@ -20069,6 +20214,9 @@
           <a:ln>
             <a:tailEnd type="arrow"/>
           </a:ln>
+          <a:effectLst>
+            <a:reflection blurRad="12700" stA="26000" endPos="32000" dist="12700" dir="5400000" sy="-100000" rotWithShape="0"/>
+          </a:effectLst>
         </p:spPr>
         <p:style>
           <a:lnRef idx="3">
@@ -20286,7 +20434,7 @@
     </p:spTree>
     <p:extLst>
       <p:ext uri="{BB962C8B-B14F-4D97-AF65-F5344CB8AC3E}">
-        <p14:creationId xmlns:p14="http://schemas.microsoft.com/office/powerpoint/2010/main" val="3792767168"/>
+        <p14:creationId xmlns:p14="http://schemas.microsoft.com/office/powerpoint/2010/main" xmlns="" val="3792767168"/>
       </p:ext>
     </p:extLst>
   </p:cSld>
@@ -20318,7 +20466,7 @@
           <p:cNvPr id="4" name="Rectángulo 3">
             <a:extLst>
               <a:ext uri="{FF2B5EF4-FFF2-40B4-BE49-F238E27FC236}">
-                <a16:creationId xmlns:a16="http://schemas.microsoft.com/office/drawing/2014/main" id="{B0F1B4F4-0C7A-4C0E-8584-95718BC545EC}"/>
+                <a16:creationId xmlns:a16="http://schemas.microsoft.com/office/drawing/2014/main" xmlns="" id="{B0F1B4F4-0C7A-4C0E-8584-95718BC545EC}"/>
               </a:ext>
             </a:extLst>
           </p:cNvPr>
@@ -20377,7 +20525,7 @@
     </p:spTree>
     <p:extLst>
       <p:ext uri="{BB962C8B-B14F-4D97-AF65-F5344CB8AC3E}">
-        <p14:creationId xmlns:p14="http://schemas.microsoft.com/office/powerpoint/2010/main" val="3888593392"/>
+        <p14:creationId xmlns:p14="http://schemas.microsoft.com/office/powerpoint/2010/main" xmlns="" val="3888593392"/>
       </p:ext>
     </p:extLst>
   </p:cSld>
@@ -20409,7 +20557,7 @@
           <p:cNvPr id="2" name="Título 1">
             <a:extLst>
               <a:ext uri="{FF2B5EF4-FFF2-40B4-BE49-F238E27FC236}">
-                <a16:creationId xmlns:a16="http://schemas.microsoft.com/office/drawing/2014/main" id="{0ED6D180-92C1-4333-BA91-2BBA4DD94A3B}"/>
+                <a16:creationId xmlns:a16="http://schemas.microsoft.com/office/drawing/2014/main" xmlns="" id="{0ED6D180-92C1-4333-BA91-2BBA4DD94A3B}"/>
               </a:ext>
             </a:extLst>
           </p:cNvPr>
@@ -20446,7 +20594,7 @@
           <p:cNvPr id="6" name="CuadroTexto 5">
             <a:extLst>
               <a:ext uri="{FF2B5EF4-FFF2-40B4-BE49-F238E27FC236}">
-                <a16:creationId xmlns:a16="http://schemas.microsoft.com/office/drawing/2014/main" id="{BC8D092D-6667-447D-B473-A50467138064}"/>
+                <a16:creationId xmlns:a16="http://schemas.microsoft.com/office/drawing/2014/main" xmlns="" id="{BC8D092D-6667-447D-B473-A50467138064}"/>
               </a:ext>
             </a:extLst>
           </p:cNvPr>
@@ -20573,7 +20721,7 @@
     </p:spTree>
     <p:extLst>
       <p:ext uri="{BB962C8B-B14F-4D97-AF65-F5344CB8AC3E}">
-        <p14:creationId xmlns:p14="http://schemas.microsoft.com/office/powerpoint/2010/main" val="2147726924"/>
+        <p14:creationId xmlns:p14="http://schemas.microsoft.com/office/powerpoint/2010/main" xmlns="" val="2147726924"/>
       </p:ext>
     </p:extLst>
   </p:cSld>
@@ -20605,7 +20753,7 @@
           <p:cNvPr id="4" name="Rectángulo 3">
             <a:extLst>
               <a:ext uri="{FF2B5EF4-FFF2-40B4-BE49-F238E27FC236}">
-                <a16:creationId xmlns:a16="http://schemas.microsoft.com/office/drawing/2014/main" id="{B0F1B4F4-0C7A-4C0E-8584-95718BC545EC}"/>
+                <a16:creationId xmlns:a16="http://schemas.microsoft.com/office/drawing/2014/main" xmlns="" id="{B0F1B4F4-0C7A-4C0E-8584-95718BC545EC}"/>
               </a:ext>
             </a:extLst>
           </p:cNvPr>
@@ -20669,7 +20817,7 @@
           <p:cNvPr id="2" name="CuadroTexto 1">
             <a:extLst>
               <a:ext uri="{FF2B5EF4-FFF2-40B4-BE49-F238E27FC236}">
-                <a16:creationId xmlns:a16="http://schemas.microsoft.com/office/drawing/2014/main" id="{BBF285E2-50A8-4654-BD24-220C20D7C57B}"/>
+                <a16:creationId xmlns:a16="http://schemas.microsoft.com/office/drawing/2014/main" xmlns="" id="{BBF285E2-50A8-4654-BD24-220C20D7C57B}"/>
               </a:ext>
             </a:extLst>
           </p:cNvPr>
@@ -20702,7 +20850,7 @@
     </p:spTree>
     <p:extLst>
       <p:ext uri="{BB962C8B-B14F-4D97-AF65-F5344CB8AC3E}">
-        <p14:creationId xmlns:p14="http://schemas.microsoft.com/office/powerpoint/2010/main" val="3442063561"/>
+        <p14:creationId xmlns:p14="http://schemas.microsoft.com/office/powerpoint/2010/main" xmlns="" val="3442063561"/>
       </p:ext>
     </p:extLst>
   </p:cSld>
@@ -20734,7 +20882,7 @@
           <p:cNvPr id="2" name="Título 1">
             <a:extLst>
               <a:ext uri="{FF2B5EF4-FFF2-40B4-BE49-F238E27FC236}">
-                <a16:creationId xmlns:a16="http://schemas.microsoft.com/office/drawing/2014/main" id="{A08BF852-5F19-46F2-83FE-6528AEC95981}"/>
+                <a16:creationId xmlns:a16="http://schemas.microsoft.com/office/drawing/2014/main" xmlns="" id="{A08BF852-5F19-46F2-83FE-6528AEC95981}"/>
               </a:ext>
             </a:extLst>
           </p:cNvPr>
@@ -20779,7 +20927,7 @@
           <p:cNvPr id="3" name="Marcador de contenido 2">
             <a:extLst>
               <a:ext uri="{FF2B5EF4-FFF2-40B4-BE49-F238E27FC236}">
-                <a16:creationId xmlns:a16="http://schemas.microsoft.com/office/drawing/2014/main" id="{4825B7B8-2642-4E50-9E0D-E85148EB6652}"/>
+                <a16:creationId xmlns:a16="http://schemas.microsoft.com/office/drawing/2014/main" xmlns="" id="{4825B7B8-2642-4E50-9E0D-E85148EB6652}"/>
               </a:ext>
             </a:extLst>
           </p:cNvPr>
@@ -20893,13 +21041,20 @@
     </p:spTree>
     <p:extLst>
       <p:ext uri="{BB962C8B-B14F-4D97-AF65-F5344CB8AC3E}">
-        <p14:creationId xmlns:p14="http://schemas.microsoft.com/office/powerpoint/2010/main" val="493199861"/>
+        <p14:creationId xmlns:p14="http://schemas.microsoft.com/office/powerpoint/2010/main" xmlns="" val="493199861"/>
       </p:ext>
     </p:extLst>
   </p:cSld>
   <p:clrMapOvr>
     <a:masterClrMapping/>
   </p:clrMapOvr>
+  <p:timing>
+    <p:tnLst>
+      <p:par>
+        <p:cTn id="1" dur="indefinite" restart="never" nodeType="tmRoot"/>
+      </p:par>
+    </p:tnLst>
+  </p:timing>
 </p:sld>
 </file>
 
@@ -20922,7 +21077,7 @@
       </p:grpSpPr>
       <p:pic>
         <p:nvPicPr>
-          <p:cNvPr id="2050" name="Picture 2" descr="C:\Users\Usuario\Desktop\PRESENTACION FINAL - LDS\Diagrama funcionamiento sistema.png"/>
+          <p:cNvPr id="1026" name="Picture 2" descr="C:\Users\Usuario\Desktop\PRESENTACION FINAL - LDS\Diagrama funcionamiento sistema.png"/>
           <p:cNvPicPr>
             <a:picLocks noChangeAspect="1" noChangeArrowheads="1"/>
           </p:cNvPicPr>
@@ -20951,6 +21106,13 @@
   <p:clrMapOvr>
     <a:masterClrMapping/>
   </p:clrMapOvr>
+  <p:timing>
+    <p:tnLst>
+      <p:par>
+        <p:cTn id="1" dur="indefinite" restart="never" nodeType="tmRoot"/>
+      </p:par>
+    </p:tnLst>
+  </p:timing>
 </p:sld>
 </file>
 
@@ -20976,7 +21138,7 @@
           <p:cNvPr id="9" name="Elipse 8">
             <a:extLst>
               <a:ext uri="{FF2B5EF4-FFF2-40B4-BE49-F238E27FC236}">
-                <a16:creationId xmlns:a16="http://schemas.microsoft.com/office/drawing/2014/main" id="{669363E3-65EC-4B6C-B5A2-86799758077C}"/>
+                <a16:creationId xmlns:a16="http://schemas.microsoft.com/office/drawing/2014/main" xmlns="" id="{669363E3-65EC-4B6C-B5A2-86799758077C}"/>
               </a:ext>
             </a:extLst>
           </p:cNvPr>
@@ -21020,7 +21182,7 @@
           <p:cNvPr id="11" name="Elipse 10">
             <a:extLst>
               <a:ext uri="{FF2B5EF4-FFF2-40B4-BE49-F238E27FC236}">
-                <a16:creationId xmlns:a16="http://schemas.microsoft.com/office/drawing/2014/main" id="{1B4CFB39-227C-45B0-9FFA-5482B1E7B481}"/>
+                <a16:creationId xmlns:a16="http://schemas.microsoft.com/office/drawing/2014/main" xmlns="" id="{1B4CFB39-227C-45B0-9FFA-5482B1E7B481}"/>
               </a:ext>
             </a:extLst>
           </p:cNvPr>
@@ -21064,7 +21226,7 @@
           <p:cNvPr id="2" name="Título 1">
             <a:extLst>
               <a:ext uri="{FF2B5EF4-FFF2-40B4-BE49-F238E27FC236}">
-                <a16:creationId xmlns:a16="http://schemas.microsoft.com/office/drawing/2014/main" id="{0ED6D180-92C1-4333-BA91-2BBA4DD94A3B}"/>
+                <a16:creationId xmlns:a16="http://schemas.microsoft.com/office/drawing/2014/main" xmlns="" id="{0ED6D180-92C1-4333-BA91-2BBA4DD94A3B}"/>
               </a:ext>
             </a:extLst>
           </p:cNvPr>
@@ -21101,7 +21263,7 @@
           <p:cNvPr id="15" name="CuadroTexto 14">
             <a:extLst>
               <a:ext uri="{FF2B5EF4-FFF2-40B4-BE49-F238E27FC236}">
-                <a16:creationId xmlns:a16="http://schemas.microsoft.com/office/drawing/2014/main" id="{69C0BCF2-7C39-4E40-9C2B-2198580F3E40}"/>
+                <a16:creationId xmlns:a16="http://schemas.microsoft.com/office/drawing/2014/main" xmlns="" id="{69C0BCF2-7C39-4E40-9C2B-2198580F3E40}"/>
               </a:ext>
             </a:extLst>
           </p:cNvPr>
@@ -21172,7 +21334,7 @@
           <p:cNvPr id="17" name="CuadroTexto 16">
             <a:extLst>
               <a:ext uri="{FF2B5EF4-FFF2-40B4-BE49-F238E27FC236}">
-                <a16:creationId xmlns:a16="http://schemas.microsoft.com/office/drawing/2014/main" id="{F0BB235C-3047-4EFA-8B74-0EE023A1B6DF}"/>
+                <a16:creationId xmlns:a16="http://schemas.microsoft.com/office/drawing/2014/main" xmlns="" id="{F0BB235C-3047-4EFA-8B74-0EE023A1B6DF}"/>
               </a:ext>
             </a:extLst>
           </p:cNvPr>
@@ -21213,7 +21375,7 @@
           <p:cNvPr id="12" name="Imagen 11">
             <a:extLst>
               <a:ext uri="{FF2B5EF4-FFF2-40B4-BE49-F238E27FC236}">
-                <a16:creationId xmlns:a16="http://schemas.microsoft.com/office/drawing/2014/main" id="{2A9D7A44-27F6-4502-B24D-E951B30D6332}"/>
+                <a16:creationId xmlns:a16="http://schemas.microsoft.com/office/drawing/2014/main" xmlns="" id="{2A9D7A44-27F6-4502-B24D-E951B30D6332}"/>
               </a:ext>
             </a:extLst>
           </p:cNvPr>
@@ -21226,7 +21388,7 @@
           <a:blip r:embed="rId2" cstate="print">
             <a:extLst>
               <a:ext uri="{28A0092B-C50C-407E-A947-70E740481C1C}">
-                <a14:useLocalDpi xmlns:a14="http://schemas.microsoft.com/office/drawing/2010/main" val="0"/>
+                <a14:useLocalDpi xmlns:a14="http://schemas.microsoft.com/office/drawing/2010/main" xmlns="" val="0"/>
               </a:ext>
             </a:extLst>
           </a:blip>
@@ -21249,7 +21411,7 @@
           <p:cNvPr id="19" name="Imagen 18">
             <a:extLst>
               <a:ext uri="{FF2B5EF4-FFF2-40B4-BE49-F238E27FC236}">
-                <a16:creationId xmlns:a16="http://schemas.microsoft.com/office/drawing/2014/main" id="{82895803-8F79-4265-84E7-2467F906676D}"/>
+                <a16:creationId xmlns:a16="http://schemas.microsoft.com/office/drawing/2014/main" xmlns="" id="{82895803-8F79-4265-84E7-2467F906676D}"/>
               </a:ext>
             </a:extLst>
           </p:cNvPr>
@@ -21262,7 +21424,7 @@
           <a:blip r:embed="rId3" cstate="print">
             <a:extLst>
               <a:ext uri="{28A0092B-C50C-407E-A947-70E740481C1C}">
-                <a14:useLocalDpi xmlns:a14="http://schemas.microsoft.com/office/drawing/2010/main" val="0"/>
+                <a14:useLocalDpi xmlns:a14="http://schemas.microsoft.com/office/drawing/2010/main" xmlns="" val="0"/>
               </a:ext>
             </a:extLst>
           </a:blip>
@@ -21283,13 +21445,20 @@
     </p:spTree>
     <p:extLst>
       <p:ext uri="{BB962C8B-B14F-4D97-AF65-F5344CB8AC3E}">
-        <p14:creationId xmlns:p14="http://schemas.microsoft.com/office/powerpoint/2010/main" val="779257163"/>
+        <p14:creationId xmlns:p14="http://schemas.microsoft.com/office/powerpoint/2010/main" xmlns="" val="779257163"/>
       </p:ext>
     </p:extLst>
   </p:cSld>
   <p:clrMapOvr>
     <a:masterClrMapping/>
   </p:clrMapOvr>
+  <p:timing>
+    <p:tnLst>
+      <p:par>
+        <p:cTn id="1" dur="indefinite" restart="never" nodeType="tmRoot"/>
+      </p:par>
+    </p:tnLst>
+  </p:timing>
 </p:sld>
 </file>
 
@@ -21315,7 +21484,7 @@
           <p:cNvPr id="4" name="Rectángulo 3">
             <a:extLst>
               <a:ext uri="{FF2B5EF4-FFF2-40B4-BE49-F238E27FC236}">
-                <a16:creationId xmlns:a16="http://schemas.microsoft.com/office/drawing/2014/main" id="{B0F1B4F4-0C7A-4C0E-8584-95718BC545EC}"/>
+                <a16:creationId xmlns:a16="http://schemas.microsoft.com/office/drawing/2014/main" xmlns="" id="{B0F1B4F4-0C7A-4C0E-8584-95718BC545EC}"/>
               </a:ext>
             </a:extLst>
           </p:cNvPr>
@@ -21374,7 +21543,7 @@
     </p:spTree>
     <p:extLst>
       <p:ext uri="{BB962C8B-B14F-4D97-AF65-F5344CB8AC3E}">
-        <p14:creationId xmlns:p14="http://schemas.microsoft.com/office/powerpoint/2010/main" val="4228125147"/>
+        <p14:creationId xmlns:p14="http://schemas.microsoft.com/office/powerpoint/2010/main" xmlns="" val="4228125147"/>
       </p:ext>
     </p:extLst>
   </p:cSld>
@@ -21406,7 +21575,7 @@
           <p:cNvPr id="2" name="Título 1">
             <a:extLst>
               <a:ext uri="{FF2B5EF4-FFF2-40B4-BE49-F238E27FC236}">
-                <a16:creationId xmlns:a16="http://schemas.microsoft.com/office/drawing/2014/main" id="{0ED6D180-92C1-4333-BA91-2BBA4DD94A3B}"/>
+                <a16:creationId xmlns:a16="http://schemas.microsoft.com/office/drawing/2014/main" xmlns="" id="{0ED6D180-92C1-4333-BA91-2BBA4DD94A3B}"/>
               </a:ext>
             </a:extLst>
           </p:cNvPr>
@@ -21443,7 +21612,7 @@
           <p:cNvPr id="4" name="CuadroTexto 3">
             <a:extLst>
               <a:ext uri="{FF2B5EF4-FFF2-40B4-BE49-F238E27FC236}">
-                <a16:creationId xmlns:a16="http://schemas.microsoft.com/office/drawing/2014/main" id="{077AD978-631F-4986-B928-CABD7DCA36D6}"/>
+                <a16:creationId xmlns:a16="http://schemas.microsoft.com/office/drawing/2014/main" xmlns="" id="{077AD978-631F-4986-B928-CABD7DCA36D6}"/>
               </a:ext>
             </a:extLst>
           </p:cNvPr>
@@ -21537,7 +21706,7 @@
     </p:spTree>
     <p:extLst>
       <p:ext uri="{BB962C8B-B14F-4D97-AF65-F5344CB8AC3E}">
-        <p14:creationId xmlns:p14="http://schemas.microsoft.com/office/powerpoint/2010/main" val="3252879309"/>
+        <p14:creationId xmlns:p14="http://schemas.microsoft.com/office/powerpoint/2010/main" xmlns="" val="3252879309"/>
       </p:ext>
     </p:extLst>
   </p:cSld>
@@ -21569,7 +21738,7 @@
           <p:cNvPr id="2" name="Título 1">
             <a:extLst>
               <a:ext uri="{FF2B5EF4-FFF2-40B4-BE49-F238E27FC236}">
-                <a16:creationId xmlns:a16="http://schemas.microsoft.com/office/drawing/2014/main" id="{0ED6D180-92C1-4333-BA91-2BBA4DD94A3B}"/>
+                <a16:creationId xmlns:a16="http://schemas.microsoft.com/office/drawing/2014/main" xmlns="" id="{0ED6D180-92C1-4333-BA91-2BBA4DD94A3B}"/>
               </a:ext>
             </a:extLst>
           </p:cNvPr>
@@ -21606,7 +21775,7 @@
           <p:cNvPr id="6" name="CuadroTexto 5">
             <a:extLst>
               <a:ext uri="{FF2B5EF4-FFF2-40B4-BE49-F238E27FC236}">
-                <a16:creationId xmlns:a16="http://schemas.microsoft.com/office/drawing/2014/main" id="{BC8D092D-6667-447D-B473-A50467138064}"/>
+                <a16:creationId xmlns:a16="http://schemas.microsoft.com/office/drawing/2014/main" xmlns="" id="{BC8D092D-6667-447D-B473-A50467138064}"/>
               </a:ext>
             </a:extLst>
           </p:cNvPr>
@@ -21695,7 +21864,7 @@
     </p:spTree>
     <p:extLst>
       <p:ext uri="{BB962C8B-B14F-4D97-AF65-F5344CB8AC3E}">
-        <p14:creationId xmlns:p14="http://schemas.microsoft.com/office/powerpoint/2010/main" val="2333497509"/>
+        <p14:creationId xmlns:p14="http://schemas.microsoft.com/office/powerpoint/2010/main" xmlns="" val="2333497509"/>
       </p:ext>
     </p:extLst>
   </p:cSld>
@@ -21955,7 +22124,7 @@
   <a:extraClrSchemeLst/>
   <a:extLst>
     <a:ext uri="{05A4C25C-085E-4340-85A3-A5531E510DB2}">
-      <thm15:themeFamily xmlns:thm15="http://schemas.microsoft.com/office/thememl/2012/main" name="Parallax" id="{3388167B-A2EB-4685-9635-1831D9AEF8C4}" vid="{4F7A876A-7598-49CA-AFC8-8EDA2551E4A7}"/>
+      <thm15:themeFamily xmlns:thm15="http://schemas.microsoft.com/office/thememl/2012/main" xmlns="" name="Parallax" id="{3388167B-A2EB-4685-9635-1831D9AEF8C4}" vid="{4F7A876A-7598-49CA-AFC8-8EDA2551E4A7}"/>
     </a:ext>
   </a:extLst>
 </a:theme>
@@ -22216,7 +22385,7 @@
   <a:extraClrSchemeLst/>
   <a:extLst>
     <a:ext uri="{05A4C25C-085E-4340-85A3-A5531E510DB2}">
-      <thm15:themeFamily xmlns:thm15="http://schemas.microsoft.com/office/thememl/2012/main" name="Office Theme" id="{62F939B6-93AF-4DB8-9C6B-D6C7DFDC589F}" vid="{4A3C46E8-61CC-4603-A589-7422A47A8E4A}"/>
+      <thm15:themeFamily xmlns:thm15="http://schemas.microsoft.com/office/thememl/2012/main" xmlns="" name="Office Theme" id="{62F939B6-93AF-4DB8-9C6B-D6C7DFDC589F}" vid="{4A3C46E8-61CC-4603-A589-7422A47A8E4A}"/>
     </a:ext>
   </a:extLst>
 </a:theme>

</xml_diff>

<commit_message>
Se actualiza presentación final
</commit_message>
<xml_diff>
--- a/Presentaciones/Presentación VASPA - Diciembre 2020 - Examen Final/Presentación VASPA - Diciembre 2020 - Examen Final.pptx
+++ b/Presentaciones/Presentación VASPA - Diciembre 2020 - Examen Final/Presentación VASPA - Diciembre 2020 - Examen Final.pptx
@@ -202,6 +202,7 @@
           </a:p>
         </c:rich>
       </c:tx>
+      <c:layout/>
       <c:overlay val="0"/>
       <c:spPr>
         <a:noFill/>
@@ -609,6 +610,7 @@
     </c:plotArea>
     <c:legend>
       <c:legendPos val="b"/>
+      <c:layout/>
       <c:overlay val="0"/>
       <c:spPr>
         <a:noFill/>
@@ -640,6 +642,7 @@
     </c:legend>
     <c:plotVisOnly val="1"/>
     <c:dispBlanksAs val="gap"/>
+    <c:showDLblsOverMax val="0"/>
     <c:extLst>
       <c:ext xmlns:c16r3="http://schemas.microsoft.com/office/drawing/2017/03/chart" uri="{56B9EC1D-385E-4148-901F-78D8002777C0}">
         <c16r3:dataDisplayOptions16>
@@ -647,7 +650,6 @@
         </c16r3:dataDisplayOptions16>
       </c:ext>
     </c:extLst>
-    <c:showDLblsOverMax val="0"/>
   </c:chart>
   <c:spPr>
     <a:solidFill>
@@ -2406,6 +2408,13 @@
         </dgm:presLayoutVars>
       </dgm:prSet>
       <dgm:spPr/>
+      <dgm:t>
+        <a:bodyPr/>
+        <a:lstStyle/>
+        <a:p>
+          <a:endParaRPr lang="es-ES"/>
+        </a:p>
+      </dgm:t>
     </dgm:pt>
     <dgm:pt modelId="{3D5C674D-195F-4346-A602-68D809648B83}" type="pres">
       <dgm:prSet presAssocID="{853FF75D-08FD-4C0B-97FF-B95C5121D1D7}" presName="parTxOnly" presStyleLbl="node1" presStyleIdx="0" presStyleCnt="4">
@@ -2416,6 +2425,13 @@
         </dgm:presLayoutVars>
       </dgm:prSet>
       <dgm:spPr/>
+      <dgm:t>
+        <a:bodyPr/>
+        <a:lstStyle/>
+        <a:p>
+          <a:endParaRPr lang="es-ES"/>
+        </a:p>
+      </dgm:t>
     </dgm:pt>
     <dgm:pt modelId="{4DCC4052-4221-44D0-84E2-29AAAD96FCB3}" type="pres">
       <dgm:prSet presAssocID="{888E8F23-D971-4F49-AF2A-2D3F7847711C}" presName="parTxOnlySpace" presStyleCnt="0"/>
@@ -2430,6 +2446,13 @@
         </dgm:presLayoutVars>
       </dgm:prSet>
       <dgm:spPr/>
+      <dgm:t>
+        <a:bodyPr/>
+        <a:lstStyle/>
+        <a:p>
+          <a:endParaRPr lang="es-ES"/>
+        </a:p>
+      </dgm:t>
     </dgm:pt>
     <dgm:pt modelId="{A6E2C1E9-D2ED-47B3-A71D-FDA80BA4D0C1}" type="pres">
       <dgm:prSet presAssocID="{431F7064-B371-4D30-9440-9276B420E393}" presName="parTxOnlySpace" presStyleCnt="0"/>
@@ -2444,6 +2467,13 @@
         </dgm:presLayoutVars>
       </dgm:prSet>
       <dgm:spPr/>
+      <dgm:t>
+        <a:bodyPr/>
+        <a:lstStyle/>
+        <a:p>
+          <a:endParaRPr lang="es-ES"/>
+        </a:p>
+      </dgm:t>
     </dgm:pt>
     <dgm:pt modelId="{FA28285D-C85B-47E5-8E04-E3031E7EB070}" type="pres">
       <dgm:prSet presAssocID="{50E5B106-8092-4055-AC3C-E16AB9A8A632}" presName="parTxOnlySpace" presStyleCnt="0"/>
@@ -2458,18 +2488,25 @@
         </dgm:presLayoutVars>
       </dgm:prSet>
       <dgm:spPr/>
+      <dgm:t>
+        <a:bodyPr/>
+        <a:lstStyle/>
+        <a:p>
+          <a:endParaRPr lang="es-ES"/>
+        </a:p>
+      </dgm:t>
     </dgm:pt>
   </dgm:ptLst>
   <dgm:cxnLst>
+    <dgm:cxn modelId="{5E7AA7A8-CA8D-46F6-8417-A9E8900910E7}" type="presOf" srcId="{07D852F8-DC80-412E-99FF-CBC8CF6E9E53}" destId="{BB3205ED-EB8F-4AA2-A69D-916A25FD317F}" srcOrd="0" destOrd="0" presId="urn:microsoft.com/office/officeart/2005/8/layout/chevron1"/>
+    <dgm:cxn modelId="{49728C46-9AF0-4404-B77C-0BF8753B1BE2}" srcId="{07D852F8-DC80-412E-99FF-CBC8CF6E9E53}" destId="{3B4EE390-B919-49DE-81BE-0780A08DDBFA}" srcOrd="2" destOrd="0" parTransId="{3B1FF57E-AA55-4079-B104-9BCA769CA707}" sibTransId="{50E5B106-8092-4055-AC3C-E16AB9A8A632}"/>
+    <dgm:cxn modelId="{24BDC4C3-8E68-4ABC-A0DA-A0FE0C4BE3D4}" srcId="{07D852F8-DC80-412E-99FF-CBC8CF6E9E53}" destId="{3E85E467-C11E-426F-9200-FC251BE43DEA}" srcOrd="1" destOrd="0" parTransId="{83EB3A9D-25F1-42C7-AA54-1B46554184BF}" sibTransId="{431F7064-B371-4D30-9440-9276B420E393}"/>
+    <dgm:cxn modelId="{C846122C-05FD-4C41-8444-CC3A300BDFFE}" srcId="{07D852F8-DC80-412E-99FF-CBC8CF6E9E53}" destId="{853FF75D-08FD-4C0B-97FF-B95C5121D1D7}" srcOrd="0" destOrd="0" parTransId="{BD4839AE-4C9F-4F18-92E9-4B1323829560}" sibTransId="{888E8F23-D971-4F49-AF2A-2D3F7847711C}"/>
     <dgm:cxn modelId="{7D2F0A27-3D8B-4128-8CB3-A82F5F34B1DA}" type="presOf" srcId="{3B4EE390-B919-49DE-81BE-0780A08DDBFA}" destId="{AEA2C0A0-0FCA-4EB1-AA5B-89E50BC14E35}" srcOrd="0" destOrd="0" presId="urn:microsoft.com/office/officeart/2005/8/layout/chevron1"/>
-    <dgm:cxn modelId="{C846122C-05FD-4C41-8444-CC3A300BDFFE}" srcId="{07D852F8-DC80-412E-99FF-CBC8CF6E9E53}" destId="{853FF75D-08FD-4C0B-97FF-B95C5121D1D7}" srcOrd="0" destOrd="0" parTransId="{BD4839AE-4C9F-4F18-92E9-4B1323829560}" sibTransId="{888E8F23-D971-4F49-AF2A-2D3F7847711C}"/>
-    <dgm:cxn modelId="{49728C46-9AF0-4404-B77C-0BF8753B1BE2}" srcId="{07D852F8-DC80-412E-99FF-CBC8CF6E9E53}" destId="{3B4EE390-B919-49DE-81BE-0780A08DDBFA}" srcOrd="2" destOrd="0" parTransId="{3B1FF57E-AA55-4079-B104-9BCA769CA707}" sibTransId="{50E5B106-8092-4055-AC3C-E16AB9A8A632}"/>
+    <dgm:cxn modelId="{D76B3C6A-BC4F-4872-BB7B-7982459BAA86}" type="presOf" srcId="{853FF75D-08FD-4C0B-97FF-B95C5121D1D7}" destId="{3D5C674D-195F-4346-A602-68D809648B83}" srcOrd="0" destOrd="0" presId="urn:microsoft.com/office/officeart/2005/8/layout/chevron1"/>
+    <dgm:cxn modelId="{61C2D7D0-DEE2-4010-B64E-4D1FEDBA0702}" srcId="{07D852F8-DC80-412E-99FF-CBC8CF6E9E53}" destId="{FE8D9DF2-8BC9-4E07-8005-D845C397B55E}" srcOrd="3" destOrd="0" parTransId="{5B8A1B7E-67AD-4057-819C-2245EC4F7AC4}" sibTransId="{5B54ED7F-A264-47E6-96E6-7D075AA7F363}"/>
+    <dgm:cxn modelId="{403E4FC9-6B5A-4E42-8B00-B4A63F0B56C0}" type="presOf" srcId="{3E85E467-C11E-426F-9200-FC251BE43DEA}" destId="{6886AB32-2506-433F-9563-157CC1EA1348}" srcOrd="0" destOrd="0" presId="urn:microsoft.com/office/officeart/2005/8/layout/chevron1"/>
     <dgm:cxn modelId="{D7B69E66-919E-4FAC-945E-964D8A3AC565}" type="presOf" srcId="{FE8D9DF2-8BC9-4E07-8005-D845C397B55E}" destId="{09B459DE-37E0-4270-82CB-D68CAF9A376E}" srcOrd="0" destOrd="0" presId="urn:microsoft.com/office/officeart/2005/8/layout/chevron1"/>
-    <dgm:cxn modelId="{D76B3C6A-BC4F-4872-BB7B-7982459BAA86}" type="presOf" srcId="{853FF75D-08FD-4C0B-97FF-B95C5121D1D7}" destId="{3D5C674D-195F-4346-A602-68D809648B83}" srcOrd="0" destOrd="0" presId="urn:microsoft.com/office/officeart/2005/8/layout/chevron1"/>
-    <dgm:cxn modelId="{5E7AA7A8-CA8D-46F6-8417-A9E8900910E7}" type="presOf" srcId="{07D852F8-DC80-412E-99FF-CBC8CF6E9E53}" destId="{BB3205ED-EB8F-4AA2-A69D-916A25FD317F}" srcOrd="0" destOrd="0" presId="urn:microsoft.com/office/officeart/2005/8/layout/chevron1"/>
-    <dgm:cxn modelId="{24BDC4C3-8E68-4ABC-A0DA-A0FE0C4BE3D4}" srcId="{07D852F8-DC80-412E-99FF-CBC8CF6E9E53}" destId="{3E85E467-C11E-426F-9200-FC251BE43DEA}" srcOrd="1" destOrd="0" parTransId="{83EB3A9D-25F1-42C7-AA54-1B46554184BF}" sibTransId="{431F7064-B371-4D30-9440-9276B420E393}"/>
-    <dgm:cxn modelId="{403E4FC9-6B5A-4E42-8B00-B4A63F0B56C0}" type="presOf" srcId="{3E85E467-C11E-426F-9200-FC251BE43DEA}" destId="{6886AB32-2506-433F-9563-157CC1EA1348}" srcOrd="0" destOrd="0" presId="urn:microsoft.com/office/officeart/2005/8/layout/chevron1"/>
-    <dgm:cxn modelId="{61C2D7D0-DEE2-4010-B64E-4D1FEDBA0702}" srcId="{07D852F8-DC80-412E-99FF-CBC8CF6E9E53}" destId="{FE8D9DF2-8BC9-4E07-8005-D845C397B55E}" srcOrd="3" destOrd="0" parTransId="{5B8A1B7E-67AD-4057-819C-2245EC4F7AC4}" sibTransId="{5B54ED7F-A264-47E6-96E6-7D075AA7F363}"/>
     <dgm:cxn modelId="{2F515B5D-54B1-4237-891D-39EC55794076}" type="presParOf" srcId="{BB3205ED-EB8F-4AA2-A69D-916A25FD317F}" destId="{3D5C674D-195F-4346-A602-68D809648B83}" srcOrd="0" destOrd="0" presId="urn:microsoft.com/office/officeart/2005/8/layout/chevron1"/>
     <dgm:cxn modelId="{624BFC5C-F915-4A8E-B04A-57BF8C238C73}" type="presParOf" srcId="{BB3205ED-EB8F-4AA2-A69D-916A25FD317F}" destId="{4DCC4052-4221-44D0-84E2-29AAAD96FCB3}" srcOrd="1" destOrd="0" presId="urn:microsoft.com/office/officeart/2005/8/layout/chevron1"/>
     <dgm:cxn modelId="{6BB152CA-DFDB-44B7-9F2B-2AD9DCE38131}" type="presParOf" srcId="{BB3205ED-EB8F-4AA2-A69D-916A25FD317F}" destId="{6886AB32-2506-433F-9563-157CC1EA1348}" srcOrd="2" destOrd="0" presId="urn:microsoft.com/office/officeart/2005/8/layout/chevron1"/>
@@ -2719,6 +2756,13 @@
         </dgm:presLayoutVars>
       </dgm:prSet>
       <dgm:spPr/>
+      <dgm:t>
+        <a:bodyPr/>
+        <a:lstStyle/>
+        <a:p>
+          <a:endParaRPr lang="es-ES"/>
+        </a:p>
+      </dgm:t>
     </dgm:pt>
     <dgm:pt modelId="{3D5C674D-195F-4346-A602-68D809648B83}" type="pres">
       <dgm:prSet presAssocID="{853FF75D-08FD-4C0B-97FF-B95C5121D1D7}" presName="parTxOnly" presStyleLbl="node1" presStyleIdx="0" presStyleCnt="4">
@@ -2729,6 +2773,13 @@
         </dgm:presLayoutVars>
       </dgm:prSet>
       <dgm:spPr/>
+      <dgm:t>
+        <a:bodyPr/>
+        <a:lstStyle/>
+        <a:p>
+          <a:endParaRPr lang="es-ES"/>
+        </a:p>
+      </dgm:t>
     </dgm:pt>
     <dgm:pt modelId="{4DCC4052-4221-44D0-84E2-29AAAD96FCB3}" type="pres">
       <dgm:prSet presAssocID="{888E8F23-D971-4F49-AF2A-2D3F7847711C}" presName="parTxOnlySpace" presStyleCnt="0"/>
@@ -2743,6 +2794,13 @@
         </dgm:presLayoutVars>
       </dgm:prSet>
       <dgm:spPr/>
+      <dgm:t>
+        <a:bodyPr/>
+        <a:lstStyle/>
+        <a:p>
+          <a:endParaRPr lang="es-ES"/>
+        </a:p>
+      </dgm:t>
     </dgm:pt>
     <dgm:pt modelId="{A6E2C1E9-D2ED-47B3-A71D-FDA80BA4D0C1}" type="pres">
       <dgm:prSet presAssocID="{431F7064-B371-4D30-9440-9276B420E393}" presName="parTxOnlySpace" presStyleCnt="0"/>
@@ -2757,6 +2815,13 @@
         </dgm:presLayoutVars>
       </dgm:prSet>
       <dgm:spPr/>
+      <dgm:t>
+        <a:bodyPr/>
+        <a:lstStyle/>
+        <a:p>
+          <a:endParaRPr lang="es-ES"/>
+        </a:p>
+      </dgm:t>
     </dgm:pt>
     <dgm:pt modelId="{FA28285D-C85B-47E5-8E04-E3031E7EB070}" type="pres">
       <dgm:prSet presAssocID="{50E5B106-8092-4055-AC3C-E16AB9A8A632}" presName="parTxOnlySpace" presStyleCnt="0"/>
@@ -2771,18 +2836,25 @@
         </dgm:presLayoutVars>
       </dgm:prSet>
       <dgm:spPr/>
+      <dgm:t>
+        <a:bodyPr/>
+        <a:lstStyle/>
+        <a:p>
+          <a:endParaRPr lang="es-ES"/>
+        </a:p>
+      </dgm:t>
     </dgm:pt>
   </dgm:ptLst>
   <dgm:cxnLst>
+    <dgm:cxn modelId="{5E7AA7A8-CA8D-46F6-8417-A9E8900910E7}" type="presOf" srcId="{07D852F8-DC80-412E-99FF-CBC8CF6E9E53}" destId="{BB3205ED-EB8F-4AA2-A69D-916A25FD317F}" srcOrd="0" destOrd="0" presId="urn:microsoft.com/office/officeart/2005/8/layout/chevron1"/>
+    <dgm:cxn modelId="{49728C46-9AF0-4404-B77C-0BF8753B1BE2}" srcId="{07D852F8-DC80-412E-99FF-CBC8CF6E9E53}" destId="{3B4EE390-B919-49DE-81BE-0780A08DDBFA}" srcOrd="2" destOrd="0" parTransId="{3B1FF57E-AA55-4079-B104-9BCA769CA707}" sibTransId="{50E5B106-8092-4055-AC3C-E16AB9A8A632}"/>
+    <dgm:cxn modelId="{24BDC4C3-8E68-4ABC-A0DA-A0FE0C4BE3D4}" srcId="{07D852F8-DC80-412E-99FF-CBC8CF6E9E53}" destId="{3E85E467-C11E-426F-9200-FC251BE43DEA}" srcOrd="1" destOrd="0" parTransId="{83EB3A9D-25F1-42C7-AA54-1B46554184BF}" sibTransId="{431F7064-B371-4D30-9440-9276B420E393}"/>
+    <dgm:cxn modelId="{C846122C-05FD-4C41-8444-CC3A300BDFFE}" srcId="{07D852F8-DC80-412E-99FF-CBC8CF6E9E53}" destId="{853FF75D-08FD-4C0B-97FF-B95C5121D1D7}" srcOrd="0" destOrd="0" parTransId="{BD4839AE-4C9F-4F18-92E9-4B1323829560}" sibTransId="{888E8F23-D971-4F49-AF2A-2D3F7847711C}"/>
     <dgm:cxn modelId="{7D2F0A27-3D8B-4128-8CB3-A82F5F34B1DA}" type="presOf" srcId="{3B4EE390-B919-49DE-81BE-0780A08DDBFA}" destId="{AEA2C0A0-0FCA-4EB1-AA5B-89E50BC14E35}" srcOrd="0" destOrd="0" presId="urn:microsoft.com/office/officeart/2005/8/layout/chevron1"/>
-    <dgm:cxn modelId="{C846122C-05FD-4C41-8444-CC3A300BDFFE}" srcId="{07D852F8-DC80-412E-99FF-CBC8CF6E9E53}" destId="{853FF75D-08FD-4C0B-97FF-B95C5121D1D7}" srcOrd="0" destOrd="0" parTransId="{BD4839AE-4C9F-4F18-92E9-4B1323829560}" sibTransId="{888E8F23-D971-4F49-AF2A-2D3F7847711C}"/>
-    <dgm:cxn modelId="{49728C46-9AF0-4404-B77C-0BF8753B1BE2}" srcId="{07D852F8-DC80-412E-99FF-CBC8CF6E9E53}" destId="{3B4EE390-B919-49DE-81BE-0780A08DDBFA}" srcOrd="2" destOrd="0" parTransId="{3B1FF57E-AA55-4079-B104-9BCA769CA707}" sibTransId="{50E5B106-8092-4055-AC3C-E16AB9A8A632}"/>
+    <dgm:cxn modelId="{D76B3C6A-BC4F-4872-BB7B-7982459BAA86}" type="presOf" srcId="{853FF75D-08FD-4C0B-97FF-B95C5121D1D7}" destId="{3D5C674D-195F-4346-A602-68D809648B83}" srcOrd="0" destOrd="0" presId="urn:microsoft.com/office/officeart/2005/8/layout/chevron1"/>
+    <dgm:cxn modelId="{61C2D7D0-DEE2-4010-B64E-4D1FEDBA0702}" srcId="{07D852F8-DC80-412E-99FF-CBC8CF6E9E53}" destId="{FE8D9DF2-8BC9-4E07-8005-D845C397B55E}" srcOrd="3" destOrd="0" parTransId="{5B8A1B7E-67AD-4057-819C-2245EC4F7AC4}" sibTransId="{5B54ED7F-A264-47E6-96E6-7D075AA7F363}"/>
+    <dgm:cxn modelId="{403E4FC9-6B5A-4E42-8B00-B4A63F0B56C0}" type="presOf" srcId="{3E85E467-C11E-426F-9200-FC251BE43DEA}" destId="{6886AB32-2506-433F-9563-157CC1EA1348}" srcOrd="0" destOrd="0" presId="urn:microsoft.com/office/officeart/2005/8/layout/chevron1"/>
     <dgm:cxn modelId="{D7B69E66-919E-4FAC-945E-964D8A3AC565}" type="presOf" srcId="{FE8D9DF2-8BC9-4E07-8005-D845C397B55E}" destId="{09B459DE-37E0-4270-82CB-D68CAF9A376E}" srcOrd="0" destOrd="0" presId="urn:microsoft.com/office/officeart/2005/8/layout/chevron1"/>
-    <dgm:cxn modelId="{D76B3C6A-BC4F-4872-BB7B-7982459BAA86}" type="presOf" srcId="{853FF75D-08FD-4C0B-97FF-B95C5121D1D7}" destId="{3D5C674D-195F-4346-A602-68D809648B83}" srcOrd="0" destOrd="0" presId="urn:microsoft.com/office/officeart/2005/8/layout/chevron1"/>
-    <dgm:cxn modelId="{5E7AA7A8-CA8D-46F6-8417-A9E8900910E7}" type="presOf" srcId="{07D852F8-DC80-412E-99FF-CBC8CF6E9E53}" destId="{BB3205ED-EB8F-4AA2-A69D-916A25FD317F}" srcOrd="0" destOrd="0" presId="urn:microsoft.com/office/officeart/2005/8/layout/chevron1"/>
-    <dgm:cxn modelId="{24BDC4C3-8E68-4ABC-A0DA-A0FE0C4BE3D4}" srcId="{07D852F8-DC80-412E-99FF-CBC8CF6E9E53}" destId="{3E85E467-C11E-426F-9200-FC251BE43DEA}" srcOrd="1" destOrd="0" parTransId="{83EB3A9D-25F1-42C7-AA54-1B46554184BF}" sibTransId="{431F7064-B371-4D30-9440-9276B420E393}"/>
-    <dgm:cxn modelId="{403E4FC9-6B5A-4E42-8B00-B4A63F0B56C0}" type="presOf" srcId="{3E85E467-C11E-426F-9200-FC251BE43DEA}" destId="{6886AB32-2506-433F-9563-157CC1EA1348}" srcOrd="0" destOrd="0" presId="urn:microsoft.com/office/officeart/2005/8/layout/chevron1"/>
-    <dgm:cxn modelId="{61C2D7D0-DEE2-4010-B64E-4D1FEDBA0702}" srcId="{07D852F8-DC80-412E-99FF-CBC8CF6E9E53}" destId="{FE8D9DF2-8BC9-4E07-8005-D845C397B55E}" srcOrd="3" destOrd="0" parTransId="{5B8A1B7E-67AD-4057-819C-2245EC4F7AC4}" sibTransId="{5B54ED7F-A264-47E6-96E6-7D075AA7F363}"/>
     <dgm:cxn modelId="{2F515B5D-54B1-4237-891D-39EC55794076}" type="presParOf" srcId="{BB3205ED-EB8F-4AA2-A69D-916A25FD317F}" destId="{3D5C674D-195F-4346-A602-68D809648B83}" srcOrd="0" destOrd="0" presId="urn:microsoft.com/office/officeart/2005/8/layout/chevron1"/>
     <dgm:cxn modelId="{624BFC5C-F915-4A8E-B04A-57BF8C238C73}" type="presParOf" srcId="{BB3205ED-EB8F-4AA2-A69D-916A25FD317F}" destId="{4DCC4052-4221-44D0-84E2-29AAAD96FCB3}" srcOrd="1" destOrd="0" presId="urn:microsoft.com/office/officeart/2005/8/layout/chevron1"/>
     <dgm:cxn modelId="{6BB152CA-DFDB-44B7-9F2B-2AD9DCE38131}" type="presParOf" srcId="{BB3205ED-EB8F-4AA2-A69D-916A25FD317F}" destId="{6886AB32-2506-433F-9563-157CC1EA1348}" srcOrd="2" destOrd="0" presId="urn:microsoft.com/office/officeart/2005/8/layout/chevron1"/>
@@ -2883,7 +2955,7 @@
         </a:bodyPr>
         <a:lstStyle/>
         <a:p>
-          <a:pPr marL="0" lvl="0" indent="0" algn="ctr" defTabSz="755650">
+          <a:pPr lvl="0" algn="ctr" defTabSz="755650">
             <a:lnSpc>
               <a:spcPct val="90000"/>
             </a:lnSpc>
@@ -2893,7 +2965,6 @@
             <a:spcAft>
               <a:spcPct val="35000"/>
             </a:spcAft>
-            <a:buNone/>
           </a:pPr>
           <a:r>
             <a:rPr lang="es-ES" sz="1700" kern="1200" dirty="0"/>
@@ -2981,7 +3052,7 @@
         </a:bodyPr>
         <a:lstStyle/>
         <a:p>
-          <a:pPr marL="0" lvl="0" indent="0" algn="ctr" defTabSz="755650">
+          <a:pPr lvl="0" algn="ctr" defTabSz="755650">
             <a:lnSpc>
               <a:spcPct val="90000"/>
             </a:lnSpc>
@@ -2991,7 +3062,6 @@
             <a:spcAft>
               <a:spcPct val="35000"/>
             </a:spcAft>
-            <a:buNone/>
           </a:pPr>
           <a:r>
             <a:rPr lang="es-ES" sz="1700" kern="1200" dirty="0"/>
@@ -3079,7 +3149,7 @@
         </a:bodyPr>
         <a:lstStyle/>
         <a:p>
-          <a:pPr marL="0" lvl="0" indent="0" algn="ctr" defTabSz="755650">
+          <a:pPr lvl="0" algn="ctr" defTabSz="755650">
             <a:lnSpc>
               <a:spcPct val="90000"/>
             </a:lnSpc>
@@ -3089,7 +3159,6 @@
             <a:spcAft>
               <a:spcPct val="35000"/>
             </a:spcAft>
-            <a:buNone/>
           </a:pPr>
           <a:r>
             <a:rPr lang="es-ES" sz="1700" kern="1200" dirty="0"/>
@@ -3177,7 +3246,7 @@
         </a:bodyPr>
         <a:lstStyle/>
         <a:p>
-          <a:pPr marL="0" lvl="0" indent="0" algn="ctr" defTabSz="755650">
+          <a:pPr lvl="0" algn="ctr" defTabSz="755650">
             <a:lnSpc>
               <a:spcPct val="90000"/>
             </a:lnSpc>
@@ -3187,7 +3256,6 @@
             <a:spcAft>
               <a:spcPct val="35000"/>
             </a:spcAft>
-            <a:buNone/>
           </a:pPr>
           <a:r>
             <a:rPr lang="es-ES" sz="1700" kern="1200" dirty="0"/>
@@ -3287,7 +3355,7 @@
         </a:bodyPr>
         <a:lstStyle/>
         <a:p>
-          <a:pPr marL="0" lvl="0" indent="0" algn="ctr" defTabSz="755650">
+          <a:pPr lvl="0" algn="ctr" defTabSz="755650">
             <a:lnSpc>
               <a:spcPct val="90000"/>
             </a:lnSpc>
@@ -3297,7 +3365,6 @@
             <a:spcAft>
               <a:spcPct val="35000"/>
             </a:spcAft>
-            <a:buNone/>
           </a:pPr>
           <a:r>
             <a:rPr lang="es-ES" sz="1700" kern="1200" dirty="0"/>
@@ -3385,7 +3452,7 @@
         </a:bodyPr>
         <a:lstStyle/>
         <a:p>
-          <a:pPr marL="0" lvl="0" indent="0" algn="ctr" defTabSz="755650">
+          <a:pPr lvl="0" algn="ctr" defTabSz="755650">
             <a:lnSpc>
               <a:spcPct val="90000"/>
             </a:lnSpc>
@@ -3395,7 +3462,6 @@
             <a:spcAft>
               <a:spcPct val="35000"/>
             </a:spcAft>
-            <a:buNone/>
           </a:pPr>
           <a:r>
             <a:rPr lang="es-ES" sz="1700" kern="1200" dirty="0"/>
@@ -3483,7 +3549,7 @@
         </a:bodyPr>
         <a:lstStyle/>
         <a:p>
-          <a:pPr marL="0" lvl="0" indent="0" algn="ctr" defTabSz="755650">
+          <a:pPr lvl="0" algn="ctr" defTabSz="755650">
             <a:lnSpc>
               <a:spcPct val="90000"/>
             </a:lnSpc>
@@ -3493,7 +3559,6 @@
             <a:spcAft>
               <a:spcPct val="35000"/>
             </a:spcAft>
-            <a:buNone/>
           </a:pPr>
           <a:r>
             <a:rPr lang="es-ES" sz="1700" kern="1200" dirty="0"/>
@@ -3581,7 +3646,7 @@
         </a:bodyPr>
         <a:lstStyle/>
         <a:p>
-          <a:pPr marL="0" lvl="0" indent="0" algn="ctr" defTabSz="755650">
+          <a:pPr lvl="0" algn="ctr" defTabSz="755650">
             <a:lnSpc>
               <a:spcPct val="90000"/>
             </a:lnSpc>
@@ -3591,7 +3656,6 @@
             <a:spcAft>
               <a:spcPct val="35000"/>
             </a:spcAft>
-            <a:buNone/>
           </a:pPr>
           <a:r>
             <a:rPr lang="es-ES" sz="1700" kern="1200" dirty="0"/>
@@ -13714,6 +13778,13 @@
   <p:clrMapOvr>
     <a:masterClrMapping/>
   </p:clrMapOvr>
+  <p:timing>
+    <p:tnLst>
+      <p:par>
+        <p:cTn id="1" dur="indefinite" restart="never" nodeType="tmRoot"/>
+      </p:par>
+    </p:tnLst>
+  </p:timing>
 </p:sld>
 </file>
 
@@ -13785,8 +13856,8 @@
         </p:nvSpPr>
         <p:spPr>
           <a:xfrm>
-            <a:off x="2469776" y="1950620"/>
-            <a:ext cx="7252447" cy="3693319"/>
+            <a:off x="2469776" y="1683332"/>
+            <a:ext cx="7252447" cy="4247317"/>
           </a:xfrm>
           <a:prstGeom prst="rect">
             <a:avLst/>
@@ -13872,39 +13943,48 @@
           </a:p>
           <a:p>
             <a:pPr algn="l"/>
+            <a:endParaRPr lang="es-ES" sz="2000" b="0" i="0" u="none" strike="noStrike" baseline="0" dirty="0">
+              <a:solidFill>
+                <a:srgbClr val="000000"/>
+              </a:solidFill>
+              <a:latin typeface="Calibri" panose="020F0502020204030204" pitchFamily="34" charset="0"/>
+            </a:endParaRPr>
+          </a:p>
+          <a:p>
+            <a:pPr marL="342900" indent="-342900" algn="l">
+              <a:buFont typeface="Arial" panose="020B0604020202020204" pitchFamily="34" charset="0"/>
+              <a:buChar char="•"/>
+            </a:pPr>
+            <a:r>
+              <a:rPr lang="es-ES" sz="2000" dirty="0">
+                <a:solidFill>
+                  <a:srgbClr val="000000"/>
+                </a:solidFill>
+                <a:latin typeface="Calibri" panose="020F0502020204030204" pitchFamily="34" charset="0"/>
+              </a:rPr>
+              <a:t>Principales objetivos cumplidos</a:t>
+            </a:r>
+            <a:r>
+              <a:rPr lang="es-ES" sz="2000" dirty="0" smtClean="0">
+                <a:solidFill>
+                  <a:srgbClr val="000000"/>
+                </a:solidFill>
+                <a:latin typeface="Calibri" panose="020F0502020204030204" pitchFamily="34" charset="0"/>
+              </a:rPr>
+              <a:t>:</a:t>
+            </a:r>
+          </a:p>
+          <a:p>
+            <a:pPr marL="342900" indent="-342900" algn="l">
+              <a:buFont typeface="Arial" panose="020B0604020202020204" pitchFamily="34" charset="0"/>
+              <a:buChar char="•"/>
+            </a:pPr>
             <a:endParaRPr lang="es-ES" sz="2000" dirty="0">
               <a:solidFill>
                 <a:srgbClr val="000000"/>
               </a:solidFill>
               <a:latin typeface="Calibri" panose="020F0502020204030204" pitchFamily="34" charset="0"/>
             </a:endParaRPr>
-          </a:p>
-          <a:p>
-            <a:pPr marL="342900" indent="-342900" algn="l">
-              <a:buFont typeface="Arial" panose="020B0604020202020204" pitchFamily="34" charset="0"/>
-              <a:buChar char="•"/>
-            </a:pPr>
-            <a:endParaRPr lang="es-ES" sz="2000" b="0" i="0" u="none" strike="noStrike" baseline="0" dirty="0">
-              <a:solidFill>
-                <a:srgbClr val="000000"/>
-              </a:solidFill>
-              <a:latin typeface="Calibri" panose="020F0502020204030204" pitchFamily="34" charset="0"/>
-            </a:endParaRPr>
-          </a:p>
-          <a:p>
-            <a:pPr marL="342900" indent="-342900" algn="l">
-              <a:buFont typeface="Arial" panose="020B0604020202020204" pitchFamily="34" charset="0"/>
-              <a:buChar char="•"/>
-            </a:pPr>
-            <a:r>
-              <a:rPr lang="es-ES" sz="2000" dirty="0">
-                <a:solidFill>
-                  <a:srgbClr val="000000"/>
-                </a:solidFill>
-                <a:latin typeface="Calibri" panose="020F0502020204030204" pitchFamily="34" charset="0"/>
-              </a:rPr>
-              <a:t>Principales objetivos cumplidos:</a:t>
-            </a:r>
           </a:p>
           <a:p>
             <a:pPr marL="800100" lvl="1" indent="-342900">
@@ -13927,8 +14007,29 @@
                 </a:solidFill>
                 <a:latin typeface="Calibri" panose="020F0502020204030204" pitchFamily="34" charset="0"/>
               </a:rPr>
-              <a:t>finición del nombre del equipo y del sistema</a:t>
-            </a:r>
+              <a:t>finición del nombre del equipo y del </a:t>
+            </a:r>
+            <a:r>
+              <a:rPr lang="es-ES" dirty="0" smtClean="0">
+                <a:solidFill>
+                  <a:srgbClr val="000000"/>
+                </a:solidFill>
+                <a:latin typeface="Calibri" panose="020F0502020204030204" pitchFamily="34" charset="0"/>
+              </a:rPr>
+              <a:t>sistema</a:t>
+            </a:r>
+          </a:p>
+          <a:p>
+            <a:pPr marL="800100" lvl="1" indent="-342900">
+              <a:buFont typeface="Arial" panose="020B0604020202020204" pitchFamily="34" charset="0"/>
+              <a:buChar char="•"/>
+            </a:pPr>
+            <a:endParaRPr lang="es-ES" dirty="0">
+              <a:solidFill>
+                <a:srgbClr val="000000"/>
+              </a:solidFill>
+              <a:latin typeface="Calibri" panose="020F0502020204030204" pitchFamily="34" charset="0"/>
+            </a:endParaRPr>
           </a:p>
           <a:p>
             <a:pPr marL="800100" lvl="1" indent="-342900">
@@ -13942,8 +14043,29 @@
                 </a:solidFill>
                 <a:latin typeface="Calibri" panose="020F0502020204030204" pitchFamily="34" charset="0"/>
               </a:rPr>
-              <a:t>Primer contacto con el cliente</a:t>
-            </a:r>
+              <a:t>Primer contacto con el </a:t>
+            </a:r>
+            <a:r>
+              <a:rPr lang="es-ES" b="0" i="0" u="none" strike="noStrike" baseline="0" dirty="0" smtClean="0">
+                <a:solidFill>
+                  <a:srgbClr val="000000"/>
+                </a:solidFill>
+                <a:latin typeface="Calibri" panose="020F0502020204030204" pitchFamily="34" charset="0"/>
+              </a:rPr>
+              <a:t>cliente</a:t>
+            </a:r>
+          </a:p>
+          <a:p>
+            <a:pPr marL="800100" lvl="1" indent="-342900">
+              <a:buFont typeface="Arial" panose="020B0604020202020204" pitchFamily="34" charset="0"/>
+              <a:buChar char="•"/>
+            </a:pPr>
+            <a:endParaRPr lang="es-ES" b="0" i="0" u="none" strike="noStrike" baseline="0" dirty="0">
+              <a:solidFill>
+                <a:srgbClr val="000000"/>
+              </a:solidFill>
+              <a:latin typeface="Calibri" panose="020F0502020204030204" pitchFamily="34" charset="0"/>
+            </a:endParaRPr>
           </a:p>
           <a:p>
             <a:pPr marL="800100" lvl="1" indent="-342900">
@@ -13986,7 +14108,7 @@
           <p:nvPr/>
         </p:nvPicPr>
         <p:blipFill>
-          <a:blip r:embed="rId2">
+          <a:blip r:embed="rId2" cstate="hqprint">
             <a:extLst>
               <a:ext uri="{28A0092B-C50C-407E-A947-70E740481C1C}">
                 <a14:useLocalDpi xmlns:a14="http://schemas.microsoft.com/office/drawing/2010/main" val="0"/>
@@ -13999,8 +14121,68 @@
         </p:blipFill>
         <p:spPr>
           <a:xfrm>
-            <a:off x="9986683" y="3984815"/>
-            <a:ext cx="1344705" cy="1344705"/>
+            <a:off x="8129370" y="3745664"/>
+            <a:ext cx="855094" cy="855094"/>
+          </a:xfrm>
+          <a:prstGeom prst="rect">
+            <a:avLst/>
+          </a:prstGeom>
+        </p:spPr>
+      </p:pic>
+      <p:pic>
+        <p:nvPicPr>
+          <p:cNvPr id="3" name="Imagen 2"/>
+          <p:cNvPicPr>
+            <a:picLocks noChangeAspect="1"/>
+          </p:cNvPicPr>
+          <p:nvPr/>
+        </p:nvPicPr>
+        <p:blipFill>
+          <a:blip r:embed="rId3" cstate="hqprint">
+            <a:extLst>
+              <a:ext uri="{28A0092B-C50C-407E-A947-70E740481C1C}">
+                <a14:useLocalDpi xmlns:a14="http://schemas.microsoft.com/office/drawing/2010/main" val="0"/>
+              </a:ext>
+            </a:extLst>
+          </a:blip>
+          <a:stretch>
+            <a:fillRect/>
+          </a:stretch>
+        </p:blipFill>
+        <p:spPr>
+          <a:xfrm>
+            <a:off x="6769258" y="4559178"/>
+            <a:ext cx="622353" cy="622353"/>
+          </a:xfrm>
+          <a:prstGeom prst="rect">
+            <a:avLst/>
+          </a:prstGeom>
+        </p:spPr>
+      </p:pic>
+      <p:pic>
+        <p:nvPicPr>
+          <p:cNvPr id="5" name="Imagen 4"/>
+          <p:cNvPicPr>
+            <a:picLocks noChangeAspect="1"/>
+          </p:cNvPicPr>
+          <p:nvPr/>
+        </p:nvPicPr>
+        <p:blipFill>
+          <a:blip r:embed="rId4" cstate="hqprint">
+            <a:extLst>
+              <a:ext uri="{28A0092B-C50C-407E-A947-70E740481C1C}">
+                <a14:useLocalDpi xmlns:a14="http://schemas.microsoft.com/office/drawing/2010/main" val="0"/>
+              </a:ext>
+            </a:extLst>
+          </a:blip>
+          <a:stretch>
+            <a:fillRect/>
+          </a:stretch>
+        </p:blipFill>
+        <p:spPr>
+          <a:xfrm>
+            <a:off x="9566030" y="5056163"/>
+            <a:ext cx="642425" cy="642425"/>
           </a:xfrm>
           <a:prstGeom prst="rect">
             <a:avLst/>
@@ -14017,6 +14199,13 @@
   <p:clrMapOvr>
     <a:masterClrMapping/>
   </p:clrMapOvr>
+  <p:timing>
+    <p:tnLst>
+      <p:par>
+        <p:cTn id="1" dur="indefinite" restart="never" nodeType="tmRoot"/>
+      </p:par>
+    </p:tnLst>
+  </p:timing>
 </p:sld>
 </file>
 
@@ -14338,6 +14527,13 @@
   <p:clrMapOvr>
     <a:masterClrMapping/>
   </p:clrMapOvr>
+  <p:timing>
+    <p:tnLst>
+      <p:par>
+        <p:cTn id="1" dur="indefinite" restart="never" nodeType="tmRoot"/>
+      </p:par>
+    </p:tnLst>
+  </p:timing>
 </p:sld>
 </file>
 
@@ -14650,6 +14846,13 @@
   <p:clrMapOvr>
     <a:masterClrMapping/>
   </p:clrMapOvr>
+  <p:timing>
+    <p:tnLst>
+      <p:par>
+        <p:cTn id="1" dur="indefinite" restart="never" nodeType="tmRoot"/>
+      </p:par>
+    </p:tnLst>
+  </p:timing>
 </p:sld>
 </file>
 
@@ -15022,6 +15225,13 @@
   <p:clrMapOvr>
     <a:masterClrMapping/>
   </p:clrMapOvr>
+  <p:timing>
+    <p:tnLst>
+      <p:par>
+        <p:cTn id="1" dur="indefinite" restart="never" nodeType="tmRoot"/>
+      </p:par>
+    </p:tnLst>
+  </p:timing>
 </p:sld>
 </file>
 
@@ -15113,6 +15323,13 @@
   <p:clrMapOvr>
     <a:masterClrMapping/>
   </p:clrMapOvr>
+  <p:timing>
+    <p:tnLst>
+      <p:par>
+        <p:cTn id="1" dur="indefinite" restart="never" nodeType="tmRoot"/>
+      </p:par>
+    </p:tnLst>
+  </p:timing>
 </p:sld>
 </file>
 
@@ -15191,6 +15408,13 @@
   <p:clrMapOvr>
     <a:masterClrMapping/>
   </p:clrMapOvr>
+  <p:timing>
+    <p:tnLst>
+      <p:par>
+        <p:cTn id="1" dur="indefinite" restart="never" nodeType="tmRoot"/>
+      </p:par>
+    </p:tnLst>
+  </p:timing>
 </p:sld>
 </file>
 
@@ -15285,6 +15509,13 @@
   <p:clrMapOvr>
     <a:masterClrMapping/>
   </p:clrMapOvr>
+  <p:timing>
+    <p:tnLst>
+      <p:par>
+        <p:cTn id="1" dur="indefinite" restart="never" nodeType="tmRoot"/>
+      </p:par>
+    </p:tnLst>
+  </p:timing>
 </p:sld>
 </file>
 
@@ -15363,6 +15594,13 @@
   <p:clrMapOvr>
     <a:masterClrMapping/>
   </p:clrMapOvr>
+  <p:timing>
+    <p:tnLst>
+      <p:par>
+        <p:cTn id="1" dur="indefinite" restart="never" nodeType="tmRoot"/>
+      </p:par>
+    </p:tnLst>
+  </p:timing>
 </p:sld>
 </file>
 
@@ -15589,6 +15827,13 @@
   <p:clrMapOvr>
     <a:masterClrMapping/>
   </p:clrMapOvr>
+  <p:timing>
+    <p:tnLst>
+      <p:par>
+        <p:cTn id="1" dur="indefinite" restart="never" nodeType="tmRoot"/>
+      </p:par>
+    </p:tnLst>
+  </p:timing>
 </p:sld>
 </file>
 
@@ -15732,7 +15977,14 @@
                 <a:latin typeface="Georgia" panose="02040502050405020303" pitchFamily="18" charset="0"/>
                 <a:sym typeface="Wingdings" panose="05000000000000000000" pitchFamily="2" charset="2"/>
               </a:rPr>
-              <a:t> todos fueron mitigados</a:t>
+              <a:t> </a:t>
+            </a:r>
+            <a:r>
+              <a:rPr lang="es-ES" sz="2000" dirty="0" smtClean="0">
+                <a:latin typeface="Georgia" panose="02040502050405020303" pitchFamily="18" charset="0"/>
+                <a:sym typeface="Wingdings" panose="05000000000000000000" pitchFamily="2" charset="2"/>
+              </a:rPr>
+              <a:t>mitigados/eliminados</a:t>
             </a:r>
             <a:endParaRPr lang="es-ES" sz="2000" dirty="0">
               <a:latin typeface="Georgia" panose="02040502050405020303" pitchFamily="18" charset="0"/>
@@ -15757,6 +16009,18 @@
               <a:buFont typeface="Arial" panose="020B0604020202020204" pitchFamily="34" charset="0"/>
               <a:buChar char="•"/>
             </a:pPr>
+            <a:r>
+              <a:rPr lang="es-ES" sz="2000" b="0" i="0" u="none" strike="noStrike" baseline="0" dirty="0" smtClean="0">
+                <a:latin typeface="Georgia" panose="02040502050405020303" pitchFamily="18" charset="0"/>
+              </a:rPr>
+              <a:t>Cantidad de riesgos</a:t>
+            </a:r>
+            <a:r>
+              <a:rPr lang="es-ES" sz="2000" b="0" i="0" u="none" strike="noStrike" dirty="0" smtClean="0">
+                <a:latin typeface="Georgia" panose="02040502050405020303" pitchFamily="18" charset="0"/>
+              </a:rPr>
+              <a:t> gestionados según etapa del proceso:</a:t>
+            </a:r>
             <a:endParaRPr lang="es-ES" sz="2000" b="0" i="0" u="none" strike="noStrike" baseline="0" dirty="0">
               <a:latin typeface="Georgia" panose="02040502050405020303" pitchFamily="18" charset="0"/>
             </a:endParaRPr>
@@ -15945,6 +16209,13 @@
   <p:clrMapOvr>
     <a:masterClrMapping/>
   </p:clrMapOvr>
+  <p:timing>
+    <p:tnLst>
+      <p:par>
+        <p:cTn id="1" dur="indefinite" restart="never" nodeType="tmRoot"/>
+      </p:par>
+    </p:tnLst>
+  </p:timing>
 </p:sld>
 </file>
 
@@ -16335,6 +16606,13 @@
   <p:clrMapOvr>
     <a:masterClrMapping/>
   </p:clrMapOvr>
+  <p:timing>
+    <p:tnLst>
+      <p:par>
+        <p:cTn id="1" dur="indefinite" restart="never" nodeType="tmRoot"/>
+      </p:par>
+    </p:tnLst>
+  </p:timing>
 </p:sld>
 </file>
 
@@ -16413,6 +16691,13 @@
   <p:clrMapOvr>
     <a:masterClrMapping/>
   </p:clrMapOvr>
+  <p:timing>
+    <p:tnLst>
+      <p:par>
+        <p:cTn id="1" dur="indefinite" restart="never" nodeType="tmRoot"/>
+      </p:par>
+    </p:tnLst>
+  </p:timing>
 </p:sld>
 </file>
 
@@ -17255,6 +17540,13 @@
   <p:clrMapOvr>
     <a:masterClrMapping/>
   </p:clrMapOvr>
+  <p:timing>
+    <p:tnLst>
+      <p:par>
+        <p:cTn id="1" dur="indefinite" restart="never" nodeType="tmRoot"/>
+      </p:par>
+    </p:tnLst>
+  </p:timing>
 </p:sld>
 </file>
 
@@ -17384,6 +17676,13 @@
   <p:clrMapOvr>
     <a:masterClrMapping/>
   </p:clrMapOvr>
+  <p:timing>
+    <p:tnLst>
+      <p:par>
+        <p:cTn id="1" dur="indefinite" restart="never" nodeType="tmRoot"/>
+      </p:par>
+    </p:tnLst>
+  </p:timing>
 </p:sld>
 </file>
 
@@ -17540,7 +17839,7 @@
           <p:nvPr/>
         </p:nvPicPr>
         <p:blipFill>
-          <a:blip r:embed="rId4" cstate="print">
+          <a:blip r:embed="rId4" cstate="hqprint">
             <a:extLst>
               <a:ext uri="{28A0092B-C50C-407E-A947-70E740481C1C}">
                 <a14:useLocalDpi xmlns:a14="http://schemas.microsoft.com/office/drawing/2010/main" val="0"/>
@@ -17953,7 +18252,7 @@
         </p:blipFill>
         <p:spPr>
           <a:xfrm>
-            <a:off x="6586862" y="4606856"/>
+            <a:off x="6061050" y="4618275"/>
             <a:ext cx="981236" cy="1131515"/>
           </a:xfrm>
           <a:prstGeom prst="rect">
@@ -17983,7 +18282,7 @@
         </p:blipFill>
         <p:spPr>
           <a:xfrm>
-            <a:off x="10171544" y="4519810"/>
+            <a:off x="9738530" y="4218053"/>
             <a:ext cx="1775007" cy="591669"/>
           </a:xfrm>
           <a:prstGeom prst="rect">
@@ -18013,7 +18312,7 @@
         </p:blipFill>
         <p:spPr>
           <a:xfrm>
-            <a:off x="10632358" y="5336736"/>
+            <a:off x="10199344" y="5141950"/>
             <a:ext cx="853377" cy="853377"/>
           </a:xfrm>
           <a:prstGeom prst="rect">
@@ -18073,7 +18372,7 @@
         </p:blipFill>
         <p:spPr>
           <a:xfrm>
-            <a:off x="8488839" y="4698167"/>
+            <a:off x="8145878" y="4658220"/>
             <a:ext cx="1051623" cy="1051623"/>
           </a:xfrm>
           <a:prstGeom prst="rect">
@@ -18130,7 +18429,7 @@
         </p:nvSpPr>
         <p:spPr>
           <a:xfrm>
-            <a:off x="6464972" y="5810346"/>
+            <a:off x="5939160" y="5819667"/>
             <a:ext cx="1225015" cy="400110"/>
           </a:xfrm>
           <a:prstGeom prst="rect">
@@ -18172,7 +18471,7 @@
         </p:nvSpPr>
         <p:spPr>
           <a:xfrm>
-            <a:off x="8243716" y="5814812"/>
+            <a:off x="7877240" y="5819667"/>
             <a:ext cx="1588897" cy="400110"/>
           </a:xfrm>
           <a:prstGeom prst="rect">
@@ -18304,6 +18603,13 @@
   <p:clrMapOvr>
     <a:masterClrMapping/>
   </p:clrMapOvr>
+  <p:timing>
+    <p:tnLst>
+      <p:par>
+        <p:cTn id="1" dur="indefinite" restart="never" nodeType="tmRoot"/>
+      </p:par>
+    </p:tnLst>
+  </p:timing>
 </p:sld>
 </file>
 
@@ -18395,6 +18701,13 @@
   <p:clrMapOvr>
     <a:masterClrMapping/>
   </p:clrMapOvr>
+  <p:timing>
+    <p:tnLst>
+      <p:par>
+        <p:cTn id="1" dur="indefinite" restart="never" nodeType="tmRoot"/>
+      </p:par>
+    </p:tnLst>
+  </p:timing>
 </p:sld>
 </file>
 
@@ -18767,6 +19080,13 @@
   <p:clrMapOvr>
     <a:masterClrMapping/>
   </p:clrMapOvr>
+  <p:timing>
+    <p:tnLst>
+      <p:par>
+        <p:cTn id="1" dur="indefinite" restart="never" nodeType="tmRoot"/>
+      </p:par>
+    </p:tnLst>
+  </p:timing>
 </p:sld>
 </file>
 
@@ -19033,6 +19353,13 @@
   <p:clrMapOvr>
     <a:masterClrMapping/>
   </p:clrMapOvr>
+  <p:timing>
+    <p:tnLst>
+      <p:par>
+        <p:cTn id="1" dur="indefinite" restart="never" nodeType="tmRoot"/>
+      </p:par>
+    </p:tnLst>
+  </p:timing>
 </p:sld>
 </file>
 
@@ -19111,6 +19438,13 @@
   <p:clrMapOvr>
     <a:masterClrMapping/>
   </p:clrMapOvr>
+  <p:timing>
+    <p:tnLst>
+      <p:par>
+        <p:cTn id="1" dur="indefinite" restart="never" nodeType="tmRoot"/>
+      </p:par>
+    </p:tnLst>
+  </p:timing>
 </p:sld>
 </file>
 
@@ -19282,6 +19616,66 @@
           </a:p>
         </p:txBody>
       </p:sp>
+      <p:pic>
+        <p:nvPicPr>
+          <p:cNvPr id="6" name="Imagen 5"/>
+          <p:cNvPicPr>
+            <a:picLocks noChangeAspect="1"/>
+          </p:cNvPicPr>
+          <p:nvPr/>
+        </p:nvPicPr>
+        <p:blipFill>
+          <a:blip r:embed="rId2">
+            <a:extLst>
+              <a:ext uri="{28A0092B-C50C-407E-A947-70E740481C1C}">
+                <a14:useLocalDpi xmlns:a14="http://schemas.microsoft.com/office/drawing/2010/main" val="0"/>
+              </a:ext>
+            </a:extLst>
+          </a:blip>
+          <a:stretch>
+            <a:fillRect/>
+          </a:stretch>
+        </p:blipFill>
+        <p:spPr>
+          <a:xfrm>
+            <a:off x="9033675" y="2039522"/>
+            <a:ext cx="2421563" cy="2421563"/>
+          </a:xfrm>
+          <a:prstGeom prst="rect">
+            <a:avLst/>
+          </a:prstGeom>
+        </p:spPr>
+      </p:pic>
+      <p:pic>
+        <p:nvPicPr>
+          <p:cNvPr id="7" name="Imagen 6"/>
+          <p:cNvPicPr>
+            <a:picLocks noChangeAspect="1"/>
+          </p:cNvPicPr>
+          <p:nvPr/>
+        </p:nvPicPr>
+        <p:blipFill>
+          <a:blip r:embed="rId3" cstate="hqprint">
+            <a:extLst>
+              <a:ext uri="{28A0092B-C50C-407E-A947-70E740481C1C}">
+                <a14:useLocalDpi xmlns:a14="http://schemas.microsoft.com/office/drawing/2010/main" val="0"/>
+              </a:ext>
+            </a:extLst>
+          </a:blip>
+          <a:stretch>
+            <a:fillRect/>
+          </a:stretch>
+        </p:blipFill>
+        <p:spPr>
+          <a:xfrm>
+            <a:off x="9144000" y="2404695"/>
+            <a:ext cx="2208628" cy="1393582"/>
+          </a:xfrm>
+          <a:prstGeom prst="rect">
+            <a:avLst/>
+          </a:prstGeom>
+        </p:spPr>
+      </p:pic>
     </p:spTree>
     <p:extLst>
       <p:ext uri="{BB962C8B-B14F-4D97-AF65-F5344CB8AC3E}">
@@ -19292,6 +19686,13 @@
   <p:clrMapOvr>
     <a:masterClrMapping/>
   </p:clrMapOvr>
+  <p:timing>
+    <p:tnLst>
+      <p:par>
+        <p:cTn id="1" dur="indefinite" restart="never" nodeType="tmRoot"/>
+      </p:par>
+    </p:tnLst>
+  </p:timing>
 </p:sld>
 </file>
 
@@ -19383,6 +19784,13 @@
   <p:clrMapOvr>
     <a:masterClrMapping/>
   </p:clrMapOvr>
+  <p:timing>
+    <p:tnLst>
+      <p:par>
+        <p:cTn id="1" dur="indefinite" restart="never" nodeType="tmRoot"/>
+      </p:par>
+    </p:tnLst>
+  </p:timing>
 </p:sld>
 </file>
 
@@ -19579,6 +19987,13 @@
   <p:clrMapOvr>
     <a:masterClrMapping/>
   </p:clrMapOvr>
+  <p:timing>
+    <p:tnLst>
+      <p:par>
+        <p:cTn id="1" dur="indefinite" restart="never" nodeType="tmRoot"/>
+      </p:par>
+    </p:tnLst>
+  </p:timing>
 </p:sld>
 </file>
 
@@ -19708,6 +20123,13 @@
   <p:clrMapOvr>
     <a:masterClrMapping/>
   </p:clrMapOvr>
+  <p:timing>
+    <p:tnLst>
+      <p:par>
+        <p:cTn id="1" dur="indefinite" restart="never" nodeType="tmRoot"/>
+      </p:par>
+    </p:tnLst>
+  </p:timing>
 </p:sld>
 </file>
 
@@ -19744,7 +20166,12 @@
             <p:ph type="title"/>
           </p:nvPr>
         </p:nvSpPr>
-        <p:spPr/>
+        <p:spPr>
+          <a:xfrm>
+            <a:off x="1484311" y="123091"/>
+            <a:ext cx="10018713" cy="1752599"/>
+          </a:xfrm>
+        </p:spPr>
         <p:txBody>
           <a:bodyPr/>
           <a:lstStyle/>
@@ -19889,6 +20316,200 @@
           </a:p>
         </p:txBody>
       </p:sp>
+      <p:pic>
+        <p:nvPicPr>
+          <p:cNvPr id="4" name="Imagen 3"/>
+          <p:cNvPicPr>
+            <a:picLocks noChangeAspect="1"/>
+          </p:cNvPicPr>
+          <p:nvPr/>
+        </p:nvPicPr>
+        <p:blipFill>
+          <a:blip r:embed="rId2" cstate="hqprint">
+            <a:extLst>
+              <a:ext uri="{28A0092B-C50C-407E-A947-70E740481C1C}">
+                <a14:useLocalDpi xmlns:a14="http://schemas.microsoft.com/office/drawing/2010/main" val="0"/>
+              </a:ext>
+            </a:extLst>
+          </a:blip>
+          <a:stretch>
+            <a:fillRect/>
+          </a:stretch>
+        </p:blipFill>
+        <p:spPr>
+          <a:xfrm>
+            <a:off x="5635575" y="2096380"/>
+            <a:ext cx="1139190" cy="1139190"/>
+          </a:xfrm>
+          <a:prstGeom prst="rect">
+            <a:avLst/>
+          </a:prstGeom>
+        </p:spPr>
+      </p:pic>
+      <p:pic>
+        <p:nvPicPr>
+          <p:cNvPr id="8" name="Imagen 7"/>
+          <p:cNvPicPr>
+            <a:picLocks noChangeAspect="1"/>
+          </p:cNvPicPr>
+          <p:nvPr/>
+        </p:nvPicPr>
+        <p:blipFill>
+          <a:blip r:embed="rId3" cstate="hqprint">
+            <a:extLst>
+              <a:ext uri="{28A0092B-C50C-407E-A947-70E740481C1C}">
+                <a14:useLocalDpi xmlns:a14="http://schemas.microsoft.com/office/drawing/2010/main" val="0"/>
+              </a:ext>
+            </a:extLst>
+          </a:blip>
+          <a:stretch>
+            <a:fillRect/>
+          </a:stretch>
+        </p:blipFill>
+        <p:spPr>
+          <a:xfrm>
+            <a:off x="5685138" y="2250832"/>
+            <a:ext cx="1061492" cy="675248"/>
+          </a:xfrm>
+          <a:prstGeom prst="rect">
+            <a:avLst/>
+          </a:prstGeom>
+        </p:spPr>
+      </p:pic>
+      <p:pic>
+        <p:nvPicPr>
+          <p:cNvPr id="10" name="Imagen 9"/>
+          <p:cNvPicPr>
+            <a:picLocks noChangeAspect="1"/>
+          </p:cNvPicPr>
+          <p:nvPr/>
+        </p:nvPicPr>
+        <p:blipFill>
+          <a:blip r:embed="rId4" cstate="hqprint">
+            <a:extLst>
+              <a:ext uri="{28A0092B-C50C-407E-A947-70E740481C1C}">
+                <a14:useLocalDpi xmlns:a14="http://schemas.microsoft.com/office/drawing/2010/main" val="0"/>
+              </a:ext>
+            </a:extLst>
+          </a:blip>
+          <a:stretch>
+            <a:fillRect/>
+          </a:stretch>
+        </p:blipFill>
+        <p:spPr>
+          <a:xfrm>
+            <a:off x="5685138" y="4366846"/>
+            <a:ext cx="1037932" cy="1037932"/>
+          </a:xfrm>
+          <a:prstGeom prst="rect">
+            <a:avLst/>
+          </a:prstGeom>
+        </p:spPr>
+      </p:pic>
+      <p:pic>
+        <p:nvPicPr>
+          <p:cNvPr id="11" name="Imagen 10"/>
+          <p:cNvPicPr>
+            <a:picLocks noChangeAspect="1"/>
+          </p:cNvPicPr>
+          <p:nvPr/>
+        </p:nvPicPr>
+        <p:blipFill>
+          <a:blip r:embed="rId2" cstate="hqprint">
+            <a:extLst>
+              <a:ext uri="{28A0092B-C50C-407E-A947-70E740481C1C}">
+                <a14:useLocalDpi xmlns:a14="http://schemas.microsoft.com/office/drawing/2010/main" val="0"/>
+              </a:ext>
+            </a:extLst>
+          </a:blip>
+          <a:stretch>
+            <a:fillRect/>
+          </a:stretch>
+        </p:blipFill>
+        <p:spPr>
+          <a:xfrm>
+            <a:off x="7154886" y="3235570"/>
+            <a:ext cx="1087495" cy="1087495"/>
+          </a:xfrm>
+          <a:prstGeom prst="rect">
+            <a:avLst/>
+          </a:prstGeom>
+        </p:spPr>
+      </p:pic>
+      <p:pic>
+        <p:nvPicPr>
+          <p:cNvPr id="12" name="Imagen 11"/>
+          <p:cNvPicPr>
+            <a:picLocks noChangeAspect="1"/>
+          </p:cNvPicPr>
+          <p:nvPr/>
+        </p:nvPicPr>
+        <p:blipFill>
+          <a:blip r:embed="rId5" cstate="hqprint">
+            <a:extLst>
+              <a:ext uri="{28A0092B-C50C-407E-A947-70E740481C1C}">
+                <a14:useLocalDpi xmlns:a14="http://schemas.microsoft.com/office/drawing/2010/main" val="0"/>
+              </a:ext>
+            </a:extLst>
+          </a:blip>
+          <a:stretch>
+            <a:fillRect/>
+          </a:stretch>
+        </p:blipFill>
+        <p:spPr>
+          <a:xfrm>
+            <a:off x="7369847" y="3385267"/>
+            <a:ext cx="648736" cy="648736"/>
+          </a:xfrm>
+          <a:prstGeom prst="rect">
+            <a:avLst/>
+          </a:prstGeom>
+        </p:spPr>
+      </p:pic>
+      <p:pic>
+        <p:nvPicPr>
+          <p:cNvPr id="5" name="Imagen 4"/>
+          <p:cNvPicPr>
+            <a:picLocks noChangeAspect="1"/>
+          </p:cNvPicPr>
+          <p:nvPr/>
+        </p:nvPicPr>
+        <p:blipFill>
+          <a:blip r:embed="rId6">
+            <a:extLst>
+              <a:ext uri="{28A0092B-C50C-407E-A947-70E740481C1C}">
+                <a14:useLocalDpi xmlns:a14="http://schemas.microsoft.com/office/drawing/2010/main" val="0"/>
+              </a:ext>
+            </a:extLst>
+          </a:blip>
+          <a:stretch>
+            <a:fillRect/>
+          </a:stretch>
+        </p:blipFill>
+        <p:spPr>
+          <a:xfrm>
+            <a:off x="8894155" y="2096380"/>
+            <a:ext cx="2261541" cy="3198139"/>
+          </a:xfrm>
+          <a:prstGeom prst="rect">
+            <a:avLst/>
+          </a:prstGeom>
+          <a:ln w="38100" cap="sq">
+            <a:solidFill>
+              <a:srgbClr val="000000"/>
+            </a:solidFill>
+            <a:prstDash val="solid"/>
+            <a:miter lim="800000"/>
+          </a:ln>
+          <a:effectLst>
+            <a:outerShdw blurRad="50800" dist="38100" dir="2700000" algn="tl" rotWithShape="0">
+              <a:srgbClr val="000000">
+                <a:alpha val="43000"/>
+              </a:srgbClr>
+            </a:outerShdw>
+          </a:effectLst>
+        </p:spPr>
+      </p:pic>
     </p:spTree>
     <p:extLst>
       <p:ext uri="{BB962C8B-B14F-4D97-AF65-F5344CB8AC3E}">
@@ -19899,6 +20520,13 @@
   <p:clrMapOvr>
     <a:masterClrMapping/>
   </p:clrMapOvr>
+  <p:timing>
+    <p:tnLst>
+      <p:par>
+        <p:cTn id="1" dur="indefinite" restart="never" nodeType="tmRoot"/>
+      </p:par>
+    </p:tnLst>
+  </p:timing>
 </p:sld>
 </file>
 
@@ -19950,6 +20578,13 @@
   <p:clrMapOvr>
     <a:masterClrMapping/>
   </p:clrMapOvr>
+  <p:timing>
+    <p:tnLst>
+      <p:par>
+        <p:cTn id="1" dur="indefinite" restart="never" nodeType="tmRoot"/>
+      </p:par>
+    </p:tnLst>
+  </p:timing>
 </p:sld>
 </file>
 
@@ -20587,6 +21222,66 @@
           </a:p>
         </p:txBody>
       </p:sp>
+      <p:pic>
+        <p:nvPicPr>
+          <p:cNvPr id="3" name="Imagen 2"/>
+          <p:cNvPicPr>
+            <a:picLocks noChangeAspect="1"/>
+          </p:cNvPicPr>
+          <p:nvPr/>
+        </p:nvPicPr>
+        <p:blipFill>
+          <a:blip r:embed="rId2" cstate="hqprint">
+            <a:extLst>
+              <a:ext uri="{28A0092B-C50C-407E-A947-70E740481C1C}">
+                <a14:useLocalDpi xmlns:a14="http://schemas.microsoft.com/office/drawing/2010/main" val="0"/>
+              </a:ext>
+            </a:extLst>
+          </a:blip>
+          <a:stretch>
+            <a:fillRect/>
+          </a:stretch>
+        </p:blipFill>
+        <p:spPr>
+          <a:xfrm>
+            <a:off x="5242560" y="2167597"/>
+            <a:ext cx="477129" cy="477129"/>
+          </a:xfrm>
+          <a:prstGeom prst="rect">
+            <a:avLst/>
+          </a:prstGeom>
+        </p:spPr>
+      </p:pic>
+      <p:pic>
+        <p:nvPicPr>
+          <p:cNvPr id="4" name="Imagen 3"/>
+          <p:cNvPicPr>
+            <a:picLocks noChangeAspect="1"/>
+          </p:cNvPicPr>
+          <p:nvPr/>
+        </p:nvPicPr>
+        <p:blipFill>
+          <a:blip r:embed="rId3" cstate="hqprint">
+            <a:extLst>
+              <a:ext uri="{28A0092B-C50C-407E-A947-70E740481C1C}">
+                <a14:useLocalDpi xmlns:a14="http://schemas.microsoft.com/office/drawing/2010/main" val="0"/>
+              </a:ext>
+            </a:extLst>
+          </a:blip>
+          <a:stretch>
+            <a:fillRect/>
+          </a:stretch>
+        </p:blipFill>
+        <p:spPr>
+          <a:xfrm>
+            <a:off x="6457071" y="2805333"/>
+            <a:ext cx="496082" cy="496082"/>
+          </a:xfrm>
+          <a:prstGeom prst="rect">
+            <a:avLst/>
+          </a:prstGeom>
+        </p:spPr>
+      </p:pic>
     </p:spTree>
     <p:extLst>
       <p:ext uri="{BB962C8B-B14F-4D97-AF65-F5344CB8AC3E}">

</xml_diff>